<commit_message>
add post "observer pattern" update post "functional programming"
</commit_message>
<xml_diff>
--- a/etc/images.pptx
+++ b/etc/images.pptx
@@ -2,10 +2,11 @@
 <file path=ppt/presentation.xml><?xml version="1.0" encoding="utf-8"?>
 <p:presentation xmlns:r="http://schemas.openxmlformats.org/officeDocument/2006/relationships" xmlns:c="http://schemas.openxmlformats.org/drawingml/2006/chart" xmlns:a="http://schemas.openxmlformats.org/drawingml/2006/main" xmlns:dgm="http://schemas.openxmlformats.org/drawingml/2006/diagram" xmlns:dsp="http://schemas.microsoft.com/office/drawing/2008/diagram" xmlns:p="http://schemas.openxmlformats.org/presentationml/2006/main">
   <p:sldMasterIdLst>
-    <p:sldMasterId id="2147483721" r:id="rId1"/>
+    <p:sldMasterId id="2147483731" r:id="rId1"/>
   </p:sldMasterIdLst>
   <p:sldIdLst>
     <p:sldId id="256" r:id="rId2"/>
+    <p:sldId id="257" r:id="rId3"/>
   </p:sldIdLst>
   <p:sldSz cx="12192000" cy="6858000"/>
   <p:notesSz cx="6858000" cy="9144000"/>
@@ -3842,6 +3843,1355 @@
 </p:sld>
 </file>
 
+<file path=ppt/slides/slide2.xml><?xml version="1.0" encoding="utf-8"?>
+<p:sld xmlns:r="http://schemas.openxmlformats.org/officeDocument/2006/relationships" xmlns:c="http://schemas.openxmlformats.org/drawingml/2006/chart" xmlns:a="http://schemas.openxmlformats.org/drawingml/2006/main" xmlns:dgm="http://schemas.openxmlformats.org/drawingml/2006/diagram" xmlns:dsp="http://schemas.microsoft.com/office/drawing/2008/diagram" xmlns:p="http://schemas.openxmlformats.org/presentationml/2006/main">
+  <p:cSld>
+    <p:spTree>
+      <p:nvGrpSpPr>
+        <p:cNvPr id="1" name=""/>
+        <p:cNvGrpSpPr/>
+        <p:nvPr/>
+      </p:nvGrpSpPr>
+      <p:grpSpPr>
+        <a:xfrm>
+          <a:off x="0" y="0"/>
+          <a:ext cx="0" cy="0"/>
+          <a:chOff x="0" y="0"/>
+          <a:chExt cx="0" cy="0"/>
+        </a:xfrm>
+      </p:grpSpPr>
+      <p:sp>
+        <p:nvSpPr>
+          <p:cNvPr id="28" name=""/>
+          <p:cNvSpPr/>
+          <p:nvPr/>
+        </p:nvSpPr>
+        <p:spPr>
+          <a:xfrm>
+            <a:off x="540795" y="533025"/>
+            <a:ext cx="10978815" cy="3822532"/>
+          </a:xfrm>
+          <a:prstGeom prst="flowChartAlternateProcess">
+            <a:avLst/>
+          </a:prstGeom>
+        </p:spPr>
+        <p:style>
+          <a:lnRef idx="1">
+            <a:schemeClr val="accent2"/>
+          </a:lnRef>
+          <a:fillRef idx="2">
+            <a:schemeClr val="accent2"/>
+          </a:fillRef>
+          <a:effectRef idx="1">
+            <a:schemeClr val="accent2"/>
+          </a:effectRef>
+          <a:fontRef idx="minor">
+            <a:schemeClr val="dk1"/>
+          </a:fontRef>
+        </p:style>
+        <p:txBody>
+          <a:bodyPr anchor="ctr"/>
+          <a:p>
+            <a:pPr algn="ctr">
+              <a:defRPr/>
+            </a:pPr>
+            <a:endParaRPr lang="en-US" altLang="ko-KR"/>
+          </a:p>
+        </p:txBody>
+      </p:sp>
+      <p:sp>
+        <p:nvSpPr>
+          <p:cNvPr id="4" name=""/>
+          <p:cNvSpPr/>
+          <p:nvPr/>
+        </p:nvSpPr>
+        <p:spPr>
+          <a:xfrm>
+            <a:off x="7145631" y="777416"/>
+            <a:ext cx="1905000" cy="520115"/>
+          </a:xfrm>
+          <a:prstGeom prst="roundRect">
+            <a:avLst>
+              <a:gd name="adj" fmla="val 16667"/>
+            </a:avLst>
+          </a:prstGeom>
+        </p:spPr>
+        <p:style>
+          <a:lnRef idx="2">
+            <a:schemeClr val="accent1">
+              <a:shade val="20000"/>
+            </a:schemeClr>
+          </a:lnRef>
+          <a:fillRef idx="1">
+            <a:schemeClr val="accent1"/>
+          </a:fillRef>
+          <a:effectRef idx="0">
+            <a:schemeClr val="accent1"/>
+          </a:effectRef>
+          <a:fontRef idx="minor">
+            <a:schemeClr val="lt1"/>
+          </a:fontRef>
+        </p:style>
+        <p:txBody>
+          <a:bodyPr anchor="ctr"/>
+          <a:p>
+            <a:pPr algn="ctr">
+              <a:defRPr/>
+            </a:pPr>
+            <a:r>
+              <a:rPr lang="en-US" altLang="ko-KR" b="1"/>
+              <a:t>Observer</a:t>
+            </a:r>
+            <a:endParaRPr lang="en-US" altLang="ko-KR" b="1"/>
+          </a:p>
+        </p:txBody>
+      </p:sp>
+      <p:sp>
+        <p:nvSpPr>
+          <p:cNvPr id="5" name=""/>
+          <p:cNvSpPr/>
+          <p:nvPr/>
+        </p:nvSpPr>
+        <p:spPr>
+          <a:xfrm>
+            <a:off x="4989970" y="2736557"/>
+            <a:ext cx="1905000" cy="520115"/>
+          </a:xfrm>
+          <a:prstGeom prst="roundRect">
+            <a:avLst>
+              <a:gd name="adj" fmla="val 16667"/>
+            </a:avLst>
+          </a:prstGeom>
+        </p:spPr>
+        <p:style>
+          <a:lnRef idx="2">
+            <a:schemeClr val="accent1">
+              <a:shade val="20000"/>
+            </a:schemeClr>
+          </a:lnRef>
+          <a:fillRef idx="1">
+            <a:schemeClr val="accent1"/>
+          </a:fillRef>
+          <a:effectRef idx="0">
+            <a:schemeClr val="accent1"/>
+          </a:effectRef>
+          <a:fontRef idx="minor">
+            <a:schemeClr val="lt1"/>
+          </a:fontRef>
+        </p:style>
+        <p:txBody>
+          <a:bodyPr anchor="ctr"/>
+          <a:p>
+            <a:pPr algn="ctr">
+              <a:defRPr/>
+            </a:pPr>
+            <a:r>
+              <a:rPr lang="en-US" altLang="ko-KR" b="1"/>
+              <a:t>ChatRoom</a:t>
+            </a:r>
+            <a:endParaRPr lang="en-US" altLang="ko-KR" b="1"/>
+          </a:p>
+        </p:txBody>
+      </p:sp>
+      <p:sp>
+        <p:nvSpPr>
+          <p:cNvPr id="6" name=""/>
+          <p:cNvSpPr/>
+          <p:nvPr/>
+        </p:nvSpPr>
+        <p:spPr>
+          <a:xfrm>
+            <a:off x="7145627" y="2739816"/>
+            <a:ext cx="1905000" cy="520115"/>
+          </a:xfrm>
+          <a:prstGeom prst="roundRect">
+            <a:avLst>
+              <a:gd name="adj" fmla="val 16667"/>
+            </a:avLst>
+          </a:prstGeom>
+        </p:spPr>
+        <p:style>
+          <a:lnRef idx="2">
+            <a:schemeClr val="accent1">
+              <a:shade val="20000"/>
+            </a:schemeClr>
+          </a:lnRef>
+          <a:fillRef idx="1">
+            <a:schemeClr val="accent1"/>
+          </a:fillRef>
+          <a:effectRef idx="0">
+            <a:schemeClr val="accent1"/>
+          </a:effectRef>
+          <a:fontRef idx="minor">
+            <a:schemeClr val="lt1"/>
+          </a:fontRef>
+        </p:style>
+        <p:txBody>
+          <a:bodyPr anchor="ctr"/>
+          <a:p>
+            <a:pPr algn="ctr">
+              <a:defRPr/>
+            </a:pPr>
+            <a:r>
+              <a:rPr lang="en-US" altLang="ko-KR" b="1"/>
+              <a:t>GameRoom</a:t>
+            </a:r>
+            <a:endParaRPr lang="en-US" altLang="ko-KR" b="1"/>
+          </a:p>
+        </p:txBody>
+      </p:sp>
+      <p:sp>
+        <p:nvSpPr>
+          <p:cNvPr id="7" name=""/>
+          <p:cNvSpPr/>
+          <p:nvPr/>
+        </p:nvSpPr>
+        <p:spPr>
+          <a:xfrm>
+            <a:off x="9288753" y="2736557"/>
+            <a:ext cx="1905000" cy="520115"/>
+          </a:xfrm>
+          <a:prstGeom prst="roundRect">
+            <a:avLst>
+              <a:gd name="adj" fmla="val 16667"/>
+            </a:avLst>
+          </a:prstGeom>
+        </p:spPr>
+        <p:style>
+          <a:lnRef idx="2">
+            <a:schemeClr val="accent1">
+              <a:shade val="20000"/>
+            </a:schemeClr>
+          </a:lnRef>
+          <a:fillRef idx="1">
+            <a:schemeClr val="accent1"/>
+          </a:fillRef>
+          <a:effectRef idx="0">
+            <a:schemeClr val="accent1"/>
+          </a:effectRef>
+          <a:fontRef idx="minor">
+            <a:schemeClr val="lt1"/>
+          </a:fontRef>
+        </p:style>
+        <p:txBody>
+          <a:bodyPr anchor="ctr"/>
+          <a:p>
+            <a:pPr algn="ctr">
+              <a:defRPr/>
+            </a:pPr>
+            <a:r>
+              <a:rPr lang="en-US" altLang="ko-KR" b="1"/>
+              <a:t>DevRoom</a:t>
+            </a:r>
+            <a:endParaRPr lang="en-US" altLang="ko-KR" b="1"/>
+          </a:p>
+        </p:txBody>
+      </p:sp>
+      <p:sp>
+        <p:nvSpPr>
+          <p:cNvPr id="8" name=""/>
+          <p:cNvSpPr/>
+          <p:nvPr/>
+        </p:nvSpPr>
+        <p:spPr>
+          <a:xfrm>
+            <a:off x="1393030" y="777415"/>
+            <a:ext cx="1905000" cy="520115"/>
+          </a:xfrm>
+          <a:prstGeom prst="roundRect">
+            <a:avLst>
+              <a:gd name="adj" fmla="val 16667"/>
+            </a:avLst>
+          </a:prstGeom>
+        </p:spPr>
+        <p:style>
+          <a:lnRef idx="2">
+            <a:schemeClr val="accent1">
+              <a:shade val="20000"/>
+            </a:schemeClr>
+          </a:lnRef>
+          <a:fillRef idx="1">
+            <a:schemeClr val="accent1"/>
+          </a:fillRef>
+          <a:effectRef idx="0">
+            <a:schemeClr val="accent1"/>
+          </a:effectRef>
+          <a:fontRef idx="minor">
+            <a:schemeClr val="lt1"/>
+          </a:fontRef>
+        </p:style>
+        <p:txBody>
+          <a:bodyPr anchor="ctr"/>
+          <a:p>
+            <a:pPr algn="ctr">
+              <a:defRPr/>
+            </a:pPr>
+            <a:r>
+              <a:rPr lang="en-US" altLang="ko-KR" b="1"/>
+              <a:t>Subject</a:t>
+            </a:r>
+            <a:endParaRPr lang="en-US" altLang="ko-KR" b="1"/>
+          </a:p>
+        </p:txBody>
+      </p:sp>
+      <p:sp>
+        <p:nvSpPr>
+          <p:cNvPr id="9" name=""/>
+          <p:cNvSpPr/>
+          <p:nvPr/>
+        </p:nvSpPr>
+        <p:spPr>
+          <a:xfrm>
+            <a:off x="1393030" y="3603583"/>
+            <a:ext cx="1905000" cy="520115"/>
+          </a:xfrm>
+          <a:prstGeom prst="roundRect">
+            <a:avLst>
+              <a:gd name="adj" fmla="val 16667"/>
+            </a:avLst>
+          </a:prstGeom>
+        </p:spPr>
+        <p:style>
+          <a:lnRef idx="2">
+            <a:schemeClr val="accent1">
+              <a:shade val="20000"/>
+            </a:schemeClr>
+          </a:lnRef>
+          <a:fillRef idx="1">
+            <a:schemeClr val="accent1"/>
+          </a:fillRef>
+          <a:effectRef idx="0">
+            <a:schemeClr val="accent1"/>
+          </a:effectRef>
+          <a:fontRef idx="minor">
+            <a:schemeClr val="lt1"/>
+          </a:fontRef>
+        </p:style>
+        <p:txBody>
+          <a:bodyPr anchor="ctr"/>
+          <a:p>
+            <a:pPr algn="ctr">
+              <a:defRPr/>
+            </a:pPr>
+            <a:r>
+              <a:rPr lang="en-US" altLang="ko-KR" b="1"/>
+              <a:t>User</a:t>
+            </a:r>
+            <a:endParaRPr lang="en-US" altLang="ko-KR" b="1"/>
+          </a:p>
+        </p:txBody>
+      </p:sp>
+      <p:cxnSp>
+        <p:nvCxnSpPr>
+          <p:cNvPr id="10" name=""/>
+          <p:cNvCxnSpPr>
+            <a:stCxn id="5" idx="0"/>
+          </p:cNvCxnSpPr>
+          <p:nvPr/>
+        </p:nvCxnSpPr>
+        <p:spPr>
+          <a:xfrm flipV="1">
+            <a:off x="5942470" y="1646196"/>
+            <a:ext cx="1203157" cy="1090361"/>
+          </a:xfrm>
+          <a:prstGeom prst="straightConnector1">
+            <a:avLst/>
+          </a:prstGeom>
+          <a:ln w="38100">
+            <a:solidFill>
+              <a:schemeClr val="accent5"/>
+            </a:solidFill>
+            <a:tailEnd type="arrow"/>
+          </a:ln>
+        </p:spPr>
+        <p:style>
+          <a:lnRef idx="1">
+            <a:schemeClr val="accent1"/>
+          </a:lnRef>
+          <a:fillRef idx="0">
+            <a:schemeClr val="accent1"/>
+          </a:fillRef>
+          <a:effectRef idx="0">
+            <a:schemeClr val="accent1"/>
+          </a:effectRef>
+          <a:fontRef idx="minor">
+            <a:schemeClr val="tx1"/>
+          </a:fontRef>
+        </p:style>
+      </p:cxnSp>
+      <p:cxnSp>
+        <p:nvCxnSpPr>
+          <p:cNvPr id="11" name=""/>
+          <p:cNvCxnSpPr/>
+          <p:nvPr/>
+        </p:nvCxnSpPr>
+        <p:spPr>
+          <a:xfrm rot="5400000" flipH="1" flipV="1">
+            <a:off x="7556078" y="2188241"/>
+            <a:ext cx="1084095" cy="4"/>
+          </a:xfrm>
+          <a:prstGeom prst="straightConnector1">
+            <a:avLst/>
+          </a:prstGeom>
+          <a:ln w="38100">
+            <a:solidFill>
+              <a:schemeClr val="accent5"/>
+            </a:solidFill>
+            <a:tailEnd type="arrow"/>
+          </a:ln>
+        </p:spPr>
+        <p:style>
+          <a:lnRef idx="1">
+            <a:schemeClr val="accent1"/>
+          </a:lnRef>
+          <a:fillRef idx="0">
+            <a:schemeClr val="accent1"/>
+          </a:fillRef>
+          <a:effectRef idx="0">
+            <a:schemeClr val="accent1"/>
+          </a:effectRef>
+          <a:fontRef idx="minor">
+            <a:schemeClr val="tx1"/>
+          </a:fontRef>
+        </p:style>
+      </p:cxnSp>
+      <p:cxnSp>
+        <p:nvCxnSpPr>
+          <p:cNvPr id="12" name=""/>
+          <p:cNvCxnSpPr>
+            <a:stCxn id="7" idx="0"/>
+          </p:cNvCxnSpPr>
+          <p:nvPr/>
+        </p:nvCxnSpPr>
+        <p:spPr>
+          <a:xfrm rot="10800000">
+            <a:off x="9050628" y="1646195"/>
+            <a:ext cx="1190626" cy="1090362"/>
+          </a:xfrm>
+          <a:prstGeom prst="straightConnector1">
+            <a:avLst/>
+          </a:prstGeom>
+          <a:ln w="38100">
+            <a:solidFill>
+              <a:schemeClr val="accent5"/>
+            </a:solidFill>
+            <a:tailEnd type="arrow"/>
+          </a:ln>
+        </p:spPr>
+        <p:style>
+          <a:lnRef idx="1">
+            <a:schemeClr val="accent1"/>
+          </a:lnRef>
+          <a:fillRef idx="0">
+            <a:schemeClr val="accent1"/>
+          </a:fillRef>
+          <a:effectRef idx="0">
+            <a:schemeClr val="accent1"/>
+          </a:effectRef>
+          <a:fontRef idx="minor">
+            <a:schemeClr val="tx1"/>
+          </a:fontRef>
+        </p:style>
+      </p:cxnSp>
+      <p:cxnSp>
+        <p:nvCxnSpPr>
+          <p:cNvPr id="13" name=""/>
+          <p:cNvCxnSpPr>
+            <a:stCxn id="9" idx="0"/>
+            <a:endCxn id="16" idx="2"/>
+          </p:cNvCxnSpPr>
+          <p:nvPr/>
+        </p:nvCxnSpPr>
+        <p:spPr>
+          <a:xfrm rot="16200000">
+            <a:off x="1648388" y="2906441"/>
+            <a:ext cx="1394283" cy="0"/>
+          </a:xfrm>
+          <a:prstGeom prst="straightConnector1">
+            <a:avLst/>
+          </a:prstGeom>
+          <a:ln w="38100">
+            <a:solidFill>
+              <a:schemeClr val="accent5"/>
+            </a:solidFill>
+            <a:tailEnd type="arrow"/>
+          </a:ln>
+        </p:spPr>
+        <p:style>
+          <a:lnRef idx="1">
+            <a:schemeClr val="accent1"/>
+          </a:lnRef>
+          <a:fillRef idx="0">
+            <a:schemeClr val="accent1"/>
+          </a:fillRef>
+          <a:effectRef idx="0">
+            <a:schemeClr val="accent1"/>
+          </a:effectRef>
+          <a:fontRef idx="minor">
+            <a:schemeClr val="tx1"/>
+          </a:fontRef>
+        </p:style>
+      </p:cxnSp>
+      <p:cxnSp>
+        <p:nvCxnSpPr>
+          <p:cNvPr id="14" name=""/>
+          <p:cNvCxnSpPr>
+            <a:stCxn id="8" idx="3"/>
+            <a:endCxn id="4" idx="1"/>
+          </p:cNvCxnSpPr>
+          <p:nvPr/>
+        </p:nvCxnSpPr>
+        <p:spPr>
+          <a:xfrm>
+            <a:off x="3298030" y="1037473"/>
+            <a:ext cx="3847602" cy="0"/>
+          </a:xfrm>
+          <a:prstGeom prst="straightConnector1">
+            <a:avLst/>
+          </a:prstGeom>
+          <a:ln w="38100">
+            <a:solidFill>
+              <a:schemeClr val="accent6"/>
+            </a:solidFill>
+            <a:tailEnd type="arrow"/>
+          </a:ln>
+        </p:spPr>
+        <p:style>
+          <a:lnRef idx="1">
+            <a:schemeClr val="accent1"/>
+          </a:lnRef>
+          <a:fillRef idx="0">
+            <a:schemeClr val="accent1"/>
+          </a:fillRef>
+          <a:effectRef idx="0">
+            <a:schemeClr val="accent1"/>
+          </a:effectRef>
+          <a:fontRef idx="minor">
+            <a:schemeClr val="tx1"/>
+          </a:fontRef>
+        </p:style>
+      </p:cxnSp>
+      <p:sp>
+        <p:nvSpPr>
+          <p:cNvPr id="15" name=""/>
+          <p:cNvSpPr txBox="1"/>
+          <p:nvPr/>
+        </p:nvSpPr>
+        <p:spPr>
+          <a:xfrm>
+            <a:off x="3298031" y="1037473"/>
+            <a:ext cx="3476701" cy="332599"/>
+          </a:xfrm>
+          <a:prstGeom prst="rect">
+            <a:avLst/>
+          </a:prstGeom>
+        </p:spPr>
+        <p:txBody>
+          <a:bodyPr wrap="none">
+            <a:spAutoFit/>
+          </a:bodyPr>
+          <a:p>
+            <a:pPr>
+              <a:defRPr/>
+            </a:pPr>
+            <a:r>
+              <a:rPr lang="en-US" altLang="ko-KR" sz="1600"/>
+              <a:t>subject</a:t>
+            </a:r>
+            <a:r>
+              <a:rPr lang="ko-KR" altLang="en-US" sz="1600"/>
+              <a:t>에 </a:t>
+            </a:r>
+            <a:r>
+              <a:rPr lang="en-US" altLang="ko-KR" sz="1600"/>
+              <a:t>Observer </a:t>
+            </a:r>
+            <a:r>
+              <a:rPr lang="ko-KR" altLang="en-US" sz="1600"/>
+              <a:t>객체</a:t>
+            </a:r>
+            <a:r>
+              <a:rPr lang="en-US" altLang="ko-KR" sz="1600"/>
+              <a:t> List</a:t>
+            </a:r>
+            <a:r>
+              <a:rPr lang="ko-KR" altLang="en-US" sz="1600"/>
+              <a:t>를 지닌다</a:t>
+            </a:r>
+            <a:r>
+              <a:rPr lang="en-US" altLang="ko-KR" sz="1600"/>
+              <a:t>.</a:t>
+            </a:r>
+            <a:endParaRPr lang="en-US" altLang="ko-KR" sz="1600"/>
+          </a:p>
+        </p:txBody>
+      </p:sp>
+      <p:sp>
+        <p:nvSpPr>
+          <p:cNvPr id="16" name=""/>
+          <p:cNvSpPr/>
+          <p:nvPr/>
+        </p:nvSpPr>
+        <p:spPr>
+          <a:xfrm>
+            <a:off x="1393030" y="1297531"/>
+            <a:ext cx="1905000" cy="911768"/>
+          </a:xfrm>
+          <a:prstGeom prst="roundRect">
+            <a:avLst>
+              <a:gd name="adj" fmla="val 16667"/>
+            </a:avLst>
+          </a:prstGeom>
+        </p:spPr>
+        <p:style>
+          <a:lnRef idx="2">
+            <a:schemeClr val="accent1">
+              <a:shade val="20000"/>
+            </a:schemeClr>
+          </a:lnRef>
+          <a:fillRef idx="1">
+            <a:schemeClr val="accent1"/>
+          </a:fillRef>
+          <a:effectRef idx="0">
+            <a:schemeClr val="accent1"/>
+          </a:effectRef>
+          <a:fontRef idx="minor">
+            <a:schemeClr val="lt1"/>
+          </a:fontRef>
+        </p:style>
+        <p:txBody>
+          <a:bodyPr anchor="ctr"/>
+          <a:p>
+            <a:pPr algn="ctr">
+              <a:defRPr/>
+            </a:pPr>
+            <a:r>
+              <a:rPr lang="en-US" altLang="ko-KR" sz="1600"/>
+              <a:t>attach();</a:t>
+            </a:r>
+            <a:endParaRPr lang="en-US" altLang="ko-KR" sz="1600"/>
+          </a:p>
+          <a:p>
+            <a:pPr algn="ctr">
+              <a:defRPr/>
+            </a:pPr>
+            <a:r>
+              <a:rPr lang="en-US" altLang="ko-KR" sz="1600"/>
+              <a:t>detach();</a:t>
+            </a:r>
+            <a:endParaRPr lang="en-US" altLang="ko-KR" sz="1600"/>
+          </a:p>
+          <a:p>
+            <a:pPr algn="ctr">
+              <a:defRPr/>
+            </a:pPr>
+            <a:r>
+              <a:rPr lang="en-US" altLang="ko-KR" sz="1600"/>
+              <a:t>notify();</a:t>
+            </a:r>
+            <a:endParaRPr lang="en-US" altLang="ko-KR" sz="1600"/>
+          </a:p>
+        </p:txBody>
+      </p:sp>
+      <p:sp>
+        <p:nvSpPr>
+          <p:cNvPr id="21" name=""/>
+          <p:cNvSpPr/>
+          <p:nvPr/>
+        </p:nvSpPr>
+        <p:spPr>
+          <a:xfrm>
+            <a:off x="7145628" y="1297531"/>
+            <a:ext cx="1905000" cy="344654"/>
+          </a:xfrm>
+          <a:prstGeom prst="roundRect">
+            <a:avLst>
+              <a:gd name="adj" fmla="val 16667"/>
+            </a:avLst>
+          </a:prstGeom>
+        </p:spPr>
+        <p:style>
+          <a:lnRef idx="2">
+            <a:schemeClr val="accent1">
+              <a:shade val="20000"/>
+            </a:schemeClr>
+          </a:lnRef>
+          <a:fillRef idx="1">
+            <a:schemeClr val="accent1"/>
+          </a:fillRef>
+          <a:effectRef idx="0">
+            <a:schemeClr val="accent1"/>
+          </a:effectRef>
+          <a:fontRef idx="minor">
+            <a:schemeClr val="lt1"/>
+          </a:fontRef>
+        </p:style>
+        <p:txBody>
+          <a:bodyPr anchor="ctr"/>
+          <a:p>
+            <a:pPr algn="ctr">
+              <a:defRPr/>
+            </a:pPr>
+            <a:r>
+              <a:rPr lang="en-US" altLang="ko-KR" sz="1600"/>
+              <a:t>receive();</a:t>
+            </a:r>
+            <a:endParaRPr lang="en-US" altLang="ko-KR" sz="1600"/>
+          </a:p>
+        </p:txBody>
+      </p:sp>
+      <p:sp>
+        <p:nvSpPr>
+          <p:cNvPr id="25" name=""/>
+          <p:cNvSpPr/>
+          <p:nvPr/>
+        </p:nvSpPr>
+        <p:spPr>
+          <a:xfrm>
+            <a:off x="4989970" y="3259931"/>
+            <a:ext cx="1905000" cy="344654"/>
+          </a:xfrm>
+          <a:prstGeom prst="roundRect">
+            <a:avLst>
+              <a:gd name="adj" fmla="val 16667"/>
+            </a:avLst>
+          </a:prstGeom>
+        </p:spPr>
+        <p:style>
+          <a:lnRef idx="2">
+            <a:schemeClr val="accent1">
+              <a:shade val="20000"/>
+            </a:schemeClr>
+          </a:lnRef>
+          <a:fillRef idx="1">
+            <a:schemeClr val="accent1"/>
+          </a:fillRef>
+          <a:effectRef idx="0">
+            <a:schemeClr val="accent1"/>
+          </a:effectRef>
+          <a:fontRef idx="minor">
+            <a:schemeClr val="lt1"/>
+          </a:fontRef>
+        </p:style>
+        <p:txBody>
+          <a:bodyPr anchor="ctr"/>
+          <a:p>
+            <a:pPr algn="ctr">
+              <a:defRPr/>
+            </a:pPr>
+            <a:r>
+              <a:rPr lang="en-US" altLang="ko-KR" sz="1600"/>
+              <a:t>receive();</a:t>
+            </a:r>
+            <a:endParaRPr lang="en-US" altLang="ko-KR" sz="1600"/>
+          </a:p>
+        </p:txBody>
+      </p:sp>
+      <p:sp>
+        <p:nvSpPr>
+          <p:cNvPr id="26" name=""/>
+          <p:cNvSpPr/>
+          <p:nvPr/>
+        </p:nvSpPr>
+        <p:spPr>
+          <a:xfrm>
+            <a:off x="7145624" y="3256672"/>
+            <a:ext cx="1905000" cy="344654"/>
+          </a:xfrm>
+          <a:prstGeom prst="roundRect">
+            <a:avLst>
+              <a:gd name="adj" fmla="val 16667"/>
+            </a:avLst>
+          </a:prstGeom>
+        </p:spPr>
+        <p:style>
+          <a:lnRef idx="2">
+            <a:schemeClr val="accent1">
+              <a:shade val="20000"/>
+            </a:schemeClr>
+          </a:lnRef>
+          <a:fillRef idx="1">
+            <a:schemeClr val="accent1"/>
+          </a:fillRef>
+          <a:effectRef idx="0">
+            <a:schemeClr val="accent1"/>
+          </a:effectRef>
+          <a:fontRef idx="minor">
+            <a:schemeClr val="lt1"/>
+          </a:fontRef>
+        </p:style>
+        <p:txBody>
+          <a:bodyPr anchor="ctr"/>
+          <a:p>
+            <a:pPr algn="ctr">
+              <a:defRPr/>
+            </a:pPr>
+            <a:r>
+              <a:rPr lang="en-US" altLang="ko-KR" sz="1600"/>
+              <a:t>receive();</a:t>
+            </a:r>
+            <a:endParaRPr lang="en-US" altLang="ko-KR" sz="1600"/>
+          </a:p>
+        </p:txBody>
+      </p:sp>
+      <p:sp>
+        <p:nvSpPr>
+          <p:cNvPr id="27" name=""/>
+          <p:cNvSpPr/>
+          <p:nvPr/>
+        </p:nvSpPr>
+        <p:spPr>
+          <a:xfrm>
+            <a:off x="9288753" y="3259931"/>
+            <a:ext cx="1905000" cy="344654"/>
+          </a:xfrm>
+          <a:prstGeom prst="roundRect">
+            <a:avLst>
+              <a:gd name="adj" fmla="val 16667"/>
+            </a:avLst>
+          </a:prstGeom>
+        </p:spPr>
+        <p:style>
+          <a:lnRef idx="2">
+            <a:schemeClr val="accent1">
+              <a:shade val="20000"/>
+            </a:schemeClr>
+          </a:lnRef>
+          <a:fillRef idx="1">
+            <a:schemeClr val="accent1"/>
+          </a:fillRef>
+          <a:effectRef idx="0">
+            <a:schemeClr val="accent1"/>
+          </a:effectRef>
+          <a:fontRef idx="minor">
+            <a:schemeClr val="lt1"/>
+          </a:fontRef>
+        </p:style>
+        <p:txBody>
+          <a:bodyPr anchor="ctr"/>
+          <a:p>
+            <a:pPr algn="ctr">
+              <a:defRPr/>
+            </a:pPr>
+            <a:r>
+              <a:rPr lang="en-US" altLang="ko-KR" sz="1600"/>
+              <a:t>receive();</a:t>
+            </a:r>
+            <a:endParaRPr lang="en-US" altLang="ko-KR" sz="1600"/>
+          </a:p>
+        </p:txBody>
+      </p:sp>
+      <p:sp>
+        <p:nvSpPr>
+          <p:cNvPr id="29" name=""/>
+          <p:cNvSpPr/>
+          <p:nvPr/>
+        </p:nvSpPr>
+        <p:spPr>
+          <a:xfrm>
+            <a:off x="9125825" y="272967"/>
+            <a:ext cx="2067928" cy="520115"/>
+          </a:xfrm>
+          <a:prstGeom prst="roundRect">
+            <a:avLst>
+              <a:gd name="adj" fmla="val 16667"/>
+            </a:avLst>
+          </a:prstGeom>
+        </p:spPr>
+        <p:style>
+          <a:lnRef idx="1">
+            <a:schemeClr val="accent2"/>
+          </a:lnRef>
+          <a:fillRef idx="2">
+            <a:schemeClr val="accent2"/>
+          </a:fillRef>
+          <a:effectRef idx="1">
+            <a:schemeClr val="accent2"/>
+          </a:effectRef>
+          <a:fontRef idx="minor">
+            <a:schemeClr val="dk1"/>
+          </a:fontRef>
+        </p:style>
+        <p:txBody>
+          <a:bodyPr anchor="ctr"/>
+          <a:p>
+            <a:pPr algn="ctr">
+              <a:defRPr/>
+            </a:pPr>
+            <a:r>
+              <a:rPr lang="en-US" altLang="ko-KR" b="1"/>
+              <a:t>Observer Pattern</a:t>
+            </a:r>
+            <a:endParaRPr lang="en-US" altLang="ko-KR" b="1"/>
+          </a:p>
+        </p:txBody>
+      </p:sp>
+      <p:sp>
+        <p:nvSpPr>
+          <p:cNvPr id="34" name=""/>
+          <p:cNvSpPr/>
+          <p:nvPr/>
+        </p:nvSpPr>
+        <p:spPr>
+          <a:xfrm>
+            <a:off x="2934538" y="4888605"/>
+            <a:ext cx="1905000" cy="520115"/>
+          </a:xfrm>
+          <a:prstGeom prst="roundRect">
+            <a:avLst>
+              <a:gd name="adj" fmla="val 16667"/>
+            </a:avLst>
+          </a:prstGeom>
+          <a:solidFill>
+            <a:srgbClr val="6182d6">
+              <a:alpha val="100000"/>
+            </a:srgbClr>
+          </a:solidFill>
+          <a:ln w="19050" cap="flat" cmpd="sng" algn="ctr">
+            <a:solidFill>
+              <a:srgbClr val="2e3e67">
+                <a:alpha val="100000"/>
+              </a:srgbClr>
+            </a:solidFill>
+            <a:prstDash val="solid"/>
+          </a:ln>
+        </p:spPr>
+        <p:txBody>
+          <a:bodyPr anchor="ctr"/>
+          <a:p>
+            <a:pPr marL="0" indent="0" algn="ctr" defTabSz="914400" rtl="0" eaLnBrk="1" latinLnBrk="1" hangingPunct="1">
+              <a:lnSpc>
+                <a:spcPct val="100000"/>
+              </a:lnSpc>
+              <a:spcBef>
+                <a:spcPct val="0"/>
+              </a:spcBef>
+              <a:spcAft>
+                <a:spcPts val="0"/>
+              </a:spcAft>
+              <a:buNone/>
+              <a:defRPr/>
+            </a:pPr>
+            <a:r>
+              <a:rPr xmlns:mc="http://schemas.openxmlformats.org/markup-compatibility/2006" xmlns:hp="http://schemas.haansoft.com/office/presentation/8.0" kumimoji="0" lang="en-US" altLang="ko-KR" sz="1800" b="1" i="0" u="none" strike="noStrike" kern="1200" cap="none" spc="0" normalizeH="0" baseline="0" mc:Ignorable="hp" hp:hslEmbossed="0">
+                <a:solidFill>
+                  <a:srgbClr val="ffffff"/>
+                </a:solidFill>
+                <a:latin typeface="Calibri"/>
+                <a:ea typeface="맑은 고딕"/>
+                <a:cs typeface="Times New Roman"/>
+              </a:rPr>
+              <a:t>Client</a:t>
+            </a:r>
+            <a:endParaRPr xmlns:mc="http://schemas.openxmlformats.org/markup-compatibility/2006" xmlns:hp="http://schemas.haansoft.com/office/presentation/8.0" kumimoji="0" lang="en-US" altLang="ko-KR" sz="1800" b="1" i="0" u="none" strike="noStrike" kern="1200" cap="none" spc="0" normalizeH="0" baseline="0" mc:Ignorable="hp" hp:hslEmbossed="0">
+              <a:solidFill>
+                <a:srgbClr val="ffffff"/>
+              </a:solidFill>
+              <a:latin typeface="Calibri"/>
+              <a:ea typeface="맑은 고딕"/>
+              <a:cs typeface="Times New Roman"/>
+            </a:endParaRPr>
+          </a:p>
+        </p:txBody>
+      </p:sp>
+      <p:sp>
+        <p:nvSpPr>
+          <p:cNvPr id="35" name=""/>
+          <p:cNvSpPr/>
+          <p:nvPr/>
+        </p:nvSpPr>
+        <p:spPr>
+          <a:xfrm>
+            <a:off x="2934538" y="5408720"/>
+            <a:ext cx="1905000" cy="520115"/>
+          </a:xfrm>
+          <a:prstGeom prst="roundRect">
+            <a:avLst>
+              <a:gd name="adj" fmla="val 16667"/>
+            </a:avLst>
+          </a:prstGeom>
+          <a:solidFill>
+            <a:srgbClr val="6182d6">
+              <a:alpha val="100000"/>
+            </a:srgbClr>
+          </a:solidFill>
+          <a:ln w="19050" cap="flat" cmpd="sng" algn="ctr">
+            <a:solidFill>
+              <a:srgbClr val="2e3e67">
+                <a:alpha val="100000"/>
+              </a:srgbClr>
+            </a:solidFill>
+            <a:prstDash val="solid"/>
+          </a:ln>
+        </p:spPr>
+        <p:txBody>
+          <a:bodyPr anchor="ctr"/>
+          <a:p>
+            <a:pPr marL="0" indent="0" algn="ctr" defTabSz="914400" rtl="0" eaLnBrk="1" latinLnBrk="1" hangingPunct="1">
+              <a:lnSpc>
+                <a:spcPct val="100000"/>
+              </a:lnSpc>
+              <a:spcBef>
+                <a:spcPct val="0"/>
+              </a:spcBef>
+              <a:spcAft>
+                <a:spcPts val="0"/>
+              </a:spcAft>
+              <a:buNone/>
+              <a:defRPr/>
+            </a:pPr>
+            <a:r>
+              <a:rPr xmlns:mc="http://schemas.openxmlformats.org/markup-compatibility/2006" xmlns:hp="http://schemas.haansoft.com/office/presentation/8.0" kumimoji="0" lang="en-US" altLang="ko-KR" sz="1600" b="0" i="0" u="none" strike="noStrike" kern="1200" cap="none" spc="0" normalizeH="0" baseline="0" mc:Ignorable="hp" hp:hslEmbossed="0">
+                <a:solidFill>
+                  <a:srgbClr val="ffffff"/>
+                </a:solidFill>
+                <a:latin typeface="Calibri"/>
+                <a:ea typeface="맑은 고딕"/>
+                <a:cs typeface="Times New Roman"/>
+              </a:rPr>
+              <a:t>//</a:t>
+            </a:r>
+            <a:r>
+              <a:rPr xmlns:mc="http://schemas.openxmlformats.org/markup-compatibility/2006" xmlns:hp="http://schemas.haansoft.com/office/presentation/8.0" kumimoji="0" lang="ko-KR" altLang="en-US" sz="1600" b="0" i="0" u="none" strike="noStrike" kern="1200" cap="none" spc="0" normalizeH="0" baseline="0" mc:Ignorable="hp" hp:hslEmbossed="0">
+                <a:solidFill>
+                  <a:srgbClr val="ffffff"/>
+                </a:solidFill>
+                <a:latin typeface="Calibri"/>
+                <a:ea typeface="맑은 고딕"/>
+                <a:cs typeface="맑은 고딕"/>
+              </a:rPr>
+              <a:t> </a:t>
+            </a:r>
+            <a:r>
+              <a:rPr xmlns:mc="http://schemas.openxmlformats.org/markup-compatibility/2006" xmlns:hp="http://schemas.haansoft.com/office/presentation/8.0" kumimoji="0" lang="en-US" altLang="ko-KR" sz="1600" b="0" i="0" u="none" strike="noStrike" kern="1200" cap="none" spc="0" normalizeH="0" baseline="0" mc:Ignorable="hp" hp:hslEmbossed="0">
+                <a:solidFill>
+                  <a:srgbClr val="ffffff"/>
+                </a:solidFill>
+                <a:latin typeface="Calibri"/>
+                <a:ea typeface="맑은 고딕"/>
+                <a:cs typeface="Times New Roman"/>
+              </a:rPr>
+              <a:t>External Class</a:t>
+            </a:r>
+            <a:endParaRPr xmlns:mc="http://schemas.openxmlformats.org/markup-compatibility/2006" xmlns:hp="http://schemas.haansoft.com/office/presentation/8.0" kumimoji="0" lang="en-US" altLang="ko-KR" sz="1600" b="0" i="0" u="none" strike="noStrike" kern="1200" cap="none" spc="0" normalizeH="0" baseline="0" mc:Ignorable="hp" hp:hslEmbossed="0">
+              <a:solidFill>
+                <a:srgbClr val="ffffff"/>
+              </a:solidFill>
+              <a:latin typeface="Calibri"/>
+              <a:ea typeface="맑은 고딕"/>
+              <a:cs typeface="Times New Roman"/>
+            </a:endParaRPr>
+          </a:p>
+        </p:txBody>
+      </p:sp>
+      <p:cxnSp>
+        <p:nvCxnSpPr>
+          <p:cNvPr id="36" name=""/>
+          <p:cNvCxnSpPr>
+            <a:stCxn id="34" idx="0"/>
+          </p:cNvCxnSpPr>
+          <p:nvPr/>
+        </p:nvCxnSpPr>
+        <p:spPr>
+          <a:xfrm rot="16200000" flipV="1">
+            <a:off x="3210080" y="4211648"/>
+            <a:ext cx="764907" cy="589008"/>
+          </a:xfrm>
+          <a:prstGeom prst="straightConnector1">
+            <a:avLst/>
+          </a:prstGeom>
+          <a:ln w="38100">
+            <a:solidFill>
+              <a:schemeClr val="accent6"/>
+            </a:solidFill>
+            <a:tailEnd type="arrow"/>
+          </a:ln>
+        </p:spPr>
+        <p:style>
+          <a:lnRef idx="1">
+            <a:schemeClr val="accent1"/>
+          </a:lnRef>
+          <a:fillRef idx="0">
+            <a:schemeClr val="accent1"/>
+          </a:fillRef>
+          <a:effectRef idx="0">
+            <a:schemeClr val="accent1"/>
+          </a:effectRef>
+          <a:fontRef idx="minor">
+            <a:schemeClr val="tx1"/>
+          </a:fontRef>
+        </p:style>
+      </p:cxnSp>
+      <p:sp>
+        <p:nvSpPr>
+          <p:cNvPr id="37" name=""/>
+          <p:cNvSpPr txBox="1"/>
+          <p:nvPr/>
+        </p:nvSpPr>
+        <p:spPr>
+          <a:xfrm>
+            <a:off x="5054553" y="5148662"/>
+            <a:ext cx="3440357" cy="574834"/>
+          </a:xfrm>
+          <a:prstGeom prst="rect">
+            <a:avLst/>
+          </a:prstGeom>
+        </p:spPr>
+        <p:txBody>
+          <a:bodyPr wrap="square">
+            <a:spAutoFit/>
+          </a:bodyPr>
+          <a:p>
+            <a:pPr marL="0" indent="0" algn="l" defTabSz="914400" rtl="0" eaLnBrk="1" latinLnBrk="1" hangingPunct="1">
+              <a:lnSpc>
+                <a:spcPct val="100000"/>
+              </a:lnSpc>
+              <a:spcBef>
+                <a:spcPct val="0"/>
+              </a:spcBef>
+              <a:spcAft>
+                <a:spcPts val="0"/>
+              </a:spcAft>
+              <a:buNone/>
+              <a:defRPr/>
+            </a:pPr>
+            <a:r>
+              <a:rPr xmlns:mc="http://schemas.openxmlformats.org/markup-compatibility/2006" xmlns:hp="http://schemas.haansoft.com/office/presentation/8.0" kumimoji="0" lang="en-US" altLang="ko-KR" sz="1600" b="0" i="0" u="none" strike="noStrike" kern="1200" cap="none" spc="0" normalizeH="0" baseline="0" mc:Ignorable="hp" hp:hslEmbossed="0">
+                <a:solidFill>
+                  <a:srgbClr val="000000"/>
+                </a:solidFill>
+                <a:latin typeface="Calibri"/>
+                <a:ea typeface="맑은 고딕"/>
+                <a:cs typeface="Times New Roman"/>
+              </a:rPr>
+              <a:t>Client</a:t>
+            </a:r>
+            <a:r>
+              <a:rPr xmlns:mc="http://schemas.openxmlformats.org/markup-compatibility/2006" xmlns:hp="http://schemas.haansoft.com/office/presentation/8.0" kumimoji="0" lang="ko-KR" altLang="en-US" sz="1600" b="0" i="0" u="none" strike="noStrike" kern="1200" cap="none" spc="0" normalizeH="0" baseline="0" mc:Ignorable="hp" hp:hslEmbossed="0">
+                <a:solidFill>
+                  <a:srgbClr val="000000"/>
+                </a:solidFill>
+                <a:latin typeface="Calibri"/>
+                <a:ea typeface="맑은 고딕"/>
+                <a:cs typeface="맑은 고딕"/>
+              </a:rPr>
+              <a:t>에 구체화된 </a:t>
+            </a:r>
+            <a:r>
+              <a:rPr xmlns:mc="http://schemas.openxmlformats.org/markup-compatibility/2006" xmlns:hp="http://schemas.haansoft.com/office/presentation/8.0" kumimoji="0" lang="en-US" altLang="ko-KR" sz="1600" b="0" i="0" u="none" strike="noStrike" kern="1200" cap="none" spc="0" normalizeH="0" baseline="0" mc:Ignorable="hp" hp:hslEmbossed="0">
+                <a:solidFill>
+                  <a:srgbClr val="000000"/>
+                </a:solidFill>
+                <a:latin typeface="Calibri"/>
+                <a:ea typeface="맑은 고딕"/>
+                <a:cs typeface="맑은 고딕"/>
+              </a:rPr>
+              <a:t>Class</a:t>
+            </a:r>
+            <a:r>
+              <a:rPr xmlns:mc="http://schemas.openxmlformats.org/markup-compatibility/2006" xmlns:hp="http://schemas.haansoft.com/office/presentation/8.0" kumimoji="0" lang="ko-KR" altLang="en-US" sz="1600" b="0" i="0" u="none" strike="noStrike" kern="1200" cap="none" spc="0" normalizeH="0" baseline="0" mc:Ignorable="hp" hp:hslEmbossed="0">
+                <a:solidFill>
+                  <a:srgbClr val="000000"/>
+                </a:solidFill>
+                <a:latin typeface="Calibri"/>
+                <a:ea typeface="맑은 고딕"/>
+                <a:cs typeface="맑은 고딕"/>
+              </a:rPr>
+              <a:t>를 지닌다</a:t>
+            </a:r>
+            <a:r>
+              <a:rPr xmlns:mc="http://schemas.openxmlformats.org/markup-compatibility/2006" xmlns:hp="http://schemas.haansoft.com/office/presentation/8.0" kumimoji="0" lang="en-US" altLang="ko-KR" sz="1600" b="0" i="0" u="none" strike="noStrike" kern="1200" cap="none" spc="0" normalizeH="0" baseline="0" mc:Ignorable="hp" hp:hslEmbossed="0">
+                <a:solidFill>
+                  <a:srgbClr val="000000"/>
+                </a:solidFill>
+                <a:latin typeface="Calibri"/>
+                <a:ea typeface="맑은 고딕"/>
+                <a:cs typeface="맑은 고딕"/>
+              </a:rPr>
+              <a:t>.</a:t>
+            </a:r>
+            <a:endParaRPr xmlns:mc="http://schemas.openxmlformats.org/markup-compatibility/2006" xmlns:hp="http://schemas.haansoft.com/office/presentation/8.0" kumimoji="0" lang="en-US" altLang="ko-KR" sz="1600" b="0" i="0" u="none" strike="noStrike" kern="1200" cap="none" spc="0" normalizeH="0" baseline="0" mc:Ignorable="hp" hp:hslEmbossed="0">
+              <a:solidFill>
+                <a:srgbClr val="000000"/>
+              </a:solidFill>
+              <a:latin typeface="Calibri"/>
+              <a:ea typeface="맑은 고딕"/>
+              <a:cs typeface="맑은 고딕"/>
+            </a:endParaRPr>
+          </a:p>
+          <a:p>
+            <a:pPr marL="0" indent="0" algn="l" defTabSz="914400" rtl="0" eaLnBrk="1" latinLnBrk="1" hangingPunct="1">
+              <a:lnSpc>
+                <a:spcPct val="100000"/>
+              </a:lnSpc>
+              <a:spcBef>
+                <a:spcPct val="0"/>
+              </a:spcBef>
+              <a:spcAft>
+                <a:spcPts val="0"/>
+              </a:spcAft>
+              <a:buNone/>
+              <a:defRPr/>
+            </a:pPr>
+            <a:r>
+              <a:rPr xmlns:mc="http://schemas.openxmlformats.org/markup-compatibility/2006" xmlns:hp="http://schemas.haansoft.com/office/presentation/8.0" kumimoji="0" lang="en-US" altLang="ko-KR" sz="1600" b="0" i="0" u="none" strike="noStrike" kern="1200" cap="none" spc="0" normalizeH="0" baseline="0" mc:Ignorable="hp" hp:hslEmbossed="0">
+                <a:solidFill>
+                  <a:srgbClr val="000000"/>
+                </a:solidFill>
+                <a:latin typeface="Calibri"/>
+                <a:ea typeface="맑은 고딕"/>
+                <a:cs typeface="맑은 고딕"/>
+              </a:rPr>
+              <a:t>attach(), detach(), notify() </a:t>
+            </a:r>
+            <a:r>
+              <a:rPr xmlns:mc="http://schemas.openxmlformats.org/markup-compatibility/2006" xmlns:hp="http://schemas.haansoft.com/office/presentation/8.0" kumimoji="0" lang="ko-KR" altLang="en-US" sz="1600" b="0" i="0" u="none" strike="noStrike" kern="1200" cap="none" spc="0" normalizeH="0" baseline="0" mc:Ignorable="hp" hp:hslEmbossed="0">
+                <a:solidFill>
+                  <a:srgbClr val="000000"/>
+                </a:solidFill>
+                <a:latin typeface="Calibri"/>
+                <a:ea typeface="맑은 고딕"/>
+                <a:cs typeface="맑은 고딕"/>
+              </a:rPr>
+              <a:t>이용</a:t>
+            </a:r>
+            <a:endParaRPr xmlns:mc="http://schemas.openxmlformats.org/markup-compatibility/2006" xmlns:hp="http://schemas.haansoft.com/office/presentation/8.0" kumimoji="0" lang="ko-KR" altLang="en-US" sz="1600" b="0" i="0" u="none" strike="noStrike" kern="1200" cap="none" spc="0" normalizeH="0" baseline="0" mc:Ignorable="hp" hp:hslEmbossed="0">
+              <a:solidFill>
+                <a:srgbClr val="000000"/>
+              </a:solidFill>
+              <a:latin typeface="Calibri"/>
+              <a:ea typeface="맑은 고딕"/>
+              <a:cs typeface="맑은 고딕"/>
+            </a:endParaRPr>
+          </a:p>
+        </p:txBody>
+      </p:sp>
+      <p:cxnSp>
+        <p:nvCxnSpPr>
+          <p:cNvPr id="38" name=""/>
+          <p:cNvCxnSpPr/>
+          <p:nvPr/>
+        </p:nvCxnSpPr>
+        <p:spPr>
+          <a:xfrm rot="5400000" flipH="1" flipV="1">
+            <a:off x="3871713" y="3770342"/>
+            <a:ext cx="1284020" cy="952504"/>
+          </a:xfrm>
+          <a:prstGeom prst="straightConnector1">
+            <a:avLst/>
+          </a:prstGeom>
+          <a:ln w="38100">
+            <a:solidFill>
+              <a:schemeClr val="accent6"/>
+            </a:solidFill>
+            <a:tailEnd type="arrow"/>
+          </a:ln>
+        </p:spPr>
+        <p:style>
+          <a:lnRef idx="1">
+            <a:schemeClr val="accent1"/>
+          </a:lnRef>
+          <a:fillRef idx="0">
+            <a:schemeClr val="accent1"/>
+          </a:fillRef>
+          <a:effectRef idx="0">
+            <a:schemeClr val="accent1"/>
+          </a:effectRef>
+          <a:fontRef idx="minor">
+            <a:schemeClr val="tx1"/>
+          </a:fontRef>
+        </p:style>
+      </p:cxnSp>
+      <p:cxnSp>
+        <p:nvCxnSpPr>
+          <p:cNvPr id="39" name=""/>
+          <p:cNvCxnSpPr/>
+          <p:nvPr/>
+        </p:nvCxnSpPr>
+        <p:spPr>
+          <a:xfrm flipV="1">
+            <a:off x="4532521" y="3604587"/>
+            <a:ext cx="2613111" cy="1284018"/>
+          </a:xfrm>
+          <a:prstGeom prst="straightConnector1">
+            <a:avLst/>
+          </a:prstGeom>
+          <a:ln w="38100">
+            <a:solidFill>
+              <a:schemeClr val="accent6"/>
+            </a:solidFill>
+            <a:tailEnd type="arrow"/>
+          </a:ln>
+        </p:spPr>
+        <p:style>
+          <a:lnRef idx="1">
+            <a:schemeClr val="accent1"/>
+          </a:lnRef>
+          <a:fillRef idx="0">
+            <a:schemeClr val="accent1"/>
+          </a:fillRef>
+          <a:effectRef idx="0">
+            <a:schemeClr val="accent1"/>
+          </a:effectRef>
+          <a:fontRef idx="minor">
+            <a:schemeClr val="tx1"/>
+          </a:fontRef>
+        </p:style>
+      </p:cxnSp>
+      <p:cxnSp>
+        <p:nvCxnSpPr>
+          <p:cNvPr id="40" name=""/>
+          <p:cNvCxnSpPr>
+            <a:stCxn id="34" idx="3"/>
+          </p:cNvCxnSpPr>
+          <p:nvPr/>
+        </p:nvCxnSpPr>
+        <p:spPr>
+          <a:xfrm flipV="1">
+            <a:off x="4839538" y="3604587"/>
+            <a:ext cx="4511882" cy="1544075"/>
+          </a:xfrm>
+          <a:prstGeom prst="straightConnector1">
+            <a:avLst/>
+          </a:prstGeom>
+          <a:ln w="38100">
+            <a:solidFill>
+              <a:schemeClr val="accent6"/>
+            </a:solidFill>
+            <a:tailEnd type="arrow"/>
+          </a:ln>
+        </p:spPr>
+        <p:style>
+          <a:lnRef idx="1">
+            <a:schemeClr val="accent1"/>
+          </a:lnRef>
+          <a:fillRef idx="0">
+            <a:schemeClr val="accent1"/>
+          </a:fillRef>
+          <a:effectRef idx="0">
+            <a:schemeClr val="accent1"/>
+          </a:effectRef>
+          <a:fontRef idx="minor">
+            <a:schemeClr val="tx1"/>
+          </a:fontRef>
+        </p:style>
+      </p:cxnSp>
+    </p:spTree>
+  </p:cSld>
+  <p:clrMapOvr>
+    <a:masterClrMapping/>
+  </p:clrMapOvr>
+  <mc:AlternateContent xmlns:mc="http://schemas.openxmlformats.org/markup-compatibility/2006">
+    <mc:Choice xmlns:p14="http://schemas.microsoft.com/office/powerpoint/2010/main" Requires="p14">
+      <p:transition xmlns:mc="http://schemas.openxmlformats.org/markup-compatibility/2006" xmlns:p14="http://schemas.microsoft.com/office/powerpoint/2010/main" mc:Ignorable="p14" p14:dur="500"/>
+    </mc:Choice>
+    <mc:Fallback>
+      <p:transition/>
+    </mc:Fallback>
+  </mc:AlternateContent>
+</p:sld>
+</file>
+
 <file path=ppt/theme/theme1.xml><?xml version="1.0" encoding="utf-8"?>
 <a:theme xmlns:r="http://schemas.openxmlformats.org/officeDocument/2006/relationships" xmlns:c="http://schemas.openxmlformats.org/drawingml/2006/chart" xmlns:dgm="http://schemas.openxmlformats.org/drawingml/2006/diagram" xmlns:dsp="http://schemas.microsoft.com/office/drawing/2008/diagram" xmlns:a="http://schemas.openxmlformats.org/drawingml/2006/main" xmlns:pic="http://schemas.openxmlformats.org/drawingml/2006/picture" xmlns:wp="http://schemas.openxmlformats.org/drawingml/2006/wordprocessingDrawing" xmlns:xdr="http://schemas.openxmlformats.org/drawingml/2006/spreadsheetDrawing" xmlns:lc="http://schemas.openxmlformats.org/drawingml/2006/lockedCanvas" xmlns:p="http://schemas.openxmlformats.org/presentationml/2006/main" name="한컴오피스">
   <a:themeElements>

</xml_diff>

<commit_message>
add posts "Strategy Pattern"
</commit_message>
<xml_diff>
--- a/etc/images.pptx
+++ b/etc/images.pptx
@@ -2,11 +2,15 @@
 <file path=ppt/presentation.xml><?xml version="1.0" encoding="utf-8"?>
 <p:presentation xmlns:r="http://schemas.openxmlformats.org/officeDocument/2006/relationships" xmlns:c="http://schemas.openxmlformats.org/drawingml/2006/chart" xmlns:a="http://schemas.openxmlformats.org/drawingml/2006/main" xmlns:dgm="http://schemas.openxmlformats.org/drawingml/2006/diagram" xmlns:dsp="http://schemas.microsoft.com/office/drawing/2008/diagram" xmlns:p="http://schemas.openxmlformats.org/presentationml/2006/main">
   <p:sldMasterIdLst>
-    <p:sldMasterId id="2147483731" r:id="rId1"/>
+    <p:sldMasterId id="2147483722" r:id="rId1"/>
   </p:sldMasterIdLst>
+  <p:notesMasterIdLst>
+    <p:notesMasterId r:id="rId2"/>
+  </p:notesMasterIdLst>
   <p:sldIdLst>
-    <p:sldId id="256" r:id="rId2"/>
-    <p:sldId id="257" r:id="rId3"/>
+    <p:sldId id="256" r:id="rId3"/>
+    <p:sldId id="257" r:id="rId4"/>
+    <p:sldId id="258" r:id="rId5"/>
   </p:sldIdLst>
   <p:sldSz cx="12192000" cy="6858000"/>
   <p:notesSz cx="6858000" cy="9144000"/>
@@ -106,6 +110,499 @@
     </a:lvl9pPr>
   </p:defaultTextStyle>
 </p:presentation>
+</file>
+
+<file path=ppt/notesMasters/notesMaster1.xml><?xml version="1.0" encoding="utf-8"?>
+<p:notesMaster xmlns:r="http://schemas.openxmlformats.org/officeDocument/2006/relationships" xmlns:c="http://schemas.openxmlformats.org/drawingml/2006/chart" xmlns:a="http://schemas.openxmlformats.org/drawingml/2006/main" xmlns:dgm="http://schemas.openxmlformats.org/drawingml/2006/diagram" xmlns:dsp="http://schemas.microsoft.com/office/drawing/2008/diagram" xmlns:p="http://schemas.openxmlformats.org/presentationml/2006/main">
+  <p:cSld>
+    <p:bg>
+      <p:bgRef idx="1001">
+        <a:schemeClr val="bg1"/>
+      </p:bgRef>
+    </p:bg>
+    <p:spTree>
+      <p:nvGrpSpPr>
+        <p:cNvPr id="1" name=""/>
+        <p:cNvGrpSpPr/>
+        <p:nvPr/>
+      </p:nvGrpSpPr>
+      <p:grpSpPr>
+        <a:xfrm>
+          <a:off x="0" y="0"/>
+          <a:ext cx="0" cy="0"/>
+          <a:chOff x="0" y="0"/>
+          <a:chExt cx="0" cy="0"/>
+        </a:xfrm>
+      </p:grpSpPr>
+      <p:sp>
+        <p:nvSpPr>
+          <p:cNvPr id="2" name="머리글 개체 틀 1"/>
+          <p:cNvSpPr>
+            <a:spLocks noGrp="1"/>
+          </p:cNvSpPr>
+          <p:nvPr>
+            <p:ph type="hdr" sz="quarter" idx="0"/>
+          </p:nvPr>
+        </p:nvSpPr>
+        <p:spPr>
+          <a:xfrm>
+            <a:off x="0" y="0"/>
+            <a:ext cx="2971800" cy="457200"/>
+          </a:xfrm>
+          <a:prstGeom prst="rect">
+            <a:avLst/>
+          </a:prstGeom>
+        </p:spPr>
+        <p:txBody>
+          <a:bodyPr vert="horz" lIns="91440" tIns="45720" rIns="91440" bIns="45720"/>
+          <a:lstStyle>
+            <a:lvl1pPr algn="l">
+              <a:defRPr sz="1200"/>
+            </a:lvl1pPr>
+          </a:lstStyle>
+          <a:p>
+            <a:pPr lvl="0">
+              <a:defRPr/>
+            </a:pPr>
+            <a:r>
+              <a:rPr lang="ko-KR" altLang="en-US"/>
+              <a:t/>
+            </a:r>
+            <a:endParaRPr lang="ko-KR" altLang="en-US"/>
+          </a:p>
+        </p:txBody>
+      </p:sp>
+      <p:sp>
+        <p:nvSpPr>
+          <p:cNvPr id="3" name="날짜 개체 틀 2"/>
+          <p:cNvSpPr>
+            <a:spLocks noGrp="1"/>
+          </p:cNvSpPr>
+          <p:nvPr>
+            <p:ph type="dt" idx="1"/>
+          </p:nvPr>
+        </p:nvSpPr>
+        <p:spPr>
+          <a:xfrm>
+            <a:off x="3884613" y="0"/>
+            <a:ext cx="2971800" cy="457200"/>
+          </a:xfrm>
+          <a:prstGeom prst="rect">
+            <a:avLst/>
+          </a:prstGeom>
+        </p:spPr>
+        <p:txBody>
+          <a:bodyPr vert="horz" lIns="91440" tIns="45720" rIns="91440" bIns="45720"/>
+          <a:lstStyle>
+            <a:lvl1pPr algn="r">
+              <a:defRPr sz="1200"/>
+            </a:lvl1pPr>
+          </a:lstStyle>
+          <a:p>
+            <a:pPr lvl="0">
+              <a:defRPr/>
+            </a:pPr>
+            <a:fld id="{E2B2BC9D-A816-4D0A-858B-1D023B3A8ACA}" type="datetime1">
+              <a:rPr lang="ko-KR" altLang="en-US"/>
+              <a:pPr lvl="0">
+                <a:defRPr/>
+              </a:pPr>
+              <a:t>2019-07-29</a:t>
+            </a:fld>
+            <a:endParaRPr lang="ko-KR" altLang="en-US"/>
+          </a:p>
+        </p:txBody>
+      </p:sp>
+      <p:sp>
+        <p:nvSpPr>
+          <p:cNvPr id="4" name="슬라이드 이미지 개체 틀 3"/>
+          <p:cNvSpPr>
+            <a:spLocks noGrp="1" noRot="1" noChangeAspect="1" noTextEdit="1"/>
+          </p:cNvSpPr>
+          <p:nvPr>
+            <p:ph type="sldImg" idx="2"/>
+          </p:nvPr>
+        </p:nvSpPr>
+        <p:spPr>
+          <a:xfrm>
+            <a:off x="381000" y="685800"/>
+            <a:ext cx="6096000" cy="3429000"/>
+          </a:xfrm>
+          <a:prstGeom prst="rect">
+            <a:avLst/>
+          </a:prstGeom>
+          <a:noFill/>
+          <a:ln w="12700">
+            <a:solidFill>
+              <a:prstClr val="black"/>
+            </a:solidFill>
+          </a:ln>
+        </p:spPr>
+        <p:txBody>
+          <a:bodyPr vert="horz" lIns="91440" tIns="45720" rIns="91440" bIns="45720" anchor="ctr"/>
+          <a:lstStyle/>
+          <a:p>
+            <a:pPr lvl="0">
+              <a:defRPr/>
+            </a:pPr>
+            <a:endParaRPr lang="ko-KR" altLang="en-US"/>
+          </a:p>
+        </p:txBody>
+      </p:sp>
+      <p:sp>
+        <p:nvSpPr>
+          <p:cNvPr id="5" name="슬라이드 노트 개체 틀 4"/>
+          <p:cNvSpPr>
+            <a:spLocks noGrp="1"/>
+          </p:cNvSpPr>
+          <p:nvPr>
+            <p:ph type="body" sz="quarter" idx="3"/>
+          </p:nvPr>
+        </p:nvSpPr>
+        <p:spPr>
+          <a:xfrm>
+            <a:off x="685800" y="4343400"/>
+            <a:ext cx="5486400" cy="4114800"/>
+          </a:xfrm>
+          <a:prstGeom prst="rect">
+            <a:avLst/>
+          </a:prstGeom>
+        </p:spPr>
+        <p:txBody>
+          <a:bodyPr vert="horz" lIns="91440" tIns="45720" rIns="91440" bIns="45720">
+            <a:noAutofit/>
+          </a:bodyPr>
+          <a:lstStyle/>
+          <a:p>
+            <a:pPr lvl="0">
+              <a:defRPr/>
+            </a:pPr>
+            <a:r>
+              <a:rPr lang="ko-KR" altLang="en-US"/>
+              <a:t>마스터 텍스트 스타일을 편집합니다</a:t>
+            </a:r>
+            <a:endParaRPr lang="ko-KR" altLang="en-US"/>
+          </a:p>
+          <a:p>
+            <a:pPr lvl="1">
+              <a:defRPr/>
+            </a:pPr>
+            <a:r>
+              <a:rPr lang="ko-KR" altLang="en-US"/>
+              <a:t>둘째 수준</a:t>
+            </a:r>
+            <a:endParaRPr lang="ko-KR" altLang="en-US"/>
+          </a:p>
+          <a:p>
+            <a:pPr lvl="2">
+              <a:defRPr/>
+            </a:pPr>
+            <a:r>
+              <a:rPr lang="ko-KR" altLang="en-US"/>
+              <a:t>셋째 수준</a:t>
+            </a:r>
+            <a:endParaRPr lang="ko-KR" altLang="en-US"/>
+          </a:p>
+          <a:p>
+            <a:pPr lvl="3">
+              <a:defRPr/>
+            </a:pPr>
+            <a:r>
+              <a:rPr lang="ko-KR" altLang="en-US"/>
+              <a:t>넷째 수준</a:t>
+            </a:r>
+            <a:endParaRPr lang="ko-KR" altLang="en-US"/>
+          </a:p>
+          <a:p>
+            <a:pPr lvl="4">
+              <a:defRPr/>
+            </a:pPr>
+            <a:r>
+              <a:rPr lang="ko-KR" altLang="en-US"/>
+              <a:t>다섯째 수준</a:t>
+            </a:r>
+            <a:endParaRPr lang="ko-KR" altLang="en-US"/>
+          </a:p>
+        </p:txBody>
+      </p:sp>
+      <p:sp>
+        <p:nvSpPr>
+          <p:cNvPr id="6" name="바닥글 개체 틀 5"/>
+          <p:cNvSpPr>
+            <a:spLocks noGrp="1"/>
+          </p:cNvSpPr>
+          <p:nvPr>
+            <p:ph type="ftr" sz="quarter" idx="4"/>
+          </p:nvPr>
+        </p:nvSpPr>
+        <p:spPr>
+          <a:xfrm>
+            <a:off x="0" y="8685213"/>
+            <a:ext cx="2971800" cy="457200"/>
+          </a:xfrm>
+          <a:prstGeom prst="rect">
+            <a:avLst/>
+          </a:prstGeom>
+        </p:spPr>
+        <p:txBody>
+          <a:bodyPr vert="horz" lIns="91440" tIns="45720" rIns="91440" bIns="45720" anchor="b"/>
+          <a:lstStyle>
+            <a:lvl1pPr algn="l">
+              <a:defRPr sz="1200"/>
+            </a:lvl1pPr>
+          </a:lstStyle>
+          <a:p>
+            <a:pPr lvl="0">
+              <a:defRPr/>
+            </a:pPr>
+            <a:r>
+              <a:rPr lang="ko-KR" altLang="en-US"/>
+              <a:t/>
+            </a:r>
+            <a:endParaRPr lang="ko-KR" altLang="en-US"/>
+          </a:p>
+        </p:txBody>
+      </p:sp>
+      <p:sp>
+        <p:nvSpPr>
+          <p:cNvPr id="7" name="슬라이드 번호 개체 틀 6"/>
+          <p:cNvSpPr>
+            <a:spLocks noGrp="1"/>
+          </p:cNvSpPr>
+          <p:nvPr>
+            <p:ph type="sldNum" sz="quarter" idx="5"/>
+          </p:nvPr>
+        </p:nvSpPr>
+        <p:spPr>
+          <a:xfrm>
+            <a:off x="3884613" y="8685213"/>
+            <a:ext cx="2971800" cy="457200"/>
+          </a:xfrm>
+          <a:prstGeom prst="rect">
+            <a:avLst/>
+          </a:prstGeom>
+        </p:spPr>
+        <p:txBody>
+          <a:bodyPr vert="horz" lIns="91440" tIns="45720" rIns="91440" bIns="45720" anchor="b"/>
+          <a:lstStyle>
+            <a:lvl1pPr algn="r">
+              <a:defRPr sz="1200"/>
+            </a:lvl1pPr>
+          </a:lstStyle>
+          <a:p>
+            <a:pPr lvl="0">
+              <a:defRPr/>
+            </a:pPr>
+            <a:fld id="{09F4262C-968C-4EE9-8164-CE16364706B3}" type="slidenum">
+              <a:rPr lang="ko-KR" altLang="en-US"/>
+              <a:pPr lvl="0">
+                <a:defRPr/>
+              </a:pPr>
+              <a:t>‹#›</a:t>
+            </a:fld>
+            <a:endParaRPr lang="ko-KR" altLang="en-US"/>
+          </a:p>
+        </p:txBody>
+      </p:sp>
+    </p:spTree>
+  </p:cSld>
+  <p:clrMap bg1="lt1" tx1="dk1" bg2="lt2" tx2="dk2" accent1="accent1" accent2="accent2" accent3="accent3" accent4="accent4" accent5="accent5" accent6="accent6" hlink="hlink" folHlink="folHlink"/>
+  <p:hf hdr="0" ftr="0" dt="0"/>
+  <p:notesStyle>
+    <a:lvl1pPr marL="0" algn="l" defTabSz="914400" rtl="0" eaLnBrk="1" latinLnBrk="1" hangingPunct="1">
+      <a:defRPr sz="1200" kern="1200">
+        <a:solidFill>
+          <a:schemeClr val="tx1"/>
+        </a:solidFill>
+        <a:latin typeface="+mj-lt"/>
+        <a:ea typeface="+mj-ea"/>
+        <a:cs typeface="+mj-cs"/>
+      </a:defRPr>
+    </a:lvl1pPr>
+    <a:lvl2pPr marL="457200" algn="l" defTabSz="914400" rtl="0" eaLnBrk="1" latinLnBrk="1" hangingPunct="1">
+      <a:defRPr sz="1200" kern="1200">
+        <a:solidFill>
+          <a:schemeClr val="tx1"/>
+        </a:solidFill>
+        <a:latin typeface="+mj-lt"/>
+        <a:ea typeface="+mj-ea"/>
+        <a:cs typeface="+mj-cs"/>
+      </a:defRPr>
+    </a:lvl2pPr>
+    <a:lvl3pPr marL="914400" algn="l" defTabSz="914400" rtl="0" eaLnBrk="1" latinLnBrk="1" hangingPunct="1">
+      <a:defRPr sz="1200" kern="1200">
+        <a:solidFill>
+          <a:schemeClr val="tx1"/>
+        </a:solidFill>
+        <a:latin typeface="+mj-lt"/>
+        <a:ea typeface="+mj-ea"/>
+        <a:cs typeface="+mj-cs"/>
+      </a:defRPr>
+    </a:lvl3pPr>
+    <a:lvl4pPr marL="1371600" algn="l" defTabSz="914400" rtl="0" eaLnBrk="1" latinLnBrk="1" hangingPunct="1">
+      <a:defRPr sz="1200" kern="1200">
+        <a:solidFill>
+          <a:schemeClr val="tx1"/>
+        </a:solidFill>
+        <a:latin typeface="+mj-lt"/>
+        <a:ea typeface="+mj-ea"/>
+        <a:cs typeface="+mj-cs"/>
+      </a:defRPr>
+    </a:lvl4pPr>
+    <a:lvl5pPr marL="1828800" algn="l" defTabSz="914400" rtl="0" eaLnBrk="1" latinLnBrk="1" hangingPunct="1">
+      <a:defRPr sz="1200" kern="1200">
+        <a:solidFill>
+          <a:schemeClr val="tx1"/>
+        </a:solidFill>
+        <a:latin typeface="+mj-lt"/>
+        <a:ea typeface="+mj-ea"/>
+        <a:cs typeface="+mj-cs"/>
+      </a:defRPr>
+    </a:lvl5pPr>
+    <a:lvl6pPr marL="2286000" algn="l" defTabSz="914400" rtl="0" eaLnBrk="1" latinLnBrk="1" hangingPunct="1">
+      <a:defRPr sz="1200" kern="1200">
+        <a:solidFill>
+          <a:schemeClr val="tx1"/>
+        </a:solidFill>
+        <a:latin typeface="+mj-lt"/>
+        <a:ea typeface="+mj-ea"/>
+        <a:cs typeface="+mj-cs"/>
+      </a:defRPr>
+    </a:lvl6pPr>
+    <a:lvl7pPr marL="2743200" algn="l" defTabSz="914400" rtl="0" eaLnBrk="1" latinLnBrk="1" hangingPunct="1">
+      <a:defRPr sz="1200" kern="1200">
+        <a:solidFill>
+          <a:schemeClr val="tx1"/>
+        </a:solidFill>
+        <a:latin typeface="+mj-lt"/>
+        <a:ea typeface="+mj-ea"/>
+        <a:cs typeface="+mj-cs"/>
+      </a:defRPr>
+    </a:lvl7pPr>
+    <a:lvl8pPr marL="3200400" algn="l" defTabSz="914400" rtl="0" eaLnBrk="1" latinLnBrk="1" hangingPunct="1">
+      <a:defRPr sz="1200" kern="1200">
+        <a:solidFill>
+          <a:schemeClr val="tx1"/>
+        </a:solidFill>
+        <a:latin typeface="+mj-lt"/>
+        <a:ea typeface="+mj-ea"/>
+        <a:cs typeface="+mj-cs"/>
+      </a:defRPr>
+    </a:lvl8pPr>
+    <a:lvl9pPr marL="3657600" algn="l" defTabSz="914400" rtl="0" eaLnBrk="1" latinLnBrk="1" hangingPunct="1">
+      <a:defRPr sz="1200" kern="1200">
+        <a:solidFill>
+          <a:schemeClr val="tx1"/>
+        </a:solidFill>
+        <a:latin typeface="+mj-lt"/>
+        <a:ea typeface="+mj-ea"/>
+        <a:cs typeface="+mj-cs"/>
+      </a:defRPr>
+    </a:lvl9pPr>
+  </p:notesStyle>
+</p:notesMaster>
+</file>
+
+<file path=ppt/notesSlides/notesSlide1.xml><?xml version="1.0" encoding="utf-8"?>
+<p:notes xmlns:r="http://schemas.openxmlformats.org/officeDocument/2006/relationships" xmlns:c="http://schemas.openxmlformats.org/drawingml/2006/chart" xmlns:a="http://schemas.openxmlformats.org/drawingml/2006/main" xmlns:dgm="http://schemas.openxmlformats.org/drawingml/2006/diagram" xmlns:dsp="http://schemas.microsoft.com/office/drawing/2008/diagram" xmlns:p="http://schemas.openxmlformats.org/presentationml/2006/main">
+  <p:cSld>
+    <p:spTree>
+      <p:nvGrpSpPr>
+        <p:cNvPr id="1" name=""/>
+        <p:cNvGrpSpPr/>
+        <p:nvPr/>
+      </p:nvGrpSpPr>
+      <p:grpSpPr>
+        <a:xfrm>
+          <a:off x="0" y="0"/>
+          <a:ext cx="0" cy="0"/>
+          <a:chOff x="0" y="0"/>
+          <a:chExt cx="0" cy="0"/>
+        </a:xfrm>
+      </p:grpSpPr>
+      <p:sp>
+        <p:nvSpPr>
+          <p:cNvPr id="2" name="슬라이드 이미지 개체 틀 3"/>
+          <p:cNvSpPr>
+            <a:spLocks noGrp="1" noRot="1" noChangeAspect="1" noTextEdit="1"/>
+          </p:cNvSpPr>
+          <p:nvPr>
+            <p:ph type="sldImg" idx="2"/>
+          </p:nvPr>
+        </p:nvSpPr>
+        <p:spPr/>
+        <p:txBody>
+          <a:bodyPr/>
+          <a:lstStyle/>
+          <a:p>
+            <a:pPr>
+              <a:defRPr/>
+            </a:pPr>
+            <a:endParaRPr lang="en-US" altLang="ko-KR"/>
+          </a:p>
+        </p:txBody>
+      </p:sp>
+      <p:sp>
+        <p:nvSpPr>
+          <p:cNvPr id="3" name="슬라이드 노트 개체 틀 4"/>
+          <p:cNvSpPr>
+            <a:spLocks noGrp="1"/>
+          </p:cNvSpPr>
+          <p:nvPr>
+            <p:ph type="body" sz="quarter" idx="3"/>
+          </p:nvPr>
+        </p:nvSpPr>
+        <p:spPr/>
+        <p:txBody>
+          <a:bodyPr/>
+          <a:lstStyle/>
+          <a:p>
+            <a:pPr>
+              <a:defRPr/>
+            </a:pPr>
+            <a:r>
+              <a:rPr lang="en-US" altLang="ko-KR"/>
+              <a:t/>
+            </a:r>
+            <a:endParaRPr lang="en-US" altLang="ko-KR"/>
+          </a:p>
+        </p:txBody>
+      </p:sp>
+      <p:sp>
+        <p:nvSpPr>
+          <p:cNvPr id="4" name="슬라이드 번호 개체 틀 6"/>
+          <p:cNvSpPr>
+            <a:spLocks noGrp="1"/>
+          </p:cNvSpPr>
+          <p:nvPr>
+            <p:ph type="sldNum" sz="quarter" idx="5"/>
+          </p:nvPr>
+        </p:nvSpPr>
+        <p:spPr/>
+        <p:txBody>
+          <a:bodyPr/>
+          <a:lstStyle/>
+          <a:p>
+            <a:pPr lvl="0">
+              <a:defRPr/>
+            </a:pPr>
+            <a:fld id="{09F4262C-968C-4EE9-8164-CE16364706B3}" type="slidenum">
+              <a:rPr lang="en-US" altLang="en-US"/>
+              <a:pPr lvl="0">
+                <a:defRPr/>
+              </a:pPr>
+              <a:t>3</a:t>
+            </a:fld>
+            <a:endParaRPr lang="en-US" altLang="en-US"/>
+          </a:p>
+        </p:txBody>
+      </p:sp>
+    </p:spTree>
+  </p:cSld>
+  <p:clrMapOvr>
+    <a:masterClrMapping/>
+  </p:clrMapOvr>
+</p:notes>
 </file>
 
 <file path=ppt/slideLayouts/slideLayout1.xml><?xml version="1.0" encoding="utf-8"?>
@@ -5192,6 +5689,559 @@
 </p:sld>
 </file>
 
+<file path=ppt/slides/slide3.xml><?xml version="1.0" encoding="utf-8"?>
+<p:sld xmlns:r="http://schemas.openxmlformats.org/officeDocument/2006/relationships" xmlns:c="http://schemas.openxmlformats.org/drawingml/2006/chart" xmlns:a="http://schemas.openxmlformats.org/drawingml/2006/main" xmlns:dgm="http://schemas.openxmlformats.org/drawingml/2006/diagram" xmlns:dsp="http://schemas.microsoft.com/office/drawing/2008/diagram" xmlns:p="http://schemas.openxmlformats.org/presentationml/2006/main">
+  <p:cSld>
+    <p:spTree>
+      <p:nvGrpSpPr>
+        <p:cNvPr id="1" name=""/>
+        <p:cNvGrpSpPr/>
+        <p:nvPr/>
+      </p:nvGrpSpPr>
+      <p:grpSpPr>
+        <a:xfrm>
+          <a:off x="0" y="0"/>
+          <a:ext cx="0" cy="0"/>
+          <a:chOff x="0" y="0"/>
+          <a:chExt cx="0" cy="0"/>
+        </a:xfrm>
+      </p:grpSpPr>
+      <p:grpSp>
+        <p:nvGrpSpPr>
+          <p:cNvPr id="6" name=""/>
+          <p:cNvGrpSpPr/>
+          <p:nvPr/>
+        </p:nvGrpSpPr>
+        <p:grpSpPr>
+          <a:xfrm rot="0">
+            <a:off x="3178968" y="1007018"/>
+            <a:ext cx="1773403" cy="1591678"/>
+            <a:chOff x="1649955" y="1007018"/>
+            <a:chExt cx="1773403" cy="1591678"/>
+          </a:xfrm>
+        </p:grpSpPr>
+        <p:sp>
+          <p:nvSpPr>
+            <p:cNvPr id="4" name=""/>
+            <p:cNvSpPr/>
+            <p:nvPr/>
+          </p:nvSpPr>
+          <p:spPr>
+            <a:xfrm>
+              <a:off x="1649955" y="1445669"/>
+              <a:ext cx="1773403" cy="1153026"/>
+            </a:xfrm>
+            <a:prstGeom prst="roundRect">
+              <a:avLst>
+                <a:gd name="adj" fmla="val 16667"/>
+              </a:avLst>
+            </a:prstGeom>
+          </p:spPr>
+          <p:style>
+            <a:lnRef idx="2">
+              <a:schemeClr val="accent1">
+                <a:shade val="20000"/>
+              </a:schemeClr>
+            </a:lnRef>
+            <a:fillRef idx="1">
+              <a:schemeClr val="accent1"/>
+            </a:fillRef>
+            <a:effectRef idx="0">
+              <a:schemeClr val="accent1"/>
+            </a:effectRef>
+            <a:fontRef idx="minor">
+              <a:schemeClr val="lt1"/>
+            </a:fontRef>
+          </p:style>
+          <p:txBody>
+            <a:bodyPr anchor="ctr"/>
+            <a:p>
+              <a:pPr algn="ctr">
+                <a:defRPr/>
+              </a:pPr>
+              <a:endParaRPr lang="en-US" altLang="ko-KR" sz="2200" b="1"/>
+            </a:p>
+          </p:txBody>
+        </p:sp>
+        <p:sp>
+          <p:nvSpPr>
+            <p:cNvPr id="5" name=""/>
+            <p:cNvSpPr/>
+            <p:nvPr/>
+          </p:nvSpPr>
+          <p:spPr>
+            <a:xfrm>
+              <a:off x="1649955" y="1007018"/>
+              <a:ext cx="1773403" cy="438651"/>
+            </a:xfrm>
+            <a:prstGeom prst="roundRect">
+              <a:avLst>
+                <a:gd name="adj" fmla="val 16667"/>
+              </a:avLst>
+            </a:prstGeom>
+          </p:spPr>
+          <p:style>
+            <a:lnRef idx="2">
+              <a:schemeClr val="accent1">
+                <a:shade val="20000"/>
+              </a:schemeClr>
+            </a:lnRef>
+            <a:fillRef idx="1">
+              <a:schemeClr val="accent1"/>
+            </a:fillRef>
+            <a:effectRef idx="0">
+              <a:schemeClr val="accent1"/>
+            </a:effectRef>
+            <a:fontRef idx="minor">
+              <a:schemeClr val="lt1"/>
+            </a:fontRef>
+          </p:style>
+          <p:txBody>
+            <a:bodyPr anchor="ctr"/>
+            <a:p>
+              <a:pPr algn="ctr">
+                <a:defRPr/>
+              </a:pPr>
+              <a:r>
+                <a:rPr lang="en-US" altLang="ko-KR" sz="2200" b="1"/>
+                <a:t>Client</a:t>
+              </a:r>
+              <a:endParaRPr lang="en-US" altLang="ko-KR" sz="2200" b="1"/>
+            </a:p>
+          </p:txBody>
+        </p:sp>
+      </p:grpSp>
+      <p:grpSp>
+        <p:nvGrpSpPr>
+          <p:cNvPr id="7" name=""/>
+          <p:cNvGrpSpPr/>
+          <p:nvPr/>
+        </p:nvGrpSpPr>
+        <p:grpSpPr>
+          <a:xfrm rot="0">
+            <a:off x="7202030" y="674896"/>
+            <a:ext cx="2111791" cy="1923800"/>
+            <a:chOff x="1649955" y="674896"/>
+            <a:chExt cx="1773403" cy="1923800"/>
+          </a:xfrm>
+        </p:grpSpPr>
+        <p:sp>
+          <p:nvSpPr>
+            <p:cNvPr id="8" name=""/>
+            <p:cNvSpPr/>
+            <p:nvPr/>
+          </p:nvSpPr>
+          <p:spPr>
+            <a:xfrm>
+              <a:off x="1649955" y="1445669"/>
+              <a:ext cx="1773403" cy="1153026"/>
+            </a:xfrm>
+            <a:prstGeom prst="roundRect">
+              <a:avLst>
+                <a:gd name="adj" fmla="val 16667"/>
+              </a:avLst>
+            </a:prstGeom>
+          </p:spPr>
+          <p:style>
+            <a:lnRef idx="2">
+              <a:schemeClr val="accent1">
+                <a:shade val="20000"/>
+              </a:schemeClr>
+            </a:lnRef>
+            <a:fillRef idx="1">
+              <a:schemeClr val="accent1"/>
+            </a:fillRef>
+            <a:effectRef idx="0">
+              <a:schemeClr val="accent1"/>
+            </a:effectRef>
+            <a:fontRef idx="minor">
+              <a:schemeClr val="lt1"/>
+            </a:fontRef>
+          </p:style>
+          <p:txBody>
+            <a:bodyPr anchor="ctr"/>
+            <a:p>
+              <a:pPr algn="ctr">
+                <a:defRPr/>
+              </a:pPr>
+              <a:r>
+                <a:rPr lang="en-US" altLang="ko-KR" sz="2000"/>
+                <a:t>move()</a:t>
+              </a:r>
+              <a:endParaRPr lang="en-US" altLang="ko-KR" sz="2000"/>
+            </a:p>
+          </p:txBody>
+        </p:sp>
+        <p:sp>
+          <p:nvSpPr>
+            <p:cNvPr id="9" name=""/>
+            <p:cNvSpPr/>
+            <p:nvPr/>
+          </p:nvSpPr>
+          <p:spPr>
+            <a:xfrm>
+              <a:off x="1649955" y="674896"/>
+              <a:ext cx="1773403" cy="770773"/>
+            </a:xfrm>
+            <a:prstGeom prst="roundRect">
+              <a:avLst>
+                <a:gd name="adj" fmla="val 16667"/>
+              </a:avLst>
+            </a:prstGeom>
+          </p:spPr>
+          <p:style>
+            <a:lnRef idx="2">
+              <a:schemeClr val="accent1">
+                <a:shade val="20000"/>
+              </a:schemeClr>
+            </a:lnRef>
+            <a:fillRef idx="1">
+              <a:schemeClr val="accent1"/>
+            </a:fillRef>
+            <a:effectRef idx="0">
+              <a:schemeClr val="accent1"/>
+            </a:effectRef>
+            <a:fontRef idx="minor">
+              <a:schemeClr val="lt1"/>
+            </a:fontRef>
+          </p:style>
+          <p:txBody>
+            <a:bodyPr anchor="ctr"/>
+            <a:p>
+              <a:pPr algn="ctr">
+                <a:defRPr/>
+              </a:pPr>
+              <a:r>
+                <a:rPr lang="en-US" altLang="ko-KR" sz="2000" b="1"/>
+                <a:t>&lt;&lt;Interface&gt;&gt;</a:t>
+              </a:r>
+              <a:endParaRPr lang="en-US" altLang="ko-KR" sz="2000" b="1"/>
+            </a:p>
+            <a:p>
+              <a:pPr algn="ctr">
+                <a:defRPr/>
+              </a:pPr>
+              <a:r>
+                <a:rPr lang="en-US" altLang="ko-KR" sz="2000" b="1"/>
+                <a:t>Moveable</a:t>
+              </a:r>
+              <a:endParaRPr lang="en-US" altLang="ko-KR" sz="2000" b="1"/>
+            </a:p>
+          </p:txBody>
+        </p:sp>
+      </p:grpSp>
+      <p:grpSp>
+        <p:nvGrpSpPr>
+          <p:cNvPr id="10" name=""/>
+          <p:cNvGrpSpPr/>
+          <p:nvPr/>
+        </p:nvGrpSpPr>
+        <p:grpSpPr>
+          <a:xfrm rot="0">
+            <a:off x="5807745" y="4155907"/>
+            <a:ext cx="1773403" cy="1591678"/>
+            <a:chOff x="1649955" y="1007018"/>
+            <a:chExt cx="1773403" cy="1591678"/>
+          </a:xfrm>
+        </p:grpSpPr>
+        <p:sp>
+          <p:nvSpPr>
+            <p:cNvPr id="11" name=""/>
+            <p:cNvSpPr/>
+            <p:nvPr/>
+          </p:nvSpPr>
+          <p:spPr>
+            <a:xfrm>
+              <a:off x="1649955" y="1445669"/>
+              <a:ext cx="1773403" cy="1153026"/>
+            </a:xfrm>
+            <a:prstGeom prst="roundRect">
+              <a:avLst>
+                <a:gd name="adj" fmla="val 16667"/>
+              </a:avLst>
+            </a:prstGeom>
+          </p:spPr>
+          <p:style>
+            <a:lnRef idx="2">
+              <a:schemeClr val="accent1">
+                <a:shade val="20000"/>
+              </a:schemeClr>
+            </a:lnRef>
+            <a:fillRef idx="1">
+              <a:schemeClr val="accent1"/>
+            </a:fillRef>
+            <a:effectRef idx="0">
+              <a:schemeClr val="accent1"/>
+            </a:effectRef>
+            <a:fontRef idx="minor">
+              <a:schemeClr val="lt1"/>
+            </a:fontRef>
+          </p:style>
+          <p:txBody>
+            <a:bodyPr anchor="ctr"/>
+            <a:p>
+              <a:pPr algn="ctr">
+                <a:defRPr/>
+              </a:pPr>
+              <a:r>
+                <a:rPr lang="en-US" altLang="ko-KR" sz="2200"/>
+                <a:t>move()</a:t>
+              </a:r>
+              <a:endParaRPr lang="en-US" altLang="ko-KR" sz="2200"/>
+            </a:p>
+          </p:txBody>
+        </p:sp>
+        <p:sp>
+          <p:nvSpPr>
+            <p:cNvPr id="12" name=""/>
+            <p:cNvSpPr/>
+            <p:nvPr/>
+          </p:nvSpPr>
+          <p:spPr>
+            <a:xfrm>
+              <a:off x="1649955" y="1007018"/>
+              <a:ext cx="1773403" cy="438651"/>
+            </a:xfrm>
+            <a:prstGeom prst="roundRect">
+              <a:avLst>
+                <a:gd name="adj" fmla="val 16667"/>
+              </a:avLst>
+            </a:prstGeom>
+          </p:spPr>
+          <p:style>
+            <a:lnRef idx="2">
+              <a:schemeClr val="accent1">
+                <a:shade val="20000"/>
+              </a:schemeClr>
+            </a:lnRef>
+            <a:fillRef idx="1">
+              <a:schemeClr val="accent1"/>
+            </a:fillRef>
+            <a:effectRef idx="0">
+              <a:schemeClr val="accent1"/>
+            </a:effectRef>
+            <a:fontRef idx="minor">
+              <a:schemeClr val="lt1"/>
+            </a:fontRef>
+          </p:style>
+          <p:txBody>
+            <a:bodyPr anchor="ctr"/>
+            <a:p>
+              <a:pPr algn="ctr">
+                <a:defRPr/>
+              </a:pPr>
+              <a:r>
+                <a:rPr lang="en-US" altLang="ko-KR" sz="2200" b="1"/>
+                <a:t>Train</a:t>
+              </a:r>
+              <a:endParaRPr lang="en-US" altLang="ko-KR" sz="2200" b="1"/>
+            </a:p>
+          </p:txBody>
+        </p:sp>
+      </p:grpSp>
+      <p:grpSp>
+        <p:nvGrpSpPr>
+          <p:cNvPr id="13" name=""/>
+          <p:cNvGrpSpPr/>
+          <p:nvPr/>
+        </p:nvGrpSpPr>
+        <p:grpSpPr>
+          <a:xfrm rot="0">
+            <a:off x="8790572" y="4155907"/>
+            <a:ext cx="1773403" cy="1591678"/>
+            <a:chOff x="1649955" y="1007018"/>
+            <a:chExt cx="1773403" cy="1591678"/>
+          </a:xfrm>
+        </p:grpSpPr>
+        <p:sp>
+          <p:nvSpPr>
+            <p:cNvPr id="14" name=""/>
+            <p:cNvSpPr/>
+            <p:nvPr/>
+          </p:nvSpPr>
+          <p:spPr>
+            <a:xfrm>
+              <a:off x="1649955" y="1445669"/>
+              <a:ext cx="1773403" cy="1153026"/>
+            </a:xfrm>
+            <a:prstGeom prst="roundRect">
+              <a:avLst>
+                <a:gd name="adj" fmla="val 16667"/>
+              </a:avLst>
+            </a:prstGeom>
+          </p:spPr>
+          <p:style>
+            <a:lnRef idx="2">
+              <a:schemeClr val="accent1">
+                <a:shade val="20000"/>
+              </a:schemeClr>
+            </a:lnRef>
+            <a:fillRef idx="1">
+              <a:schemeClr val="accent1"/>
+            </a:fillRef>
+            <a:effectRef idx="0">
+              <a:schemeClr val="accent1"/>
+            </a:effectRef>
+            <a:fontRef idx="minor">
+              <a:schemeClr val="lt1"/>
+            </a:fontRef>
+          </p:style>
+          <p:txBody>
+            <a:bodyPr anchor="ctr"/>
+            <a:p>
+              <a:pPr algn="ctr">
+                <a:defRPr/>
+              </a:pPr>
+              <a:r>
+                <a:rPr lang="en-US" altLang="ko-KR" sz="2200"/>
+                <a:t>move()</a:t>
+              </a:r>
+              <a:endParaRPr lang="en-US" altLang="ko-KR" sz="2200"/>
+            </a:p>
+          </p:txBody>
+        </p:sp>
+        <p:sp>
+          <p:nvSpPr>
+            <p:cNvPr id="15" name=""/>
+            <p:cNvSpPr/>
+            <p:nvPr/>
+          </p:nvSpPr>
+          <p:spPr>
+            <a:xfrm>
+              <a:off x="1649955" y="1007018"/>
+              <a:ext cx="1773403" cy="438651"/>
+            </a:xfrm>
+            <a:prstGeom prst="roundRect">
+              <a:avLst>
+                <a:gd name="adj" fmla="val 16667"/>
+              </a:avLst>
+            </a:prstGeom>
+          </p:spPr>
+          <p:style>
+            <a:lnRef idx="2">
+              <a:schemeClr val="accent1">
+                <a:shade val="20000"/>
+              </a:schemeClr>
+            </a:lnRef>
+            <a:fillRef idx="1">
+              <a:schemeClr val="accent1"/>
+            </a:fillRef>
+            <a:effectRef idx="0">
+              <a:schemeClr val="accent1"/>
+            </a:effectRef>
+            <a:fontRef idx="minor">
+              <a:schemeClr val="lt1"/>
+            </a:fontRef>
+          </p:style>
+          <p:txBody>
+            <a:bodyPr anchor="ctr"/>
+            <a:p>
+              <a:pPr algn="ctr">
+                <a:defRPr/>
+              </a:pPr>
+              <a:r>
+                <a:rPr lang="en-US" altLang="ko-KR" sz="2200" b="1"/>
+                <a:t>Bus</a:t>
+              </a:r>
+              <a:endParaRPr lang="en-US" altLang="ko-KR" sz="2200" b="1"/>
+            </a:p>
+          </p:txBody>
+        </p:sp>
+      </p:grpSp>
+      <p:cxnSp>
+        <p:nvCxnSpPr>
+          <p:cNvPr id="17" name=""/>
+          <p:cNvCxnSpPr/>
+          <p:nvPr/>
+        </p:nvCxnSpPr>
+        <p:spPr>
+          <a:xfrm flipV="1">
+            <a:off x="5065168" y="1993984"/>
+            <a:ext cx="2061663" cy="0"/>
+          </a:xfrm>
+          <a:prstGeom prst="straightConnector1">
+            <a:avLst/>
+          </a:prstGeom>
+          <a:noFill/>
+          <a:ln w="38100" cap="flat" cmpd="sng" algn="ctr">
+            <a:solidFill>
+              <a:srgbClr val="9d5cbb">
+                <a:alpha val="100000"/>
+              </a:srgbClr>
+            </a:solidFill>
+            <a:prstDash val="solid"/>
+            <a:tailEnd type="arrow"/>
+          </a:ln>
+        </p:spPr>
+      </p:cxnSp>
+      <p:cxnSp>
+        <p:nvCxnSpPr>
+          <p:cNvPr id="18" name=""/>
+          <p:cNvCxnSpPr/>
+          <p:nvPr/>
+        </p:nvCxnSpPr>
+        <p:spPr>
+          <a:xfrm rot="5400000" flipH="1" flipV="1">
+            <a:off x="6647445" y="2814886"/>
+            <a:ext cx="1278355" cy="1184362"/>
+          </a:xfrm>
+          <a:prstGeom prst="straightConnector1">
+            <a:avLst/>
+          </a:prstGeom>
+          <a:noFill/>
+          <a:ln w="38100" cap="flat" cmpd="sng" algn="ctr">
+            <a:solidFill>
+              <a:srgbClr val="9d5cbb">
+                <a:alpha val="100000"/>
+              </a:srgbClr>
+            </a:solidFill>
+            <a:prstDash val="solid"/>
+            <a:tailEnd type="arrow"/>
+          </a:ln>
+        </p:spPr>
+      </p:cxnSp>
+      <p:cxnSp>
+        <p:nvCxnSpPr>
+          <p:cNvPr id="19" name=""/>
+          <p:cNvCxnSpPr/>
+          <p:nvPr/>
+        </p:nvCxnSpPr>
+        <p:spPr>
+          <a:xfrm rot="16200000" flipV="1">
+            <a:off x="8549310" y="2918287"/>
+            <a:ext cx="1278355" cy="977559"/>
+          </a:xfrm>
+          <a:prstGeom prst="straightConnector1">
+            <a:avLst/>
+          </a:prstGeom>
+          <a:noFill/>
+          <a:ln w="38100" cap="flat" cmpd="sng" algn="ctr">
+            <a:solidFill>
+              <a:srgbClr val="9d5cbb">
+                <a:alpha val="100000"/>
+              </a:srgbClr>
+            </a:solidFill>
+            <a:prstDash val="solid"/>
+            <a:tailEnd type="arrow"/>
+          </a:ln>
+        </p:spPr>
+      </p:cxnSp>
+    </p:spTree>
+  </p:cSld>
+  <p:clrMapOvr>
+    <a:masterClrMapping/>
+  </p:clrMapOvr>
+  <mc:AlternateContent xmlns:mc="http://schemas.openxmlformats.org/markup-compatibility/2006">
+    <mc:Choice xmlns:p14="http://schemas.microsoft.com/office/powerpoint/2010/main" Requires="p14">
+      <p:transition xmlns:mc="http://schemas.openxmlformats.org/markup-compatibility/2006" xmlns:p14="http://schemas.microsoft.com/office/powerpoint/2010/main" mc:Ignorable="p14" p14:dur="500"/>
+    </mc:Choice>
+    <mc:Fallback>
+      <p:transition/>
+    </mc:Fallback>
+  </mc:AlternateContent>
+</p:sld>
+</file>
+
 <file path=ppt/theme/theme1.xml><?xml version="1.0" encoding="utf-8"?>
 <a:theme xmlns:r="http://schemas.openxmlformats.org/officeDocument/2006/relationships" xmlns:c="http://schemas.openxmlformats.org/drawingml/2006/chart" xmlns:dgm="http://schemas.openxmlformats.org/drawingml/2006/diagram" xmlns:dsp="http://schemas.microsoft.com/office/drawing/2008/diagram" xmlns:a="http://schemas.openxmlformats.org/drawingml/2006/main" xmlns:pic="http://schemas.openxmlformats.org/drawingml/2006/picture" xmlns:wp="http://schemas.openxmlformats.org/drawingml/2006/wordprocessingDrawing" xmlns:xdr="http://schemas.openxmlformats.org/drawingml/2006/spreadsheetDrawing" xmlns:lc="http://schemas.openxmlformats.org/drawingml/2006/lockedCanvas" xmlns:p="http://schemas.openxmlformats.org/presentationml/2006/main" name="한컴오피스">
   <a:themeElements>
@@ -5453,4 +6503,267 @@
     </a:fmtScheme>
   </a:themeElements>
 </a:theme>
+</file>
+
+<file path=ppt/theme/theme2.xml><?xml version="1.0" encoding="utf-8"?>
+<a:theme xmlns:r="http://schemas.openxmlformats.org/officeDocument/2006/relationships" xmlns:c="http://schemas.openxmlformats.org/drawingml/2006/chart" xmlns:dgm="http://schemas.openxmlformats.org/drawingml/2006/diagram" xmlns:dsp="http://schemas.microsoft.com/office/drawing/2008/diagram" xmlns:a="http://schemas.openxmlformats.org/drawingml/2006/main" xmlns:pic="http://schemas.openxmlformats.org/drawingml/2006/picture" xmlns:wp="http://schemas.openxmlformats.org/drawingml/2006/wordprocessingDrawing" xmlns:xdr="http://schemas.openxmlformats.org/drawingml/2006/spreadsheetDrawing" xmlns:lc="http://schemas.openxmlformats.org/drawingml/2006/lockedCanvas" xmlns:p="http://schemas.openxmlformats.org/presentationml/2006/main" name="한컴오피스">
+  <a:themeElements>
+    <a:clrScheme name="한컴오피스">
+      <a:dk1>
+        <a:sysClr val="windowText" lastClr="000000"/>
+      </a:dk1>
+      <a:lt1>
+        <a:sysClr val="window" lastClr="ffffff"/>
+      </a:lt1>
+      <a:dk2>
+        <a:srgbClr val="3a3c84"/>
+      </a:dk2>
+      <a:lt2>
+        <a:srgbClr val="faf3db"/>
+      </a:lt2>
+      <a:accent1>
+        <a:srgbClr val="6182d6"/>
+      </a:accent1>
+      <a:accent2>
+        <a:srgbClr val="ff843a"/>
+      </a:accent2>
+      <a:accent3>
+        <a:srgbClr val="b2b2b2"/>
+      </a:accent3>
+      <a:accent4>
+        <a:srgbClr val="ffd700"/>
+      </a:accent4>
+      <a:accent5>
+        <a:srgbClr val="289b6e"/>
+      </a:accent5>
+      <a:accent6>
+        <a:srgbClr val="9d5cbb"/>
+      </a:accent6>
+      <a:hlink>
+        <a:srgbClr val="0000ff"/>
+      </a:hlink>
+      <a:folHlink>
+        <a:srgbClr val="800080"/>
+      </a:folHlink>
+    </a:clrScheme>
+    <a:fontScheme name="한컴오피스">
+      <a:majorFont>
+        <a:latin typeface="Calibri"/>
+        <a:ea typeface=""/>
+        <a:cs typeface="Times New Roman"/>
+        <a:font script="Jpan" typeface="MS PGothic"/>
+        <a:font script="Hang" typeface="맑은 고딕"/>
+        <a:font script="Hans" typeface="SimSun"/>
+        <a:font script="Hant" typeface="新細明體"/>
+        <a:font script="Arab" typeface="Times New Roman"/>
+        <a:font script="Hebr" typeface="Times New Roman"/>
+        <a:font script="Thai" typeface="Angsana New"/>
+        <a:font script="Beng" typeface="Vrinda"/>
+        <a:font script="Gujr" typeface="Shruti"/>
+        <a:font script="Khmr" typeface="MoolBoran"/>
+        <a:font script="Knda" typeface="Tunga"/>
+        <a:font script="Guru" typeface="Raavi"/>
+        <a:font script="Cans" typeface="Euphemia"/>
+        <a:font script="Cher" typeface="Plantagenet Cherokee"/>
+        <a:font script="Yiii" typeface="Microsoft Yi Baiti"/>
+        <a:font script="Tibt" typeface="Microsoft Himalaya"/>
+        <a:font script="Thaa" typeface="MV Boli"/>
+        <a:font script="Deva" typeface="Mangal"/>
+        <a:font script="Telu" typeface="Gautami"/>
+        <a:font script="Taml" typeface="Latha"/>
+        <a:font script="Syrc" typeface="Estrangelo Edessa"/>
+        <a:font script="Orya" typeface="Kalinga"/>
+        <a:font script="Mlym" typeface="Kartika"/>
+        <a:font script="Laoo" typeface="DokChampa"/>
+        <a:font script="Sinh" typeface="Iskoola Pota"/>
+        <a:font script="Mong" typeface="Mongolian Baiti"/>
+        <a:font script="Viet" typeface="Times New Roman"/>
+        <a:font script="Uigh" typeface="Microsoft Uighur"/>
+      </a:majorFont>
+      <a:minorFont>
+        <a:latin typeface="Calibri"/>
+        <a:ea typeface=""/>
+        <a:cs typeface="Times New Roman"/>
+        <a:font script="Jpan" typeface="MS PGothic"/>
+        <a:font script="Hang" typeface="맑은 고딕"/>
+        <a:font script="Hans" typeface="SimSun"/>
+        <a:font script="Hant" typeface="新細明體"/>
+        <a:font script="Arab" typeface="Times New Roman"/>
+        <a:font script="Hebr" typeface="Times New Roman"/>
+        <a:font script="Thai" typeface="Angsana New"/>
+        <a:font script="Beng" typeface="Vrinda"/>
+        <a:font script="Gujr" typeface="Shruti"/>
+        <a:font script="Khmr" typeface="MoolBoran"/>
+        <a:font script="Knda" typeface="Tunga"/>
+        <a:font script="Guru" typeface="Raavi"/>
+        <a:font script="Cans" typeface="Euphemia"/>
+        <a:font script="Cher" typeface="Plantagenet Cherokee"/>
+        <a:font script="Yiii" typeface="Microsoft Yi Baiti"/>
+        <a:font script="Tibt" typeface="Microsoft Himalaya"/>
+        <a:font script="Thaa" typeface="MV Boli"/>
+        <a:font script="Deva" typeface="Mangal"/>
+        <a:font script="Telu" typeface="Gautami"/>
+        <a:font script="Taml" typeface="Latha"/>
+        <a:font script="Syrc" typeface="Estrangelo Edessa"/>
+        <a:font script="Orya" typeface="Kalinga"/>
+        <a:font script="Mlym" typeface="Kartika"/>
+        <a:font script="Laoo" typeface="DokChampa"/>
+        <a:font script="Sinh" typeface="Iskoola Pota"/>
+        <a:font script="Mong" typeface="Mongolian Baiti"/>
+        <a:font script="Viet" typeface="Times New Roman"/>
+        <a:font script="Uigh" typeface="Microsoft Uighur"/>
+      </a:minorFont>
+    </a:fontScheme>
+    <a:fmtScheme name="한컴오피스">
+      <a:fillStyleLst>
+        <a:solidFill>
+          <a:schemeClr val="phClr"/>
+        </a:solidFill>
+        <a:gradFill rotWithShape="1">
+          <a:gsLst>
+            <a:gs pos="0">
+              <a:schemeClr val="phClr">
+                <a:tint val="50000"/>
+                <a:satMod val="300000"/>
+              </a:schemeClr>
+            </a:gs>
+            <a:gs pos="35000">
+              <a:schemeClr val="phClr">
+                <a:tint val="37000"/>
+                <a:satMod val="300000"/>
+              </a:schemeClr>
+            </a:gs>
+            <a:gs pos="100000">
+              <a:schemeClr val="phClr">
+                <a:tint val="15000"/>
+                <a:satMod val="350000"/>
+              </a:schemeClr>
+            </a:gs>
+          </a:gsLst>
+          <a:lin ang="16200000" scaled="1"/>
+        </a:gradFill>
+        <a:gradFill rotWithShape="1">
+          <a:gsLst>
+            <a:gs pos="0">
+              <a:schemeClr val="phClr">
+                <a:shade val="51000"/>
+                <a:satMod val="130000"/>
+              </a:schemeClr>
+            </a:gs>
+            <a:gs pos="80000">
+              <a:schemeClr val="phClr">
+                <a:shade val="93000"/>
+                <a:satMod val="130000"/>
+              </a:schemeClr>
+            </a:gs>
+            <a:gs pos="100000">
+              <a:schemeClr val="phClr">
+                <a:shade val="94000"/>
+                <a:satMod val="135000"/>
+              </a:schemeClr>
+            </a:gs>
+          </a:gsLst>
+          <a:lin ang="16200000" scaled="0"/>
+        </a:gradFill>
+      </a:fillStyleLst>
+      <a:lnStyleLst>
+        <a:ln w="12700" cap="flat" cmpd="sng" algn="ctr">
+          <a:solidFill>
+            <a:schemeClr val="phClr">
+              <a:satMod val="105000"/>
+            </a:schemeClr>
+          </a:solidFill>
+          <a:prstDash val="solid"/>
+        </a:ln>
+        <a:ln w="19050" cap="flat" cmpd="sng" algn="ctr">
+          <a:solidFill>
+            <a:schemeClr val="phClr"/>
+          </a:solidFill>
+          <a:prstDash val="solid"/>
+        </a:ln>
+        <a:ln w="38100" cap="flat" cmpd="sng" algn="ctr">
+          <a:solidFill>
+            <a:schemeClr val="phClr"/>
+          </a:solidFill>
+          <a:prstDash val="solid"/>
+        </a:ln>
+      </a:lnStyleLst>
+      <a:effectStyleLst>
+        <a:effectStyle>
+          <a:effectLst>
+            <a:outerShdw blurRad="38100" dist="25400" dir="5400000" rotWithShape="0">
+              <a:srgbClr val="000000">
+                <a:alpha val="75000"/>
+              </a:srgbClr>
+            </a:outerShdw>
+          </a:effectLst>
+        </a:effectStyle>
+        <a:effectStyle>
+          <a:effectLst>
+            <a:outerShdw blurRad="38100" dist="25400" dir="5400000" rotWithShape="0">
+              <a:srgbClr val="000000">
+                <a:alpha val="75000"/>
+              </a:srgbClr>
+            </a:outerShdw>
+          </a:effectLst>
+        </a:effectStyle>
+        <a:effectStyle>
+          <a:effectLst>
+            <a:reflection blurRad="12700" stA="26000" endPos="28000" dist="38100" dir="5400000" sy="-100000" rotWithShape="0"/>
+          </a:effectLst>
+        </a:effectStyle>
+      </a:effectStyleLst>
+      <a:bgFillStyleLst>
+        <a:solidFill>
+          <a:schemeClr val="phClr"/>
+        </a:solidFill>
+        <a:gradFill rotWithShape="1">
+          <a:gsLst>
+            <a:gs pos="0">
+              <a:schemeClr val="phClr">
+                <a:tint val="40000"/>
+                <a:satMod val="350000"/>
+              </a:schemeClr>
+            </a:gs>
+            <a:gs pos="40000">
+              <a:schemeClr val="phClr">
+                <a:tint val="45000"/>
+                <a:shade val="99000"/>
+                <a:satMod val="350000"/>
+              </a:schemeClr>
+            </a:gs>
+            <a:gs pos="100000">
+              <a:schemeClr val="phClr">
+                <a:shade val="20000"/>
+                <a:satMod val="255000"/>
+              </a:schemeClr>
+            </a:gs>
+          </a:gsLst>
+          <a:path path="circle">
+            <a:fillToRect l="50000" t="-80000" r="50000" b="180000"/>
+          </a:path>
+        </a:gradFill>
+        <a:gradFill rotWithShape="1">
+          <a:gsLst>
+            <a:gs pos="0">
+              <a:schemeClr val="phClr">
+                <a:tint val="80000"/>
+                <a:satMod val="300000"/>
+              </a:schemeClr>
+            </a:gs>
+            <a:gs pos="100000">
+              <a:schemeClr val="phClr">
+                <a:shade val="30000"/>
+                <a:satMod val="200000"/>
+              </a:schemeClr>
+            </a:gs>
+          </a:gsLst>
+          <a:path path="circle">
+            <a:fillToRect l="50000" t="50000" r="50000" b="50000"/>
+          </a:path>
+        </a:gradFill>
+      </a:bgFillStyleLst>
+    </a:fmtScheme>
+  </a:themeElements>
+</a:theme>
 </file>
</xml_diff>

<commit_message>
add posts "state pattern"
</commit_message>
<xml_diff>
--- a/etc/images.pptx
+++ b/etc/images.pptx
@@ -2,7 +2,7 @@
 <file path=ppt/presentation.xml><?xml version="1.0" encoding="utf-8"?>
 <p:presentation xmlns:r="http://schemas.openxmlformats.org/officeDocument/2006/relationships" xmlns:c="http://schemas.openxmlformats.org/drawingml/2006/chart" xmlns:a="http://schemas.openxmlformats.org/drawingml/2006/main" xmlns:dgm="http://schemas.openxmlformats.org/drawingml/2006/diagram" xmlns:dsp="http://schemas.microsoft.com/office/drawing/2008/diagram" xmlns:p="http://schemas.openxmlformats.org/presentationml/2006/main">
   <p:sldMasterIdLst>
-    <p:sldMasterId id="2147483720" r:id="rId1"/>
+    <p:sldMasterId id="2147483721" r:id="rId1"/>
   </p:sldMasterIdLst>
   <p:notesMasterIdLst>
     <p:notesMasterId r:id="rId2"/>
@@ -13,6 +13,7 @@
     <p:sldId id="258" r:id="rId5"/>
     <p:sldId id="259" r:id="rId6"/>
     <p:sldId id="260" r:id="rId7"/>
+    <p:sldId id="261" r:id="rId8"/>
   </p:sldIdLst>
   <p:sldSz cx="12192000" cy="6858000"/>
   <p:notesSz cx="6858000" cy="9144000"/>
@@ -209,7 +210,7 @@
               <a:pPr lvl="0">
                 <a:defRPr/>
               </a:pPr>
-              <a:t>2019-07-29</a:t>
+              <a:t>2019-07-31</a:t>
             </a:fld>
             <a:endParaRPr lang="ko-KR" altLang="en-US"/>
           </a:p>
@@ -665,10 +666,10 @@
               <a:defRPr/>
             </a:pPr>
             <a:r>
-              <a:rPr lang="en-US" altLang="ko-KR"/>
+              <a:rPr lang="ko-KR" altLang="en-US"/>
               <a:t/>
             </a:r>
-            <a:endParaRPr lang="en-US" altLang="ko-KR"/>
+            <a:endParaRPr lang="ko-KR" altLang="en-US"/>
           </a:p>
         </p:txBody>
       </p:sp>
@@ -7410,6 +7411,724 @@
           </p:txBody>
         </p:sp>
       </p:grpSp>
+    </p:spTree>
+  </p:cSld>
+  <p:clrMapOvr>
+    <a:masterClrMapping/>
+  </p:clrMapOvr>
+  <mc:AlternateContent xmlns:mc="http://schemas.openxmlformats.org/markup-compatibility/2006">
+    <mc:Choice xmlns:p14="http://schemas.microsoft.com/office/powerpoint/2010/main" Requires="p14">
+      <p:transition xmlns:mc="http://schemas.openxmlformats.org/markup-compatibility/2006" xmlns:p14="http://schemas.microsoft.com/office/powerpoint/2010/main" mc:Ignorable="p14" p14:dur="500"/>
+    </mc:Choice>
+    <mc:Fallback>
+      <p:transition/>
+    </mc:Fallback>
+  </mc:AlternateContent>
+</p:sld>
+</file>
+
+<file path=ppt/slides/slide6.xml><?xml version="1.0" encoding="utf-8"?>
+<p:sld xmlns:r="http://schemas.openxmlformats.org/officeDocument/2006/relationships" xmlns:c="http://schemas.openxmlformats.org/drawingml/2006/chart" xmlns:a="http://schemas.openxmlformats.org/drawingml/2006/main" xmlns:dgm="http://schemas.openxmlformats.org/drawingml/2006/diagram" xmlns:dsp="http://schemas.microsoft.com/office/drawing/2008/diagram" xmlns:p="http://schemas.openxmlformats.org/presentationml/2006/main">
+  <p:cSld>
+    <p:spTree>
+      <p:nvGrpSpPr>
+        <p:cNvPr id="1" name=""/>
+        <p:cNvGrpSpPr/>
+        <p:nvPr/>
+      </p:nvGrpSpPr>
+      <p:grpSpPr>
+        <a:xfrm>
+          <a:off x="0" y="0"/>
+          <a:ext cx="0" cy="0"/>
+          <a:chOff x="0" y="0"/>
+          <a:chExt cx="0" cy="0"/>
+        </a:xfrm>
+      </p:grpSpPr>
+      <p:sp>
+        <p:nvSpPr>
+          <p:cNvPr id="4" name=""/>
+          <p:cNvSpPr/>
+          <p:nvPr/>
+        </p:nvSpPr>
+        <p:spPr>
+          <a:xfrm>
+            <a:off x="1952006" y="1103414"/>
+            <a:ext cx="2127662" cy="3005943"/>
+          </a:xfrm>
+          <a:prstGeom prst="roundRect">
+            <a:avLst>
+              <a:gd name="adj" fmla="val 16667"/>
+            </a:avLst>
+          </a:prstGeom>
+        </p:spPr>
+        <p:style>
+          <a:lnRef idx="2">
+            <a:schemeClr val="accent1">
+              <a:shade val="20000"/>
+            </a:schemeClr>
+          </a:lnRef>
+          <a:fillRef idx="1">
+            <a:schemeClr val="accent1"/>
+          </a:fillRef>
+          <a:effectRef idx="0">
+            <a:schemeClr val="accent1"/>
+          </a:effectRef>
+          <a:fontRef idx="minor">
+            <a:schemeClr val="lt1"/>
+          </a:fontRef>
+        </p:style>
+        <p:txBody>
+          <a:bodyPr anchor="ctr"/>
+          <a:p>
+            <a:pPr>
+              <a:defRPr/>
+            </a:pPr>
+            <a:r>
+              <a:rPr lang="en-US" altLang="ko-KR"/>
+              <a:t>if ON {</a:t>
+            </a:r>
+            <a:endParaRPr lang="en-US" altLang="ko-KR"/>
+          </a:p>
+          <a:p>
+            <a:pPr>
+              <a:defRPr/>
+            </a:pPr>
+            <a:r>
+              <a:rPr lang="en-US" altLang="ko-KR"/>
+              <a:t>  power on;</a:t>
+            </a:r>
+            <a:endParaRPr lang="en-US" altLang="ko-KR"/>
+          </a:p>
+          <a:p>
+            <a:pPr>
+              <a:defRPr/>
+            </a:pPr>
+            <a:r>
+              <a:rPr lang="en-US" altLang="ko-KR"/>
+              <a:t>}</a:t>
+            </a:r>
+            <a:endParaRPr lang="en-US" altLang="ko-KR"/>
+          </a:p>
+          <a:p>
+            <a:pPr>
+              <a:defRPr/>
+            </a:pPr>
+            <a:r>
+              <a:rPr lang="en-US" altLang="ko-KR"/>
+              <a:t>if OFF {</a:t>
+            </a:r>
+            <a:endParaRPr lang="en-US" altLang="ko-KR"/>
+          </a:p>
+          <a:p>
+            <a:pPr>
+              <a:defRPr/>
+            </a:pPr>
+            <a:r>
+              <a:rPr lang="en-US" altLang="ko-KR"/>
+              <a:t>  power off;</a:t>
+            </a:r>
+            <a:endParaRPr lang="en-US" altLang="ko-KR"/>
+          </a:p>
+          <a:p>
+            <a:pPr>
+              <a:defRPr/>
+            </a:pPr>
+            <a:r>
+              <a:rPr lang="en-US" altLang="ko-KR"/>
+              <a:t>}</a:t>
+            </a:r>
+            <a:endParaRPr lang="en-US" altLang="ko-KR"/>
+          </a:p>
+          <a:p>
+            <a:pPr>
+              <a:defRPr/>
+            </a:pPr>
+            <a:r>
+              <a:rPr lang="en-US" altLang="ko-KR"/>
+              <a:t>if SAVING {</a:t>
+            </a:r>
+            <a:endParaRPr lang="en-US" altLang="ko-KR"/>
+          </a:p>
+          <a:p>
+            <a:pPr>
+              <a:defRPr/>
+            </a:pPr>
+            <a:r>
+              <a:rPr lang="en-US" altLang="ko-KR"/>
+              <a:t>  power saving;</a:t>
+            </a:r>
+            <a:endParaRPr lang="en-US" altLang="ko-KR"/>
+          </a:p>
+          <a:p>
+            <a:pPr>
+              <a:defRPr/>
+            </a:pPr>
+            <a:r>
+              <a:rPr lang="en-US" altLang="ko-KR"/>
+              <a:t>}</a:t>
+            </a:r>
+            <a:endParaRPr lang="en-US" altLang="ko-KR"/>
+          </a:p>
+        </p:txBody>
+      </p:sp>
+      <p:sp>
+        <p:nvSpPr>
+          <p:cNvPr id="5" name=""/>
+          <p:cNvSpPr txBox="1"/>
+          <p:nvPr/>
+        </p:nvSpPr>
+        <p:spPr>
+          <a:xfrm>
+            <a:off x="2264147" y="658557"/>
+            <a:ext cx="1503380" cy="444857"/>
+          </a:xfrm>
+          <a:prstGeom prst="rect">
+            <a:avLst/>
+          </a:prstGeom>
+        </p:spPr>
+        <p:txBody>
+          <a:bodyPr wrap="square">
+            <a:spAutoFit/>
+          </a:bodyPr>
+          <a:p>
+            <a:pPr algn="ctr">
+              <a:defRPr/>
+            </a:pPr>
+            <a:r>
+              <a:rPr lang="en-US" altLang="ko-KR" sz="2400" b="1"/>
+              <a:t>Laptop</a:t>
+            </a:r>
+            <a:endParaRPr lang="en-US" altLang="ko-KR" sz="2400" b="1"/>
+          </a:p>
+        </p:txBody>
+      </p:sp>
+      <p:sp>
+        <p:nvSpPr>
+          <p:cNvPr id="6" name=""/>
+          <p:cNvSpPr txBox="1"/>
+          <p:nvPr/>
+        </p:nvSpPr>
+        <p:spPr>
+          <a:xfrm>
+            <a:off x="2264147" y="4109358"/>
+            <a:ext cx="1503380" cy="822687"/>
+          </a:xfrm>
+          <a:prstGeom prst="rect">
+            <a:avLst/>
+          </a:prstGeom>
+        </p:spPr>
+        <p:txBody>
+          <a:bodyPr wrap="square">
+            <a:spAutoFit/>
+          </a:bodyPr>
+          <a:p>
+            <a:pPr algn="ctr">
+              <a:defRPr/>
+            </a:pPr>
+            <a:r>
+              <a:rPr lang="en-US" altLang="ko-KR" sz="2400" b="1"/>
+              <a:t>State Pattern X</a:t>
+            </a:r>
+            <a:endParaRPr lang="en-US" altLang="ko-KR" sz="2400" b="1"/>
+          </a:p>
+        </p:txBody>
+      </p:sp>
+      <p:sp>
+        <p:nvSpPr>
+          <p:cNvPr id="7" name=""/>
+          <p:cNvSpPr/>
+          <p:nvPr/>
+        </p:nvSpPr>
+        <p:spPr>
+          <a:xfrm>
+            <a:off x="5304210" y="2468664"/>
+            <a:ext cx="2588037" cy="545318"/>
+          </a:xfrm>
+          <a:prstGeom prst="roundRect">
+            <a:avLst>
+              <a:gd name="adj" fmla="val 16667"/>
+            </a:avLst>
+          </a:prstGeom>
+        </p:spPr>
+        <p:style>
+          <a:lnRef idx="2">
+            <a:schemeClr val="accent1">
+              <a:shade val="20000"/>
+            </a:schemeClr>
+          </a:lnRef>
+          <a:fillRef idx="1">
+            <a:schemeClr val="accent1"/>
+          </a:fillRef>
+          <a:effectRef idx="0">
+            <a:schemeClr val="accent1"/>
+          </a:effectRef>
+          <a:fontRef idx="minor">
+            <a:schemeClr val="lt1"/>
+          </a:fontRef>
+        </p:style>
+        <p:txBody>
+          <a:bodyPr anchor="ctr"/>
+          <a:p>
+            <a:pPr algn="ctr">
+              <a:defRPr/>
+            </a:pPr>
+            <a:r>
+              <a:rPr lang="en-US" altLang="ko-KR"/>
+              <a:t>State Interface.call()</a:t>
+            </a:r>
+            <a:endParaRPr lang="en-US" altLang="ko-KR"/>
+          </a:p>
+        </p:txBody>
+      </p:sp>
+      <p:sp>
+        <p:nvSpPr>
+          <p:cNvPr id="8" name=""/>
+          <p:cNvSpPr txBox="1"/>
+          <p:nvPr/>
+        </p:nvSpPr>
+        <p:spPr>
+          <a:xfrm>
+            <a:off x="5846539" y="2019464"/>
+            <a:ext cx="1503380" cy="449200"/>
+          </a:xfrm>
+          <a:prstGeom prst="rect">
+            <a:avLst/>
+          </a:prstGeom>
+        </p:spPr>
+        <p:txBody>
+          <a:bodyPr wrap="square">
+            <a:spAutoFit/>
+          </a:bodyPr>
+          <a:p>
+            <a:pPr algn="ctr">
+              <a:defRPr/>
+            </a:pPr>
+            <a:r>
+              <a:rPr lang="en-US" altLang="ko-KR" sz="2400" b="1"/>
+              <a:t>Laptop</a:t>
+            </a:r>
+            <a:endParaRPr lang="en-US" altLang="ko-KR" sz="2400" b="1"/>
+          </a:p>
+        </p:txBody>
+      </p:sp>
+      <p:sp>
+        <p:nvSpPr>
+          <p:cNvPr id="9" name=""/>
+          <p:cNvSpPr txBox="1"/>
+          <p:nvPr/>
+        </p:nvSpPr>
+        <p:spPr>
+          <a:xfrm>
+            <a:off x="7965646" y="4680857"/>
+            <a:ext cx="1503379" cy="822688"/>
+          </a:xfrm>
+          <a:prstGeom prst="rect">
+            <a:avLst/>
+          </a:prstGeom>
+        </p:spPr>
+        <p:txBody>
+          <a:bodyPr wrap="square">
+            <a:spAutoFit/>
+          </a:bodyPr>
+          <a:p>
+            <a:pPr algn="ctr">
+              <a:defRPr/>
+            </a:pPr>
+            <a:r>
+              <a:rPr lang="en-US" altLang="ko-KR" sz="2400" b="1"/>
+              <a:t>State Pattern O</a:t>
+            </a:r>
+            <a:endParaRPr lang="en-US" altLang="ko-KR" sz="2400" b="1"/>
+          </a:p>
+        </p:txBody>
+      </p:sp>
+      <p:sp>
+        <p:nvSpPr>
+          <p:cNvPr id="10" name=""/>
+          <p:cNvSpPr/>
+          <p:nvPr/>
+        </p:nvSpPr>
+        <p:spPr>
+          <a:xfrm>
+            <a:off x="9469026" y="1103414"/>
+            <a:ext cx="2045709" cy="545318"/>
+          </a:xfrm>
+          <a:prstGeom prst="roundRect">
+            <a:avLst>
+              <a:gd name="adj" fmla="val 16667"/>
+            </a:avLst>
+          </a:prstGeom>
+        </p:spPr>
+        <p:style>
+          <a:lnRef idx="2">
+            <a:schemeClr val="accent1">
+              <a:shade val="20000"/>
+            </a:schemeClr>
+          </a:lnRef>
+          <a:fillRef idx="1">
+            <a:schemeClr val="accent1"/>
+          </a:fillRef>
+          <a:effectRef idx="0">
+            <a:schemeClr val="accent1"/>
+          </a:effectRef>
+          <a:fontRef idx="minor">
+            <a:schemeClr val="lt1"/>
+          </a:fontRef>
+        </p:style>
+        <p:txBody>
+          <a:bodyPr anchor="ctr"/>
+          <a:p>
+            <a:pPr algn="ctr">
+              <a:defRPr/>
+            </a:pPr>
+            <a:r>
+              <a:rPr lang="en-US" altLang="ko-KR"/>
+              <a:t>power on;</a:t>
+            </a:r>
+            <a:endParaRPr lang="en-US" altLang="ko-KR"/>
+          </a:p>
+        </p:txBody>
+      </p:sp>
+      <p:sp>
+        <p:nvSpPr>
+          <p:cNvPr id="11" name=""/>
+          <p:cNvSpPr txBox="1"/>
+          <p:nvPr/>
+        </p:nvSpPr>
+        <p:spPr>
+          <a:xfrm>
+            <a:off x="9740190" y="658557"/>
+            <a:ext cx="1503380" cy="449200"/>
+          </a:xfrm>
+          <a:prstGeom prst="rect">
+            <a:avLst/>
+          </a:prstGeom>
+        </p:spPr>
+        <p:txBody>
+          <a:bodyPr wrap="square">
+            <a:spAutoFit/>
+          </a:bodyPr>
+          <a:p>
+            <a:pPr algn="ctr">
+              <a:defRPr/>
+            </a:pPr>
+            <a:r>
+              <a:rPr lang="en-US" altLang="ko-KR" sz="2400" b="1"/>
+              <a:t>ON</a:t>
+            </a:r>
+            <a:endParaRPr lang="en-US" altLang="ko-KR" sz="2400" b="1"/>
+          </a:p>
+        </p:txBody>
+      </p:sp>
+      <p:sp>
+        <p:nvSpPr>
+          <p:cNvPr id="14" name=""/>
+          <p:cNvSpPr/>
+          <p:nvPr/>
+        </p:nvSpPr>
+        <p:spPr>
+          <a:xfrm>
+            <a:off x="9469026" y="2468664"/>
+            <a:ext cx="2045709" cy="545318"/>
+          </a:xfrm>
+          <a:prstGeom prst="roundRect">
+            <a:avLst>
+              <a:gd name="adj" fmla="val 16667"/>
+            </a:avLst>
+          </a:prstGeom>
+        </p:spPr>
+        <p:style>
+          <a:lnRef idx="2">
+            <a:schemeClr val="accent1">
+              <a:shade val="20000"/>
+            </a:schemeClr>
+          </a:lnRef>
+          <a:fillRef idx="1">
+            <a:schemeClr val="accent1"/>
+          </a:fillRef>
+          <a:effectRef idx="0">
+            <a:schemeClr val="accent1"/>
+          </a:effectRef>
+          <a:fontRef idx="minor">
+            <a:schemeClr val="lt1"/>
+          </a:fontRef>
+        </p:style>
+        <p:txBody>
+          <a:bodyPr anchor="ctr"/>
+          <a:p>
+            <a:pPr algn="ctr">
+              <a:defRPr/>
+            </a:pPr>
+            <a:r>
+              <a:rPr lang="en-US" altLang="ko-KR"/>
+              <a:t>power on;</a:t>
+            </a:r>
+            <a:endParaRPr lang="en-US" altLang="ko-KR"/>
+          </a:p>
+        </p:txBody>
+      </p:sp>
+      <p:sp>
+        <p:nvSpPr>
+          <p:cNvPr id="15" name=""/>
+          <p:cNvSpPr txBox="1"/>
+          <p:nvPr/>
+        </p:nvSpPr>
+        <p:spPr>
+          <a:xfrm>
+            <a:off x="9740190" y="2023807"/>
+            <a:ext cx="1503380" cy="450788"/>
+          </a:xfrm>
+          <a:prstGeom prst="rect">
+            <a:avLst/>
+          </a:prstGeom>
+        </p:spPr>
+        <p:txBody>
+          <a:bodyPr wrap="square">
+            <a:spAutoFit/>
+          </a:bodyPr>
+          <a:p>
+            <a:pPr algn="ctr">
+              <a:defRPr/>
+            </a:pPr>
+            <a:r>
+              <a:rPr lang="en-US" altLang="ko-KR" sz="2400" b="1"/>
+              <a:t>OFF</a:t>
+            </a:r>
+            <a:endParaRPr lang="en-US" altLang="ko-KR" sz="2400" b="1"/>
+          </a:p>
+        </p:txBody>
+      </p:sp>
+      <p:sp>
+        <p:nvSpPr>
+          <p:cNvPr id="16" name=""/>
+          <p:cNvSpPr/>
+          <p:nvPr/>
+        </p:nvSpPr>
+        <p:spPr>
+          <a:xfrm>
+            <a:off x="9469026" y="3975382"/>
+            <a:ext cx="2045709" cy="545318"/>
+          </a:xfrm>
+          <a:prstGeom prst="roundRect">
+            <a:avLst>
+              <a:gd name="adj" fmla="val 16667"/>
+            </a:avLst>
+          </a:prstGeom>
+        </p:spPr>
+        <p:style>
+          <a:lnRef idx="2">
+            <a:schemeClr val="accent1">
+              <a:shade val="20000"/>
+            </a:schemeClr>
+          </a:lnRef>
+          <a:fillRef idx="1">
+            <a:schemeClr val="accent1"/>
+          </a:fillRef>
+          <a:effectRef idx="0">
+            <a:schemeClr val="accent1"/>
+          </a:effectRef>
+          <a:fontRef idx="minor">
+            <a:schemeClr val="lt1"/>
+          </a:fontRef>
+        </p:style>
+        <p:txBody>
+          <a:bodyPr anchor="ctr"/>
+          <a:p>
+            <a:pPr algn="ctr">
+              <a:defRPr/>
+            </a:pPr>
+            <a:r>
+              <a:rPr lang="en-US" altLang="ko-KR"/>
+              <a:t>power saving;</a:t>
+            </a:r>
+            <a:endParaRPr lang="en-US" altLang="ko-KR"/>
+          </a:p>
+        </p:txBody>
+      </p:sp>
+      <p:sp>
+        <p:nvSpPr>
+          <p:cNvPr id="17" name=""/>
+          <p:cNvSpPr txBox="1"/>
+          <p:nvPr/>
+        </p:nvSpPr>
+        <p:spPr>
+          <a:xfrm>
+            <a:off x="9740190" y="3530525"/>
+            <a:ext cx="1503380" cy="450788"/>
+          </a:xfrm>
+          <a:prstGeom prst="rect">
+            <a:avLst/>
+          </a:prstGeom>
+        </p:spPr>
+        <p:txBody>
+          <a:bodyPr wrap="square">
+            <a:spAutoFit/>
+          </a:bodyPr>
+          <a:p>
+            <a:pPr algn="ctr">
+              <a:defRPr/>
+            </a:pPr>
+            <a:r>
+              <a:rPr lang="en-US" altLang="ko-KR" sz="2400" b="1"/>
+              <a:t>SAVING</a:t>
+            </a:r>
+            <a:endParaRPr lang="en-US" altLang="ko-KR" sz="2400" b="1"/>
+          </a:p>
+        </p:txBody>
+      </p:sp>
+      <p:cxnSp>
+        <p:nvCxnSpPr>
+          <p:cNvPr id="18" name=""/>
+          <p:cNvCxnSpPr>
+            <a:stCxn id="7" idx="3"/>
+            <a:endCxn id="10" idx="1"/>
+          </p:cNvCxnSpPr>
+          <p:nvPr/>
+        </p:nvCxnSpPr>
+        <p:spPr>
+          <a:xfrm flipV="1">
+            <a:off x="7892244" y="1376073"/>
+            <a:ext cx="1576782" cy="1365249"/>
+          </a:xfrm>
+          <a:prstGeom prst="straightConnector1">
+            <a:avLst/>
+          </a:prstGeom>
+          <a:ln w="38100">
+            <a:solidFill>
+              <a:schemeClr val="accent1">
+                <a:satMod val="105000"/>
+              </a:schemeClr>
+            </a:solidFill>
+            <a:tailEnd type="arrow"/>
+          </a:ln>
+        </p:spPr>
+        <p:style>
+          <a:lnRef idx="1">
+            <a:schemeClr val="accent1"/>
+          </a:lnRef>
+          <a:fillRef idx="0">
+            <a:schemeClr val="accent1"/>
+          </a:fillRef>
+          <a:effectRef idx="0">
+            <a:schemeClr val="accent1"/>
+          </a:effectRef>
+          <a:fontRef idx="minor">
+            <a:schemeClr val="tx1"/>
+          </a:fontRef>
+        </p:style>
+      </p:cxnSp>
+      <p:cxnSp>
+        <p:nvCxnSpPr>
+          <p:cNvPr id="19" name=""/>
+          <p:cNvCxnSpPr>
+            <a:stCxn id="7" idx="3"/>
+            <a:endCxn id="16" idx="1"/>
+          </p:cNvCxnSpPr>
+          <p:nvPr/>
+        </p:nvCxnSpPr>
+        <p:spPr>
+          <a:xfrm>
+            <a:off x="7892242" y="2741324"/>
+            <a:ext cx="1576784" cy="1506718"/>
+          </a:xfrm>
+          <a:prstGeom prst="straightConnector1">
+            <a:avLst/>
+          </a:prstGeom>
+          <a:ln w="38100">
+            <a:solidFill>
+              <a:schemeClr val="accent1">
+                <a:satMod val="105000"/>
+              </a:schemeClr>
+            </a:solidFill>
+            <a:tailEnd type="arrow"/>
+          </a:ln>
+        </p:spPr>
+        <p:style>
+          <a:lnRef idx="1">
+            <a:schemeClr val="accent1"/>
+          </a:lnRef>
+          <a:fillRef idx="0">
+            <a:schemeClr val="accent1"/>
+          </a:fillRef>
+          <a:effectRef idx="0">
+            <a:schemeClr val="accent1"/>
+          </a:effectRef>
+          <a:fontRef idx="minor">
+            <a:schemeClr val="tx1"/>
+          </a:fontRef>
+        </p:style>
+      </p:cxnSp>
+      <p:cxnSp>
+        <p:nvCxnSpPr>
+          <p:cNvPr id="20" name=""/>
+          <p:cNvCxnSpPr>
+            <a:stCxn id="7" idx="3"/>
+            <a:endCxn id="14" idx="1"/>
+          </p:cNvCxnSpPr>
+          <p:nvPr/>
+        </p:nvCxnSpPr>
+        <p:spPr>
+          <a:xfrm flipV="1">
+            <a:off x="7892246" y="2741324"/>
+            <a:ext cx="1576780" cy="0"/>
+          </a:xfrm>
+          <a:prstGeom prst="straightConnector1">
+            <a:avLst/>
+          </a:prstGeom>
+          <a:ln w="38100">
+            <a:solidFill>
+              <a:schemeClr val="accent1">
+                <a:satMod val="105000"/>
+              </a:schemeClr>
+            </a:solidFill>
+            <a:tailEnd type="arrow"/>
+          </a:ln>
+        </p:spPr>
+        <p:style>
+          <a:lnRef idx="1">
+            <a:schemeClr val="accent1"/>
+          </a:lnRef>
+          <a:fillRef idx="0">
+            <a:schemeClr val="accent1"/>
+          </a:fillRef>
+          <a:effectRef idx="0">
+            <a:schemeClr val="accent1"/>
+          </a:effectRef>
+          <a:fontRef idx="minor">
+            <a:schemeClr val="tx1"/>
+          </a:fontRef>
+        </p:style>
+      </p:cxnSp>
+      <p:cxnSp>
+        <p:nvCxnSpPr>
+          <p:cNvPr id="21" name=""/>
+          <p:cNvCxnSpPr/>
+          <p:nvPr/>
+        </p:nvCxnSpPr>
+        <p:spPr>
+          <a:xfrm rot="16200000" flipH="1">
+            <a:off x="2109271" y="3180825"/>
+            <a:ext cx="5044536" cy="0"/>
+          </a:xfrm>
+          <a:prstGeom prst="line">
+            <a:avLst/>
+          </a:prstGeom>
+        </p:spPr>
+        <p:style>
+          <a:lnRef idx="1">
+            <a:schemeClr val="accent1"/>
+          </a:lnRef>
+          <a:fillRef idx="0">
+            <a:schemeClr val="accent1"/>
+          </a:fillRef>
+          <a:effectRef idx="0">
+            <a:schemeClr val="accent1"/>
+          </a:effectRef>
+          <a:fontRef idx="minor">
+            <a:schemeClr val="tx1"/>
+          </a:fontRef>
+        </p:style>
+      </p:cxnSp>
     </p:spTree>
   </p:cSld>
   <p:clrMapOvr>

</xml_diff>

<commit_message>
add image "Command Pattern"
</commit_message>
<xml_diff>
--- a/etc/images.pptx
+++ b/etc/images.pptx
@@ -2,7 +2,7 @@
 <file path=ppt/presentation.xml><?xml version="1.0" encoding="utf-8"?>
 <p:presentation xmlns:r="http://schemas.openxmlformats.org/officeDocument/2006/relationships" xmlns:c="http://schemas.openxmlformats.org/drawingml/2006/chart" xmlns:a="http://schemas.openxmlformats.org/drawingml/2006/main" xmlns:dgm="http://schemas.openxmlformats.org/drawingml/2006/diagram" xmlns:dsp="http://schemas.microsoft.com/office/drawing/2008/diagram" xmlns:p="http://schemas.openxmlformats.org/presentationml/2006/main">
   <p:sldMasterIdLst>
-    <p:sldMasterId id="2147483721" r:id="rId1"/>
+    <p:sldMasterId id="2147483720" r:id="rId1"/>
   </p:sldMasterIdLst>
   <p:notesMasterIdLst>
     <p:notesMasterId r:id="rId2"/>
@@ -14,6 +14,7 @@
     <p:sldId id="259" r:id="rId6"/>
     <p:sldId id="260" r:id="rId7"/>
     <p:sldId id="261" r:id="rId8"/>
+    <p:sldId id="262" r:id="rId9"/>
   </p:sldIdLst>
   <p:sldSz cx="12192000" cy="6858000"/>
   <p:notesSz cx="6858000" cy="9144000"/>
@@ -210,7 +211,7 @@
               <a:pPr lvl="0">
                 <a:defRPr/>
               </a:pPr>
-              <a:t>2019-07-31</a:t>
+              <a:t>2019-08-02</a:t>
             </a:fld>
             <a:endParaRPr lang="ko-KR" altLang="en-US"/>
           </a:p>
@@ -768,10 +769,10 @@
               <a:defRPr/>
             </a:pPr>
             <a:r>
-              <a:rPr lang="en-US" altLang="ko-KR"/>
+              <a:rPr lang="ko-KR" altLang="en-US"/>
               <a:t/>
             </a:r>
-            <a:endParaRPr lang="en-US" altLang="ko-KR"/>
+            <a:endParaRPr lang="ko-KR" altLang="en-US"/>
           </a:p>
         </p:txBody>
       </p:sp>
@@ -8129,6 +8130,420 @@
           </a:fontRef>
         </p:style>
       </p:cxnSp>
+    </p:spTree>
+  </p:cSld>
+  <p:clrMapOvr>
+    <a:masterClrMapping/>
+  </p:clrMapOvr>
+  <mc:AlternateContent xmlns:mc="http://schemas.openxmlformats.org/markup-compatibility/2006">
+    <mc:Choice xmlns:p14="http://schemas.microsoft.com/office/powerpoint/2010/main" Requires="p14">
+      <p:transition xmlns:mc="http://schemas.openxmlformats.org/markup-compatibility/2006" xmlns:p14="http://schemas.microsoft.com/office/powerpoint/2010/main" mc:Ignorable="p14" p14:dur="500"/>
+    </mc:Choice>
+    <mc:Fallback>
+      <p:transition/>
+    </mc:Fallback>
+  </mc:AlternateContent>
+</p:sld>
+</file>
+
+<file path=ppt/slides/slide7.xml><?xml version="1.0" encoding="utf-8"?>
+<p:sld xmlns:r="http://schemas.openxmlformats.org/officeDocument/2006/relationships" xmlns:c="http://schemas.openxmlformats.org/drawingml/2006/chart" xmlns:a="http://schemas.openxmlformats.org/drawingml/2006/main" xmlns:dgm="http://schemas.openxmlformats.org/drawingml/2006/diagram" xmlns:dsp="http://schemas.microsoft.com/office/drawing/2008/diagram" xmlns:p="http://schemas.openxmlformats.org/presentationml/2006/main">
+  <p:cSld>
+    <p:spTree>
+      <p:nvGrpSpPr>
+        <p:cNvPr id="1" name=""/>
+        <p:cNvGrpSpPr/>
+        <p:nvPr/>
+      </p:nvGrpSpPr>
+      <p:grpSpPr>
+        <a:xfrm>
+          <a:off x="0" y="0"/>
+          <a:ext cx="0" cy="0"/>
+          <a:chOff x="0" y="0"/>
+          <a:chExt cx="0" cy="0"/>
+        </a:xfrm>
+      </p:grpSpPr>
+      <p:sp>
+        <p:nvSpPr>
+          <p:cNvPr id="4" name=""/>
+          <p:cNvSpPr/>
+          <p:nvPr/>
+        </p:nvSpPr>
+        <p:spPr>
+          <a:xfrm>
+            <a:off x="1795524" y="1560195"/>
+            <a:ext cx="1970561" cy="1416998"/>
+          </a:xfrm>
+          <a:prstGeom prst="roundRect">
+            <a:avLst>
+              <a:gd name="adj" fmla="val 16667"/>
+            </a:avLst>
+          </a:prstGeom>
+        </p:spPr>
+        <p:style>
+          <a:lnRef idx="2">
+            <a:schemeClr val="accent1">
+              <a:shade val="20000"/>
+            </a:schemeClr>
+          </a:lnRef>
+          <a:fillRef idx="1">
+            <a:schemeClr val="accent1"/>
+          </a:fillRef>
+          <a:effectRef idx="0">
+            <a:schemeClr val="accent1"/>
+          </a:effectRef>
+          <a:fontRef idx="minor">
+            <a:schemeClr val="lt1"/>
+          </a:fontRef>
+        </p:style>
+        <p:txBody>
+          <a:bodyPr anchor="ctr"/>
+          <a:p>
+            <a:pPr algn="ctr">
+              <a:defRPr/>
+            </a:pPr>
+            <a:r>
+              <a:rPr lang="en-US" altLang="ko-KR" sz="2000"/>
+              <a:t>setCommand()</a:t>
+            </a:r>
+            <a:endParaRPr lang="en-US" altLang="ko-KR" sz="2000"/>
+          </a:p>
+          <a:p>
+            <a:pPr algn="ctr">
+              <a:defRPr/>
+            </a:pPr>
+            <a:r>
+              <a:rPr lang="en-US" altLang="ko-KR" sz="2000"/>
+              <a:t>talk()</a:t>
+            </a:r>
+            <a:endParaRPr lang="en-US" altLang="ko-KR" sz="2000"/>
+          </a:p>
+        </p:txBody>
+      </p:sp>
+      <p:sp>
+        <p:nvSpPr>
+          <p:cNvPr id="6" name=""/>
+          <p:cNvSpPr txBox="1"/>
+          <p:nvPr/>
+        </p:nvSpPr>
+        <p:spPr>
+          <a:xfrm>
+            <a:off x="2029114" y="1110068"/>
+            <a:ext cx="1503379" cy="450127"/>
+          </a:xfrm>
+          <a:prstGeom prst="rect">
+            <a:avLst/>
+          </a:prstGeom>
+        </p:spPr>
+        <p:txBody>
+          <a:bodyPr wrap="square">
+            <a:spAutoFit/>
+          </a:bodyPr>
+          <a:p>
+            <a:pPr marL="0" indent="0" algn="ctr" defTabSz="914400" rtl="0" eaLnBrk="1" latinLnBrk="1" hangingPunct="1">
+              <a:lnSpc>
+                <a:spcPct val="100000"/>
+              </a:lnSpc>
+              <a:spcBef>
+                <a:spcPct val="0"/>
+              </a:spcBef>
+              <a:spcAft>
+                <a:spcPts val="0"/>
+              </a:spcAft>
+              <a:buNone/>
+              <a:defRPr/>
+            </a:pPr>
+            <a:r>
+              <a:rPr xmlns:mc="http://schemas.openxmlformats.org/markup-compatibility/2006" xmlns:hp="http://schemas.haansoft.com/office/presentation/8.0" kumimoji="0" lang="en-US" altLang="ko-KR" sz="2400" b="1" i="0" u="none" strike="noStrike" kern="1200" cap="none" spc="0" normalizeH="0" baseline="0" mc:Ignorable="hp" hp:hslEmbossed="0">
+                <a:solidFill>
+                  <a:srgbClr val="000000"/>
+                </a:solidFill>
+                <a:latin typeface="Calibri"/>
+                <a:ea typeface="맑은 고딕"/>
+                <a:cs typeface="Times New Roman"/>
+              </a:rPr>
+              <a:t>OKGoogle</a:t>
+            </a:r>
+            <a:endParaRPr xmlns:mc="http://schemas.openxmlformats.org/markup-compatibility/2006" xmlns:hp="http://schemas.haansoft.com/office/presentation/8.0" kumimoji="0" lang="en-US" altLang="ko-KR" sz="2400" b="1" i="0" u="none" strike="noStrike" kern="1200" cap="none" spc="0" normalizeH="0" baseline="0" mc:Ignorable="hp" hp:hslEmbossed="0">
+              <a:solidFill>
+                <a:srgbClr val="000000"/>
+              </a:solidFill>
+              <a:latin typeface="Calibri"/>
+              <a:ea typeface="맑은 고딕"/>
+              <a:cs typeface="Times New Roman"/>
+            </a:endParaRPr>
+          </a:p>
+        </p:txBody>
+      </p:sp>
+      <p:sp>
+        <p:nvSpPr>
+          <p:cNvPr id="9" name=""/>
+          <p:cNvSpPr/>
+          <p:nvPr/>
+        </p:nvSpPr>
+        <p:spPr>
+          <a:xfrm>
+            <a:off x="6498491" y="1560196"/>
+            <a:ext cx="1970561" cy="1416998"/>
+          </a:xfrm>
+          <a:prstGeom prst="roundRect">
+            <a:avLst>
+              <a:gd name="adj" fmla="val 16667"/>
+            </a:avLst>
+          </a:prstGeom>
+        </p:spPr>
+        <p:style>
+          <a:lnRef idx="2">
+            <a:schemeClr val="accent1">
+              <a:shade val="20000"/>
+            </a:schemeClr>
+          </a:lnRef>
+          <a:fillRef idx="1">
+            <a:schemeClr val="accent1"/>
+          </a:fillRef>
+          <a:effectRef idx="0">
+            <a:schemeClr val="accent1"/>
+          </a:effectRef>
+          <a:fontRef idx="minor">
+            <a:schemeClr val="lt1"/>
+          </a:fontRef>
+        </p:style>
+        <p:txBody>
+          <a:bodyPr anchor="ctr"/>
+          <a:p>
+            <a:pPr algn="ctr">
+              <a:defRPr/>
+            </a:pPr>
+            <a:r>
+              <a:rPr lang="en-US" altLang="ko-KR" sz="2000"/>
+              <a:t>run()</a:t>
+            </a:r>
+            <a:endParaRPr lang="en-US" altLang="ko-KR" sz="2000"/>
+          </a:p>
+        </p:txBody>
+      </p:sp>
+      <p:sp>
+        <p:nvSpPr>
+          <p:cNvPr id="10" name=""/>
+          <p:cNvSpPr txBox="1"/>
+          <p:nvPr/>
+        </p:nvSpPr>
+        <p:spPr>
+          <a:xfrm>
+            <a:off x="6732081" y="714709"/>
+            <a:ext cx="1503381" cy="452509"/>
+          </a:xfrm>
+          <a:prstGeom prst="rect">
+            <a:avLst/>
+          </a:prstGeom>
+        </p:spPr>
+        <p:txBody>
+          <a:bodyPr wrap="square">
+            <a:spAutoFit/>
+          </a:bodyPr>
+          <a:p>
+            <a:pPr marL="0" indent="0" algn="ctr" defTabSz="914400" rtl="0" eaLnBrk="1" latinLnBrk="1" hangingPunct="1">
+              <a:lnSpc>
+                <a:spcPct val="100000"/>
+              </a:lnSpc>
+              <a:spcBef>
+                <a:spcPct val="0"/>
+              </a:spcBef>
+              <a:spcAft>
+                <a:spcPts val="0"/>
+              </a:spcAft>
+              <a:buNone/>
+              <a:defRPr/>
+            </a:pPr>
+            <a:r>
+              <a:rPr xmlns:mc="http://schemas.openxmlformats.org/markup-compatibility/2006" xmlns:hp="http://schemas.haansoft.com/office/presentation/8.0" kumimoji="0" lang="en-US" altLang="ko-KR" sz="2400" b="1" i="0" u="none" strike="noStrike" kern="1200" cap="none" spc="0" normalizeH="0" baseline="0" mc:Ignorable="hp" hp:hslEmbossed="0">
+                <a:solidFill>
+                  <a:srgbClr val="000000"/>
+                </a:solidFill>
+                <a:latin typeface="Calibri"/>
+                <a:ea typeface="맑은 고딕"/>
+                <a:cs typeface="Times New Roman"/>
+              </a:rPr>
+              <a:t>Command</a:t>
+            </a:r>
+            <a:endParaRPr xmlns:mc="http://schemas.openxmlformats.org/markup-compatibility/2006" xmlns:hp="http://schemas.haansoft.com/office/presentation/8.0" kumimoji="0" lang="en-US" altLang="ko-KR" sz="2400" b="1" i="0" u="none" strike="noStrike" kern="1200" cap="none" spc="0" normalizeH="0" baseline="0" mc:Ignorable="hp" hp:hslEmbossed="0">
+              <a:solidFill>
+                <a:srgbClr val="000000"/>
+              </a:solidFill>
+              <a:latin typeface="Calibri"/>
+              <a:ea typeface="맑은 고딕"/>
+              <a:cs typeface="Times New Roman"/>
+            </a:endParaRPr>
+          </a:p>
+        </p:txBody>
+      </p:sp>
+      <p:sp>
+        <p:nvSpPr>
+          <p:cNvPr id="11" name=""/>
+          <p:cNvSpPr txBox="1"/>
+          <p:nvPr/>
+        </p:nvSpPr>
+        <p:spPr>
+          <a:xfrm>
+            <a:off x="6537046" y="1167218"/>
+            <a:ext cx="1932007" cy="392977"/>
+          </a:xfrm>
+          <a:prstGeom prst="rect">
+            <a:avLst/>
+          </a:prstGeom>
+        </p:spPr>
+        <p:txBody>
+          <a:bodyPr wrap="square">
+            <a:spAutoFit/>
+          </a:bodyPr>
+          <a:p>
+            <a:pPr marL="0" indent="0" algn="ctr" defTabSz="914400" rtl="0" eaLnBrk="1" latinLnBrk="1" hangingPunct="1">
+              <a:lnSpc>
+                <a:spcPct val="100000"/>
+              </a:lnSpc>
+              <a:spcBef>
+                <a:spcPct val="0"/>
+              </a:spcBef>
+              <a:spcAft>
+                <a:spcPts val="0"/>
+              </a:spcAft>
+              <a:buNone/>
+              <a:defRPr/>
+            </a:pPr>
+            <a:r>
+              <a:rPr xmlns:mc="http://schemas.openxmlformats.org/markup-compatibility/2006" xmlns:hp="http://schemas.haansoft.com/office/presentation/8.0" kumimoji="0" lang="en-US" altLang="ko-KR" sz="2000" b="0" i="0" u="none" strike="noStrike" kern="1200" cap="none" spc="0" normalizeH="0" baseline="0" mc:Ignorable="hp" hp:hslEmbossed="0">
+                <a:solidFill>
+                  <a:srgbClr val="000000"/>
+                </a:solidFill>
+                <a:latin typeface="Calibri"/>
+                <a:ea typeface="맑은 고딕"/>
+                <a:cs typeface="Times New Roman"/>
+              </a:rPr>
+              <a:t>(Encapsulation)</a:t>
+            </a:r>
+            <a:endParaRPr xmlns:mc="http://schemas.openxmlformats.org/markup-compatibility/2006" xmlns:hp="http://schemas.haansoft.com/office/presentation/8.0" kumimoji="0" lang="en-US" altLang="ko-KR" sz="2000" b="0" i="0" u="none" strike="noStrike" kern="1200" cap="none" spc="0" normalizeH="0" baseline="0" mc:Ignorable="hp" hp:hslEmbossed="0">
+              <a:solidFill>
+                <a:srgbClr val="000000"/>
+              </a:solidFill>
+              <a:latin typeface="Calibri"/>
+              <a:ea typeface="맑은 고딕"/>
+              <a:cs typeface="Times New Roman"/>
+            </a:endParaRPr>
+          </a:p>
+        </p:txBody>
+      </p:sp>
+      <p:sp>
+        <p:nvSpPr>
+          <p:cNvPr id="12" name=""/>
+          <p:cNvSpPr/>
+          <p:nvPr/>
+        </p:nvSpPr>
+        <p:spPr>
+          <a:xfrm>
+            <a:off x="5110719" y="4393882"/>
+            <a:ext cx="1970561" cy="1416998"/>
+          </a:xfrm>
+          <a:prstGeom prst="roundRect">
+            <a:avLst>
+              <a:gd name="adj" fmla="val 16667"/>
+            </a:avLst>
+          </a:prstGeom>
+        </p:spPr>
+        <p:style>
+          <a:lnRef idx="2">
+            <a:schemeClr val="accent1">
+              <a:shade val="20000"/>
+            </a:schemeClr>
+          </a:lnRef>
+          <a:fillRef idx="1">
+            <a:schemeClr val="accent1"/>
+          </a:fillRef>
+          <a:effectRef idx="0">
+            <a:schemeClr val="accent1"/>
+          </a:effectRef>
+          <a:fontRef idx="minor">
+            <a:schemeClr val="lt1"/>
+          </a:fontRef>
+        </p:style>
+        <p:txBody>
+          <a:bodyPr anchor="ctr"/>
+          <a:p>
+            <a:pPr algn="ctr">
+              <a:defRPr/>
+            </a:pPr>
+            <a:r>
+              <a:rPr lang="en-US" altLang="ko-KR" sz="2000"/>
+              <a:t>setCommand()</a:t>
+            </a:r>
+            <a:endParaRPr lang="en-US" altLang="ko-KR" sz="2000"/>
+          </a:p>
+          <a:p>
+            <a:pPr algn="ctr">
+              <a:defRPr/>
+            </a:pPr>
+            <a:r>
+              <a:rPr lang="en-US" altLang="ko-KR" sz="2000"/>
+              <a:t>talk()</a:t>
+            </a:r>
+            <a:endParaRPr lang="en-US" altLang="ko-KR" sz="2000"/>
+          </a:p>
+        </p:txBody>
+      </p:sp>
+      <p:sp>
+        <p:nvSpPr>
+          <p:cNvPr id="13" name=""/>
+          <p:cNvSpPr txBox="1"/>
+          <p:nvPr/>
+        </p:nvSpPr>
+        <p:spPr>
+          <a:xfrm>
+            <a:off x="5344310" y="3943755"/>
+            <a:ext cx="1503379" cy="816840"/>
+          </a:xfrm>
+          <a:prstGeom prst="rect">
+            <a:avLst/>
+          </a:prstGeom>
+        </p:spPr>
+        <p:txBody>
+          <a:bodyPr wrap="square">
+            <a:spAutoFit/>
+          </a:bodyPr>
+          <a:p>
+            <a:pPr marL="0" indent="0" algn="ctr" defTabSz="914400" rtl="0" eaLnBrk="1" latinLnBrk="1" hangingPunct="1">
+              <a:lnSpc>
+                <a:spcPct val="100000"/>
+              </a:lnSpc>
+              <a:spcBef>
+                <a:spcPct val="0"/>
+              </a:spcBef>
+              <a:spcAft>
+                <a:spcPts val="0"/>
+              </a:spcAft>
+              <a:buNone/>
+              <a:defRPr/>
+            </a:pPr>
+            <a:r>
+              <a:rPr xmlns:mc="http://schemas.openxmlformats.org/markup-compatibility/2006" xmlns:hp="http://schemas.haansoft.com/office/presentation/8.0" kumimoji="0" lang="en-US" altLang="ko-KR" sz="2400" b="1" i="0" u="none" strike="noStrike" kern="1200" cap="none" spc="0" normalizeH="0" baseline="0" mc:Ignorable="hp" hp:hslEmbossed="0">
+                <a:solidFill>
+                  <a:srgbClr val="000000"/>
+                </a:solidFill>
+                <a:latin typeface="Calibri"/>
+                <a:ea typeface="맑은 고딕"/>
+                <a:cs typeface="Times New Roman"/>
+              </a:rPr>
+              <a:t>HeaterOnCommand</a:t>
+            </a:r>
+            <a:endParaRPr xmlns:mc="http://schemas.openxmlformats.org/markup-compatibility/2006" xmlns:hp="http://schemas.haansoft.com/office/presentation/8.0" kumimoji="0" lang="en-US" altLang="ko-KR" sz="2400" b="1" i="0" u="none" strike="noStrike" kern="1200" cap="none" spc="0" normalizeH="0" baseline="0" mc:Ignorable="hp" hp:hslEmbossed="0">
+              <a:solidFill>
+                <a:srgbClr val="000000"/>
+              </a:solidFill>
+              <a:latin typeface="Calibri"/>
+              <a:ea typeface="맑은 고딕"/>
+              <a:cs typeface="Times New Roman"/>
+            </a:endParaRPr>
+          </a:p>
+        </p:txBody>
+      </p:sp>
     </p:spTree>
   </p:cSld>
   <p:clrMapOvr>

</xml_diff>

<commit_message>
add image ...ing "architecture" add posts ...ing "difference jdbc jpa mybatis"
</commit_message>
<xml_diff>
--- a/etc/images.pptx
+++ b/etc/images.pptx
@@ -2,7 +2,7 @@
 <file path=ppt/presentation.xml><?xml version="1.0" encoding="utf-8"?>
 <p:presentation xmlns:r="http://schemas.openxmlformats.org/officeDocument/2006/relationships" xmlns:c="http://schemas.openxmlformats.org/drawingml/2006/chart" xmlns:a="http://schemas.openxmlformats.org/drawingml/2006/main" xmlns:dgm="http://schemas.openxmlformats.org/drawingml/2006/diagram" xmlns:dsp="http://schemas.microsoft.com/office/drawing/2008/diagram" xmlns:p="http://schemas.openxmlformats.org/presentationml/2006/main">
   <p:sldMasterIdLst>
-    <p:sldMasterId id="2147483720" r:id="rId1"/>
+    <p:sldMasterId id="2147483726" r:id="rId1"/>
   </p:sldMasterIdLst>
   <p:notesMasterIdLst>
     <p:notesMasterId r:id="rId2"/>
@@ -15,6 +15,7 @@
     <p:sldId id="260" r:id="rId7"/>
     <p:sldId id="261" r:id="rId8"/>
     <p:sldId id="262" r:id="rId9"/>
+    <p:sldId id="263" r:id="rId10"/>
   </p:sldIdLst>
   <p:sldSz cx="12192000" cy="6858000"/>
   <p:notesSz cx="6858000" cy="9144000"/>
@@ -8199,7 +8200,7 @@
         <p:txBody>
           <a:bodyPr anchor="ctr"/>
           <a:p>
-            <a:pPr algn="ctr">
+            <a:pPr>
               <a:defRPr/>
             </a:pPr>
             <a:r>
@@ -8209,7 +8210,7 @@
             <a:endParaRPr lang="en-US" altLang="ko-KR" sz="2000"/>
           </a:p>
           <a:p>
-            <a:pPr algn="ctr">
+            <a:pPr>
               <a:defRPr/>
             </a:pPr>
             <a:r>
@@ -8311,7 +8312,7 @@
         <p:txBody>
           <a:bodyPr anchor="ctr"/>
           <a:p>
-            <a:pPr algn="ctr">
+            <a:pPr>
               <a:defRPr/>
             </a:pPr>
             <a:r>
@@ -8440,8 +8441,8 @@
         </p:nvSpPr>
         <p:spPr>
           <a:xfrm>
-            <a:off x="5110719" y="4393882"/>
-            <a:ext cx="1970561" cy="1416998"/>
+            <a:off x="4128881" y="4398644"/>
+            <a:ext cx="2603200" cy="1702748"/>
           </a:xfrm>
           <a:prstGeom prst="roundRect">
             <a:avLst>
@@ -8468,22 +8469,32 @@
         <p:txBody>
           <a:bodyPr anchor="ctr"/>
           <a:p>
-            <a:pPr algn="ctr">
+            <a:pPr>
               <a:defRPr/>
             </a:pPr>
             <a:r>
               <a:rPr lang="en-US" altLang="ko-KR" sz="2000"/>
-              <a:t>setCommand()</a:t>
+              <a:t>run() {</a:t>
             </a:r>
             <a:endParaRPr lang="en-US" altLang="ko-KR" sz="2000"/>
           </a:p>
           <a:p>
-            <a:pPr algn="ctr">
+            <a:pPr>
               <a:defRPr/>
             </a:pPr>
             <a:r>
               <a:rPr lang="en-US" altLang="ko-KR" sz="2000"/>
-              <a:t>talk()</a:t>
+              <a:t>  heater.powerOn()</a:t>
+            </a:r>
+            <a:endParaRPr lang="en-US" altLang="ko-KR" sz="2000"/>
+          </a:p>
+          <a:p>
+            <a:pPr>
+              <a:defRPr/>
+            </a:pPr>
+            <a:r>
+              <a:rPr lang="en-US" altLang="ko-KR" sz="2000"/>
+              <a:t>}</a:t>
             </a:r>
             <a:endParaRPr lang="en-US" altLang="ko-KR" sz="2000"/>
           </a:p>
@@ -8497,8 +8508,8 @@
         </p:nvSpPr>
         <p:spPr>
           <a:xfrm>
-            <a:off x="5344310" y="3943755"/>
-            <a:ext cx="1503379" cy="816840"/>
+            <a:off x="3984905" y="3948516"/>
+            <a:ext cx="2891152" cy="450129"/>
           </a:xfrm>
           <a:prstGeom prst="rect">
             <a:avLst/>
@@ -8534,6 +8545,1471 @@
               <a:t>HeaterOnCommand</a:t>
             </a:r>
             <a:endParaRPr xmlns:mc="http://schemas.openxmlformats.org/markup-compatibility/2006" xmlns:hp="http://schemas.haansoft.com/office/presentation/8.0" kumimoji="0" lang="en-US" altLang="ko-KR" sz="2400" b="1" i="0" u="none" strike="noStrike" kern="1200" cap="none" spc="0" normalizeH="0" baseline="0" mc:Ignorable="hp" hp:hslEmbossed="0">
+              <a:solidFill>
+                <a:srgbClr val="000000"/>
+              </a:solidFill>
+              <a:latin typeface="Calibri"/>
+              <a:ea typeface="맑은 고딕"/>
+              <a:cs typeface="Times New Roman"/>
+            </a:endParaRPr>
+          </a:p>
+        </p:txBody>
+      </p:sp>
+      <p:sp>
+        <p:nvSpPr>
+          <p:cNvPr id="16" name=""/>
+          <p:cNvSpPr/>
+          <p:nvPr/>
+        </p:nvSpPr>
+        <p:spPr>
+          <a:xfrm>
+            <a:off x="8235462" y="4398644"/>
+            <a:ext cx="2603200" cy="1702748"/>
+          </a:xfrm>
+          <a:prstGeom prst="roundRect">
+            <a:avLst>
+              <a:gd name="adj" fmla="val 16667"/>
+            </a:avLst>
+          </a:prstGeom>
+        </p:spPr>
+        <p:style>
+          <a:lnRef idx="2">
+            <a:schemeClr val="accent1">
+              <a:shade val="20000"/>
+            </a:schemeClr>
+          </a:lnRef>
+          <a:fillRef idx="1">
+            <a:schemeClr val="accent1"/>
+          </a:fillRef>
+          <a:effectRef idx="0">
+            <a:schemeClr val="accent1"/>
+          </a:effectRef>
+          <a:fontRef idx="minor">
+            <a:schemeClr val="lt1"/>
+          </a:fontRef>
+        </p:style>
+        <p:txBody>
+          <a:bodyPr anchor="ctr"/>
+          <a:p>
+            <a:pPr>
+              <a:defRPr/>
+            </a:pPr>
+            <a:r>
+              <a:rPr lang="en-US" altLang="ko-KR" sz="2000"/>
+              <a:t>run() {</a:t>
+            </a:r>
+            <a:endParaRPr lang="en-US" altLang="ko-KR" sz="2000"/>
+          </a:p>
+          <a:p>
+            <a:pPr>
+              <a:defRPr/>
+            </a:pPr>
+            <a:r>
+              <a:rPr lang="en-US" altLang="ko-KR" sz="2000"/>
+              <a:t>  lamp.turnOn()</a:t>
+            </a:r>
+            <a:endParaRPr lang="en-US" altLang="ko-KR" sz="2000"/>
+          </a:p>
+          <a:p>
+            <a:pPr>
+              <a:defRPr/>
+            </a:pPr>
+            <a:r>
+              <a:rPr lang="en-US" altLang="ko-KR" sz="2000"/>
+              <a:t>}</a:t>
+            </a:r>
+            <a:endParaRPr lang="en-US" altLang="ko-KR" sz="2000"/>
+          </a:p>
+        </p:txBody>
+      </p:sp>
+      <p:sp>
+        <p:nvSpPr>
+          <p:cNvPr id="17" name=""/>
+          <p:cNvSpPr txBox="1"/>
+          <p:nvPr/>
+        </p:nvSpPr>
+        <p:spPr>
+          <a:xfrm>
+            <a:off x="8091486" y="3948516"/>
+            <a:ext cx="2891152" cy="450129"/>
+          </a:xfrm>
+          <a:prstGeom prst="rect">
+            <a:avLst/>
+          </a:prstGeom>
+        </p:spPr>
+        <p:txBody>
+          <a:bodyPr wrap="square">
+            <a:spAutoFit/>
+          </a:bodyPr>
+          <a:p>
+            <a:pPr marL="0" indent="0" algn="ctr" defTabSz="914400" rtl="0" eaLnBrk="1" latinLnBrk="1" hangingPunct="1">
+              <a:lnSpc>
+                <a:spcPct val="100000"/>
+              </a:lnSpc>
+              <a:spcBef>
+                <a:spcPct val="0"/>
+              </a:spcBef>
+              <a:spcAft>
+                <a:spcPts val="0"/>
+              </a:spcAft>
+              <a:buNone/>
+              <a:defRPr/>
+            </a:pPr>
+            <a:r>
+              <a:rPr xmlns:mc="http://schemas.openxmlformats.org/markup-compatibility/2006" xmlns:hp="http://schemas.haansoft.com/office/presentation/8.0" kumimoji="0" lang="en-US" altLang="ko-KR" sz="2400" b="1" i="0" u="none" strike="noStrike" kern="1200" cap="none" spc="0" normalizeH="0" baseline="0" mc:Ignorable="hp" hp:hslEmbossed="0">
+                <a:solidFill>
+                  <a:srgbClr val="000000"/>
+                </a:solidFill>
+                <a:latin typeface="Calibri"/>
+                <a:ea typeface="맑은 고딕"/>
+                <a:cs typeface="Times New Roman"/>
+              </a:rPr>
+              <a:t>LampOnCommand</a:t>
+            </a:r>
+            <a:endParaRPr xmlns:mc="http://schemas.openxmlformats.org/markup-compatibility/2006" xmlns:hp="http://schemas.haansoft.com/office/presentation/8.0" kumimoji="0" lang="en-US" altLang="ko-KR" sz="2400" b="1" i="0" u="none" strike="noStrike" kern="1200" cap="none" spc="0" normalizeH="0" baseline="0" mc:Ignorable="hp" hp:hslEmbossed="0">
+              <a:solidFill>
+                <a:srgbClr val="000000"/>
+              </a:solidFill>
+              <a:latin typeface="Calibri"/>
+              <a:ea typeface="맑은 고딕"/>
+              <a:cs typeface="Times New Roman"/>
+            </a:endParaRPr>
+          </a:p>
+        </p:txBody>
+      </p:sp>
+      <p:cxnSp>
+        <p:nvCxnSpPr>
+          <p:cNvPr id="18" name=""/>
+          <p:cNvCxnSpPr/>
+          <p:nvPr/>
+        </p:nvCxnSpPr>
+        <p:spPr>
+          <a:xfrm>
+            <a:off x="3984904" y="2268694"/>
+            <a:ext cx="2362191" cy="0"/>
+          </a:xfrm>
+          <a:prstGeom prst="straightConnector1">
+            <a:avLst/>
+          </a:prstGeom>
+          <a:ln w="38100">
+            <a:solidFill>
+              <a:schemeClr val="accent1">
+                <a:satMod val="105000"/>
+              </a:schemeClr>
+            </a:solidFill>
+            <a:tailEnd type="arrow"/>
+          </a:ln>
+        </p:spPr>
+        <p:style>
+          <a:lnRef idx="1">
+            <a:schemeClr val="accent1"/>
+          </a:lnRef>
+          <a:fillRef idx="0">
+            <a:schemeClr val="accent1"/>
+          </a:fillRef>
+          <a:effectRef idx="0">
+            <a:schemeClr val="accent1"/>
+          </a:effectRef>
+          <a:fontRef idx="minor">
+            <a:schemeClr val="tx1"/>
+          </a:fontRef>
+        </p:style>
+      </p:cxnSp>
+      <p:cxnSp>
+        <p:nvCxnSpPr>
+          <p:cNvPr id="19" name=""/>
+          <p:cNvCxnSpPr>
+            <a:stCxn id="13" idx="0"/>
+          </p:cNvCxnSpPr>
+          <p:nvPr/>
+        </p:nvCxnSpPr>
+        <p:spPr>
+          <a:xfrm flipV="1">
+            <a:off x="5430481" y="3125391"/>
+            <a:ext cx="1832331" cy="823125"/>
+          </a:xfrm>
+          <a:prstGeom prst="straightConnector1">
+            <a:avLst/>
+          </a:prstGeom>
+          <a:ln w="38100">
+            <a:solidFill>
+              <a:schemeClr val="accent1">
+                <a:satMod val="105000"/>
+              </a:schemeClr>
+            </a:solidFill>
+            <a:tailEnd type="arrow"/>
+          </a:ln>
+        </p:spPr>
+        <p:style>
+          <a:lnRef idx="1">
+            <a:schemeClr val="accent1"/>
+          </a:lnRef>
+          <a:fillRef idx="0">
+            <a:schemeClr val="accent1"/>
+          </a:fillRef>
+          <a:effectRef idx="0">
+            <a:schemeClr val="accent1"/>
+          </a:effectRef>
+          <a:fontRef idx="minor">
+            <a:schemeClr val="tx1"/>
+          </a:fontRef>
+        </p:style>
+      </p:cxnSp>
+      <p:cxnSp>
+        <p:nvCxnSpPr>
+          <p:cNvPr id="20" name=""/>
+          <p:cNvCxnSpPr>
+            <a:stCxn id="17" idx="0"/>
+          </p:cNvCxnSpPr>
+          <p:nvPr/>
+        </p:nvCxnSpPr>
+        <p:spPr>
+          <a:xfrm rot="10800000">
+            <a:off x="7917655" y="3125391"/>
+            <a:ext cx="1619405" cy="823127"/>
+          </a:xfrm>
+          <a:prstGeom prst="straightConnector1">
+            <a:avLst/>
+          </a:prstGeom>
+          <a:ln w="38100">
+            <a:solidFill>
+              <a:schemeClr val="accent1">
+                <a:satMod val="105000"/>
+              </a:schemeClr>
+            </a:solidFill>
+            <a:tailEnd type="arrow"/>
+          </a:ln>
+        </p:spPr>
+        <p:style>
+          <a:lnRef idx="1">
+            <a:schemeClr val="accent1"/>
+          </a:lnRef>
+          <a:fillRef idx="0">
+            <a:schemeClr val="accent1"/>
+          </a:fillRef>
+          <a:effectRef idx="0">
+            <a:schemeClr val="accent1"/>
+          </a:effectRef>
+          <a:fontRef idx="minor">
+            <a:schemeClr val="tx1"/>
+          </a:fontRef>
+        </p:style>
+      </p:cxnSp>
+    </p:spTree>
+  </p:cSld>
+  <p:clrMapOvr>
+    <a:masterClrMapping/>
+  </p:clrMapOvr>
+  <mc:AlternateContent xmlns:mc="http://schemas.openxmlformats.org/markup-compatibility/2006">
+    <mc:Choice xmlns:p14="http://schemas.microsoft.com/office/powerpoint/2010/main" Requires="p14">
+      <p:transition xmlns:mc="http://schemas.openxmlformats.org/markup-compatibility/2006" xmlns:p14="http://schemas.microsoft.com/office/powerpoint/2010/main" mc:Ignorable="p14" p14:dur="500"/>
+    </mc:Choice>
+    <mc:Fallback>
+      <p:transition/>
+    </mc:Fallback>
+  </mc:AlternateContent>
+</p:sld>
+</file>
+
+<file path=ppt/slides/slide8.xml><?xml version="1.0" encoding="utf-8"?>
+<p:sld xmlns:r="http://schemas.openxmlformats.org/officeDocument/2006/relationships" xmlns:c="http://schemas.openxmlformats.org/drawingml/2006/chart" xmlns:a="http://schemas.openxmlformats.org/drawingml/2006/main" xmlns:dgm="http://schemas.openxmlformats.org/drawingml/2006/diagram" xmlns:dsp="http://schemas.microsoft.com/office/drawing/2008/diagram" xmlns:p="http://schemas.openxmlformats.org/presentationml/2006/main">
+  <p:cSld>
+    <p:spTree>
+      <p:nvGrpSpPr>
+        <p:cNvPr id="1" name=""/>
+        <p:cNvGrpSpPr/>
+        <p:nvPr/>
+      </p:nvGrpSpPr>
+      <p:grpSpPr>
+        <a:xfrm>
+          <a:off x="0" y="0"/>
+          <a:ext cx="0" cy="0"/>
+          <a:chOff x="0" y="0"/>
+          <a:chExt cx="0" cy="0"/>
+        </a:xfrm>
+      </p:grpSpPr>
+      <p:sp>
+        <p:nvSpPr>
+          <p:cNvPr id="4" name=""/>
+          <p:cNvSpPr/>
+          <p:nvPr/>
+        </p:nvSpPr>
+        <p:spPr>
+          <a:xfrm>
+            <a:off x="726281" y="1232297"/>
+            <a:ext cx="1345406" cy="3702843"/>
+          </a:xfrm>
+          <a:prstGeom prst="roundRect">
+            <a:avLst>
+              <a:gd name="adj" fmla="val 16667"/>
+            </a:avLst>
+          </a:prstGeom>
+        </p:spPr>
+        <p:style>
+          <a:lnRef idx="2">
+            <a:schemeClr val="accent1">
+              <a:shade val="20000"/>
+            </a:schemeClr>
+          </a:lnRef>
+          <a:fillRef idx="1">
+            <a:schemeClr val="accent1"/>
+          </a:fillRef>
+          <a:effectRef idx="0">
+            <a:schemeClr val="accent1"/>
+          </a:effectRef>
+          <a:fontRef idx="minor">
+            <a:schemeClr val="lt1"/>
+          </a:fontRef>
+        </p:style>
+        <p:txBody>
+          <a:bodyPr anchor="ctr"/>
+          <a:p>
+            <a:pPr algn="ctr">
+              <a:defRPr/>
+            </a:pPr>
+            <a:r>
+              <a:rPr lang="en-US" altLang="ko-KR" sz="2400" b="1"/>
+              <a:t>Client</a:t>
+            </a:r>
+            <a:endParaRPr lang="en-US" altLang="ko-KR" sz="2400" b="1"/>
+          </a:p>
+        </p:txBody>
+      </p:sp>
+      <p:sp>
+        <p:nvSpPr>
+          <p:cNvPr id="5" name=""/>
+          <p:cNvSpPr/>
+          <p:nvPr/>
+        </p:nvSpPr>
+        <p:spPr>
+          <a:xfrm>
+            <a:off x="3071813" y="1232296"/>
+            <a:ext cx="1345406" cy="2381250"/>
+          </a:xfrm>
+          <a:prstGeom prst="roundRect">
+            <a:avLst>
+              <a:gd name="adj" fmla="val 16667"/>
+            </a:avLst>
+          </a:prstGeom>
+        </p:spPr>
+        <p:style>
+          <a:lnRef idx="2">
+            <a:schemeClr val="accent2">
+              <a:shade val="20000"/>
+            </a:schemeClr>
+          </a:lnRef>
+          <a:fillRef idx="1">
+            <a:schemeClr val="accent2"/>
+          </a:fillRef>
+          <a:effectRef idx="0">
+            <a:schemeClr val="accent2"/>
+          </a:effectRef>
+          <a:fontRef idx="minor">
+            <a:schemeClr val="lt1"/>
+          </a:fontRef>
+        </p:style>
+        <p:txBody>
+          <a:bodyPr anchor="ctr"/>
+          <a:p>
+            <a:pPr algn="ctr">
+              <a:defRPr/>
+            </a:pPr>
+            <a:r>
+              <a:rPr lang="en-US" altLang="ko-KR" sz="2400" b="1"/>
+              <a:t>Servlet</a:t>
+            </a:r>
+            <a:endParaRPr lang="en-US" altLang="ko-KR" sz="2400" b="1"/>
+          </a:p>
+        </p:txBody>
+      </p:sp>
+      <p:sp>
+        <p:nvSpPr>
+          <p:cNvPr id="6" name=""/>
+          <p:cNvSpPr/>
+          <p:nvPr/>
+        </p:nvSpPr>
+        <p:spPr>
+          <a:xfrm>
+            <a:off x="3071813" y="4494609"/>
+            <a:ext cx="1345406" cy="1190625"/>
+          </a:xfrm>
+          <a:prstGeom prst="roundRect">
+            <a:avLst>
+              <a:gd name="adj" fmla="val 16667"/>
+            </a:avLst>
+          </a:prstGeom>
+        </p:spPr>
+        <p:style>
+          <a:lnRef idx="2">
+            <a:schemeClr val="accent3">
+              <a:shade val="20000"/>
+            </a:schemeClr>
+          </a:lnRef>
+          <a:fillRef idx="1">
+            <a:schemeClr val="accent3"/>
+          </a:fillRef>
+          <a:effectRef idx="0">
+            <a:schemeClr val="accent3"/>
+          </a:effectRef>
+          <a:fontRef idx="minor">
+            <a:schemeClr val="lt1"/>
+          </a:fontRef>
+        </p:style>
+        <p:txBody>
+          <a:bodyPr anchor="ctr"/>
+          <a:p>
+            <a:pPr algn="ctr">
+              <a:defRPr/>
+            </a:pPr>
+            <a:r>
+              <a:rPr lang="en-US" altLang="ko-KR" sz="2400" b="1"/>
+              <a:t>JSP</a:t>
+            </a:r>
+            <a:endParaRPr lang="en-US" altLang="ko-KR" sz="2400" b="1"/>
+          </a:p>
+        </p:txBody>
+      </p:sp>
+      <p:sp>
+        <p:nvSpPr>
+          <p:cNvPr id="7" name=""/>
+          <p:cNvSpPr/>
+          <p:nvPr/>
+        </p:nvSpPr>
+        <p:spPr>
+          <a:xfrm>
+            <a:off x="5274469" y="1232297"/>
+            <a:ext cx="1964532" cy="2381250"/>
+          </a:xfrm>
+          <a:prstGeom prst="roundRect">
+            <a:avLst>
+              <a:gd name="adj" fmla="val 16667"/>
+            </a:avLst>
+          </a:prstGeom>
+        </p:spPr>
+        <p:style>
+          <a:lnRef idx="2">
+            <a:schemeClr val="accent4">
+              <a:shade val="20000"/>
+            </a:schemeClr>
+          </a:lnRef>
+          <a:fillRef idx="1">
+            <a:schemeClr val="accent4"/>
+          </a:fillRef>
+          <a:effectRef idx="0">
+            <a:schemeClr val="accent4"/>
+          </a:effectRef>
+          <a:fontRef idx="minor">
+            <a:schemeClr val="lt1"/>
+          </a:fontRef>
+        </p:style>
+        <p:txBody>
+          <a:bodyPr anchor="ctr"/>
+          <a:p>
+            <a:pPr algn="ctr">
+              <a:defRPr/>
+            </a:pPr>
+            <a:r>
+              <a:rPr lang="en-US" altLang="ko-KR" sz="2400" b="1"/>
+              <a:t>Business</a:t>
+            </a:r>
+            <a:endParaRPr lang="en-US" altLang="ko-KR" sz="2400" b="1"/>
+          </a:p>
+          <a:p>
+            <a:pPr algn="ctr">
+              <a:defRPr/>
+            </a:pPr>
+            <a:r>
+              <a:rPr lang="en-US" altLang="ko-KR" sz="2400" b="1"/>
+              <a:t>Service</a:t>
+            </a:r>
+            <a:endParaRPr lang="en-US" altLang="ko-KR" sz="2400" b="1"/>
+          </a:p>
+          <a:p>
+            <a:pPr algn="ctr">
+              <a:defRPr/>
+            </a:pPr>
+            <a:r>
+              <a:rPr lang="en-US" altLang="ko-KR" sz="2400" b="1"/>
+              <a:t>Object</a:t>
+            </a:r>
+            <a:endParaRPr lang="en-US" altLang="ko-KR" sz="2400" b="1"/>
+          </a:p>
+        </p:txBody>
+      </p:sp>
+      <p:sp>
+        <p:nvSpPr>
+          <p:cNvPr id="9" name=""/>
+          <p:cNvSpPr/>
+          <p:nvPr/>
+        </p:nvSpPr>
+        <p:spPr>
+          <a:xfrm>
+            <a:off x="8084346" y="1232296"/>
+            <a:ext cx="1345406" cy="2381250"/>
+          </a:xfrm>
+          <a:prstGeom prst="roundRect">
+            <a:avLst>
+              <a:gd name="adj" fmla="val 16667"/>
+            </a:avLst>
+          </a:prstGeom>
+        </p:spPr>
+        <p:style>
+          <a:lnRef idx="2">
+            <a:schemeClr val="accent6">
+              <a:shade val="20000"/>
+            </a:schemeClr>
+          </a:lnRef>
+          <a:fillRef idx="1">
+            <a:schemeClr val="accent6"/>
+          </a:fillRef>
+          <a:effectRef idx="0">
+            <a:schemeClr val="accent6"/>
+          </a:effectRef>
+          <a:fontRef idx="minor">
+            <a:schemeClr val="lt1"/>
+          </a:fontRef>
+        </p:style>
+        <p:txBody>
+          <a:bodyPr anchor="ctr"/>
+          <a:p>
+            <a:pPr algn="ctr">
+              <a:defRPr/>
+            </a:pPr>
+            <a:r>
+              <a:rPr lang="en-US" altLang="ko-KR" sz="2400" b="1"/>
+              <a:t>DAO</a:t>
+            </a:r>
+            <a:endParaRPr lang="en-US" altLang="ko-KR" sz="2400" b="1"/>
+          </a:p>
+        </p:txBody>
+      </p:sp>
+      <p:sp>
+        <p:nvSpPr>
+          <p:cNvPr id="10" name=""/>
+          <p:cNvSpPr/>
+          <p:nvPr/>
+        </p:nvSpPr>
+        <p:spPr>
+          <a:xfrm>
+            <a:off x="10298907" y="1232296"/>
+            <a:ext cx="1345406" cy="2381250"/>
+          </a:xfrm>
+          <a:prstGeom prst="can">
+            <a:avLst>
+              <a:gd name="adj" fmla="val 25000"/>
+            </a:avLst>
+          </a:prstGeom>
+        </p:spPr>
+        <p:style>
+          <a:lnRef idx="2">
+            <a:schemeClr val="accent5">
+              <a:shade val="20000"/>
+            </a:schemeClr>
+          </a:lnRef>
+          <a:fillRef idx="1">
+            <a:schemeClr val="accent5"/>
+          </a:fillRef>
+          <a:effectRef idx="0">
+            <a:schemeClr val="accent5"/>
+          </a:effectRef>
+          <a:fontRef idx="minor">
+            <a:schemeClr val="lt1"/>
+          </a:fontRef>
+        </p:style>
+        <p:txBody>
+          <a:bodyPr anchor="ctr"/>
+          <a:p>
+            <a:pPr algn="ctr">
+              <a:defRPr/>
+            </a:pPr>
+            <a:r>
+              <a:rPr lang="en-US" altLang="ko-KR" sz="2400" b="1"/>
+              <a:t>DB</a:t>
+            </a:r>
+            <a:endParaRPr lang="en-US" altLang="ko-KR" sz="2400" b="1"/>
+          </a:p>
+        </p:txBody>
+      </p:sp>
+      <p:cxnSp>
+        <p:nvCxnSpPr>
+          <p:cNvPr id="11" name=""/>
+          <p:cNvCxnSpPr/>
+          <p:nvPr/>
+        </p:nvCxnSpPr>
+        <p:spPr>
+          <a:xfrm>
+            <a:off x="2202656" y="1791890"/>
+            <a:ext cx="773906" cy="0"/>
+          </a:xfrm>
+          <a:prstGeom prst="straightConnector1">
+            <a:avLst/>
+          </a:prstGeom>
+          <a:ln w="38100">
+            <a:solidFill>
+              <a:srgbClr val="ff0000"/>
+            </a:solidFill>
+            <a:tailEnd type="arrow"/>
+          </a:ln>
+        </p:spPr>
+        <p:style>
+          <a:lnRef idx="1">
+            <a:schemeClr val="accent1"/>
+          </a:lnRef>
+          <a:fillRef idx="0">
+            <a:schemeClr val="accent1"/>
+          </a:fillRef>
+          <a:effectRef idx="0">
+            <a:schemeClr val="accent1"/>
+          </a:effectRef>
+          <a:fontRef idx="minor">
+            <a:schemeClr val="tx1"/>
+          </a:fontRef>
+        </p:style>
+      </p:cxnSp>
+      <p:cxnSp>
+        <p:nvCxnSpPr>
+          <p:cNvPr id="12" name=""/>
+          <p:cNvCxnSpPr/>
+          <p:nvPr/>
+        </p:nvCxnSpPr>
+        <p:spPr>
+          <a:xfrm rot="16200000" flipV="1">
+            <a:off x="2051392" y="4164751"/>
+            <a:ext cx="1076433" cy="773907"/>
+          </a:xfrm>
+          <a:prstGeom prst="straightConnector1">
+            <a:avLst/>
+          </a:prstGeom>
+          <a:ln w="38100">
+            <a:solidFill>
+              <a:srgbClr val="ff0000"/>
+            </a:solidFill>
+            <a:tailEnd type="arrow"/>
+          </a:ln>
+        </p:spPr>
+        <p:style>
+          <a:lnRef idx="1">
+            <a:schemeClr val="accent1"/>
+          </a:lnRef>
+          <a:fillRef idx="0">
+            <a:schemeClr val="accent1"/>
+          </a:fillRef>
+          <a:effectRef idx="0">
+            <a:schemeClr val="accent1"/>
+          </a:effectRef>
+          <a:fontRef idx="minor">
+            <a:schemeClr val="tx1"/>
+          </a:fontRef>
+        </p:style>
+      </p:cxnSp>
+      <p:sp>
+        <p:nvSpPr>
+          <p:cNvPr id="13" name=""/>
+          <p:cNvSpPr txBox="1"/>
+          <p:nvPr/>
+        </p:nvSpPr>
+        <p:spPr>
+          <a:xfrm>
+            <a:off x="2016306" y="1427488"/>
+            <a:ext cx="1146607" cy="364402"/>
+          </a:xfrm>
+          <a:prstGeom prst="rect">
+            <a:avLst/>
+          </a:prstGeom>
+        </p:spPr>
+        <p:txBody>
+          <a:bodyPr wrap="square">
+            <a:spAutoFit/>
+          </a:bodyPr>
+          <a:p>
+            <a:pPr marL="0" indent="0" algn="ctr" defTabSz="914400" rtl="0" eaLnBrk="1" latinLnBrk="1" hangingPunct="1">
+              <a:lnSpc>
+                <a:spcPct val="100000"/>
+              </a:lnSpc>
+              <a:spcBef>
+                <a:spcPct val="0"/>
+              </a:spcBef>
+              <a:spcAft>
+                <a:spcPts val="0"/>
+              </a:spcAft>
+              <a:buNone/>
+              <a:defRPr/>
+            </a:pPr>
+            <a:r>
+              <a:rPr xmlns:mc="http://schemas.openxmlformats.org/markup-compatibility/2006" xmlns:hp="http://schemas.haansoft.com/office/presentation/8.0" kumimoji="0" lang="en-US" altLang="ko-KR" b="1" i="0" u="none" strike="noStrike" kern="1200" cap="none" spc="0" normalizeH="0" baseline="0" mc:Ignorable="hp" hp:hslEmbossed="0">
+                <a:solidFill>
+                  <a:srgbClr val="000000"/>
+                </a:solidFill>
+                <a:latin typeface="Calibri"/>
+                <a:ea typeface="맑은 고딕"/>
+                <a:cs typeface="Times New Roman"/>
+              </a:rPr>
+              <a:t>Request</a:t>
+            </a:r>
+            <a:endParaRPr xmlns:mc="http://schemas.openxmlformats.org/markup-compatibility/2006" xmlns:hp="http://schemas.haansoft.com/office/presentation/8.0" kumimoji="0" lang="en-US" altLang="ko-KR" b="1" i="0" u="none" strike="noStrike" kern="1200" cap="none" spc="0" normalizeH="0" baseline="0" mc:Ignorable="hp" hp:hslEmbossed="0">
+              <a:solidFill>
+                <a:srgbClr val="000000"/>
+              </a:solidFill>
+              <a:latin typeface="Calibri"/>
+              <a:ea typeface="맑은 고딕"/>
+              <a:cs typeface="Times New Roman"/>
+            </a:endParaRPr>
+          </a:p>
+        </p:txBody>
+      </p:sp>
+      <p:sp>
+        <p:nvSpPr>
+          <p:cNvPr id="14" name=""/>
+          <p:cNvSpPr txBox="1"/>
+          <p:nvPr/>
+        </p:nvSpPr>
+        <p:spPr>
+          <a:xfrm>
+            <a:off x="2016306" y="1427488"/>
+            <a:ext cx="1146607" cy="364402"/>
+          </a:xfrm>
+          <a:prstGeom prst="rect">
+            <a:avLst/>
+          </a:prstGeom>
+        </p:spPr>
+        <p:txBody>
+          <a:bodyPr wrap="square">
+            <a:spAutoFit/>
+          </a:bodyPr>
+          <a:p>
+            <a:pPr marL="0" indent="0" algn="ctr" defTabSz="914400" rtl="0" eaLnBrk="1" latinLnBrk="1" hangingPunct="1">
+              <a:lnSpc>
+                <a:spcPct val="100000"/>
+              </a:lnSpc>
+              <a:spcBef>
+                <a:spcPct val="0"/>
+              </a:spcBef>
+              <a:spcAft>
+                <a:spcPts val="0"/>
+              </a:spcAft>
+              <a:buNone/>
+              <a:defRPr/>
+            </a:pPr>
+            <a:r>
+              <a:rPr xmlns:mc="http://schemas.openxmlformats.org/markup-compatibility/2006" xmlns:hp="http://schemas.haansoft.com/office/presentation/8.0" kumimoji="0" lang="en-US" altLang="ko-KR" b="1" i="0" u="none" strike="noStrike" kern="1200" cap="none" spc="0" normalizeH="0" baseline="0" mc:Ignorable="hp" hp:hslEmbossed="0">
+                <a:solidFill>
+                  <a:srgbClr val="000000"/>
+                </a:solidFill>
+                <a:latin typeface="Calibri"/>
+                <a:ea typeface="맑은 고딕"/>
+                <a:cs typeface="Times New Roman"/>
+              </a:rPr>
+              <a:t>Request</a:t>
+            </a:r>
+            <a:endParaRPr xmlns:mc="http://schemas.openxmlformats.org/markup-compatibility/2006" xmlns:hp="http://schemas.haansoft.com/office/presentation/8.0" kumimoji="0" lang="en-US" altLang="ko-KR" b="1" i="0" u="none" strike="noStrike" kern="1200" cap="none" spc="0" normalizeH="0" baseline="0" mc:Ignorable="hp" hp:hslEmbossed="0">
+              <a:solidFill>
+                <a:srgbClr val="000000"/>
+              </a:solidFill>
+              <a:latin typeface="Calibri"/>
+              <a:ea typeface="맑은 고딕"/>
+              <a:cs typeface="Times New Roman"/>
+            </a:endParaRPr>
+          </a:p>
+        </p:txBody>
+      </p:sp>
+      <p:sp>
+        <p:nvSpPr>
+          <p:cNvPr id="16" name=""/>
+          <p:cNvSpPr txBox="1"/>
+          <p:nvPr/>
+        </p:nvSpPr>
+        <p:spPr>
+          <a:xfrm>
+            <a:off x="1629352" y="5089922"/>
+            <a:ext cx="1146607" cy="365998"/>
+          </a:xfrm>
+          <a:prstGeom prst="rect">
+            <a:avLst/>
+          </a:prstGeom>
+        </p:spPr>
+        <p:txBody>
+          <a:bodyPr wrap="square">
+            <a:spAutoFit/>
+          </a:bodyPr>
+          <a:p>
+            <a:pPr marL="0" indent="0" algn="ctr" defTabSz="914400" rtl="0" eaLnBrk="1" latinLnBrk="1" hangingPunct="1">
+              <a:lnSpc>
+                <a:spcPct val="100000"/>
+              </a:lnSpc>
+              <a:spcBef>
+                <a:spcPct val="0"/>
+              </a:spcBef>
+              <a:spcAft>
+                <a:spcPts val="0"/>
+              </a:spcAft>
+              <a:buNone/>
+              <a:defRPr/>
+            </a:pPr>
+            <a:r>
+              <a:rPr xmlns:mc="http://schemas.openxmlformats.org/markup-compatibility/2006" xmlns:hp="http://schemas.haansoft.com/office/presentation/8.0" kumimoji="0" lang="en-US" altLang="ko-KR" b="1" i="0" u="none" strike="noStrike" kern="1200" cap="none" spc="0" normalizeH="0" baseline="0" mc:Ignorable="hp" hp:hslEmbossed="0">
+                <a:solidFill>
+                  <a:srgbClr val="000000"/>
+                </a:solidFill>
+                <a:latin typeface="Calibri"/>
+                <a:ea typeface="맑은 고딕"/>
+                <a:cs typeface="Times New Roman"/>
+              </a:rPr>
+              <a:t>Response</a:t>
+            </a:r>
+            <a:endParaRPr xmlns:mc="http://schemas.openxmlformats.org/markup-compatibility/2006" xmlns:hp="http://schemas.haansoft.com/office/presentation/8.0" kumimoji="0" lang="en-US" altLang="ko-KR" b="1" i="0" u="none" strike="noStrike" kern="1200" cap="none" spc="0" normalizeH="0" baseline="0" mc:Ignorable="hp" hp:hslEmbossed="0">
+              <a:solidFill>
+                <a:srgbClr val="000000"/>
+              </a:solidFill>
+              <a:latin typeface="Calibri"/>
+              <a:ea typeface="맑은 고딕"/>
+              <a:cs typeface="Times New Roman"/>
+            </a:endParaRPr>
+          </a:p>
+        </p:txBody>
+      </p:sp>
+      <p:cxnSp>
+        <p:nvCxnSpPr>
+          <p:cNvPr id="17" name=""/>
+          <p:cNvCxnSpPr/>
+          <p:nvPr/>
+        </p:nvCxnSpPr>
+        <p:spPr>
+          <a:xfrm rot="16200000" flipH="1">
+            <a:off x="3411014" y="4061241"/>
+            <a:ext cx="667005" cy="0"/>
+          </a:xfrm>
+          <a:prstGeom prst="straightConnector1">
+            <a:avLst/>
+          </a:prstGeom>
+          <a:ln w="38100">
+            <a:solidFill>
+              <a:srgbClr val="ff0000"/>
+            </a:solidFill>
+            <a:tailEnd type="arrow"/>
+          </a:ln>
+        </p:spPr>
+        <p:style>
+          <a:lnRef idx="1">
+            <a:schemeClr val="accent1"/>
+          </a:lnRef>
+          <a:fillRef idx="0">
+            <a:schemeClr val="accent1"/>
+          </a:fillRef>
+          <a:effectRef idx="0">
+            <a:schemeClr val="accent1"/>
+          </a:effectRef>
+          <a:fontRef idx="minor">
+            <a:schemeClr val="tx1"/>
+          </a:fontRef>
+        </p:style>
+      </p:cxnSp>
+      <p:sp>
+        <p:nvSpPr>
+          <p:cNvPr id="18" name=""/>
+          <p:cNvSpPr txBox="1"/>
+          <p:nvPr/>
+        </p:nvSpPr>
+        <p:spPr>
+          <a:xfrm>
+            <a:off x="3171213" y="535951"/>
+            <a:ext cx="1146607" cy="367019"/>
+          </a:xfrm>
+          <a:prstGeom prst="rect">
+            <a:avLst/>
+          </a:prstGeom>
+        </p:spPr>
+        <p:txBody>
+          <a:bodyPr wrap="square">
+            <a:spAutoFit/>
+          </a:bodyPr>
+          <a:p>
+            <a:pPr marL="0" indent="0" algn="ctr" defTabSz="914400" rtl="0" eaLnBrk="1" latinLnBrk="1" hangingPunct="1">
+              <a:lnSpc>
+                <a:spcPct val="100000"/>
+              </a:lnSpc>
+              <a:spcBef>
+                <a:spcPct val="0"/>
+              </a:spcBef>
+              <a:spcAft>
+                <a:spcPts val="0"/>
+              </a:spcAft>
+              <a:buNone/>
+              <a:defRPr/>
+            </a:pPr>
+            <a:r>
+              <a:rPr xmlns:mc="http://schemas.openxmlformats.org/markup-compatibility/2006" xmlns:hp="http://schemas.haansoft.com/office/presentation/8.0" kumimoji="0" lang="en-US" altLang="ko-KR" b="1" i="0" u="none" strike="noStrike" kern="1200" cap="none" spc="0" normalizeH="0" baseline="0" mc:Ignorable="hp" hp:hslEmbossed="0">
+                <a:solidFill>
+                  <a:srgbClr val="000000"/>
+                </a:solidFill>
+                <a:latin typeface="Calibri"/>
+                <a:ea typeface="맑은 고딕"/>
+                <a:cs typeface="Times New Roman"/>
+              </a:rPr>
+              <a:t>Controller</a:t>
+            </a:r>
+            <a:endParaRPr xmlns:mc="http://schemas.openxmlformats.org/markup-compatibility/2006" xmlns:hp="http://schemas.haansoft.com/office/presentation/8.0" kumimoji="0" lang="en-US" altLang="ko-KR" b="1" i="0" u="none" strike="noStrike" kern="1200" cap="none" spc="0" normalizeH="0" baseline="0" mc:Ignorable="hp" hp:hslEmbossed="0">
+              <a:solidFill>
+                <a:srgbClr val="000000"/>
+              </a:solidFill>
+              <a:latin typeface="Calibri"/>
+              <a:ea typeface="맑은 고딕"/>
+              <a:cs typeface="Times New Roman"/>
+            </a:endParaRPr>
+          </a:p>
+        </p:txBody>
+      </p:sp>
+      <p:sp>
+        <p:nvSpPr>
+          <p:cNvPr id="15" name=""/>
+          <p:cNvSpPr txBox="1"/>
+          <p:nvPr/>
+        </p:nvSpPr>
+        <p:spPr>
+          <a:xfrm>
+            <a:off x="4496053" y="2240721"/>
+            <a:ext cx="687675" cy="367224"/>
+          </a:xfrm>
+          <a:prstGeom prst="rect">
+            <a:avLst/>
+          </a:prstGeom>
+        </p:spPr>
+        <p:txBody>
+          <a:bodyPr wrap="square">
+            <a:spAutoFit/>
+          </a:bodyPr>
+          <a:p>
+            <a:pPr marL="0" indent="0" algn="ctr" defTabSz="914400" rtl="0" eaLnBrk="1" latinLnBrk="1" hangingPunct="1">
+              <a:lnSpc>
+                <a:spcPct val="100000"/>
+              </a:lnSpc>
+              <a:spcBef>
+                <a:spcPct val="0"/>
+              </a:spcBef>
+              <a:spcAft>
+                <a:spcPts val="0"/>
+              </a:spcAft>
+              <a:buNone/>
+              <a:defRPr/>
+            </a:pPr>
+            <a:r>
+              <a:rPr xmlns:mc="http://schemas.openxmlformats.org/markup-compatibility/2006" xmlns:hp="http://schemas.haansoft.com/office/presentation/8.0" kumimoji="0" lang="en-US" altLang="ko-KR" b="1" i="0" u="none" strike="noStrike" kern="1200" cap="none" spc="0" normalizeH="0" baseline="0" mc:Ignorable="hp" hp:hslEmbossed="0">
+                <a:solidFill>
+                  <a:srgbClr val="000000"/>
+                </a:solidFill>
+                <a:latin typeface="Calibri"/>
+                <a:ea typeface="맑은 고딕"/>
+                <a:cs typeface="Times New Roman"/>
+              </a:rPr>
+              <a:t>DTO</a:t>
+            </a:r>
+            <a:endParaRPr xmlns:mc="http://schemas.openxmlformats.org/markup-compatibility/2006" xmlns:hp="http://schemas.haansoft.com/office/presentation/8.0" kumimoji="0" lang="en-US" altLang="ko-KR" b="1" i="0" u="none" strike="noStrike" kern="1200" cap="none" spc="0" normalizeH="0" baseline="0" mc:Ignorable="hp" hp:hslEmbossed="0">
+              <a:solidFill>
+                <a:srgbClr val="000000"/>
+              </a:solidFill>
+              <a:latin typeface="Calibri"/>
+              <a:ea typeface="맑은 고딕"/>
+              <a:cs typeface="Times New Roman"/>
+            </a:endParaRPr>
+          </a:p>
+        </p:txBody>
+      </p:sp>
+      <p:cxnSp>
+        <p:nvCxnSpPr>
+          <p:cNvPr id="19" name=""/>
+          <p:cNvCxnSpPr/>
+          <p:nvPr/>
+        </p:nvCxnSpPr>
+        <p:spPr>
+          <a:xfrm>
+            <a:off x="4471987" y="1791890"/>
+            <a:ext cx="773906" cy="0"/>
+          </a:xfrm>
+          <a:prstGeom prst="straightConnector1">
+            <a:avLst/>
+          </a:prstGeom>
+          <a:ln w="38100">
+            <a:solidFill>
+              <a:srgbClr val="ff0000"/>
+            </a:solidFill>
+            <a:tailEnd type="arrow"/>
+          </a:ln>
+        </p:spPr>
+        <p:style>
+          <a:lnRef idx="1">
+            <a:schemeClr val="accent1"/>
+          </a:lnRef>
+          <a:fillRef idx="0">
+            <a:schemeClr val="accent1"/>
+          </a:fillRef>
+          <a:effectRef idx="0">
+            <a:schemeClr val="accent1"/>
+          </a:effectRef>
+          <a:fontRef idx="minor">
+            <a:schemeClr val="tx1"/>
+          </a:fontRef>
+        </p:style>
+      </p:cxnSp>
+      <p:cxnSp>
+        <p:nvCxnSpPr>
+          <p:cNvPr id="20" name=""/>
+          <p:cNvCxnSpPr/>
+          <p:nvPr/>
+        </p:nvCxnSpPr>
+        <p:spPr>
+          <a:xfrm flipH="1">
+            <a:off x="4452937" y="3083718"/>
+            <a:ext cx="773906" cy="0"/>
+          </a:xfrm>
+          <a:prstGeom prst="straightConnector1">
+            <a:avLst/>
+          </a:prstGeom>
+          <a:ln w="38100">
+            <a:solidFill>
+              <a:srgbClr val="ff0000"/>
+            </a:solidFill>
+            <a:tailEnd type="arrow"/>
+          </a:ln>
+        </p:spPr>
+        <p:style>
+          <a:lnRef idx="1">
+            <a:schemeClr val="accent1"/>
+          </a:lnRef>
+          <a:fillRef idx="0">
+            <a:schemeClr val="accent1"/>
+          </a:fillRef>
+          <a:effectRef idx="0">
+            <a:schemeClr val="accent1"/>
+          </a:effectRef>
+          <a:fontRef idx="minor">
+            <a:schemeClr val="tx1"/>
+          </a:fontRef>
+        </p:style>
+      </p:cxnSp>
+      <p:sp>
+        <p:nvSpPr>
+          <p:cNvPr id="23" name=""/>
+          <p:cNvSpPr txBox="1"/>
+          <p:nvPr/>
+        </p:nvSpPr>
+        <p:spPr>
+          <a:xfrm>
+            <a:off x="7304773" y="2240721"/>
+            <a:ext cx="687675" cy="367224"/>
+          </a:xfrm>
+          <a:prstGeom prst="rect">
+            <a:avLst/>
+          </a:prstGeom>
+        </p:spPr>
+        <p:txBody>
+          <a:bodyPr wrap="square">
+            <a:spAutoFit/>
+          </a:bodyPr>
+          <a:p>
+            <a:pPr marL="0" indent="0" algn="ctr" defTabSz="914400" rtl="0" eaLnBrk="1" latinLnBrk="1" hangingPunct="1">
+              <a:lnSpc>
+                <a:spcPct val="100000"/>
+              </a:lnSpc>
+              <a:spcBef>
+                <a:spcPct val="0"/>
+              </a:spcBef>
+              <a:spcAft>
+                <a:spcPts val="0"/>
+              </a:spcAft>
+              <a:buNone/>
+              <a:defRPr/>
+            </a:pPr>
+            <a:r>
+              <a:rPr xmlns:mc="http://schemas.openxmlformats.org/markup-compatibility/2006" xmlns:hp="http://schemas.haansoft.com/office/presentation/8.0" kumimoji="0" lang="en-US" altLang="ko-KR" b="1" i="0" u="none" strike="noStrike" kern="1200" cap="none" spc="0" normalizeH="0" baseline="0" mc:Ignorable="hp" hp:hslEmbossed="0">
+                <a:solidFill>
+                  <a:srgbClr val="000000"/>
+                </a:solidFill>
+                <a:latin typeface="Calibri"/>
+                <a:ea typeface="맑은 고딕"/>
+                <a:cs typeface="Times New Roman"/>
+              </a:rPr>
+              <a:t>DTO</a:t>
+            </a:r>
+            <a:endParaRPr xmlns:mc="http://schemas.openxmlformats.org/markup-compatibility/2006" xmlns:hp="http://schemas.haansoft.com/office/presentation/8.0" kumimoji="0" lang="en-US" altLang="ko-KR" b="1" i="0" u="none" strike="noStrike" kern="1200" cap="none" spc="0" normalizeH="0" baseline="0" mc:Ignorable="hp" hp:hslEmbossed="0">
+              <a:solidFill>
+                <a:srgbClr val="000000"/>
+              </a:solidFill>
+              <a:latin typeface="Calibri"/>
+              <a:ea typeface="맑은 고딕"/>
+              <a:cs typeface="Times New Roman"/>
+            </a:endParaRPr>
+          </a:p>
+        </p:txBody>
+      </p:sp>
+      <p:cxnSp>
+        <p:nvCxnSpPr>
+          <p:cNvPr id="24" name=""/>
+          <p:cNvCxnSpPr/>
+          <p:nvPr/>
+        </p:nvCxnSpPr>
+        <p:spPr>
+          <a:xfrm>
+            <a:off x="7280707" y="1791891"/>
+            <a:ext cx="773906" cy="0"/>
+          </a:xfrm>
+          <a:prstGeom prst="straightConnector1">
+            <a:avLst/>
+          </a:prstGeom>
+          <a:ln w="38100">
+            <a:solidFill>
+              <a:srgbClr val="ff0000"/>
+            </a:solidFill>
+            <a:tailEnd type="arrow"/>
+          </a:ln>
+        </p:spPr>
+        <p:style>
+          <a:lnRef idx="1">
+            <a:schemeClr val="accent1"/>
+          </a:lnRef>
+          <a:fillRef idx="0">
+            <a:schemeClr val="accent1"/>
+          </a:fillRef>
+          <a:effectRef idx="0">
+            <a:schemeClr val="accent1"/>
+          </a:effectRef>
+          <a:fontRef idx="minor">
+            <a:schemeClr val="tx1"/>
+          </a:fontRef>
+        </p:style>
+      </p:cxnSp>
+      <p:cxnSp>
+        <p:nvCxnSpPr>
+          <p:cNvPr id="25" name=""/>
+          <p:cNvCxnSpPr/>
+          <p:nvPr/>
+        </p:nvCxnSpPr>
+        <p:spPr>
+          <a:xfrm flipH="1">
+            <a:off x="7261657" y="3083719"/>
+            <a:ext cx="773906" cy="0"/>
+          </a:xfrm>
+          <a:prstGeom prst="straightConnector1">
+            <a:avLst/>
+          </a:prstGeom>
+          <a:ln w="38100">
+            <a:solidFill>
+              <a:srgbClr val="ff0000"/>
+            </a:solidFill>
+            <a:tailEnd type="arrow"/>
+          </a:ln>
+        </p:spPr>
+        <p:style>
+          <a:lnRef idx="1">
+            <a:schemeClr val="accent1"/>
+          </a:lnRef>
+          <a:fillRef idx="0">
+            <a:schemeClr val="accent1"/>
+          </a:fillRef>
+          <a:effectRef idx="0">
+            <a:schemeClr val="accent1"/>
+          </a:effectRef>
+          <a:fontRef idx="minor">
+            <a:schemeClr val="tx1"/>
+          </a:fontRef>
+        </p:style>
+      </p:cxnSp>
+      <p:cxnSp>
+        <p:nvCxnSpPr>
+          <p:cNvPr id="26" name=""/>
+          <p:cNvCxnSpPr/>
+          <p:nvPr/>
+        </p:nvCxnSpPr>
+        <p:spPr>
+          <a:xfrm>
+            <a:off x="9486902" y="1791890"/>
+            <a:ext cx="773906" cy="0"/>
+          </a:xfrm>
+          <a:prstGeom prst="straightConnector1">
+            <a:avLst/>
+          </a:prstGeom>
+          <a:ln w="38100">
+            <a:solidFill>
+              <a:srgbClr val="ff0000"/>
+            </a:solidFill>
+            <a:tailEnd type="arrow"/>
+          </a:ln>
+        </p:spPr>
+        <p:style>
+          <a:lnRef idx="1">
+            <a:schemeClr val="accent1"/>
+          </a:lnRef>
+          <a:fillRef idx="0">
+            <a:schemeClr val="accent1"/>
+          </a:fillRef>
+          <a:effectRef idx="0">
+            <a:schemeClr val="accent1"/>
+          </a:effectRef>
+          <a:fontRef idx="minor">
+            <a:schemeClr val="tx1"/>
+          </a:fontRef>
+        </p:style>
+      </p:cxnSp>
+      <p:cxnSp>
+        <p:nvCxnSpPr>
+          <p:cNvPr id="27" name=""/>
+          <p:cNvCxnSpPr/>
+          <p:nvPr/>
+        </p:nvCxnSpPr>
+        <p:spPr>
+          <a:xfrm flipH="1">
+            <a:off x="9467851" y="3083718"/>
+            <a:ext cx="773906" cy="0"/>
+          </a:xfrm>
+          <a:prstGeom prst="straightConnector1">
+            <a:avLst/>
+          </a:prstGeom>
+          <a:ln w="38100">
+            <a:solidFill>
+              <a:srgbClr val="ff0000"/>
+            </a:solidFill>
+            <a:tailEnd type="arrow"/>
+          </a:ln>
+        </p:spPr>
+        <p:style>
+          <a:lnRef idx="1">
+            <a:schemeClr val="accent1"/>
+          </a:lnRef>
+          <a:fillRef idx="0">
+            <a:schemeClr val="accent1"/>
+          </a:fillRef>
+          <a:effectRef idx="0">
+            <a:schemeClr val="accent1"/>
+          </a:effectRef>
+          <a:fontRef idx="minor">
+            <a:schemeClr val="tx1"/>
+          </a:fontRef>
+        </p:style>
+      </p:cxnSp>
+      <p:grpSp>
+        <p:nvGrpSpPr>
+          <p:cNvPr id="31" name=""/>
+          <p:cNvGrpSpPr/>
+          <p:nvPr/>
+        </p:nvGrpSpPr>
+        <p:grpSpPr>
+          <a:xfrm rot="0">
+            <a:off x="5106427" y="1057305"/>
+            <a:ext cx="4491941" cy="365490"/>
+            <a:chOff x="5183728" y="857280"/>
+            <a:chExt cx="4284122" cy="626931"/>
+          </a:xfrm>
+        </p:grpSpPr>
+        <p:cxnSp>
+          <p:nvCxnSpPr>
+            <p:cNvPr id="28" name=""/>
+            <p:cNvCxnSpPr/>
+            <p:nvPr/>
+          </p:nvCxnSpPr>
+          <p:spPr>
+            <a:xfrm rot="16200000" flipH="1">
+              <a:off x="4879788" y="1170746"/>
+              <a:ext cx="626931" cy="0"/>
+            </a:xfrm>
+            <a:prstGeom prst="line">
+              <a:avLst/>
+            </a:prstGeom>
+            <a:ln w="38100">
+              <a:solidFill>
+                <a:schemeClr val="accent1">
+                  <a:satMod val="105000"/>
+                </a:schemeClr>
+              </a:solidFill>
+            </a:ln>
+          </p:spPr>
+          <p:style>
+            <a:lnRef idx="1">
+              <a:schemeClr val="accent1"/>
+            </a:lnRef>
+            <a:fillRef idx="0">
+              <a:schemeClr val="accent1"/>
+            </a:fillRef>
+            <a:effectRef idx="0">
+              <a:schemeClr val="accent1"/>
+            </a:effectRef>
+            <a:fontRef idx="minor">
+              <a:schemeClr val="tx1"/>
+            </a:fontRef>
+          </p:style>
+        </p:cxnSp>
+        <p:cxnSp>
+          <p:nvCxnSpPr>
+            <p:cNvPr id="29" name=""/>
+            <p:cNvCxnSpPr/>
+            <p:nvPr/>
+          </p:nvCxnSpPr>
+          <p:spPr>
+            <a:xfrm>
+              <a:off x="5183728" y="866805"/>
+              <a:ext cx="4284122" cy="0"/>
+            </a:xfrm>
+            <a:prstGeom prst="line">
+              <a:avLst/>
+            </a:prstGeom>
+            <a:ln w="38100">
+              <a:solidFill>
+                <a:schemeClr val="accent1">
+                  <a:satMod val="105000"/>
+                </a:schemeClr>
+              </a:solidFill>
+            </a:ln>
+          </p:spPr>
+          <p:style>
+            <a:lnRef idx="1">
+              <a:schemeClr val="accent1"/>
+            </a:lnRef>
+            <a:fillRef idx="0">
+              <a:schemeClr val="accent1"/>
+            </a:fillRef>
+            <a:effectRef idx="0">
+              <a:schemeClr val="accent1"/>
+            </a:effectRef>
+            <a:fontRef idx="minor">
+              <a:schemeClr val="tx1"/>
+            </a:fontRef>
+          </p:style>
+        </p:cxnSp>
+        <p:cxnSp>
+          <p:nvCxnSpPr>
+            <p:cNvPr id="30" name=""/>
+            <p:cNvCxnSpPr/>
+            <p:nvPr/>
+          </p:nvCxnSpPr>
+          <p:spPr>
+            <a:xfrm rot="16200000" flipH="1">
+              <a:off x="9144861" y="1170746"/>
+              <a:ext cx="626931" cy="0"/>
+            </a:xfrm>
+            <a:prstGeom prst="line">
+              <a:avLst/>
+            </a:prstGeom>
+            <a:ln w="38100">
+              <a:solidFill>
+                <a:schemeClr val="accent1">
+                  <a:satMod val="105000"/>
+                </a:schemeClr>
+              </a:solidFill>
+            </a:ln>
+          </p:spPr>
+          <p:style>
+            <a:lnRef idx="1">
+              <a:schemeClr val="accent1"/>
+            </a:lnRef>
+            <a:fillRef idx="0">
+              <a:schemeClr val="accent1"/>
+            </a:fillRef>
+            <a:effectRef idx="0">
+              <a:schemeClr val="accent1"/>
+            </a:effectRef>
+            <a:fontRef idx="minor">
+              <a:schemeClr val="tx1"/>
+            </a:fontRef>
+          </p:style>
+        </p:cxnSp>
+      </p:grpSp>
+      <p:sp>
+        <p:nvSpPr>
+          <p:cNvPr id="32" name=""/>
+          <p:cNvSpPr txBox="1"/>
+          <p:nvPr/>
+        </p:nvSpPr>
+        <p:spPr>
+          <a:xfrm>
+            <a:off x="6779094" y="535951"/>
+            <a:ext cx="1146607" cy="367019"/>
+          </a:xfrm>
+          <a:prstGeom prst="rect">
+            <a:avLst/>
+          </a:prstGeom>
+        </p:spPr>
+        <p:txBody>
+          <a:bodyPr wrap="square">
+            <a:spAutoFit/>
+          </a:bodyPr>
+          <a:p>
+            <a:pPr marL="0" indent="0" algn="ctr" defTabSz="914400" rtl="0" eaLnBrk="1" latinLnBrk="1" hangingPunct="1">
+              <a:lnSpc>
+                <a:spcPct val="100000"/>
+              </a:lnSpc>
+              <a:spcBef>
+                <a:spcPct val="0"/>
+              </a:spcBef>
+              <a:spcAft>
+                <a:spcPts val="0"/>
+              </a:spcAft>
+              <a:buNone/>
+              <a:defRPr/>
+            </a:pPr>
+            <a:r>
+              <a:rPr xmlns:mc="http://schemas.openxmlformats.org/markup-compatibility/2006" xmlns:hp="http://schemas.haansoft.com/office/presentation/8.0" kumimoji="0" lang="en-US" altLang="ko-KR" b="1" i="0" u="none" strike="noStrike" kern="1200" cap="none" spc="0" normalizeH="0" baseline="0" mc:Ignorable="hp" hp:hslEmbossed="0">
+                <a:solidFill>
+                  <a:srgbClr val="000000"/>
+                </a:solidFill>
+                <a:latin typeface="Calibri"/>
+                <a:ea typeface="맑은 고딕"/>
+                <a:cs typeface="Times New Roman"/>
+              </a:rPr>
+              <a:t>Model</a:t>
+            </a:r>
+            <a:endParaRPr xmlns:mc="http://schemas.openxmlformats.org/markup-compatibility/2006" xmlns:hp="http://schemas.haansoft.com/office/presentation/8.0" kumimoji="0" lang="en-US" altLang="ko-KR" b="1" i="0" u="none" strike="noStrike" kern="1200" cap="none" spc="0" normalizeH="0" baseline="0" mc:Ignorable="hp" hp:hslEmbossed="0">
+              <a:solidFill>
+                <a:srgbClr val="000000"/>
+              </a:solidFill>
+              <a:latin typeface="Calibri"/>
+              <a:ea typeface="맑은 고딕"/>
+              <a:cs typeface="Times New Roman"/>
+            </a:endParaRPr>
+          </a:p>
+        </p:txBody>
+      </p:sp>
+      <p:sp>
+        <p:nvSpPr>
+          <p:cNvPr id="33" name=""/>
+          <p:cNvSpPr txBox="1"/>
+          <p:nvPr/>
+        </p:nvSpPr>
+        <p:spPr>
+          <a:xfrm>
+            <a:off x="3744516" y="4127590"/>
+            <a:ext cx="1146607" cy="367019"/>
+          </a:xfrm>
+          <a:prstGeom prst="rect">
+            <a:avLst/>
+          </a:prstGeom>
+        </p:spPr>
+        <p:txBody>
+          <a:bodyPr wrap="square">
+            <a:spAutoFit/>
+          </a:bodyPr>
+          <a:p>
+            <a:pPr marL="0" indent="0" algn="ctr" defTabSz="914400" rtl="0" eaLnBrk="1" latinLnBrk="1" hangingPunct="1">
+              <a:lnSpc>
+                <a:spcPct val="100000"/>
+              </a:lnSpc>
+              <a:spcBef>
+                <a:spcPct val="0"/>
+              </a:spcBef>
+              <a:spcAft>
+                <a:spcPts val="0"/>
+              </a:spcAft>
+              <a:buNone/>
+              <a:defRPr/>
+            </a:pPr>
+            <a:r>
+              <a:rPr xmlns:mc="http://schemas.openxmlformats.org/markup-compatibility/2006" xmlns:hp="http://schemas.haansoft.com/office/presentation/8.0" kumimoji="0" lang="en-US" altLang="ko-KR" b="1" i="0" u="none" strike="noStrike" kern="1200" cap="none" spc="0" normalizeH="0" baseline="0" mc:Ignorable="hp" hp:hslEmbossed="0">
+                <a:solidFill>
+                  <a:srgbClr val="000000"/>
+                </a:solidFill>
+                <a:latin typeface="Calibri"/>
+                <a:ea typeface="맑은 고딕"/>
+                <a:cs typeface="Times New Roman"/>
+              </a:rPr>
+              <a:t>View</a:t>
+            </a:r>
+            <a:endParaRPr xmlns:mc="http://schemas.openxmlformats.org/markup-compatibility/2006" xmlns:hp="http://schemas.haansoft.com/office/presentation/8.0" kumimoji="0" lang="en-US" altLang="ko-KR" b="1" i="0" u="none" strike="noStrike" kern="1200" cap="none" spc="0" normalizeH="0" baseline="0" mc:Ignorable="hp" hp:hslEmbossed="0">
               <a:solidFill>
                 <a:srgbClr val="000000"/>
               </a:solidFill>

</xml_diff>

<commit_message>
add image "backend architecture"
</commit_message>
<xml_diff>
--- a/etc/images.pptx
+++ b/etc/images.pptx
@@ -2,7 +2,7 @@
 <file path=ppt/presentation.xml><?xml version="1.0" encoding="utf-8"?>
 <p:presentation xmlns:r="http://schemas.openxmlformats.org/officeDocument/2006/relationships" xmlns:c="http://schemas.openxmlformats.org/drawingml/2006/chart" xmlns:a="http://schemas.openxmlformats.org/drawingml/2006/main" xmlns:dgm="http://schemas.openxmlformats.org/drawingml/2006/diagram" xmlns:dsp="http://schemas.microsoft.com/office/drawing/2008/diagram" xmlns:p="http://schemas.openxmlformats.org/presentationml/2006/main">
   <p:sldMasterIdLst>
-    <p:sldMasterId id="2147483726" r:id="rId1"/>
+    <p:sldMasterId id="2147483720" r:id="rId1"/>
   </p:sldMasterIdLst>
   <p:notesMasterIdLst>
     <p:notesMasterId r:id="rId2"/>
@@ -212,7 +212,7 @@
               <a:pPr lvl="0">
                 <a:defRPr/>
               </a:pPr>
-              <a:t>2019-08-02</a:t>
+              <a:t>2019-08-05</a:t>
             </a:fld>
             <a:endParaRPr lang="ko-KR" altLang="en-US"/>
           </a:p>
@@ -10008,6 +10008,356 @@
                 <a:cs typeface="Times New Roman"/>
               </a:rPr>
               <a:t>View</a:t>
+            </a:r>
+            <a:endParaRPr xmlns:mc="http://schemas.openxmlformats.org/markup-compatibility/2006" xmlns:hp="http://schemas.haansoft.com/office/presentation/8.0" kumimoji="0" lang="en-US" altLang="ko-KR" b="1" i="0" u="none" strike="noStrike" kern="1200" cap="none" spc="0" normalizeH="0" baseline="0" mc:Ignorable="hp" hp:hslEmbossed="0">
+              <a:solidFill>
+                <a:srgbClr val="000000"/>
+              </a:solidFill>
+              <a:latin typeface="Calibri"/>
+              <a:ea typeface="맑은 고딕"/>
+              <a:cs typeface="Times New Roman"/>
+            </a:endParaRPr>
+          </a:p>
+        </p:txBody>
+      </p:sp>
+      <p:grpSp>
+        <p:nvGrpSpPr>
+          <p:cNvPr id="34" name=""/>
+          <p:cNvGrpSpPr/>
+          <p:nvPr/>
+        </p:nvGrpSpPr>
+        <p:grpSpPr>
+          <a:xfrm rot="0" flipV="1">
+            <a:off x="2812831" y="5502489"/>
+            <a:ext cx="1903898" cy="365490"/>
+            <a:chOff x="5183728" y="857280"/>
+            <a:chExt cx="4284122" cy="626931"/>
+          </a:xfrm>
+        </p:grpSpPr>
+        <p:cxnSp>
+          <p:nvCxnSpPr>
+            <p:cNvPr id="35" name=""/>
+            <p:cNvCxnSpPr/>
+            <p:nvPr/>
+          </p:nvCxnSpPr>
+          <p:spPr>
+            <a:xfrm rot="16200000" flipH="1">
+              <a:off x="4879788" y="1170746"/>
+              <a:ext cx="626931" cy="0"/>
+            </a:xfrm>
+            <a:prstGeom prst="line">
+              <a:avLst/>
+            </a:prstGeom>
+            <a:ln w="38100">
+              <a:solidFill>
+                <a:schemeClr val="accent5"/>
+              </a:solidFill>
+            </a:ln>
+          </p:spPr>
+          <p:style>
+            <a:lnRef idx="1">
+              <a:schemeClr val="accent1"/>
+            </a:lnRef>
+            <a:fillRef idx="0">
+              <a:schemeClr val="accent1"/>
+            </a:fillRef>
+            <a:effectRef idx="0">
+              <a:schemeClr val="accent1"/>
+            </a:effectRef>
+            <a:fontRef idx="minor">
+              <a:schemeClr val="tx1"/>
+            </a:fontRef>
+          </p:style>
+        </p:cxnSp>
+        <p:cxnSp>
+          <p:nvCxnSpPr>
+            <p:cNvPr id="36" name=""/>
+            <p:cNvCxnSpPr/>
+            <p:nvPr/>
+          </p:nvCxnSpPr>
+          <p:spPr>
+            <a:xfrm>
+              <a:off x="5183728" y="866805"/>
+              <a:ext cx="4284122" cy="0"/>
+            </a:xfrm>
+            <a:prstGeom prst="line">
+              <a:avLst/>
+            </a:prstGeom>
+            <a:ln w="38100">
+              <a:solidFill>
+                <a:schemeClr val="accent5"/>
+              </a:solidFill>
+            </a:ln>
+          </p:spPr>
+          <p:style>
+            <a:lnRef idx="1">
+              <a:schemeClr val="accent1"/>
+            </a:lnRef>
+            <a:fillRef idx="0">
+              <a:schemeClr val="accent1"/>
+            </a:fillRef>
+            <a:effectRef idx="0">
+              <a:schemeClr val="accent1"/>
+            </a:effectRef>
+            <a:fontRef idx="minor">
+              <a:schemeClr val="tx1"/>
+            </a:fontRef>
+          </p:style>
+        </p:cxnSp>
+        <p:cxnSp>
+          <p:nvCxnSpPr>
+            <p:cNvPr id="37" name=""/>
+            <p:cNvCxnSpPr/>
+            <p:nvPr/>
+          </p:nvCxnSpPr>
+          <p:spPr>
+            <a:xfrm rot="16200000" flipH="1">
+              <a:off x="9144861" y="1170746"/>
+              <a:ext cx="626931" cy="0"/>
+            </a:xfrm>
+            <a:prstGeom prst="line">
+              <a:avLst/>
+            </a:prstGeom>
+            <a:ln w="38100">
+              <a:solidFill>
+                <a:schemeClr val="accent5"/>
+              </a:solidFill>
+            </a:ln>
+          </p:spPr>
+          <p:style>
+            <a:lnRef idx="1">
+              <a:schemeClr val="accent1"/>
+            </a:lnRef>
+            <a:fillRef idx="0">
+              <a:schemeClr val="accent1"/>
+            </a:fillRef>
+            <a:effectRef idx="0">
+              <a:schemeClr val="accent1"/>
+            </a:effectRef>
+            <a:fontRef idx="minor">
+              <a:schemeClr val="tx1"/>
+            </a:fontRef>
+          </p:style>
+        </p:cxnSp>
+      </p:grpSp>
+      <p:sp>
+        <p:nvSpPr>
+          <p:cNvPr id="38" name=""/>
+          <p:cNvSpPr txBox="1"/>
+          <p:nvPr/>
+        </p:nvSpPr>
+        <p:spPr>
+          <a:xfrm>
+            <a:off x="2624363" y="5867979"/>
+            <a:ext cx="2280834" cy="359466"/>
+          </a:xfrm>
+          <a:prstGeom prst="rect">
+            <a:avLst/>
+          </a:prstGeom>
+        </p:spPr>
+        <p:txBody>
+          <a:bodyPr wrap="square">
+            <a:spAutoFit/>
+          </a:bodyPr>
+          <a:p>
+            <a:pPr marL="0" indent="0" algn="ctr" defTabSz="914400" rtl="0" eaLnBrk="1" latinLnBrk="1" hangingPunct="1">
+              <a:lnSpc>
+                <a:spcPct val="100000"/>
+              </a:lnSpc>
+              <a:spcBef>
+                <a:spcPct val="0"/>
+              </a:spcBef>
+              <a:spcAft>
+                <a:spcPts val="0"/>
+              </a:spcAft>
+              <a:buNone/>
+              <a:defRPr/>
+            </a:pPr>
+            <a:r>
+              <a:rPr xmlns:mc="http://schemas.openxmlformats.org/markup-compatibility/2006" xmlns:hp="http://schemas.haansoft.com/office/presentation/8.0" kumimoji="0" lang="en-US" altLang="ko-KR" b="1" i="0" u="none" strike="noStrike" kern="1200" cap="none" spc="0" normalizeH="0" baseline="0" mc:Ignorable="hp" hp:hslEmbossed="0">
+                <a:solidFill>
+                  <a:srgbClr val="000000"/>
+                </a:solidFill>
+                <a:latin typeface="Calibri"/>
+                <a:ea typeface="맑은 고딕"/>
+                <a:cs typeface="Times New Roman"/>
+              </a:rPr>
+              <a:t>Presentation Layer</a:t>
+            </a:r>
+            <a:endParaRPr xmlns:mc="http://schemas.openxmlformats.org/markup-compatibility/2006" xmlns:hp="http://schemas.haansoft.com/office/presentation/8.0" kumimoji="0" lang="en-US" altLang="ko-KR" b="1" i="0" u="none" strike="noStrike" kern="1200" cap="none" spc="0" normalizeH="0" baseline="0" mc:Ignorable="hp" hp:hslEmbossed="0">
+              <a:solidFill>
+                <a:srgbClr val="000000"/>
+              </a:solidFill>
+              <a:latin typeface="Calibri"/>
+              <a:ea typeface="맑은 고딕"/>
+              <a:cs typeface="Times New Roman"/>
+            </a:endParaRPr>
+          </a:p>
+        </p:txBody>
+      </p:sp>
+      <p:grpSp>
+        <p:nvGrpSpPr>
+          <p:cNvPr id="39" name=""/>
+          <p:cNvGrpSpPr/>
+          <p:nvPr/>
+        </p:nvGrpSpPr>
+        <p:grpSpPr>
+          <a:xfrm rot="0" flipV="1">
+            <a:off x="5138695" y="3762100"/>
+            <a:ext cx="2236079" cy="365490"/>
+            <a:chOff x="5183728" y="857280"/>
+            <a:chExt cx="4284122" cy="626931"/>
+          </a:xfrm>
+        </p:grpSpPr>
+        <p:cxnSp>
+          <p:nvCxnSpPr>
+            <p:cNvPr id="40" name=""/>
+            <p:cNvCxnSpPr/>
+            <p:nvPr/>
+          </p:nvCxnSpPr>
+          <p:spPr>
+            <a:xfrm rot="16200000" flipH="1">
+              <a:off x="4879788" y="1170746"/>
+              <a:ext cx="626931" cy="0"/>
+            </a:xfrm>
+            <a:prstGeom prst="line">
+              <a:avLst/>
+            </a:prstGeom>
+            <a:ln w="38100">
+              <a:solidFill>
+                <a:schemeClr val="accent5"/>
+              </a:solidFill>
+            </a:ln>
+          </p:spPr>
+          <p:style>
+            <a:lnRef idx="1">
+              <a:schemeClr val="accent1"/>
+            </a:lnRef>
+            <a:fillRef idx="0">
+              <a:schemeClr val="accent1"/>
+            </a:fillRef>
+            <a:effectRef idx="0">
+              <a:schemeClr val="accent1"/>
+            </a:effectRef>
+            <a:fontRef idx="minor">
+              <a:schemeClr val="tx1"/>
+            </a:fontRef>
+          </p:style>
+        </p:cxnSp>
+        <p:cxnSp>
+          <p:nvCxnSpPr>
+            <p:cNvPr id="41" name=""/>
+            <p:cNvCxnSpPr/>
+            <p:nvPr/>
+          </p:nvCxnSpPr>
+          <p:spPr>
+            <a:xfrm>
+              <a:off x="5183728" y="866805"/>
+              <a:ext cx="4284122" cy="0"/>
+            </a:xfrm>
+            <a:prstGeom prst="line">
+              <a:avLst/>
+            </a:prstGeom>
+            <a:ln w="38100">
+              <a:solidFill>
+                <a:schemeClr val="accent5"/>
+              </a:solidFill>
+            </a:ln>
+          </p:spPr>
+          <p:style>
+            <a:lnRef idx="1">
+              <a:schemeClr val="accent1"/>
+            </a:lnRef>
+            <a:fillRef idx="0">
+              <a:schemeClr val="accent1"/>
+            </a:fillRef>
+            <a:effectRef idx="0">
+              <a:schemeClr val="accent1"/>
+            </a:effectRef>
+            <a:fontRef idx="minor">
+              <a:schemeClr val="tx1"/>
+            </a:fontRef>
+          </p:style>
+        </p:cxnSp>
+        <p:cxnSp>
+          <p:nvCxnSpPr>
+            <p:cNvPr id="42" name=""/>
+            <p:cNvCxnSpPr/>
+            <p:nvPr/>
+          </p:nvCxnSpPr>
+          <p:spPr>
+            <a:xfrm rot="16200000" flipH="1">
+              <a:off x="9144861" y="1170746"/>
+              <a:ext cx="626931" cy="0"/>
+            </a:xfrm>
+            <a:prstGeom prst="line">
+              <a:avLst/>
+            </a:prstGeom>
+            <a:ln w="38100">
+              <a:solidFill>
+                <a:schemeClr val="accent5"/>
+              </a:solidFill>
+            </a:ln>
+          </p:spPr>
+          <p:style>
+            <a:lnRef idx="1">
+              <a:schemeClr val="accent1"/>
+            </a:lnRef>
+            <a:fillRef idx="0">
+              <a:schemeClr val="accent1"/>
+            </a:fillRef>
+            <a:effectRef idx="0">
+              <a:schemeClr val="accent1"/>
+            </a:effectRef>
+            <a:fontRef idx="minor">
+              <a:schemeClr val="tx1"/>
+            </a:fontRef>
+          </p:style>
+        </p:cxnSp>
+      </p:grpSp>
+      <p:sp>
+        <p:nvSpPr>
+          <p:cNvPr id="43" name=""/>
+          <p:cNvSpPr txBox="1"/>
+          <p:nvPr/>
+        </p:nvSpPr>
+        <p:spPr>
+          <a:xfrm>
+            <a:off x="5116318" y="4127590"/>
+            <a:ext cx="2280834" cy="366305"/>
+          </a:xfrm>
+          <a:prstGeom prst="rect">
+            <a:avLst/>
+          </a:prstGeom>
+        </p:spPr>
+        <p:txBody>
+          <a:bodyPr wrap="square">
+            <a:spAutoFit/>
+          </a:bodyPr>
+          <a:p>
+            <a:pPr marL="0" indent="0" algn="ctr" defTabSz="914400" rtl="0" eaLnBrk="1" latinLnBrk="1" hangingPunct="1">
+              <a:lnSpc>
+                <a:spcPct val="100000"/>
+              </a:lnSpc>
+              <a:spcBef>
+                <a:spcPct val="0"/>
+              </a:spcBef>
+              <a:spcAft>
+                <a:spcPts val="0"/>
+              </a:spcAft>
+              <a:buNone/>
+              <a:defRPr/>
+            </a:pPr>
+            <a:r>
+              <a:rPr xmlns:mc="http://schemas.openxmlformats.org/markup-compatibility/2006" xmlns:hp="http://schemas.haansoft.com/office/presentation/8.0" kumimoji="0" lang="en-US" altLang="ko-KR" b="1" i="0" u="none" strike="noStrike" kern="1200" cap="none" spc="0" normalizeH="0" baseline="0" mc:Ignorable="hp" hp:hslEmbossed="0">
+                <a:solidFill>
+                  <a:srgbClr val="000000"/>
+                </a:solidFill>
+                <a:latin typeface="Calibri"/>
+                <a:ea typeface="맑은 고딕"/>
+                <a:cs typeface="Times New Roman"/>
+              </a:rPr>
+              <a:t>Business Layer</a:t>
             </a:r>
             <a:endParaRPr xmlns:mc="http://schemas.openxmlformats.org/markup-compatibility/2006" xmlns:hp="http://schemas.haansoft.com/office/presentation/8.0" kumimoji="0" lang="en-US" altLang="ko-KR" b="1" i="0" u="none" strike="noStrike" kern="1200" cap="none" spc="0" normalizeH="0" baseline="0" mc:Ignorable="hp" hp:hslEmbossed="0">
               <a:solidFill>

</xml_diff>

<commit_message>
add image "data access layer"
</commit_message>
<xml_diff>
--- a/etc/images.pptx
+++ b/etc/images.pptx
@@ -2,7 +2,7 @@
 <file path=ppt/presentation.xml><?xml version="1.0" encoding="utf-8"?>
 <p:presentation xmlns:r="http://schemas.openxmlformats.org/officeDocument/2006/relationships" xmlns:c="http://schemas.openxmlformats.org/drawingml/2006/chart" xmlns:a="http://schemas.openxmlformats.org/drawingml/2006/main" xmlns:dgm="http://schemas.openxmlformats.org/drawingml/2006/diagram" xmlns:dsp="http://schemas.microsoft.com/office/drawing/2008/diagram" xmlns:p="http://schemas.openxmlformats.org/presentationml/2006/main">
   <p:sldMasterIdLst>
-    <p:sldMasterId id="2147483720" r:id="rId1"/>
+    <p:sldMasterId id="2147483736" r:id="rId1"/>
   </p:sldMasterIdLst>
   <p:notesMasterIdLst>
     <p:notesMasterId r:id="rId2"/>
@@ -16,6 +16,7 @@
     <p:sldId id="261" r:id="rId8"/>
     <p:sldId id="262" r:id="rId9"/>
     <p:sldId id="263" r:id="rId10"/>
+    <p:sldId id="264" r:id="rId11"/>
   </p:sldIdLst>
   <p:sldSz cx="12192000" cy="6858000"/>
   <p:notesSz cx="6858000" cy="9144000"/>
@@ -9411,7 +9412,7 @@
         </p:nvSpPr>
         <p:spPr>
           <a:xfrm>
-            <a:off x="3171213" y="535951"/>
+            <a:off x="3171213" y="694979"/>
             <a:ext cx="1146607" cy="367019"/>
           </a:xfrm>
           <a:prstGeom prst="rect">
@@ -9792,7 +9793,7 @@
         </p:nvGrpSpPr>
         <p:grpSpPr>
           <a:xfrm rot="0">
-            <a:off x="5106427" y="1057305"/>
+            <a:off x="5140089" y="1061998"/>
             <a:ext cx="4491941" cy="365490"/>
             <a:chOff x="5183728" y="857280"/>
             <a:chExt cx="4284122" cy="626931"/>
@@ -9918,7 +9919,7 @@
         </p:nvSpPr>
         <p:spPr>
           <a:xfrm>
-            <a:off x="6779094" y="535951"/>
+            <a:off x="6888956" y="694979"/>
             <a:ext cx="1146607" cy="367019"/>
           </a:xfrm>
           <a:prstGeom prst="rect">
@@ -10370,6 +10371,1097 @@
           </a:p>
         </p:txBody>
       </p:sp>
+      <p:grpSp>
+        <p:nvGrpSpPr>
+          <p:cNvPr id="44" name=""/>
+          <p:cNvGrpSpPr/>
+          <p:nvPr/>
+        </p:nvGrpSpPr>
+        <p:grpSpPr>
+          <a:xfrm rot="0" flipV="1">
+            <a:off x="7891996" y="3762814"/>
+            <a:ext cx="1740034" cy="365490"/>
+            <a:chOff x="5183728" y="857280"/>
+            <a:chExt cx="4284122" cy="626931"/>
+          </a:xfrm>
+        </p:grpSpPr>
+        <p:cxnSp>
+          <p:nvCxnSpPr>
+            <p:cNvPr id="45" name=""/>
+            <p:cNvCxnSpPr/>
+            <p:nvPr/>
+          </p:nvCxnSpPr>
+          <p:spPr>
+            <a:xfrm rot="16200000" flipH="1">
+              <a:off x="4879788" y="1170746"/>
+              <a:ext cx="626931" cy="0"/>
+            </a:xfrm>
+            <a:prstGeom prst="line">
+              <a:avLst/>
+            </a:prstGeom>
+            <a:ln w="38100">
+              <a:solidFill>
+                <a:schemeClr val="accent5"/>
+              </a:solidFill>
+            </a:ln>
+          </p:spPr>
+          <p:style>
+            <a:lnRef idx="1">
+              <a:schemeClr val="accent1"/>
+            </a:lnRef>
+            <a:fillRef idx="0">
+              <a:schemeClr val="accent1"/>
+            </a:fillRef>
+            <a:effectRef idx="0">
+              <a:schemeClr val="accent1"/>
+            </a:effectRef>
+            <a:fontRef idx="minor">
+              <a:schemeClr val="tx1"/>
+            </a:fontRef>
+          </p:style>
+        </p:cxnSp>
+        <p:cxnSp>
+          <p:nvCxnSpPr>
+            <p:cNvPr id="46" name=""/>
+            <p:cNvCxnSpPr/>
+            <p:nvPr/>
+          </p:nvCxnSpPr>
+          <p:spPr>
+            <a:xfrm>
+              <a:off x="5183728" y="866805"/>
+              <a:ext cx="4284122" cy="0"/>
+            </a:xfrm>
+            <a:prstGeom prst="line">
+              <a:avLst/>
+            </a:prstGeom>
+            <a:ln w="38100">
+              <a:solidFill>
+                <a:schemeClr val="accent5"/>
+              </a:solidFill>
+            </a:ln>
+          </p:spPr>
+          <p:style>
+            <a:lnRef idx="1">
+              <a:schemeClr val="accent1"/>
+            </a:lnRef>
+            <a:fillRef idx="0">
+              <a:schemeClr val="accent1"/>
+            </a:fillRef>
+            <a:effectRef idx="0">
+              <a:schemeClr val="accent1"/>
+            </a:effectRef>
+            <a:fontRef idx="minor">
+              <a:schemeClr val="tx1"/>
+            </a:fontRef>
+          </p:style>
+        </p:cxnSp>
+        <p:cxnSp>
+          <p:nvCxnSpPr>
+            <p:cNvPr id="47" name=""/>
+            <p:cNvCxnSpPr/>
+            <p:nvPr/>
+          </p:nvCxnSpPr>
+          <p:spPr>
+            <a:xfrm rot="16200000" flipH="1">
+              <a:off x="9144861" y="1170746"/>
+              <a:ext cx="626931" cy="0"/>
+            </a:xfrm>
+            <a:prstGeom prst="line">
+              <a:avLst/>
+            </a:prstGeom>
+            <a:ln w="38100">
+              <a:solidFill>
+                <a:schemeClr val="accent5"/>
+              </a:solidFill>
+            </a:ln>
+          </p:spPr>
+          <p:style>
+            <a:lnRef idx="1">
+              <a:schemeClr val="accent1"/>
+            </a:lnRef>
+            <a:fillRef idx="0">
+              <a:schemeClr val="accent1"/>
+            </a:fillRef>
+            <a:effectRef idx="0">
+              <a:schemeClr val="accent1"/>
+            </a:effectRef>
+            <a:fontRef idx="minor">
+              <a:schemeClr val="tx1"/>
+            </a:fontRef>
+          </p:style>
+        </p:cxnSp>
+      </p:grpSp>
+      <p:sp>
+        <p:nvSpPr>
+          <p:cNvPr id="48" name=""/>
+          <p:cNvSpPr txBox="1"/>
+          <p:nvPr/>
+        </p:nvSpPr>
+        <p:spPr>
+          <a:xfrm>
+            <a:off x="7764456" y="4128304"/>
+            <a:ext cx="1985186" cy="365591"/>
+          </a:xfrm>
+          <a:prstGeom prst="rect">
+            <a:avLst/>
+          </a:prstGeom>
+        </p:spPr>
+        <p:txBody>
+          <a:bodyPr wrap="square">
+            <a:spAutoFit/>
+          </a:bodyPr>
+          <a:p>
+            <a:pPr marL="0" indent="0" algn="ctr" defTabSz="914400" rtl="0" eaLnBrk="1" latinLnBrk="1" hangingPunct="1">
+              <a:lnSpc>
+                <a:spcPct val="100000"/>
+              </a:lnSpc>
+              <a:spcBef>
+                <a:spcPct val="0"/>
+              </a:spcBef>
+              <a:spcAft>
+                <a:spcPts val="0"/>
+              </a:spcAft>
+              <a:buNone/>
+              <a:defRPr/>
+            </a:pPr>
+            <a:r>
+              <a:rPr xmlns:mc="http://schemas.openxmlformats.org/markup-compatibility/2006" xmlns:hp="http://schemas.haansoft.com/office/presentation/8.0" kumimoji="0" lang="en-US" altLang="ko-KR" b="1" i="0" u="none" strike="noStrike" kern="1200" cap="none" spc="0" normalizeH="0" baseline="0" mc:Ignorable="hp" hp:hslEmbossed="0">
+                <a:solidFill>
+                  <a:srgbClr val="000000"/>
+                </a:solidFill>
+                <a:latin typeface="Calibri"/>
+                <a:ea typeface="맑은 고딕"/>
+                <a:cs typeface="Times New Roman"/>
+              </a:rPr>
+              <a:t>Persistence Layer</a:t>
+            </a:r>
+            <a:endParaRPr xmlns:mc="http://schemas.openxmlformats.org/markup-compatibility/2006" xmlns:hp="http://schemas.haansoft.com/office/presentation/8.0" kumimoji="0" lang="en-US" altLang="ko-KR" b="1" i="0" u="none" strike="noStrike" kern="1200" cap="none" spc="0" normalizeH="0" baseline="0" mc:Ignorable="hp" hp:hslEmbossed="0">
+              <a:solidFill>
+                <a:srgbClr val="000000"/>
+              </a:solidFill>
+              <a:latin typeface="Calibri"/>
+              <a:ea typeface="맑은 고딕"/>
+              <a:cs typeface="Times New Roman"/>
+            </a:endParaRPr>
+          </a:p>
+        </p:txBody>
+      </p:sp>
+    </p:spTree>
+  </p:cSld>
+  <p:clrMapOvr>
+    <a:masterClrMapping/>
+  </p:clrMapOvr>
+  <mc:AlternateContent xmlns:mc="http://schemas.openxmlformats.org/markup-compatibility/2006">
+    <mc:Choice xmlns:p14="http://schemas.microsoft.com/office/powerpoint/2010/main" Requires="p14">
+      <p:transition xmlns:mc="http://schemas.openxmlformats.org/markup-compatibility/2006" xmlns:p14="http://schemas.microsoft.com/office/powerpoint/2010/main" mc:Ignorable="p14" p14:dur="500"/>
+    </mc:Choice>
+    <mc:Fallback>
+      <p:transition/>
+    </mc:Fallback>
+  </mc:AlternateContent>
+</p:sld>
+</file>
+
+<file path=ppt/slides/slide9.xml><?xml version="1.0" encoding="utf-8"?>
+<p:sld xmlns:r="http://schemas.openxmlformats.org/officeDocument/2006/relationships" xmlns:c="http://schemas.openxmlformats.org/drawingml/2006/chart" xmlns:a="http://schemas.openxmlformats.org/drawingml/2006/main" xmlns:dgm="http://schemas.openxmlformats.org/drawingml/2006/diagram" xmlns:dsp="http://schemas.microsoft.com/office/drawing/2008/diagram" xmlns:p="http://schemas.openxmlformats.org/presentationml/2006/main">
+  <p:cSld>
+    <p:spTree>
+      <p:nvGrpSpPr>
+        <p:cNvPr id="1" name=""/>
+        <p:cNvGrpSpPr/>
+        <p:nvPr/>
+      </p:nvGrpSpPr>
+      <p:grpSpPr>
+        <a:xfrm>
+          <a:off x="0" y="0"/>
+          <a:ext cx="0" cy="0"/>
+          <a:chOff x="0" y="0"/>
+          <a:chExt cx="0" cy="0"/>
+        </a:xfrm>
+      </p:grpSpPr>
+      <p:sp>
+        <p:nvSpPr>
+          <p:cNvPr id="4" name=""/>
+          <p:cNvSpPr txBox="1"/>
+          <p:nvPr/>
+        </p:nvSpPr>
+        <p:spPr>
+          <a:xfrm>
+            <a:off x="318374" y="1445972"/>
+            <a:ext cx="2343083" cy="450127"/>
+          </a:xfrm>
+          <a:prstGeom prst="rect">
+            <a:avLst/>
+          </a:prstGeom>
+        </p:spPr>
+        <p:txBody>
+          <a:bodyPr wrap="square">
+            <a:spAutoFit/>
+          </a:bodyPr>
+          <a:p>
+            <a:pPr marL="0" indent="0" algn="ctr" defTabSz="914400" rtl="0" eaLnBrk="1" latinLnBrk="1" hangingPunct="1">
+              <a:lnSpc>
+                <a:spcPct val="100000"/>
+              </a:lnSpc>
+              <a:spcBef>
+                <a:spcPct val="0"/>
+              </a:spcBef>
+              <a:spcAft>
+                <a:spcPts val="0"/>
+              </a:spcAft>
+              <a:buNone/>
+              <a:defRPr/>
+            </a:pPr>
+            <a:r>
+              <a:rPr xmlns:mc="http://schemas.openxmlformats.org/markup-compatibility/2006" xmlns:hp="http://schemas.haansoft.com/office/presentation/8.0" kumimoji="0" lang="en-US" altLang="ko-KR" sz="2400" b="1" i="0" u="none" strike="noStrike" kern="1200" cap="none" spc="0" normalizeH="0" baseline="0" mc:Ignorable="hp" hp:hslEmbossed="0">
+                <a:solidFill>
+                  <a:srgbClr val="000000"/>
+                </a:solidFill>
+                <a:latin typeface="Calibri"/>
+                <a:ea typeface="맑은 고딕"/>
+                <a:cs typeface="Times New Roman"/>
+              </a:rPr>
+              <a:t>Application</a:t>
+            </a:r>
+            <a:endParaRPr xmlns:mc="http://schemas.openxmlformats.org/markup-compatibility/2006" xmlns:hp="http://schemas.haansoft.com/office/presentation/8.0" kumimoji="0" lang="en-US" altLang="ko-KR" sz="2400" b="1" i="0" u="none" strike="noStrike" kern="1200" cap="none" spc="0" normalizeH="0" baseline="0" mc:Ignorable="hp" hp:hslEmbossed="0">
+              <a:solidFill>
+                <a:srgbClr val="000000"/>
+              </a:solidFill>
+              <a:latin typeface="Calibri"/>
+              <a:ea typeface="맑은 고딕"/>
+              <a:cs typeface="Times New Roman"/>
+            </a:endParaRPr>
+          </a:p>
+        </p:txBody>
+      </p:sp>
+      <p:sp>
+        <p:nvSpPr>
+          <p:cNvPr id="5" name=""/>
+          <p:cNvSpPr/>
+          <p:nvPr/>
+        </p:nvSpPr>
+        <p:spPr>
+          <a:xfrm>
+            <a:off x="604899" y="2052760"/>
+            <a:ext cx="1795100" cy="1128741"/>
+          </a:xfrm>
+          <a:prstGeom prst="roundRect">
+            <a:avLst>
+              <a:gd name="adj" fmla="val 16667"/>
+            </a:avLst>
+          </a:prstGeom>
+          <a:solidFill>
+            <a:srgbClr val="6182d6">
+              <a:alpha val="100000"/>
+            </a:srgbClr>
+          </a:solidFill>
+          <a:ln w="19050" cap="flat" cmpd="sng" algn="ctr">
+            <a:solidFill>
+              <a:srgbClr val="2e3e67">
+                <a:alpha val="100000"/>
+              </a:srgbClr>
+            </a:solidFill>
+            <a:prstDash val="solid"/>
+          </a:ln>
+        </p:spPr>
+        <p:txBody>
+          <a:bodyPr anchor="ctr"/>
+          <a:p>
+            <a:pPr marL="0" indent="0" algn="ctr" defTabSz="914400" rtl="0" eaLnBrk="1" latinLnBrk="1" hangingPunct="1">
+              <a:lnSpc>
+                <a:spcPct val="100000"/>
+              </a:lnSpc>
+              <a:spcBef>
+                <a:spcPct val="0"/>
+              </a:spcBef>
+              <a:spcAft>
+                <a:spcPts val="0"/>
+              </a:spcAft>
+              <a:buNone/>
+              <a:defRPr/>
+            </a:pPr>
+            <a:r>
+              <a:rPr xmlns:mc="http://schemas.openxmlformats.org/markup-compatibility/2006" xmlns:hp="http://schemas.haansoft.com/office/presentation/8.0" kumimoji="0" lang="en-US" altLang="ko-KR" sz="2000" b="0" i="0" u="none" strike="noStrike" kern="1200" cap="none" spc="0" normalizeH="0" baseline="0" mc:Ignorable="hp" hp:hslEmbossed="0">
+                <a:solidFill>
+                  <a:srgbClr val="ffffff"/>
+                </a:solidFill>
+                <a:latin typeface="Calibri"/>
+                <a:ea typeface="맑은 고딕"/>
+                <a:cs typeface="Times New Roman"/>
+              </a:rPr>
+              <a:t>DAO</a:t>
+            </a:r>
+            <a:endParaRPr xmlns:mc="http://schemas.openxmlformats.org/markup-compatibility/2006" xmlns:hp="http://schemas.haansoft.com/office/presentation/8.0" kumimoji="0" lang="en-US" altLang="ko-KR" sz="2000" b="0" i="0" u="none" strike="noStrike" kern="1200" cap="none" spc="0" normalizeH="0" baseline="0" mc:Ignorable="hp" hp:hslEmbossed="0">
+              <a:solidFill>
+                <a:srgbClr val="ffffff"/>
+              </a:solidFill>
+              <a:latin typeface="Calibri"/>
+              <a:ea typeface="맑은 고딕"/>
+              <a:cs typeface="Times New Roman"/>
+            </a:endParaRPr>
+          </a:p>
+        </p:txBody>
+      </p:sp>
+      <p:cxnSp>
+        <p:nvCxnSpPr>
+          <p:cNvPr id="6" name=""/>
+          <p:cNvCxnSpPr/>
+          <p:nvPr/>
+        </p:nvCxnSpPr>
+        <p:spPr>
+          <a:xfrm rot="16200000" flipH="1">
+            <a:off x="461195" y="3428999"/>
+            <a:ext cx="5044536" cy="0"/>
+          </a:xfrm>
+          <a:prstGeom prst="line">
+            <a:avLst/>
+          </a:prstGeom>
+          <a:noFill/>
+          <a:ln w="12700" cap="flat" cmpd="sng" algn="ctr">
+            <a:solidFill>
+              <a:srgbClr val="808080">
+                <a:alpha val="100000"/>
+              </a:srgbClr>
+            </a:solidFill>
+            <a:prstDash val="solid"/>
+          </a:ln>
+        </p:spPr>
+      </p:cxnSp>
+      <p:sp>
+        <p:nvSpPr>
+          <p:cNvPr id="7" name=""/>
+          <p:cNvSpPr txBox="1"/>
+          <p:nvPr/>
+        </p:nvSpPr>
+        <p:spPr>
+          <a:xfrm>
+            <a:off x="3383197" y="1445971"/>
+            <a:ext cx="2343083" cy="450127"/>
+          </a:xfrm>
+          <a:prstGeom prst="rect">
+            <a:avLst/>
+          </a:prstGeom>
+        </p:spPr>
+        <p:txBody>
+          <a:bodyPr wrap="square">
+            <a:spAutoFit/>
+          </a:bodyPr>
+          <a:p>
+            <a:pPr marL="0" indent="0" algn="ctr" defTabSz="914400" rtl="0" eaLnBrk="1" latinLnBrk="1" hangingPunct="1">
+              <a:lnSpc>
+                <a:spcPct val="100000"/>
+              </a:lnSpc>
+              <a:spcBef>
+                <a:spcPct val="0"/>
+              </a:spcBef>
+              <a:spcAft>
+                <a:spcPts val="0"/>
+              </a:spcAft>
+              <a:buNone/>
+              <a:defRPr/>
+            </a:pPr>
+            <a:r>
+              <a:rPr xmlns:mc="http://schemas.openxmlformats.org/markup-compatibility/2006" xmlns:hp="http://schemas.haansoft.com/office/presentation/8.0" kumimoji="0" lang="en-US" altLang="ko-KR" sz="2400" b="1" i="0" u="none" strike="noStrike" kern="1200" cap="none" spc="0" normalizeH="0" baseline="0" mc:Ignorable="hp" hp:hslEmbossed="0">
+                <a:solidFill>
+                  <a:srgbClr val="000000"/>
+                </a:solidFill>
+                <a:latin typeface="Calibri"/>
+                <a:ea typeface="맑은 고딕"/>
+                <a:cs typeface="Times New Roman"/>
+              </a:rPr>
+              <a:t>JDBC Interface</a:t>
+            </a:r>
+            <a:endParaRPr xmlns:mc="http://schemas.openxmlformats.org/markup-compatibility/2006" xmlns:hp="http://schemas.haansoft.com/office/presentation/8.0" kumimoji="0" lang="en-US" altLang="ko-KR" sz="2400" b="1" i="0" u="none" strike="noStrike" kern="1200" cap="none" spc="0" normalizeH="0" baseline="0" mc:Ignorable="hp" hp:hslEmbossed="0">
+              <a:solidFill>
+                <a:srgbClr val="000000"/>
+              </a:solidFill>
+              <a:latin typeface="Calibri"/>
+              <a:ea typeface="맑은 고딕"/>
+              <a:cs typeface="Times New Roman"/>
+            </a:endParaRPr>
+          </a:p>
+        </p:txBody>
+      </p:sp>
+      <p:sp>
+        <p:nvSpPr>
+          <p:cNvPr id="8" name=""/>
+          <p:cNvSpPr/>
+          <p:nvPr/>
+        </p:nvSpPr>
+        <p:spPr>
+          <a:xfrm>
+            <a:off x="3669722" y="2052760"/>
+            <a:ext cx="1795100" cy="1128741"/>
+          </a:xfrm>
+          <a:prstGeom prst="roundRect">
+            <a:avLst>
+              <a:gd name="adj" fmla="val 16667"/>
+            </a:avLst>
+          </a:prstGeom>
+          <a:solidFill>
+            <a:srgbClr val="eb5800">
+              <a:alpha val="100000"/>
+            </a:srgbClr>
+          </a:solidFill>
+          <a:ln w="19050" cap="flat" cmpd="sng" algn="ctr">
+            <a:solidFill>
+              <a:srgbClr val="2e3e67">
+                <a:alpha val="100000"/>
+              </a:srgbClr>
+            </a:solidFill>
+            <a:prstDash val="solid"/>
+          </a:ln>
+        </p:spPr>
+        <p:txBody>
+          <a:bodyPr anchor="ctr"/>
+          <a:p>
+            <a:pPr marL="0" indent="0" algn="ctr" defTabSz="914400" rtl="0" eaLnBrk="1" latinLnBrk="1" hangingPunct="1">
+              <a:lnSpc>
+                <a:spcPct val="100000"/>
+              </a:lnSpc>
+              <a:spcBef>
+                <a:spcPct val="0"/>
+              </a:spcBef>
+              <a:spcAft>
+                <a:spcPts val="0"/>
+              </a:spcAft>
+              <a:buNone/>
+              <a:defRPr/>
+            </a:pPr>
+            <a:r>
+              <a:rPr xmlns:mc="http://schemas.openxmlformats.org/markup-compatibility/2006" xmlns:hp="http://schemas.haansoft.com/office/presentation/8.0" kumimoji="0" lang="en-US" altLang="ko-KR" sz="2000" b="0" i="0" u="none" strike="noStrike" kern="1200" cap="none" spc="0" normalizeH="0" baseline="0" mc:Ignorable="hp" hp:hslEmbossed="0">
+                <a:solidFill>
+                  <a:srgbClr val="ffffff"/>
+                </a:solidFill>
+                <a:latin typeface="Calibri"/>
+                <a:ea typeface="맑은 고딕"/>
+                <a:cs typeface="Times New Roman"/>
+              </a:rPr>
+              <a:t>JDBC Template</a:t>
+            </a:r>
+            <a:endParaRPr xmlns:mc="http://schemas.openxmlformats.org/markup-compatibility/2006" xmlns:hp="http://schemas.haansoft.com/office/presentation/8.0" kumimoji="0" lang="en-US" altLang="ko-KR" sz="2000" b="0" i="0" u="none" strike="noStrike" kern="1200" cap="none" spc="0" normalizeH="0" baseline="0" mc:Ignorable="hp" hp:hslEmbossed="0">
+              <a:solidFill>
+                <a:srgbClr val="ffffff"/>
+              </a:solidFill>
+              <a:latin typeface="Calibri"/>
+              <a:ea typeface="맑은 고딕"/>
+              <a:cs typeface="Times New Roman"/>
+            </a:endParaRPr>
+          </a:p>
+        </p:txBody>
+      </p:sp>
+      <p:sp>
+        <p:nvSpPr>
+          <p:cNvPr id="9" name=""/>
+          <p:cNvSpPr txBox="1"/>
+          <p:nvPr/>
+        </p:nvSpPr>
+        <p:spPr>
+          <a:xfrm>
+            <a:off x="6453757" y="1074289"/>
+            <a:ext cx="2480946" cy="821809"/>
+          </a:xfrm>
+          <a:prstGeom prst="rect">
+            <a:avLst/>
+          </a:prstGeom>
+        </p:spPr>
+        <p:txBody>
+          <a:bodyPr wrap="square">
+            <a:spAutoFit/>
+          </a:bodyPr>
+          <a:p>
+            <a:pPr marL="0" indent="0" algn="ctr" defTabSz="914400" rtl="0" eaLnBrk="1" latinLnBrk="1" hangingPunct="1">
+              <a:lnSpc>
+                <a:spcPct val="100000"/>
+              </a:lnSpc>
+              <a:spcBef>
+                <a:spcPct val="0"/>
+              </a:spcBef>
+              <a:spcAft>
+                <a:spcPts val="0"/>
+              </a:spcAft>
+              <a:buNone/>
+              <a:defRPr/>
+            </a:pPr>
+            <a:r>
+              <a:rPr xmlns:mc="http://schemas.openxmlformats.org/markup-compatibility/2006" xmlns:hp="http://schemas.haansoft.com/office/presentation/8.0" kumimoji="0" lang="en-US" altLang="ko-KR" sz="2400" b="1" i="0" u="none" strike="noStrike" kern="1200" cap="none" spc="0" normalizeH="0" baseline="0" mc:Ignorable="hp" hp:hslEmbossed="0">
+                <a:solidFill>
+                  <a:srgbClr val="000000"/>
+                </a:solidFill>
+                <a:latin typeface="Calibri"/>
+                <a:ea typeface="맑은 고딕"/>
+                <a:cs typeface="Times New Roman"/>
+              </a:rPr>
+              <a:t>JDBC Implementations</a:t>
+            </a:r>
+            <a:endParaRPr xmlns:mc="http://schemas.openxmlformats.org/markup-compatibility/2006" xmlns:hp="http://schemas.haansoft.com/office/presentation/8.0" kumimoji="0" lang="en-US" altLang="ko-KR" sz="2400" b="1" i="0" u="none" strike="noStrike" kern="1200" cap="none" spc="0" normalizeH="0" baseline="0" mc:Ignorable="hp" hp:hslEmbossed="0">
+              <a:solidFill>
+                <a:srgbClr val="000000"/>
+              </a:solidFill>
+              <a:latin typeface="Calibri"/>
+              <a:ea typeface="맑은 고딕"/>
+              <a:cs typeface="Times New Roman"/>
+            </a:endParaRPr>
+          </a:p>
+        </p:txBody>
+      </p:sp>
+      <p:sp>
+        <p:nvSpPr>
+          <p:cNvPr id="10" name=""/>
+          <p:cNvSpPr/>
+          <p:nvPr/>
+        </p:nvSpPr>
+        <p:spPr>
+          <a:xfrm>
+            <a:off x="6796679" y="2052760"/>
+            <a:ext cx="1795100" cy="1128741"/>
+          </a:xfrm>
+          <a:prstGeom prst="roundRect">
+            <a:avLst>
+              <a:gd name="adj" fmla="val 16667"/>
+            </a:avLst>
+          </a:prstGeom>
+          <a:solidFill>
+            <a:srgbClr val="800080">
+              <a:alpha val="100000"/>
+            </a:srgbClr>
+          </a:solidFill>
+          <a:ln w="19050" cap="flat" cmpd="sng" algn="ctr">
+            <a:solidFill>
+              <a:srgbClr val="2e3e67">
+                <a:alpha val="100000"/>
+              </a:srgbClr>
+            </a:solidFill>
+            <a:prstDash val="solid"/>
+          </a:ln>
+        </p:spPr>
+        <p:txBody>
+          <a:bodyPr anchor="ctr"/>
+          <a:p>
+            <a:pPr marL="0" indent="0" algn="ctr" defTabSz="914400" rtl="0" eaLnBrk="1" latinLnBrk="1" hangingPunct="1">
+              <a:lnSpc>
+                <a:spcPct val="100000"/>
+              </a:lnSpc>
+              <a:spcBef>
+                <a:spcPct val="0"/>
+              </a:spcBef>
+              <a:spcAft>
+                <a:spcPts val="0"/>
+              </a:spcAft>
+              <a:buNone/>
+              <a:defRPr/>
+            </a:pPr>
+            <a:r>
+              <a:rPr xmlns:mc="http://schemas.openxmlformats.org/markup-compatibility/2006" xmlns:hp="http://schemas.haansoft.com/office/presentation/8.0" kumimoji="0" lang="en-US" altLang="ko-KR" sz="2000" b="0" i="0" u="none" strike="noStrike" kern="1200" cap="none" spc="0" normalizeH="0" baseline="0" mc:Ignorable="hp" hp:hslEmbossed="0">
+                <a:solidFill>
+                  <a:srgbClr val="ffffff"/>
+                </a:solidFill>
+                <a:latin typeface="Calibri"/>
+                <a:ea typeface="맑은 고딕"/>
+                <a:cs typeface="Times New Roman"/>
+              </a:rPr>
+              <a:t>JDBC Driver</a:t>
+            </a:r>
+            <a:endParaRPr xmlns:mc="http://schemas.openxmlformats.org/markup-compatibility/2006" xmlns:hp="http://schemas.haansoft.com/office/presentation/8.0" kumimoji="0" lang="en-US" altLang="ko-KR" sz="2000" b="0" i="0" u="none" strike="noStrike" kern="1200" cap="none" spc="0" normalizeH="0" baseline="0" mc:Ignorable="hp" hp:hslEmbossed="0">
+              <a:solidFill>
+                <a:srgbClr val="ffffff"/>
+              </a:solidFill>
+              <a:latin typeface="Calibri"/>
+              <a:ea typeface="맑은 고딕"/>
+              <a:cs typeface="Times New Roman"/>
+            </a:endParaRPr>
+          </a:p>
+        </p:txBody>
+      </p:sp>
+      <p:cxnSp>
+        <p:nvCxnSpPr>
+          <p:cNvPr id="11" name=""/>
+          <p:cNvCxnSpPr/>
+          <p:nvPr/>
+        </p:nvCxnSpPr>
+        <p:spPr>
+          <a:xfrm rot="16200000" flipH="1">
+            <a:off x="3663351" y="3428999"/>
+            <a:ext cx="5044536" cy="0"/>
+          </a:xfrm>
+          <a:prstGeom prst="line">
+            <a:avLst/>
+          </a:prstGeom>
+          <a:noFill/>
+          <a:ln w="12700" cap="flat" cmpd="sng" algn="ctr">
+            <a:solidFill>
+              <a:srgbClr val="808080">
+                <a:alpha val="100000"/>
+              </a:srgbClr>
+            </a:solidFill>
+            <a:prstDash val="solid"/>
+          </a:ln>
+        </p:spPr>
+      </p:cxnSp>
+      <p:cxnSp>
+        <p:nvCxnSpPr>
+          <p:cNvPr id="12" name=""/>
+          <p:cNvCxnSpPr/>
+          <p:nvPr/>
+        </p:nvCxnSpPr>
+        <p:spPr>
+          <a:xfrm rot="16200000" flipH="1">
+            <a:off x="6733908" y="3428999"/>
+            <a:ext cx="5044536" cy="0"/>
+          </a:xfrm>
+          <a:prstGeom prst="line">
+            <a:avLst/>
+          </a:prstGeom>
+          <a:noFill/>
+          <a:ln w="12700" cap="flat" cmpd="sng" algn="ctr">
+            <a:solidFill>
+              <a:srgbClr val="808080">
+                <a:alpha val="100000"/>
+              </a:srgbClr>
+            </a:solidFill>
+            <a:prstDash val="solid"/>
+          </a:ln>
+        </p:spPr>
+      </p:cxnSp>
+      <p:sp>
+        <p:nvSpPr>
+          <p:cNvPr id="13" name=""/>
+          <p:cNvSpPr/>
+          <p:nvPr/>
+        </p:nvSpPr>
+        <p:spPr>
+          <a:xfrm>
+            <a:off x="9966785" y="2052760"/>
+            <a:ext cx="1558464" cy="1128741"/>
+          </a:xfrm>
+          <a:prstGeom prst="can">
+            <a:avLst>
+              <a:gd name="adj" fmla="val 25000"/>
+            </a:avLst>
+          </a:prstGeom>
+          <a:solidFill>
+            <a:srgbClr val="289b6e">
+              <a:alpha val="100000"/>
+            </a:srgbClr>
+          </a:solidFill>
+          <a:ln w="19050" cap="flat" cmpd="sng" algn="ctr">
+            <a:solidFill>
+              <a:srgbClr val="134a34">
+                <a:alpha val="100000"/>
+              </a:srgbClr>
+            </a:solidFill>
+            <a:prstDash val="solid"/>
+          </a:ln>
+        </p:spPr>
+        <p:txBody>
+          <a:bodyPr anchor="ctr"/>
+          <a:p>
+            <a:pPr marL="0" indent="0" algn="ctr" defTabSz="914400" rtl="0" eaLnBrk="1" latinLnBrk="1" hangingPunct="1">
+              <a:lnSpc>
+                <a:spcPct val="100000"/>
+              </a:lnSpc>
+              <a:spcBef>
+                <a:spcPct val="0"/>
+              </a:spcBef>
+              <a:spcAft>
+                <a:spcPts val="0"/>
+              </a:spcAft>
+              <a:buNone/>
+              <a:defRPr/>
+            </a:pPr>
+            <a:r>
+              <a:rPr xmlns:mc="http://schemas.openxmlformats.org/markup-compatibility/2006" xmlns:hp="http://schemas.haansoft.com/office/presentation/8.0" kumimoji="0" lang="en-US" altLang="ko-KR" sz="2000" b="0" i="0" u="none" strike="noStrike" kern="1200" cap="none" spc="0" normalizeH="0" baseline="0" mc:Ignorable="hp" hp:hslEmbossed="0">
+                <a:solidFill>
+                  <a:srgbClr val="ffffff"/>
+                </a:solidFill>
+                <a:latin typeface="Calibri"/>
+                <a:ea typeface="맑은 고딕"/>
+                <a:cs typeface="Times New Roman"/>
+              </a:rPr>
+              <a:t>Database</a:t>
+            </a:r>
+            <a:endParaRPr xmlns:mc="http://schemas.openxmlformats.org/markup-compatibility/2006" xmlns:hp="http://schemas.haansoft.com/office/presentation/8.0" kumimoji="0" lang="en-US" altLang="ko-KR" sz="2000" b="0" i="0" u="none" strike="noStrike" kern="1200" cap="none" spc="0" normalizeH="0" baseline="0" mc:Ignorable="hp" hp:hslEmbossed="0">
+              <a:solidFill>
+                <a:srgbClr val="ffffff"/>
+              </a:solidFill>
+              <a:latin typeface="Calibri"/>
+              <a:ea typeface="맑은 고딕"/>
+              <a:cs typeface="Times New Roman"/>
+            </a:endParaRPr>
+          </a:p>
+        </p:txBody>
+      </p:sp>
+      <p:sp>
+        <p:nvSpPr>
+          <p:cNvPr id="14" name=""/>
+          <p:cNvSpPr txBox="1"/>
+          <p:nvPr/>
+        </p:nvSpPr>
+        <p:spPr>
+          <a:xfrm>
+            <a:off x="9574475" y="1074290"/>
+            <a:ext cx="2343084" cy="821809"/>
+          </a:xfrm>
+          <a:prstGeom prst="rect">
+            <a:avLst/>
+          </a:prstGeom>
+        </p:spPr>
+        <p:txBody>
+          <a:bodyPr wrap="square">
+            <a:spAutoFit/>
+          </a:bodyPr>
+          <a:p>
+            <a:pPr marL="0" indent="0" algn="ctr" defTabSz="914400" rtl="0" eaLnBrk="1" latinLnBrk="1" hangingPunct="1">
+              <a:lnSpc>
+                <a:spcPct val="100000"/>
+              </a:lnSpc>
+              <a:spcBef>
+                <a:spcPct val="0"/>
+              </a:spcBef>
+              <a:spcAft>
+                <a:spcPts val="0"/>
+              </a:spcAft>
+              <a:buNone/>
+              <a:defRPr/>
+            </a:pPr>
+            <a:r>
+              <a:rPr xmlns:mc="http://schemas.openxmlformats.org/markup-compatibility/2006" xmlns:hp="http://schemas.haansoft.com/office/presentation/8.0" kumimoji="0" lang="en-US" altLang="ko-KR" sz="2400" b="1" i="0" u="none" strike="noStrike" kern="1200" cap="none" spc="0" normalizeH="0" baseline="0" mc:Ignorable="hp" hp:hslEmbossed="0">
+                <a:solidFill>
+                  <a:srgbClr val="000000"/>
+                </a:solidFill>
+                <a:latin typeface="Calibri"/>
+                <a:ea typeface="맑은 고딕"/>
+                <a:cs typeface="Times New Roman"/>
+              </a:rPr>
+              <a:t>Persistence Layer</a:t>
+            </a:r>
+            <a:endParaRPr xmlns:mc="http://schemas.openxmlformats.org/markup-compatibility/2006" xmlns:hp="http://schemas.haansoft.com/office/presentation/8.0" kumimoji="0" lang="en-US" altLang="ko-KR" sz="2400" b="1" i="0" u="none" strike="noStrike" kern="1200" cap="none" spc="0" normalizeH="0" baseline="0" mc:Ignorable="hp" hp:hslEmbossed="0">
+              <a:solidFill>
+                <a:srgbClr val="000000"/>
+              </a:solidFill>
+              <a:latin typeface="Calibri"/>
+              <a:ea typeface="맑은 고딕"/>
+              <a:cs typeface="Times New Roman"/>
+            </a:endParaRPr>
+          </a:p>
+        </p:txBody>
+      </p:sp>
+      <p:sp>
+        <p:nvSpPr>
+          <p:cNvPr id="16" name=""/>
+          <p:cNvSpPr/>
+          <p:nvPr/>
+        </p:nvSpPr>
+        <p:spPr>
+          <a:xfrm>
+            <a:off x="3669722" y="4076822"/>
+            <a:ext cx="1795100" cy="1423264"/>
+          </a:xfrm>
+          <a:prstGeom prst="roundRect">
+            <a:avLst>
+              <a:gd name="adj" fmla="val 16667"/>
+            </a:avLst>
+          </a:prstGeom>
+          <a:solidFill>
+            <a:srgbClr val="ffb689">
+              <a:alpha val="100000"/>
+            </a:srgbClr>
+          </a:solidFill>
+          <a:ln w="19050" cap="flat" cmpd="sng" algn="ctr">
+            <a:solidFill>
+              <a:srgbClr val="2e3e67">
+                <a:alpha val="100000"/>
+              </a:srgbClr>
+            </a:solidFill>
+            <a:prstDash val="solid"/>
+          </a:ln>
+        </p:spPr>
+        <p:txBody>
+          <a:bodyPr anchor="ctr"/>
+          <a:p>
+            <a:pPr marL="0" indent="0" algn="ctr" defTabSz="914400" rtl="0" eaLnBrk="1" latinLnBrk="1" hangingPunct="1">
+              <a:lnSpc>
+                <a:spcPct val="100000"/>
+              </a:lnSpc>
+              <a:spcBef>
+                <a:spcPct val="0"/>
+              </a:spcBef>
+              <a:spcAft>
+                <a:spcPts val="0"/>
+              </a:spcAft>
+              <a:buNone/>
+              <a:defRPr/>
+            </a:pPr>
+            <a:r>
+              <a:rPr xmlns:mc="http://schemas.openxmlformats.org/markup-compatibility/2006" xmlns:hp="http://schemas.haansoft.com/office/presentation/8.0" kumimoji="0" lang="en-US" altLang="ko-KR" b="0" i="0" u="none" strike="noStrike" kern="1200" cap="none" spc="0" normalizeH="0" baseline="0" mc:Ignorable="hp" hp:hslEmbossed="0">
+                <a:solidFill>
+                  <a:srgbClr val="ffffff"/>
+                </a:solidFill>
+                <a:latin typeface="Calibri"/>
+                <a:ea typeface="맑은 고딕"/>
+                <a:cs typeface="Times New Roman"/>
+              </a:rPr>
+              <a:t>Data Source</a:t>
+            </a:r>
+            <a:endParaRPr xmlns:mc="http://schemas.openxmlformats.org/markup-compatibility/2006" xmlns:hp="http://schemas.haansoft.com/office/presentation/8.0" kumimoji="0" lang="en-US" altLang="ko-KR" b="0" i="0" u="none" strike="noStrike" kern="1200" cap="none" spc="0" normalizeH="0" baseline="0" mc:Ignorable="hp" hp:hslEmbossed="0">
+              <a:solidFill>
+                <a:srgbClr val="ffffff"/>
+              </a:solidFill>
+              <a:latin typeface="Calibri"/>
+              <a:ea typeface="맑은 고딕"/>
+              <a:cs typeface="Times New Roman"/>
+            </a:endParaRPr>
+          </a:p>
+          <a:p>
+            <a:pPr marL="0" indent="0" algn="ctr" defTabSz="914400" rtl="0" eaLnBrk="1" latinLnBrk="1" hangingPunct="1">
+              <a:lnSpc>
+                <a:spcPct val="100000"/>
+              </a:lnSpc>
+              <a:spcBef>
+                <a:spcPct val="0"/>
+              </a:spcBef>
+              <a:spcAft>
+                <a:spcPts val="0"/>
+              </a:spcAft>
+              <a:buNone/>
+              <a:defRPr/>
+            </a:pPr>
+            <a:endParaRPr xmlns:mc="http://schemas.openxmlformats.org/markup-compatibility/2006" xmlns:hp="http://schemas.haansoft.com/office/presentation/8.0" kumimoji="0" lang="en-US" altLang="ko-KR" b="0" i="0" u="none" strike="noStrike" kern="1200" cap="none" spc="0" normalizeH="0" baseline="0" mc:Ignorable="hp" hp:hslEmbossed="0">
+              <a:solidFill>
+                <a:srgbClr val="ffffff"/>
+              </a:solidFill>
+              <a:latin typeface="Calibri"/>
+              <a:ea typeface="맑은 고딕"/>
+              <a:cs typeface="Times New Roman"/>
+            </a:endParaRPr>
+          </a:p>
+          <a:p>
+            <a:pPr marL="0" indent="0" algn="ctr" defTabSz="914400" rtl="0" eaLnBrk="1" latinLnBrk="1" hangingPunct="1">
+              <a:lnSpc>
+                <a:spcPct val="100000"/>
+              </a:lnSpc>
+              <a:spcBef>
+                <a:spcPct val="0"/>
+              </a:spcBef>
+              <a:spcAft>
+                <a:spcPts val="0"/>
+              </a:spcAft>
+              <a:buNone/>
+              <a:defRPr/>
+            </a:pPr>
+            <a:r>
+              <a:rPr xmlns:mc="http://schemas.openxmlformats.org/markup-compatibility/2006" xmlns:hp="http://schemas.haansoft.com/office/presentation/8.0" kumimoji="0" lang="en-US" altLang="ko-KR" b="0" i="0" u="none" strike="noStrike" kern="1200" cap="none" spc="0" normalizeH="0" baseline="0" mc:Ignorable="hp" hp:hslEmbossed="0">
+                <a:solidFill>
+                  <a:srgbClr val="ffffff"/>
+                </a:solidFill>
+                <a:latin typeface="Calibri"/>
+                <a:ea typeface="맑은 고딕"/>
+                <a:cs typeface="Times New Roman"/>
+              </a:rPr>
+              <a:t>Configuration</a:t>
+            </a:r>
+            <a:endParaRPr xmlns:mc="http://schemas.openxmlformats.org/markup-compatibility/2006" xmlns:hp="http://schemas.haansoft.com/office/presentation/8.0" kumimoji="0" lang="en-US" altLang="ko-KR" b="0" i="0" u="none" strike="noStrike" kern="1200" cap="none" spc="0" normalizeH="0" baseline="0" mc:Ignorable="hp" hp:hslEmbossed="0">
+              <a:solidFill>
+                <a:srgbClr val="ffffff"/>
+              </a:solidFill>
+              <a:latin typeface="Calibri"/>
+              <a:ea typeface="맑은 고딕"/>
+              <a:cs typeface="Times New Roman"/>
+            </a:endParaRPr>
+          </a:p>
+          <a:p>
+            <a:pPr marL="0" indent="0" algn="ctr" defTabSz="914400" rtl="0" eaLnBrk="1" latinLnBrk="1" hangingPunct="1">
+              <a:lnSpc>
+                <a:spcPct val="100000"/>
+              </a:lnSpc>
+              <a:spcBef>
+                <a:spcPct val="0"/>
+              </a:spcBef>
+              <a:spcAft>
+                <a:spcPts val="0"/>
+              </a:spcAft>
+              <a:buNone/>
+              <a:defRPr/>
+            </a:pPr>
+            <a:r>
+              <a:rPr xmlns:mc="http://schemas.openxmlformats.org/markup-compatibility/2006" xmlns:hp="http://schemas.haansoft.com/office/presentation/8.0" kumimoji="0" lang="en-US" altLang="ko-KR" b="0" i="0" u="none" strike="noStrike" kern="1200" cap="none" spc="0" normalizeH="0" baseline="0" mc:Ignorable="hp" hp:hslEmbossed="0">
+                <a:solidFill>
+                  <a:srgbClr val="ffffff"/>
+                </a:solidFill>
+                <a:latin typeface="Calibri"/>
+                <a:ea typeface="맑은 고딕"/>
+                <a:cs typeface="Times New Roman"/>
+              </a:rPr>
+              <a:t>for Connection</a:t>
+            </a:r>
+            <a:endParaRPr xmlns:mc="http://schemas.openxmlformats.org/markup-compatibility/2006" xmlns:hp="http://schemas.haansoft.com/office/presentation/8.0" kumimoji="0" lang="en-US" altLang="ko-KR" b="0" i="0" u="none" strike="noStrike" kern="1200" cap="none" spc="0" normalizeH="0" baseline="0" mc:Ignorable="hp" hp:hslEmbossed="0">
+              <a:solidFill>
+                <a:srgbClr val="ffffff"/>
+              </a:solidFill>
+              <a:latin typeface="Calibri"/>
+              <a:ea typeface="맑은 고딕"/>
+              <a:cs typeface="Times New Roman"/>
+            </a:endParaRPr>
+          </a:p>
+        </p:txBody>
+      </p:sp>
+      <p:cxnSp>
+        <p:nvCxnSpPr>
+          <p:cNvPr id="18" name=""/>
+          <p:cNvCxnSpPr>
+            <a:endCxn id="8" idx="2"/>
+          </p:cNvCxnSpPr>
+          <p:nvPr/>
+        </p:nvCxnSpPr>
+        <p:spPr>
+          <a:xfrm rot="16200000">
+            <a:off x="4119612" y="3629162"/>
+            <a:ext cx="895321" cy="0"/>
+          </a:xfrm>
+          <a:prstGeom prst="straightConnector1">
+            <a:avLst/>
+          </a:prstGeom>
+          <a:ln w="28575">
+            <a:solidFill>
+              <a:schemeClr val="accent1">
+                <a:satMod val="105000"/>
+              </a:schemeClr>
+            </a:solidFill>
+            <a:tailEnd type="arrow"/>
+          </a:ln>
+        </p:spPr>
+        <p:style>
+          <a:lnRef idx="1">
+            <a:schemeClr val="accent1"/>
+          </a:lnRef>
+          <a:fillRef idx="0">
+            <a:schemeClr val="accent1"/>
+          </a:fillRef>
+          <a:effectRef idx="0">
+            <a:schemeClr val="accent1"/>
+          </a:effectRef>
+          <a:fontRef idx="minor">
+            <a:schemeClr val="tx1"/>
+          </a:fontRef>
+        </p:style>
+      </p:cxnSp>
+      <p:cxnSp>
+        <p:nvCxnSpPr>
+          <p:cNvPr id="19" name=""/>
+          <p:cNvCxnSpPr>
+            <a:stCxn id="5" idx="3"/>
+            <a:endCxn id="8" idx="1"/>
+          </p:cNvCxnSpPr>
+          <p:nvPr/>
+        </p:nvCxnSpPr>
+        <p:spPr>
+          <a:xfrm>
+            <a:off x="2400000" y="2617131"/>
+            <a:ext cx="1269722" cy="0"/>
+          </a:xfrm>
+          <a:prstGeom prst="straightConnector1">
+            <a:avLst/>
+          </a:prstGeom>
+          <a:ln w="76200">
+            <a:solidFill>
+              <a:schemeClr val="dk2"/>
+            </a:solidFill>
+            <a:tailEnd type="arrow"/>
+          </a:ln>
+        </p:spPr>
+        <p:style>
+          <a:lnRef idx="1">
+            <a:schemeClr val="accent1"/>
+          </a:lnRef>
+          <a:fillRef idx="0">
+            <a:schemeClr val="accent1"/>
+          </a:fillRef>
+          <a:effectRef idx="0">
+            <a:schemeClr val="accent1"/>
+          </a:effectRef>
+          <a:fontRef idx="minor">
+            <a:schemeClr val="tx1"/>
+          </a:fontRef>
+        </p:style>
+      </p:cxnSp>
+      <p:cxnSp>
+        <p:nvCxnSpPr>
+          <p:cNvPr id="20" name=""/>
+          <p:cNvCxnSpPr>
+            <a:stCxn id="8" idx="3"/>
+            <a:endCxn id="10" idx="1"/>
+          </p:cNvCxnSpPr>
+          <p:nvPr/>
+        </p:nvCxnSpPr>
+        <p:spPr>
+          <a:xfrm flipV="1">
+            <a:off x="5464823" y="2617130"/>
+            <a:ext cx="1331856" cy="0"/>
+          </a:xfrm>
+          <a:prstGeom prst="straightConnector1">
+            <a:avLst/>
+          </a:prstGeom>
+          <a:ln w="76200">
+            <a:solidFill>
+              <a:schemeClr val="dk2"/>
+            </a:solidFill>
+            <a:tailEnd type="arrow"/>
+          </a:ln>
+        </p:spPr>
+        <p:style>
+          <a:lnRef idx="1">
+            <a:schemeClr val="accent1"/>
+          </a:lnRef>
+          <a:fillRef idx="0">
+            <a:schemeClr val="accent1"/>
+          </a:fillRef>
+          <a:effectRef idx="0">
+            <a:schemeClr val="accent1"/>
+          </a:effectRef>
+          <a:fontRef idx="minor">
+            <a:schemeClr val="tx1"/>
+          </a:fontRef>
+        </p:style>
+      </p:cxnSp>
+      <p:cxnSp>
+        <p:nvCxnSpPr>
+          <p:cNvPr id="21" name=""/>
+          <p:cNvCxnSpPr>
+            <a:stCxn id="10" idx="3"/>
+            <a:endCxn id="13" idx="2"/>
+          </p:cNvCxnSpPr>
+          <p:nvPr/>
+        </p:nvCxnSpPr>
+        <p:spPr>
+          <a:xfrm>
+            <a:off x="8591780" y="2617130"/>
+            <a:ext cx="1375005" cy="0"/>
+          </a:xfrm>
+          <a:prstGeom prst="straightConnector1">
+            <a:avLst/>
+          </a:prstGeom>
+          <a:ln w="76200">
+            <a:solidFill>
+              <a:schemeClr val="dk2"/>
+            </a:solidFill>
+            <a:tailEnd type="arrow"/>
+          </a:ln>
+        </p:spPr>
+        <p:style>
+          <a:lnRef idx="1">
+            <a:schemeClr val="accent1"/>
+          </a:lnRef>
+          <a:fillRef idx="0">
+            <a:schemeClr val="accent1"/>
+          </a:fillRef>
+          <a:effectRef idx="0">
+            <a:schemeClr val="accent1"/>
+          </a:effectRef>
+          <a:fontRef idx="minor">
+            <a:schemeClr val="tx1"/>
+          </a:fontRef>
+        </p:style>
+      </p:cxnSp>
     </p:spTree>
   </p:cSld>
   <p:clrMapOvr>

</xml_diff>

<commit_message>
add image database system
</commit_message>
<xml_diff>
--- a/etc/images.pptx
+++ b/etc/images.pptx
@@ -2,7 +2,7 @@
 <file path=ppt/presentation.xml><?xml version="1.0" encoding="utf-8"?>
 <p:presentation xmlns:r="http://schemas.openxmlformats.org/officeDocument/2006/relationships" xmlns:c="http://schemas.openxmlformats.org/drawingml/2006/chart" xmlns:a="http://schemas.openxmlformats.org/drawingml/2006/main" xmlns:dgm="http://schemas.openxmlformats.org/drawingml/2006/diagram" xmlns:dsp="http://schemas.microsoft.com/office/drawing/2008/diagram" xmlns:p="http://schemas.openxmlformats.org/presentationml/2006/main">
   <p:sldMasterIdLst>
-    <p:sldMasterId id="2147483749" r:id="rId1"/>
+    <p:sldMasterId id="2147483725" r:id="rId1"/>
   </p:sldMasterIdLst>
   <p:notesMasterIdLst>
     <p:notesMasterId r:id="rId2"/>
@@ -18,6 +18,7 @@
     <p:sldId id="263" r:id="rId10"/>
     <p:sldId id="264" r:id="rId11"/>
     <p:sldId id="265" r:id="rId12"/>
+    <p:sldId id="266" r:id="rId13"/>
   </p:sldIdLst>
   <p:sldSz cx="12192000" cy="6858000"/>
   <p:notesSz cx="6858000" cy="9144000"/>
@@ -214,7 +215,7 @@
               <a:pPr lvl="0">
                 <a:defRPr/>
               </a:pPr>
-              <a:t>2019-08-12</a:t>
+              <a:t>2019-08-16</a:t>
             </a:fld>
             <a:endParaRPr lang="ko-KR" altLang="en-US"/>
           </a:p>
@@ -6934,6 +6935,473 @@
           </a:fontRef>
         </p:style>
       </p:cxnSp>
+    </p:spTree>
+  </p:cSld>
+  <p:clrMapOvr>
+    <a:masterClrMapping/>
+  </p:clrMapOvr>
+  <mc:AlternateContent xmlns:mc="http://schemas.openxmlformats.org/markup-compatibility/2006">
+    <mc:Choice xmlns:p14="http://schemas.microsoft.com/office/powerpoint/2010/main" Requires="p14">
+      <p:transition xmlns:mc="http://schemas.openxmlformats.org/markup-compatibility/2006" xmlns:p14="http://schemas.microsoft.com/office/powerpoint/2010/main" mc:Ignorable="p14" p14:dur="500"/>
+    </mc:Choice>
+    <mc:Fallback>
+      <p:transition/>
+    </mc:Fallback>
+  </mc:AlternateContent>
+</p:sld>
+</file>
+
+<file path=ppt/slides/slide11.xml><?xml version="1.0" encoding="utf-8"?>
+<p:sld xmlns:r="http://schemas.openxmlformats.org/officeDocument/2006/relationships" xmlns:c="http://schemas.openxmlformats.org/drawingml/2006/chart" xmlns:a="http://schemas.openxmlformats.org/drawingml/2006/main" xmlns:dgm="http://schemas.openxmlformats.org/drawingml/2006/diagram" xmlns:dsp="http://schemas.microsoft.com/office/drawing/2008/diagram" xmlns:p="http://schemas.openxmlformats.org/presentationml/2006/main">
+  <p:cSld>
+    <p:spTree>
+      <p:nvGrpSpPr>
+        <p:cNvPr id="1" name=""/>
+        <p:cNvGrpSpPr/>
+        <p:nvPr/>
+      </p:nvGrpSpPr>
+      <p:grpSpPr>
+        <a:xfrm>
+          <a:off x="0" y="0"/>
+          <a:ext cx="0" cy="0"/>
+          <a:chOff x="0" y="0"/>
+          <a:chExt cx="0" cy="0"/>
+        </a:xfrm>
+      </p:grpSpPr>
+      <p:pic>
+        <p:nvPicPr>
+          <p:cNvPr id="4" name=""/>
+          <p:cNvPicPr>
+            <a:picLocks noChangeAspect="1"/>
+          </p:cNvPicPr>
+          <p:nvPr/>
+        </p:nvPicPr>
+        <p:blipFill rotWithShape="1">
+          <a:blip r:embed="rId2"/>
+          <a:stretch>
+            <a:fillRect/>
+          </a:stretch>
+        </p:blipFill>
+        <p:spPr>
+          <a:xfrm>
+            <a:off x="2493597" y="521064"/>
+            <a:ext cx="1325657" cy="1325657"/>
+          </a:xfrm>
+          <a:prstGeom prst="rect">
+            <a:avLst/>
+          </a:prstGeom>
+        </p:spPr>
+      </p:pic>
+      <p:sp>
+        <p:nvSpPr>
+          <p:cNvPr id="5" name=""/>
+          <p:cNvSpPr/>
+          <p:nvPr/>
+        </p:nvSpPr>
+        <p:spPr>
+          <a:xfrm>
+            <a:off x="1657026" y="2849354"/>
+            <a:ext cx="1673141" cy="579646"/>
+          </a:xfrm>
+          <a:prstGeom prst="flowChartAlternateProcess">
+            <a:avLst/>
+          </a:prstGeom>
+        </p:spPr>
+        <p:style>
+          <a:lnRef idx="2">
+            <a:schemeClr val="accent1">
+              <a:shade val="20000"/>
+            </a:schemeClr>
+          </a:lnRef>
+          <a:fillRef idx="1">
+            <a:schemeClr val="accent1"/>
+          </a:fillRef>
+          <a:effectRef idx="0">
+            <a:schemeClr val="accent1"/>
+          </a:effectRef>
+          <a:fontRef idx="minor">
+            <a:schemeClr val="lt1"/>
+          </a:fontRef>
+        </p:style>
+        <p:txBody>
+          <a:bodyPr anchor="ctr"/>
+          <a:p>
+            <a:pPr algn="ctr">
+              <a:defRPr/>
+            </a:pPr>
+            <a:r>
+              <a:rPr lang="ko-KR" altLang="en-US" sz="1500" b="1"/>
+              <a:t>데이터 언어 </a:t>
+            </a:r>
+            <a:r>
+              <a:rPr lang="en-US" altLang="ko-KR" sz="1500" b="1"/>
+              <a:t>(SQL)</a:t>
+            </a:r>
+            <a:endParaRPr lang="en-US" altLang="ko-KR" sz="1500" b="1"/>
+          </a:p>
+        </p:txBody>
+      </p:sp>
+      <p:sp>
+        <p:nvSpPr>
+          <p:cNvPr id="6" name=""/>
+          <p:cNvSpPr/>
+          <p:nvPr/>
+        </p:nvSpPr>
+        <p:spPr>
+          <a:xfrm>
+            <a:off x="1367355" y="3958514"/>
+            <a:ext cx="3578141" cy="579646"/>
+          </a:xfrm>
+          <a:prstGeom prst="flowChartAlternateProcess">
+            <a:avLst/>
+          </a:prstGeom>
+        </p:spPr>
+        <p:style>
+          <a:lnRef idx="2">
+            <a:schemeClr val="accent1">
+              <a:shade val="20000"/>
+            </a:schemeClr>
+          </a:lnRef>
+          <a:fillRef idx="1">
+            <a:schemeClr val="accent1"/>
+          </a:fillRef>
+          <a:effectRef idx="0">
+            <a:schemeClr val="accent1"/>
+          </a:effectRef>
+          <a:fontRef idx="minor">
+            <a:schemeClr val="lt1"/>
+          </a:fontRef>
+        </p:style>
+        <p:txBody>
+          <a:bodyPr anchor="ctr"/>
+          <a:p>
+            <a:pPr algn="ctr">
+              <a:defRPr/>
+            </a:pPr>
+            <a:r>
+              <a:rPr lang="en-US" altLang="ko-KR" sz="1700" b="1"/>
+              <a:t>Database Management System</a:t>
+            </a:r>
+            <a:endParaRPr lang="en-US" altLang="ko-KR" sz="1700" b="1"/>
+          </a:p>
+        </p:txBody>
+      </p:sp>
+      <p:sp>
+        <p:nvSpPr>
+          <p:cNvPr id="7" name=""/>
+          <p:cNvSpPr/>
+          <p:nvPr/>
+        </p:nvSpPr>
+        <p:spPr>
+          <a:xfrm>
+            <a:off x="2107101" y="5186739"/>
+            <a:ext cx="1866789" cy="946234"/>
+          </a:xfrm>
+          <a:prstGeom prst="can">
+            <a:avLst>
+              <a:gd name="adj" fmla="val 25000"/>
+            </a:avLst>
+          </a:prstGeom>
+        </p:spPr>
+        <p:style>
+          <a:lnRef idx="2">
+            <a:schemeClr val="accent1">
+              <a:shade val="20000"/>
+            </a:schemeClr>
+          </a:lnRef>
+          <a:fillRef idx="1">
+            <a:schemeClr val="accent1"/>
+          </a:fillRef>
+          <a:effectRef idx="0">
+            <a:schemeClr val="accent1"/>
+          </a:effectRef>
+          <a:fontRef idx="minor">
+            <a:schemeClr val="lt1"/>
+          </a:fontRef>
+        </p:style>
+        <p:txBody>
+          <a:bodyPr anchor="ctr"/>
+          <a:p>
+            <a:pPr algn="ctr">
+              <a:defRPr/>
+            </a:pPr>
+            <a:r>
+              <a:rPr lang="en-US" altLang="ko-KR" sz="1700" b="1"/>
+              <a:t>Database</a:t>
+            </a:r>
+            <a:endParaRPr lang="en-US" altLang="ko-KR" sz="1700" b="1"/>
+          </a:p>
+        </p:txBody>
+      </p:sp>
+      <p:cxnSp>
+        <p:nvCxnSpPr>
+          <p:cNvPr id="8" name=""/>
+          <p:cNvCxnSpPr/>
+          <p:nvPr/>
+        </p:nvCxnSpPr>
+        <p:spPr>
+          <a:xfrm rot="16200000" flipH="1" flipV="1">
+            <a:off x="1992281" y="2348038"/>
+            <a:ext cx="1002632" cy="0"/>
+          </a:xfrm>
+          <a:prstGeom prst="straightConnector1">
+            <a:avLst/>
+          </a:prstGeom>
+          <a:ln w="38100">
+            <a:solidFill>
+              <a:schemeClr val="accent1">
+                <a:satMod val="105000"/>
+              </a:schemeClr>
+            </a:solidFill>
+            <a:tailEnd type="arrow"/>
+          </a:ln>
+        </p:spPr>
+        <p:style>
+          <a:lnRef idx="1">
+            <a:schemeClr val="accent1"/>
+          </a:lnRef>
+          <a:fillRef idx="0">
+            <a:schemeClr val="accent1"/>
+          </a:fillRef>
+          <a:effectRef idx="0">
+            <a:schemeClr val="accent1"/>
+          </a:effectRef>
+          <a:fontRef idx="minor">
+            <a:schemeClr val="tx1"/>
+          </a:fontRef>
+        </p:style>
+      </p:cxnSp>
+      <p:cxnSp>
+        <p:nvCxnSpPr>
+          <p:cNvPr id="9" name=""/>
+          <p:cNvCxnSpPr/>
+          <p:nvPr/>
+        </p:nvCxnSpPr>
+        <p:spPr>
+          <a:xfrm rot="16200000" flipH="1">
+            <a:off x="2228840" y="3693757"/>
+            <a:ext cx="529514" cy="0"/>
+          </a:xfrm>
+          <a:prstGeom prst="straightConnector1">
+            <a:avLst/>
+          </a:prstGeom>
+          <a:ln w="38100">
+            <a:solidFill>
+              <a:schemeClr val="accent1">
+                <a:satMod val="105000"/>
+              </a:schemeClr>
+            </a:solidFill>
+            <a:tailEnd type="arrow"/>
+          </a:ln>
+        </p:spPr>
+        <p:style>
+          <a:lnRef idx="1">
+            <a:schemeClr val="accent1"/>
+          </a:lnRef>
+          <a:fillRef idx="0">
+            <a:schemeClr val="accent1"/>
+          </a:fillRef>
+          <a:effectRef idx="0">
+            <a:schemeClr val="accent1"/>
+          </a:effectRef>
+          <a:fontRef idx="minor">
+            <a:schemeClr val="tx1"/>
+          </a:fontRef>
+        </p:style>
+      </p:cxnSp>
+      <p:cxnSp>
+        <p:nvCxnSpPr>
+          <p:cNvPr id="11" name=""/>
+          <p:cNvCxnSpPr>
+            <a:endCxn id="7" idx="1"/>
+          </p:cNvCxnSpPr>
+          <p:nvPr/>
+        </p:nvCxnSpPr>
+        <p:spPr>
+          <a:xfrm rot="16200000" flipH="1">
+            <a:off x="2716207" y="4862450"/>
+            <a:ext cx="648578" cy="0"/>
+          </a:xfrm>
+          <a:prstGeom prst="straightConnector1">
+            <a:avLst/>
+          </a:prstGeom>
+          <a:ln w="38100">
+            <a:solidFill>
+              <a:schemeClr val="accent1">
+                <a:satMod val="105000"/>
+              </a:schemeClr>
+            </a:solidFill>
+            <a:headEnd type="arrow"/>
+            <a:tailEnd type="arrow"/>
+          </a:ln>
+        </p:spPr>
+        <p:style>
+          <a:lnRef idx="1">
+            <a:schemeClr val="accent1"/>
+          </a:lnRef>
+          <a:fillRef idx="0">
+            <a:schemeClr val="accent1"/>
+          </a:fillRef>
+          <a:effectRef idx="0">
+            <a:schemeClr val="accent1"/>
+          </a:effectRef>
+          <a:fontRef idx="minor">
+            <a:schemeClr val="tx1"/>
+          </a:fontRef>
+        </p:style>
+      </p:cxnSp>
+      <p:cxnSp>
+        <p:nvCxnSpPr>
+          <p:cNvPr id="12" name=""/>
+          <p:cNvCxnSpPr/>
+          <p:nvPr/>
+        </p:nvCxnSpPr>
+        <p:spPr>
+          <a:xfrm rot="16200000">
+            <a:off x="2548760" y="2911589"/>
+            <a:ext cx="2093851" cy="0"/>
+          </a:xfrm>
+          <a:prstGeom prst="straightConnector1">
+            <a:avLst/>
+          </a:prstGeom>
+          <a:ln w="38100">
+            <a:solidFill>
+              <a:schemeClr val="accent1">
+                <a:satMod val="105000"/>
+              </a:schemeClr>
+            </a:solidFill>
+            <a:tailEnd type="arrow"/>
+          </a:ln>
+        </p:spPr>
+        <p:style>
+          <a:lnRef idx="1">
+            <a:schemeClr val="accent1"/>
+          </a:lnRef>
+          <a:fillRef idx="0">
+            <a:schemeClr val="accent1"/>
+          </a:fillRef>
+          <a:effectRef idx="0">
+            <a:schemeClr val="accent1"/>
+          </a:effectRef>
+          <a:fontRef idx="minor">
+            <a:schemeClr val="tx1"/>
+          </a:fontRef>
+        </p:style>
+      </p:cxnSp>
+      <p:sp>
+        <p:nvSpPr>
+          <p:cNvPr id="13" name=""/>
+          <p:cNvSpPr txBox="1"/>
+          <p:nvPr/>
+        </p:nvSpPr>
+        <p:spPr>
+          <a:xfrm>
+            <a:off x="3465399" y="842973"/>
+            <a:ext cx="707709" cy="345747"/>
+          </a:xfrm>
+          <a:prstGeom prst="rect">
+            <a:avLst/>
+          </a:prstGeom>
+        </p:spPr>
+        <p:txBody>
+          <a:bodyPr wrap="square">
+            <a:spAutoFit/>
+          </a:bodyPr>
+          <a:p>
+            <a:pPr>
+              <a:defRPr/>
+            </a:pPr>
+            <a:r>
+              <a:rPr lang="en-US" altLang="ko-KR" sz="1700" b="1"/>
+              <a:t>USER</a:t>
+            </a:r>
+            <a:endParaRPr lang="en-US" altLang="ko-KR" sz="1700" b="1"/>
+          </a:p>
+        </p:txBody>
+      </p:sp>
+      <p:sp>
+        <p:nvSpPr>
+          <p:cNvPr id="14" name=""/>
+          <p:cNvSpPr/>
+          <p:nvPr/>
+        </p:nvSpPr>
+        <p:spPr>
+          <a:xfrm>
+            <a:off x="4945496" y="521065"/>
+            <a:ext cx="388519" cy="5611908"/>
+          </a:xfrm>
+          <a:prstGeom prst="rightBracket">
+            <a:avLst>
+              <a:gd name="adj" fmla="val 87776"/>
+            </a:avLst>
+          </a:prstGeom>
+          <a:ln w="28575">
+            <a:solidFill>
+              <a:schemeClr val="accent1">
+                <a:satMod val="105000"/>
+              </a:schemeClr>
+            </a:solidFill>
+          </a:ln>
+        </p:spPr>
+        <p:style>
+          <a:lnRef idx="1">
+            <a:schemeClr val="accent1"/>
+          </a:lnRef>
+          <a:fillRef idx="0">
+            <a:schemeClr val="accent1"/>
+          </a:fillRef>
+          <a:effectRef idx="0">
+            <a:schemeClr val="accent1"/>
+          </a:effectRef>
+          <a:fontRef idx="minor">
+            <a:schemeClr val="tx1"/>
+          </a:fontRef>
+        </p:style>
+        <p:txBody>
+          <a:bodyPr anchor="ctr"/>
+          <a:p>
+            <a:pPr algn="ctr">
+              <a:defRPr/>
+            </a:pPr>
+            <a:endParaRPr lang="en-US" altLang="ko-KR">
+              <a:solidFill>
+                <a:schemeClr val="tx1"/>
+              </a:solidFill>
+            </a:endParaRPr>
+          </a:p>
+        </p:txBody>
+      </p:sp>
+      <p:sp>
+        <p:nvSpPr>
+          <p:cNvPr id="15" name=""/>
+          <p:cNvSpPr txBox="1"/>
+          <p:nvPr/>
+        </p:nvSpPr>
+        <p:spPr>
+          <a:xfrm>
+            <a:off x="3737789" y="174543"/>
+            <a:ext cx="1923400" cy="347427"/>
+          </a:xfrm>
+          <a:prstGeom prst="rect">
+            <a:avLst/>
+          </a:prstGeom>
+        </p:spPr>
+        <p:txBody>
+          <a:bodyPr wrap="square">
+            <a:spAutoFit/>
+          </a:bodyPr>
+          <a:p>
+            <a:pPr>
+              <a:defRPr/>
+            </a:pPr>
+            <a:r>
+              <a:rPr lang="en-US" altLang="ko-KR" sz="1700" b="1"/>
+              <a:t>Database System</a:t>
+            </a:r>
+            <a:endParaRPr lang="en-US" altLang="ko-KR" sz="1700" b="1"/>
+          </a:p>
+        </p:txBody>
+      </p:sp>
     </p:spTree>
   </p:cSld>
   <p:clrMapOvr>

</xml_diff>

<commit_message>
add post "what is database system
</commit_message>
<xml_diff>
--- a/etc/images.pptx
+++ b/etc/images.pptx
@@ -2,7 +2,7 @@
 <file path=ppt/presentation.xml><?xml version="1.0" encoding="utf-8"?>
 <p:presentation xmlns:r="http://schemas.openxmlformats.org/officeDocument/2006/relationships" xmlns:c="http://schemas.openxmlformats.org/drawingml/2006/chart" xmlns:a="http://schemas.openxmlformats.org/drawingml/2006/main" xmlns:dgm="http://schemas.openxmlformats.org/drawingml/2006/diagram" xmlns:dsp="http://schemas.microsoft.com/office/drawing/2008/diagram" xmlns:p="http://schemas.openxmlformats.org/presentationml/2006/main">
   <p:sldMasterIdLst>
-    <p:sldMasterId id="2147483749" r:id="rId1"/>
+    <p:sldMasterId id="2147483725" r:id="rId1"/>
   </p:sldMasterIdLst>
   <p:notesMasterIdLst>
     <p:notesMasterId r:id="rId2"/>
@@ -18,6 +18,7 @@
     <p:sldId id="263" r:id="rId10"/>
     <p:sldId id="264" r:id="rId11"/>
     <p:sldId id="265" r:id="rId12"/>
+    <p:sldId id="266" r:id="rId13"/>
   </p:sldIdLst>
   <p:sldSz cx="12192000" cy="6858000"/>
   <p:notesSz cx="6858000" cy="9144000"/>
@@ -214,7 +215,7 @@
               <a:pPr lvl="0">
                 <a:defRPr/>
               </a:pPr>
-              <a:t>2019-08-12</a:t>
+              <a:t>2019-08-16</a:t>
             </a:fld>
             <a:endParaRPr lang="ko-KR" altLang="en-US"/>
           </a:p>
@@ -6934,6 +6935,473 @@
           </a:fontRef>
         </p:style>
       </p:cxnSp>
+    </p:spTree>
+  </p:cSld>
+  <p:clrMapOvr>
+    <a:masterClrMapping/>
+  </p:clrMapOvr>
+  <mc:AlternateContent xmlns:mc="http://schemas.openxmlformats.org/markup-compatibility/2006">
+    <mc:Choice xmlns:p14="http://schemas.microsoft.com/office/powerpoint/2010/main" Requires="p14">
+      <p:transition xmlns:mc="http://schemas.openxmlformats.org/markup-compatibility/2006" xmlns:p14="http://schemas.microsoft.com/office/powerpoint/2010/main" mc:Ignorable="p14" p14:dur="500"/>
+    </mc:Choice>
+    <mc:Fallback>
+      <p:transition/>
+    </mc:Fallback>
+  </mc:AlternateContent>
+</p:sld>
+</file>
+
+<file path=ppt/slides/slide11.xml><?xml version="1.0" encoding="utf-8"?>
+<p:sld xmlns:r="http://schemas.openxmlformats.org/officeDocument/2006/relationships" xmlns:c="http://schemas.openxmlformats.org/drawingml/2006/chart" xmlns:a="http://schemas.openxmlformats.org/drawingml/2006/main" xmlns:dgm="http://schemas.openxmlformats.org/drawingml/2006/diagram" xmlns:dsp="http://schemas.microsoft.com/office/drawing/2008/diagram" xmlns:p="http://schemas.openxmlformats.org/presentationml/2006/main">
+  <p:cSld>
+    <p:spTree>
+      <p:nvGrpSpPr>
+        <p:cNvPr id="1" name=""/>
+        <p:cNvGrpSpPr/>
+        <p:nvPr/>
+      </p:nvGrpSpPr>
+      <p:grpSpPr>
+        <a:xfrm>
+          <a:off x="0" y="0"/>
+          <a:ext cx="0" cy="0"/>
+          <a:chOff x="0" y="0"/>
+          <a:chExt cx="0" cy="0"/>
+        </a:xfrm>
+      </p:grpSpPr>
+      <p:pic>
+        <p:nvPicPr>
+          <p:cNvPr id="4" name=""/>
+          <p:cNvPicPr>
+            <a:picLocks noChangeAspect="1"/>
+          </p:cNvPicPr>
+          <p:nvPr/>
+        </p:nvPicPr>
+        <p:blipFill rotWithShape="1">
+          <a:blip r:embed="rId2"/>
+          <a:stretch>
+            <a:fillRect/>
+          </a:stretch>
+        </p:blipFill>
+        <p:spPr>
+          <a:xfrm>
+            <a:off x="2493597" y="521064"/>
+            <a:ext cx="1325657" cy="1325657"/>
+          </a:xfrm>
+          <a:prstGeom prst="rect">
+            <a:avLst/>
+          </a:prstGeom>
+        </p:spPr>
+      </p:pic>
+      <p:sp>
+        <p:nvSpPr>
+          <p:cNvPr id="5" name=""/>
+          <p:cNvSpPr/>
+          <p:nvPr/>
+        </p:nvSpPr>
+        <p:spPr>
+          <a:xfrm>
+            <a:off x="1657026" y="2849354"/>
+            <a:ext cx="1673141" cy="579646"/>
+          </a:xfrm>
+          <a:prstGeom prst="flowChartAlternateProcess">
+            <a:avLst/>
+          </a:prstGeom>
+        </p:spPr>
+        <p:style>
+          <a:lnRef idx="2">
+            <a:schemeClr val="accent1">
+              <a:shade val="20000"/>
+            </a:schemeClr>
+          </a:lnRef>
+          <a:fillRef idx="1">
+            <a:schemeClr val="accent1"/>
+          </a:fillRef>
+          <a:effectRef idx="0">
+            <a:schemeClr val="accent1"/>
+          </a:effectRef>
+          <a:fontRef idx="minor">
+            <a:schemeClr val="lt1"/>
+          </a:fontRef>
+        </p:style>
+        <p:txBody>
+          <a:bodyPr anchor="ctr"/>
+          <a:p>
+            <a:pPr algn="ctr">
+              <a:defRPr/>
+            </a:pPr>
+            <a:r>
+              <a:rPr lang="ko-KR" altLang="en-US" sz="1500" b="1"/>
+              <a:t>데이터 언어 </a:t>
+            </a:r>
+            <a:r>
+              <a:rPr lang="en-US" altLang="ko-KR" sz="1500" b="1"/>
+              <a:t>(SQL)</a:t>
+            </a:r>
+            <a:endParaRPr lang="en-US" altLang="ko-KR" sz="1500" b="1"/>
+          </a:p>
+        </p:txBody>
+      </p:sp>
+      <p:sp>
+        <p:nvSpPr>
+          <p:cNvPr id="6" name=""/>
+          <p:cNvSpPr/>
+          <p:nvPr/>
+        </p:nvSpPr>
+        <p:spPr>
+          <a:xfrm>
+            <a:off x="1367355" y="3958514"/>
+            <a:ext cx="3578141" cy="579646"/>
+          </a:xfrm>
+          <a:prstGeom prst="flowChartAlternateProcess">
+            <a:avLst/>
+          </a:prstGeom>
+        </p:spPr>
+        <p:style>
+          <a:lnRef idx="2">
+            <a:schemeClr val="accent1">
+              <a:shade val="20000"/>
+            </a:schemeClr>
+          </a:lnRef>
+          <a:fillRef idx="1">
+            <a:schemeClr val="accent1"/>
+          </a:fillRef>
+          <a:effectRef idx="0">
+            <a:schemeClr val="accent1"/>
+          </a:effectRef>
+          <a:fontRef idx="minor">
+            <a:schemeClr val="lt1"/>
+          </a:fontRef>
+        </p:style>
+        <p:txBody>
+          <a:bodyPr anchor="ctr"/>
+          <a:p>
+            <a:pPr algn="ctr">
+              <a:defRPr/>
+            </a:pPr>
+            <a:r>
+              <a:rPr lang="en-US" altLang="ko-KR" sz="1700" b="1"/>
+              <a:t>Database Management System</a:t>
+            </a:r>
+            <a:endParaRPr lang="en-US" altLang="ko-KR" sz="1700" b="1"/>
+          </a:p>
+        </p:txBody>
+      </p:sp>
+      <p:sp>
+        <p:nvSpPr>
+          <p:cNvPr id="7" name=""/>
+          <p:cNvSpPr/>
+          <p:nvPr/>
+        </p:nvSpPr>
+        <p:spPr>
+          <a:xfrm>
+            <a:off x="2107101" y="5186739"/>
+            <a:ext cx="1866789" cy="946234"/>
+          </a:xfrm>
+          <a:prstGeom prst="can">
+            <a:avLst>
+              <a:gd name="adj" fmla="val 25000"/>
+            </a:avLst>
+          </a:prstGeom>
+        </p:spPr>
+        <p:style>
+          <a:lnRef idx="2">
+            <a:schemeClr val="accent1">
+              <a:shade val="20000"/>
+            </a:schemeClr>
+          </a:lnRef>
+          <a:fillRef idx="1">
+            <a:schemeClr val="accent1"/>
+          </a:fillRef>
+          <a:effectRef idx="0">
+            <a:schemeClr val="accent1"/>
+          </a:effectRef>
+          <a:fontRef idx="minor">
+            <a:schemeClr val="lt1"/>
+          </a:fontRef>
+        </p:style>
+        <p:txBody>
+          <a:bodyPr anchor="ctr"/>
+          <a:p>
+            <a:pPr algn="ctr">
+              <a:defRPr/>
+            </a:pPr>
+            <a:r>
+              <a:rPr lang="en-US" altLang="ko-KR" sz="1700" b="1"/>
+              <a:t>Database</a:t>
+            </a:r>
+            <a:endParaRPr lang="en-US" altLang="ko-KR" sz="1700" b="1"/>
+          </a:p>
+        </p:txBody>
+      </p:sp>
+      <p:cxnSp>
+        <p:nvCxnSpPr>
+          <p:cNvPr id="8" name=""/>
+          <p:cNvCxnSpPr/>
+          <p:nvPr/>
+        </p:nvCxnSpPr>
+        <p:spPr>
+          <a:xfrm rot="16200000" flipH="1" flipV="1">
+            <a:off x="1992281" y="2348038"/>
+            <a:ext cx="1002632" cy="0"/>
+          </a:xfrm>
+          <a:prstGeom prst="straightConnector1">
+            <a:avLst/>
+          </a:prstGeom>
+          <a:ln w="38100">
+            <a:solidFill>
+              <a:schemeClr val="accent1">
+                <a:satMod val="105000"/>
+              </a:schemeClr>
+            </a:solidFill>
+            <a:tailEnd type="arrow"/>
+          </a:ln>
+        </p:spPr>
+        <p:style>
+          <a:lnRef idx="1">
+            <a:schemeClr val="accent1"/>
+          </a:lnRef>
+          <a:fillRef idx="0">
+            <a:schemeClr val="accent1"/>
+          </a:fillRef>
+          <a:effectRef idx="0">
+            <a:schemeClr val="accent1"/>
+          </a:effectRef>
+          <a:fontRef idx="minor">
+            <a:schemeClr val="tx1"/>
+          </a:fontRef>
+        </p:style>
+      </p:cxnSp>
+      <p:cxnSp>
+        <p:nvCxnSpPr>
+          <p:cNvPr id="9" name=""/>
+          <p:cNvCxnSpPr/>
+          <p:nvPr/>
+        </p:nvCxnSpPr>
+        <p:spPr>
+          <a:xfrm rot="16200000" flipH="1">
+            <a:off x="2228840" y="3693757"/>
+            <a:ext cx="529514" cy="0"/>
+          </a:xfrm>
+          <a:prstGeom prst="straightConnector1">
+            <a:avLst/>
+          </a:prstGeom>
+          <a:ln w="38100">
+            <a:solidFill>
+              <a:schemeClr val="accent1">
+                <a:satMod val="105000"/>
+              </a:schemeClr>
+            </a:solidFill>
+            <a:tailEnd type="arrow"/>
+          </a:ln>
+        </p:spPr>
+        <p:style>
+          <a:lnRef idx="1">
+            <a:schemeClr val="accent1"/>
+          </a:lnRef>
+          <a:fillRef idx="0">
+            <a:schemeClr val="accent1"/>
+          </a:fillRef>
+          <a:effectRef idx="0">
+            <a:schemeClr val="accent1"/>
+          </a:effectRef>
+          <a:fontRef idx="minor">
+            <a:schemeClr val="tx1"/>
+          </a:fontRef>
+        </p:style>
+      </p:cxnSp>
+      <p:cxnSp>
+        <p:nvCxnSpPr>
+          <p:cNvPr id="11" name=""/>
+          <p:cNvCxnSpPr>
+            <a:endCxn id="7" idx="1"/>
+          </p:cNvCxnSpPr>
+          <p:nvPr/>
+        </p:nvCxnSpPr>
+        <p:spPr>
+          <a:xfrm rot="16200000" flipH="1">
+            <a:off x="2716207" y="4862450"/>
+            <a:ext cx="648578" cy="0"/>
+          </a:xfrm>
+          <a:prstGeom prst="straightConnector1">
+            <a:avLst/>
+          </a:prstGeom>
+          <a:ln w="38100">
+            <a:solidFill>
+              <a:schemeClr val="accent1">
+                <a:satMod val="105000"/>
+              </a:schemeClr>
+            </a:solidFill>
+            <a:headEnd type="arrow"/>
+            <a:tailEnd type="arrow"/>
+          </a:ln>
+        </p:spPr>
+        <p:style>
+          <a:lnRef idx="1">
+            <a:schemeClr val="accent1"/>
+          </a:lnRef>
+          <a:fillRef idx="0">
+            <a:schemeClr val="accent1"/>
+          </a:fillRef>
+          <a:effectRef idx="0">
+            <a:schemeClr val="accent1"/>
+          </a:effectRef>
+          <a:fontRef idx="minor">
+            <a:schemeClr val="tx1"/>
+          </a:fontRef>
+        </p:style>
+      </p:cxnSp>
+      <p:cxnSp>
+        <p:nvCxnSpPr>
+          <p:cNvPr id="12" name=""/>
+          <p:cNvCxnSpPr/>
+          <p:nvPr/>
+        </p:nvCxnSpPr>
+        <p:spPr>
+          <a:xfrm rot="16200000">
+            <a:off x="2548760" y="2911589"/>
+            <a:ext cx="2093851" cy="0"/>
+          </a:xfrm>
+          <a:prstGeom prst="straightConnector1">
+            <a:avLst/>
+          </a:prstGeom>
+          <a:ln w="38100">
+            <a:solidFill>
+              <a:schemeClr val="accent1">
+                <a:satMod val="105000"/>
+              </a:schemeClr>
+            </a:solidFill>
+            <a:tailEnd type="arrow"/>
+          </a:ln>
+        </p:spPr>
+        <p:style>
+          <a:lnRef idx="1">
+            <a:schemeClr val="accent1"/>
+          </a:lnRef>
+          <a:fillRef idx="0">
+            <a:schemeClr val="accent1"/>
+          </a:fillRef>
+          <a:effectRef idx="0">
+            <a:schemeClr val="accent1"/>
+          </a:effectRef>
+          <a:fontRef idx="minor">
+            <a:schemeClr val="tx1"/>
+          </a:fontRef>
+        </p:style>
+      </p:cxnSp>
+      <p:sp>
+        <p:nvSpPr>
+          <p:cNvPr id="13" name=""/>
+          <p:cNvSpPr txBox="1"/>
+          <p:nvPr/>
+        </p:nvSpPr>
+        <p:spPr>
+          <a:xfrm>
+            <a:off x="3465399" y="842973"/>
+            <a:ext cx="707709" cy="345747"/>
+          </a:xfrm>
+          <a:prstGeom prst="rect">
+            <a:avLst/>
+          </a:prstGeom>
+        </p:spPr>
+        <p:txBody>
+          <a:bodyPr wrap="square">
+            <a:spAutoFit/>
+          </a:bodyPr>
+          <a:p>
+            <a:pPr>
+              <a:defRPr/>
+            </a:pPr>
+            <a:r>
+              <a:rPr lang="en-US" altLang="ko-KR" sz="1700" b="1"/>
+              <a:t>USER</a:t>
+            </a:r>
+            <a:endParaRPr lang="en-US" altLang="ko-KR" sz="1700" b="1"/>
+          </a:p>
+        </p:txBody>
+      </p:sp>
+      <p:sp>
+        <p:nvSpPr>
+          <p:cNvPr id="14" name=""/>
+          <p:cNvSpPr/>
+          <p:nvPr/>
+        </p:nvSpPr>
+        <p:spPr>
+          <a:xfrm>
+            <a:off x="4945496" y="521065"/>
+            <a:ext cx="388519" cy="5611908"/>
+          </a:xfrm>
+          <a:prstGeom prst="rightBracket">
+            <a:avLst>
+              <a:gd name="adj" fmla="val 87776"/>
+            </a:avLst>
+          </a:prstGeom>
+          <a:ln w="28575">
+            <a:solidFill>
+              <a:schemeClr val="accent1">
+                <a:satMod val="105000"/>
+              </a:schemeClr>
+            </a:solidFill>
+          </a:ln>
+        </p:spPr>
+        <p:style>
+          <a:lnRef idx="1">
+            <a:schemeClr val="accent1"/>
+          </a:lnRef>
+          <a:fillRef idx="0">
+            <a:schemeClr val="accent1"/>
+          </a:fillRef>
+          <a:effectRef idx="0">
+            <a:schemeClr val="accent1"/>
+          </a:effectRef>
+          <a:fontRef idx="minor">
+            <a:schemeClr val="tx1"/>
+          </a:fontRef>
+        </p:style>
+        <p:txBody>
+          <a:bodyPr anchor="ctr"/>
+          <a:p>
+            <a:pPr algn="ctr">
+              <a:defRPr/>
+            </a:pPr>
+            <a:endParaRPr lang="en-US" altLang="ko-KR">
+              <a:solidFill>
+                <a:schemeClr val="tx1"/>
+              </a:solidFill>
+            </a:endParaRPr>
+          </a:p>
+        </p:txBody>
+      </p:sp>
+      <p:sp>
+        <p:nvSpPr>
+          <p:cNvPr id="15" name=""/>
+          <p:cNvSpPr txBox="1"/>
+          <p:nvPr/>
+        </p:nvSpPr>
+        <p:spPr>
+          <a:xfrm>
+            <a:off x="3737789" y="174543"/>
+            <a:ext cx="1923400" cy="347427"/>
+          </a:xfrm>
+          <a:prstGeom prst="rect">
+            <a:avLst/>
+          </a:prstGeom>
+        </p:spPr>
+        <p:txBody>
+          <a:bodyPr wrap="square">
+            <a:spAutoFit/>
+          </a:bodyPr>
+          <a:p>
+            <a:pPr>
+              <a:defRPr/>
+            </a:pPr>
+            <a:r>
+              <a:rPr lang="en-US" altLang="ko-KR" sz="1700" b="1"/>
+              <a:t>Database System</a:t>
+            </a:r>
+            <a:endParaRPr lang="en-US" altLang="ko-KR" sz="1700" b="1"/>
+          </a:p>
+        </p:txBody>
+      </p:sp>
     </p:spTree>
   </p:cSld>
   <p:clrMapOvr>

</xml_diff>

<commit_message>
add image "array vs linked list
</commit_message>
<xml_diff>
--- a/etc/images.pptx
+++ b/etc/images.pptx
@@ -2,7 +2,7 @@
 <file path=ppt/presentation.xml><?xml version="1.0" encoding="utf-8"?>
 <p:presentation xmlns:r="http://schemas.openxmlformats.org/officeDocument/2006/relationships" xmlns:c="http://schemas.openxmlformats.org/drawingml/2006/chart" xmlns:a="http://schemas.openxmlformats.org/drawingml/2006/main" xmlns:dgm="http://schemas.openxmlformats.org/drawingml/2006/diagram" xmlns:dsp="http://schemas.microsoft.com/office/drawing/2008/diagram" xmlns:p="http://schemas.openxmlformats.org/presentationml/2006/main">
   <p:sldMasterIdLst>
-    <p:sldMasterId id="2147483733" r:id="rId1"/>
+    <p:sldMasterId id="2147483732" r:id="rId1"/>
   </p:sldMasterIdLst>
   <p:notesMasterIdLst>
     <p:notesMasterId r:id="rId2"/>
@@ -20,6 +20,7 @@
     <p:sldId id="265" r:id="rId12"/>
     <p:sldId id="266" r:id="rId13"/>
     <p:sldId id="267" r:id="rId14"/>
+    <p:sldId id="268" r:id="rId15"/>
   </p:sldIdLst>
   <p:sldSz cx="12192000" cy="6858000"/>
   <p:notesSz cx="6858000" cy="9144000"/>
@@ -216,7 +217,7 @@
               <a:pPr lvl="0">
                 <a:defRPr/>
               </a:pPr>
-              <a:t>2019-08-16</a:t>
+              <a:t>2019-08-19</a:t>
             </a:fld>
             <a:endParaRPr lang="ko-KR" altLang="en-US"/>
           </a:p>
@@ -8680,6 +8681,1864 @@
           </a:effectRef>
           <a:fontRef idx="minor">
             <a:schemeClr val="tx1"/>
+          </a:fontRef>
+        </p:style>
+      </p:cxnSp>
+    </p:spTree>
+  </p:cSld>
+  <p:clrMapOvr>
+    <a:masterClrMapping/>
+  </p:clrMapOvr>
+  <mc:AlternateContent xmlns:mc="http://schemas.openxmlformats.org/markup-compatibility/2006">
+    <mc:Choice xmlns:p14="http://schemas.microsoft.com/office/powerpoint/2010/main" Requires="p14">
+      <p:transition xmlns:mc="http://schemas.openxmlformats.org/markup-compatibility/2006" xmlns:p14="http://schemas.microsoft.com/office/powerpoint/2010/main" mc:Ignorable="p14" p14:dur="500"/>
+    </mc:Choice>
+    <mc:Fallback>
+      <p:transition/>
+    </mc:Fallback>
+  </mc:AlternateContent>
+</p:sld>
+</file>
+
+<file path=ppt/slides/slide13.xml><?xml version="1.0" encoding="utf-8"?>
+<p:sld xmlns:r="http://schemas.openxmlformats.org/officeDocument/2006/relationships" xmlns:c="http://schemas.openxmlformats.org/drawingml/2006/chart" xmlns:a="http://schemas.openxmlformats.org/drawingml/2006/main" xmlns:dgm="http://schemas.openxmlformats.org/drawingml/2006/diagram" xmlns:dsp="http://schemas.microsoft.com/office/drawing/2008/diagram" xmlns:p="http://schemas.openxmlformats.org/presentationml/2006/main">
+  <p:cSld>
+    <p:spTree>
+      <p:nvGrpSpPr>
+        <p:cNvPr id="1" name=""/>
+        <p:cNvGrpSpPr/>
+        <p:nvPr/>
+      </p:nvGrpSpPr>
+      <p:grpSpPr>
+        <a:xfrm>
+          <a:off x="0" y="0"/>
+          <a:ext cx="0" cy="0"/>
+          <a:chOff x="0" y="0"/>
+          <a:chExt cx="0" cy="0"/>
+        </a:xfrm>
+      </p:grpSpPr>
+      <p:sp>
+        <p:nvSpPr>
+          <p:cNvPr id="4" name=""/>
+          <p:cNvSpPr/>
+          <p:nvPr/>
+        </p:nvSpPr>
+        <p:spPr>
+          <a:xfrm>
+            <a:off x="2426995" y="1464469"/>
+            <a:ext cx="1002631" cy="858503"/>
+          </a:xfrm>
+          <a:prstGeom prst="flowChartAlternateProcess">
+            <a:avLst/>
+          </a:prstGeom>
+        </p:spPr>
+        <p:style>
+          <a:lnRef idx="2">
+            <a:schemeClr val="accent3">
+              <a:shade val="20000"/>
+            </a:schemeClr>
+          </a:lnRef>
+          <a:fillRef idx="1">
+            <a:schemeClr val="accent3"/>
+          </a:fillRef>
+          <a:effectRef idx="0">
+            <a:schemeClr val="accent3"/>
+          </a:effectRef>
+          <a:fontRef idx="minor">
+            <a:schemeClr val="lt1"/>
+          </a:fontRef>
+        </p:style>
+        <p:txBody>
+          <a:bodyPr anchor="ctr"/>
+          <a:p>
+            <a:pPr algn="ctr">
+              <a:defRPr/>
+            </a:pPr>
+            <a:endParaRPr lang="ko-KR" altLang="en-US"/>
+          </a:p>
+        </p:txBody>
+      </p:sp>
+      <p:sp>
+        <p:nvSpPr>
+          <p:cNvPr id="5" name=""/>
+          <p:cNvSpPr/>
+          <p:nvPr/>
+        </p:nvSpPr>
+        <p:spPr>
+          <a:xfrm>
+            <a:off x="3429626" y="1464469"/>
+            <a:ext cx="1002631" cy="858503"/>
+          </a:xfrm>
+          <a:prstGeom prst="flowChartAlternateProcess">
+            <a:avLst/>
+          </a:prstGeom>
+        </p:spPr>
+        <p:style>
+          <a:lnRef idx="2">
+            <a:schemeClr val="accent3">
+              <a:shade val="20000"/>
+            </a:schemeClr>
+          </a:lnRef>
+          <a:fillRef idx="1">
+            <a:schemeClr val="accent3"/>
+          </a:fillRef>
+          <a:effectRef idx="0">
+            <a:schemeClr val="accent3"/>
+          </a:effectRef>
+          <a:fontRef idx="minor">
+            <a:schemeClr val="lt1"/>
+          </a:fontRef>
+        </p:style>
+        <p:txBody>
+          <a:bodyPr anchor="ctr"/>
+          <a:p>
+            <a:pPr algn="ctr">
+              <a:defRPr/>
+            </a:pPr>
+            <a:endParaRPr lang="ko-KR" altLang="en-US"/>
+          </a:p>
+        </p:txBody>
+      </p:sp>
+      <p:sp>
+        <p:nvSpPr>
+          <p:cNvPr id="6" name=""/>
+          <p:cNvSpPr txBox="1"/>
+          <p:nvPr/>
+        </p:nvSpPr>
+        <p:spPr>
+          <a:xfrm>
+            <a:off x="923615" y="1508862"/>
+            <a:ext cx="1503380" cy="451383"/>
+          </a:xfrm>
+          <a:prstGeom prst="rect">
+            <a:avLst/>
+          </a:prstGeom>
+        </p:spPr>
+        <p:txBody>
+          <a:bodyPr wrap="square">
+            <a:spAutoFit/>
+          </a:bodyPr>
+          <a:p>
+            <a:pPr marL="0" indent="0" algn="ctr" defTabSz="914400" rtl="0" eaLnBrk="1" latinLnBrk="1" hangingPunct="1">
+              <a:lnSpc>
+                <a:spcPct val="100000"/>
+              </a:lnSpc>
+              <a:spcBef>
+                <a:spcPct val="0"/>
+              </a:spcBef>
+              <a:spcAft>
+                <a:spcPts val="0"/>
+              </a:spcAft>
+              <a:buNone/>
+              <a:defRPr/>
+            </a:pPr>
+            <a:r>
+              <a:rPr xmlns:mc="http://schemas.openxmlformats.org/markup-compatibility/2006" xmlns:hp="http://schemas.haansoft.com/office/presentation/8.0" kumimoji="0" lang="en-US" altLang="ko-KR" sz="2400" b="1" i="0" u="none" strike="noStrike" kern="1200" cap="none" spc="0" normalizeH="0" baseline="0" mc:Ignorable="hp" hp:hslEmbossed="0">
+                <a:solidFill>
+                  <a:srgbClr val="000000"/>
+                </a:solidFill>
+                <a:latin typeface="Calibri"/>
+                <a:ea typeface="맑은 고딕"/>
+                <a:cs typeface="Times New Roman"/>
+              </a:rPr>
+              <a:t>Array</a:t>
+            </a:r>
+            <a:endParaRPr xmlns:mc="http://schemas.openxmlformats.org/markup-compatibility/2006" xmlns:hp="http://schemas.haansoft.com/office/presentation/8.0" kumimoji="0" lang="en-US" altLang="ko-KR" sz="2400" b="1" i="0" u="none" strike="noStrike" kern="1200" cap="none" spc="0" normalizeH="0" baseline="0" mc:Ignorable="hp" hp:hslEmbossed="0">
+              <a:solidFill>
+                <a:srgbClr val="000000"/>
+              </a:solidFill>
+              <a:latin typeface="Calibri"/>
+              <a:ea typeface="맑은 고딕"/>
+              <a:cs typeface="Times New Roman"/>
+            </a:endParaRPr>
+          </a:p>
+        </p:txBody>
+      </p:sp>
+      <p:sp>
+        <p:nvSpPr>
+          <p:cNvPr id="7" name=""/>
+          <p:cNvSpPr txBox="1"/>
+          <p:nvPr/>
+        </p:nvSpPr>
+        <p:spPr>
+          <a:xfrm>
+            <a:off x="2426995" y="1012610"/>
+            <a:ext cx="1002631" cy="452335"/>
+          </a:xfrm>
+          <a:prstGeom prst="rect">
+            <a:avLst/>
+          </a:prstGeom>
+        </p:spPr>
+        <p:txBody>
+          <a:bodyPr wrap="square">
+            <a:spAutoFit/>
+          </a:bodyPr>
+          <a:p>
+            <a:pPr marL="0" indent="0" algn="ctr" defTabSz="914400" rtl="0" eaLnBrk="1" latinLnBrk="1" hangingPunct="1">
+              <a:lnSpc>
+                <a:spcPct val="100000"/>
+              </a:lnSpc>
+              <a:spcBef>
+                <a:spcPct val="0"/>
+              </a:spcBef>
+              <a:spcAft>
+                <a:spcPts val="0"/>
+              </a:spcAft>
+              <a:buNone/>
+              <a:defRPr/>
+            </a:pPr>
+            <a:r>
+              <a:rPr xmlns:mc="http://schemas.openxmlformats.org/markup-compatibility/2006" xmlns:hp="http://schemas.haansoft.com/office/presentation/8.0" kumimoji="0" lang="en-US" altLang="ko-KR" sz="2400" b="1" i="0" u="none" strike="noStrike" kern="1200" cap="none" spc="0" normalizeH="0" baseline="0" mc:Ignorable="hp" hp:hslEmbossed="0">
+                <a:solidFill>
+                  <a:srgbClr val="000000"/>
+                </a:solidFill>
+                <a:latin typeface="Calibri"/>
+                <a:ea typeface="맑은 고딕"/>
+                <a:cs typeface="Times New Roman"/>
+              </a:rPr>
+              <a:t>[0]</a:t>
+            </a:r>
+            <a:endParaRPr xmlns:mc="http://schemas.openxmlformats.org/markup-compatibility/2006" xmlns:hp="http://schemas.haansoft.com/office/presentation/8.0" kumimoji="0" lang="en-US" altLang="ko-KR" sz="2400" b="1" i="0" u="none" strike="noStrike" kern="1200" cap="none" spc="0" normalizeH="0" baseline="0" mc:Ignorable="hp" hp:hslEmbossed="0">
+              <a:solidFill>
+                <a:srgbClr val="000000"/>
+              </a:solidFill>
+              <a:latin typeface="Calibri"/>
+              <a:ea typeface="맑은 고딕"/>
+              <a:cs typeface="Times New Roman"/>
+            </a:endParaRPr>
+          </a:p>
+        </p:txBody>
+      </p:sp>
+      <p:sp>
+        <p:nvSpPr>
+          <p:cNvPr id="8" name=""/>
+          <p:cNvSpPr txBox="1"/>
+          <p:nvPr/>
+        </p:nvSpPr>
+        <p:spPr>
+          <a:xfrm>
+            <a:off x="3429626" y="1012134"/>
+            <a:ext cx="1002632" cy="452811"/>
+          </a:xfrm>
+          <a:prstGeom prst="rect">
+            <a:avLst/>
+          </a:prstGeom>
+        </p:spPr>
+        <p:txBody>
+          <a:bodyPr wrap="square">
+            <a:spAutoFit/>
+          </a:bodyPr>
+          <a:p>
+            <a:pPr marL="0" indent="0" algn="ctr" defTabSz="914400" rtl="0" eaLnBrk="1" latinLnBrk="1" hangingPunct="1">
+              <a:lnSpc>
+                <a:spcPct val="100000"/>
+              </a:lnSpc>
+              <a:spcBef>
+                <a:spcPct val="0"/>
+              </a:spcBef>
+              <a:spcAft>
+                <a:spcPts val="0"/>
+              </a:spcAft>
+              <a:buNone/>
+              <a:defRPr/>
+            </a:pPr>
+            <a:r>
+              <a:rPr xmlns:mc="http://schemas.openxmlformats.org/markup-compatibility/2006" xmlns:hp="http://schemas.haansoft.com/office/presentation/8.0" kumimoji="0" lang="en-US" altLang="ko-KR" sz="2400" b="1" i="0" u="none" strike="noStrike" kern="1200" cap="none" spc="0" normalizeH="0" baseline="0" mc:Ignorable="hp" hp:hslEmbossed="0">
+                <a:solidFill>
+                  <a:srgbClr val="000000"/>
+                </a:solidFill>
+                <a:latin typeface="Calibri"/>
+                <a:ea typeface="맑은 고딕"/>
+                <a:cs typeface="Times New Roman"/>
+              </a:rPr>
+              <a:t>[1]</a:t>
+            </a:r>
+            <a:endParaRPr xmlns:mc="http://schemas.openxmlformats.org/markup-compatibility/2006" xmlns:hp="http://schemas.haansoft.com/office/presentation/8.0" kumimoji="0" lang="en-US" altLang="ko-KR" sz="2400" b="1" i="0" u="none" strike="noStrike" kern="1200" cap="none" spc="0" normalizeH="0" baseline="0" mc:Ignorable="hp" hp:hslEmbossed="0">
+              <a:solidFill>
+                <a:srgbClr val="000000"/>
+              </a:solidFill>
+              <a:latin typeface="Calibri"/>
+              <a:ea typeface="맑은 고딕"/>
+              <a:cs typeface="Times New Roman"/>
+            </a:endParaRPr>
+          </a:p>
+        </p:txBody>
+      </p:sp>
+      <p:sp>
+        <p:nvSpPr>
+          <p:cNvPr id="9" name=""/>
+          <p:cNvSpPr/>
+          <p:nvPr/>
+        </p:nvSpPr>
+        <p:spPr>
+          <a:xfrm>
+            <a:off x="4432258" y="1463993"/>
+            <a:ext cx="1002631" cy="858979"/>
+          </a:xfrm>
+          <a:prstGeom prst="flowChartAlternateProcess">
+            <a:avLst/>
+          </a:prstGeom>
+        </p:spPr>
+        <p:style>
+          <a:lnRef idx="2">
+            <a:schemeClr val="accent3">
+              <a:shade val="20000"/>
+            </a:schemeClr>
+          </a:lnRef>
+          <a:fillRef idx="1">
+            <a:schemeClr val="accent3"/>
+          </a:fillRef>
+          <a:effectRef idx="0">
+            <a:schemeClr val="accent3"/>
+          </a:effectRef>
+          <a:fontRef idx="minor">
+            <a:schemeClr val="lt1"/>
+          </a:fontRef>
+        </p:style>
+        <p:txBody>
+          <a:bodyPr anchor="ctr"/>
+          <a:p>
+            <a:pPr algn="ctr">
+              <a:defRPr/>
+            </a:pPr>
+            <a:endParaRPr lang="ko-KR" altLang="en-US"/>
+          </a:p>
+        </p:txBody>
+      </p:sp>
+      <p:sp>
+        <p:nvSpPr>
+          <p:cNvPr id="10" name=""/>
+          <p:cNvSpPr/>
+          <p:nvPr/>
+        </p:nvSpPr>
+        <p:spPr>
+          <a:xfrm>
+            <a:off x="5434889" y="1463993"/>
+            <a:ext cx="1002631" cy="858979"/>
+          </a:xfrm>
+          <a:prstGeom prst="flowChartAlternateProcess">
+            <a:avLst/>
+          </a:prstGeom>
+        </p:spPr>
+        <p:style>
+          <a:lnRef idx="2">
+            <a:schemeClr val="accent3">
+              <a:shade val="20000"/>
+            </a:schemeClr>
+          </a:lnRef>
+          <a:fillRef idx="1">
+            <a:schemeClr val="accent3"/>
+          </a:fillRef>
+          <a:effectRef idx="0">
+            <a:schemeClr val="accent3"/>
+          </a:effectRef>
+          <a:fontRef idx="minor">
+            <a:schemeClr val="lt1"/>
+          </a:fontRef>
+        </p:style>
+        <p:txBody>
+          <a:bodyPr anchor="ctr"/>
+          <a:p>
+            <a:pPr algn="ctr">
+              <a:defRPr/>
+            </a:pPr>
+            <a:endParaRPr lang="ko-KR" altLang="en-US"/>
+          </a:p>
+        </p:txBody>
+      </p:sp>
+      <p:sp>
+        <p:nvSpPr>
+          <p:cNvPr id="11" name=""/>
+          <p:cNvSpPr txBox="1"/>
+          <p:nvPr/>
+        </p:nvSpPr>
+        <p:spPr>
+          <a:xfrm>
+            <a:off x="4432258" y="1012133"/>
+            <a:ext cx="1002631" cy="452811"/>
+          </a:xfrm>
+          <a:prstGeom prst="rect">
+            <a:avLst/>
+          </a:prstGeom>
+        </p:spPr>
+        <p:txBody>
+          <a:bodyPr wrap="square">
+            <a:spAutoFit/>
+          </a:bodyPr>
+          <a:p>
+            <a:pPr marL="0" indent="0" algn="ctr" defTabSz="914400" rtl="0" eaLnBrk="1" latinLnBrk="1" hangingPunct="1">
+              <a:lnSpc>
+                <a:spcPct val="100000"/>
+              </a:lnSpc>
+              <a:spcBef>
+                <a:spcPct val="0"/>
+              </a:spcBef>
+              <a:spcAft>
+                <a:spcPts val="0"/>
+              </a:spcAft>
+              <a:buNone/>
+              <a:defRPr/>
+            </a:pPr>
+            <a:r>
+              <a:rPr xmlns:mc="http://schemas.openxmlformats.org/markup-compatibility/2006" xmlns:hp="http://schemas.haansoft.com/office/presentation/8.0" kumimoji="0" lang="en-US" altLang="ko-KR" sz="2400" b="1" i="0" u="none" strike="noStrike" kern="1200" cap="none" spc="0" normalizeH="0" baseline="0" mc:Ignorable="hp" hp:hslEmbossed="0">
+                <a:solidFill>
+                  <a:srgbClr val="000000"/>
+                </a:solidFill>
+                <a:latin typeface="Calibri"/>
+                <a:ea typeface="맑은 고딕"/>
+                <a:cs typeface="Times New Roman"/>
+              </a:rPr>
+              <a:t>[2]</a:t>
+            </a:r>
+            <a:endParaRPr xmlns:mc="http://schemas.openxmlformats.org/markup-compatibility/2006" xmlns:hp="http://schemas.haansoft.com/office/presentation/8.0" kumimoji="0" lang="en-US" altLang="ko-KR" sz="2400" b="1" i="0" u="none" strike="noStrike" kern="1200" cap="none" spc="0" normalizeH="0" baseline="0" mc:Ignorable="hp" hp:hslEmbossed="0">
+              <a:solidFill>
+                <a:srgbClr val="000000"/>
+              </a:solidFill>
+              <a:latin typeface="Calibri"/>
+              <a:ea typeface="맑은 고딕"/>
+              <a:cs typeface="Times New Roman"/>
+            </a:endParaRPr>
+          </a:p>
+        </p:txBody>
+      </p:sp>
+      <p:sp>
+        <p:nvSpPr>
+          <p:cNvPr id="12" name=""/>
+          <p:cNvSpPr txBox="1"/>
+          <p:nvPr/>
+        </p:nvSpPr>
+        <p:spPr>
+          <a:xfrm>
+            <a:off x="5434889" y="1011657"/>
+            <a:ext cx="1002632" cy="453287"/>
+          </a:xfrm>
+          <a:prstGeom prst="rect">
+            <a:avLst/>
+          </a:prstGeom>
+        </p:spPr>
+        <p:txBody>
+          <a:bodyPr wrap="square">
+            <a:spAutoFit/>
+          </a:bodyPr>
+          <a:p>
+            <a:pPr marL="0" indent="0" algn="ctr" defTabSz="914400" rtl="0" eaLnBrk="1" latinLnBrk="1" hangingPunct="1">
+              <a:lnSpc>
+                <a:spcPct val="100000"/>
+              </a:lnSpc>
+              <a:spcBef>
+                <a:spcPct val="0"/>
+              </a:spcBef>
+              <a:spcAft>
+                <a:spcPts val="0"/>
+              </a:spcAft>
+              <a:buNone/>
+              <a:defRPr/>
+            </a:pPr>
+            <a:r>
+              <a:rPr xmlns:mc="http://schemas.openxmlformats.org/markup-compatibility/2006" xmlns:hp="http://schemas.haansoft.com/office/presentation/8.0" kumimoji="0" lang="en-US" altLang="ko-KR" sz="2400" b="1" i="0" u="none" strike="noStrike" kern="1200" cap="none" spc="0" normalizeH="0" baseline="0" mc:Ignorable="hp" hp:hslEmbossed="0">
+                <a:solidFill>
+                  <a:srgbClr val="000000"/>
+                </a:solidFill>
+                <a:latin typeface="Calibri"/>
+                <a:ea typeface="맑은 고딕"/>
+                <a:cs typeface="Times New Roman"/>
+              </a:rPr>
+              <a:t>[3]</a:t>
+            </a:r>
+            <a:endParaRPr xmlns:mc="http://schemas.openxmlformats.org/markup-compatibility/2006" xmlns:hp="http://schemas.haansoft.com/office/presentation/8.0" kumimoji="0" lang="en-US" altLang="ko-KR" sz="2400" b="1" i="0" u="none" strike="noStrike" kern="1200" cap="none" spc="0" normalizeH="0" baseline="0" mc:Ignorable="hp" hp:hslEmbossed="0">
+              <a:solidFill>
+                <a:srgbClr val="000000"/>
+              </a:solidFill>
+              <a:latin typeface="Calibri"/>
+              <a:ea typeface="맑은 고딕"/>
+              <a:cs typeface="Times New Roman"/>
+            </a:endParaRPr>
+          </a:p>
+        </p:txBody>
+      </p:sp>
+      <p:sp>
+        <p:nvSpPr>
+          <p:cNvPr id="13" name=""/>
+          <p:cNvSpPr/>
+          <p:nvPr/>
+        </p:nvSpPr>
+        <p:spPr>
+          <a:xfrm>
+            <a:off x="6437521" y="1463517"/>
+            <a:ext cx="1002631" cy="859455"/>
+          </a:xfrm>
+          <a:prstGeom prst="flowChartAlternateProcess">
+            <a:avLst/>
+          </a:prstGeom>
+        </p:spPr>
+        <p:style>
+          <a:lnRef idx="2">
+            <a:schemeClr val="accent3">
+              <a:shade val="20000"/>
+            </a:schemeClr>
+          </a:lnRef>
+          <a:fillRef idx="1">
+            <a:schemeClr val="accent3"/>
+          </a:fillRef>
+          <a:effectRef idx="0">
+            <a:schemeClr val="accent3"/>
+          </a:effectRef>
+          <a:fontRef idx="minor">
+            <a:schemeClr val="lt1"/>
+          </a:fontRef>
+        </p:style>
+        <p:txBody>
+          <a:bodyPr anchor="ctr"/>
+          <a:p>
+            <a:pPr algn="ctr">
+              <a:defRPr/>
+            </a:pPr>
+            <a:endParaRPr lang="ko-KR" altLang="en-US"/>
+          </a:p>
+        </p:txBody>
+      </p:sp>
+      <p:sp>
+        <p:nvSpPr>
+          <p:cNvPr id="14" name=""/>
+          <p:cNvSpPr/>
+          <p:nvPr/>
+        </p:nvSpPr>
+        <p:spPr>
+          <a:xfrm>
+            <a:off x="7440153" y="1463517"/>
+            <a:ext cx="1002631" cy="859455"/>
+          </a:xfrm>
+          <a:prstGeom prst="flowChartAlternateProcess">
+            <a:avLst/>
+          </a:prstGeom>
+        </p:spPr>
+        <p:style>
+          <a:lnRef idx="2">
+            <a:schemeClr val="accent3">
+              <a:shade val="20000"/>
+            </a:schemeClr>
+          </a:lnRef>
+          <a:fillRef idx="1">
+            <a:schemeClr val="accent3"/>
+          </a:fillRef>
+          <a:effectRef idx="0">
+            <a:schemeClr val="accent3"/>
+          </a:effectRef>
+          <a:fontRef idx="minor">
+            <a:schemeClr val="lt1"/>
+          </a:fontRef>
+        </p:style>
+        <p:txBody>
+          <a:bodyPr anchor="ctr"/>
+          <a:p>
+            <a:pPr algn="ctr">
+              <a:defRPr/>
+            </a:pPr>
+            <a:endParaRPr lang="ko-KR" altLang="en-US"/>
+          </a:p>
+        </p:txBody>
+      </p:sp>
+      <p:sp>
+        <p:nvSpPr>
+          <p:cNvPr id="15" name=""/>
+          <p:cNvSpPr txBox="1"/>
+          <p:nvPr/>
+        </p:nvSpPr>
+        <p:spPr>
+          <a:xfrm>
+            <a:off x="6437521" y="1011657"/>
+            <a:ext cx="1002631" cy="453288"/>
+          </a:xfrm>
+          <a:prstGeom prst="rect">
+            <a:avLst/>
+          </a:prstGeom>
+        </p:spPr>
+        <p:txBody>
+          <a:bodyPr wrap="square">
+            <a:spAutoFit/>
+          </a:bodyPr>
+          <a:p>
+            <a:pPr marL="0" indent="0" algn="ctr" defTabSz="914400" rtl="0" eaLnBrk="1" latinLnBrk="1" hangingPunct="1">
+              <a:lnSpc>
+                <a:spcPct val="100000"/>
+              </a:lnSpc>
+              <a:spcBef>
+                <a:spcPct val="0"/>
+              </a:spcBef>
+              <a:spcAft>
+                <a:spcPts val="0"/>
+              </a:spcAft>
+              <a:buNone/>
+              <a:defRPr/>
+            </a:pPr>
+            <a:r>
+              <a:rPr xmlns:mc="http://schemas.openxmlformats.org/markup-compatibility/2006" xmlns:hp="http://schemas.haansoft.com/office/presentation/8.0" kumimoji="0" lang="en-US" altLang="ko-KR" sz="2400" b="1" i="0" u="none" strike="noStrike" kern="1200" cap="none" spc="0" normalizeH="0" baseline="0" mc:Ignorable="hp" hp:hslEmbossed="0">
+                <a:solidFill>
+                  <a:srgbClr val="000000"/>
+                </a:solidFill>
+                <a:latin typeface="Calibri"/>
+                <a:ea typeface="맑은 고딕"/>
+                <a:cs typeface="Times New Roman"/>
+              </a:rPr>
+              <a:t>[4]</a:t>
+            </a:r>
+            <a:endParaRPr xmlns:mc="http://schemas.openxmlformats.org/markup-compatibility/2006" xmlns:hp="http://schemas.haansoft.com/office/presentation/8.0" kumimoji="0" lang="en-US" altLang="ko-KR" sz="2400" b="1" i="0" u="none" strike="noStrike" kern="1200" cap="none" spc="0" normalizeH="0" baseline="0" mc:Ignorable="hp" hp:hslEmbossed="0">
+              <a:solidFill>
+                <a:srgbClr val="000000"/>
+              </a:solidFill>
+              <a:latin typeface="Calibri"/>
+              <a:ea typeface="맑은 고딕"/>
+              <a:cs typeface="Times New Roman"/>
+            </a:endParaRPr>
+          </a:p>
+        </p:txBody>
+      </p:sp>
+      <p:sp>
+        <p:nvSpPr>
+          <p:cNvPr id="16" name=""/>
+          <p:cNvSpPr txBox="1"/>
+          <p:nvPr/>
+        </p:nvSpPr>
+        <p:spPr>
+          <a:xfrm>
+            <a:off x="7440152" y="1011181"/>
+            <a:ext cx="1002633" cy="453287"/>
+          </a:xfrm>
+          <a:prstGeom prst="rect">
+            <a:avLst/>
+          </a:prstGeom>
+        </p:spPr>
+        <p:txBody>
+          <a:bodyPr wrap="square">
+            <a:spAutoFit/>
+          </a:bodyPr>
+          <a:p>
+            <a:pPr marL="0" indent="0" algn="ctr" defTabSz="914400" rtl="0" eaLnBrk="1" latinLnBrk="1" hangingPunct="1">
+              <a:lnSpc>
+                <a:spcPct val="100000"/>
+              </a:lnSpc>
+              <a:spcBef>
+                <a:spcPct val="0"/>
+              </a:spcBef>
+              <a:spcAft>
+                <a:spcPts val="0"/>
+              </a:spcAft>
+              <a:buNone/>
+              <a:defRPr/>
+            </a:pPr>
+            <a:r>
+              <a:rPr xmlns:mc="http://schemas.openxmlformats.org/markup-compatibility/2006" xmlns:hp="http://schemas.haansoft.com/office/presentation/8.0" kumimoji="0" lang="en-US" altLang="ko-KR" sz="2400" b="1" i="0" u="none" strike="noStrike" kern="1200" cap="none" spc="0" normalizeH="0" baseline="0" mc:Ignorable="hp" hp:hslEmbossed="0">
+                <a:solidFill>
+                  <a:srgbClr val="000000"/>
+                </a:solidFill>
+                <a:latin typeface="Calibri"/>
+                <a:ea typeface="맑은 고딕"/>
+                <a:cs typeface="Times New Roman"/>
+              </a:rPr>
+              <a:t>[5]</a:t>
+            </a:r>
+            <a:endParaRPr xmlns:mc="http://schemas.openxmlformats.org/markup-compatibility/2006" xmlns:hp="http://schemas.haansoft.com/office/presentation/8.0" kumimoji="0" lang="en-US" altLang="ko-KR" sz="2400" b="1" i="0" u="none" strike="noStrike" kern="1200" cap="none" spc="0" normalizeH="0" baseline="0" mc:Ignorable="hp" hp:hslEmbossed="0">
+              <a:solidFill>
+                <a:srgbClr val="000000"/>
+              </a:solidFill>
+              <a:latin typeface="Calibri"/>
+              <a:ea typeface="맑은 고딕"/>
+              <a:cs typeface="Times New Roman"/>
+            </a:endParaRPr>
+          </a:p>
+        </p:txBody>
+      </p:sp>
+      <p:sp>
+        <p:nvSpPr>
+          <p:cNvPr id="19" name=""/>
+          <p:cNvSpPr txBox="1"/>
+          <p:nvPr/>
+        </p:nvSpPr>
+        <p:spPr>
+          <a:xfrm>
+            <a:off x="923615" y="3609801"/>
+            <a:ext cx="1503380" cy="451383"/>
+          </a:xfrm>
+          <a:prstGeom prst="rect">
+            <a:avLst/>
+          </a:prstGeom>
+        </p:spPr>
+        <p:txBody>
+          <a:bodyPr wrap="square">
+            <a:spAutoFit/>
+          </a:bodyPr>
+          <a:p>
+            <a:pPr marL="0" indent="0" algn="ctr" defTabSz="914400" rtl="0" eaLnBrk="1" latinLnBrk="1" hangingPunct="1">
+              <a:lnSpc>
+                <a:spcPct val="100000"/>
+              </a:lnSpc>
+              <a:spcBef>
+                <a:spcPct val="0"/>
+              </a:spcBef>
+              <a:spcAft>
+                <a:spcPts val="0"/>
+              </a:spcAft>
+              <a:buNone/>
+              <a:defRPr/>
+            </a:pPr>
+            <a:r>
+              <a:rPr xmlns:mc="http://schemas.openxmlformats.org/markup-compatibility/2006" xmlns:hp="http://schemas.haansoft.com/office/presentation/8.0" kumimoji="0" lang="en-US" altLang="ko-KR" sz="2400" b="1" i="0" u="none" strike="noStrike" kern="1200" cap="none" spc="0" normalizeH="0" baseline="0" mc:Ignorable="hp" hp:hslEmbossed="0">
+                <a:solidFill>
+                  <a:srgbClr val="000000"/>
+                </a:solidFill>
+                <a:latin typeface="Calibri"/>
+                <a:ea typeface="맑은 고딕"/>
+                <a:cs typeface="Times New Roman"/>
+              </a:rPr>
+              <a:t>Linked List</a:t>
+            </a:r>
+            <a:endParaRPr xmlns:mc="http://schemas.openxmlformats.org/markup-compatibility/2006" xmlns:hp="http://schemas.haansoft.com/office/presentation/8.0" kumimoji="0" lang="en-US" altLang="ko-KR" sz="2400" b="1" i="0" u="none" strike="noStrike" kern="1200" cap="none" spc="0" normalizeH="0" baseline="0" mc:Ignorable="hp" hp:hslEmbossed="0">
+              <a:solidFill>
+                <a:srgbClr val="000000"/>
+              </a:solidFill>
+              <a:latin typeface="Calibri"/>
+              <a:ea typeface="맑은 고딕"/>
+              <a:cs typeface="Times New Roman"/>
+            </a:endParaRPr>
+          </a:p>
+        </p:txBody>
+      </p:sp>
+      <p:sp>
+        <p:nvSpPr>
+          <p:cNvPr id="33" name=""/>
+          <p:cNvSpPr/>
+          <p:nvPr/>
+        </p:nvSpPr>
+        <p:spPr>
+          <a:xfrm>
+            <a:off x="2426994" y="3362475"/>
+            <a:ext cx="1002631" cy="858503"/>
+          </a:xfrm>
+          <a:prstGeom prst="flowChartAlternateProcess">
+            <a:avLst/>
+          </a:prstGeom>
+        </p:spPr>
+        <p:style>
+          <a:lnRef idx="2">
+            <a:schemeClr val="accent3">
+              <a:shade val="20000"/>
+            </a:schemeClr>
+          </a:lnRef>
+          <a:fillRef idx="1">
+            <a:schemeClr val="accent3"/>
+          </a:fillRef>
+          <a:effectRef idx="0">
+            <a:schemeClr val="accent3"/>
+          </a:effectRef>
+          <a:fontRef idx="minor">
+            <a:schemeClr val="lt1"/>
+          </a:fontRef>
+        </p:style>
+        <p:txBody>
+          <a:bodyPr anchor="ctr"/>
+          <a:p>
+            <a:pPr algn="ctr">
+              <a:defRPr/>
+            </a:pPr>
+            <a:r>
+              <a:rPr lang="en-US" altLang="ko-KR" b="1"/>
+              <a:t>Head</a:t>
+            </a:r>
+            <a:endParaRPr lang="en-US" altLang="ko-KR" b="1"/>
+          </a:p>
+        </p:txBody>
+      </p:sp>
+      <p:grpSp>
+        <p:nvGrpSpPr>
+          <p:cNvPr id="37" name=""/>
+          <p:cNvGrpSpPr/>
+          <p:nvPr/>
+        </p:nvGrpSpPr>
+        <p:grpSpPr>
+          <a:xfrm rot="0">
+            <a:off x="4103269" y="3362475"/>
+            <a:ext cx="3001628" cy="858503"/>
+            <a:chOff x="3802480" y="3362475"/>
+            <a:chExt cx="3001628" cy="858503"/>
+          </a:xfrm>
+        </p:grpSpPr>
+        <p:sp>
+          <p:nvSpPr>
+            <p:cNvPr id="34" name=""/>
+            <p:cNvSpPr/>
+            <p:nvPr/>
+          </p:nvSpPr>
+          <p:spPr>
+            <a:xfrm>
+              <a:off x="3802480" y="3362475"/>
+              <a:ext cx="3001628" cy="858503"/>
+            </a:xfrm>
+            <a:prstGeom prst="flowChartAlternateProcess">
+              <a:avLst/>
+            </a:prstGeom>
+          </p:spPr>
+          <p:style>
+            <a:lnRef idx="2">
+              <a:schemeClr val="accent3">
+                <a:shade val="20000"/>
+              </a:schemeClr>
+            </a:lnRef>
+            <a:fillRef idx="1">
+              <a:schemeClr val="accent3"/>
+            </a:fillRef>
+            <a:effectRef idx="0">
+              <a:schemeClr val="accent3"/>
+            </a:effectRef>
+            <a:fontRef idx="minor">
+              <a:schemeClr val="lt1"/>
+            </a:fontRef>
+          </p:style>
+          <p:txBody>
+            <a:bodyPr anchor="ctr"/>
+            <a:p>
+              <a:pPr algn="ctr">
+                <a:defRPr/>
+              </a:pPr>
+              <a:endParaRPr lang="en-US" altLang="ko-KR" b="1"/>
+            </a:p>
+          </p:txBody>
+        </p:sp>
+        <p:sp>
+          <p:nvSpPr>
+            <p:cNvPr id="32" name=""/>
+            <p:cNvSpPr/>
+            <p:nvPr/>
+          </p:nvSpPr>
+          <p:spPr>
+            <a:xfrm>
+              <a:off x="3930942" y="3429000"/>
+              <a:ext cx="745707" cy="707873"/>
+            </a:xfrm>
+            <a:prstGeom prst="flowChartAlternateProcess">
+              <a:avLst/>
+            </a:prstGeom>
+          </p:spPr>
+          <p:style>
+            <a:lnRef idx="2">
+              <a:schemeClr val="accent1">
+                <a:shade val="20000"/>
+              </a:schemeClr>
+            </a:lnRef>
+            <a:fillRef idx="1">
+              <a:schemeClr val="accent1"/>
+            </a:fillRef>
+            <a:effectRef idx="0">
+              <a:schemeClr val="accent1"/>
+            </a:effectRef>
+            <a:fontRef idx="minor">
+              <a:schemeClr val="lt1"/>
+            </a:fontRef>
+          </p:style>
+          <p:txBody>
+            <a:bodyPr anchor="ctr"/>
+            <a:p>
+              <a:pPr algn="ctr">
+                <a:defRPr/>
+              </a:pPr>
+              <a:r>
+                <a:rPr lang="en-US" altLang="ko-KR"/>
+                <a:t>prev</a:t>
+              </a:r>
+              <a:endParaRPr lang="en-US" altLang="ko-KR"/>
+            </a:p>
+          </p:txBody>
+        </p:sp>
+        <p:sp>
+          <p:nvSpPr>
+            <p:cNvPr id="35" name=""/>
+            <p:cNvSpPr/>
+            <p:nvPr/>
+          </p:nvSpPr>
+          <p:spPr>
+            <a:xfrm>
+              <a:off x="5936205" y="3429000"/>
+              <a:ext cx="745707" cy="707873"/>
+            </a:xfrm>
+            <a:prstGeom prst="flowChartAlternateProcess">
+              <a:avLst/>
+            </a:prstGeom>
+          </p:spPr>
+          <p:style>
+            <a:lnRef idx="2">
+              <a:schemeClr val="accent1">
+                <a:shade val="20000"/>
+              </a:schemeClr>
+            </a:lnRef>
+            <a:fillRef idx="1">
+              <a:schemeClr val="accent1"/>
+            </a:fillRef>
+            <a:effectRef idx="0">
+              <a:schemeClr val="accent1"/>
+            </a:effectRef>
+            <a:fontRef idx="minor">
+              <a:schemeClr val="lt1"/>
+            </a:fontRef>
+          </p:style>
+          <p:txBody>
+            <a:bodyPr anchor="ctr"/>
+            <a:p>
+              <a:pPr algn="ctr">
+                <a:defRPr/>
+              </a:pPr>
+              <a:r>
+                <a:rPr lang="en-US" altLang="ko-KR"/>
+                <a:t>next</a:t>
+              </a:r>
+              <a:endParaRPr lang="en-US" altLang="ko-KR"/>
+            </a:p>
+          </p:txBody>
+        </p:sp>
+        <p:sp>
+          <p:nvSpPr>
+            <p:cNvPr id="36" name=""/>
+            <p:cNvSpPr/>
+            <p:nvPr/>
+          </p:nvSpPr>
+          <p:spPr>
+            <a:xfrm>
+              <a:off x="4758113" y="3429000"/>
+              <a:ext cx="1077829" cy="707873"/>
+            </a:xfrm>
+            <a:prstGeom prst="flowChartAlternateProcess">
+              <a:avLst/>
+            </a:prstGeom>
+          </p:spPr>
+          <p:style>
+            <a:lnRef idx="2">
+              <a:schemeClr val="accent1">
+                <a:shade val="20000"/>
+              </a:schemeClr>
+            </a:lnRef>
+            <a:fillRef idx="1">
+              <a:schemeClr val="accent1"/>
+            </a:fillRef>
+            <a:effectRef idx="0">
+              <a:schemeClr val="accent1"/>
+            </a:effectRef>
+            <a:fontRef idx="minor">
+              <a:schemeClr val="lt1"/>
+            </a:fontRef>
+          </p:style>
+          <p:txBody>
+            <a:bodyPr anchor="ctr"/>
+            <a:p>
+              <a:pPr algn="ctr">
+                <a:defRPr/>
+              </a:pPr>
+              <a:r>
+                <a:rPr lang="en-US" altLang="ko-KR"/>
+                <a:t>A</a:t>
+              </a:r>
+              <a:endParaRPr lang="en-US" altLang="ko-KR"/>
+            </a:p>
+          </p:txBody>
+        </p:sp>
+      </p:grpSp>
+      <p:grpSp>
+        <p:nvGrpSpPr>
+          <p:cNvPr id="38" name=""/>
+          <p:cNvGrpSpPr/>
+          <p:nvPr/>
+        </p:nvGrpSpPr>
+        <p:grpSpPr>
+          <a:xfrm rot="0">
+            <a:off x="7778541" y="3362475"/>
+            <a:ext cx="3001628" cy="858503"/>
+            <a:chOff x="3802480" y="3362475"/>
+            <a:chExt cx="3001628" cy="858503"/>
+          </a:xfrm>
+        </p:grpSpPr>
+        <p:sp>
+          <p:nvSpPr>
+            <p:cNvPr id="39" name=""/>
+            <p:cNvSpPr/>
+            <p:nvPr/>
+          </p:nvSpPr>
+          <p:spPr>
+            <a:xfrm>
+              <a:off x="3802480" y="3362475"/>
+              <a:ext cx="3001628" cy="858503"/>
+            </a:xfrm>
+            <a:prstGeom prst="flowChartAlternateProcess">
+              <a:avLst/>
+            </a:prstGeom>
+          </p:spPr>
+          <p:style>
+            <a:lnRef idx="2">
+              <a:schemeClr val="accent3">
+                <a:shade val="20000"/>
+              </a:schemeClr>
+            </a:lnRef>
+            <a:fillRef idx="1">
+              <a:schemeClr val="accent3"/>
+            </a:fillRef>
+            <a:effectRef idx="0">
+              <a:schemeClr val="accent3"/>
+            </a:effectRef>
+            <a:fontRef idx="minor">
+              <a:schemeClr val="lt1"/>
+            </a:fontRef>
+          </p:style>
+          <p:txBody>
+            <a:bodyPr anchor="ctr"/>
+            <a:p>
+              <a:pPr algn="ctr">
+                <a:defRPr/>
+              </a:pPr>
+              <a:endParaRPr lang="en-US" altLang="ko-KR" b="1"/>
+            </a:p>
+          </p:txBody>
+        </p:sp>
+        <p:sp>
+          <p:nvSpPr>
+            <p:cNvPr id="40" name=""/>
+            <p:cNvSpPr/>
+            <p:nvPr/>
+          </p:nvSpPr>
+          <p:spPr>
+            <a:xfrm>
+              <a:off x="3930942" y="3429000"/>
+              <a:ext cx="745707" cy="707873"/>
+            </a:xfrm>
+            <a:prstGeom prst="flowChartAlternateProcess">
+              <a:avLst/>
+            </a:prstGeom>
+          </p:spPr>
+          <p:style>
+            <a:lnRef idx="2">
+              <a:schemeClr val="accent1">
+                <a:shade val="20000"/>
+              </a:schemeClr>
+            </a:lnRef>
+            <a:fillRef idx="1">
+              <a:schemeClr val="accent1"/>
+            </a:fillRef>
+            <a:effectRef idx="0">
+              <a:schemeClr val="accent1"/>
+            </a:effectRef>
+            <a:fontRef idx="minor">
+              <a:schemeClr val="lt1"/>
+            </a:fontRef>
+          </p:style>
+          <p:txBody>
+            <a:bodyPr anchor="ctr"/>
+            <a:p>
+              <a:pPr algn="ctr">
+                <a:defRPr/>
+              </a:pPr>
+              <a:r>
+                <a:rPr lang="en-US" altLang="ko-KR"/>
+                <a:t>prev</a:t>
+              </a:r>
+              <a:endParaRPr lang="en-US" altLang="ko-KR"/>
+            </a:p>
+          </p:txBody>
+        </p:sp>
+        <p:sp>
+          <p:nvSpPr>
+            <p:cNvPr id="41" name=""/>
+            <p:cNvSpPr/>
+            <p:nvPr/>
+          </p:nvSpPr>
+          <p:spPr>
+            <a:xfrm>
+              <a:off x="5936205" y="3429000"/>
+              <a:ext cx="745707" cy="707873"/>
+            </a:xfrm>
+            <a:prstGeom prst="flowChartAlternateProcess">
+              <a:avLst/>
+            </a:prstGeom>
+          </p:spPr>
+          <p:style>
+            <a:lnRef idx="2">
+              <a:schemeClr val="accent1">
+                <a:shade val="20000"/>
+              </a:schemeClr>
+            </a:lnRef>
+            <a:fillRef idx="1">
+              <a:schemeClr val="accent1"/>
+            </a:fillRef>
+            <a:effectRef idx="0">
+              <a:schemeClr val="accent1"/>
+            </a:effectRef>
+            <a:fontRef idx="minor">
+              <a:schemeClr val="lt1"/>
+            </a:fontRef>
+          </p:style>
+          <p:txBody>
+            <a:bodyPr anchor="ctr"/>
+            <a:p>
+              <a:pPr algn="ctr">
+                <a:defRPr/>
+              </a:pPr>
+              <a:r>
+                <a:rPr lang="en-US" altLang="ko-KR"/>
+                <a:t>next</a:t>
+              </a:r>
+              <a:endParaRPr lang="en-US" altLang="ko-KR"/>
+            </a:p>
+          </p:txBody>
+        </p:sp>
+        <p:sp>
+          <p:nvSpPr>
+            <p:cNvPr id="42" name=""/>
+            <p:cNvSpPr/>
+            <p:nvPr/>
+          </p:nvSpPr>
+          <p:spPr>
+            <a:xfrm>
+              <a:off x="4758113" y="3429000"/>
+              <a:ext cx="1077829" cy="707873"/>
+            </a:xfrm>
+            <a:prstGeom prst="flowChartAlternateProcess">
+              <a:avLst/>
+            </a:prstGeom>
+          </p:spPr>
+          <p:style>
+            <a:lnRef idx="2">
+              <a:schemeClr val="accent1">
+                <a:shade val="20000"/>
+              </a:schemeClr>
+            </a:lnRef>
+            <a:fillRef idx="1">
+              <a:schemeClr val="accent1"/>
+            </a:fillRef>
+            <a:effectRef idx="0">
+              <a:schemeClr val="accent1"/>
+            </a:effectRef>
+            <a:fontRef idx="minor">
+              <a:schemeClr val="lt1"/>
+            </a:fontRef>
+          </p:style>
+          <p:txBody>
+            <a:bodyPr anchor="ctr"/>
+            <a:p>
+              <a:pPr algn="ctr">
+                <a:defRPr/>
+              </a:pPr>
+              <a:r>
+                <a:rPr lang="en-US" altLang="ko-KR"/>
+                <a:t>B</a:t>
+              </a:r>
+              <a:endParaRPr lang="en-US" altLang="ko-KR"/>
+            </a:p>
+          </p:txBody>
+        </p:sp>
+      </p:grpSp>
+      <p:grpSp>
+        <p:nvGrpSpPr>
+          <p:cNvPr id="43" name=""/>
+          <p:cNvGrpSpPr/>
+          <p:nvPr/>
+        </p:nvGrpSpPr>
+        <p:grpSpPr>
+          <a:xfrm rot="0">
+            <a:off x="2928310" y="4778693"/>
+            <a:ext cx="3001628" cy="858503"/>
+            <a:chOff x="3802480" y="3362475"/>
+            <a:chExt cx="3001628" cy="858503"/>
+          </a:xfrm>
+        </p:grpSpPr>
+        <p:sp>
+          <p:nvSpPr>
+            <p:cNvPr id="44" name=""/>
+            <p:cNvSpPr/>
+            <p:nvPr/>
+          </p:nvSpPr>
+          <p:spPr>
+            <a:xfrm>
+              <a:off x="3802480" y="3362475"/>
+              <a:ext cx="3001628" cy="858503"/>
+            </a:xfrm>
+            <a:prstGeom prst="flowChartAlternateProcess">
+              <a:avLst/>
+            </a:prstGeom>
+          </p:spPr>
+          <p:style>
+            <a:lnRef idx="2">
+              <a:schemeClr val="accent3">
+                <a:shade val="20000"/>
+              </a:schemeClr>
+            </a:lnRef>
+            <a:fillRef idx="1">
+              <a:schemeClr val="accent3"/>
+            </a:fillRef>
+            <a:effectRef idx="0">
+              <a:schemeClr val="accent3"/>
+            </a:effectRef>
+            <a:fontRef idx="minor">
+              <a:schemeClr val="lt1"/>
+            </a:fontRef>
+          </p:style>
+          <p:txBody>
+            <a:bodyPr anchor="ctr"/>
+            <a:p>
+              <a:pPr algn="ctr">
+                <a:defRPr/>
+              </a:pPr>
+              <a:endParaRPr lang="en-US" altLang="ko-KR" b="1"/>
+            </a:p>
+          </p:txBody>
+        </p:sp>
+        <p:sp>
+          <p:nvSpPr>
+            <p:cNvPr id="45" name=""/>
+            <p:cNvSpPr/>
+            <p:nvPr/>
+          </p:nvSpPr>
+          <p:spPr>
+            <a:xfrm>
+              <a:off x="3930942" y="3429000"/>
+              <a:ext cx="745707" cy="707873"/>
+            </a:xfrm>
+            <a:prstGeom prst="flowChartAlternateProcess">
+              <a:avLst/>
+            </a:prstGeom>
+          </p:spPr>
+          <p:style>
+            <a:lnRef idx="2">
+              <a:schemeClr val="accent1">
+                <a:shade val="20000"/>
+              </a:schemeClr>
+            </a:lnRef>
+            <a:fillRef idx="1">
+              <a:schemeClr val="accent1"/>
+            </a:fillRef>
+            <a:effectRef idx="0">
+              <a:schemeClr val="accent1"/>
+            </a:effectRef>
+            <a:fontRef idx="minor">
+              <a:schemeClr val="lt1"/>
+            </a:fontRef>
+          </p:style>
+          <p:txBody>
+            <a:bodyPr anchor="ctr"/>
+            <a:p>
+              <a:pPr algn="ctr">
+                <a:defRPr/>
+              </a:pPr>
+              <a:r>
+                <a:rPr lang="en-US" altLang="ko-KR"/>
+                <a:t>prev</a:t>
+              </a:r>
+              <a:endParaRPr lang="en-US" altLang="ko-KR"/>
+            </a:p>
+          </p:txBody>
+        </p:sp>
+        <p:sp>
+          <p:nvSpPr>
+            <p:cNvPr id="46" name=""/>
+            <p:cNvSpPr/>
+            <p:nvPr/>
+          </p:nvSpPr>
+          <p:spPr>
+            <a:xfrm>
+              <a:off x="5936205" y="3429000"/>
+              <a:ext cx="745707" cy="707873"/>
+            </a:xfrm>
+            <a:prstGeom prst="flowChartAlternateProcess">
+              <a:avLst/>
+            </a:prstGeom>
+          </p:spPr>
+          <p:style>
+            <a:lnRef idx="2">
+              <a:schemeClr val="accent1">
+                <a:shade val="20000"/>
+              </a:schemeClr>
+            </a:lnRef>
+            <a:fillRef idx="1">
+              <a:schemeClr val="accent1"/>
+            </a:fillRef>
+            <a:effectRef idx="0">
+              <a:schemeClr val="accent1"/>
+            </a:effectRef>
+            <a:fontRef idx="minor">
+              <a:schemeClr val="lt1"/>
+            </a:fontRef>
+          </p:style>
+          <p:txBody>
+            <a:bodyPr anchor="ctr"/>
+            <a:p>
+              <a:pPr algn="ctr">
+                <a:defRPr/>
+              </a:pPr>
+              <a:r>
+                <a:rPr lang="en-US" altLang="ko-KR"/>
+                <a:t>next</a:t>
+              </a:r>
+              <a:endParaRPr lang="en-US" altLang="ko-KR"/>
+            </a:p>
+          </p:txBody>
+        </p:sp>
+        <p:sp>
+          <p:nvSpPr>
+            <p:cNvPr id="47" name=""/>
+            <p:cNvSpPr/>
+            <p:nvPr/>
+          </p:nvSpPr>
+          <p:spPr>
+            <a:xfrm>
+              <a:off x="4758113" y="3429000"/>
+              <a:ext cx="1077829" cy="707873"/>
+            </a:xfrm>
+            <a:prstGeom prst="flowChartAlternateProcess">
+              <a:avLst/>
+            </a:prstGeom>
+          </p:spPr>
+          <p:style>
+            <a:lnRef idx="2">
+              <a:schemeClr val="accent1">
+                <a:shade val="20000"/>
+              </a:schemeClr>
+            </a:lnRef>
+            <a:fillRef idx="1">
+              <a:schemeClr val="accent1"/>
+            </a:fillRef>
+            <a:effectRef idx="0">
+              <a:schemeClr val="accent1"/>
+            </a:effectRef>
+            <a:fontRef idx="minor">
+              <a:schemeClr val="lt1"/>
+            </a:fontRef>
+          </p:style>
+          <p:txBody>
+            <a:bodyPr anchor="ctr"/>
+            <a:p>
+              <a:pPr algn="ctr">
+                <a:defRPr/>
+              </a:pPr>
+              <a:r>
+                <a:rPr lang="en-US" altLang="ko-KR"/>
+                <a:t>C</a:t>
+              </a:r>
+              <a:endParaRPr lang="en-US" altLang="ko-KR"/>
+            </a:p>
+          </p:txBody>
+        </p:sp>
+      </p:grpSp>
+      <p:sp>
+        <p:nvSpPr>
+          <p:cNvPr id="48" name=""/>
+          <p:cNvSpPr/>
+          <p:nvPr/>
+        </p:nvSpPr>
+        <p:spPr>
+          <a:xfrm>
+            <a:off x="6603582" y="4778693"/>
+            <a:ext cx="1002631" cy="858503"/>
+          </a:xfrm>
+          <a:prstGeom prst="flowChartAlternateProcess">
+            <a:avLst/>
+          </a:prstGeom>
+        </p:spPr>
+        <p:style>
+          <a:lnRef idx="2">
+            <a:schemeClr val="accent3">
+              <a:shade val="20000"/>
+            </a:schemeClr>
+          </a:lnRef>
+          <a:fillRef idx="1">
+            <a:schemeClr val="accent3"/>
+          </a:fillRef>
+          <a:effectRef idx="0">
+            <a:schemeClr val="accent3"/>
+          </a:effectRef>
+          <a:fontRef idx="minor">
+            <a:schemeClr val="lt1"/>
+          </a:fontRef>
+        </p:style>
+        <p:txBody>
+          <a:bodyPr anchor="ctr"/>
+          <a:p>
+            <a:pPr algn="ctr">
+              <a:defRPr/>
+            </a:pPr>
+            <a:r>
+              <a:rPr lang="en-US" altLang="ko-KR" b="1"/>
+              <a:t>NULL</a:t>
+            </a:r>
+            <a:endParaRPr lang="en-US" altLang="ko-KR" b="1"/>
+          </a:p>
+        </p:txBody>
+      </p:sp>
+      <p:cxnSp>
+        <p:nvCxnSpPr>
+          <p:cNvPr id="49" name=""/>
+          <p:cNvCxnSpPr/>
+          <p:nvPr/>
+        </p:nvCxnSpPr>
+        <p:spPr>
+          <a:xfrm>
+            <a:off x="3207102" y="3960921"/>
+            <a:ext cx="1193823" cy="0"/>
+          </a:xfrm>
+          <a:prstGeom prst="straightConnector1">
+            <a:avLst/>
+          </a:prstGeom>
+          <a:ln w="28575">
+            <a:solidFill>
+              <a:srgbClr val="ff843a"/>
+            </a:solidFill>
+            <a:headEnd w="med" len="med"/>
+            <a:tailEnd type="arrow" w="med" len="med"/>
+          </a:ln>
+        </p:spPr>
+        <p:style>
+          <a:lnRef idx="2">
+            <a:schemeClr val="accent2">
+              <a:shade val="20000"/>
+            </a:schemeClr>
+          </a:lnRef>
+          <a:fillRef idx="1">
+            <a:schemeClr val="accent2"/>
+          </a:fillRef>
+          <a:effectRef idx="0">
+            <a:schemeClr val="accent2"/>
+          </a:effectRef>
+          <a:fontRef idx="minor">
+            <a:schemeClr val="lt1"/>
+          </a:fontRef>
+        </p:style>
+      </p:cxnSp>
+      <p:cxnSp>
+        <p:nvCxnSpPr>
+          <p:cNvPr id="50" name=""/>
+          <p:cNvCxnSpPr/>
+          <p:nvPr/>
+        </p:nvCxnSpPr>
+        <p:spPr>
+          <a:xfrm flipH="1">
+            <a:off x="3207102" y="3641133"/>
+            <a:ext cx="1193823" cy="0"/>
+          </a:xfrm>
+          <a:prstGeom prst="straightConnector1">
+            <a:avLst/>
+          </a:prstGeom>
+          <a:ln w="28575">
+            <a:solidFill>
+              <a:srgbClr val="ff843a"/>
+            </a:solidFill>
+            <a:headEnd w="med" len="med"/>
+            <a:tailEnd type="arrow" w="med" len="med"/>
+          </a:ln>
+        </p:spPr>
+        <p:style>
+          <a:lnRef idx="2">
+            <a:schemeClr val="accent2">
+              <a:shade val="20000"/>
+            </a:schemeClr>
+          </a:lnRef>
+          <a:fillRef idx="1">
+            <a:schemeClr val="accent2"/>
+          </a:fillRef>
+          <a:effectRef idx="0">
+            <a:schemeClr val="accent2"/>
+          </a:effectRef>
+          <a:fontRef idx="minor">
+            <a:schemeClr val="lt1"/>
+          </a:fontRef>
+        </p:style>
+      </p:cxnSp>
+      <p:cxnSp>
+        <p:nvCxnSpPr>
+          <p:cNvPr id="51" name=""/>
+          <p:cNvCxnSpPr/>
+          <p:nvPr/>
+        </p:nvCxnSpPr>
+        <p:spPr>
+          <a:xfrm>
+            <a:off x="6811909" y="3960921"/>
+            <a:ext cx="1193823" cy="0"/>
+          </a:xfrm>
+          <a:prstGeom prst="straightConnector1">
+            <a:avLst/>
+          </a:prstGeom>
+          <a:ln w="28575">
+            <a:solidFill>
+              <a:srgbClr val="ff843a"/>
+            </a:solidFill>
+            <a:headEnd w="med" len="med"/>
+            <a:tailEnd type="arrow" w="med" len="med"/>
+          </a:ln>
+        </p:spPr>
+        <p:style>
+          <a:lnRef idx="2">
+            <a:schemeClr val="accent2">
+              <a:shade val="20000"/>
+            </a:schemeClr>
+          </a:lnRef>
+          <a:fillRef idx="1">
+            <a:schemeClr val="accent2"/>
+          </a:fillRef>
+          <a:effectRef idx="0">
+            <a:schemeClr val="accent2"/>
+          </a:effectRef>
+          <a:fontRef idx="minor">
+            <a:schemeClr val="lt1"/>
+          </a:fontRef>
+        </p:style>
+      </p:cxnSp>
+      <p:cxnSp>
+        <p:nvCxnSpPr>
+          <p:cNvPr id="52" name=""/>
+          <p:cNvCxnSpPr/>
+          <p:nvPr/>
+        </p:nvCxnSpPr>
+        <p:spPr>
+          <a:xfrm flipH="1">
+            <a:off x="6811909" y="3641133"/>
+            <a:ext cx="1193823" cy="0"/>
+          </a:xfrm>
+          <a:prstGeom prst="straightConnector1">
+            <a:avLst/>
+          </a:prstGeom>
+          <a:ln w="28575">
+            <a:solidFill>
+              <a:srgbClr val="ff843a"/>
+            </a:solidFill>
+            <a:headEnd w="med" len="med"/>
+            <a:tailEnd type="arrow" w="med" len="med"/>
+          </a:ln>
+        </p:spPr>
+        <p:style>
+          <a:lnRef idx="2">
+            <a:schemeClr val="accent2">
+              <a:shade val="20000"/>
+            </a:schemeClr>
+          </a:lnRef>
+          <a:fillRef idx="1">
+            <a:schemeClr val="accent2"/>
+          </a:fillRef>
+          <a:effectRef idx="0">
+            <a:schemeClr val="accent2"/>
+          </a:effectRef>
+          <a:fontRef idx="minor">
+            <a:schemeClr val="lt1"/>
+          </a:fontRef>
+        </p:style>
+      </p:cxnSp>
+      <p:cxnSp>
+        <p:nvCxnSpPr>
+          <p:cNvPr id="56" name=""/>
+          <p:cNvCxnSpPr/>
+          <p:nvPr/>
+        </p:nvCxnSpPr>
+        <p:spPr>
+          <a:xfrm>
+            <a:off x="2270333" y="5370874"/>
+            <a:ext cx="918593" cy="0"/>
+          </a:xfrm>
+          <a:prstGeom prst="straightConnector1">
+            <a:avLst/>
+          </a:prstGeom>
+          <a:ln w="28575">
+            <a:solidFill>
+              <a:srgbClr val="ff843a"/>
+            </a:solidFill>
+            <a:headEnd w="med" len="med"/>
+            <a:tailEnd type="arrow" w="med" len="med"/>
+          </a:ln>
+        </p:spPr>
+        <p:style>
+          <a:lnRef idx="2">
+            <a:schemeClr val="accent2">
+              <a:shade val="20000"/>
+            </a:schemeClr>
+          </a:lnRef>
+          <a:fillRef idx="1">
+            <a:schemeClr val="accent2"/>
+          </a:fillRef>
+          <a:effectRef idx="0">
+            <a:schemeClr val="accent2"/>
+          </a:effectRef>
+          <a:fontRef idx="minor">
+            <a:schemeClr val="lt1"/>
+          </a:fontRef>
+        </p:style>
+      </p:cxnSp>
+      <p:cxnSp>
+        <p:nvCxnSpPr>
+          <p:cNvPr id="57" name=""/>
+          <p:cNvCxnSpPr/>
+          <p:nvPr/>
+        </p:nvCxnSpPr>
+        <p:spPr>
+          <a:xfrm rot="10800000">
+            <a:off x="10476182" y="3609801"/>
+            <a:ext cx="767707" cy="0"/>
+          </a:xfrm>
+          <a:prstGeom prst="straightConnector1">
+            <a:avLst/>
+          </a:prstGeom>
+          <a:ln w="28575">
+            <a:solidFill>
+              <a:srgbClr val="ff843a"/>
+            </a:solidFill>
+            <a:headEnd w="med" len="med"/>
+            <a:tailEnd type="arrow" w="med" len="med"/>
+          </a:ln>
+        </p:spPr>
+        <p:style>
+          <a:lnRef idx="2">
+            <a:schemeClr val="accent2">
+              <a:shade val="20000"/>
+            </a:schemeClr>
+          </a:lnRef>
+          <a:fillRef idx="1">
+            <a:schemeClr val="accent2"/>
+          </a:fillRef>
+          <a:effectRef idx="0">
+            <a:schemeClr val="accent2"/>
+          </a:effectRef>
+          <a:fontRef idx="minor">
+            <a:schemeClr val="lt1"/>
+          </a:fontRef>
+        </p:style>
+      </p:cxnSp>
+      <p:cxnSp>
+        <p:nvCxnSpPr>
+          <p:cNvPr id="58" name=""/>
+          <p:cNvCxnSpPr/>
+          <p:nvPr/>
+        </p:nvCxnSpPr>
+        <p:spPr>
+          <a:xfrm rot="10800000" flipV="1">
+            <a:off x="2508459" y="3609821"/>
+            <a:ext cx="8735434" cy="1019203"/>
+          </a:xfrm>
+          <a:prstGeom prst="bentConnector3">
+            <a:avLst>
+              <a:gd name="adj1" fmla="val -49"/>
+            </a:avLst>
+          </a:prstGeom>
+          <a:ln w="28575">
+            <a:solidFill>
+              <a:srgbClr val="ff843a"/>
+            </a:solidFill>
+            <a:headEnd w="med" len="med"/>
+            <a:tailEnd w="med" len="med"/>
+          </a:ln>
+        </p:spPr>
+        <p:style>
+          <a:lnRef idx="2">
+            <a:schemeClr val="accent2">
+              <a:shade val="20000"/>
+            </a:schemeClr>
+          </a:lnRef>
+          <a:fillRef idx="1">
+            <a:schemeClr val="accent2"/>
+          </a:fillRef>
+          <a:effectRef idx="0">
+            <a:schemeClr val="accent2"/>
+          </a:effectRef>
+          <a:fontRef idx="minor">
+            <a:schemeClr val="lt1"/>
+          </a:fontRef>
+        </p:style>
+      </p:cxnSp>
+      <p:cxnSp>
+        <p:nvCxnSpPr>
+          <p:cNvPr id="59" name=""/>
+          <p:cNvCxnSpPr/>
+          <p:nvPr/>
+        </p:nvCxnSpPr>
+        <p:spPr>
+          <a:xfrm>
+            <a:off x="2508459" y="4629025"/>
+            <a:ext cx="680468" cy="444917"/>
+          </a:xfrm>
+          <a:prstGeom prst="bentConnector3">
+            <a:avLst>
+              <a:gd name="adj1" fmla="val 1870"/>
+            </a:avLst>
+          </a:prstGeom>
+          <a:ln w="28575">
+            <a:solidFill>
+              <a:srgbClr val="ff843a"/>
+            </a:solidFill>
+            <a:headEnd w="med" len="med"/>
+            <a:tailEnd w="med" len="med"/>
+          </a:ln>
+        </p:spPr>
+        <p:style>
+          <a:lnRef idx="2">
+            <a:schemeClr val="accent2">
+              <a:shade val="20000"/>
+            </a:schemeClr>
+          </a:lnRef>
+          <a:fillRef idx="1">
+            <a:schemeClr val="accent2"/>
+          </a:fillRef>
+          <a:effectRef idx="0">
+            <a:schemeClr val="accent2"/>
+          </a:effectRef>
+          <a:fontRef idx="minor">
+            <a:schemeClr val="lt1"/>
+          </a:fontRef>
+        </p:style>
+      </p:cxnSp>
+      <p:cxnSp>
+        <p:nvCxnSpPr>
+          <p:cNvPr id="60" name=""/>
+          <p:cNvCxnSpPr/>
+          <p:nvPr/>
+        </p:nvCxnSpPr>
+        <p:spPr>
+          <a:xfrm rot="10800000" flipV="1">
+            <a:off x="2270334" y="4365834"/>
+            <a:ext cx="8810624" cy="1005028"/>
+          </a:xfrm>
+          <a:prstGeom prst="bentConnector3">
+            <a:avLst>
+              <a:gd name="adj1" fmla="val 99918"/>
+            </a:avLst>
+          </a:prstGeom>
+          <a:ln w="28575">
+            <a:solidFill>
+              <a:srgbClr val="ff843a"/>
+            </a:solidFill>
+            <a:headEnd w="med" len="med"/>
+            <a:tailEnd w="med" len="med"/>
+          </a:ln>
+        </p:spPr>
+        <p:style>
+          <a:lnRef idx="2">
+            <a:schemeClr val="accent2">
+              <a:shade val="20000"/>
+            </a:schemeClr>
+          </a:lnRef>
+          <a:fillRef idx="1">
+            <a:schemeClr val="accent2"/>
+          </a:fillRef>
+          <a:effectRef idx="0">
+            <a:schemeClr val="accent2"/>
+          </a:effectRef>
+          <a:fontRef idx="minor">
+            <a:schemeClr val="lt1"/>
+          </a:fontRef>
+        </p:style>
+      </p:cxnSp>
+      <p:cxnSp>
+        <p:nvCxnSpPr>
+          <p:cNvPr id="62" name=""/>
+          <p:cNvCxnSpPr/>
+          <p:nvPr/>
+        </p:nvCxnSpPr>
+        <p:spPr>
+          <a:xfrm>
+            <a:off x="10476182" y="3960921"/>
+            <a:ext cx="604776" cy="404912"/>
+          </a:xfrm>
+          <a:prstGeom prst="bentConnector3">
+            <a:avLst>
+              <a:gd name="adj1" fmla="val 100174"/>
+            </a:avLst>
+          </a:prstGeom>
+          <a:ln w="28575">
+            <a:solidFill>
+              <a:srgbClr val="ff843a"/>
+            </a:solidFill>
+            <a:headEnd w="med" len="med"/>
+            <a:tailEnd w="med" len="med"/>
+          </a:ln>
+        </p:spPr>
+        <p:style>
+          <a:lnRef idx="2">
+            <a:schemeClr val="accent2">
+              <a:shade val="20000"/>
+            </a:schemeClr>
+          </a:lnRef>
+          <a:fillRef idx="1">
+            <a:schemeClr val="accent2"/>
+          </a:fillRef>
+          <a:effectRef idx="0">
+            <a:schemeClr val="accent2"/>
+          </a:effectRef>
+          <a:fontRef idx="minor">
+            <a:schemeClr val="lt1"/>
+          </a:fontRef>
+        </p:style>
+      </p:cxnSp>
+      <p:cxnSp>
+        <p:nvCxnSpPr>
+          <p:cNvPr id="63" name=""/>
+          <p:cNvCxnSpPr/>
+          <p:nvPr/>
+        </p:nvCxnSpPr>
+        <p:spPr>
+          <a:xfrm>
+            <a:off x="5604083" y="5370874"/>
+            <a:ext cx="1193823" cy="0"/>
+          </a:xfrm>
+          <a:prstGeom prst="straightConnector1">
+            <a:avLst/>
+          </a:prstGeom>
+          <a:ln w="28575">
+            <a:solidFill>
+              <a:srgbClr val="ff843a"/>
+            </a:solidFill>
+            <a:headEnd w="med" len="med"/>
+            <a:tailEnd type="arrow" w="med" len="med"/>
+          </a:ln>
+        </p:spPr>
+        <p:style>
+          <a:lnRef idx="2">
+            <a:schemeClr val="accent2">
+              <a:shade val="20000"/>
+            </a:schemeClr>
+          </a:lnRef>
+          <a:fillRef idx="1">
+            <a:schemeClr val="accent2"/>
+          </a:fillRef>
+          <a:effectRef idx="0">
+            <a:schemeClr val="accent2"/>
+          </a:effectRef>
+          <a:fontRef idx="minor">
+            <a:schemeClr val="lt1"/>
+          </a:fontRef>
+        </p:style>
+      </p:cxnSp>
+      <p:cxnSp>
+        <p:nvCxnSpPr>
+          <p:cNvPr id="64" name=""/>
+          <p:cNvCxnSpPr/>
+          <p:nvPr/>
+        </p:nvCxnSpPr>
+        <p:spPr>
+          <a:xfrm flipH="1">
+            <a:off x="5604083" y="5051087"/>
+            <a:ext cx="1193823" cy="0"/>
+          </a:xfrm>
+          <a:prstGeom prst="straightConnector1">
+            <a:avLst/>
+          </a:prstGeom>
+          <a:ln w="28575">
+            <a:solidFill>
+              <a:srgbClr val="ff843a"/>
+            </a:solidFill>
+            <a:headEnd w="med" len="med"/>
+            <a:tailEnd type="arrow" w="med" len="med"/>
+          </a:ln>
+        </p:spPr>
+        <p:style>
+          <a:lnRef idx="2">
+            <a:schemeClr val="accent2">
+              <a:shade val="20000"/>
+            </a:schemeClr>
+          </a:lnRef>
+          <a:fillRef idx="1">
+            <a:schemeClr val="accent2"/>
+          </a:fillRef>
+          <a:effectRef idx="0">
+            <a:schemeClr val="accent2"/>
+          </a:effectRef>
+          <a:fontRef idx="minor">
+            <a:schemeClr val="lt1"/>
           </a:fontRef>
         </p:style>
       </p:cxnSp>

</xml_diff>

<commit_message>
add image "hash table"
</commit_message>
<xml_diff>
--- a/etc/images.pptx
+++ b/etc/images.pptx
@@ -2,7 +2,7 @@
 <file path=ppt/presentation.xml><?xml version="1.0" encoding="utf-8"?>
 <p:presentation xmlns:r="http://schemas.openxmlformats.org/officeDocument/2006/relationships" xmlns:c="http://schemas.openxmlformats.org/drawingml/2006/chart" xmlns:a="http://schemas.openxmlformats.org/drawingml/2006/main" xmlns:dgm="http://schemas.openxmlformats.org/drawingml/2006/diagram" xmlns:dsp="http://schemas.microsoft.com/office/drawing/2008/diagram" xmlns:p="http://schemas.openxmlformats.org/presentationml/2006/main">
   <p:sldMasterIdLst>
-    <p:sldMasterId id="2147483732" r:id="rId1"/>
+    <p:sldMasterId id="2147483733" r:id="rId1"/>
   </p:sldMasterIdLst>
   <p:notesMasterIdLst>
     <p:notesMasterId r:id="rId2"/>
@@ -21,6 +21,7 @@
     <p:sldId id="266" r:id="rId13"/>
     <p:sldId id="267" r:id="rId14"/>
     <p:sldId id="268" r:id="rId15"/>
+    <p:sldId id="269" r:id="rId16"/>
   </p:sldIdLst>
   <p:sldSz cx="12192000" cy="6858000"/>
   <p:notesSz cx="6858000" cy="9144000"/>
@@ -217,7 +218,7 @@
               <a:pPr lvl="0">
                 <a:defRPr/>
               </a:pPr>
-              <a:t>2019-08-19</a:t>
+              <a:t>2019-08-21</a:t>
             </a:fld>
             <a:endParaRPr lang="ko-KR" altLang="en-US"/>
           </a:p>
@@ -10542,6 +10543,1403 @@
           </a:fontRef>
         </p:style>
       </p:cxnSp>
+    </p:spTree>
+  </p:cSld>
+  <p:clrMapOvr>
+    <a:masterClrMapping/>
+  </p:clrMapOvr>
+  <mc:AlternateContent xmlns:mc="http://schemas.openxmlformats.org/markup-compatibility/2006">
+    <mc:Choice xmlns:p14="http://schemas.microsoft.com/office/powerpoint/2010/main" Requires="p14">
+      <p:transition xmlns:mc="http://schemas.openxmlformats.org/markup-compatibility/2006" xmlns:p14="http://schemas.microsoft.com/office/powerpoint/2010/main" mc:Ignorable="p14" p14:dur="500"/>
+    </mc:Choice>
+    <mc:Fallback>
+      <p:transition/>
+    </mc:Fallback>
+  </mc:AlternateContent>
+</p:sld>
+</file>
+
+<file path=ppt/slides/slide14.xml><?xml version="1.0" encoding="utf-8"?>
+<p:sld xmlns:r="http://schemas.openxmlformats.org/officeDocument/2006/relationships" xmlns:c="http://schemas.openxmlformats.org/drawingml/2006/chart" xmlns:a="http://schemas.openxmlformats.org/drawingml/2006/main" xmlns:dgm="http://schemas.openxmlformats.org/drawingml/2006/diagram" xmlns:dsp="http://schemas.microsoft.com/office/drawing/2008/diagram" xmlns:p="http://schemas.openxmlformats.org/presentationml/2006/main">
+  <p:cSld>
+    <p:spTree>
+      <p:nvGrpSpPr>
+        <p:cNvPr id="1" name=""/>
+        <p:cNvGrpSpPr/>
+        <p:nvPr/>
+      </p:nvGrpSpPr>
+      <p:grpSpPr>
+        <a:xfrm>
+          <a:off x="0" y="0"/>
+          <a:ext cx="0" cy="0"/>
+          <a:chOff x="0" y="0"/>
+          <a:chExt cx="0" cy="0"/>
+        </a:xfrm>
+      </p:grpSpPr>
+      <p:sp>
+        <p:nvSpPr>
+          <p:cNvPr id="4" name=""/>
+          <p:cNvSpPr/>
+          <p:nvPr/>
+        </p:nvSpPr>
+        <p:spPr>
+          <a:xfrm>
+            <a:off x="1427512" y="1668421"/>
+            <a:ext cx="1373084" cy="432954"/>
+          </a:xfrm>
+          <a:prstGeom prst="flowChartAlternateProcess">
+            <a:avLst/>
+          </a:prstGeom>
+        </p:spPr>
+        <p:style>
+          <a:lnRef idx="2">
+            <a:schemeClr val="accent1">
+              <a:shade val="20000"/>
+            </a:schemeClr>
+          </a:lnRef>
+          <a:fillRef idx="1">
+            <a:schemeClr val="accent1"/>
+          </a:fillRef>
+          <a:effectRef idx="0">
+            <a:schemeClr val="accent1"/>
+          </a:effectRef>
+          <a:fontRef idx="minor">
+            <a:schemeClr val="lt1"/>
+          </a:fontRef>
+        </p:style>
+        <p:txBody>
+          <a:bodyPr anchor="ctr"/>
+          <a:p>
+            <a:pPr algn="ctr">
+              <a:defRPr/>
+            </a:pPr>
+            <a:r>
+              <a:rPr lang="en-US" altLang="ko-KR" b="1"/>
+              <a:t>John Smith</a:t>
+            </a:r>
+            <a:endParaRPr lang="en-US" altLang="ko-KR" b="1"/>
+          </a:p>
+        </p:txBody>
+      </p:sp>
+      <p:sp>
+        <p:nvSpPr>
+          <p:cNvPr id="5" name=""/>
+          <p:cNvSpPr/>
+          <p:nvPr/>
+        </p:nvSpPr>
+        <p:spPr>
+          <a:xfrm>
+            <a:off x="1427512" y="2418516"/>
+            <a:ext cx="1373084" cy="432954"/>
+          </a:xfrm>
+          <a:prstGeom prst="flowChartAlternateProcess">
+            <a:avLst/>
+          </a:prstGeom>
+        </p:spPr>
+        <p:style>
+          <a:lnRef idx="2">
+            <a:schemeClr val="accent1">
+              <a:shade val="20000"/>
+            </a:schemeClr>
+          </a:lnRef>
+          <a:fillRef idx="1">
+            <a:schemeClr val="accent1"/>
+          </a:fillRef>
+          <a:effectRef idx="0">
+            <a:schemeClr val="accent1"/>
+          </a:effectRef>
+          <a:fontRef idx="minor">
+            <a:schemeClr val="lt1"/>
+          </a:fontRef>
+        </p:style>
+        <p:txBody>
+          <a:bodyPr anchor="ctr"/>
+          <a:p>
+            <a:pPr algn="ctr">
+              <a:defRPr/>
+            </a:pPr>
+            <a:r>
+              <a:rPr lang="en-US" altLang="ko-KR" b="1"/>
+              <a:t>Kim Jaeho</a:t>
+            </a:r>
+            <a:endParaRPr lang="en-US" altLang="ko-KR" b="1"/>
+          </a:p>
+        </p:txBody>
+      </p:sp>
+      <p:sp>
+        <p:nvSpPr>
+          <p:cNvPr id="6" name=""/>
+          <p:cNvSpPr/>
+          <p:nvPr/>
+        </p:nvSpPr>
+        <p:spPr>
+          <a:xfrm>
+            <a:off x="1427512" y="3212522"/>
+            <a:ext cx="1373084" cy="432954"/>
+          </a:xfrm>
+          <a:prstGeom prst="flowChartAlternateProcess">
+            <a:avLst/>
+          </a:prstGeom>
+        </p:spPr>
+        <p:style>
+          <a:lnRef idx="2">
+            <a:schemeClr val="accent1">
+              <a:shade val="20000"/>
+            </a:schemeClr>
+          </a:lnRef>
+          <a:fillRef idx="1">
+            <a:schemeClr val="accent1"/>
+          </a:fillRef>
+          <a:effectRef idx="0">
+            <a:schemeClr val="accent1"/>
+          </a:effectRef>
+          <a:fontRef idx="minor">
+            <a:schemeClr val="lt1"/>
+          </a:fontRef>
+        </p:style>
+        <p:txBody>
+          <a:bodyPr anchor="ctr"/>
+          <a:p>
+            <a:pPr algn="ctr">
+              <a:defRPr/>
+            </a:pPr>
+            <a:r>
+              <a:rPr lang="en-US" altLang="ko-KR" b="1"/>
+              <a:t>Ted Baker</a:t>
+            </a:r>
+            <a:endParaRPr lang="en-US" altLang="ko-KR" b="1"/>
+          </a:p>
+        </p:txBody>
+      </p:sp>
+      <p:sp>
+        <p:nvSpPr>
+          <p:cNvPr id="7" name=""/>
+          <p:cNvSpPr/>
+          <p:nvPr/>
+        </p:nvSpPr>
+        <p:spPr>
+          <a:xfrm>
+            <a:off x="1427512" y="3936639"/>
+            <a:ext cx="1373084" cy="432954"/>
+          </a:xfrm>
+          <a:prstGeom prst="flowChartAlternateProcess">
+            <a:avLst/>
+          </a:prstGeom>
+        </p:spPr>
+        <p:style>
+          <a:lnRef idx="2">
+            <a:schemeClr val="accent1">
+              <a:shade val="20000"/>
+            </a:schemeClr>
+          </a:lnRef>
+          <a:fillRef idx="1">
+            <a:schemeClr val="accent1"/>
+          </a:fillRef>
+          <a:effectRef idx="0">
+            <a:schemeClr val="accent1"/>
+          </a:effectRef>
+          <a:fontRef idx="minor">
+            <a:schemeClr val="lt1"/>
+          </a:fontRef>
+        </p:style>
+        <p:txBody>
+          <a:bodyPr anchor="ctr"/>
+          <a:p>
+            <a:pPr algn="ctr">
+              <a:defRPr/>
+            </a:pPr>
+            <a:r>
+              <a:rPr lang="en-US" altLang="ko-KR" b="1"/>
+              <a:t>Sam Doe</a:t>
+            </a:r>
+            <a:endParaRPr lang="en-US" altLang="ko-KR" b="1"/>
+          </a:p>
+        </p:txBody>
+      </p:sp>
+      <p:sp>
+        <p:nvSpPr>
+          <p:cNvPr id="8" name=""/>
+          <p:cNvSpPr/>
+          <p:nvPr/>
+        </p:nvSpPr>
+        <p:spPr>
+          <a:xfrm>
+            <a:off x="1427512" y="4686733"/>
+            <a:ext cx="1373084" cy="432954"/>
+          </a:xfrm>
+          <a:prstGeom prst="flowChartAlternateProcess">
+            <a:avLst/>
+          </a:prstGeom>
+        </p:spPr>
+        <p:style>
+          <a:lnRef idx="2">
+            <a:schemeClr val="accent1">
+              <a:shade val="20000"/>
+            </a:schemeClr>
+          </a:lnRef>
+          <a:fillRef idx="1">
+            <a:schemeClr val="accent1"/>
+          </a:fillRef>
+          <a:effectRef idx="0">
+            <a:schemeClr val="accent1"/>
+          </a:effectRef>
+          <a:fontRef idx="minor">
+            <a:schemeClr val="lt1"/>
+          </a:fontRef>
+        </p:style>
+        <p:txBody>
+          <a:bodyPr anchor="ctr"/>
+          <a:p>
+            <a:pPr algn="ctr">
+              <a:defRPr/>
+            </a:pPr>
+            <a:r>
+              <a:rPr lang="en-US" altLang="ko-KR" b="1"/>
+              <a:t>Big Mama</a:t>
+            </a:r>
+            <a:endParaRPr lang="en-US" altLang="ko-KR" b="1"/>
+          </a:p>
+        </p:txBody>
+      </p:sp>
+      <p:sp>
+        <p:nvSpPr>
+          <p:cNvPr id="9" name=""/>
+          <p:cNvSpPr txBox="1"/>
+          <p:nvPr/>
+        </p:nvSpPr>
+        <p:spPr>
+          <a:xfrm>
+            <a:off x="1781393" y="879274"/>
+            <a:ext cx="665322" cy="395170"/>
+          </a:xfrm>
+          <a:prstGeom prst="rect">
+            <a:avLst/>
+          </a:prstGeom>
+        </p:spPr>
+        <p:txBody>
+          <a:bodyPr wrap="none">
+            <a:spAutoFit/>
+          </a:bodyPr>
+          <a:p>
+            <a:pPr>
+              <a:defRPr/>
+            </a:pPr>
+            <a:r>
+              <a:rPr lang="en-US" altLang="ko-KR" sz="2000" b="1"/>
+              <a:t>Keys</a:t>
+            </a:r>
+            <a:endParaRPr lang="en-US" altLang="ko-KR" sz="2000" b="1"/>
+          </a:p>
+        </p:txBody>
+      </p:sp>
+      <p:sp>
+        <p:nvSpPr>
+          <p:cNvPr id="10" name=""/>
+          <p:cNvSpPr/>
+          <p:nvPr/>
+        </p:nvSpPr>
+        <p:spPr>
+          <a:xfrm>
+            <a:off x="4546950" y="1668421"/>
+            <a:ext cx="686542" cy="432954"/>
+          </a:xfrm>
+          <a:prstGeom prst="flowChartAlternateProcess">
+            <a:avLst/>
+          </a:prstGeom>
+        </p:spPr>
+        <p:style>
+          <a:lnRef idx="2">
+            <a:schemeClr val="accent5">
+              <a:shade val="20000"/>
+            </a:schemeClr>
+          </a:lnRef>
+          <a:fillRef idx="1">
+            <a:schemeClr val="accent5"/>
+          </a:fillRef>
+          <a:effectRef idx="0">
+            <a:schemeClr val="accent5"/>
+          </a:effectRef>
+          <a:fontRef idx="minor">
+            <a:schemeClr val="lt1"/>
+          </a:fontRef>
+        </p:style>
+        <p:txBody>
+          <a:bodyPr anchor="ctr"/>
+          <a:p>
+            <a:pPr algn="ctr">
+              <a:defRPr/>
+            </a:pPr>
+            <a:r>
+              <a:rPr lang="en-US" altLang="ko-KR" b="1"/>
+              <a:t>001</a:t>
+            </a:r>
+            <a:endParaRPr lang="en-US" altLang="ko-KR" b="1"/>
+          </a:p>
+        </p:txBody>
+      </p:sp>
+      <p:sp>
+        <p:nvSpPr>
+          <p:cNvPr id="11" name=""/>
+          <p:cNvSpPr/>
+          <p:nvPr/>
+        </p:nvSpPr>
+        <p:spPr>
+          <a:xfrm>
+            <a:off x="4546950" y="2101376"/>
+            <a:ext cx="686542" cy="432954"/>
+          </a:xfrm>
+          <a:prstGeom prst="flowChartAlternateProcess">
+            <a:avLst/>
+          </a:prstGeom>
+        </p:spPr>
+        <p:style>
+          <a:lnRef idx="2">
+            <a:schemeClr val="accent5">
+              <a:shade val="20000"/>
+            </a:schemeClr>
+          </a:lnRef>
+          <a:fillRef idx="1">
+            <a:schemeClr val="accent5"/>
+          </a:fillRef>
+          <a:effectRef idx="0">
+            <a:schemeClr val="accent5"/>
+          </a:effectRef>
+          <a:fontRef idx="minor">
+            <a:schemeClr val="lt1"/>
+          </a:fontRef>
+        </p:style>
+        <p:txBody>
+          <a:bodyPr anchor="ctr"/>
+          <a:p>
+            <a:pPr algn="ctr">
+              <a:defRPr/>
+            </a:pPr>
+            <a:r>
+              <a:rPr lang="en-US" altLang="ko-KR" b="1"/>
+              <a:t>002</a:t>
+            </a:r>
+            <a:endParaRPr lang="en-US" altLang="ko-KR" b="1"/>
+          </a:p>
+        </p:txBody>
+      </p:sp>
+      <p:sp>
+        <p:nvSpPr>
+          <p:cNvPr id="12" name=""/>
+          <p:cNvSpPr/>
+          <p:nvPr/>
+        </p:nvSpPr>
+        <p:spPr>
+          <a:xfrm>
+            <a:off x="4546950" y="2534330"/>
+            <a:ext cx="686542" cy="432954"/>
+          </a:xfrm>
+          <a:prstGeom prst="flowChartAlternateProcess">
+            <a:avLst/>
+          </a:prstGeom>
+        </p:spPr>
+        <p:style>
+          <a:lnRef idx="2">
+            <a:schemeClr val="accent5">
+              <a:shade val="20000"/>
+            </a:schemeClr>
+          </a:lnRef>
+          <a:fillRef idx="1">
+            <a:schemeClr val="accent5"/>
+          </a:fillRef>
+          <a:effectRef idx="0">
+            <a:schemeClr val="accent5"/>
+          </a:effectRef>
+          <a:fontRef idx="minor">
+            <a:schemeClr val="lt1"/>
+          </a:fontRef>
+        </p:style>
+        <p:txBody>
+          <a:bodyPr anchor="ctr"/>
+          <a:p>
+            <a:pPr algn="ctr">
+              <a:defRPr/>
+            </a:pPr>
+            <a:r>
+              <a:rPr lang="en-US" altLang="ko-KR" b="1"/>
+              <a:t>003</a:t>
+            </a:r>
+            <a:endParaRPr lang="en-US" altLang="ko-KR" b="1"/>
+          </a:p>
+        </p:txBody>
+      </p:sp>
+      <p:sp>
+        <p:nvSpPr>
+          <p:cNvPr id="13" name=""/>
+          <p:cNvSpPr/>
+          <p:nvPr/>
+        </p:nvSpPr>
+        <p:spPr>
+          <a:xfrm>
+            <a:off x="4546950" y="2967470"/>
+            <a:ext cx="686542" cy="432954"/>
+          </a:xfrm>
+          <a:prstGeom prst="flowChartAlternateProcess">
+            <a:avLst/>
+          </a:prstGeom>
+        </p:spPr>
+        <p:style>
+          <a:lnRef idx="2">
+            <a:schemeClr val="accent5">
+              <a:shade val="20000"/>
+            </a:schemeClr>
+          </a:lnRef>
+          <a:fillRef idx="1">
+            <a:schemeClr val="accent5"/>
+          </a:fillRef>
+          <a:effectRef idx="0">
+            <a:schemeClr val="accent5"/>
+          </a:effectRef>
+          <a:fontRef idx="minor">
+            <a:schemeClr val="lt1"/>
+          </a:fontRef>
+        </p:style>
+        <p:txBody>
+          <a:bodyPr anchor="ctr"/>
+          <a:p>
+            <a:pPr algn="ctr">
+              <a:defRPr/>
+            </a:pPr>
+            <a:r>
+              <a:rPr lang="en-US" altLang="ko-KR" b="1"/>
+              <a:t>004</a:t>
+            </a:r>
+            <a:endParaRPr lang="en-US" altLang="ko-KR" b="1"/>
+          </a:p>
+        </p:txBody>
+      </p:sp>
+      <p:sp>
+        <p:nvSpPr>
+          <p:cNvPr id="14" name=""/>
+          <p:cNvSpPr/>
+          <p:nvPr/>
+        </p:nvSpPr>
+        <p:spPr>
+          <a:xfrm>
+            <a:off x="4546950" y="3387684"/>
+            <a:ext cx="686542" cy="432954"/>
+          </a:xfrm>
+          <a:prstGeom prst="flowChartAlternateProcess">
+            <a:avLst/>
+          </a:prstGeom>
+        </p:spPr>
+        <p:style>
+          <a:lnRef idx="2">
+            <a:schemeClr val="accent5">
+              <a:shade val="20000"/>
+            </a:schemeClr>
+          </a:lnRef>
+          <a:fillRef idx="1">
+            <a:schemeClr val="accent5"/>
+          </a:fillRef>
+          <a:effectRef idx="0">
+            <a:schemeClr val="accent5"/>
+          </a:effectRef>
+          <a:fontRef idx="minor">
+            <a:schemeClr val="lt1"/>
+          </a:fontRef>
+        </p:style>
+        <p:txBody>
+          <a:bodyPr anchor="ctr"/>
+          <a:p>
+            <a:pPr algn="ctr">
+              <a:defRPr/>
+            </a:pPr>
+            <a:r>
+              <a:rPr lang="en-US" altLang="ko-KR" b="1"/>
+              <a:t>005</a:t>
+            </a:r>
+            <a:endParaRPr lang="en-US" altLang="ko-KR" b="1"/>
+          </a:p>
+        </p:txBody>
+      </p:sp>
+      <p:sp>
+        <p:nvSpPr>
+          <p:cNvPr id="15" name=""/>
+          <p:cNvSpPr/>
+          <p:nvPr/>
+        </p:nvSpPr>
+        <p:spPr>
+          <a:xfrm>
+            <a:off x="4546950" y="3820638"/>
+            <a:ext cx="686542" cy="432954"/>
+          </a:xfrm>
+          <a:prstGeom prst="flowChartAlternateProcess">
+            <a:avLst/>
+          </a:prstGeom>
+        </p:spPr>
+        <p:style>
+          <a:lnRef idx="2">
+            <a:schemeClr val="accent5">
+              <a:shade val="20000"/>
+            </a:schemeClr>
+          </a:lnRef>
+          <a:fillRef idx="1">
+            <a:schemeClr val="accent5"/>
+          </a:fillRef>
+          <a:effectRef idx="0">
+            <a:schemeClr val="accent5"/>
+          </a:effectRef>
+          <a:fontRef idx="minor">
+            <a:schemeClr val="lt1"/>
+          </a:fontRef>
+        </p:style>
+        <p:txBody>
+          <a:bodyPr anchor="ctr"/>
+          <a:p>
+            <a:pPr algn="ctr">
+              <a:defRPr/>
+            </a:pPr>
+            <a:r>
+              <a:rPr lang="en-US" altLang="ko-KR" b="1"/>
+              <a:t>006</a:t>
+            </a:r>
+            <a:endParaRPr lang="en-US" altLang="ko-KR" b="1"/>
+          </a:p>
+        </p:txBody>
+      </p:sp>
+      <p:sp>
+        <p:nvSpPr>
+          <p:cNvPr id="16" name=""/>
+          <p:cNvSpPr/>
+          <p:nvPr/>
+        </p:nvSpPr>
+        <p:spPr>
+          <a:xfrm>
+            <a:off x="4546950" y="4253593"/>
+            <a:ext cx="686542" cy="432954"/>
+          </a:xfrm>
+          <a:prstGeom prst="flowChartAlternateProcess">
+            <a:avLst/>
+          </a:prstGeom>
+        </p:spPr>
+        <p:style>
+          <a:lnRef idx="2">
+            <a:schemeClr val="accent5">
+              <a:shade val="20000"/>
+            </a:schemeClr>
+          </a:lnRef>
+          <a:fillRef idx="1">
+            <a:schemeClr val="accent5"/>
+          </a:fillRef>
+          <a:effectRef idx="0">
+            <a:schemeClr val="accent5"/>
+          </a:effectRef>
+          <a:fontRef idx="minor">
+            <a:schemeClr val="lt1"/>
+          </a:fontRef>
+        </p:style>
+        <p:txBody>
+          <a:bodyPr anchor="ctr"/>
+          <a:p>
+            <a:pPr algn="ctr">
+              <a:defRPr/>
+            </a:pPr>
+            <a:r>
+              <a:rPr lang="en-US" altLang="ko-KR" b="1"/>
+              <a:t>007</a:t>
+            </a:r>
+            <a:endParaRPr lang="en-US" altLang="ko-KR" b="1"/>
+          </a:p>
+        </p:txBody>
+      </p:sp>
+      <p:sp>
+        <p:nvSpPr>
+          <p:cNvPr id="17" name=""/>
+          <p:cNvSpPr/>
+          <p:nvPr/>
+        </p:nvSpPr>
+        <p:spPr>
+          <a:xfrm>
+            <a:off x="4546950" y="4686733"/>
+            <a:ext cx="686542" cy="432954"/>
+          </a:xfrm>
+          <a:prstGeom prst="flowChartAlternateProcess">
+            <a:avLst/>
+          </a:prstGeom>
+        </p:spPr>
+        <p:style>
+          <a:lnRef idx="2">
+            <a:schemeClr val="accent5">
+              <a:shade val="20000"/>
+            </a:schemeClr>
+          </a:lnRef>
+          <a:fillRef idx="1">
+            <a:schemeClr val="accent5"/>
+          </a:fillRef>
+          <a:effectRef idx="0">
+            <a:schemeClr val="accent5"/>
+          </a:effectRef>
+          <a:fontRef idx="minor">
+            <a:schemeClr val="lt1"/>
+          </a:fontRef>
+        </p:style>
+        <p:txBody>
+          <a:bodyPr anchor="ctr"/>
+          <a:p>
+            <a:pPr algn="ctr">
+              <a:defRPr/>
+            </a:pPr>
+            <a:r>
+              <a:rPr lang="en-US" altLang="ko-KR" b="1"/>
+              <a:t>008</a:t>
+            </a:r>
+            <a:endParaRPr lang="en-US" altLang="ko-KR" b="1"/>
+          </a:p>
+        </p:txBody>
+      </p:sp>
+      <p:sp>
+        <p:nvSpPr>
+          <p:cNvPr id="18" name=""/>
+          <p:cNvSpPr txBox="1"/>
+          <p:nvPr/>
+        </p:nvSpPr>
+        <p:spPr>
+          <a:xfrm>
+            <a:off x="5474219" y="879275"/>
+            <a:ext cx="1010383" cy="395170"/>
+          </a:xfrm>
+          <a:prstGeom prst="rect">
+            <a:avLst/>
+          </a:prstGeom>
+        </p:spPr>
+        <p:txBody>
+          <a:bodyPr wrap="none">
+            <a:spAutoFit/>
+          </a:bodyPr>
+          <a:p>
+            <a:pPr>
+              <a:defRPr/>
+            </a:pPr>
+            <a:r>
+              <a:rPr lang="en-US" altLang="ko-KR" sz="2000" b="1"/>
+              <a:t>Buckets</a:t>
+            </a:r>
+            <a:endParaRPr lang="en-US" altLang="ko-KR" sz="2000" b="1"/>
+          </a:p>
+        </p:txBody>
+      </p:sp>
+      <p:sp>
+        <p:nvSpPr>
+          <p:cNvPr id="19" name=""/>
+          <p:cNvSpPr txBox="1"/>
+          <p:nvPr/>
+        </p:nvSpPr>
+        <p:spPr>
+          <a:xfrm>
+            <a:off x="4167396" y="1273848"/>
+            <a:ext cx="1467594" cy="394572"/>
+          </a:xfrm>
+          <a:prstGeom prst="rect">
+            <a:avLst/>
+          </a:prstGeom>
+        </p:spPr>
+        <p:txBody>
+          <a:bodyPr wrap="none">
+            <a:spAutoFit/>
+          </a:bodyPr>
+          <a:p>
+            <a:pPr>
+              <a:defRPr/>
+            </a:pPr>
+            <a:r>
+              <a:rPr lang="en-US" altLang="ko-KR" sz="2000" b="1"/>
+              <a:t>Hash Values</a:t>
+            </a:r>
+            <a:endParaRPr lang="en-US" altLang="ko-KR" sz="2000" b="1"/>
+          </a:p>
+        </p:txBody>
+      </p:sp>
+      <p:sp>
+        <p:nvSpPr>
+          <p:cNvPr id="20" name=""/>
+          <p:cNvSpPr/>
+          <p:nvPr/>
+        </p:nvSpPr>
+        <p:spPr>
+          <a:xfrm>
+            <a:off x="5233492" y="2101376"/>
+            <a:ext cx="1491837" cy="432954"/>
+          </a:xfrm>
+          <a:prstGeom prst="flowChartAlternateProcess">
+            <a:avLst/>
+          </a:prstGeom>
+        </p:spPr>
+        <p:style>
+          <a:lnRef idx="2">
+            <a:schemeClr val="accent6">
+              <a:shade val="20000"/>
+            </a:schemeClr>
+          </a:lnRef>
+          <a:fillRef idx="1">
+            <a:schemeClr val="accent6"/>
+          </a:fillRef>
+          <a:effectRef idx="0">
+            <a:schemeClr val="accent6"/>
+          </a:effectRef>
+          <a:fontRef idx="minor">
+            <a:schemeClr val="lt1"/>
+          </a:fontRef>
+        </p:style>
+        <p:txBody>
+          <a:bodyPr anchor="ctr"/>
+          <a:p>
+            <a:pPr algn="ctr">
+              <a:defRPr/>
+            </a:pPr>
+            <a:r>
+              <a:rPr lang="en-US" altLang="ko-KR" b="1"/>
+              <a:t>Ted Baker</a:t>
+            </a:r>
+            <a:endParaRPr lang="en-US" altLang="ko-KR" b="1"/>
+          </a:p>
+        </p:txBody>
+      </p:sp>
+      <p:cxnSp>
+        <p:nvCxnSpPr>
+          <p:cNvPr id="21" name=""/>
+          <p:cNvCxnSpPr>
+            <a:stCxn id="4" idx="3"/>
+            <a:endCxn id="14" idx="1"/>
+          </p:cNvCxnSpPr>
+          <p:nvPr/>
+        </p:nvCxnSpPr>
+        <p:spPr>
+          <a:xfrm>
+            <a:off x="2800597" y="1884898"/>
+            <a:ext cx="1746353" cy="1719262"/>
+          </a:xfrm>
+          <a:prstGeom prst="bentConnector3">
+            <a:avLst>
+              <a:gd name="adj1" fmla="val 50000"/>
+            </a:avLst>
+          </a:prstGeom>
+          <a:ln w="28575">
+            <a:solidFill>
+              <a:srgbClr val="000000"/>
+            </a:solidFill>
+            <a:tailEnd type="arrow"/>
+          </a:ln>
+        </p:spPr>
+        <p:style>
+          <a:lnRef idx="1">
+            <a:schemeClr val="accent1"/>
+          </a:lnRef>
+          <a:fillRef idx="0">
+            <a:schemeClr val="accent1"/>
+          </a:fillRef>
+          <a:effectRef idx="0">
+            <a:schemeClr val="accent1"/>
+          </a:effectRef>
+          <a:fontRef idx="minor">
+            <a:schemeClr val="tx1"/>
+          </a:fontRef>
+        </p:style>
+      </p:cxnSp>
+      <p:cxnSp>
+        <p:nvCxnSpPr>
+          <p:cNvPr id="22" name=""/>
+          <p:cNvCxnSpPr>
+            <a:stCxn id="5" idx="3"/>
+            <a:endCxn id="16" idx="1"/>
+          </p:cNvCxnSpPr>
+          <p:nvPr/>
+        </p:nvCxnSpPr>
+        <p:spPr>
+          <a:xfrm>
+            <a:off x="2800597" y="2634993"/>
+            <a:ext cx="1746353" cy="1835076"/>
+          </a:xfrm>
+          <a:prstGeom prst="bentConnector3">
+            <a:avLst>
+              <a:gd name="adj1" fmla="val 19279"/>
+            </a:avLst>
+          </a:prstGeom>
+          <a:ln w="28575">
+            <a:solidFill>
+              <a:srgbClr val="000000"/>
+            </a:solidFill>
+            <a:tailEnd type="arrow"/>
+          </a:ln>
+        </p:spPr>
+        <p:style>
+          <a:lnRef idx="1">
+            <a:schemeClr val="accent1"/>
+          </a:lnRef>
+          <a:fillRef idx="0">
+            <a:schemeClr val="accent1"/>
+          </a:fillRef>
+          <a:effectRef idx="0">
+            <a:schemeClr val="accent1"/>
+          </a:effectRef>
+          <a:fontRef idx="minor">
+            <a:schemeClr val="tx1"/>
+          </a:fontRef>
+        </p:style>
+      </p:cxnSp>
+      <p:cxnSp>
+        <p:nvCxnSpPr>
+          <p:cNvPr id="25" name=""/>
+          <p:cNvCxnSpPr>
+            <a:stCxn id="6" idx="3"/>
+            <a:endCxn id="11" idx="1"/>
+          </p:cNvCxnSpPr>
+          <p:nvPr/>
+        </p:nvCxnSpPr>
+        <p:spPr>
+          <a:xfrm flipV="1">
+            <a:off x="2800597" y="2317853"/>
+            <a:ext cx="1746353" cy="1111146"/>
+          </a:xfrm>
+          <a:prstGeom prst="bentConnector3">
+            <a:avLst>
+              <a:gd name="adj1" fmla="val 64335"/>
+            </a:avLst>
+          </a:prstGeom>
+          <a:ln w="28575">
+            <a:solidFill>
+              <a:srgbClr val="000000"/>
+            </a:solidFill>
+            <a:tailEnd type="arrow"/>
+          </a:ln>
+        </p:spPr>
+        <p:style>
+          <a:lnRef idx="1">
+            <a:schemeClr val="accent1"/>
+          </a:lnRef>
+          <a:fillRef idx="0">
+            <a:schemeClr val="accent1"/>
+          </a:fillRef>
+          <a:effectRef idx="0">
+            <a:schemeClr val="accent1"/>
+          </a:effectRef>
+          <a:fontRef idx="minor">
+            <a:schemeClr val="tx1"/>
+          </a:fontRef>
+        </p:style>
+      </p:cxnSp>
+      <p:cxnSp>
+        <p:nvCxnSpPr>
+          <p:cNvPr id="26" name=""/>
+          <p:cNvCxnSpPr>
+            <a:stCxn id="7" idx="3"/>
+            <a:endCxn id="12" idx="1"/>
+          </p:cNvCxnSpPr>
+          <p:nvPr/>
+        </p:nvCxnSpPr>
+        <p:spPr>
+          <a:xfrm flipV="1">
+            <a:off x="2800597" y="2750807"/>
+            <a:ext cx="1746353" cy="1402308"/>
+          </a:xfrm>
+          <a:prstGeom prst="bentConnector3">
+            <a:avLst>
+              <a:gd name="adj1" fmla="val 38735"/>
+            </a:avLst>
+          </a:prstGeom>
+          <a:ln w="28575">
+            <a:solidFill>
+              <a:srgbClr val="000000"/>
+            </a:solidFill>
+            <a:tailEnd type="arrow"/>
+          </a:ln>
+        </p:spPr>
+        <p:style>
+          <a:lnRef idx="1">
+            <a:schemeClr val="accent1"/>
+          </a:lnRef>
+          <a:fillRef idx="0">
+            <a:schemeClr val="accent1"/>
+          </a:fillRef>
+          <a:effectRef idx="0">
+            <a:schemeClr val="accent1"/>
+          </a:effectRef>
+          <a:fontRef idx="minor">
+            <a:schemeClr val="tx1"/>
+          </a:fontRef>
+        </p:style>
+      </p:cxnSp>
+      <p:cxnSp>
+        <p:nvCxnSpPr>
+          <p:cNvPr id="27" name=""/>
+          <p:cNvCxnSpPr>
+            <a:stCxn id="8" idx="3"/>
+            <a:endCxn id="15" idx="1"/>
+          </p:cNvCxnSpPr>
+          <p:nvPr/>
+        </p:nvCxnSpPr>
+        <p:spPr>
+          <a:xfrm flipV="1">
+            <a:off x="2800597" y="4037115"/>
+            <a:ext cx="1746353" cy="866094"/>
+          </a:xfrm>
+          <a:prstGeom prst="bentConnector3">
+            <a:avLst>
+              <a:gd name="adj1" fmla="val 78159"/>
+            </a:avLst>
+          </a:prstGeom>
+          <a:ln w="28575">
+            <a:solidFill>
+              <a:srgbClr val="000000"/>
+            </a:solidFill>
+            <a:tailEnd type="arrow"/>
+          </a:ln>
+        </p:spPr>
+        <p:style>
+          <a:lnRef idx="1">
+            <a:schemeClr val="accent1"/>
+          </a:lnRef>
+          <a:fillRef idx="0">
+            <a:schemeClr val="accent1"/>
+          </a:fillRef>
+          <a:effectRef idx="0">
+            <a:schemeClr val="accent1"/>
+          </a:effectRef>
+          <a:fontRef idx="minor">
+            <a:schemeClr val="tx1"/>
+          </a:fontRef>
+        </p:style>
+      </p:cxnSp>
+      <p:sp>
+        <p:nvSpPr>
+          <p:cNvPr id="28" name=""/>
+          <p:cNvSpPr/>
+          <p:nvPr/>
+        </p:nvSpPr>
+        <p:spPr>
+          <a:xfrm>
+            <a:off x="6725329" y="2101376"/>
+            <a:ext cx="1491837" cy="432954"/>
+          </a:xfrm>
+          <a:prstGeom prst="flowChartAlternateProcess">
+            <a:avLst/>
+          </a:prstGeom>
+        </p:spPr>
+        <p:style>
+          <a:lnRef idx="2">
+            <a:schemeClr val="accent6">
+              <a:shade val="20000"/>
+            </a:schemeClr>
+          </a:lnRef>
+          <a:fillRef idx="1">
+            <a:schemeClr val="accent6"/>
+          </a:fillRef>
+          <a:effectRef idx="0">
+            <a:schemeClr val="accent6"/>
+          </a:effectRef>
+          <a:fontRef idx="minor">
+            <a:schemeClr val="lt1"/>
+          </a:fontRef>
+        </p:style>
+        <p:txBody>
+          <a:bodyPr anchor="ctr"/>
+          <a:p>
+            <a:pPr algn="ctr">
+              <a:defRPr/>
+            </a:pPr>
+            <a:r>
+              <a:rPr lang="en-US" altLang="ko-KR" b="1"/>
+              <a:t>123-4510</a:t>
+            </a:r>
+            <a:endParaRPr lang="en-US" altLang="ko-KR" b="1"/>
+          </a:p>
+        </p:txBody>
+      </p:sp>
+      <p:sp>
+        <p:nvSpPr>
+          <p:cNvPr id="29" name=""/>
+          <p:cNvSpPr/>
+          <p:nvPr/>
+        </p:nvSpPr>
+        <p:spPr>
+          <a:xfrm>
+            <a:off x="5233492" y="2534330"/>
+            <a:ext cx="1491837" cy="432954"/>
+          </a:xfrm>
+          <a:prstGeom prst="flowChartAlternateProcess">
+            <a:avLst/>
+          </a:prstGeom>
+        </p:spPr>
+        <p:style>
+          <a:lnRef idx="2">
+            <a:schemeClr val="accent6">
+              <a:shade val="20000"/>
+            </a:schemeClr>
+          </a:lnRef>
+          <a:fillRef idx="1">
+            <a:schemeClr val="accent6"/>
+          </a:fillRef>
+          <a:effectRef idx="0">
+            <a:schemeClr val="accent6"/>
+          </a:effectRef>
+          <a:fontRef idx="minor">
+            <a:schemeClr val="lt1"/>
+          </a:fontRef>
+        </p:style>
+        <p:txBody>
+          <a:bodyPr anchor="ctr"/>
+          <a:p>
+            <a:pPr algn="ctr">
+              <a:defRPr/>
+            </a:pPr>
+            <a:r>
+              <a:rPr lang="en-US" altLang="ko-KR" b="1"/>
+              <a:t>Sam Doe</a:t>
+            </a:r>
+            <a:endParaRPr lang="en-US" altLang="ko-KR" b="1"/>
+          </a:p>
+        </p:txBody>
+      </p:sp>
+      <p:sp>
+        <p:nvSpPr>
+          <p:cNvPr id="30" name=""/>
+          <p:cNvSpPr/>
+          <p:nvPr/>
+        </p:nvSpPr>
+        <p:spPr>
+          <a:xfrm>
+            <a:off x="6725329" y="2534330"/>
+            <a:ext cx="1491837" cy="432954"/>
+          </a:xfrm>
+          <a:prstGeom prst="flowChartAlternateProcess">
+            <a:avLst/>
+          </a:prstGeom>
+        </p:spPr>
+        <p:style>
+          <a:lnRef idx="2">
+            <a:schemeClr val="accent6">
+              <a:shade val="20000"/>
+            </a:schemeClr>
+          </a:lnRef>
+          <a:fillRef idx="1">
+            <a:schemeClr val="accent6"/>
+          </a:fillRef>
+          <a:effectRef idx="0">
+            <a:schemeClr val="accent6"/>
+          </a:effectRef>
+          <a:fontRef idx="minor">
+            <a:schemeClr val="lt1"/>
+          </a:fontRef>
+        </p:style>
+        <p:txBody>
+          <a:bodyPr anchor="ctr"/>
+          <a:p>
+            <a:pPr algn="ctr">
+              <a:defRPr/>
+            </a:pPr>
+            <a:r>
+              <a:rPr lang="en-US" altLang="ko-KR" b="1"/>
+              <a:t>123-2270</a:t>
+            </a:r>
+            <a:endParaRPr lang="en-US" altLang="ko-KR" b="1"/>
+          </a:p>
+        </p:txBody>
+      </p:sp>
+      <p:sp>
+        <p:nvSpPr>
+          <p:cNvPr id="31" name=""/>
+          <p:cNvSpPr/>
+          <p:nvPr/>
+        </p:nvSpPr>
+        <p:spPr>
+          <a:xfrm>
+            <a:off x="5233492" y="3400425"/>
+            <a:ext cx="1491837" cy="432954"/>
+          </a:xfrm>
+          <a:prstGeom prst="flowChartAlternateProcess">
+            <a:avLst/>
+          </a:prstGeom>
+        </p:spPr>
+        <p:style>
+          <a:lnRef idx="2">
+            <a:schemeClr val="accent6">
+              <a:shade val="20000"/>
+            </a:schemeClr>
+          </a:lnRef>
+          <a:fillRef idx="1">
+            <a:schemeClr val="accent6"/>
+          </a:fillRef>
+          <a:effectRef idx="0">
+            <a:schemeClr val="accent6"/>
+          </a:effectRef>
+          <a:fontRef idx="minor">
+            <a:schemeClr val="lt1"/>
+          </a:fontRef>
+        </p:style>
+        <p:txBody>
+          <a:bodyPr anchor="ctr"/>
+          <a:p>
+            <a:pPr algn="ctr">
+              <a:defRPr/>
+            </a:pPr>
+            <a:r>
+              <a:rPr lang="en-US" altLang="ko-KR" b="1"/>
+              <a:t>John Smith</a:t>
+            </a:r>
+            <a:endParaRPr lang="en-US" altLang="ko-KR" b="1"/>
+          </a:p>
+        </p:txBody>
+      </p:sp>
+      <p:sp>
+        <p:nvSpPr>
+          <p:cNvPr id="32" name=""/>
+          <p:cNvSpPr/>
+          <p:nvPr/>
+        </p:nvSpPr>
+        <p:spPr>
+          <a:xfrm>
+            <a:off x="6725329" y="3400425"/>
+            <a:ext cx="1491837" cy="432954"/>
+          </a:xfrm>
+          <a:prstGeom prst="flowChartAlternateProcess">
+            <a:avLst/>
+          </a:prstGeom>
+        </p:spPr>
+        <p:style>
+          <a:lnRef idx="2">
+            <a:schemeClr val="accent6">
+              <a:shade val="20000"/>
+            </a:schemeClr>
+          </a:lnRef>
+          <a:fillRef idx="1">
+            <a:schemeClr val="accent6"/>
+          </a:fillRef>
+          <a:effectRef idx="0">
+            <a:schemeClr val="accent6"/>
+          </a:effectRef>
+          <a:fontRef idx="minor">
+            <a:schemeClr val="lt1"/>
+          </a:fontRef>
+        </p:style>
+        <p:txBody>
+          <a:bodyPr anchor="ctr"/>
+          <a:p>
+            <a:pPr algn="ctr">
+              <a:defRPr/>
+            </a:pPr>
+            <a:r>
+              <a:rPr lang="en-US" altLang="ko-KR" b="1"/>
+              <a:t>123-9840</a:t>
+            </a:r>
+            <a:endParaRPr lang="en-US" altLang="ko-KR" b="1"/>
+          </a:p>
+        </p:txBody>
+      </p:sp>
+      <p:sp>
+        <p:nvSpPr>
+          <p:cNvPr id="33" name=""/>
+          <p:cNvSpPr/>
+          <p:nvPr/>
+        </p:nvSpPr>
+        <p:spPr>
+          <a:xfrm>
+            <a:off x="5233492" y="3820638"/>
+            <a:ext cx="1491837" cy="432954"/>
+          </a:xfrm>
+          <a:prstGeom prst="flowChartAlternateProcess">
+            <a:avLst/>
+          </a:prstGeom>
+        </p:spPr>
+        <p:style>
+          <a:lnRef idx="2">
+            <a:schemeClr val="accent6">
+              <a:shade val="20000"/>
+            </a:schemeClr>
+          </a:lnRef>
+          <a:fillRef idx="1">
+            <a:schemeClr val="accent6"/>
+          </a:fillRef>
+          <a:effectRef idx="0">
+            <a:schemeClr val="accent6"/>
+          </a:effectRef>
+          <a:fontRef idx="minor">
+            <a:schemeClr val="lt1"/>
+          </a:fontRef>
+        </p:style>
+        <p:txBody>
+          <a:bodyPr anchor="ctr"/>
+          <a:p>
+            <a:pPr algn="ctr">
+              <a:defRPr/>
+            </a:pPr>
+            <a:r>
+              <a:rPr lang="en-US" altLang="ko-KR" b="1"/>
+              <a:t>Big Mama</a:t>
+            </a:r>
+            <a:endParaRPr lang="en-US" altLang="ko-KR" b="1"/>
+          </a:p>
+        </p:txBody>
+      </p:sp>
+      <p:sp>
+        <p:nvSpPr>
+          <p:cNvPr id="34" name=""/>
+          <p:cNvSpPr/>
+          <p:nvPr/>
+        </p:nvSpPr>
+        <p:spPr>
+          <a:xfrm>
+            <a:off x="6725329" y="3820638"/>
+            <a:ext cx="1491837" cy="432954"/>
+          </a:xfrm>
+          <a:prstGeom prst="flowChartAlternateProcess">
+            <a:avLst/>
+          </a:prstGeom>
+        </p:spPr>
+        <p:style>
+          <a:lnRef idx="2">
+            <a:schemeClr val="accent6">
+              <a:shade val="20000"/>
+            </a:schemeClr>
+          </a:lnRef>
+          <a:fillRef idx="1">
+            <a:schemeClr val="accent6"/>
+          </a:fillRef>
+          <a:effectRef idx="0">
+            <a:schemeClr val="accent6"/>
+          </a:effectRef>
+          <a:fontRef idx="minor">
+            <a:schemeClr val="lt1"/>
+          </a:fontRef>
+        </p:style>
+        <p:txBody>
+          <a:bodyPr anchor="ctr"/>
+          <a:p>
+            <a:pPr algn="ctr">
+              <a:defRPr/>
+            </a:pPr>
+            <a:r>
+              <a:rPr lang="en-US" altLang="ko-KR" b="1"/>
+              <a:t>987-1208</a:t>
+            </a:r>
+            <a:endParaRPr lang="en-US" altLang="ko-KR" b="1"/>
+          </a:p>
+        </p:txBody>
+      </p:sp>
+      <p:sp>
+        <p:nvSpPr>
+          <p:cNvPr id="35" name=""/>
+          <p:cNvSpPr/>
+          <p:nvPr/>
+        </p:nvSpPr>
+        <p:spPr>
+          <a:xfrm>
+            <a:off x="5233492" y="4253778"/>
+            <a:ext cx="1491837" cy="432954"/>
+          </a:xfrm>
+          <a:prstGeom prst="flowChartAlternateProcess">
+            <a:avLst/>
+          </a:prstGeom>
+        </p:spPr>
+        <p:style>
+          <a:lnRef idx="2">
+            <a:schemeClr val="accent6">
+              <a:shade val="20000"/>
+            </a:schemeClr>
+          </a:lnRef>
+          <a:fillRef idx="1">
+            <a:schemeClr val="accent6"/>
+          </a:fillRef>
+          <a:effectRef idx="0">
+            <a:schemeClr val="accent6"/>
+          </a:effectRef>
+          <a:fontRef idx="minor">
+            <a:schemeClr val="lt1"/>
+          </a:fontRef>
+        </p:style>
+        <p:txBody>
+          <a:bodyPr anchor="ctr"/>
+          <a:p>
+            <a:pPr algn="ctr">
+              <a:defRPr/>
+            </a:pPr>
+            <a:r>
+              <a:rPr lang="en-US" altLang="ko-KR" b="1"/>
+              <a:t>Kim Jaeho</a:t>
+            </a:r>
+            <a:endParaRPr lang="en-US" altLang="ko-KR" b="1"/>
+          </a:p>
+        </p:txBody>
+      </p:sp>
+      <p:sp>
+        <p:nvSpPr>
+          <p:cNvPr id="36" name=""/>
+          <p:cNvSpPr/>
+          <p:nvPr/>
+        </p:nvSpPr>
+        <p:spPr>
+          <a:xfrm>
+            <a:off x="6725329" y="4253778"/>
+            <a:ext cx="1491837" cy="432954"/>
+          </a:xfrm>
+          <a:prstGeom prst="flowChartAlternateProcess">
+            <a:avLst/>
+          </a:prstGeom>
+        </p:spPr>
+        <p:style>
+          <a:lnRef idx="2">
+            <a:schemeClr val="accent6">
+              <a:shade val="20000"/>
+            </a:schemeClr>
+          </a:lnRef>
+          <a:fillRef idx="1">
+            <a:schemeClr val="accent6"/>
+          </a:fillRef>
+          <a:effectRef idx="0">
+            <a:schemeClr val="accent6"/>
+          </a:effectRef>
+          <a:fontRef idx="minor">
+            <a:schemeClr val="lt1"/>
+          </a:fontRef>
+        </p:style>
+        <p:txBody>
+          <a:bodyPr anchor="ctr"/>
+          <a:p>
+            <a:pPr algn="ctr">
+              <a:defRPr/>
+            </a:pPr>
+            <a:r>
+              <a:rPr lang="en-US" altLang="ko-KR" b="1"/>
+              <a:t>321-3648</a:t>
+            </a:r>
+            <a:endParaRPr lang="en-US" altLang="ko-KR" b="1"/>
+          </a:p>
+        </p:txBody>
+      </p:sp>
+      <p:sp>
+        <p:nvSpPr>
+          <p:cNvPr id="37" name=""/>
+          <p:cNvSpPr txBox="1"/>
+          <p:nvPr/>
+        </p:nvSpPr>
+        <p:spPr>
+          <a:xfrm>
+            <a:off x="6270188" y="1273848"/>
+            <a:ext cx="910282" cy="394573"/>
+          </a:xfrm>
+          <a:prstGeom prst="rect">
+            <a:avLst/>
+          </a:prstGeom>
+        </p:spPr>
+        <p:txBody>
+          <a:bodyPr wrap="none">
+            <a:spAutoFit/>
+          </a:bodyPr>
+          <a:p>
+            <a:pPr>
+              <a:defRPr/>
+            </a:pPr>
+            <a:r>
+              <a:rPr lang="en-US" altLang="ko-KR" sz="2000" b="1"/>
+              <a:t>Entries</a:t>
+            </a:r>
+            <a:endParaRPr lang="en-US" altLang="ko-KR" sz="2000" b="1"/>
+          </a:p>
+        </p:txBody>
+      </p:sp>
     </p:spTree>
   </p:cSld>
   <p:clrMapOvr>

</xml_diff>

<commit_message>
add image "tree structure"
</commit_message>
<xml_diff>
--- a/etc/images.pptx
+++ b/etc/images.pptx
@@ -2,7 +2,7 @@
 <file path=ppt/presentation.xml><?xml version="1.0" encoding="utf-8"?>
 <p:presentation xmlns:r="http://schemas.openxmlformats.org/officeDocument/2006/relationships" xmlns:c="http://schemas.openxmlformats.org/drawingml/2006/chart" xmlns:a="http://schemas.openxmlformats.org/drawingml/2006/main" xmlns:dgm="http://schemas.openxmlformats.org/drawingml/2006/diagram" xmlns:dsp="http://schemas.microsoft.com/office/drawing/2008/diagram" xmlns:p="http://schemas.openxmlformats.org/presentationml/2006/main">
   <p:sldMasterIdLst>
-    <p:sldMasterId id="2147483723" r:id="rId1"/>
+    <p:sldMasterId id="2147483721" r:id="rId1"/>
   </p:sldMasterIdLst>
   <p:notesMasterIdLst>
     <p:notesMasterId r:id="rId2"/>
@@ -23,6 +23,7 @@
     <p:sldId id="268" r:id="rId15"/>
     <p:sldId id="269" r:id="rId16"/>
     <p:sldId id="270" r:id="rId17"/>
+    <p:sldId id="271" r:id="rId18"/>
   </p:sldIdLst>
   <p:sldSz cx="12192000" cy="6858000"/>
   <p:notesSz cx="6858000" cy="9144000"/>
@@ -17066,6 +17067,1762 @@
 </p:sld>
 </file>
 
+<file path=ppt/slides/slide16.xml><?xml version="1.0" encoding="utf-8"?>
+<p:sld xmlns:r="http://schemas.openxmlformats.org/officeDocument/2006/relationships" xmlns:c="http://schemas.openxmlformats.org/drawingml/2006/chart" xmlns:a="http://schemas.openxmlformats.org/drawingml/2006/main" xmlns:dgm="http://schemas.openxmlformats.org/drawingml/2006/diagram" xmlns:dsp="http://schemas.microsoft.com/office/drawing/2008/diagram" xmlns:p="http://schemas.openxmlformats.org/presentationml/2006/main">
+  <p:cSld>
+    <p:spTree>
+      <p:nvGrpSpPr>
+        <p:cNvPr id="1" name=""/>
+        <p:cNvGrpSpPr/>
+        <p:nvPr/>
+      </p:nvGrpSpPr>
+      <p:grpSpPr>
+        <a:xfrm>
+          <a:off x="0" y="0"/>
+          <a:ext cx="0" cy="0"/>
+          <a:chOff x="0" y="0"/>
+          <a:chExt cx="0" cy="0"/>
+        </a:xfrm>
+      </p:grpSpPr>
+      <p:cxnSp>
+        <p:nvCxnSpPr>
+          <p:cNvPr id="29" name=""/>
+          <p:cNvCxnSpPr/>
+          <p:nvPr/>
+        </p:nvCxnSpPr>
+        <p:spPr>
+          <a:xfrm>
+            <a:off x="1950718" y="2433519"/>
+            <a:ext cx="7870790" cy="0"/>
+          </a:xfrm>
+          <a:prstGeom prst="line">
+            <a:avLst/>
+          </a:prstGeom>
+          <a:ln w="28575">
+            <a:solidFill>
+              <a:srgbClr val="808080"/>
+            </a:solidFill>
+            <a:prstDash val="dash"/>
+          </a:ln>
+        </p:spPr>
+        <p:style>
+          <a:lnRef idx="1">
+            <a:schemeClr val="accent1"/>
+          </a:lnRef>
+          <a:fillRef idx="0">
+            <a:schemeClr val="accent1"/>
+          </a:fillRef>
+          <a:effectRef idx="0">
+            <a:schemeClr val="accent1"/>
+          </a:effectRef>
+          <a:fontRef idx="minor">
+            <a:schemeClr val="tx1"/>
+          </a:fontRef>
+        </p:style>
+      </p:cxnSp>
+      <p:sp>
+        <p:nvSpPr>
+          <p:cNvPr id="41" name=""/>
+          <p:cNvSpPr/>
+          <p:nvPr/>
+        </p:nvSpPr>
+        <p:spPr>
+          <a:xfrm>
+            <a:off x="2080202" y="2720762"/>
+            <a:ext cx="2492055" cy="2492055"/>
+          </a:xfrm>
+          <a:prstGeom prst="triangle">
+            <a:avLst>
+              <a:gd name="adj" fmla="val 50000"/>
+            </a:avLst>
+          </a:prstGeom>
+          <a:solidFill>
+            <a:srgbClr val="f2f2f2"/>
+          </a:solidFill>
+          <a:ln w="38100">
+            <a:solidFill>
+              <a:srgbClr val="808080"/>
+            </a:solidFill>
+            <a:prstDash val="sysDot"/>
+          </a:ln>
+        </p:spPr>
+        <p:style>
+          <a:lnRef idx="2">
+            <a:schemeClr val="accent3">
+              <a:shade val="20000"/>
+            </a:schemeClr>
+          </a:lnRef>
+          <a:fillRef idx="1">
+            <a:schemeClr val="accent3"/>
+          </a:fillRef>
+          <a:effectRef idx="0">
+            <a:schemeClr val="accent3"/>
+          </a:effectRef>
+          <a:fontRef idx="minor">
+            <a:schemeClr val="lt1"/>
+          </a:fontRef>
+        </p:style>
+        <p:txBody>
+          <a:bodyPr anchor="ctr"/>
+          <a:p>
+            <a:pPr algn="ctr">
+              <a:defRPr/>
+            </a:pPr>
+            <a:endParaRPr lang="en-US" altLang="ko-KR"/>
+          </a:p>
+        </p:txBody>
+      </p:sp>
+      <p:cxnSp>
+        <p:nvCxnSpPr>
+          <p:cNvPr id="30" name=""/>
+          <p:cNvCxnSpPr/>
+          <p:nvPr/>
+        </p:nvCxnSpPr>
+        <p:spPr>
+          <a:xfrm>
+            <a:off x="1950718" y="3582492"/>
+            <a:ext cx="7870790" cy="0"/>
+          </a:xfrm>
+          <a:prstGeom prst="line">
+            <a:avLst/>
+          </a:prstGeom>
+          <a:ln w="28575">
+            <a:solidFill>
+              <a:srgbClr val="808080"/>
+            </a:solidFill>
+            <a:prstDash val="dash"/>
+          </a:ln>
+        </p:spPr>
+        <p:style>
+          <a:lnRef idx="1">
+            <a:schemeClr val="accent1"/>
+          </a:lnRef>
+          <a:fillRef idx="0">
+            <a:schemeClr val="accent1"/>
+          </a:fillRef>
+          <a:effectRef idx="0">
+            <a:schemeClr val="accent1"/>
+          </a:effectRef>
+          <a:fontRef idx="minor">
+            <a:schemeClr val="tx1"/>
+          </a:fontRef>
+        </p:style>
+      </p:cxnSp>
+      <p:cxnSp>
+        <p:nvCxnSpPr>
+          <p:cNvPr id="31" name=""/>
+          <p:cNvCxnSpPr/>
+          <p:nvPr/>
+        </p:nvCxnSpPr>
+        <p:spPr>
+          <a:xfrm>
+            <a:off x="1950717" y="4731465"/>
+            <a:ext cx="7870790" cy="0"/>
+          </a:xfrm>
+          <a:prstGeom prst="line">
+            <a:avLst/>
+          </a:prstGeom>
+          <a:ln w="28575">
+            <a:solidFill>
+              <a:srgbClr val="808080"/>
+            </a:solidFill>
+            <a:prstDash val="dash"/>
+          </a:ln>
+        </p:spPr>
+        <p:style>
+          <a:lnRef idx="1">
+            <a:schemeClr val="accent1"/>
+          </a:lnRef>
+          <a:fillRef idx="0">
+            <a:schemeClr val="accent1"/>
+          </a:fillRef>
+          <a:effectRef idx="0">
+            <a:schemeClr val="accent1"/>
+          </a:effectRef>
+          <a:fontRef idx="minor">
+            <a:schemeClr val="tx1"/>
+          </a:fontRef>
+        </p:style>
+      </p:cxnSp>
+      <p:cxnSp>
+        <p:nvCxnSpPr>
+          <p:cNvPr id="28" name=""/>
+          <p:cNvCxnSpPr/>
+          <p:nvPr/>
+        </p:nvCxnSpPr>
+        <p:spPr>
+          <a:xfrm>
+            <a:off x="1950717" y="1284545"/>
+            <a:ext cx="7870790" cy="0"/>
+          </a:xfrm>
+          <a:prstGeom prst="line">
+            <a:avLst/>
+          </a:prstGeom>
+          <a:ln w="28575">
+            <a:solidFill>
+              <a:srgbClr val="808080"/>
+            </a:solidFill>
+            <a:prstDash val="dash"/>
+          </a:ln>
+        </p:spPr>
+        <p:style>
+          <a:lnRef idx="1">
+            <a:schemeClr val="accent1"/>
+          </a:lnRef>
+          <a:fillRef idx="0">
+            <a:schemeClr val="accent1"/>
+          </a:fillRef>
+          <a:effectRef idx="0">
+            <a:schemeClr val="accent1"/>
+          </a:effectRef>
+          <a:fontRef idx="minor">
+            <a:schemeClr val="tx1"/>
+          </a:fontRef>
+        </p:style>
+      </p:cxnSp>
+      <p:sp>
+        <p:nvSpPr>
+          <p:cNvPr id="4" name=""/>
+          <p:cNvSpPr/>
+          <p:nvPr/>
+        </p:nvSpPr>
+        <p:spPr>
+          <a:xfrm>
+            <a:off x="5823239" y="997302"/>
+            <a:ext cx="545521" cy="574486"/>
+          </a:xfrm>
+          <a:prstGeom prst="ellipse">
+            <a:avLst/>
+          </a:prstGeom>
+          <a:solidFill>
+            <a:srgbClr val="6182d6">
+              <a:alpha val="100000"/>
+            </a:srgbClr>
+          </a:solidFill>
+          <a:ln w="19050" cap="flat" cmpd="sng" algn="ctr">
+            <a:solidFill>
+              <a:srgbClr val="2e3e67">
+                <a:alpha val="100000"/>
+              </a:srgbClr>
+            </a:solidFill>
+            <a:prstDash val="solid"/>
+          </a:ln>
+        </p:spPr>
+        <p:txBody>
+          <a:bodyPr anchor="ctr"/>
+          <a:p>
+            <a:pPr marL="0" indent="0" algn="ctr" defTabSz="914400" rtl="0" eaLnBrk="1" latinLnBrk="1" hangingPunct="1">
+              <a:lnSpc>
+                <a:spcPct val="100000"/>
+              </a:lnSpc>
+              <a:spcBef>
+                <a:spcPct val="0"/>
+              </a:spcBef>
+              <a:spcAft>
+                <a:spcPts val="0"/>
+              </a:spcAft>
+              <a:buNone/>
+              <a:defRPr/>
+            </a:pPr>
+            <a:r>
+              <a:rPr xmlns:mc="http://schemas.openxmlformats.org/markup-compatibility/2006" xmlns:hp="http://schemas.haansoft.com/office/presentation/8.0" kumimoji="0" lang="en-US" altLang="ko-KR" sz="2000" b="1" i="0" u="none" strike="noStrike" kern="1200" cap="none" spc="0" normalizeH="0" baseline="0" mc:Ignorable="hp" hp:hslEmbossed="0">
+                <a:solidFill>
+                  <a:srgbClr val="ffffff"/>
+                </a:solidFill>
+                <a:latin typeface="Calibri"/>
+                <a:ea typeface="맑은 고딕"/>
+                <a:cs typeface="Times New Roman"/>
+              </a:rPr>
+              <a:t>A</a:t>
+            </a:r>
+            <a:endParaRPr xmlns:mc="http://schemas.openxmlformats.org/markup-compatibility/2006" xmlns:hp="http://schemas.haansoft.com/office/presentation/8.0" kumimoji="0" lang="en-US" altLang="ko-KR" sz="2000" b="1" i="0" u="none" strike="noStrike" kern="1200" cap="none" spc="0" normalizeH="0" baseline="0" mc:Ignorable="hp" hp:hslEmbossed="0">
+              <a:solidFill>
+                <a:srgbClr val="ffffff"/>
+              </a:solidFill>
+              <a:latin typeface="Calibri"/>
+              <a:ea typeface="맑은 고딕"/>
+              <a:cs typeface="Times New Roman"/>
+            </a:endParaRPr>
+          </a:p>
+        </p:txBody>
+      </p:sp>
+      <p:sp>
+        <p:nvSpPr>
+          <p:cNvPr id="5" name=""/>
+          <p:cNvSpPr/>
+          <p:nvPr/>
+        </p:nvSpPr>
+        <p:spPr>
+          <a:xfrm>
+            <a:off x="4225295" y="2146276"/>
+            <a:ext cx="545521" cy="574486"/>
+          </a:xfrm>
+          <a:prstGeom prst="ellipse">
+            <a:avLst/>
+          </a:prstGeom>
+          <a:solidFill>
+            <a:srgbClr val="6182d6">
+              <a:alpha val="100000"/>
+            </a:srgbClr>
+          </a:solidFill>
+          <a:ln w="19050" cap="flat" cmpd="sng" algn="ctr">
+            <a:solidFill>
+              <a:srgbClr val="2e3e67">
+                <a:alpha val="100000"/>
+              </a:srgbClr>
+            </a:solidFill>
+            <a:prstDash val="solid"/>
+          </a:ln>
+        </p:spPr>
+        <p:txBody>
+          <a:bodyPr anchor="ctr"/>
+          <a:p>
+            <a:pPr marL="0" indent="0" algn="ctr" defTabSz="914400" rtl="0" eaLnBrk="1" latinLnBrk="1" hangingPunct="1">
+              <a:lnSpc>
+                <a:spcPct val="100000"/>
+              </a:lnSpc>
+              <a:spcBef>
+                <a:spcPct val="0"/>
+              </a:spcBef>
+              <a:spcAft>
+                <a:spcPts val="0"/>
+              </a:spcAft>
+              <a:buNone/>
+              <a:defRPr/>
+            </a:pPr>
+            <a:r>
+              <a:rPr xmlns:mc="http://schemas.openxmlformats.org/markup-compatibility/2006" xmlns:hp="http://schemas.haansoft.com/office/presentation/8.0" kumimoji="0" lang="en-US" altLang="ko-KR" sz="2000" b="1" i="0" u="none" strike="noStrike" kern="1200" cap="none" spc="0" normalizeH="0" baseline="0" mc:Ignorable="hp" hp:hslEmbossed="0">
+                <a:solidFill>
+                  <a:srgbClr val="ffffff"/>
+                </a:solidFill>
+                <a:latin typeface="Calibri"/>
+                <a:ea typeface="맑은 고딕"/>
+                <a:cs typeface="Times New Roman"/>
+              </a:rPr>
+              <a:t>B</a:t>
+            </a:r>
+            <a:endParaRPr xmlns:mc="http://schemas.openxmlformats.org/markup-compatibility/2006" xmlns:hp="http://schemas.haansoft.com/office/presentation/8.0" kumimoji="0" lang="en-US" altLang="ko-KR" sz="2000" b="1" i="0" u="none" strike="noStrike" kern="1200" cap="none" spc="0" normalizeH="0" baseline="0" mc:Ignorable="hp" hp:hslEmbossed="0">
+              <a:solidFill>
+                <a:srgbClr val="ffffff"/>
+              </a:solidFill>
+              <a:latin typeface="Calibri"/>
+              <a:ea typeface="맑은 고딕"/>
+              <a:cs typeface="Times New Roman"/>
+            </a:endParaRPr>
+          </a:p>
+        </p:txBody>
+      </p:sp>
+      <p:sp>
+        <p:nvSpPr>
+          <p:cNvPr id="6" name=""/>
+          <p:cNvSpPr/>
+          <p:nvPr/>
+        </p:nvSpPr>
+        <p:spPr>
+          <a:xfrm>
+            <a:off x="7452515" y="2146276"/>
+            <a:ext cx="545521" cy="574486"/>
+          </a:xfrm>
+          <a:prstGeom prst="ellipse">
+            <a:avLst/>
+          </a:prstGeom>
+          <a:solidFill>
+            <a:srgbClr val="6182d6">
+              <a:alpha val="100000"/>
+            </a:srgbClr>
+          </a:solidFill>
+          <a:ln w="19050" cap="flat" cmpd="sng" algn="ctr">
+            <a:solidFill>
+              <a:srgbClr val="2e3e67">
+                <a:alpha val="100000"/>
+              </a:srgbClr>
+            </a:solidFill>
+            <a:prstDash val="solid"/>
+          </a:ln>
+        </p:spPr>
+        <p:txBody>
+          <a:bodyPr anchor="ctr"/>
+          <a:p>
+            <a:pPr marL="0" indent="0" algn="ctr" defTabSz="914400" rtl="0" eaLnBrk="1" latinLnBrk="1" hangingPunct="1">
+              <a:lnSpc>
+                <a:spcPct val="100000"/>
+              </a:lnSpc>
+              <a:spcBef>
+                <a:spcPct val="0"/>
+              </a:spcBef>
+              <a:spcAft>
+                <a:spcPts val="0"/>
+              </a:spcAft>
+              <a:buNone/>
+              <a:defRPr/>
+            </a:pPr>
+            <a:r>
+              <a:rPr xmlns:mc="http://schemas.openxmlformats.org/markup-compatibility/2006" xmlns:hp="http://schemas.haansoft.com/office/presentation/8.0" kumimoji="0" lang="en-US" altLang="ko-KR" sz="2000" b="1" i="0" u="none" strike="noStrike" kern="1200" cap="none" spc="0" normalizeH="0" baseline="0" mc:Ignorable="hp" hp:hslEmbossed="0">
+                <a:solidFill>
+                  <a:srgbClr val="ffffff"/>
+                </a:solidFill>
+                <a:latin typeface="Calibri"/>
+                <a:ea typeface="맑은 고딕"/>
+                <a:cs typeface="Times New Roman"/>
+              </a:rPr>
+              <a:t>C</a:t>
+            </a:r>
+            <a:endParaRPr xmlns:mc="http://schemas.openxmlformats.org/markup-compatibility/2006" xmlns:hp="http://schemas.haansoft.com/office/presentation/8.0" kumimoji="0" lang="en-US" altLang="ko-KR" sz="2000" b="1" i="0" u="none" strike="noStrike" kern="1200" cap="none" spc="0" normalizeH="0" baseline="0" mc:Ignorable="hp" hp:hslEmbossed="0">
+              <a:solidFill>
+                <a:srgbClr val="ffffff"/>
+              </a:solidFill>
+              <a:latin typeface="Calibri"/>
+              <a:ea typeface="맑은 고딕"/>
+              <a:cs typeface="Times New Roman"/>
+            </a:endParaRPr>
+          </a:p>
+        </p:txBody>
+      </p:sp>
+      <p:sp>
+        <p:nvSpPr>
+          <p:cNvPr id="7" name=""/>
+          <p:cNvSpPr/>
+          <p:nvPr/>
+        </p:nvSpPr>
+        <p:spPr>
+          <a:xfrm>
+            <a:off x="3078535" y="3295249"/>
+            <a:ext cx="545521" cy="574486"/>
+          </a:xfrm>
+          <a:prstGeom prst="ellipse">
+            <a:avLst/>
+          </a:prstGeom>
+          <a:solidFill>
+            <a:srgbClr val="6182d6">
+              <a:alpha val="100000"/>
+            </a:srgbClr>
+          </a:solidFill>
+          <a:ln w="19050" cap="flat" cmpd="sng" algn="ctr">
+            <a:solidFill>
+              <a:srgbClr val="2e3e67">
+                <a:alpha val="100000"/>
+              </a:srgbClr>
+            </a:solidFill>
+            <a:prstDash val="solid"/>
+          </a:ln>
+        </p:spPr>
+        <p:txBody>
+          <a:bodyPr anchor="ctr"/>
+          <a:p>
+            <a:pPr marL="0" indent="0" algn="ctr" defTabSz="914400" rtl="0" eaLnBrk="1" latinLnBrk="1" hangingPunct="1">
+              <a:lnSpc>
+                <a:spcPct val="100000"/>
+              </a:lnSpc>
+              <a:spcBef>
+                <a:spcPct val="0"/>
+              </a:spcBef>
+              <a:spcAft>
+                <a:spcPts val="0"/>
+              </a:spcAft>
+              <a:buNone/>
+              <a:defRPr/>
+            </a:pPr>
+            <a:r>
+              <a:rPr xmlns:mc="http://schemas.openxmlformats.org/markup-compatibility/2006" xmlns:hp="http://schemas.haansoft.com/office/presentation/8.0" kumimoji="0" lang="en-US" altLang="ko-KR" sz="2000" b="1" i="0" u="none" strike="noStrike" kern="1200" cap="none" spc="0" normalizeH="0" baseline="0" mc:Ignorable="hp" hp:hslEmbossed="0">
+                <a:solidFill>
+                  <a:srgbClr val="ffffff"/>
+                </a:solidFill>
+                <a:latin typeface="Calibri"/>
+                <a:ea typeface="맑은 고딕"/>
+                <a:cs typeface="Times New Roman"/>
+              </a:rPr>
+              <a:t>D</a:t>
+            </a:r>
+            <a:endParaRPr xmlns:mc="http://schemas.openxmlformats.org/markup-compatibility/2006" xmlns:hp="http://schemas.haansoft.com/office/presentation/8.0" kumimoji="0" lang="en-US" altLang="ko-KR" sz="2000" b="1" i="0" u="none" strike="noStrike" kern="1200" cap="none" spc="0" normalizeH="0" baseline="0" mc:Ignorable="hp" hp:hslEmbossed="0">
+              <a:solidFill>
+                <a:srgbClr val="ffffff"/>
+              </a:solidFill>
+              <a:latin typeface="Calibri"/>
+              <a:ea typeface="맑은 고딕"/>
+              <a:cs typeface="Times New Roman"/>
+            </a:endParaRPr>
+          </a:p>
+        </p:txBody>
+      </p:sp>
+      <p:sp>
+        <p:nvSpPr>
+          <p:cNvPr id="8" name=""/>
+          <p:cNvSpPr/>
+          <p:nvPr/>
+        </p:nvSpPr>
+        <p:spPr>
+          <a:xfrm>
+            <a:off x="5277718" y="3295249"/>
+            <a:ext cx="545521" cy="574486"/>
+          </a:xfrm>
+          <a:prstGeom prst="ellipse">
+            <a:avLst/>
+          </a:prstGeom>
+          <a:solidFill>
+            <a:srgbClr val="6182d6">
+              <a:alpha val="100000"/>
+            </a:srgbClr>
+          </a:solidFill>
+          <a:ln w="19050" cap="flat" cmpd="sng" algn="ctr">
+            <a:solidFill>
+              <a:srgbClr val="2e3e67">
+                <a:alpha val="100000"/>
+              </a:srgbClr>
+            </a:solidFill>
+            <a:prstDash val="solid"/>
+          </a:ln>
+        </p:spPr>
+        <p:txBody>
+          <a:bodyPr anchor="ctr"/>
+          <a:p>
+            <a:pPr marL="0" indent="0" algn="ctr" defTabSz="914400" rtl="0" eaLnBrk="1" latinLnBrk="1" hangingPunct="1">
+              <a:lnSpc>
+                <a:spcPct val="100000"/>
+              </a:lnSpc>
+              <a:spcBef>
+                <a:spcPct val="0"/>
+              </a:spcBef>
+              <a:spcAft>
+                <a:spcPts val="0"/>
+              </a:spcAft>
+              <a:buNone/>
+              <a:defRPr/>
+            </a:pPr>
+            <a:r>
+              <a:rPr xmlns:mc="http://schemas.openxmlformats.org/markup-compatibility/2006" xmlns:hp="http://schemas.haansoft.com/office/presentation/8.0" kumimoji="0" lang="en-US" altLang="ko-KR" sz="2000" b="1" i="0" u="none" strike="noStrike" kern="1200" cap="none" spc="0" normalizeH="0" baseline="0" mc:Ignorable="hp" hp:hslEmbossed="0">
+                <a:solidFill>
+                  <a:srgbClr val="ffffff"/>
+                </a:solidFill>
+                <a:latin typeface="Calibri"/>
+                <a:ea typeface="맑은 고딕"/>
+                <a:cs typeface="Times New Roman"/>
+              </a:rPr>
+              <a:t>E</a:t>
+            </a:r>
+            <a:endParaRPr xmlns:mc="http://schemas.openxmlformats.org/markup-compatibility/2006" xmlns:hp="http://schemas.haansoft.com/office/presentation/8.0" kumimoji="0" lang="en-US" altLang="ko-KR" sz="2000" b="1" i="0" u="none" strike="noStrike" kern="1200" cap="none" spc="0" normalizeH="0" baseline="0" mc:Ignorable="hp" hp:hslEmbossed="0">
+              <a:solidFill>
+                <a:srgbClr val="ffffff"/>
+              </a:solidFill>
+              <a:latin typeface="Calibri"/>
+              <a:ea typeface="맑은 고딕"/>
+              <a:cs typeface="Times New Roman"/>
+            </a:endParaRPr>
+          </a:p>
+        </p:txBody>
+      </p:sp>
+      <p:sp>
+        <p:nvSpPr>
+          <p:cNvPr id="9" name=""/>
+          <p:cNvSpPr/>
+          <p:nvPr/>
+        </p:nvSpPr>
+        <p:spPr>
+          <a:xfrm>
+            <a:off x="6368760" y="3295249"/>
+            <a:ext cx="545521" cy="574486"/>
+          </a:xfrm>
+          <a:prstGeom prst="ellipse">
+            <a:avLst/>
+          </a:prstGeom>
+          <a:solidFill>
+            <a:srgbClr val="6182d6">
+              <a:alpha val="100000"/>
+            </a:srgbClr>
+          </a:solidFill>
+          <a:ln w="19050" cap="flat" cmpd="sng" algn="ctr">
+            <a:solidFill>
+              <a:srgbClr val="2e3e67">
+                <a:alpha val="100000"/>
+              </a:srgbClr>
+            </a:solidFill>
+            <a:prstDash val="solid"/>
+          </a:ln>
+        </p:spPr>
+        <p:txBody>
+          <a:bodyPr anchor="ctr"/>
+          <a:p>
+            <a:pPr marL="0" indent="0" algn="ctr" defTabSz="914400" rtl="0" eaLnBrk="1" latinLnBrk="1" hangingPunct="1">
+              <a:lnSpc>
+                <a:spcPct val="100000"/>
+              </a:lnSpc>
+              <a:spcBef>
+                <a:spcPct val="0"/>
+              </a:spcBef>
+              <a:spcAft>
+                <a:spcPts val="0"/>
+              </a:spcAft>
+              <a:buNone/>
+              <a:defRPr/>
+            </a:pPr>
+            <a:r>
+              <a:rPr xmlns:mc="http://schemas.openxmlformats.org/markup-compatibility/2006" xmlns:hp="http://schemas.haansoft.com/office/presentation/8.0" kumimoji="0" lang="en-US" altLang="ko-KR" sz="2000" b="1" i="0" u="none" strike="noStrike" kern="1200" cap="none" spc="0" normalizeH="0" baseline="0" mc:Ignorable="hp" hp:hslEmbossed="0">
+                <a:solidFill>
+                  <a:srgbClr val="ffffff"/>
+                </a:solidFill>
+                <a:latin typeface="Calibri"/>
+                <a:ea typeface="맑은 고딕"/>
+                <a:cs typeface="Times New Roman"/>
+              </a:rPr>
+              <a:t>F</a:t>
+            </a:r>
+            <a:endParaRPr xmlns:mc="http://schemas.openxmlformats.org/markup-compatibility/2006" xmlns:hp="http://schemas.haansoft.com/office/presentation/8.0" kumimoji="0" lang="en-US" altLang="ko-KR" sz="2000" b="1" i="0" u="none" strike="noStrike" kern="1200" cap="none" spc="0" normalizeH="0" baseline="0" mc:Ignorable="hp" hp:hslEmbossed="0">
+              <a:solidFill>
+                <a:srgbClr val="ffffff"/>
+              </a:solidFill>
+              <a:latin typeface="Calibri"/>
+              <a:ea typeface="맑은 고딕"/>
+              <a:cs typeface="Times New Roman"/>
+            </a:endParaRPr>
+          </a:p>
+        </p:txBody>
+      </p:sp>
+      <p:sp>
+        <p:nvSpPr>
+          <p:cNvPr id="10" name=""/>
+          <p:cNvSpPr/>
+          <p:nvPr/>
+        </p:nvSpPr>
+        <p:spPr>
+          <a:xfrm>
+            <a:off x="8693612" y="3295249"/>
+            <a:ext cx="545521" cy="574486"/>
+          </a:xfrm>
+          <a:prstGeom prst="ellipse">
+            <a:avLst/>
+          </a:prstGeom>
+          <a:solidFill>
+            <a:srgbClr val="6182d6">
+              <a:alpha val="100000"/>
+            </a:srgbClr>
+          </a:solidFill>
+          <a:ln w="19050" cap="flat" cmpd="sng" algn="ctr">
+            <a:solidFill>
+              <a:srgbClr val="2e3e67">
+                <a:alpha val="100000"/>
+              </a:srgbClr>
+            </a:solidFill>
+            <a:prstDash val="solid"/>
+          </a:ln>
+        </p:spPr>
+        <p:txBody>
+          <a:bodyPr anchor="ctr"/>
+          <a:p>
+            <a:pPr marL="0" indent="0" algn="ctr" defTabSz="914400" rtl="0" eaLnBrk="1" latinLnBrk="1" hangingPunct="1">
+              <a:lnSpc>
+                <a:spcPct val="100000"/>
+              </a:lnSpc>
+              <a:spcBef>
+                <a:spcPct val="0"/>
+              </a:spcBef>
+              <a:spcAft>
+                <a:spcPts val="0"/>
+              </a:spcAft>
+              <a:buNone/>
+              <a:defRPr/>
+            </a:pPr>
+            <a:r>
+              <a:rPr xmlns:mc="http://schemas.openxmlformats.org/markup-compatibility/2006" xmlns:hp="http://schemas.haansoft.com/office/presentation/8.0" kumimoji="0" lang="en-US" altLang="ko-KR" sz="2000" b="1" i="0" u="none" strike="noStrike" kern="1200" cap="none" spc="0" normalizeH="0" baseline="0" mc:Ignorable="hp" hp:hslEmbossed="0">
+                <a:solidFill>
+                  <a:srgbClr val="ffffff"/>
+                </a:solidFill>
+                <a:latin typeface="Calibri"/>
+                <a:ea typeface="맑은 고딕"/>
+                <a:cs typeface="Times New Roman"/>
+              </a:rPr>
+              <a:t>G</a:t>
+            </a:r>
+            <a:endParaRPr xmlns:mc="http://schemas.openxmlformats.org/markup-compatibility/2006" xmlns:hp="http://schemas.haansoft.com/office/presentation/8.0" kumimoji="0" lang="en-US" altLang="ko-KR" sz="2000" b="1" i="0" u="none" strike="noStrike" kern="1200" cap="none" spc="0" normalizeH="0" baseline="0" mc:Ignorable="hp" hp:hslEmbossed="0">
+              <a:solidFill>
+                <a:srgbClr val="ffffff"/>
+              </a:solidFill>
+              <a:latin typeface="Calibri"/>
+              <a:ea typeface="맑은 고딕"/>
+              <a:cs typeface="Times New Roman"/>
+            </a:endParaRPr>
+          </a:p>
+        </p:txBody>
+      </p:sp>
+      <p:sp>
+        <p:nvSpPr>
+          <p:cNvPr id="11" name=""/>
+          <p:cNvSpPr/>
+          <p:nvPr/>
+        </p:nvSpPr>
+        <p:spPr>
+          <a:xfrm>
+            <a:off x="2451889" y="4444223"/>
+            <a:ext cx="545521" cy="574486"/>
+          </a:xfrm>
+          <a:prstGeom prst="ellipse">
+            <a:avLst/>
+          </a:prstGeom>
+          <a:solidFill>
+            <a:srgbClr val="6182d6">
+              <a:alpha val="100000"/>
+            </a:srgbClr>
+          </a:solidFill>
+          <a:ln w="19050" cap="flat" cmpd="sng" algn="ctr">
+            <a:solidFill>
+              <a:srgbClr val="2e3e67">
+                <a:alpha val="100000"/>
+              </a:srgbClr>
+            </a:solidFill>
+            <a:prstDash val="solid"/>
+          </a:ln>
+        </p:spPr>
+        <p:txBody>
+          <a:bodyPr anchor="ctr"/>
+          <a:p>
+            <a:pPr marL="0" indent="0" algn="ctr" defTabSz="914400" rtl="0" eaLnBrk="1" latinLnBrk="1" hangingPunct="1">
+              <a:lnSpc>
+                <a:spcPct val="100000"/>
+              </a:lnSpc>
+              <a:spcBef>
+                <a:spcPct val="0"/>
+              </a:spcBef>
+              <a:spcAft>
+                <a:spcPts val="0"/>
+              </a:spcAft>
+              <a:buNone/>
+              <a:defRPr/>
+            </a:pPr>
+            <a:r>
+              <a:rPr xmlns:mc="http://schemas.openxmlformats.org/markup-compatibility/2006" xmlns:hp="http://schemas.haansoft.com/office/presentation/8.0" kumimoji="0" lang="en-US" altLang="ko-KR" sz="2000" b="1" i="0" u="none" strike="noStrike" kern="1200" cap="none" spc="0" normalizeH="0" baseline="0" mc:Ignorable="hp" hp:hslEmbossed="0">
+                <a:solidFill>
+                  <a:srgbClr val="ffffff"/>
+                </a:solidFill>
+                <a:latin typeface="Calibri"/>
+                <a:ea typeface="맑은 고딕"/>
+                <a:cs typeface="Times New Roman"/>
+              </a:rPr>
+              <a:t>H</a:t>
+            </a:r>
+            <a:endParaRPr xmlns:mc="http://schemas.openxmlformats.org/markup-compatibility/2006" xmlns:hp="http://schemas.haansoft.com/office/presentation/8.0" kumimoji="0" lang="en-US" altLang="ko-KR" sz="2000" b="1" i="0" u="none" strike="noStrike" kern="1200" cap="none" spc="0" normalizeH="0" baseline="0" mc:Ignorable="hp" hp:hslEmbossed="0">
+              <a:solidFill>
+                <a:srgbClr val="ffffff"/>
+              </a:solidFill>
+              <a:latin typeface="Calibri"/>
+              <a:ea typeface="맑은 고딕"/>
+              <a:cs typeface="Times New Roman"/>
+            </a:endParaRPr>
+          </a:p>
+        </p:txBody>
+      </p:sp>
+      <p:sp>
+        <p:nvSpPr>
+          <p:cNvPr id="12" name=""/>
+          <p:cNvSpPr/>
+          <p:nvPr/>
+        </p:nvSpPr>
+        <p:spPr>
+          <a:xfrm>
+            <a:off x="3624056" y="4444223"/>
+            <a:ext cx="545521" cy="574486"/>
+          </a:xfrm>
+          <a:prstGeom prst="ellipse">
+            <a:avLst/>
+          </a:prstGeom>
+          <a:solidFill>
+            <a:srgbClr val="6182d6">
+              <a:alpha val="100000"/>
+            </a:srgbClr>
+          </a:solidFill>
+          <a:ln w="19050" cap="flat" cmpd="sng" algn="ctr">
+            <a:solidFill>
+              <a:srgbClr val="2e3e67">
+                <a:alpha val="100000"/>
+              </a:srgbClr>
+            </a:solidFill>
+            <a:prstDash val="solid"/>
+          </a:ln>
+        </p:spPr>
+        <p:txBody>
+          <a:bodyPr anchor="ctr"/>
+          <a:p>
+            <a:pPr marL="0" indent="0" algn="ctr" defTabSz="914400" rtl="0" eaLnBrk="1" latinLnBrk="1" hangingPunct="1">
+              <a:lnSpc>
+                <a:spcPct val="100000"/>
+              </a:lnSpc>
+              <a:spcBef>
+                <a:spcPct val="0"/>
+              </a:spcBef>
+              <a:spcAft>
+                <a:spcPts val="0"/>
+              </a:spcAft>
+              <a:buNone/>
+              <a:defRPr/>
+            </a:pPr>
+            <a:r>
+              <a:rPr xmlns:mc="http://schemas.openxmlformats.org/markup-compatibility/2006" xmlns:hp="http://schemas.haansoft.com/office/presentation/8.0" kumimoji="0" lang="en-US" altLang="ko-KR" sz="2000" b="1" i="0" u="none" strike="noStrike" kern="1200" cap="none" spc="0" normalizeH="0" baseline="0" mc:Ignorable="hp" hp:hslEmbossed="0">
+                <a:solidFill>
+                  <a:srgbClr val="ffffff"/>
+                </a:solidFill>
+                <a:latin typeface="Calibri"/>
+                <a:ea typeface="맑은 고딕"/>
+                <a:cs typeface="Times New Roman"/>
+              </a:rPr>
+              <a:t>I</a:t>
+            </a:r>
+            <a:endParaRPr xmlns:mc="http://schemas.openxmlformats.org/markup-compatibility/2006" xmlns:hp="http://schemas.haansoft.com/office/presentation/8.0" kumimoji="0" lang="en-US" altLang="ko-KR" sz="2000" b="1" i="0" u="none" strike="noStrike" kern="1200" cap="none" spc="0" normalizeH="0" baseline="0" mc:Ignorable="hp" hp:hslEmbossed="0">
+              <a:solidFill>
+                <a:srgbClr val="ffffff"/>
+              </a:solidFill>
+              <a:latin typeface="Calibri"/>
+              <a:ea typeface="맑은 고딕"/>
+              <a:cs typeface="Times New Roman"/>
+            </a:endParaRPr>
+          </a:p>
+        </p:txBody>
+      </p:sp>
+      <p:sp>
+        <p:nvSpPr>
+          <p:cNvPr id="13" name=""/>
+          <p:cNvSpPr/>
+          <p:nvPr/>
+        </p:nvSpPr>
+        <p:spPr>
+          <a:xfrm>
+            <a:off x="4655072" y="4444223"/>
+            <a:ext cx="545521" cy="574486"/>
+          </a:xfrm>
+          <a:prstGeom prst="ellipse">
+            <a:avLst/>
+          </a:prstGeom>
+          <a:solidFill>
+            <a:srgbClr val="6182d6">
+              <a:alpha val="100000"/>
+            </a:srgbClr>
+          </a:solidFill>
+          <a:ln w="19050" cap="flat" cmpd="sng" algn="ctr">
+            <a:solidFill>
+              <a:srgbClr val="2e3e67">
+                <a:alpha val="100000"/>
+              </a:srgbClr>
+            </a:solidFill>
+            <a:prstDash val="solid"/>
+          </a:ln>
+        </p:spPr>
+        <p:txBody>
+          <a:bodyPr anchor="ctr"/>
+          <a:p>
+            <a:pPr marL="0" indent="0" algn="ctr" defTabSz="914400" rtl="0" eaLnBrk="1" latinLnBrk="1" hangingPunct="1">
+              <a:lnSpc>
+                <a:spcPct val="100000"/>
+              </a:lnSpc>
+              <a:spcBef>
+                <a:spcPct val="0"/>
+              </a:spcBef>
+              <a:spcAft>
+                <a:spcPts val="0"/>
+              </a:spcAft>
+              <a:buNone/>
+              <a:defRPr/>
+            </a:pPr>
+            <a:r>
+              <a:rPr xmlns:mc="http://schemas.openxmlformats.org/markup-compatibility/2006" xmlns:hp="http://schemas.haansoft.com/office/presentation/8.0" kumimoji="0" lang="en-US" altLang="ko-KR" sz="2000" b="1" i="0" u="none" strike="noStrike" kern="1200" cap="none" spc="0" normalizeH="0" baseline="0" mc:Ignorable="hp" hp:hslEmbossed="0">
+                <a:solidFill>
+                  <a:srgbClr val="ffffff"/>
+                </a:solidFill>
+                <a:latin typeface="Calibri"/>
+                <a:ea typeface="맑은 고딕"/>
+                <a:cs typeface="Times New Roman"/>
+              </a:rPr>
+              <a:t>J</a:t>
+            </a:r>
+            <a:endParaRPr xmlns:mc="http://schemas.openxmlformats.org/markup-compatibility/2006" xmlns:hp="http://schemas.haansoft.com/office/presentation/8.0" kumimoji="0" lang="en-US" altLang="ko-KR" sz="2000" b="1" i="0" u="none" strike="noStrike" kern="1200" cap="none" spc="0" normalizeH="0" baseline="0" mc:Ignorable="hp" hp:hslEmbossed="0">
+              <a:solidFill>
+                <a:srgbClr val="ffffff"/>
+              </a:solidFill>
+              <a:latin typeface="Calibri"/>
+              <a:ea typeface="맑은 고딕"/>
+              <a:cs typeface="Times New Roman"/>
+            </a:endParaRPr>
+          </a:p>
+        </p:txBody>
+      </p:sp>
+      <p:cxnSp>
+        <p:nvCxnSpPr>
+          <p:cNvPr id="14" name=""/>
+          <p:cNvCxnSpPr>
+            <a:stCxn id="4" idx="3"/>
+            <a:endCxn id="5" idx="7"/>
+          </p:cNvCxnSpPr>
+          <p:nvPr/>
+        </p:nvCxnSpPr>
+        <p:spPr>
+          <a:xfrm rot="10800000" flipV="1">
+            <a:off x="4690926" y="1487657"/>
+            <a:ext cx="1212203" cy="742749"/>
+          </a:xfrm>
+          <a:prstGeom prst="line">
+            <a:avLst/>
+          </a:prstGeom>
+          <a:ln w="38100">
+            <a:solidFill>
+              <a:schemeClr val="dk1"/>
+            </a:solidFill>
+          </a:ln>
+        </p:spPr>
+        <p:style>
+          <a:lnRef idx="1">
+            <a:schemeClr val="accent1"/>
+          </a:lnRef>
+          <a:fillRef idx="0">
+            <a:schemeClr val="accent1"/>
+          </a:fillRef>
+          <a:effectRef idx="0">
+            <a:schemeClr val="accent1"/>
+          </a:effectRef>
+          <a:fontRef idx="minor">
+            <a:schemeClr val="tx1"/>
+          </a:fontRef>
+        </p:style>
+      </p:cxnSp>
+      <p:cxnSp>
+        <p:nvCxnSpPr>
+          <p:cNvPr id="17" name=""/>
+          <p:cNvCxnSpPr>
+            <a:stCxn id="6" idx="1"/>
+            <a:endCxn id="4" idx="5"/>
+          </p:cNvCxnSpPr>
+          <p:nvPr/>
+        </p:nvCxnSpPr>
+        <p:spPr>
+          <a:xfrm rot="10800000">
+            <a:off x="6288871" y="1487655"/>
+            <a:ext cx="1243534" cy="742752"/>
+          </a:xfrm>
+          <a:prstGeom prst="line">
+            <a:avLst/>
+          </a:prstGeom>
+          <a:ln w="38100">
+            <a:solidFill>
+              <a:schemeClr val="dk1"/>
+            </a:solidFill>
+          </a:ln>
+        </p:spPr>
+        <p:style>
+          <a:lnRef idx="1">
+            <a:schemeClr val="accent1"/>
+          </a:lnRef>
+          <a:fillRef idx="0">
+            <a:schemeClr val="accent1"/>
+          </a:fillRef>
+          <a:effectRef idx="0">
+            <a:schemeClr val="accent1"/>
+          </a:effectRef>
+          <a:fontRef idx="minor">
+            <a:schemeClr val="tx1"/>
+          </a:fontRef>
+        </p:style>
+      </p:cxnSp>
+      <p:cxnSp>
+        <p:nvCxnSpPr>
+          <p:cNvPr id="18" name=""/>
+          <p:cNvCxnSpPr>
+            <a:stCxn id="9" idx="7"/>
+            <a:endCxn id="6" idx="3"/>
+          </p:cNvCxnSpPr>
+          <p:nvPr/>
+        </p:nvCxnSpPr>
+        <p:spPr>
+          <a:xfrm rot="5400000" flipH="1" flipV="1">
+            <a:off x="6812023" y="2659000"/>
+            <a:ext cx="742749" cy="698012"/>
+          </a:xfrm>
+          <a:prstGeom prst="line">
+            <a:avLst/>
+          </a:prstGeom>
+          <a:ln w="38100">
+            <a:solidFill>
+              <a:schemeClr val="dk1"/>
+            </a:solidFill>
+          </a:ln>
+        </p:spPr>
+        <p:style>
+          <a:lnRef idx="1">
+            <a:schemeClr val="accent1"/>
+          </a:lnRef>
+          <a:fillRef idx="0">
+            <a:schemeClr val="accent1"/>
+          </a:fillRef>
+          <a:effectRef idx="0">
+            <a:schemeClr val="accent1"/>
+          </a:effectRef>
+          <a:fontRef idx="minor">
+            <a:schemeClr val="tx1"/>
+          </a:fontRef>
+        </p:style>
+      </p:cxnSp>
+      <p:cxnSp>
+        <p:nvCxnSpPr>
+          <p:cNvPr id="19" name=""/>
+          <p:cNvCxnSpPr>
+            <a:stCxn id="8" idx="1"/>
+            <a:endCxn id="5" idx="5"/>
+          </p:cNvCxnSpPr>
+          <p:nvPr/>
+        </p:nvCxnSpPr>
+        <p:spPr>
+          <a:xfrm rot="16200000" flipV="1">
+            <a:off x="4652892" y="2674665"/>
+            <a:ext cx="742750" cy="666681"/>
+          </a:xfrm>
+          <a:prstGeom prst="line">
+            <a:avLst/>
+          </a:prstGeom>
+          <a:ln w="38100">
+            <a:solidFill>
+              <a:schemeClr val="dk1"/>
+            </a:solidFill>
+          </a:ln>
+        </p:spPr>
+        <p:style>
+          <a:lnRef idx="1">
+            <a:schemeClr val="accent1"/>
+          </a:lnRef>
+          <a:fillRef idx="0">
+            <a:schemeClr val="accent1"/>
+          </a:fillRef>
+          <a:effectRef idx="0">
+            <a:schemeClr val="accent1"/>
+          </a:effectRef>
+          <a:fontRef idx="minor">
+            <a:schemeClr val="tx1"/>
+          </a:fontRef>
+        </p:style>
+      </p:cxnSp>
+      <p:cxnSp>
+        <p:nvCxnSpPr>
+          <p:cNvPr id="20" name=""/>
+          <p:cNvCxnSpPr>
+            <a:stCxn id="10" idx="1"/>
+            <a:endCxn id="6" idx="5"/>
+          </p:cNvCxnSpPr>
+          <p:nvPr/>
+        </p:nvCxnSpPr>
+        <p:spPr>
+          <a:xfrm rot="10800000">
+            <a:off x="7918144" y="2636631"/>
+            <a:ext cx="855357" cy="742750"/>
+          </a:xfrm>
+          <a:prstGeom prst="line">
+            <a:avLst/>
+          </a:prstGeom>
+          <a:ln w="38100">
+            <a:solidFill>
+              <a:schemeClr val="dk1"/>
+            </a:solidFill>
+          </a:ln>
+        </p:spPr>
+        <p:style>
+          <a:lnRef idx="1">
+            <a:schemeClr val="accent1"/>
+          </a:lnRef>
+          <a:fillRef idx="0">
+            <a:schemeClr val="accent1"/>
+          </a:fillRef>
+          <a:effectRef idx="0">
+            <a:schemeClr val="accent1"/>
+          </a:effectRef>
+          <a:fontRef idx="minor">
+            <a:schemeClr val="tx1"/>
+          </a:fontRef>
+        </p:style>
+      </p:cxnSp>
+      <p:cxnSp>
+        <p:nvCxnSpPr>
+          <p:cNvPr id="21" name=""/>
+          <p:cNvCxnSpPr>
+            <a:stCxn id="5" idx="3"/>
+            <a:endCxn id="7" idx="7"/>
+          </p:cNvCxnSpPr>
+          <p:nvPr/>
+        </p:nvCxnSpPr>
+        <p:spPr>
+          <a:xfrm rot="10800000" flipV="1">
+            <a:off x="3544166" y="2636631"/>
+            <a:ext cx="761018" cy="742749"/>
+          </a:xfrm>
+          <a:prstGeom prst="line">
+            <a:avLst/>
+          </a:prstGeom>
+          <a:ln w="38100">
+            <a:solidFill>
+              <a:schemeClr val="dk1"/>
+            </a:solidFill>
+          </a:ln>
+        </p:spPr>
+        <p:style>
+          <a:lnRef idx="1">
+            <a:schemeClr val="accent1"/>
+          </a:lnRef>
+          <a:fillRef idx="0">
+            <a:schemeClr val="accent1"/>
+          </a:fillRef>
+          <a:effectRef idx="0">
+            <a:schemeClr val="accent1"/>
+          </a:effectRef>
+          <a:fontRef idx="minor">
+            <a:schemeClr val="tx1"/>
+          </a:fontRef>
+        </p:style>
+      </p:cxnSp>
+      <p:cxnSp>
+        <p:nvCxnSpPr>
+          <p:cNvPr id="22" name=""/>
+          <p:cNvCxnSpPr>
+            <a:stCxn id="7" idx="3"/>
+            <a:endCxn id="11" idx="0"/>
+          </p:cNvCxnSpPr>
+          <p:nvPr/>
+        </p:nvCxnSpPr>
+        <p:spPr>
+          <a:xfrm rot="5400000">
+            <a:off x="2612229" y="3898027"/>
+            <a:ext cx="658617" cy="433774"/>
+          </a:xfrm>
+          <a:prstGeom prst="line">
+            <a:avLst/>
+          </a:prstGeom>
+          <a:ln w="38100">
+            <a:solidFill>
+              <a:schemeClr val="dk1"/>
+            </a:solidFill>
+          </a:ln>
+        </p:spPr>
+        <p:style>
+          <a:lnRef idx="1">
+            <a:schemeClr val="accent1"/>
+          </a:lnRef>
+          <a:fillRef idx="0">
+            <a:schemeClr val="accent1"/>
+          </a:fillRef>
+          <a:effectRef idx="0">
+            <a:schemeClr val="accent1"/>
+          </a:effectRef>
+          <a:fontRef idx="minor">
+            <a:schemeClr val="tx1"/>
+          </a:fontRef>
+        </p:style>
+      </p:cxnSp>
+      <p:cxnSp>
+        <p:nvCxnSpPr>
+          <p:cNvPr id="23" name=""/>
+          <p:cNvCxnSpPr>
+            <a:stCxn id="7" idx="5"/>
+            <a:endCxn id="12" idx="0"/>
+          </p:cNvCxnSpPr>
+          <p:nvPr/>
+        </p:nvCxnSpPr>
+        <p:spPr>
+          <a:xfrm rot="16200000" flipH="1">
+            <a:off x="3391182" y="3938589"/>
+            <a:ext cx="658618" cy="352649"/>
+          </a:xfrm>
+          <a:prstGeom prst="line">
+            <a:avLst/>
+          </a:prstGeom>
+          <a:ln w="38100">
+            <a:solidFill>
+              <a:schemeClr val="dk1"/>
+            </a:solidFill>
+          </a:ln>
+        </p:spPr>
+        <p:style>
+          <a:lnRef idx="1">
+            <a:schemeClr val="accent1"/>
+          </a:lnRef>
+          <a:fillRef idx="0">
+            <a:schemeClr val="accent1"/>
+          </a:fillRef>
+          <a:effectRef idx="0">
+            <a:schemeClr val="accent1"/>
+          </a:effectRef>
+          <a:fontRef idx="minor">
+            <a:schemeClr val="tx1"/>
+          </a:fontRef>
+        </p:style>
+      </p:cxnSp>
+      <p:cxnSp>
+        <p:nvCxnSpPr>
+          <p:cNvPr id="24" name=""/>
+          <p:cNvCxnSpPr>
+            <a:stCxn id="8" idx="3"/>
+            <a:endCxn id="13" idx="0"/>
+          </p:cNvCxnSpPr>
+          <p:nvPr/>
+        </p:nvCxnSpPr>
+        <p:spPr>
+          <a:xfrm rot="5400000">
+            <a:off x="4813411" y="3900026"/>
+            <a:ext cx="658618" cy="429775"/>
+          </a:xfrm>
+          <a:prstGeom prst="line">
+            <a:avLst/>
+          </a:prstGeom>
+          <a:ln w="38100">
+            <a:solidFill>
+              <a:schemeClr val="dk1"/>
+            </a:solidFill>
+          </a:ln>
+        </p:spPr>
+        <p:style>
+          <a:lnRef idx="1">
+            <a:schemeClr val="accent1"/>
+          </a:lnRef>
+          <a:fillRef idx="0">
+            <a:schemeClr val="accent1"/>
+          </a:fillRef>
+          <a:effectRef idx="0">
+            <a:schemeClr val="accent1"/>
+          </a:effectRef>
+          <a:fontRef idx="minor">
+            <a:schemeClr val="tx1"/>
+          </a:fontRef>
+        </p:style>
+      </p:cxnSp>
+      <p:cxnSp>
+        <p:nvCxnSpPr>
+          <p:cNvPr id="25" name=""/>
+          <p:cNvCxnSpPr>
+            <a:endCxn id="4" idx="0"/>
+          </p:cNvCxnSpPr>
+          <p:nvPr/>
+        </p:nvCxnSpPr>
+        <p:spPr>
+          <a:xfrm rot="16200000" flipH="1">
+            <a:off x="5937930" y="839232"/>
+            <a:ext cx="316139" cy="0"/>
+          </a:xfrm>
+          <a:prstGeom prst="straightConnector1">
+            <a:avLst/>
+          </a:prstGeom>
+          <a:ln>
+            <a:tailEnd type="arrow"/>
+          </a:ln>
+        </p:spPr>
+        <p:style>
+          <a:lnRef idx="1">
+            <a:schemeClr val="accent1"/>
+          </a:lnRef>
+          <a:fillRef idx="0">
+            <a:schemeClr val="accent1"/>
+          </a:fillRef>
+          <a:effectRef idx="0">
+            <a:schemeClr val="accent1"/>
+          </a:effectRef>
+          <a:fontRef idx="minor">
+            <a:schemeClr val="tx1"/>
+          </a:fontRef>
+        </p:style>
+      </p:cxnSp>
+      <p:sp>
+        <p:nvSpPr>
+          <p:cNvPr id="26" name=""/>
+          <p:cNvSpPr txBox="1"/>
+          <p:nvPr/>
+        </p:nvSpPr>
+        <p:spPr>
+          <a:xfrm>
+            <a:off x="5756910" y="290662"/>
+            <a:ext cx="687704" cy="393233"/>
+          </a:xfrm>
+          <a:prstGeom prst="rect">
+            <a:avLst/>
+          </a:prstGeom>
+        </p:spPr>
+        <p:txBody>
+          <a:bodyPr wrap="none">
+            <a:spAutoFit/>
+          </a:bodyPr>
+          <a:p>
+            <a:pPr algn="ctr">
+              <a:defRPr/>
+            </a:pPr>
+            <a:r>
+              <a:rPr lang="en-US" altLang="ko-KR" sz="2000" b="1"/>
+              <a:t>Root</a:t>
+            </a:r>
+            <a:endParaRPr lang="en-US" altLang="ko-KR" sz="2000" b="1"/>
+          </a:p>
+        </p:txBody>
+      </p:sp>
+      <p:sp>
+        <p:nvSpPr>
+          <p:cNvPr id="32" name=""/>
+          <p:cNvSpPr txBox="1"/>
+          <p:nvPr/>
+        </p:nvSpPr>
+        <p:spPr>
+          <a:xfrm>
+            <a:off x="9821508" y="1086511"/>
+            <a:ext cx="916305" cy="396067"/>
+          </a:xfrm>
+          <a:prstGeom prst="rect">
+            <a:avLst/>
+          </a:prstGeom>
+        </p:spPr>
+        <p:txBody>
+          <a:bodyPr wrap="none">
+            <a:spAutoFit/>
+          </a:bodyPr>
+          <a:p>
+            <a:pPr algn="ctr">
+              <a:defRPr/>
+            </a:pPr>
+            <a:r>
+              <a:rPr lang="en-US" altLang="ko-KR" sz="2000" b="1"/>
+              <a:t>Level 0</a:t>
+            </a:r>
+            <a:endParaRPr lang="en-US" altLang="ko-KR" sz="2000" b="1"/>
+          </a:p>
+        </p:txBody>
+      </p:sp>
+      <p:sp>
+        <p:nvSpPr>
+          <p:cNvPr id="33" name=""/>
+          <p:cNvSpPr txBox="1"/>
+          <p:nvPr/>
+        </p:nvSpPr>
+        <p:spPr>
+          <a:xfrm>
+            <a:off x="9814560" y="2235486"/>
+            <a:ext cx="916305" cy="396067"/>
+          </a:xfrm>
+          <a:prstGeom prst="rect">
+            <a:avLst/>
+          </a:prstGeom>
+        </p:spPr>
+        <p:txBody>
+          <a:bodyPr wrap="none">
+            <a:spAutoFit/>
+          </a:bodyPr>
+          <a:p>
+            <a:pPr algn="ctr">
+              <a:defRPr/>
+            </a:pPr>
+            <a:r>
+              <a:rPr lang="en-US" altLang="ko-KR" sz="2000" b="1"/>
+              <a:t>Level 1</a:t>
+            </a:r>
+            <a:endParaRPr lang="en-US" altLang="ko-KR" sz="2000" b="1"/>
+          </a:p>
+        </p:txBody>
+      </p:sp>
+      <p:sp>
+        <p:nvSpPr>
+          <p:cNvPr id="34" name=""/>
+          <p:cNvSpPr txBox="1"/>
+          <p:nvPr/>
+        </p:nvSpPr>
+        <p:spPr>
+          <a:xfrm>
+            <a:off x="9814560" y="3388906"/>
+            <a:ext cx="916305" cy="396067"/>
+          </a:xfrm>
+          <a:prstGeom prst="rect">
+            <a:avLst/>
+          </a:prstGeom>
+        </p:spPr>
+        <p:txBody>
+          <a:bodyPr wrap="none">
+            <a:spAutoFit/>
+          </a:bodyPr>
+          <a:p>
+            <a:pPr algn="ctr">
+              <a:defRPr/>
+            </a:pPr>
+            <a:r>
+              <a:rPr lang="en-US" altLang="ko-KR" sz="2000" b="1"/>
+              <a:t>Level 2</a:t>
+            </a:r>
+            <a:endParaRPr lang="en-US" altLang="ko-KR" sz="2000" b="1"/>
+          </a:p>
+        </p:txBody>
+      </p:sp>
+      <p:sp>
+        <p:nvSpPr>
+          <p:cNvPr id="35" name=""/>
+          <p:cNvSpPr txBox="1"/>
+          <p:nvPr/>
+        </p:nvSpPr>
+        <p:spPr>
+          <a:xfrm>
+            <a:off x="9814560" y="4533432"/>
+            <a:ext cx="916305" cy="396067"/>
+          </a:xfrm>
+          <a:prstGeom prst="rect">
+            <a:avLst/>
+          </a:prstGeom>
+        </p:spPr>
+        <p:txBody>
+          <a:bodyPr wrap="none">
+            <a:spAutoFit/>
+          </a:bodyPr>
+          <a:p>
+            <a:pPr algn="ctr">
+              <a:defRPr/>
+            </a:pPr>
+            <a:r>
+              <a:rPr lang="en-US" altLang="ko-KR" sz="2000" b="1"/>
+              <a:t>Level 3</a:t>
+            </a:r>
+            <a:endParaRPr lang="en-US" altLang="ko-KR" sz="2000" b="1"/>
+          </a:p>
+        </p:txBody>
+      </p:sp>
+      <p:cxnSp>
+        <p:nvCxnSpPr>
+          <p:cNvPr id="36" name=""/>
+          <p:cNvCxnSpPr>
+            <a:stCxn id="37" idx="0"/>
+            <a:endCxn id="9" idx="4"/>
+          </p:cNvCxnSpPr>
+          <p:nvPr/>
+        </p:nvCxnSpPr>
+        <p:spPr>
+          <a:xfrm rot="16200000">
+            <a:off x="6067034" y="4444223"/>
+            <a:ext cx="1148973" cy="0"/>
+          </a:xfrm>
+          <a:prstGeom prst="straightConnector1">
+            <a:avLst/>
+          </a:prstGeom>
+          <a:ln>
+            <a:tailEnd type="arrow"/>
+          </a:ln>
+        </p:spPr>
+        <p:style>
+          <a:lnRef idx="1">
+            <a:schemeClr val="accent1"/>
+          </a:lnRef>
+          <a:fillRef idx="0">
+            <a:schemeClr val="accent1"/>
+          </a:fillRef>
+          <a:effectRef idx="0">
+            <a:schemeClr val="accent1"/>
+          </a:effectRef>
+          <a:fontRef idx="minor">
+            <a:schemeClr val="tx1"/>
+          </a:fontRef>
+        </p:style>
+      </p:cxnSp>
+      <p:sp>
+        <p:nvSpPr>
+          <p:cNvPr id="37" name=""/>
+          <p:cNvSpPr txBox="1"/>
+          <p:nvPr/>
+        </p:nvSpPr>
+        <p:spPr>
+          <a:xfrm>
+            <a:off x="5927717" y="5018710"/>
+            <a:ext cx="1427607" cy="389585"/>
+          </a:xfrm>
+          <a:prstGeom prst="rect">
+            <a:avLst/>
+          </a:prstGeom>
+        </p:spPr>
+        <p:txBody>
+          <a:bodyPr wrap="square">
+            <a:spAutoFit/>
+          </a:bodyPr>
+          <a:p>
+            <a:pPr algn="ctr">
+              <a:defRPr/>
+            </a:pPr>
+            <a:r>
+              <a:rPr lang="en-US" altLang="ko-KR" sz="2000" b="1"/>
+              <a:t>Leaf Node</a:t>
+            </a:r>
+            <a:endParaRPr lang="en-US" altLang="ko-KR" sz="2000" b="1"/>
+          </a:p>
+        </p:txBody>
+      </p:sp>
+      <p:cxnSp>
+        <p:nvCxnSpPr>
+          <p:cNvPr id="39" name=""/>
+          <p:cNvCxnSpPr>
+            <a:stCxn id="9" idx="5"/>
+            <a:endCxn id="10" idx="3"/>
+          </p:cNvCxnSpPr>
+          <p:nvPr/>
+        </p:nvCxnSpPr>
+        <p:spPr>
+          <a:xfrm>
+            <a:off x="6834392" y="3785604"/>
+            <a:ext cx="1939110" cy="0"/>
+          </a:xfrm>
+          <a:prstGeom prst="straightConnector1">
+            <a:avLst/>
+          </a:prstGeom>
+          <a:ln>
+            <a:headEnd type="arrow"/>
+            <a:tailEnd type="arrow"/>
+          </a:ln>
+        </p:spPr>
+        <p:style>
+          <a:lnRef idx="1">
+            <a:schemeClr val="accent1"/>
+          </a:lnRef>
+          <a:fillRef idx="0">
+            <a:schemeClr val="accent1"/>
+          </a:fillRef>
+          <a:effectRef idx="0">
+            <a:schemeClr val="accent1"/>
+          </a:effectRef>
+          <a:fontRef idx="minor">
+            <a:schemeClr val="tx1"/>
+          </a:fontRef>
+        </p:style>
+      </p:cxnSp>
+      <p:sp>
+        <p:nvSpPr>
+          <p:cNvPr id="40" name=""/>
+          <p:cNvSpPr txBox="1"/>
+          <p:nvPr/>
+        </p:nvSpPr>
+        <p:spPr>
+          <a:xfrm>
+            <a:off x="7090143" y="3869736"/>
+            <a:ext cx="1427607" cy="395559"/>
+          </a:xfrm>
+          <a:prstGeom prst="rect">
+            <a:avLst/>
+          </a:prstGeom>
+        </p:spPr>
+        <p:txBody>
+          <a:bodyPr wrap="square">
+            <a:spAutoFit/>
+          </a:bodyPr>
+          <a:p>
+            <a:pPr algn="ctr">
+              <a:defRPr/>
+            </a:pPr>
+            <a:r>
+              <a:rPr lang="en-US" altLang="ko-KR" sz="2000" b="1"/>
+              <a:t>Siblings</a:t>
+            </a:r>
+            <a:endParaRPr lang="en-US" altLang="ko-KR" sz="2000" b="1"/>
+          </a:p>
+        </p:txBody>
+      </p:sp>
+      <p:cxnSp>
+        <p:nvCxnSpPr>
+          <p:cNvPr id="42" name=""/>
+          <p:cNvCxnSpPr>
+            <a:stCxn id="43" idx="3"/>
+            <a:endCxn id="7" idx="2"/>
+          </p:cNvCxnSpPr>
+          <p:nvPr/>
+        </p:nvCxnSpPr>
+        <p:spPr>
+          <a:xfrm flipV="1">
+            <a:off x="1822050" y="3582493"/>
+            <a:ext cx="1256485" cy="1720"/>
+          </a:xfrm>
+          <a:prstGeom prst="straightConnector1">
+            <a:avLst/>
+          </a:prstGeom>
+          <a:ln>
+            <a:tailEnd type="arrow"/>
+          </a:ln>
+        </p:spPr>
+        <p:style>
+          <a:lnRef idx="1">
+            <a:schemeClr val="accent1"/>
+          </a:lnRef>
+          <a:fillRef idx="0">
+            <a:schemeClr val="accent1"/>
+          </a:fillRef>
+          <a:effectRef idx="0">
+            <a:schemeClr val="accent1"/>
+          </a:effectRef>
+          <a:fontRef idx="minor">
+            <a:schemeClr val="tx1"/>
+          </a:fontRef>
+        </p:style>
+      </p:cxnSp>
+      <p:sp>
+        <p:nvSpPr>
+          <p:cNvPr id="43" name=""/>
+          <p:cNvSpPr txBox="1"/>
+          <p:nvPr/>
+        </p:nvSpPr>
+        <p:spPr>
+          <a:xfrm>
+            <a:off x="262848" y="3388906"/>
+            <a:ext cx="1559202" cy="390614"/>
+          </a:xfrm>
+          <a:prstGeom prst="rect">
+            <a:avLst/>
+          </a:prstGeom>
+        </p:spPr>
+        <p:txBody>
+          <a:bodyPr wrap="square">
+            <a:spAutoFit/>
+          </a:bodyPr>
+          <a:p>
+            <a:pPr algn="ctr">
+              <a:defRPr/>
+            </a:pPr>
+            <a:r>
+              <a:rPr lang="en-US" altLang="ko-KR" sz="2000" b="1"/>
+              <a:t>Parent Node</a:t>
+            </a:r>
+            <a:endParaRPr lang="en-US" altLang="ko-KR" sz="2000" b="1"/>
+          </a:p>
+        </p:txBody>
+      </p:sp>
+      <p:cxnSp>
+        <p:nvCxnSpPr>
+          <p:cNvPr id="44" name=""/>
+          <p:cNvCxnSpPr>
+            <a:stCxn id="45" idx="3"/>
+            <a:endCxn id="11" idx="2"/>
+          </p:cNvCxnSpPr>
+          <p:nvPr/>
+        </p:nvCxnSpPr>
+        <p:spPr>
+          <a:xfrm flipV="1">
+            <a:off x="1822049" y="4731466"/>
+            <a:ext cx="629840" cy="2725"/>
+          </a:xfrm>
+          <a:prstGeom prst="straightConnector1">
+            <a:avLst/>
+          </a:prstGeom>
+          <a:ln>
+            <a:tailEnd type="arrow"/>
+          </a:ln>
+        </p:spPr>
+        <p:style>
+          <a:lnRef idx="1">
+            <a:schemeClr val="accent1"/>
+          </a:lnRef>
+          <a:fillRef idx="0">
+            <a:schemeClr val="accent1"/>
+          </a:fillRef>
+          <a:effectRef idx="0">
+            <a:schemeClr val="accent1"/>
+          </a:effectRef>
+          <a:fontRef idx="minor">
+            <a:schemeClr val="tx1"/>
+          </a:fontRef>
+        </p:style>
+      </p:cxnSp>
+      <p:sp>
+        <p:nvSpPr>
+          <p:cNvPr id="45" name=""/>
+          <p:cNvSpPr txBox="1"/>
+          <p:nvPr/>
+        </p:nvSpPr>
+        <p:spPr>
+          <a:xfrm>
+            <a:off x="262847" y="4538885"/>
+            <a:ext cx="1559203" cy="393160"/>
+          </a:xfrm>
+          <a:prstGeom prst="rect">
+            <a:avLst/>
+          </a:prstGeom>
+        </p:spPr>
+        <p:txBody>
+          <a:bodyPr wrap="square">
+            <a:spAutoFit/>
+          </a:bodyPr>
+          <a:p>
+            <a:pPr algn="ctr">
+              <a:defRPr/>
+            </a:pPr>
+            <a:r>
+              <a:rPr lang="en-US" altLang="ko-KR" sz="2000" b="1"/>
+              <a:t>Child Node</a:t>
+            </a:r>
+            <a:endParaRPr lang="en-US" altLang="ko-KR" sz="2000" b="1"/>
+          </a:p>
+        </p:txBody>
+      </p:sp>
+      <p:cxnSp>
+        <p:nvCxnSpPr>
+          <p:cNvPr id="46" name=""/>
+          <p:cNvCxnSpPr>
+            <a:stCxn id="47" idx="0"/>
+          </p:cNvCxnSpPr>
+          <p:nvPr/>
+        </p:nvCxnSpPr>
+        <p:spPr>
+          <a:xfrm rot="16200000">
+            <a:off x="3193527" y="5345520"/>
+            <a:ext cx="265405" cy="0"/>
+          </a:xfrm>
+          <a:prstGeom prst="straightConnector1">
+            <a:avLst/>
+          </a:prstGeom>
+          <a:ln>
+            <a:tailEnd type="arrow"/>
+          </a:ln>
+        </p:spPr>
+        <p:style>
+          <a:lnRef idx="1">
+            <a:schemeClr val="accent1"/>
+          </a:lnRef>
+          <a:fillRef idx="0">
+            <a:schemeClr val="accent1"/>
+          </a:fillRef>
+          <a:effectRef idx="0">
+            <a:schemeClr val="accent1"/>
+          </a:effectRef>
+          <a:fontRef idx="minor">
+            <a:schemeClr val="tx1"/>
+          </a:fontRef>
+        </p:style>
+      </p:cxnSp>
+      <p:sp>
+        <p:nvSpPr>
+          <p:cNvPr id="47" name=""/>
+          <p:cNvSpPr txBox="1"/>
+          <p:nvPr/>
+        </p:nvSpPr>
+        <p:spPr>
+          <a:xfrm>
+            <a:off x="2612426" y="5478222"/>
+            <a:ext cx="1427607" cy="389585"/>
+          </a:xfrm>
+          <a:prstGeom prst="rect">
+            <a:avLst/>
+          </a:prstGeom>
+        </p:spPr>
+        <p:txBody>
+          <a:bodyPr wrap="square">
+            <a:spAutoFit/>
+          </a:bodyPr>
+          <a:p>
+            <a:pPr algn="ctr">
+              <a:defRPr/>
+            </a:pPr>
+            <a:r>
+              <a:rPr lang="en-US" altLang="ko-KR" sz="2000" b="1"/>
+              <a:t>Sub-Tree</a:t>
+            </a:r>
+            <a:endParaRPr lang="en-US" altLang="ko-KR" sz="2000" b="1"/>
+          </a:p>
+        </p:txBody>
+      </p:sp>
+    </p:spTree>
+  </p:cSld>
+  <p:clrMapOvr>
+    <a:masterClrMapping/>
+  </p:clrMapOvr>
+  <mc:AlternateContent xmlns:mc="http://schemas.openxmlformats.org/markup-compatibility/2006">
+    <mc:Choice xmlns:p14="http://schemas.microsoft.com/office/powerpoint/2010/main" Requires="p14">
+      <p:transition xmlns:mc="http://schemas.openxmlformats.org/markup-compatibility/2006" xmlns:p14="http://schemas.microsoft.com/office/powerpoint/2010/main" mc:Ignorable="p14" p14:dur="500"/>
+    </mc:Choice>
+    <mc:Fallback>
+      <p:transition/>
+    </mc:Fallback>
+  </mc:AlternateContent>
+</p:sld>
+</file>
+
 <file path=ppt/slides/slide2.xml><?xml version="1.0" encoding="utf-8"?>
 <p:sld xmlns:r="http://schemas.openxmlformats.org/officeDocument/2006/relationships" xmlns:c="http://schemas.openxmlformats.org/drawingml/2006/chart" xmlns:a="http://schemas.openxmlformats.org/drawingml/2006/main" xmlns:dgm="http://schemas.openxmlformats.org/drawingml/2006/diagram" xmlns:dsp="http://schemas.microsoft.com/office/drawing/2008/diagram" xmlns:p="http://schemas.openxmlformats.org/presentationml/2006/main">
   <p:cSld>

</xml_diff>

<commit_message>
add image "tree type"
</commit_message>
<xml_diff>
--- a/etc/images.pptx
+++ b/etc/images.pptx
@@ -24,6 +24,7 @@
     <p:sldId id="269" r:id="rId16"/>
     <p:sldId id="270" r:id="rId17"/>
     <p:sldId id="271" r:id="rId18"/>
+    <p:sldId id="272" r:id="rId19"/>
   </p:sldIdLst>
   <p:sldSz cx="12192000" cy="6858000"/>
   <p:notesSz cx="6858000" cy="9144000"/>
@@ -18823,6 +18824,2779 @@
 </p:sld>
 </file>
 
+<file path=ppt/slides/slide17.xml><?xml version="1.0" encoding="utf-8"?>
+<p:sld xmlns:r="http://schemas.openxmlformats.org/officeDocument/2006/relationships" xmlns:c="http://schemas.openxmlformats.org/drawingml/2006/chart" xmlns:a="http://schemas.openxmlformats.org/drawingml/2006/main" xmlns:dgm="http://schemas.openxmlformats.org/drawingml/2006/diagram" xmlns:dsp="http://schemas.microsoft.com/office/drawing/2008/diagram" xmlns:p="http://schemas.openxmlformats.org/presentationml/2006/main">
+  <p:cSld>
+    <p:spTree>
+      <p:nvGrpSpPr>
+        <p:cNvPr id="1" name=""/>
+        <p:cNvGrpSpPr/>
+        <p:nvPr/>
+      </p:nvGrpSpPr>
+      <p:grpSpPr>
+        <a:xfrm>
+          <a:off x="0" y="0"/>
+          <a:ext cx="0" cy="0"/>
+          <a:chOff x="0" y="0"/>
+          <a:chExt cx="0" cy="0"/>
+        </a:xfrm>
+      </p:grpSpPr>
+      <p:sp>
+        <p:nvSpPr>
+          <p:cNvPr id="4" name=""/>
+          <p:cNvSpPr/>
+          <p:nvPr/>
+        </p:nvSpPr>
+        <p:spPr>
+          <a:xfrm>
+            <a:off x="2095839" y="512864"/>
+            <a:ext cx="545521" cy="574486"/>
+          </a:xfrm>
+          <a:prstGeom prst="ellipse">
+            <a:avLst/>
+          </a:prstGeom>
+          <a:solidFill>
+            <a:srgbClr val="6182d6">
+              <a:alpha val="100000"/>
+            </a:srgbClr>
+          </a:solidFill>
+          <a:ln w="19050" cap="flat" cmpd="sng" algn="ctr">
+            <a:solidFill>
+              <a:srgbClr val="2e3e67">
+                <a:alpha val="100000"/>
+              </a:srgbClr>
+            </a:solidFill>
+            <a:prstDash val="solid"/>
+          </a:ln>
+        </p:spPr>
+        <p:txBody>
+          <a:bodyPr anchor="ctr"/>
+          <a:p>
+            <a:pPr marL="0" indent="0" algn="ctr" defTabSz="914400" rtl="0" eaLnBrk="1" latinLnBrk="1" hangingPunct="1">
+              <a:lnSpc>
+                <a:spcPct val="100000"/>
+              </a:lnSpc>
+              <a:spcBef>
+                <a:spcPct val="0"/>
+              </a:spcBef>
+              <a:spcAft>
+                <a:spcPts val="0"/>
+              </a:spcAft>
+              <a:buNone/>
+              <a:defRPr/>
+            </a:pPr>
+            <a:r>
+              <a:rPr xmlns:mc="http://schemas.openxmlformats.org/markup-compatibility/2006" xmlns:hp="http://schemas.haansoft.com/office/presentation/8.0" kumimoji="0" lang="en-US" altLang="ko-KR" sz="2000" b="1" i="0" u="none" strike="noStrike" kern="1200" cap="none" spc="0" normalizeH="0" baseline="0" mc:Ignorable="hp" hp:hslEmbossed="0">
+                <a:solidFill>
+                  <a:srgbClr val="ffffff"/>
+                </a:solidFill>
+                <a:latin typeface="Calibri"/>
+                <a:ea typeface="맑은 고딕"/>
+                <a:cs typeface="Times New Roman"/>
+              </a:rPr>
+              <a:t>A</a:t>
+            </a:r>
+            <a:endParaRPr xmlns:mc="http://schemas.openxmlformats.org/markup-compatibility/2006" xmlns:hp="http://schemas.haansoft.com/office/presentation/8.0" kumimoji="0" lang="en-US" altLang="ko-KR" sz="2000" b="1" i="0" u="none" strike="noStrike" kern="1200" cap="none" spc="0" normalizeH="0" baseline="0" mc:Ignorable="hp" hp:hslEmbossed="0">
+              <a:solidFill>
+                <a:srgbClr val="ffffff"/>
+              </a:solidFill>
+              <a:latin typeface="Calibri"/>
+              <a:ea typeface="맑은 고딕"/>
+              <a:cs typeface="Times New Roman"/>
+            </a:endParaRPr>
+          </a:p>
+        </p:txBody>
+      </p:sp>
+      <p:sp>
+        <p:nvSpPr>
+          <p:cNvPr id="5" name=""/>
+          <p:cNvSpPr/>
+          <p:nvPr/>
+        </p:nvSpPr>
+        <p:spPr>
+          <a:xfrm>
+            <a:off x="1123305" y="1464945"/>
+            <a:ext cx="545521" cy="574486"/>
+          </a:xfrm>
+          <a:prstGeom prst="ellipse">
+            <a:avLst/>
+          </a:prstGeom>
+          <a:solidFill>
+            <a:srgbClr val="6182d6">
+              <a:alpha val="100000"/>
+            </a:srgbClr>
+          </a:solidFill>
+          <a:ln w="19050" cap="flat" cmpd="sng" algn="ctr">
+            <a:solidFill>
+              <a:srgbClr val="2e3e67">
+                <a:alpha val="100000"/>
+              </a:srgbClr>
+            </a:solidFill>
+            <a:prstDash val="solid"/>
+          </a:ln>
+        </p:spPr>
+        <p:txBody>
+          <a:bodyPr anchor="ctr"/>
+          <a:p>
+            <a:pPr marL="0" indent="0" algn="ctr" defTabSz="914400" rtl="0" eaLnBrk="1" latinLnBrk="1" hangingPunct="1">
+              <a:lnSpc>
+                <a:spcPct val="100000"/>
+              </a:lnSpc>
+              <a:spcBef>
+                <a:spcPct val="0"/>
+              </a:spcBef>
+              <a:spcAft>
+                <a:spcPts val="0"/>
+              </a:spcAft>
+              <a:buNone/>
+              <a:defRPr/>
+            </a:pPr>
+            <a:r>
+              <a:rPr xmlns:mc="http://schemas.openxmlformats.org/markup-compatibility/2006" xmlns:hp="http://schemas.haansoft.com/office/presentation/8.0" kumimoji="0" lang="en-US" altLang="ko-KR" sz="2000" b="1" i="0" u="none" strike="noStrike" kern="1200" cap="none" spc="0" normalizeH="0" baseline="0" mc:Ignorable="hp" hp:hslEmbossed="0">
+                <a:solidFill>
+                  <a:srgbClr val="ffffff"/>
+                </a:solidFill>
+                <a:latin typeface="Calibri"/>
+                <a:ea typeface="맑은 고딕"/>
+                <a:cs typeface="Times New Roman"/>
+              </a:rPr>
+              <a:t>B</a:t>
+            </a:r>
+            <a:endParaRPr xmlns:mc="http://schemas.openxmlformats.org/markup-compatibility/2006" xmlns:hp="http://schemas.haansoft.com/office/presentation/8.0" kumimoji="0" lang="en-US" altLang="ko-KR" sz="2000" b="1" i="0" u="none" strike="noStrike" kern="1200" cap="none" spc="0" normalizeH="0" baseline="0" mc:Ignorable="hp" hp:hslEmbossed="0">
+              <a:solidFill>
+                <a:srgbClr val="ffffff"/>
+              </a:solidFill>
+              <a:latin typeface="Calibri"/>
+              <a:ea typeface="맑은 고딕"/>
+              <a:cs typeface="Times New Roman"/>
+            </a:endParaRPr>
+          </a:p>
+        </p:txBody>
+      </p:sp>
+      <p:sp>
+        <p:nvSpPr>
+          <p:cNvPr id="6" name=""/>
+          <p:cNvSpPr/>
+          <p:nvPr/>
+        </p:nvSpPr>
+        <p:spPr>
+          <a:xfrm>
+            <a:off x="2994010" y="1464945"/>
+            <a:ext cx="545521" cy="574486"/>
+          </a:xfrm>
+          <a:prstGeom prst="ellipse">
+            <a:avLst/>
+          </a:prstGeom>
+          <a:solidFill>
+            <a:srgbClr val="6182d6">
+              <a:alpha val="100000"/>
+            </a:srgbClr>
+          </a:solidFill>
+          <a:ln w="19050" cap="flat" cmpd="sng" algn="ctr">
+            <a:solidFill>
+              <a:srgbClr val="2e3e67">
+                <a:alpha val="100000"/>
+              </a:srgbClr>
+            </a:solidFill>
+            <a:prstDash val="solid"/>
+          </a:ln>
+        </p:spPr>
+        <p:txBody>
+          <a:bodyPr anchor="ctr"/>
+          <a:p>
+            <a:pPr marL="0" indent="0" algn="ctr" defTabSz="914400" rtl="0" eaLnBrk="1" latinLnBrk="1" hangingPunct="1">
+              <a:lnSpc>
+                <a:spcPct val="100000"/>
+              </a:lnSpc>
+              <a:spcBef>
+                <a:spcPct val="0"/>
+              </a:spcBef>
+              <a:spcAft>
+                <a:spcPts val="0"/>
+              </a:spcAft>
+              <a:buNone/>
+              <a:defRPr/>
+            </a:pPr>
+            <a:r>
+              <a:rPr xmlns:mc="http://schemas.openxmlformats.org/markup-compatibility/2006" xmlns:hp="http://schemas.haansoft.com/office/presentation/8.0" kumimoji="0" lang="en-US" altLang="ko-KR" sz="2000" b="1" i="0" u="none" strike="noStrike" kern="1200" cap="none" spc="0" normalizeH="0" baseline="0" mc:Ignorable="hp" hp:hslEmbossed="0">
+                <a:solidFill>
+                  <a:srgbClr val="ffffff"/>
+                </a:solidFill>
+                <a:latin typeface="Calibri"/>
+                <a:ea typeface="맑은 고딕"/>
+                <a:cs typeface="Times New Roman"/>
+              </a:rPr>
+              <a:t>C</a:t>
+            </a:r>
+            <a:endParaRPr xmlns:mc="http://schemas.openxmlformats.org/markup-compatibility/2006" xmlns:hp="http://schemas.haansoft.com/office/presentation/8.0" kumimoji="0" lang="en-US" altLang="ko-KR" sz="2000" b="1" i="0" u="none" strike="noStrike" kern="1200" cap="none" spc="0" normalizeH="0" baseline="0" mc:Ignorable="hp" hp:hslEmbossed="0">
+              <a:solidFill>
+                <a:srgbClr val="ffffff"/>
+              </a:solidFill>
+              <a:latin typeface="Calibri"/>
+              <a:ea typeface="맑은 고딕"/>
+              <a:cs typeface="Times New Roman"/>
+            </a:endParaRPr>
+          </a:p>
+        </p:txBody>
+      </p:sp>
+      <p:sp>
+        <p:nvSpPr>
+          <p:cNvPr id="7" name=""/>
+          <p:cNvSpPr/>
+          <p:nvPr/>
+        </p:nvSpPr>
+        <p:spPr>
+          <a:xfrm>
+            <a:off x="577784" y="2368739"/>
+            <a:ext cx="545521" cy="574486"/>
+          </a:xfrm>
+          <a:prstGeom prst="ellipse">
+            <a:avLst/>
+          </a:prstGeom>
+          <a:solidFill>
+            <a:srgbClr val="6182d6">
+              <a:alpha val="100000"/>
+            </a:srgbClr>
+          </a:solidFill>
+          <a:ln w="19050" cap="flat" cmpd="sng" algn="ctr">
+            <a:solidFill>
+              <a:srgbClr val="2e3e67">
+                <a:alpha val="100000"/>
+              </a:srgbClr>
+            </a:solidFill>
+            <a:prstDash val="solid"/>
+          </a:ln>
+        </p:spPr>
+        <p:txBody>
+          <a:bodyPr anchor="ctr"/>
+          <a:p>
+            <a:pPr marL="0" indent="0" algn="ctr" defTabSz="914400" rtl="0" eaLnBrk="1" latinLnBrk="1" hangingPunct="1">
+              <a:lnSpc>
+                <a:spcPct val="100000"/>
+              </a:lnSpc>
+              <a:spcBef>
+                <a:spcPct val="0"/>
+              </a:spcBef>
+              <a:spcAft>
+                <a:spcPts val="0"/>
+              </a:spcAft>
+              <a:buNone/>
+              <a:defRPr/>
+            </a:pPr>
+            <a:r>
+              <a:rPr xmlns:mc="http://schemas.openxmlformats.org/markup-compatibility/2006" xmlns:hp="http://schemas.haansoft.com/office/presentation/8.0" kumimoji="0" lang="en-US" altLang="ko-KR" sz="2000" b="1" i="0" u="none" strike="noStrike" kern="1200" cap="none" spc="0" normalizeH="0" baseline="0" mc:Ignorable="hp" hp:hslEmbossed="0">
+                <a:solidFill>
+                  <a:srgbClr val="ffffff"/>
+                </a:solidFill>
+                <a:latin typeface="Calibri"/>
+                <a:ea typeface="맑은 고딕"/>
+                <a:cs typeface="Times New Roman"/>
+              </a:rPr>
+              <a:t>D</a:t>
+            </a:r>
+            <a:endParaRPr xmlns:mc="http://schemas.openxmlformats.org/markup-compatibility/2006" xmlns:hp="http://schemas.haansoft.com/office/presentation/8.0" kumimoji="0" lang="en-US" altLang="ko-KR" sz="2000" b="1" i="0" u="none" strike="noStrike" kern="1200" cap="none" spc="0" normalizeH="0" baseline="0" mc:Ignorable="hp" hp:hslEmbossed="0">
+              <a:solidFill>
+                <a:srgbClr val="ffffff"/>
+              </a:solidFill>
+              <a:latin typeface="Calibri"/>
+              <a:ea typeface="맑은 고딕"/>
+              <a:cs typeface="Times New Roman"/>
+            </a:endParaRPr>
+          </a:p>
+        </p:txBody>
+      </p:sp>
+      <p:sp>
+        <p:nvSpPr>
+          <p:cNvPr id="8" name=""/>
+          <p:cNvSpPr/>
+          <p:nvPr/>
+        </p:nvSpPr>
+        <p:spPr>
+          <a:xfrm>
+            <a:off x="1668826" y="2368739"/>
+            <a:ext cx="545521" cy="574486"/>
+          </a:xfrm>
+          <a:prstGeom prst="ellipse">
+            <a:avLst/>
+          </a:prstGeom>
+          <a:solidFill>
+            <a:srgbClr val="6182d6">
+              <a:alpha val="100000"/>
+            </a:srgbClr>
+          </a:solidFill>
+          <a:ln w="19050" cap="flat" cmpd="sng" algn="ctr">
+            <a:solidFill>
+              <a:srgbClr val="2e3e67">
+                <a:alpha val="100000"/>
+              </a:srgbClr>
+            </a:solidFill>
+            <a:prstDash val="solid"/>
+          </a:ln>
+        </p:spPr>
+        <p:txBody>
+          <a:bodyPr anchor="ctr"/>
+          <a:p>
+            <a:pPr marL="0" indent="0" algn="ctr" defTabSz="914400" rtl="0" eaLnBrk="1" latinLnBrk="1" hangingPunct="1">
+              <a:lnSpc>
+                <a:spcPct val="100000"/>
+              </a:lnSpc>
+              <a:spcBef>
+                <a:spcPct val="0"/>
+              </a:spcBef>
+              <a:spcAft>
+                <a:spcPts val="0"/>
+              </a:spcAft>
+              <a:buNone/>
+              <a:defRPr/>
+            </a:pPr>
+            <a:r>
+              <a:rPr xmlns:mc="http://schemas.openxmlformats.org/markup-compatibility/2006" xmlns:hp="http://schemas.haansoft.com/office/presentation/8.0" kumimoji="0" lang="en-US" altLang="ko-KR" sz="2000" b="1" i="0" u="none" strike="noStrike" kern="1200" cap="none" spc="0" normalizeH="0" baseline="0" mc:Ignorable="hp" hp:hslEmbossed="0">
+                <a:solidFill>
+                  <a:srgbClr val="ffffff"/>
+                </a:solidFill>
+                <a:latin typeface="Calibri"/>
+                <a:ea typeface="맑은 고딕"/>
+                <a:cs typeface="Times New Roman"/>
+              </a:rPr>
+              <a:t>E</a:t>
+            </a:r>
+            <a:endParaRPr xmlns:mc="http://schemas.openxmlformats.org/markup-compatibility/2006" xmlns:hp="http://schemas.haansoft.com/office/presentation/8.0" kumimoji="0" lang="en-US" altLang="ko-KR" sz="2000" b="1" i="0" u="none" strike="noStrike" kern="1200" cap="none" spc="0" normalizeH="0" baseline="0" mc:Ignorable="hp" hp:hslEmbossed="0">
+              <a:solidFill>
+                <a:srgbClr val="ffffff"/>
+              </a:solidFill>
+              <a:latin typeface="Calibri"/>
+              <a:ea typeface="맑은 고딕"/>
+              <a:cs typeface="Times New Roman"/>
+            </a:endParaRPr>
+          </a:p>
+        </p:txBody>
+      </p:sp>
+      <p:sp>
+        <p:nvSpPr>
+          <p:cNvPr id="9" name=""/>
+          <p:cNvSpPr/>
+          <p:nvPr/>
+        </p:nvSpPr>
+        <p:spPr>
+          <a:xfrm>
+            <a:off x="2448489" y="2368740"/>
+            <a:ext cx="545521" cy="574486"/>
+          </a:xfrm>
+          <a:prstGeom prst="ellipse">
+            <a:avLst/>
+          </a:prstGeom>
+          <a:solidFill>
+            <a:srgbClr val="6182d6">
+              <a:alpha val="100000"/>
+            </a:srgbClr>
+          </a:solidFill>
+          <a:ln w="19050" cap="flat" cmpd="sng" algn="ctr">
+            <a:solidFill>
+              <a:srgbClr val="2e3e67">
+                <a:alpha val="100000"/>
+              </a:srgbClr>
+            </a:solidFill>
+            <a:prstDash val="solid"/>
+          </a:ln>
+        </p:spPr>
+        <p:txBody>
+          <a:bodyPr anchor="ctr"/>
+          <a:p>
+            <a:pPr marL="0" indent="0" algn="ctr" defTabSz="914400" rtl="0" eaLnBrk="1" latinLnBrk="1" hangingPunct="1">
+              <a:lnSpc>
+                <a:spcPct val="100000"/>
+              </a:lnSpc>
+              <a:spcBef>
+                <a:spcPct val="0"/>
+              </a:spcBef>
+              <a:spcAft>
+                <a:spcPts val="0"/>
+              </a:spcAft>
+              <a:buNone/>
+              <a:defRPr/>
+            </a:pPr>
+            <a:r>
+              <a:rPr xmlns:mc="http://schemas.openxmlformats.org/markup-compatibility/2006" xmlns:hp="http://schemas.haansoft.com/office/presentation/8.0" kumimoji="0" lang="en-US" altLang="ko-KR" sz="2000" b="1" i="0" u="none" strike="noStrike" kern="1200" cap="none" spc="0" normalizeH="0" baseline="0" mc:Ignorable="hp" hp:hslEmbossed="0">
+                <a:solidFill>
+                  <a:srgbClr val="ffffff"/>
+                </a:solidFill>
+                <a:latin typeface="Calibri"/>
+                <a:ea typeface="맑은 고딕"/>
+                <a:cs typeface="Times New Roman"/>
+              </a:rPr>
+              <a:t>F</a:t>
+            </a:r>
+            <a:endParaRPr xmlns:mc="http://schemas.openxmlformats.org/markup-compatibility/2006" xmlns:hp="http://schemas.haansoft.com/office/presentation/8.0" kumimoji="0" lang="en-US" altLang="ko-KR" sz="2000" b="1" i="0" u="none" strike="noStrike" kern="1200" cap="none" spc="0" normalizeH="0" baseline="0" mc:Ignorable="hp" hp:hslEmbossed="0">
+              <a:solidFill>
+                <a:srgbClr val="ffffff"/>
+              </a:solidFill>
+              <a:latin typeface="Calibri"/>
+              <a:ea typeface="맑은 고딕"/>
+              <a:cs typeface="Times New Roman"/>
+            </a:endParaRPr>
+          </a:p>
+        </p:txBody>
+      </p:sp>
+      <p:sp>
+        <p:nvSpPr>
+          <p:cNvPr id="10" name=""/>
+          <p:cNvSpPr/>
+          <p:nvPr/>
+        </p:nvSpPr>
+        <p:spPr>
+          <a:xfrm>
+            <a:off x="3539531" y="2368740"/>
+            <a:ext cx="545521" cy="574486"/>
+          </a:xfrm>
+          <a:prstGeom prst="ellipse">
+            <a:avLst/>
+          </a:prstGeom>
+          <a:solidFill>
+            <a:srgbClr val="6182d6">
+              <a:alpha val="100000"/>
+            </a:srgbClr>
+          </a:solidFill>
+          <a:ln w="19050" cap="flat" cmpd="sng" algn="ctr">
+            <a:solidFill>
+              <a:srgbClr val="2e3e67">
+                <a:alpha val="100000"/>
+              </a:srgbClr>
+            </a:solidFill>
+            <a:prstDash val="solid"/>
+          </a:ln>
+        </p:spPr>
+        <p:txBody>
+          <a:bodyPr anchor="ctr"/>
+          <a:p>
+            <a:pPr marL="0" indent="0" algn="ctr" defTabSz="914400" rtl="0" eaLnBrk="1" latinLnBrk="1" hangingPunct="1">
+              <a:lnSpc>
+                <a:spcPct val="100000"/>
+              </a:lnSpc>
+              <a:spcBef>
+                <a:spcPct val="0"/>
+              </a:spcBef>
+              <a:spcAft>
+                <a:spcPts val="0"/>
+              </a:spcAft>
+              <a:buNone/>
+              <a:defRPr/>
+            </a:pPr>
+            <a:r>
+              <a:rPr xmlns:mc="http://schemas.openxmlformats.org/markup-compatibility/2006" xmlns:hp="http://schemas.haansoft.com/office/presentation/8.0" kumimoji="0" lang="en-US" altLang="ko-KR" sz="2000" b="1" i="0" u="none" strike="noStrike" kern="1200" cap="none" spc="0" normalizeH="0" baseline="0" mc:Ignorable="hp" hp:hslEmbossed="0">
+                <a:solidFill>
+                  <a:srgbClr val="ffffff"/>
+                </a:solidFill>
+                <a:latin typeface="Calibri"/>
+                <a:ea typeface="맑은 고딕"/>
+                <a:cs typeface="Times New Roman"/>
+              </a:rPr>
+              <a:t>G</a:t>
+            </a:r>
+            <a:endParaRPr xmlns:mc="http://schemas.openxmlformats.org/markup-compatibility/2006" xmlns:hp="http://schemas.haansoft.com/office/presentation/8.0" kumimoji="0" lang="en-US" altLang="ko-KR" sz="2000" b="1" i="0" u="none" strike="noStrike" kern="1200" cap="none" spc="0" normalizeH="0" baseline="0" mc:Ignorable="hp" hp:hslEmbossed="0">
+              <a:solidFill>
+                <a:srgbClr val="ffffff"/>
+              </a:solidFill>
+              <a:latin typeface="Calibri"/>
+              <a:ea typeface="맑은 고딕"/>
+              <a:cs typeface="Times New Roman"/>
+            </a:endParaRPr>
+          </a:p>
+        </p:txBody>
+      </p:sp>
+      <p:cxnSp>
+        <p:nvCxnSpPr>
+          <p:cNvPr id="11" name=""/>
+          <p:cNvCxnSpPr>
+            <a:stCxn id="4" idx="3"/>
+            <a:endCxn id="5" idx="0"/>
+          </p:cNvCxnSpPr>
+          <p:nvPr/>
+        </p:nvCxnSpPr>
+        <p:spPr>
+          <a:xfrm rot="10800000" flipV="1">
+            <a:off x="1396066" y="1003218"/>
+            <a:ext cx="779662" cy="461726"/>
+          </a:xfrm>
+          <a:prstGeom prst="line">
+            <a:avLst/>
+          </a:prstGeom>
+          <a:noFill/>
+          <a:ln w="38100" cap="flat" cmpd="sng" algn="ctr">
+            <a:solidFill>
+              <a:srgbClr val="000000">
+                <a:alpha val="100000"/>
+              </a:srgbClr>
+            </a:solidFill>
+            <a:prstDash val="solid"/>
+          </a:ln>
+        </p:spPr>
+      </p:cxnSp>
+      <p:cxnSp>
+        <p:nvCxnSpPr>
+          <p:cNvPr id="12" name=""/>
+          <p:cNvCxnSpPr>
+            <a:stCxn id="6" idx="0"/>
+            <a:endCxn id="4" idx="5"/>
+          </p:cNvCxnSpPr>
+          <p:nvPr/>
+        </p:nvCxnSpPr>
+        <p:spPr>
+          <a:xfrm rot="10800000">
+            <a:off x="2561470" y="1003218"/>
+            <a:ext cx="705300" cy="461726"/>
+          </a:xfrm>
+          <a:prstGeom prst="line">
+            <a:avLst/>
+          </a:prstGeom>
+          <a:noFill/>
+          <a:ln w="38100" cap="flat" cmpd="sng" algn="ctr">
+            <a:solidFill>
+              <a:srgbClr val="000000">
+                <a:alpha val="100000"/>
+              </a:srgbClr>
+            </a:solidFill>
+            <a:prstDash val="solid"/>
+          </a:ln>
+        </p:spPr>
+      </p:cxnSp>
+      <p:cxnSp>
+        <p:nvCxnSpPr>
+          <p:cNvPr id="13" name=""/>
+          <p:cNvCxnSpPr>
+            <a:stCxn id="9" idx="0"/>
+            <a:endCxn id="6" idx="3"/>
+          </p:cNvCxnSpPr>
+          <p:nvPr/>
+        </p:nvCxnSpPr>
+        <p:spPr>
+          <a:xfrm rot="5400000" flipH="1" flipV="1">
+            <a:off x="2690855" y="1985695"/>
+            <a:ext cx="413441" cy="352650"/>
+          </a:xfrm>
+          <a:prstGeom prst="line">
+            <a:avLst/>
+          </a:prstGeom>
+          <a:noFill/>
+          <a:ln w="38100" cap="flat" cmpd="sng" algn="ctr">
+            <a:solidFill>
+              <a:srgbClr val="000000">
+                <a:alpha val="100000"/>
+              </a:srgbClr>
+            </a:solidFill>
+            <a:prstDash val="solid"/>
+          </a:ln>
+        </p:spPr>
+      </p:cxnSp>
+      <p:cxnSp>
+        <p:nvCxnSpPr>
+          <p:cNvPr id="14" name=""/>
+          <p:cNvCxnSpPr>
+            <a:stCxn id="8" idx="0"/>
+            <a:endCxn id="5" idx="5"/>
+          </p:cNvCxnSpPr>
+          <p:nvPr/>
+        </p:nvCxnSpPr>
+        <p:spPr>
+          <a:xfrm rot="16200000" flipV="1">
+            <a:off x="1558542" y="1985694"/>
+            <a:ext cx="413440" cy="352650"/>
+          </a:xfrm>
+          <a:prstGeom prst="line">
+            <a:avLst/>
+          </a:prstGeom>
+          <a:noFill/>
+          <a:ln w="38100" cap="flat" cmpd="sng" algn="ctr">
+            <a:solidFill>
+              <a:srgbClr val="000000">
+                <a:alpha val="100000"/>
+              </a:srgbClr>
+            </a:solidFill>
+            <a:prstDash val="solid"/>
+          </a:ln>
+        </p:spPr>
+      </p:cxnSp>
+      <p:cxnSp>
+        <p:nvCxnSpPr>
+          <p:cNvPr id="15" name=""/>
+          <p:cNvCxnSpPr>
+            <a:stCxn id="10" idx="0"/>
+            <a:endCxn id="6" idx="5"/>
+          </p:cNvCxnSpPr>
+          <p:nvPr/>
+        </p:nvCxnSpPr>
+        <p:spPr>
+          <a:xfrm rot="16200000" flipV="1">
+            <a:off x="3429246" y="1985695"/>
+            <a:ext cx="413441" cy="352650"/>
+          </a:xfrm>
+          <a:prstGeom prst="line">
+            <a:avLst/>
+          </a:prstGeom>
+          <a:noFill/>
+          <a:ln w="38100" cap="flat" cmpd="sng" algn="ctr">
+            <a:solidFill>
+              <a:srgbClr val="000000">
+                <a:alpha val="100000"/>
+              </a:srgbClr>
+            </a:solidFill>
+            <a:prstDash val="solid"/>
+          </a:ln>
+        </p:spPr>
+      </p:cxnSp>
+      <p:cxnSp>
+        <p:nvCxnSpPr>
+          <p:cNvPr id="16" name=""/>
+          <p:cNvCxnSpPr>
+            <a:stCxn id="5" idx="3"/>
+            <a:endCxn id="7" idx="0"/>
+          </p:cNvCxnSpPr>
+          <p:nvPr/>
+        </p:nvCxnSpPr>
+        <p:spPr>
+          <a:xfrm rot="5400000">
+            <a:off x="820150" y="1985694"/>
+            <a:ext cx="413440" cy="352650"/>
+          </a:xfrm>
+          <a:prstGeom prst="line">
+            <a:avLst/>
+          </a:prstGeom>
+          <a:noFill/>
+          <a:ln w="38100" cap="flat" cmpd="sng" algn="ctr">
+            <a:solidFill>
+              <a:srgbClr val="000000">
+                <a:alpha val="100000"/>
+              </a:srgbClr>
+            </a:solidFill>
+            <a:prstDash val="solid"/>
+          </a:ln>
+        </p:spPr>
+      </p:cxnSp>
+      <p:sp>
+        <p:nvSpPr>
+          <p:cNvPr id="18" name=""/>
+          <p:cNvSpPr/>
+          <p:nvPr/>
+        </p:nvSpPr>
+        <p:spPr>
+          <a:xfrm>
+            <a:off x="240538" y="3196695"/>
+            <a:ext cx="545521" cy="574486"/>
+          </a:xfrm>
+          <a:prstGeom prst="ellipse">
+            <a:avLst/>
+          </a:prstGeom>
+          <a:solidFill>
+            <a:srgbClr val="6182d6">
+              <a:alpha val="100000"/>
+            </a:srgbClr>
+          </a:solidFill>
+          <a:ln w="19050" cap="flat" cmpd="sng" algn="ctr">
+            <a:solidFill>
+              <a:srgbClr val="2e3e67">
+                <a:alpha val="100000"/>
+              </a:srgbClr>
+            </a:solidFill>
+            <a:prstDash val="solid"/>
+          </a:ln>
+        </p:spPr>
+        <p:txBody>
+          <a:bodyPr anchor="ctr"/>
+          <a:p>
+            <a:pPr marL="0" indent="0" algn="ctr" defTabSz="914400" rtl="0" eaLnBrk="1" latinLnBrk="1" hangingPunct="1">
+              <a:lnSpc>
+                <a:spcPct val="100000"/>
+              </a:lnSpc>
+              <a:spcBef>
+                <a:spcPct val="0"/>
+              </a:spcBef>
+              <a:spcAft>
+                <a:spcPts val="0"/>
+              </a:spcAft>
+              <a:buNone/>
+              <a:defRPr/>
+            </a:pPr>
+            <a:r>
+              <a:rPr xmlns:mc="http://schemas.openxmlformats.org/markup-compatibility/2006" xmlns:hp="http://schemas.haansoft.com/office/presentation/8.0" kumimoji="0" lang="en-US" altLang="ko-KR" sz="2000" b="1" i="0" u="none" strike="noStrike" kern="1200" cap="none" spc="0" normalizeH="0" baseline="0" mc:Ignorable="hp" hp:hslEmbossed="0">
+                <a:solidFill>
+                  <a:srgbClr val="ffffff"/>
+                </a:solidFill>
+                <a:latin typeface="Calibri"/>
+                <a:ea typeface="맑은 고딕"/>
+                <a:cs typeface="Times New Roman"/>
+              </a:rPr>
+              <a:t>H</a:t>
+            </a:r>
+            <a:endParaRPr xmlns:mc="http://schemas.openxmlformats.org/markup-compatibility/2006" xmlns:hp="http://schemas.haansoft.com/office/presentation/8.0" kumimoji="0" lang="en-US" altLang="ko-KR" sz="2000" b="1" i="0" u="none" strike="noStrike" kern="1200" cap="none" spc="0" normalizeH="0" baseline="0" mc:Ignorable="hp" hp:hslEmbossed="0">
+              <a:solidFill>
+                <a:srgbClr val="ffffff"/>
+              </a:solidFill>
+              <a:latin typeface="Calibri"/>
+              <a:ea typeface="맑은 고딕"/>
+              <a:cs typeface="Times New Roman"/>
+            </a:endParaRPr>
+          </a:p>
+        </p:txBody>
+      </p:sp>
+      <p:cxnSp>
+        <p:nvCxnSpPr>
+          <p:cNvPr id="19" name=""/>
+          <p:cNvCxnSpPr>
+            <a:stCxn id="18" idx="0"/>
+            <a:endCxn id="7" idx="3"/>
+          </p:cNvCxnSpPr>
+          <p:nvPr/>
+        </p:nvCxnSpPr>
+        <p:spPr>
+          <a:xfrm rot="5400000" flipH="1" flipV="1">
+            <a:off x="416685" y="2955707"/>
+            <a:ext cx="337601" cy="144375"/>
+          </a:xfrm>
+          <a:prstGeom prst="line">
+            <a:avLst/>
+          </a:prstGeom>
+          <a:noFill/>
+          <a:ln w="38100" cap="flat" cmpd="sng" algn="ctr">
+            <a:solidFill>
+              <a:srgbClr val="000000">
+                <a:alpha val="100000"/>
+              </a:srgbClr>
+            </a:solidFill>
+            <a:prstDash val="solid"/>
+          </a:ln>
+        </p:spPr>
+      </p:cxnSp>
+      <p:sp>
+        <p:nvSpPr>
+          <p:cNvPr id="20" name=""/>
+          <p:cNvSpPr/>
+          <p:nvPr/>
+        </p:nvSpPr>
+        <p:spPr>
+          <a:xfrm>
+            <a:off x="850546" y="3196694"/>
+            <a:ext cx="545521" cy="574486"/>
+          </a:xfrm>
+          <a:prstGeom prst="ellipse">
+            <a:avLst/>
+          </a:prstGeom>
+          <a:solidFill>
+            <a:srgbClr val="6182d6">
+              <a:alpha val="100000"/>
+            </a:srgbClr>
+          </a:solidFill>
+          <a:ln w="19050" cap="flat" cmpd="sng" algn="ctr">
+            <a:solidFill>
+              <a:srgbClr val="2e3e67">
+                <a:alpha val="100000"/>
+              </a:srgbClr>
+            </a:solidFill>
+            <a:prstDash val="solid"/>
+          </a:ln>
+        </p:spPr>
+        <p:txBody>
+          <a:bodyPr anchor="ctr"/>
+          <a:p>
+            <a:pPr marL="0" indent="0" algn="ctr" defTabSz="914400" rtl="0" eaLnBrk="1" latinLnBrk="1" hangingPunct="1">
+              <a:lnSpc>
+                <a:spcPct val="100000"/>
+              </a:lnSpc>
+              <a:spcBef>
+                <a:spcPct val="0"/>
+              </a:spcBef>
+              <a:spcAft>
+                <a:spcPts val="0"/>
+              </a:spcAft>
+              <a:buNone/>
+              <a:defRPr/>
+            </a:pPr>
+            <a:r>
+              <a:rPr xmlns:mc="http://schemas.openxmlformats.org/markup-compatibility/2006" xmlns:hp="http://schemas.haansoft.com/office/presentation/8.0" kumimoji="0" lang="en-US" altLang="ko-KR" sz="2000" b="1" i="0" u="none" strike="noStrike" kern="1200" cap="none" spc="0" normalizeH="0" baseline="0" mc:Ignorable="hp" hp:hslEmbossed="0">
+                <a:solidFill>
+                  <a:srgbClr val="ffffff"/>
+                </a:solidFill>
+                <a:latin typeface="Calibri"/>
+                <a:ea typeface="맑은 고딕"/>
+                <a:cs typeface="Times New Roman"/>
+              </a:rPr>
+              <a:t>I</a:t>
+            </a:r>
+            <a:endParaRPr xmlns:mc="http://schemas.openxmlformats.org/markup-compatibility/2006" xmlns:hp="http://schemas.haansoft.com/office/presentation/8.0" kumimoji="0" lang="en-US" altLang="ko-KR" sz="2000" b="1" i="0" u="none" strike="noStrike" kern="1200" cap="none" spc="0" normalizeH="0" baseline="0" mc:Ignorable="hp" hp:hslEmbossed="0">
+              <a:solidFill>
+                <a:srgbClr val="ffffff"/>
+              </a:solidFill>
+              <a:latin typeface="Calibri"/>
+              <a:ea typeface="맑은 고딕"/>
+              <a:cs typeface="Times New Roman"/>
+            </a:endParaRPr>
+          </a:p>
+        </p:txBody>
+      </p:sp>
+      <p:cxnSp>
+        <p:nvCxnSpPr>
+          <p:cNvPr id="21" name=""/>
+          <p:cNvCxnSpPr>
+            <a:stCxn id="20" idx="0"/>
+            <a:endCxn id="7" idx="5"/>
+          </p:cNvCxnSpPr>
+          <p:nvPr/>
+        </p:nvCxnSpPr>
+        <p:spPr>
+          <a:xfrm rot="16200000" flipV="1">
+            <a:off x="914561" y="2987949"/>
+            <a:ext cx="337600" cy="79890"/>
+          </a:xfrm>
+          <a:prstGeom prst="line">
+            <a:avLst/>
+          </a:prstGeom>
+          <a:noFill/>
+          <a:ln w="38100" cap="flat" cmpd="sng" algn="ctr">
+            <a:solidFill>
+              <a:srgbClr val="000000">
+                <a:alpha val="100000"/>
+              </a:srgbClr>
+            </a:solidFill>
+            <a:prstDash val="solid"/>
+          </a:ln>
+        </p:spPr>
+      </p:cxnSp>
+      <p:sp>
+        <p:nvSpPr>
+          <p:cNvPr id="22" name=""/>
+          <p:cNvSpPr/>
+          <p:nvPr/>
+        </p:nvSpPr>
+        <p:spPr>
+          <a:xfrm>
+            <a:off x="1436011" y="3196695"/>
+            <a:ext cx="545521" cy="574486"/>
+          </a:xfrm>
+          <a:prstGeom prst="ellipse">
+            <a:avLst/>
+          </a:prstGeom>
+          <a:solidFill>
+            <a:srgbClr val="6182d6">
+              <a:alpha val="100000"/>
+            </a:srgbClr>
+          </a:solidFill>
+          <a:ln w="19050" cap="flat" cmpd="sng" algn="ctr">
+            <a:solidFill>
+              <a:srgbClr val="2e3e67">
+                <a:alpha val="100000"/>
+              </a:srgbClr>
+            </a:solidFill>
+            <a:prstDash val="solid"/>
+          </a:ln>
+        </p:spPr>
+        <p:txBody>
+          <a:bodyPr anchor="ctr"/>
+          <a:p>
+            <a:pPr marL="0" indent="0" algn="ctr" defTabSz="914400" rtl="0" eaLnBrk="1" latinLnBrk="1" hangingPunct="1">
+              <a:lnSpc>
+                <a:spcPct val="100000"/>
+              </a:lnSpc>
+              <a:spcBef>
+                <a:spcPct val="0"/>
+              </a:spcBef>
+              <a:spcAft>
+                <a:spcPts val="0"/>
+              </a:spcAft>
+              <a:buNone/>
+              <a:defRPr/>
+            </a:pPr>
+            <a:r>
+              <a:rPr xmlns:mc="http://schemas.openxmlformats.org/markup-compatibility/2006" xmlns:hp="http://schemas.haansoft.com/office/presentation/8.0" kumimoji="0" lang="en-US" altLang="ko-KR" sz="2000" b="1" i="0" u="none" strike="noStrike" kern="1200" cap="none" spc="0" normalizeH="0" baseline="0" mc:Ignorable="hp" hp:hslEmbossed="0">
+                <a:solidFill>
+                  <a:srgbClr val="ffffff"/>
+                </a:solidFill>
+                <a:latin typeface="Calibri"/>
+                <a:ea typeface="맑은 고딕"/>
+                <a:cs typeface="Times New Roman"/>
+              </a:rPr>
+              <a:t>J</a:t>
+            </a:r>
+            <a:endParaRPr xmlns:mc="http://schemas.openxmlformats.org/markup-compatibility/2006" xmlns:hp="http://schemas.haansoft.com/office/presentation/8.0" kumimoji="0" lang="en-US" altLang="ko-KR" sz="2000" b="1" i="0" u="none" strike="noStrike" kern="1200" cap="none" spc="0" normalizeH="0" baseline="0" mc:Ignorable="hp" hp:hslEmbossed="0">
+              <a:solidFill>
+                <a:srgbClr val="ffffff"/>
+              </a:solidFill>
+              <a:latin typeface="Calibri"/>
+              <a:ea typeface="맑은 고딕"/>
+              <a:cs typeface="Times New Roman"/>
+            </a:endParaRPr>
+          </a:p>
+        </p:txBody>
+      </p:sp>
+      <p:cxnSp>
+        <p:nvCxnSpPr>
+          <p:cNvPr id="23" name=""/>
+          <p:cNvCxnSpPr>
+            <a:stCxn id="22" idx="0"/>
+            <a:endCxn id="8" idx="3"/>
+          </p:cNvCxnSpPr>
+          <p:nvPr/>
+        </p:nvCxnSpPr>
+        <p:spPr>
+          <a:xfrm rot="5400000" flipH="1" flipV="1">
+            <a:off x="1559943" y="3007922"/>
+            <a:ext cx="337601" cy="39944"/>
+          </a:xfrm>
+          <a:prstGeom prst="line">
+            <a:avLst/>
+          </a:prstGeom>
+          <a:noFill/>
+          <a:ln w="38100" cap="flat" cmpd="sng" algn="ctr">
+            <a:solidFill>
+              <a:srgbClr val="000000">
+                <a:alpha val="100000"/>
+              </a:srgbClr>
+            </a:solidFill>
+            <a:prstDash val="solid"/>
+          </a:ln>
+        </p:spPr>
+      </p:cxnSp>
+      <p:sp>
+        <p:nvSpPr>
+          <p:cNvPr id="24" name=""/>
+          <p:cNvSpPr/>
+          <p:nvPr/>
+        </p:nvSpPr>
+        <p:spPr>
+          <a:xfrm>
+            <a:off x="5905500" y="512864"/>
+            <a:ext cx="545521" cy="574486"/>
+          </a:xfrm>
+          <a:prstGeom prst="ellipse">
+            <a:avLst/>
+          </a:prstGeom>
+          <a:solidFill>
+            <a:srgbClr val="6182d6">
+              <a:alpha val="100000"/>
+            </a:srgbClr>
+          </a:solidFill>
+          <a:ln w="19050" cap="flat" cmpd="sng" algn="ctr">
+            <a:solidFill>
+              <a:srgbClr val="2e3e67">
+                <a:alpha val="100000"/>
+              </a:srgbClr>
+            </a:solidFill>
+            <a:prstDash val="solid"/>
+          </a:ln>
+        </p:spPr>
+        <p:txBody>
+          <a:bodyPr anchor="ctr"/>
+          <a:p>
+            <a:pPr marL="0" indent="0" algn="ctr" defTabSz="914400" rtl="0" eaLnBrk="1" latinLnBrk="1" hangingPunct="1">
+              <a:lnSpc>
+                <a:spcPct val="100000"/>
+              </a:lnSpc>
+              <a:spcBef>
+                <a:spcPct val="0"/>
+              </a:spcBef>
+              <a:spcAft>
+                <a:spcPts val="0"/>
+              </a:spcAft>
+              <a:buNone/>
+              <a:defRPr/>
+            </a:pPr>
+            <a:r>
+              <a:rPr xmlns:mc="http://schemas.openxmlformats.org/markup-compatibility/2006" xmlns:hp="http://schemas.haansoft.com/office/presentation/8.0" kumimoji="0" lang="en-US" altLang="ko-KR" sz="2000" b="1" i="0" u="none" strike="noStrike" kern="1200" cap="none" spc="0" normalizeH="0" baseline="0" mc:Ignorable="hp" hp:hslEmbossed="0">
+                <a:solidFill>
+                  <a:srgbClr val="ffffff"/>
+                </a:solidFill>
+                <a:latin typeface="Calibri"/>
+                <a:ea typeface="맑은 고딕"/>
+                <a:cs typeface="Times New Roman"/>
+              </a:rPr>
+              <a:t>A</a:t>
+            </a:r>
+            <a:endParaRPr xmlns:mc="http://schemas.openxmlformats.org/markup-compatibility/2006" xmlns:hp="http://schemas.haansoft.com/office/presentation/8.0" kumimoji="0" lang="en-US" altLang="ko-KR" sz="2000" b="1" i="0" u="none" strike="noStrike" kern="1200" cap="none" spc="0" normalizeH="0" baseline="0" mc:Ignorable="hp" hp:hslEmbossed="0">
+              <a:solidFill>
+                <a:srgbClr val="ffffff"/>
+              </a:solidFill>
+              <a:latin typeface="Calibri"/>
+              <a:ea typeface="맑은 고딕"/>
+              <a:cs typeface="Times New Roman"/>
+            </a:endParaRPr>
+          </a:p>
+        </p:txBody>
+      </p:sp>
+      <p:sp>
+        <p:nvSpPr>
+          <p:cNvPr id="25" name=""/>
+          <p:cNvSpPr/>
+          <p:nvPr/>
+        </p:nvSpPr>
+        <p:spPr>
+          <a:xfrm>
+            <a:off x="4932967" y="1464945"/>
+            <a:ext cx="545521" cy="574486"/>
+          </a:xfrm>
+          <a:prstGeom prst="ellipse">
+            <a:avLst/>
+          </a:prstGeom>
+          <a:solidFill>
+            <a:srgbClr val="6182d6">
+              <a:alpha val="100000"/>
+            </a:srgbClr>
+          </a:solidFill>
+          <a:ln w="19050" cap="flat" cmpd="sng" algn="ctr">
+            <a:solidFill>
+              <a:srgbClr val="2e3e67">
+                <a:alpha val="100000"/>
+              </a:srgbClr>
+            </a:solidFill>
+            <a:prstDash val="solid"/>
+          </a:ln>
+        </p:spPr>
+        <p:txBody>
+          <a:bodyPr anchor="ctr"/>
+          <a:p>
+            <a:pPr marL="0" indent="0" algn="ctr" defTabSz="914400" rtl="0" eaLnBrk="1" latinLnBrk="1" hangingPunct="1">
+              <a:lnSpc>
+                <a:spcPct val="100000"/>
+              </a:lnSpc>
+              <a:spcBef>
+                <a:spcPct val="0"/>
+              </a:spcBef>
+              <a:spcAft>
+                <a:spcPts val="0"/>
+              </a:spcAft>
+              <a:buNone/>
+              <a:defRPr/>
+            </a:pPr>
+            <a:r>
+              <a:rPr xmlns:mc="http://schemas.openxmlformats.org/markup-compatibility/2006" xmlns:hp="http://schemas.haansoft.com/office/presentation/8.0" kumimoji="0" lang="en-US" altLang="ko-KR" sz="2000" b="1" i="0" u="none" strike="noStrike" kern="1200" cap="none" spc="0" normalizeH="0" baseline="0" mc:Ignorable="hp" hp:hslEmbossed="0">
+                <a:solidFill>
+                  <a:srgbClr val="ffffff"/>
+                </a:solidFill>
+                <a:latin typeface="Calibri"/>
+                <a:ea typeface="맑은 고딕"/>
+                <a:cs typeface="Times New Roman"/>
+              </a:rPr>
+              <a:t>B</a:t>
+            </a:r>
+            <a:endParaRPr xmlns:mc="http://schemas.openxmlformats.org/markup-compatibility/2006" xmlns:hp="http://schemas.haansoft.com/office/presentation/8.0" kumimoji="0" lang="en-US" altLang="ko-KR" sz="2000" b="1" i="0" u="none" strike="noStrike" kern="1200" cap="none" spc="0" normalizeH="0" baseline="0" mc:Ignorable="hp" hp:hslEmbossed="0">
+              <a:solidFill>
+                <a:srgbClr val="ffffff"/>
+              </a:solidFill>
+              <a:latin typeface="Calibri"/>
+              <a:ea typeface="맑은 고딕"/>
+              <a:cs typeface="Times New Roman"/>
+            </a:endParaRPr>
+          </a:p>
+        </p:txBody>
+      </p:sp>
+      <p:sp>
+        <p:nvSpPr>
+          <p:cNvPr id="26" name=""/>
+          <p:cNvSpPr/>
+          <p:nvPr/>
+        </p:nvSpPr>
+        <p:spPr>
+          <a:xfrm>
+            <a:off x="6803672" y="1464945"/>
+            <a:ext cx="545521" cy="574486"/>
+          </a:xfrm>
+          <a:prstGeom prst="ellipse">
+            <a:avLst/>
+          </a:prstGeom>
+          <a:solidFill>
+            <a:srgbClr val="6182d6">
+              <a:alpha val="100000"/>
+            </a:srgbClr>
+          </a:solidFill>
+          <a:ln w="19050" cap="flat" cmpd="sng" algn="ctr">
+            <a:solidFill>
+              <a:srgbClr val="2e3e67">
+                <a:alpha val="100000"/>
+              </a:srgbClr>
+            </a:solidFill>
+            <a:prstDash val="solid"/>
+          </a:ln>
+        </p:spPr>
+        <p:txBody>
+          <a:bodyPr anchor="ctr"/>
+          <a:p>
+            <a:pPr marL="0" indent="0" algn="ctr" defTabSz="914400" rtl="0" eaLnBrk="1" latinLnBrk="1" hangingPunct="1">
+              <a:lnSpc>
+                <a:spcPct val="100000"/>
+              </a:lnSpc>
+              <a:spcBef>
+                <a:spcPct val="0"/>
+              </a:spcBef>
+              <a:spcAft>
+                <a:spcPts val="0"/>
+              </a:spcAft>
+              <a:buNone/>
+              <a:defRPr/>
+            </a:pPr>
+            <a:r>
+              <a:rPr xmlns:mc="http://schemas.openxmlformats.org/markup-compatibility/2006" xmlns:hp="http://schemas.haansoft.com/office/presentation/8.0" kumimoji="0" lang="en-US" altLang="ko-KR" sz="2000" b="1" i="0" u="none" strike="noStrike" kern="1200" cap="none" spc="0" normalizeH="0" baseline="0" mc:Ignorable="hp" hp:hslEmbossed="0">
+                <a:solidFill>
+                  <a:srgbClr val="ffffff"/>
+                </a:solidFill>
+                <a:latin typeface="Calibri"/>
+                <a:ea typeface="맑은 고딕"/>
+                <a:cs typeface="Times New Roman"/>
+              </a:rPr>
+              <a:t>C</a:t>
+            </a:r>
+            <a:endParaRPr xmlns:mc="http://schemas.openxmlformats.org/markup-compatibility/2006" xmlns:hp="http://schemas.haansoft.com/office/presentation/8.0" kumimoji="0" lang="en-US" altLang="ko-KR" sz="2000" b="1" i="0" u="none" strike="noStrike" kern="1200" cap="none" spc="0" normalizeH="0" baseline="0" mc:Ignorable="hp" hp:hslEmbossed="0">
+              <a:solidFill>
+                <a:srgbClr val="ffffff"/>
+              </a:solidFill>
+              <a:latin typeface="Calibri"/>
+              <a:ea typeface="맑은 고딕"/>
+              <a:cs typeface="Times New Roman"/>
+            </a:endParaRPr>
+          </a:p>
+        </p:txBody>
+      </p:sp>
+      <p:sp>
+        <p:nvSpPr>
+          <p:cNvPr id="27" name=""/>
+          <p:cNvSpPr/>
+          <p:nvPr/>
+        </p:nvSpPr>
+        <p:spPr>
+          <a:xfrm>
+            <a:off x="4387446" y="2368739"/>
+            <a:ext cx="545521" cy="574486"/>
+          </a:xfrm>
+          <a:prstGeom prst="ellipse">
+            <a:avLst/>
+          </a:prstGeom>
+          <a:solidFill>
+            <a:srgbClr val="6182d6">
+              <a:alpha val="100000"/>
+            </a:srgbClr>
+          </a:solidFill>
+          <a:ln w="19050" cap="flat" cmpd="sng" algn="ctr">
+            <a:solidFill>
+              <a:srgbClr val="2e3e67">
+                <a:alpha val="100000"/>
+              </a:srgbClr>
+            </a:solidFill>
+            <a:prstDash val="solid"/>
+          </a:ln>
+        </p:spPr>
+        <p:txBody>
+          <a:bodyPr anchor="ctr"/>
+          <a:p>
+            <a:pPr marL="0" indent="0" algn="ctr" defTabSz="914400" rtl="0" eaLnBrk="1" latinLnBrk="1" hangingPunct="1">
+              <a:lnSpc>
+                <a:spcPct val="100000"/>
+              </a:lnSpc>
+              <a:spcBef>
+                <a:spcPct val="0"/>
+              </a:spcBef>
+              <a:spcAft>
+                <a:spcPts val="0"/>
+              </a:spcAft>
+              <a:buNone/>
+              <a:defRPr/>
+            </a:pPr>
+            <a:r>
+              <a:rPr xmlns:mc="http://schemas.openxmlformats.org/markup-compatibility/2006" xmlns:hp="http://schemas.haansoft.com/office/presentation/8.0" kumimoji="0" lang="en-US" altLang="ko-KR" sz="2000" b="1" i="0" u="none" strike="noStrike" kern="1200" cap="none" spc="0" normalizeH="0" baseline="0" mc:Ignorable="hp" hp:hslEmbossed="0">
+                <a:solidFill>
+                  <a:srgbClr val="ffffff"/>
+                </a:solidFill>
+                <a:latin typeface="Calibri"/>
+                <a:ea typeface="맑은 고딕"/>
+                <a:cs typeface="Times New Roman"/>
+              </a:rPr>
+              <a:t>D</a:t>
+            </a:r>
+            <a:endParaRPr xmlns:mc="http://schemas.openxmlformats.org/markup-compatibility/2006" xmlns:hp="http://schemas.haansoft.com/office/presentation/8.0" kumimoji="0" lang="en-US" altLang="ko-KR" sz="2000" b="1" i="0" u="none" strike="noStrike" kern="1200" cap="none" spc="0" normalizeH="0" baseline="0" mc:Ignorable="hp" hp:hslEmbossed="0">
+              <a:solidFill>
+                <a:srgbClr val="ffffff"/>
+              </a:solidFill>
+              <a:latin typeface="Calibri"/>
+              <a:ea typeface="맑은 고딕"/>
+              <a:cs typeface="Times New Roman"/>
+            </a:endParaRPr>
+          </a:p>
+        </p:txBody>
+      </p:sp>
+      <p:sp>
+        <p:nvSpPr>
+          <p:cNvPr id="28" name=""/>
+          <p:cNvSpPr/>
+          <p:nvPr/>
+        </p:nvSpPr>
+        <p:spPr>
+          <a:xfrm>
+            <a:off x="5478488" y="2368739"/>
+            <a:ext cx="545521" cy="574486"/>
+          </a:xfrm>
+          <a:prstGeom prst="ellipse">
+            <a:avLst/>
+          </a:prstGeom>
+          <a:solidFill>
+            <a:srgbClr val="6182d6">
+              <a:alpha val="100000"/>
+            </a:srgbClr>
+          </a:solidFill>
+          <a:ln w="19050" cap="flat" cmpd="sng" algn="ctr">
+            <a:solidFill>
+              <a:srgbClr val="2e3e67">
+                <a:alpha val="100000"/>
+              </a:srgbClr>
+            </a:solidFill>
+            <a:prstDash val="solid"/>
+          </a:ln>
+        </p:spPr>
+        <p:txBody>
+          <a:bodyPr anchor="ctr"/>
+          <a:p>
+            <a:pPr marL="0" indent="0" algn="ctr" defTabSz="914400" rtl="0" eaLnBrk="1" latinLnBrk="1" hangingPunct="1">
+              <a:lnSpc>
+                <a:spcPct val="100000"/>
+              </a:lnSpc>
+              <a:spcBef>
+                <a:spcPct val="0"/>
+              </a:spcBef>
+              <a:spcAft>
+                <a:spcPts val="0"/>
+              </a:spcAft>
+              <a:buNone/>
+              <a:defRPr/>
+            </a:pPr>
+            <a:r>
+              <a:rPr xmlns:mc="http://schemas.openxmlformats.org/markup-compatibility/2006" xmlns:hp="http://schemas.haansoft.com/office/presentation/8.0" kumimoji="0" lang="en-US" altLang="ko-KR" sz="2000" b="1" i="0" u="none" strike="noStrike" kern="1200" cap="none" spc="0" normalizeH="0" baseline="0" mc:Ignorable="hp" hp:hslEmbossed="0">
+                <a:solidFill>
+                  <a:srgbClr val="ffffff"/>
+                </a:solidFill>
+                <a:latin typeface="Calibri"/>
+                <a:ea typeface="맑은 고딕"/>
+                <a:cs typeface="Times New Roman"/>
+              </a:rPr>
+              <a:t>E</a:t>
+            </a:r>
+            <a:endParaRPr xmlns:mc="http://schemas.openxmlformats.org/markup-compatibility/2006" xmlns:hp="http://schemas.haansoft.com/office/presentation/8.0" kumimoji="0" lang="en-US" altLang="ko-KR" sz="2000" b="1" i="0" u="none" strike="noStrike" kern="1200" cap="none" spc="0" normalizeH="0" baseline="0" mc:Ignorable="hp" hp:hslEmbossed="0">
+              <a:solidFill>
+                <a:srgbClr val="ffffff"/>
+              </a:solidFill>
+              <a:latin typeface="Calibri"/>
+              <a:ea typeface="맑은 고딕"/>
+              <a:cs typeface="Times New Roman"/>
+            </a:endParaRPr>
+          </a:p>
+        </p:txBody>
+      </p:sp>
+      <p:cxnSp>
+        <p:nvCxnSpPr>
+          <p:cNvPr id="31" name=""/>
+          <p:cNvCxnSpPr>
+            <a:stCxn id="24" idx="3"/>
+            <a:endCxn id="25" idx="0"/>
+          </p:cNvCxnSpPr>
+          <p:nvPr/>
+        </p:nvCxnSpPr>
+        <p:spPr>
+          <a:xfrm rot="10800000" flipV="1">
+            <a:off x="5205727" y="1003218"/>
+            <a:ext cx="779662" cy="461726"/>
+          </a:xfrm>
+          <a:prstGeom prst="line">
+            <a:avLst/>
+          </a:prstGeom>
+          <a:noFill/>
+          <a:ln w="38100" cap="flat" cmpd="sng" algn="ctr">
+            <a:solidFill>
+              <a:srgbClr val="000000">
+                <a:alpha val="100000"/>
+              </a:srgbClr>
+            </a:solidFill>
+            <a:prstDash val="solid"/>
+          </a:ln>
+        </p:spPr>
+      </p:cxnSp>
+      <p:cxnSp>
+        <p:nvCxnSpPr>
+          <p:cNvPr id="32" name=""/>
+          <p:cNvCxnSpPr>
+            <a:stCxn id="26" idx="0"/>
+            <a:endCxn id="24" idx="5"/>
+          </p:cNvCxnSpPr>
+          <p:nvPr/>
+        </p:nvCxnSpPr>
+        <p:spPr>
+          <a:xfrm rot="10800000">
+            <a:off x="6371132" y="1003218"/>
+            <a:ext cx="705300" cy="461726"/>
+          </a:xfrm>
+          <a:prstGeom prst="line">
+            <a:avLst/>
+          </a:prstGeom>
+          <a:noFill/>
+          <a:ln w="38100" cap="flat" cmpd="sng" algn="ctr">
+            <a:solidFill>
+              <a:srgbClr val="000000">
+                <a:alpha val="100000"/>
+              </a:srgbClr>
+            </a:solidFill>
+            <a:prstDash val="solid"/>
+          </a:ln>
+        </p:spPr>
+      </p:cxnSp>
+      <p:cxnSp>
+        <p:nvCxnSpPr>
+          <p:cNvPr id="34" name=""/>
+          <p:cNvCxnSpPr>
+            <a:stCxn id="28" idx="0"/>
+            <a:endCxn id="25" idx="5"/>
+          </p:cNvCxnSpPr>
+          <p:nvPr/>
+        </p:nvCxnSpPr>
+        <p:spPr>
+          <a:xfrm rot="16200000" flipV="1">
+            <a:off x="5368203" y="1985694"/>
+            <a:ext cx="413440" cy="352650"/>
+          </a:xfrm>
+          <a:prstGeom prst="line">
+            <a:avLst/>
+          </a:prstGeom>
+          <a:noFill/>
+          <a:ln w="38100" cap="flat" cmpd="sng" algn="ctr">
+            <a:solidFill>
+              <a:srgbClr val="000000">
+                <a:alpha val="100000"/>
+              </a:srgbClr>
+            </a:solidFill>
+            <a:prstDash val="solid"/>
+          </a:ln>
+        </p:spPr>
+      </p:cxnSp>
+      <p:cxnSp>
+        <p:nvCxnSpPr>
+          <p:cNvPr id="36" name=""/>
+          <p:cNvCxnSpPr>
+            <a:stCxn id="25" idx="3"/>
+            <a:endCxn id="27" idx="0"/>
+          </p:cNvCxnSpPr>
+          <p:nvPr/>
+        </p:nvCxnSpPr>
+        <p:spPr>
+          <a:xfrm rot="5400000">
+            <a:off x="4629812" y="1985694"/>
+            <a:ext cx="413440" cy="352650"/>
+          </a:xfrm>
+          <a:prstGeom prst="line">
+            <a:avLst/>
+          </a:prstGeom>
+          <a:noFill/>
+          <a:ln w="38100" cap="flat" cmpd="sng" algn="ctr">
+            <a:solidFill>
+              <a:srgbClr val="000000">
+                <a:alpha val="100000"/>
+              </a:srgbClr>
+            </a:solidFill>
+            <a:prstDash val="solid"/>
+          </a:ln>
+        </p:spPr>
+      </p:cxnSp>
+      <p:sp>
+        <p:nvSpPr>
+          <p:cNvPr id="42" name=""/>
+          <p:cNvSpPr/>
+          <p:nvPr/>
+        </p:nvSpPr>
+        <p:spPr>
+          <a:xfrm>
+            <a:off x="3804744" y="3537176"/>
+            <a:ext cx="545521" cy="574486"/>
+          </a:xfrm>
+          <a:prstGeom prst="ellipse">
+            <a:avLst/>
+          </a:prstGeom>
+          <a:solidFill>
+            <a:srgbClr val="6182d6">
+              <a:alpha val="100000"/>
+            </a:srgbClr>
+          </a:solidFill>
+          <a:ln w="19050" cap="flat" cmpd="sng" algn="ctr">
+            <a:solidFill>
+              <a:srgbClr val="2e3e67">
+                <a:alpha val="100000"/>
+              </a:srgbClr>
+            </a:solidFill>
+            <a:prstDash val="solid"/>
+          </a:ln>
+        </p:spPr>
+        <p:txBody>
+          <a:bodyPr anchor="ctr"/>
+          <a:p>
+            <a:pPr marL="0" indent="0" algn="ctr" defTabSz="914400" rtl="0" eaLnBrk="1" latinLnBrk="1" hangingPunct="1">
+              <a:lnSpc>
+                <a:spcPct val="100000"/>
+              </a:lnSpc>
+              <a:spcBef>
+                <a:spcPct val="0"/>
+              </a:spcBef>
+              <a:spcAft>
+                <a:spcPts val="0"/>
+              </a:spcAft>
+              <a:buNone/>
+              <a:defRPr/>
+            </a:pPr>
+            <a:r>
+              <a:rPr xmlns:mc="http://schemas.openxmlformats.org/markup-compatibility/2006" xmlns:hp="http://schemas.haansoft.com/office/presentation/8.0" kumimoji="0" lang="en-US" altLang="ko-KR" sz="2000" b="1" i="0" u="none" strike="noStrike" kern="1200" cap="none" spc="0" normalizeH="0" baseline="0" mc:Ignorable="hp" hp:hslEmbossed="0">
+                <a:solidFill>
+                  <a:srgbClr val="ffffff"/>
+                </a:solidFill>
+                <a:latin typeface="Calibri"/>
+                <a:ea typeface="맑은 고딕"/>
+                <a:cs typeface="Times New Roman"/>
+              </a:rPr>
+              <a:t>A</a:t>
+            </a:r>
+            <a:endParaRPr xmlns:mc="http://schemas.openxmlformats.org/markup-compatibility/2006" xmlns:hp="http://schemas.haansoft.com/office/presentation/8.0" kumimoji="0" lang="en-US" altLang="ko-KR" sz="2000" b="1" i="0" u="none" strike="noStrike" kern="1200" cap="none" spc="0" normalizeH="0" baseline="0" mc:Ignorable="hp" hp:hslEmbossed="0">
+              <a:solidFill>
+                <a:srgbClr val="ffffff"/>
+              </a:solidFill>
+              <a:latin typeface="Calibri"/>
+              <a:ea typeface="맑은 고딕"/>
+              <a:cs typeface="Times New Roman"/>
+            </a:endParaRPr>
+          </a:p>
+        </p:txBody>
+      </p:sp>
+      <p:sp>
+        <p:nvSpPr>
+          <p:cNvPr id="43" name=""/>
+          <p:cNvSpPr/>
+          <p:nvPr/>
+        </p:nvSpPr>
+        <p:spPr>
+          <a:xfrm>
+            <a:off x="2832210" y="4489257"/>
+            <a:ext cx="545521" cy="574486"/>
+          </a:xfrm>
+          <a:prstGeom prst="ellipse">
+            <a:avLst/>
+          </a:prstGeom>
+          <a:solidFill>
+            <a:srgbClr val="6182d6">
+              <a:alpha val="100000"/>
+            </a:srgbClr>
+          </a:solidFill>
+          <a:ln w="19050" cap="flat" cmpd="sng" algn="ctr">
+            <a:solidFill>
+              <a:srgbClr val="2e3e67">
+                <a:alpha val="100000"/>
+              </a:srgbClr>
+            </a:solidFill>
+            <a:prstDash val="solid"/>
+          </a:ln>
+        </p:spPr>
+        <p:txBody>
+          <a:bodyPr anchor="ctr"/>
+          <a:p>
+            <a:pPr marL="0" indent="0" algn="ctr" defTabSz="914400" rtl="0" eaLnBrk="1" latinLnBrk="1" hangingPunct="1">
+              <a:lnSpc>
+                <a:spcPct val="100000"/>
+              </a:lnSpc>
+              <a:spcBef>
+                <a:spcPct val="0"/>
+              </a:spcBef>
+              <a:spcAft>
+                <a:spcPts val="0"/>
+              </a:spcAft>
+              <a:buNone/>
+              <a:defRPr/>
+            </a:pPr>
+            <a:r>
+              <a:rPr xmlns:mc="http://schemas.openxmlformats.org/markup-compatibility/2006" xmlns:hp="http://schemas.haansoft.com/office/presentation/8.0" kumimoji="0" lang="en-US" altLang="ko-KR" sz="2000" b="1" i="0" u="none" strike="noStrike" kern="1200" cap="none" spc="0" normalizeH="0" baseline="0" mc:Ignorable="hp" hp:hslEmbossed="0">
+                <a:solidFill>
+                  <a:srgbClr val="ffffff"/>
+                </a:solidFill>
+                <a:latin typeface="Calibri"/>
+                <a:ea typeface="맑은 고딕"/>
+                <a:cs typeface="Times New Roman"/>
+              </a:rPr>
+              <a:t>B</a:t>
+            </a:r>
+            <a:endParaRPr xmlns:mc="http://schemas.openxmlformats.org/markup-compatibility/2006" xmlns:hp="http://schemas.haansoft.com/office/presentation/8.0" kumimoji="0" lang="en-US" altLang="ko-KR" sz="2000" b="1" i="0" u="none" strike="noStrike" kern="1200" cap="none" spc="0" normalizeH="0" baseline="0" mc:Ignorable="hp" hp:hslEmbossed="0">
+              <a:solidFill>
+                <a:srgbClr val="ffffff"/>
+              </a:solidFill>
+              <a:latin typeface="Calibri"/>
+              <a:ea typeface="맑은 고딕"/>
+              <a:cs typeface="Times New Roman"/>
+            </a:endParaRPr>
+          </a:p>
+        </p:txBody>
+      </p:sp>
+      <p:sp>
+        <p:nvSpPr>
+          <p:cNvPr id="44" name=""/>
+          <p:cNvSpPr/>
+          <p:nvPr/>
+        </p:nvSpPr>
+        <p:spPr>
+          <a:xfrm>
+            <a:off x="4702916" y="4489257"/>
+            <a:ext cx="545521" cy="574486"/>
+          </a:xfrm>
+          <a:prstGeom prst="ellipse">
+            <a:avLst/>
+          </a:prstGeom>
+          <a:solidFill>
+            <a:srgbClr val="6182d6">
+              <a:alpha val="100000"/>
+            </a:srgbClr>
+          </a:solidFill>
+          <a:ln w="19050" cap="flat" cmpd="sng" algn="ctr">
+            <a:solidFill>
+              <a:srgbClr val="2e3e67">
+                <a:alpha val="100000"/>
+              </a:srgbClr>
+            </a:solidFill>
+            <a:prstDash val="solid"/>
+          </a:ln>
+        </p:spPr>
+        <p:txBody>
+          <a:bodyPr anchor="ctr"/>
+          <a:p>
+            <a:pPr marL="0" indent="0" algn="ctr" defTabSz="914400" rtl="0" eaLnBrk="1" latinLnBrk="1" hangingPunct="1">
+              <a:lnSpc>
+                <a:spcPct val="100000"/>
+              </a:lnSpc>
+              <a:spcBef>
+                <a:spcPct val="0"/>
+              </a:spcBef>
+              <a:spcAft>
+                <a:spcPts val="0"/>
+              </a:spcAft>
+              <a:buNone/>
+              <a:defRPr/>
+            </a:pPr>
+            <a:r>
+              <a:rPr xmlns:mc="http://schemas.openxmlformats.org/markup-compatibility/2006" xmlns:hp="http://schemas.haansoft.com/office/presentation/8.0" kumimoji="0" lang="en-US" altLang="ko-KR" sz="2000" b="1" i="0" u="none" strike="noStrike" kern="1200" cap="none" spc="0" normalizeH="0" baseline="0" mc:Ignorable="hp" hp:hslEmbossed="0">
+                <a:solidFill>
+                  <a:srgbClr val="ffffff"/>
+                </a:solidFill>
+                <a:latin typeface="Calibri"/>
+                <a:ea typeface="맑은 고딕"/>
+                <a:cs typeface="Times New Roman"/>
+              </a:rPr>
+              <a:t>C</a:t>
+            </a:r>
+            <a:endParaRPr xmlns:mc="http://schemas.openxmlformats.org/markup-compatibility/2006" xmlns:hp="http://schemas.haansoft.com/office/presentation/8.0" kumimoji="0" lang="en-US" altLang="ko-KR" sz="2000" b="1" i="0" u="none" strike="noStrike" kern="1200" cap="none" spc="0" normalizeH="0" baseline="0" mc:Ignorable="hp" hp:hslEmbossed="0">
+              <a:solidFill>
+                <a:srgbClr val="ffffff"/>
+              </a:solidFill>
+              <a:latin typeface="Calibri"/>
+              <a:ea typeface="맑은 고딕"/>
+              <a:cs typeface="Times New Roman"/>
+            </a:endParaRPr>
+          </a:p>
+        </p:txBody>
+      </p:sp>
+      <p:sp>
+        <p:nvSpPr>
+          <p:cNvPr id="45" name=""/>
+          <p:cNvSpPr/>
+          <p:nvPr/>
+        </p:nvSpPr>
+        <p:spPr>
+          <a:xfrm>
+            <a:off x="2286690" y="5393052"/>
+            <a:ext cx="545521" cy="574486"/>
+          </a:xfrm>
+          <a:prstGeom prst="ellipse">
+            <a:avLst/>
+          </a:prstGeom>
+          <a:solidFill>
+            <a:srgbClr val="6182d6">
+              <a:alpha val="100000"/>
+            </a:srgbClr>
+          </a:solidFill>
+          <a:ln w="19050" cap="flat" cmpd="sng" algn="ctr">
+            <a:solidFill>
+              <a:srgbClr val="2e3e67">
+                <a:alpha val="100000"/>
+              </a:srgbClr>
+            </a:solidFill>
+            <a:prstDash val="solid"/>
+          </a:ln>
+        </p:spPr>
+        <p:txBody>
+          <a:bodyPr anchor="ctr"/>
+          <a:p>
+            <a:pPr marL="0" indent="0" algn="ctr" defTabSz="914400" rtl="0" eaLnBrk="1" latinLnBrk="1" hangingPunct="1">
+              <a:lnSpc>
+                <a:spcPct val="100000"/>
+              </a:lnSpc>
+              <a:spcBef>
+                <a:spcPct val="0"/>
+              </a:spcBef>
+              <a:spcAft>
+                <a:spcPts val="0"/>
+              </a:spcAft>
+              <a:buNone/>
+              <a:defRPr/>
+            </a:pPr>
+            <a:r>
+              <a:rPr xmlns:mc="http://schemas.openxmlformats.org/markup-compatibility/2006" xmlns:hp="http://schemas.haansoft.com/office/presentation/8.0" kumimoji="0" lang="en-US" altLang="ko-KR" sz="2000" b="1" i="0" u="none" strike="noStrike" kern="1200" cap="none" spc="0" normalizeH="0" baseline="0" mc:Ignorable="hp" hp:hslEmbossed="0">
+                <a:solidFill>
+                  <a:srgbClr val="ffffff"/>
+                </a:solidFill>
+                <a:latin typeface="Calibri"/>
+                <a:ea typeface="맑은 고딕"/>
+                <a:cs typeface="Times New Roman"/>
+              </a:rPr>
+              <a:t>D</a:t>
+            </a:r>
+            <a:endParaRPr xmlns:mc="http://schemas.openxmlformats.org/markup-compatibility/2006" xmlns:hp="http://schemas.haansoft.com/office/presentation/8.0" kumimoji="0" lang="en-US" altLang="ko-KR" sz="2000" b="1" i="0" u="none" strike="noStrike" kern="1200" cap="none" spc="0" normalizeH="0" baseline="0" mc:Ignorable="hp" hp:hslEmbossed="0">
+              <a:solidFill>
+                <a:srgbClr val="ffffff"/>
+              </a:solidFill>
+              <a:latin typeface="Calibri"/>
+              <a:ea typeface="맑은 고딕"/>
+              <a:cs typeface="Times New Roman"/>
+            </a:endParaRPr>
+          </a:p>
+        </p:txBody>
+      </p:sp>
+      <p:sp>
+        <p:nvSpPr>
+          <p:cNvPr id="46" name=""/>
+          <p:cNvSpPr/>
+          <p:nvPr/>
+        </p:nvSpPr>
+        <p:spPr>
+          <a:xfrm>
+            <a:off x="3377732" y="5393052"/>
+            <a:ext cx="545521" cy="574486"/>
+          </a:xfrm>
+          <a:prstGeom prst="ellipse">
+            <a:avLst/>
+          </a:prstGeom>
+          <a:solidFill>
+            <a:srgbClr val="6182d6">
+              <a:alpha val="100000"/>
+            </a:srgbClr>
+          </a:solidFill>
+          <a:ln w="19050" cap="flat" cmpd="sng" algn="ctr">
+            <a:solidFill>
+              <a:srgbClr val="2e3e67">
+                <a:alpha val="100000"/>
+              </a:srgbClr>
+            </a:solidFill>
+            <a:prstDash val="solid"/>
+          </a:ln>
+        </p:spPr>
+        <p:txBody>
+          <a:bodyPr anchor="ctr"/>
+          <a:p>
+            <a:pPr marL="0" indent="0" algn="ctr" defTabSz="914400" rtl="0" eaLnBrk="1" latinLnBrk="1" hangingPunct="1">
+              <a:lnSpc>
+                <a:spcPct val="100000"/>
+              </a:lnSpc>
+              <a:spcBef>
+                <a:spcPct val="0"/>
+              </a:spcBef>
+              <a:spcAft>
+                <a:spcPts val="0"/>
+              </a:spcAft>
+              <a:buNone/>
+              <a:defRPr/>
+            </a:pPr>
+            <a:r>
+              <a:rPr xmlns:mc="http://schemas.openxmlformats.org/markup-compatibility/2006" xmlns:hp="http://schemas.haansoft.com/office/presentation/8.0" kumimoji="0" lang="en-US" altLang="ko-KR" sz="2000" b="1" i="0" u="none" strike="noStrike" kern="1200" cap="none" spc="0" normalizeH="0" baseline="0" mc:Ignorable="hp" hp:hslEmbossed="0">
+                <a:solidFill>
+                  <a:srgbClr val="ffffff"/>
+                </a:solidFill>
+                <a:latin typeface="Calibri"/>
+                <a:ea typeface="맑은 고딕"/>
+                <a:cs typeface="Times New Roman"/>
+              </a:rPr>
+              <a:t>E</a:t>
+            </a:r>
+            <a:endParaRPr xmlns:mc="http://schemas.openxmlformats.org/markup-compatibility/2006" xmlns:hp="http://schemas.haansoft.com/office/presentation/8.0" kumimoji="0" lang="en-US" altLang="ko-KR" sz="2000" b="1" i="0" u="none" strike="noStrike" kern="1200" cap="none" spc="0" normalizeH="0" baseline="0" mc:Ignorable="hp" hp:hslEmbossed="0">
+              <a:solidFill>
+                <a:srgbClr val="ffffff"/>
+              </a:solidFill>
+              <a:latin typeface="Calibri"/>
+              <a:ea typeface="맑은 고딕"/>
+              <a:cs typeface="Times New Roman"/>
+            </a:endParaRPr>
+          </a:p>
+        </p:txBody>
+      </p:sp>
+      <p:cxnSp>
+        <p:nvCxnSpPr>
+          <p:cNvPr id="47" name=""/>
+          <p:cNvCxnSpPr>
+            <a:stCxn id="42" idx="3"/>
+            <a:endCxn id="43" idx="0"/>
+          </p:cNvCxnSpPr>
+          <p:nvPr/>
+        </p:nvCxnSpPr>
+        <p:spPr>
+          <a:xfrm rot="10800000" flipV="1">
+            <a:off x="3104970" y="4027530"/>
+            <a:ext cx="779662" cy="461726"/>
+          </a:xfrm>
+          <a:prstGeom prst="line">
+            <a:avLst/>
+          </a:prstGeom>
+          <a:noFill/>
+          <a:ln w="38100" cap="flat" cmpd="sng" algn="ctr">
+            <a:solidFill>
+              <a:srgbClr val="000000">
+                <a:alpha val="100000"/>
+              </a:srgbClr>
+            </a:solidFill>
+            <a:prstDash val="solid"/>
+          </a:ln>
+        </p:spPr>
+      </p:cxnSp>
+      <p:cxnSp>
+        <p:nvCxnSpPr>
+          <p:cNvPr id="48" name=""/>
+          <p:cNvCxnSpPr>
+            <a:stCxn id="44" idx="0"/>
+            <a:endCxn id="42" idx="5"/>
+          </p:cNvCxnSpPr>
+          <p:nvPr/>
+        </p:nvCxnSpPr>
+        <p:spPr>
+          <a:xfrm rot="10800000">
+            <a:off x="4270375" y="4027530"/>
+            <a:ext cx="705300" cy="461726"/>
+          </a:xfrm>
+          <a:prstGeom prst="line">
+            <a:avLst/>
+          </a:prstGeom>
+          <a:noFill/>
+          <a:ln w="38100" cap="flat" cmpd="sng" algn="ctr">
+            <a:solidFill>
+              <a:srgbClr val="000000">
+                <a:alpha val="100000"/>
+              </a:srgbClr>
+            </a:solidFill>
+            <a:prstDash val="solid"/>
+          </a:ln>
+        </p:spPr>
+      </p:cxnSp>
+      <p:cxnSp>
+        <p:nvCxnSpPr>
+          <p:cNvPr id="49" name=""/>
+          <p:cNvCxnSpPr>
+            <a:stCxn id="46" idx="0"/>
+            <a:endCxn id="43" idx="5"/>
+          </p:cNvCxnSpPr>
+          <p:nvPr/>
+        </p:nvCxnSpPr>
+        <p:spPr>
+          <a:xfrm rot="16200000" flipV="1">
+            <a:off x="3267446" y="5010007"/>
+            <a:ext cx="413440" cy="352650"/>
+          </a:xfrm>
+          <a:prstGeom prst="line">
+            <a:avLst/>
+          </a:prstGeom>
+          <a:noFill/>
+          <a:ln w="38100" cap="flat" cmpd="sng" algn="ctr">
+            <a:solidFill>
+              <a:srgbClr val="000000">
+                <a:alpha val="100000"/>
+              </a:srgbClr>
+            </a:solidFill>
+            <a:prstDash val="solid"/>
+          </a:ln>
+        </p:spPr>
+      </p:cxnSp>
+      <p:cxnSp>
+        <p:nvCxnSpPr>
+          <p:cNvPr id="50" name=""/>
+          <p:cNvCxnSpPr>
+            <a:stCxn id="43" idx="3"/>
+            <a:endCxn id="45" idx="0"/>
+          </p:cNvCxnSpPr>
+          <p:nvPr/>
+        </p:nvCxnSpPr>
+        <p:spPr>
+          <a:xfrm rot="5400000">
+            <a:off x="2529055" y="5010007"/>
+            <a:ext cx="413440" cy="352650"/>
+          </a:xfrm>
+          <a:prstGeom prst="line">
+            <a:avLst/>
+          </a:prstGeom>
+          <a:noFill/>
+          <a:ln w="38100" cap="flat" cmpd="sng" algn="ctr">
+            <a:solidFill>
+              <a:srgbClr val="000000">
+                <a:alpha val="100000"/>
+              </a:srgbClr>
+            </a:solidFill>
+            <a:prstDash val="solid"/>
+          </a:ln>
+        </p:spPr>
+      </p:cxnSp>
+      <p:sp>
+        <p:nvSpPr>
+          <p:cNvPr id="51" name=""/>
+          <p:cNvSpPr/>
+          <p:nvPr/>
+        </p:nvSpPr>
+        <p:spPr>
+          <a:xfrm>
+            <a:off x="3040484" y="6221009"/>
+            <a:ext cx="545521" cy="574486"/>
+          </a:xfrm>
+          <a:prstGeom prst="ellipse">
+            <a:avLst/>
+          </a:prstGeom>
+          <a:solidFill>
+            <a:srgbClr val="6182d6">
+              <a:alpha val="100000"/>
+            </a:srgbClr>
+          </a:solidFill>
+          <a:ln w="19050" cap="flat" cmpd="sng" algn="ctr">
+            <a:solidFill>
+              <a:srgbClr val="2e3e67">
+                <a:alpha val="100000"/>
+              </a:srgbClr>
+            </a:solidFill>
+            <a:prstDash val="solid"/>
+          </a:ln>
+        </p:spPr>
+        <p:txBody>
+          <a:bodyPr anchor="ctr"/>
+          <a:p>
+            <a:pPr marL="0" indent="0" algn="ctr" defTabSz="914400" rtl="0" eaLnBrk="1" latinLnBrk="1" hangingPunct="1">
+              <a:lnSpc>
+                <a:spcPct val="100000"/>
+              </a:lnSpc>
+              <a:spcBef>
+                <a:spcPct val="0"/>
+              </a:spcBef>
+              <a:spcAft>
+                <a:spcPts val="0"/>
+              </a:spcAft>
+              <a:buNone/>
+              <a:defRPr/>
+            </a:pPr>
+            <a:r>
+              <a:rPr xmlns:mc="http://schemas.openxmlformats.org/markup-compatibility/2006" xmlns:hp="http://schemas.haansoft.com/office/presentation/8.0" kumimoji="0" lang="en-US" altLang="ko-KR" sz="2000" b="1" i="0" u="none" strike="noStrike" kern="1200" cap="none" spc="0" normalizeH="0" baseline="0" mc:Ignorable="hp" hp:hslEmbossed="0">
+                <a:solidFill>
+                  <a:srgbClr val="ffffff"/>
+                </a:solidFill>
+                <a:latin typeface="Calibri"/>
+                <a:ea typeface="맑은 고딕"/>
+                <a:cs typeface="Times New Roman"/>
+              </a:rPr>
+              <a:t>F</a:t>
+            </a:r>
+            <a:endParaRPr xmlns:mc="http://schemas.openxmlformats.org/markup-compatibility/2006" xmlns:hp="http://schemas.haansoft.com/office/presentation/8.0" kumimoji="0" lang="en-US" altLang="ko-KR" sz="2000" b="1" i="0" u="none" strike="noStrike" kern="1200" cap="none" spc="0" normalizeH="0" baseline="0" mc:Ignorable="hp" hp:hslEmbossed="0">
+              <a:solidFill>
+                <a:srgbClr val="ffffff"/>
+              </a:solidFill>
+              <a:latin typeface="Calibri"/>
+              <a:ea typeface="맑은 고딕"/>
+              <a:cs typeface="Times New Roman"/>
+            </a:endParaRPr>
+          </a:p>
+        </p:txBody>
+      </p:sp>
+      <p:cxnSp>
+        <p:nvCxnSpPr>
+          <p:cNvPr id="52" name=""/>
+          <p:cNvCxnSpPr>
+            <a:stCxn id="51" idx="0"/>
+            <a:endCxn id="46" idx="3"/>
+          </p:cNvCxnSpPr>
+          <p:nvPr/>
+        </p:nvCxnSpPr>
+        <p:spPr>
+          <a:xfrm rot="5400000" flipH="1" flipV="1">
+            <a:off x="3216631" y="5980019"/>
+            <a:ext cx="337603" cy="144377"/>
+          </a:xfrm>
+          <a:prstGeom prst="line">
+            <a:avLst/>
+          </a:prstGeom>
+          <a:noFill/>
+          <a:ln w="38100" cap="flat" cmpd="sng" algn="ctr">
+            <a:solidFill>
+              <a:srgbClr val="000000">
+                <a:alpha val="100000"/>
+              </a:srgbClr>
+            </a:solidFill>
+            <a:prstDash val="solid"/>
+          </a:ln>
+        </p:spPr>
+      </p:cxnSp>
+      <p:sp>
+        <p:nvSpPr>
+          <p:cNvPr id="53" name=""/>
+          <p:cNvSpPr/>
+          <p:nvPr/>
+        </p:nvSpPr>
+        <p:spPr>
+          <a:xfrm>
+            <a:off x="3650492" y="6221006"/>
+            <a:ext cx="545521" cy="574486"/>
+          </a:xfrm>
+          <a:prstGeom prst="ellipse">
+            <a:avLst/>
+          </a:prstGeom>
+          <a:solidFill>
+            <a:srgbClr val="6182d6">
+              <a:alpha val="100000"/>
+            </a:srgbClr>
+          </a:solidFill>
+          <a:ln w="19050" cap="flat" cmpd="sng" algn="ctr">
+            <a:solidFill>
+              <a:srgbClr val="2e3e67">
+                <a:alpha val="100000"/>
+              </a:srgbClr>
+            </a:solidFill>
+            <a:prstDash val="solid"/>
+          </a:ln>
+        </p:spPr>
+        <p:txBody>
+          <a:bodyPr anchor="ctr"/>
+          <a:p>
+            <a:pPr marL="0" indent="0" algn="ctr" defTabSz="914400" rtl="0" eaLnBrk="1" latinLnBrk="1" hangingPunct="1">
+              <a:lnSpc>
+                <a:spcPct val="100000"/>
+              </a:lnSpc>
+              <a:spcBef>
+                <a:spcPct val="0"/>
+              </a:spcBef>
+              <a:spcAft>
+                <a:spcPts val="0"/>
+              </a:spcAft>
+              <a:buNone/>
+              <a:defRPr/>
+            </a:pPr>
+            <a:r>
+              <a:rPr xmlns:mc="http://schemas.openxmlformats.org/markup-compatibility/2006" xmlns:hp="http://schemas.haansoft.com/office/presentation/8.0" kumimoji="0" lang="en-US" altLang="ko-KR" sz="2000" b="1" i="0" u="none" strike="noStrike" kern="1200" cap="none" spc="0" normalizeH="0" baseline="0" mc:Ignorable="hp" hp:hslEmbossed="0">
+                <a:solidFill>
+                  <a:srgbClr val="ffffff"/>
+                </a:solidFill>
+                <a:latin typeface="Calibri"/>
+                <a:ea typeface="맑은 고딕"/>
+                <a:cs typeface="Times New Roman"/>
+              </a:rPr>
+              <a:t>G</a:t>
+            </a:r>
+            <a:endParaRPr xmlns:mc="http://schemas.openxmlformats.org/markup-compatibility/2006" xmlns:hp="http://schemas.haansoft.com/office/presentation/8.0" kumimoji="0" lang="en-US" altLang="ko-KR" sz="2000" b="1" i="0" u="none" strike="noStrike" kern="1200" cap="none" spc="0" normalizeH="0" baseline="0" mc:Ignorable="hp" hp:hslEmbossed="0">
+              <a:solidFill>
+                <a:srgbClr val="ffffff"/>
+              </a:solidFill>
+              <a:latin typeface="Calibri"/>
+              <a:ea typeface="맑은 고딕"/>
+              <a:cs typeface="Times New Roman"/>
+            </a:endParaRPr>
+          </a:p>
+        </p:txBody>
+      </p:sp>
+      <p:cxnSp>
+        <p:nvCxnSpPr>
+          <p:cNvPr id="54" name=""/>
+          <p:cNvCxnSpPr>
+            <a:stCxn id="53" idx="0"/>
+            <a:endCxn id="46" idx="5"/>
+          </p:cNvCxnSpPr>
+          <p:nvPr/>
+        </p:nvCxnSpPr>
+        <p:spPr>
+          <a:xfrm rot="16200000" flipV="1">
+            <a:off x="3714508" y="6012262"/>
+            <a:ext cx="337600" cy="79889"/>
+          </a:xfrm>
+          <a:prstGeom prst="line">
+            <a:avLst/>
+          </a:prstGeom>
+          <a:noFill/>
+          <a:ln w="38100" cap="flat" cmpd="sng" algn="ctr">
+            <a:solidFill>
+              <a:srgbClr val="000000">
+                <a:alpha val="100000"/>
+              </a:srgbClr>
+            </a:solidFill>
+            <a:prstDash val="solid"/>
+          </a:ln>
+        </p:spPr>
+      </p:cxnSp>
+      <p:sp>
+        <p:nvSpPr>
+          <p:cNvPr id="55" name=""/>
+          <p:cNvSpPr/>
+          <p:nvPr/>
+        </p:nvSpPr>
+        <p:spPr>
+          <a:xfrm>
+            <a:off x="6274696" y="2368739"/>
+            <a:ext cx="545521" cy="574486"/>
+          </a:xfrm>
+          <a:prstGeom prst="ellipse">
+            <a:avLst/>
+          </a:prstGeom>
+          <a:solidFill>
+            <a:srgbClr val="6182d6">
+              <a:alpha val="100000"/>
+            </a:srgbClr>
+          </a:solidFill>
+          <a:ln w="19050" cap="flat" cmpd="sng" algn="ctr">
+            <a:solidFill>
+              <a:srgbClr val="2e3e67">
+                <a:alpha val="100000"/>
+              </a:srgbClr>
+            </a:solidFill>
+            <a:prstDash val="solid"/>
+          </a:ln>
+        </p:spPr>
+        <p:txBody>
+          <a:bodyPr anchor="ctr"/>
+          <a:p>
+            <a:pPr marL="0" indent="0" algn="ctr" defTabSz="914400" rtl="0" eaLnBrk="1" latinLnBrk="1" hangingPunct="1">
+              <a:lnSpc>
+                <a:spcPct val="100000"/>
+              </a:lnSpc>
+              <a:spcBef>
+                <a:spcPct val="0"/>
+              </a:spcBef>
+              <a:spcAft>
+                <a:spcPts val="0"/>
+              </a:spcAft>
+              <a:buNone/>
+              <a:defRPr/>
+            </a:pPr>
+            <a:r>
+              <a:rPr xmlns:mc="http://schemas.openxmlformats.org/markup-compatibility/2006" xmlns:hp="http://schemas.haansoft.com/office/presentation/8.0" kumimoji="0" lang="en-US" altLang="ko-KR" sz="2000" b="1" i="0" u="none" strike="noStrike" kern="1200" cap="none" spc="0" normalizeH="0" baseline="0" mc:Ignorable="hp" hp:hslEmbossed="0">
+                <a:solidFill>
+                  <a:srgbClr val="ffffff"/>
+                </a:solidFill>
+                <a:latin typeface="Calibri"/>
+                <a:ea typeface="맑은 고딕"/>
+                <a:cs typeface="Times New Roman"/>
+              </a:rPr>
+              <a:t>F</a:t>
+            </a:r>
+            <a:endParaRPr xmlns:mc="http://schemas.openxmlformats.org/markup-compatibility/2006" xmlns:hp="http://schemas.haansoft.com/office/presentation/8.0" kumimoji="0" lang="en-US" altLang="ko-KR" sz="2000" b="1" i="0" u="none" strike="noStrike" kern="1200" cap="none" spc="0" normalizeH="0" baseline="0" mc:Ignorable="hp" hp:hslEmbossed="0">
+              <a:solidFill>
+                <a:srgbClr val="ffffff"/>
+              </a:solidFill>
+              <a:latin typeface="Calibri"/>
+              <a:ea typeface="맑은 고딕"/>
+              <a:cs typeface="Times New Roman"/>
+            </a:endParaRPr>
+          </a:p>
+        </p:txBody>
+      </p:sp>
+      <p:sp>
+        <p:nvSpPr>
+          <p:cNvPr id="56" name=""/>
+          <p:cNvSpPr/>
+          <p:nvPr/>
+        </p:nvSpPr>
+        <p:spPr>
+          <a:xfrm>
+            <a:off x="7365738" y="2368739"/>
+            <a:ext cx="545521" cy="574486"/>
+          </a:xfrm>
+          <a:prstGeom prst="ellipse">
+            <a:avLst/>
+          </a:prstGeom>
+          <a:solidFill>
+            <a:srgbClr val="6182d6">
+              <a:alpha val="100000"/>
+            </a:srgbClr>
+          </a:solidFill>
+          <a:ln w="19050" cap="flat" cmpd="sng" algn="ctr">
+            <a:solidFill>
+              <a:srgbClr val="2e3e67">
+                <a:alpha val="100000"/>
+              </a:srgbClr>
+            </a:solidFill>
+            <a:prstDash val="solid"/>
+          </a:ln>
+        </p:spPr>
+        <p:txBody>
+          <a:bodyPr anchor="ctr"/>
+          <a:p>
+            <a:pPr marL="0" indent="0" algn="ctr" defTabSz="914400" rtl="0" eaLnBrk="1" latinLnBrk="1" hangingPunct="1">
+              <a:lnSpc>
+                <a:spcPct val="100000"/>
+              </a:lnSpc>
+              <a:spcBef>
+                <a:spcPct val="0"/>
+              </a:spcBef>
+              <a:spcAft>
+                <a:spcPts val="0"/>
+              </a:spcAft>
+              <a:buNone/>
+              <a:defRPr/>
+            </a:pPr>
+            <a:r>
+              <a:rPr xmlns:mc="http://schemas.openxmlformats.org/markup-compatibility/2006" xmlns:hp="http://schemas.haansoft.com/office/presentation/8.0" kumimoji="0" lang="en-US" altLang="ko-KR" sz="2000" b="1" i="0" u="none" strike="noStrike" kern="1200" cap="none" spc="0" normalizeH="0" baseline="0" mc:Ignorable="hp" hp:hslEmbossed="0">
+                <a:solidFill>
+                  <a:srgbClr val="ffffff"/>
+                </a:solidFill>
+                <a:latin typeface="Calibri"/>
+                <a:ea typeface="맑은 고딕"/>
+                <a:cs typeface="Times New Roman"/>
+              </a:rPr>
+              <a:t>G</a:t>
+            </a:r>
+            <a:endParaRPr xmlns:mc="http://schemas.openxmlformats.org/markup-compatibility/2006" xmlns:hp="http://schemas.haansoft.com/office/presentation/8.0" kumimoji="0" lang="en-US" altLang="ko-KR" sz="2000" b="1" i="0" u="none" strike="noStrike" kern="1200" cap="none" spc="0" normalizeH="0" baseline="0" mc:Ignorable="hp" hp:hslEmbossed="0">
+              <a:solidFill>
+                <a:srgbClr val="ffffff"/>
+              </a:solidFill>
+              <a:latin typeface="Calibri"/>
+              <a:ea typeface="맑은 고딕"/>
+              <a:cs typeface="Times New Roman"/>
+            </a:endParaRPr>
+          </a:p>
+        </p:txBody>
+      </p:sp>
+      <p:cxnSp>
+        <p:nvCxnSpPr>
+          <p:cNvPr id="57" name=""/>
+          <p:cNvCxnSpPr>
+            <a:stCxn id="55" idx="0"/>
+            <a:endCxn id="26" idx="3"/>
+          </p:cNvCxnSpPr>
+          <p:nvPr/>
+        </p:nvCxnSpPr>
+        <p:spPr>
+          <a:xfrm rot="5400000" flipH="1" flipV="1">
+            <a:off x="6508789" y="1993967"/>
+            <a:ext cx="413440" cy="336105"/>
+          </a:xfrm>
+          <a:prstGeom prst="line">
+            <a:avLst/>
+          </a:prstGeom>
+          <a:noFill/>
+          <a:ln w="38100" cap="flat" cmpd="sng" algn="ctr">
+            <a:solidFill>
+              <a:srgbClr val="000000">
+                <a:alpha val="100000"/>
+              </a:srgbClr>
+            </a:solidFill>
+            <a:prstDash val="solid"/>
+          </a:ln>
+        </p:spPr>
+      </p:cxnSp>
+      <p:cxnSp>
+        <p:nvCxnSpPr>
+          <p:cNvPr id="58" name=""/>
+          <p:cNvCxnSpPr>
+            <a:stCxn id="56" idx="0"/>
+            <a:endCxn id="26" idx="5"/>
+          </p:cNvCxnSpPr>
+          <p:nvPr/>
+        </p:nvCxnSpPr>
+        <p:spPr>
+          <a:xfrm rot="16200000" flipV="1">
+            <a:off x="7247181" y="1977422"/>
+            <a:ext cx="413440" cy="369194"/>
+          </a:xfrm>
+          <a:prstGeom prst="line">
+            <a:avLst/>
+          </a:prstGeom>
+          <a:noFill/>
+          <a:ln w="38100" cap="flat" cmpd="sng" algn="ctr">
+            <a:solidFill>
+              <a:srgbClr val="000000">
+                <a:alpha val="100000"/>
+              </a:srgbClr>
+            </a:solidFill>
+            <a:prstDash val="solid"/>
+          </a:ln>
+        </p:spPr>
+      </p:cxnSp>
+      <p:sp>
+        <p:nvSpPr>
+          <p:cNvPr id="59" name=""/>
+          <p:cNvSpPr txBox="1"/>
+          <p:nvPr/>
+        </p:nvSpPr>
+        <p:spPr>
+          <a:xfrm>
+            <a:off x="911271" y="10058"/>
+            <a:ext cx="2914656" cy="394626"/>
+          </a:xfrm>
+          <a:prstGeom prst="rect">
+            <a:avLst/>
+          </a:prstGeom>
+        </p:spPr>
+        <p:txBody>
+          <a:bodyPr wrap="square">
+            <a:spAutoFit/>
+          </a:bodyPr>
+          <a:p>
+            <a:pPr marL="0" indent="0" algn="ctr" defTabSz="914400" rtl="0" eaLnBrk="1" latinLnBrk="1" hangingPunct="1">
+              <a:lnSpc>
+                <a:spcPct val="100000"/>
+              </a:lnSpc>
+              <a:spcBef>
+                <a:spcPct val="0"/>
+              </a:spcBef>
+              <a:spcAft>
+                <a:spcPts val="0"/>
+              </a:spcAft>
+              <a:buNone/>
+              <a:defRPr/>
+            </a:pPr>
+            <a:r>
+              <a:rPr xmlns:mc="http://schemas.openxmlformats.org/markup-compatibility/2006" xmlns:hp="http://schemas.haansoft.com/office/presentation/8.0" kumimoji="0" lang="en-US" altLang="ko-KR" sz="2000" b="1" i="0" u="none" strike="noStrike" kern="1200" cap="none" spc="0" normalizeH="0" baseline="0" mc:Ignorable="hp" hp:hslEmbossed="0">
+                <a:solidFill>
+                  <a:srgbClr val="000000"/>
+                </a:solidFill>
+                <a:latin typeface="Calibri"/>
+                <a:ea typeface="맑은 고딕"/>
+                <a:cs typeface="Times New Roman"/>
+              </a:rPr>
+              <a:t>Complete Binary Tree</a:t>
+            </a:r>
+            <a:endParaRPr xmlns:mc="http://schemas.openxmlformats.org/markup-compatibility/2006" xmlns:hp="http://schemas.haansoft.com/office/presentation/8.0" kumimoji="0" lang="en-US" altLang="ko-KR" sz="2000" b="1" i="0" u="none" strike="noStrike" kern="1200" cap="none" spc="0" normalizeH="0" baseline="0" mc:Ignorable="hp" hp:hslEmbossed="0">
+              <a:solidFill>
+                <a:srgbClr val="000000"/>
+              </a:solidFill>
+              <a:latin typeface="Calibri"/>
+              <a:ea typeface="맑은 고딕"/>
+              <a:cs typeface="Times New Roman"/>
+            </a:endParaRPr>
+          </a:p>
+        </p:txBody>
+      </p:sp>
+      <p:sp>
+        <p:nvSpPr>
+          <p:cNvPr id="60" name=""/>
+          <p:cNvSpPr txBox="1"/>
+          <p:nvPr/>
+        </p:nvSpPr>
+        <p:spPr>
+          <a:xfrm>
+            <a:off x="4844085" y="10058"/>
+            <a:ext cx="2668351" cy="394626"/>
+          </a:xfrm>
+          <a:prstGeom prst="rect">
+            <a:avLst/>
+          </a:prstGeom>
+        </p:spPr>
+        <p:txBody>
+          <a:bodyPr wrap="square">
+            <a:spAutoFit/>
+          </a:bodyPr>
+          <a:p>
+            <a:pPr marL="0" indent="0" algn="ctr" defTabSz="914400" rtl="0" eaLnBrk="1" latinLnBrk="1" hangingPunct="1">
+              <a:lnSpc>
+                <a:spcPct val="100000"/>
+              </a:lnSpc>
+              <a:spcBef>
+                <a:spcPct val="0"/>
+              </a:spcBef>
+              <a:spcAft>
+                <a:spcPts val="0"/>
+              </a:spcAft>
+              <a:buNone/>
+              <a:defRPr/>
+            </a:pPr>
+            <a:r>
+              <a:rPr xmlns:mc="http://schemas.openxmlformats.org/markup-compatibility/2006" xmlns:hp="http://schemas.haansoft.com/office/presentation/8.0" kumimoji="0" lang="en-US" altLang="ko-KR" sz="2000" b="1" i="0" u="none" strike="noStrike" kern="1200" cap="none" spc="0" normalizeH="0" baseline="0" mc:Ignorable="hp" hp:hslEmbossed="0">
+                <a:solidFill>
+                  <a:srgbClr val="000000"/>
+                </a:solidFill>
+                <a:latin typeface="Calibri"/>
+                <a:ea typeface="맑은 고딕"/>
+                <a:cs typeface="Times New Roman"/>
+              </a:rPr>
+              <a:t>Perfect Binary Tree</a:t>
+            </a:r>
+            <a:endParaRPr xmlns:mc="http://schemas.openxmlformats.org/markup-compatibility/2006" xmlns:hp="http://schemas.haansoft.com/office/presentation/8.0" kumimoji="0" lang="en-US" altLang="ko-KR" sz="2000" b="1" i="0" u="none" strike="noStrike" kern="1200" cap="none" spc="0" normalizeH="0" baseline="0" mc:Ignorable="hp" hp:hslEmbossed="0">
+              <a:solidFill>
+                <a:srgbClr val="000000"/>
+              </a:solidFill>
+              <a:latin typeface="Calibri"/>
+              <a:ea typeface="맑은 고딕"/>
+              <a:cs typeface="Times New Roman"/>
+            </a:endParaRPr>
+          </a:p>
+        </p:txBody>
+      </p:sp>
+      <p:sp>
+        <p:nvSpPr>
+          <p:cNvPr id="61" name=""/>
+          <p:cNvSpPr txBox="1"/>
+          <p:nvPr/>
+        </p:nvSpPr>
+        <p:spPr>
+          <a:xfrm>
+            <a:off x="3142152" y="3034374"/>
+            <a:ext cx="1870705" cy="394626"/>
+          </a:xfrm>
+          <a:prstGeom prst="rect">
+            <a:avLst/>
+          </a:prstGeom>
+        </p:spPr>
+        <p:txBody>
+          <a:bodyPr wrap="square">
+            <a:spAutoFit/>
+          </a:bodyPr>
+          <a:p>
+            <a:pPr marL="0" indent="0" algn="ctr" defTabSz="914400" rtl="0" eaLnBrk="1" latinLnBrk="1" hangingPunct="1">
+              <a:lnSpc>
+                <a:spcPct val="100000"/>
+              </a:lnSpc>
+              <a:spcBef>
+                <a:spcPct val="0"/>
+              </a:spcBef>
+              <a:spcAft>
+                <a:spcPts val="0"/>
+              </a:spcAft>
+              <a:buNone/>
+              <a:defRPr/>
+            </a:pPr>
+            <a:r>
+              <a:rPr xmlns:mc="http://schemas.openxmlformats.org/markup-compatibility/2006" xmlns:hp="http://schemas.haansoft.com/office/presentation/8.0" kumimoji="0" lang="en-US" altLang="ko-KR" sz="2000" b="1" i="0" u="none" strike="noStrike" kern="1200" cap="none" spc="0" normalizeH="0" baseline="0" mc:Ignorable="hp" hp:hslEmbossed="0">
+                <a:solidFill>
+                  <a:srgbClr val="000000"/>
+                </a:solidFill>
+                <a:latin typeface="Calibri"/>
+                <a:ea typeface="맑은 고딕"/>
+                <a:cs typeface="Times New Roman"/>
+              </a:rPr>
+              <a:t>Full Binary Tree</a:t>
+            </a:r>
+            <a:endParaRPr xmlns:mc="http://schemas.openxmlformats.org/markup-compatibility/2006" xmlns:hp="http://schemas.haansoft.com/office/presentation/8.0" kumimoji="0" lang="en-US" altLang="ko-KR" sz="2000" b="1" i="0" u="none" strike="noStrike" kern="1200" cap="none" spc="0" normalizeH="0" baseline="0" mc:Ignorable="hp" hp:hslEmbossed="0">
+              <a:solidFill>
+                <a:srgbClr val="000000"/>
+              </a:solidFill>
+              <a:latin typeface="Calibri"/>
+              <a:ea typeface="맑은 고딕"/>
+              <a:cs typeface="Times New Roman"/>
+            </a:endParaRPr>
+          </a:p>
+        </p:txBody>
+      </p:sp>
+      <p:sp>
+        <p:nvSpPr>
+          <p:cNvPr id="62" name=""/>
+          <p:cNvSpPr txBox="1"/>
+          <p:nvPr/>
+        </p:nvSpPr>
+        <p:spPr>
+          <a:xfrm>
+            <a:off x="6974464" y="3036279"/>
+            <a:ext cx="2378706" cy="392721"/>
+          </a:xfrm>
+          <a:prstGeom prst="rect">
+            <a:avLst/>
+          </a:prstGeom>
+        </p:spPr>
+        <p:txBody>
+          <a:bodyPr wrap="square">
+            <a:spAutoFit/>
+          </a:bodyPr>
+          <a:p>
+            <a:pPr marL="0" indent="0" algn="ctr" defTabSz="914400" rtl="0" eaLnBrk="1" latinLnBrk="1" hangingPunct="1">
+              <a:lnSpc>
+                <a:spcPct val="100000"/>
+              </a:lnSpc>
+              <a:spcBef>
+                <a:spcPct val="0"/>
+              </a:spcBef>
+              <a:spcAft>
+                <a:spcPts val="0"/>
+              </a:spcAft>
+              <a:buNone/>
+              <a:defRPr/>
+            </a:pPr>
+            <a:r>
+              <a:rPr xmlns:mc="http://schemas.openxmlformats.org/markup-compatibility/2006" xmlns:hp="http://schemas.haansoft.com/office/presentation/8.0" kumimoji="0" lang="en-US" altLang="ko-KR" sz="2000" b="1" i="0" u="none" strike="noStrike" kern="1200" cap="none" spc="0" normalizeH="0" baseline="0" mc:Ignorable="hp" hp:hslEmbossed="0">
+                <a:solidFill>
+                  <a:srgbClr val="000000"/>
+                </a:solidFill>
+                <a:latin typeface="Calibri"/>
+                <a:ea typeface="맑은 고딕"/>
+                <a:cs typeface="Times New Roman"/>
+              </a:rPr>
+              <a:t>Skewed Binary Tree</a:t>
+            </a:r>
+            <a:endParaRPr xmlns:mc="http://schemas.openxmlformats.org/markup-compatibility/2006" xmlns:hp="http://schemas.haansoft.com/office/presentation/8.0" kumimoji="0" lang="en-US" altLang="ko-KR" sz="2000" b="1" i="0" u="none" strike="noStrike" kern="1200" cap="none" spc="0" normalizeH="0" baseline="0" mc:Ignorable="hp" hp:hslEmbossed="0">
+              <a:solidFill>
+                <a:srgbClr val="000000"/>
+              </a:solidFill>
+              <a:latin typeface="Calibri"/>
+              <a:ea typeface="맑은 고딕"/>
+              <a:cs typeface="Times New Roman"/>
+            </a:endParaRPr>
+          </a:p>
+        </p:txBody>
+      </p:sp>
+      <p:sp>
+        <p:nvSpPr>
+          <p:cNvPr id="63" name=""/>
+          <p:cNvSpPr/>
+          <p:nvPr/>
+        </p:nvSpPr>
+        <p:spPr>
+          <a:xfrm>
+            <a:off x="7365738" y="3501331"/>
+            <a:ext cx="545521" cy="574486"/>
+          </a:xfrm>
+          <a:prstGeom prst="ellipse">
+            <a:avLst/>
+          </a:prstGeom>
+          <a:solidFill>
+            <a:srgbClr val="6182d6">
+              <a:alpha val="100000"/>
+            </a:srgbClr>
+          </a:solidFill>
+          <a:ln w="19050" cap="flat" cmpd="sng" algn="ctr">
+            <a:solidFill>
+              <a:srgbClr val="2e3e67">
+                <a:alpha val="100000"/>
+              </a:srgbClr>
+            </a:solidFill>
+            <a:prstDash val="solid"/>
+          </a:ln>
+        </p:spPr>
+        <p:txBody>
+          <a:bodyPr anchor="ctr"/>
+          <a:p>
+            <a:pPr marL="0" indent="0" algn="ctr" defTabSz="914400" rtl="0" eaLnBrk="1" latinLnBrk="1" hangingPunct="1">
+              <a:lnSpc>
+                <a:spcPct val="100000"/>
+              </a:lnSpc>
+              <a:spcBef>
+                <a:spcPct val="0"/>
+              </a:spcBef>
+              <a:spcAft>
+                <a:spcPts val="0"/>
+              </a:spcAft>
+              <a:buNone/>
+              <a:defRPr/>
+            </a:pPr>
+            <a:r>
+              <a:rPr xmlns:mc="http://schemas.openxmlformats.org/markup-compatibility/2006" xmlns:hp="http://schemas.haansoft.com/office/presentation/8.0" kumimoji="0" lang="en-US" altLang="ko-KR" sz="2000" b="1" i="0" u="none" strike="noStrike" kern="1200" cap="none" spc="0" normalizeH="0" baseline="0" mc:Ignorable="hp" hp:hslEmbossed="0">
+                <a:solidFill>
+                  <a:srgbClr val="ffffff"/>
+                </a:solidFill>
+                <a:latin typeface="Calibri"/>
+                <a:ea typeface="맑은 고딕"/>
+                <a:cs typeface="Times New Roman"/>
+              </a:rPr>
+              <a:t>A</a:t>
+            </a:r>
+            <a:endParaRPr xmlns:mc="http://schemas.openxmlformats.org/markup-compatibility/2006" xmlns:hp="http://schemas.haansoft.com/office/presentation/8.0" kumimoji="0" lang="en-US" altLang="ko-KR" sz="2000" b="1" i="0" u="none" strike="noStrike" kern="1200" cap="none" spc="0" normalizeH="0" baseline="0" mc:Ignorable="hp" hp:hslEmbossed="0">
+              <a:solidFill>
+                <a:srgbClr val="ffffff"/>
+              </a:solidFill>
+              <a:latin typeface="Calibri"/>
+              <a:ea typeface="맑은 고딕"/>
+              <a:cs typeface="Times New Roman"/>
+            </a:endParaRPr>
+          </a:p>
+        </p:txBody>
+      </p:sp>
+      <p:sp>
+        <p:nvSpPr>
+          <p:cNvPr id="64" name=""/>
+          <p:cNvSpPr/>
+          <p:nvPr/>
+        </p:nvSpPr>
+        <p:spPr>
+          <a:xfrm>
+            <a:off x="8087584" y="4258394"/>
+            <a:ext cx="545521" cy="574486"/>
+          </a:xfrm>
+          <a:prstGeom prst="ellipse">
+            <a:avLst/>
+          </a:prstGeom>
+          <a:solidFill>
+            <a:srgbClr val="6182d6">
+              <a:alpha val="100000"/>
+            </a:srgbClr>
+          </a:solidFill>
+          <a:ln w="19050" cap="flat" cmpd="sng" algn="ctr">
+            <a:solidFill>
+              <a:srgbClr val="2e3e67">
+                <a:alpha val="100000"/>
+              </a:srgbClr>
+            </a:solidFill>
+            <a:prstDash val="solid"/>
+          </a:ln>
+        </p:spPr>
+        <p:txBody>
+          <a:bodyPr anchor="ctr"/>
+          <a:p>
+            <a:pPr marL="0" indent="0" algn="ctr" defTabSz="914400" rtl="0" eaLnBrk="1" latinLnBrk="1" hangingPunct="1">
+              <a:lnSpc>
+                <a:spcPct val="100000"/>
+              </a:lnSpc>
+              <a:spcBef>
+                <a:spcPct val="0"/>
+              </a:spcBef>
+              <a:spcAft>
+                <a:spcPts val="0"/>
+              </a:spcAft>
+              <a:buNone/>
+              <a:defRPr/>
+            </a:pPr>
+            <a:r>
+              <a:rPr xmlns:mc="http://schemas.openxmlformats.org/markup-compatibility/2006" xmlns:hp="http://schemas.haansoft.com/office/presentation/8.0" kumimoji="0" lang="en-US" altLang="ko-KR" sz="2000" b="1" i="0" u="none" strike="noStrike" kern="1200" cap="none" spc="0" normalizeH="0" baseline="0" mc:Ignorable="hp" hp:hslEmbossed="0">
+                <a:solidFill>
+                  <a:srgbClr val="ffffff"/>
+                </a:solidFill>
+                <a:latin typeface="Calibri"/>
+                <a:ea typeface="맑은 고딕"/>
+                <a:cs typeface="Times New Roman"/>
+              </a:rPr>
+              <a:t>B</a:t>
+            </a:r>
+            <a:endParaRPr xmlns:mc="http://schemas.openxmlformats.org/markup-compatibility/2006" xmlns:hp="http://schemas.haansoft.com/office/presentation/8.0" kumimoji="0" lang="en-US" altLang="ko-KR" sz="2000" b="1" i="0" u="none" strike="noStrike" kern="1200" cap="none" spc="0" normalizeH="0" baseline="0" mc:Ignorable="hp" hp:hslEmbossed="0">
+              <a:solidFill>
+                <a:srgbClr val="ffffff"/>
+              </a:solidFill>
+              <a:latin typeface="Calibri"/>
+              <a:ea typeface="맑은 고딕"/>
+              <a:cs typeface="Times New Roman"/>
+            </a:endParaRPr>
+          </a:p>
+        </p:txBody>
+      </p:sp>
+      <p:cxnSp>
+        <p:nvCxnSpPr>
+          <p:cNvPr id="65" name=""/>
+          <p:cNvCxnSpPr>
+            <a:stCxn id="64" idx="1"/>
+            <a:endCxn id="63" idx="5"/>
+          </p:cNvCxnSpPr>
+          <p:nvPr/>
+        </p:nvCxnSpPr>
+        <p:spPr>
+          <a:xfrm rot="16200000" flipV="1">
+            <a:off x="7824002" y="3999053"/>
+            <a:ext cx="350840" cy="336103"/>
+          </a:xfrm>
+          <a:prstGeom prst="line">
+            <a:avLst/>
+          </a:prstGeom>
+          <a:noFill/>
+          <a:ln w="38100" cap="flat" cmpd="sng" algn="ctr">
+            <a:solidFill>
+              <a:srgbClr val="000000">
+                <a:alpha val="100000"/>
+              </a:srgbClr>
+            </a:solidFill>
+            <a:prstDash val="solid"/>
+          </a:ln>
+        </p:spPr>
+      </p:cxnSp>
+      <p:sp>
+        <p:nvSpPr>
+          <p:cNvPr id="66" name=""/>
+          <p:cNvSpPr/>
+          <p:nvPr/>
+        </p:nvSpPr>
+        <p:spPr>
+          <a:xfrm>
+            <a:off x="8807649" y="5063743"/>
+            <a:ext cx="545521" cy="574486"/>
+          </a:xfrm>
+          <a:prstGeom prst="ellipse">
+            <a:avLst/>
+          </a:prstGeom>
+          <a:solidFill>
+            <a:srgbClr val="6182d6">
+              <a:alpha val="100000"/>
+            </a:srgbClr>
+          </a:solidFill>
+          <a:ln w="19050" cap="flat" cmpd="sng" algn="ctr">
+            <a:solidFill>
+              <a:srgbClr val="2e3e67">
+                <a:alpha val="100000"/>
+              </a:srgbClr>
+            </a:solidFill>
+            <a:prstDash val="solid"/>
+          </a:ln>
+        </p:spPr>
+        <p:txBody>
+          <a:bodyPr anchor="ctr"/>
+          <a:p>
+            <a:pPr marL="0" indent="0" algn="ctr" defTabSz="914400" rtl="0" eaLnBrk="1" latinLnBrk="1" hangingPunct="1">
+              <a:lnSpc>
+                <a:spcPct val="100000"/>
+              </a:lnSpc>
+              <a:spcBef>
+                <a:spcPct val="0"/>
+              </a:spcBef>
+              <a:spcAft>
+                <a:spcPts val="0"/>
+              </a:spcAft>
+              <a:buNone/>
+              <a:defRPr/>
+            </a:pPr>
+            <a:r>
+              <a:rPr xmlns:mc="http://schemas.openxmlformats.org/markup-compatibility/2006" xmlns:hp="http://schemas.haansoft.com/office/presentation/8.0" kumimoji="0" lang="en-US" altLang="ko-KR" sz="2000" b="1" i="0" u="none" strike="noStrike" kern="1200" cap="none" spc="0" normalizeH="0" baseline="0" mc:Ignorable="hp" hp:hslEmbossed="0">
+                <a:solidFill>
+                  <a:srgbClr val="ffffff"/>
+                </a:solidFill>
+                <a:latin typeface="Calibri"/>
+                <a:ea typeface="맑은 고딕"/>
+                <a:cs typeface="Times New Roman"/>
+              </a:rPr>
+              <a:t>C</a:t>
+            </a:r>
+            <a:endParaRPr xmlns:mc="http://schemas.openxmlformats.org/markup-compatibility/2006" xmlns:hp="http://schemas.haansoft.com/office/presentation/8.0" kumimoji="0" lang="en-US" altLang="ko-KR" sz="2000" b="1" i="0" u="none" strike="noStrike" kern="1200" cap="none" spc="0" normalizeH="0" baseline="0" mc:Ignorable="hp" hp:hslEmbossed="0">
+              <a:solidFill>
+                <a:srgbClr val="ffffff"/>
+              </a:solidFill>
+              <a:latin typeface="Calibri"/>
+              <a:ea typeface="맑은 고딕"/>
+              <a:cs typeface="Times New Roman"/>
+            </a:endParaRPr>
+          </a:p>
+        </p:txBody>
+      </p:sp>
+      <p:cxnSp>
+        <p:nvCxnSpPr>
+          <p:cNvPr id="67" name=""/>
+          <p:cNvCxnSpPr>
+            <a:stCxn id="66" idx="1"/>
+            <a:endCxn id="64" idx="5"/>
+          </p:cNvCxnSpPr>
+          <p:nvPr/>
+        </p:nvCxnSpPr>
+        <p:spPr>
+          <a:xfrm rot="16200000" flipV="1">
+            <a:off x="8520816" y="4781149"/>
+            <a:ext cx="399125" cy="334325"/>
+          </a:xfrm>
+          <a:prstGeom prst="line">
+            <a:avLst/>
+          </a:prstGeom>
+          <a:noFill/>
+          <a:ln w="38100" cap="flat" cmpd="sng" algn="ctr">
+            <a:solidFill>
+              <a:srgbClr val="000000">
+                <a:alpha val="100000"/>
+              </a:srgbClr>
+            </a:solidFill>
+            <a:prstDash val="solid"/>
+          </a:ln>
+        </p:spPr>
+      </p:cxnSp>
+      <p:sp>
+        <p:nvSpPr>
+          <p:cNvPr id="68" name=""/>
+          <p:cNvSpPr/>
+          <p:nvPr/>
+        </p:nvSpPr>
+        <p:spPr>
+          <a:xfrm>
+            <a:off x="9517694" y="5883406"/>
+            <a:ext cx="545521" cy="574486"/>
+          </a:xfrm>
+          <a:prstGeom prst="ellipse">
+            <a:avLst/>
+          </a:prstGeom>
+          <a:solidFill>
+            <a:srgbClr val="6182d6">
+              <a:alpha val="100000"/>
+            </a:srgbClr>
+          </a:solidFill>
+          <a:ln w="19050" cap="flat" cmpd="sng" algn="ctr">
+            <a:solidFill>
+              <a:srgbClr val="2e3e67">
+                <a:alpha val="100000"/>
+              </a:srgbClr>
+            </a:solidFill>
+            <a:prstDash val="solid"/>
+          </a:ln>
+        </p:spPr>
+        <p:txBody>
+          <a:bodyPr anchor="ctr"/>
+          <a:p>
+            <a:pPr marL="0" indent="0" algn="ctr" defTabSz="914400" rtl="0" eaLnBrk="1" latinLnBrk="1" hangingPunct="1">
+              <a:lnSpc>
+                <a:spcPct val="100000"/>
+              </a:lnSpc>
+              <a:spcBef>
+                <a:spcPct val="0"/>
+              </a:spcBef>
+              <a:spcAft>
+                <a:spcPts val="0"/>
+              </a:spcAft>
+              <a:buNone/>
+              <a:defRPr/>
+            </a:pPr>
+            <a:r>
+              <a:rPr xmlns:mc="http://schemas.openxmlformats.org/markup-compatibility/2006" xmlns:hp="http://schemas.haansoft.com/office/presentation/8.0" kumimoji="0" lang="en-US" altLang="ko-KR" sz="2000" b="1" i="0" u="none" strike="noStrike" kern="1200" cap="none" spc="0" normalizeH="0" baseline="0" mc:Ignorable="hp" hp:hslEmbossed="0">
+                <a:solidFill>
+                  <a:srgbClr val="ffffff"/>
+                </a:solidFill>
+                <a:latin typeface="Calibri"/>
+                <a:ea typeface="맑은 고딕"/>
+                <a:cs typeface="Times New Roman"/>
+              </a:rPr>
+              <a:t>D</a:t>
+            </a:r>
+            <a:endParaRPr xmlns:mc="http://schemas.openxmlformats.org/markup-compatibility/2006" xmlns:hp="http://schemas.haansoft.com/office/presentation/8.0" kumimoji="0" lang="en-US" altLang="ko-KR" sz="2000" b="1" i="0" u="none" strike="noStrike" kern="1200" cap="none" spc="0" normalizeH="0" baseline="0" mc:Ignorable="hp" hp:hslEmbossed="0">
+              <a:solidFill>
+                <a:srgbClr val="ffffff"/>
+              </a:solidFill>
+              <a:latin typeface="Calibri"/>
+              <a:ea typeface="맑은 고딕"/>
+              <a:cs typeface="Times New Roman"/>
+            </a:endParaRPr>
+          </a:p>
+        </p:txBody>
+      </p:sp>
+      <p:cxnSp>
+        <p:nvCxnSpPr>
+          <p:cNvPr id="69" name=""/>
+          <p:cNvCxnSpPr>
+            <a:stCxn id="68" idx="1"/>
+            <a:endCxn id="66" idx="5"/>
+          </p:cNvCxnSpPr>
+          <p:nvPr/>
+        </p:nvCxnSpPr>
+        <p:spPr>
+          <a:xfrm rot="16200000" flipV="1">
+            <a:off x="9228714" y="5598665"/>
+            <a:ext cx="413440" cy="324305"/>
+          </a:xfrm>
+          <a:prstGeom prst="line">
+            <a:avLst/>
+          </a:prstGeom>
+          <a:noFill/>
+          <a:ln w="38100" cap="flat" cmpd="sng" algn="ctr">
+            <a:solidFill>
+              <a:srgbClr val="000000">
+                <a:alpha val="100000"/>
+              </a:srgbClr>
+            </a:solidFill>
+            <a:prstDash val="solid"/>
+          </a:ln>
+        </p:spPr>
+      </p:cxnSp>
+    </p:spTree>
+  </p:cSld>
+  <p:clrMapOvr>
+    <a:masterClrMapping/>
+  </p:clrMapOvr>
+  <mc:AlternateContent xmlns:mc="http://schemas.openxmlformats.org/markup-compatibility/2006">
+    <mc:Choice xmlns:p14="http://schemas.microsoft.com/office/powerpoint/2010/main" Requires="p14">
+      <p:transition xmlns:mc="http://schemas.openxmlformats.org/markup-compatibility/2006" xmlns:p14="http://schemas.microsoft.com/office/powerpoint/2010/main" mc:Ignorable="p14" p14:dur="500"/>
+    </mc:Choice>
+    <mc:Fallback>
+      <p:transition/>
+    </mc:Fallback>
+  </mc:AlternateContent>
+</p:sld>
+</file>
+
 <file path=ppt/slides/slide2.xml><?xml version="1.0" encoding="utf-8"?>
 <p:sld xmlns:r="http://schemas.openxmlformats.org/officeDocument/2006/relationships" xmlns:c="http://schemas.openxmlformats.org/drawingml/2006/chart" xmlns:a="http://schemas.openxmlformats.org/drawingml/2006/main" xmlns:dgm="http://schemas.openxmlformats.org/drawingml/2006/diagram" xmlns:dsp="http://schemas.microsoft.com/office/drawing/2008/diagram" xmlns:p="http://schemas.openxmlformats.org/presentationml/2006/main">
   <p:cSld>

</xml_diff>

<commit_message>
add image "heap structure"
</commit_message>
<xml_diff>
--- a/etc/images.pptx
+++ b/etc/images.pptx
@@ -2,7 +2,7 @@
 <file path=ppt/presentation.xml><?xml version="1.0" encoding="utf-8"?>
 <p:presentation xmlns:r="http://schemas.openxmlformats.org/officeDocument/2006/relationships" xmlns:c="http://schemas.openxmlformats.org/drawingml/2006/chart" xmlns:a="http://schemas.openxmlformats.org/drawingml/2006/main" xmlns:dgm="http://schemas.openxmlformats.org/drawingml/2006/diagram" xmlns:dsp="http://schemas.microsoft.com/office/drawing/2008/diagram" xmlns:p="http://schemas.openxmlformats.org/presentationml/2006/main">
   <p:sldMasterIdLst>
-    <p:sldMasterId id="2147483721" r:id="rId1"/>
+    <p:sldMasterId id="2147483729" r:id="rId1"/>
   </p:sldMasterIdLst>
   <p:notesMasterIdLst>
     <p:notesMasterId r:id="rId2"/>
@@ -25,6 +25,7 @@
     <p:sldId id="270" r:id="rId17"/>
     <p:sldId id="271" r:id="rId18"/>
     <p:sldId id="272" r:id="rId19"/>
+    <p:sldId id="273" r:id="rId20"/>
   </p:sldIdLst>
   <p:sldSz cx="12192000" cy="6858000"/>
   <p:notesSz cx="6858000" cy="9144000"/>
@@ -221,7 +222,7 @@
               <a:pPr lvl="0">
                 <a:defRPr/>
               </a:pPr>
-              <a:t>2019-08-21</a:t>
+              <a:t>2019-08-22</a:t>
             </a:fld>
             <a:endParaRPr lang="ko-KR" altLang="en-US"/>
           </a:p>
@@ -21597,6 +21598,2188 @@
 </p:sld>
 </file>
 
+<file path=ppt/slides/slide18.xml><?xml version="1.0" encoding="utf-8"?>
+<p:sld xmlns:r="http://schemas.openxmlformats.org/officeDocument/2006/relationships" xmlns:c="http://schemas.openxmlformats.org/drawingml/2006/chart" xmlns:a="http://schemas.openxmlformats.org/drawingml/2006/main" xmlns:dgm="http://schemas.openxmlformats.org/drawingml/2006/diagram" xmlns:dsp="http://schemas.microsoft.com/office/drawing/2008/diagram" xmlns:p="http://schemas.openxmlformats.org/presentationml/2006/main">
+  <p:cSld>
+    <p:spTree>
+      <p:nvGrpSpPr>
+        <p:cNvPr id="1" name=""/>
+        <p:cNvGrpSpPr/>
+        <p:nvPr/>
+      </p:nvGrpSpPr>
+      <p:grpSpPr>
+        <a:xfrm>
+          <a:off x="0" y="0"/>
+          <a:ext cx="0" cy="0"/>
+          <a:chOff x="0" y="0"/>
+          <a:chExt cx="0" cy="0"/>
+        </a:xfrm>
+      </p:grpSpPr>
+      <p:sp>
+        <p:nvSpPr>
+          <p:cNvPr id="4" name=""/>
+          <p:cNvSpPr/>
+          <p:nvPr/>
+        </p:nvSpPr>
+        <p:spPr>
+          <a:xfrm>
+            <a:off x="5914699" y="1201749"/>
+            <a:ext cx="545521" cy="574486"/>
+          </a:xfrm>
+          <a:prstGeom prst="ellipse">
+            <a:avLst/>
+          </a:prstGeom>
+          <a:solidFill>
+            <a:srgbClr val="6182d6">
+              <a:alpha val="100000"/>
+            </a:srgbClr>
+          </a:solidFill>
+          <a:ln w="19050" cap="flat" cmpd="sng" algn="ctr">
+            <a:solidFill>
+              <a:srgbClr val="2e3e67">
+                <a:alpha val="100000"/>
+              </a:srgbClr>
+            </a:solidFill>
+            <a:prstDash val="solid"/>
+          </a:ln>
+        </p:spPr>
+        <p:txBody>
+          <a:bodyPr anchor="ctr"/>
+          <a:p>
+            <a:pPr marL="0" indent="0" algn="ctr" defTabSz="914400" rtl="0" eaLnBrk="1" latinLnBrk="1" hangingPunct="1">
+              <a:lnSpc>
+                <a:spcPct val="100000"/>
+              </a:lnSpc>
+              <a:spcBef>
+                <a:spcPct val="0"/>
+              </a:spcBef>
+              <a:spcAft>
+                <a:spcPts val="0"/>
+              </a:spcAft>
+              <a:buNone/>
+              <a:defRPr/>
+            </a:pPr>
+            <a:r>
+              <a:rPr xmlns:mc="http://schemas.openxmlformats.org/markup-compatibility/2006" xmlns:hp="http://schemas.haansoft.com/office/presentation/8.0" kumimoji="0" lang="en-US" altLang="ko-KR" sz="2000" b="1" i="0" u="none" strike="noStrike" kern="1200" cap="none" spc="0" normalizeH="0" baseline="0" mc:Ignorable="hp" hp:hslEmbossed="0">
+                <a:solidFill>
+                  <a:srgbClr val="ffffff"/>
+                </a:solidFill>
+                <a:latin typeface="Calibri"/>
+                <a:ea typeface="맑은 고딕"/>
+                <a:cs typeface="Times New Roman"/>
+              </a:rPr>
+              <a:t>9</a:t>
+            </a:r>
+            <a:endParaRPr xmlns:mc="http://schemas.openxmlformats.org/markup-compatibility/2006" xmlns:hp="http://schemas.haansoft.com/office/presentation/8.0" kumimoji="0" lang="en-US" altLang="ko-KR" sz="2000" b="1" i="0" u="none" strike="noStrike" kern="1200" cap="none" spc="0" normalizeH="0" baseline="0" mc:Ignorable="hp" hp:hslEmbossed="0">
+              <a:solidFill>
+                <a:srgbClr val="ffffff"/>
+              </a:solidFill>
+              <a:latin typeface="Calibri"/>
+              <a:ea typeface="맑은 고딕"/>
+              <a:cs typeface="Times New Roman"/>
+            </a:endParaRPr>
+          </a:p>
+        </p:txBody>
+      </p:sp>
+      <p:sp>
+        <p:nvSpPr>
+          <p:cNvPr id="5" name=""/>
+          <p:cNvSpPr/>
+          <p:nvPr/>
+        </p:nvSpPr>
+        <p:spPr>
+          <a:xfrm>
+            <a:off x="4475519" y="2237962"/>
+            <a:ext cx="545521" cy="574486"/>
+          </a:xfrm>
+          <a:prstGeom prst="ellipse">
+            <a:avLst/>
+          </a:prstGeom>
+          <a:solidFill>
+            <a:srgbClr val="6182d6">
+              <a:alpha val="100000"/>
+            </a:srgbClr>
+          </a:solidFill>
+          <a:ln w="19050" cap="flat" cmpd="sng" algn="ctr">
+            <a:solidFill>
+              <a:srgbClr val="2e3e67">
+                <a:alpha val="100000"/>
+              </a:srgbClr>
+            </a:solidFill>
+            <a:prstDash val="solid"/>
+          </a:ln>
+        </p:spPr>
+        <p:txBody>
+          <a:bodyPr anchor="ctr"/>
+          <a:p>
+            <a:pPr marL="0" indent="0" algn="ctr" defTabSz="914400" rtl="0" eaLnBrk="1" latinLnBrk="1" hangingPunct="1">
+              <a:lnSpc>
+                <a:spcPct val="100000"/>
+              </a:lnSpc>
+              <a:spcBef>
+                <a:spcPct val="0"/>
+              </a:spcBef>
+              <a:spcAft>
+                <a:spcPts val="0"/>
+              </a:spcAft>
+              <a:buNone/>
+              <a:defRPr/>
+            </a:pPr>
+            <a:r>
+              <a:rPr xmlns:mc="http://schemas.openxmlformats.org/markup-compatibility/2006" xmlns:hp="http://schemas.haansoft.com/office/presentation/8.0" kumimoji="0" lang="en-US" altLang="ko-KR" sz="2000" b="1" i="0" u="none" strike="noStrike" kern="1200" cap="none" spc="0" normalizeH="0" baseline="0" mc:Ignorable="hp" hp:hslEmbossed="0">
+                <a:solidFill>
+                  <a:srgbClr val="ffffff"/>
+                </a:solidFill>
+                <a:latin typeface="Calibri"/>
+                <a:ea typeface="맑은 고딕"/>
+                <a:cs typeface="Times New Roman"/>
+              </a:rPr>
+              <a:t>7</a:t>
+            </a:r>
+            <a:endParaRPr xmlns:mc="http://schemas.openxmlformats.org/markup-compatibility/2006" xmlns:hp="http://schemas.haansoft.com/office/presentation/8.0" kumimoji="0" lang="en-US" altLang="ko-KR" sz="2000" b="1" i="0" u="none" strike="noStrike" kern="1200" cap="none" spc="0" normalizeH="0" baseline="0" mc:Ignorable="hp" hp:hslEmbossed="0">
+              <a:solidFill>
+                <a:srgbClr val="ffffff"/>
+              </a:solidFill>
+              <a:latin typeface="Calibri"/>
+              <a:ea typeface="맑은 고딕"/>
+              <a:cs typeface="Times New Roman"/>
+            </a:endParaRPr>
+          </a:p>
+        </p:txBody>
+      </p:sp>
+      <p:sp>
+        <p:nvSpPr>
+          <p:cNvPr id="6" name=""/>
+          <p:cNvSpPr/>
+          <p:nvPr/>
+        </p:nvSpPr>
+        <p:spPr>
+          <a:xfrm>
+            <a:off x="7472387" y="2237962"/>
+            <a:ext cx="545521" cy="574486"/>
+          </a:xfrm>
+          <a:prstGeom prst="ellipse">
+            <a:avLst/>
+          </a:prstGeom>
+          <a:solidFill>
+            <a:schemeClr val="accent2">
+              <a:alpha val="100000"/>
+            </a:schemeClr>
+          </a:solidFill>
+          <a:ln w="19050" cap="flat" cmpd="sng" algn="ctr">
+            <a:solidFill>
+              <a:srgbClr val="2e3e67">
+                <a:alpha val="100000"/>
+              </a:srgbClr>
+            </a:solidFill>
+            <a:prstDash val="solid"/>
+          </a:ln>
+        </p:spPr>
+        <p:txBody>
+          <a:bodyPr anchor="ctr"/>
+          <a:p>
+            <a:pPr marL="0" indent="0" algn="ctr" defTabSz="914400" rtl="0" eaLnBrk="1" latinLnBrk="1" hangingPunct="1">
+              <a:lnSpc>
+                <a:spcPct val="100000"/>
+              </a:lnSpc>
+              <a:spcBef>
+                <a:spcPct val="0"/>
+              </a:spcBef>
+              <a:spcAft>
+                <a:spcPts val="0"/>
+              </a:spcAft>
+              <a:buNone/>
+              <a:defRPr/>
+            </a:pPr>
+            <a:r>
+              <a:rPr xmlns:mc="http://schemas.openxmlformats.org/markup-compatibility/2006" xmlns:hp="http://schemas.haansoft.com/office/presentation/8.0" kumimoji="0" lang="en-US" altLang="ko-KR" sz="2000" b="1" i="0" u="none" strike="noStrike" kern="1200" cap="none" spc="0" normalizeH="0" baseline="0" mc:Ignorable="hp" hp:hslEmbossed="0">
+                <a:solidFill>
+                  <a:srgbClr val="ffffff"/>
+                </a:solidFill>
+                <a:latin typeface="Calibri"/>
+                <a:ea typeface="맑은 고딕"/>
+                <a:cs typeface="Times New Roman"/>
+              </a:rPr>
+              <a:t>6</a:t>
+            </a:r>
+            <a:endParaRPr xmlns:mc="http://schemas.openxmlformats.org/markup-compatibility/2006" xmlns:hp="http://schemas.haansoft.com/office/presentation/8.0" kumimoji="0" lang="en-US" altLang="ko-KR" sz="2000" b="1" i="0" u="none" strike="noStrike" kern="1200" cap="none" spc="0" normalizeH="0" baseline="0" mc:Ignorable="hp" hp:hslEmbossed="0">
+              <a:solidFill>
+                <a:srgbClr val="ffffff"/>
+              </a:solidFill>
+              <a:latin typeface="Calibri"/>
+              <a:ea typeface="맑은 고딕"/>
+              <a:cs typeface="Times New Roman"/>
+            </a:endParaRPr>
+          </a:p>
+        </p:txBody>
+      </p:sp>
+      <p:sp>
+        <p:nvSpPr>
+          <p:cNvPr id="7" name=""/>
+          <p:cNvSpPr/>
+          <p:nvPr/>
+        </p:nvSpPr>
+        <p:spPr>
+          <a:xfrm>
+            <a:off x="3437848" y="3141757"/>
+            <a:ext cx="545521" cy="574486"/>
+          </a:xfrm>
+          <a:prstGeom prst="ellipse">
+            <a:avLst/>
+          </a:prstGeom>
+          <a:solidFill>
+            <a:srgbClr val="6182d6">
+              <a:alpha val="100000"/>
+            </a:srgbClr>
+          </a:solidFill>
+          <a:ln w="19050" cap="flat" cmpd="sng" algn="ctr">
+            <a:solidFill>
+              <a:srgbClr val="2e3e67">
+                <a:alpha val="100000"/>
+              </a:srgbClr>
+            </a:solidFill>
+            <a:prstDash val="solid"/>
+          </a:ln>
+        </p:spPr>
+        <p:txBody>
+          <a:bodyPr anchor="ctr"/>
+          <a:p>
+            <a:pPr marL="0" indent="0" algn="ctr" defTabSz="914400" rtl="0" eaLnBrk="1" latinLnBrk="1" hangingPunct="1">
+              <a:lnSpc>
+                <a:spcPct val="100000"/>
+              </a:lnSpc>
+              <a:spcBef>
+                <a:spcPct val="0"/>
+              </a:spcBef>
+              <a:spcAft>
+                <a:spcPts val="0"/>
+              </a:spcAft>
+              <a:buNone/>
+              <a:defRPr/>
+            </a:pPr>
+            <a:r>
+              <a:rPr xmlns:mc="http://schemas.openxmlformats.org/markup-compatibility/2006" xmlns:hp="http://schemas.haansoft.com/office/presentation/8.0" kumimoji="0" lang="en-US" altLang="ko-KR" sz="2000" b="1" i="0" u="none" strike="noStrike" kern="1200" cap="none" spc="0" normalizeH="0" baseline="0" mc:Ignorable="hp" hp:hslEmbossed="0">
+                <a:solidFill>
+                  <a:srgbClr val="ffffff"/>
+                </a:solidFill>
+                <a:latin typeface="Calibri"/>
+                <a:ea typeface="맑은 고딕"/>
+                <a:cs typeface="Times New Roman"/>
+              </a:rPr>
+              <a:t>5</a:t>
+            </a:r>
+            <a:endParaRPr xmlns:mc="http://schemas.openxmlformats.org/markup-compatibility/2006" xmlns:hp="http://schemas.haansoft.com/office/presentation/8.0" kumimoji="0" lang="en-US" altLang="ko-KR" sz="2000" b="1" i="0" u="none" strike="noStrike" kern="1200" cap="none" spc="0" normalizeH="0" baseline="0" mc:Ignorable="hp" hp:hslEmbossed="0">
+              <a:solidFill>
+                <a:srgbClr val="ffffff"/>
+              </a:solidFill>
+              <a:latin typeface="Calibri"/>
+              <a:ea typeface="맑은 고딕"/>
+              <a:cs typeface="Times New Roman"/>
+            </a:endParaRPr>
+          </a:p>
+        </p:txBody>
+      </p:sp>
+      <p:sp>
+        <p:nvSpPr>
+          <p:cNvPr id="8" name=""/>
+          <p:cNvSpPr/>
+          <p:nvPr/>
+        </p:nvSpPr>
+        <p:spPr>
+          <a:xfrm>
+            <a:off x="5471452" y="3141757"/>
+            <a:ext cx="545521" cy="574486"/>
+          </a:xfrm>
+          <a:prstGeom prst="ellipse">
+            <a:avLst/>
+          </a:prstGeom>
+          <a:solidFill>
+            <a:srgbClr val="6182d6">
+              <a:alpha val="100000"/>
+            </a:srgbClr>
+          </a:solidFill>
+          <a:ln w="19050" cap="flat" cmpd="sng" algn="ctr">
+            <a:solidFill>
+              <a:srgbClr val="2e3e67">
+                <a:alpha val="100000"/>
+              </a:srgbClr>
+            </a:solidFill>
+            <a:prstDash val="solid"/>
+          </a:ln>
+        </p:spPr>
+        <p:txBody>
+          <a:bodyPr anchor="ctr"/>
+          <a:p>
+            <a:pPr marL="0" indent="0" algn="ctr" defTabSz="914400" rtl="0" eaLnBrk="1" latinLnBrk="1" hangingPunct="1">
+              <a:lnSpc>
+                <a:spcPct val="100000"/>
+              </a:lnSpc>
+              <a:spcBef>
+                <a:spcPct val="0"/>
+              </a:spcBef>
+              <a:spcAft>
+                <a:spcPts val="0"/>
+              </a:spcAft>
+              <a:buNone/>
+              <a:defRPr/>
+            </a:pPr>
+            <a:r>
+              <a:rPr xmlns:mc="http://schemas.openxmlformats.org/markup-compatibility/2006" xmlns:hp="http://schemas.haansoft.com/office/presentation/8.0" kumimoji="0" lang="en-US" altLang="ko-KR" sz="2000" b="1" i="0" u="none" strike="noStrike" kern="1200" cap="none" spc="0" normalizeH="0" baseline="0" mc:Ignorable="hp" hp:hslEmbossed="0">
+                <a:solidFill>
+                  <a:srgbClr val="ffffff"/>
+                </a:solidFill>
+                <a:latin typeface="Calibri"/>
+                <a:ea typeface="맑은 고딕"/>
+                <a:cs typeface="Times New Roman"/>
+              </a:rPr>
+              <a:t>4</a:t>
+            </a:r>
+            <a:endParaRPr xmlns:mc="http://schemas.openxmlformats.org/markup-compatibility/2006" xmlns:hp="http://schemas.haansoft.com/office/presentation/8.0" kumimoji="0" lang="en-US" altLang="ko-KR" sz="2000" b="1" i="0" u="none" strike="noStrike" kern="1200" cap="none" spc="0" normalizeH="0" baseline="0" mc:Ignorable="hp" hp:hslEmbossed="0">
+              <a:solidFill>
+                <a:srgbClr val="ffffff"/>
+              </a:solidFill>
+              <a:latin typeface="Calibri"/>
+              <a:ea typeface="맑은 고딕"/>
+              <a:cs typeface="Times New Roman"/>
+            </a:endParaRPr>
+          </a:p>
+        </p:txBody>
+      </p:sp>
+      <p:sp>
+        <p:nvSpPr>
+          <p:cNvPr id="9" name=""/>
+          <p:cNvSpPr/>
+          <p:nvPr/>
+        </p:nvSpPr>
+        <p:spPr>
+          <a:xfrm>
+            <a:off x="6460220" y="3141757"/>
+            <a:ext cx="545521" cy="574486"/>
+          </a:xfrm>
+          <a:prstGeom prst="ellipse">
+            <a:avLst/>
+          </a:prstGeom>
+          <a:solidFill>
+            <a:schemeClr val="accent5">
+              <a:alpha val="100000"/>
+            </a:schemeClr>
+          </a:solidFill>
+          <a:ln w="19050" cap="flat" cmpd="sng" algn="ctr">
+            <a:solidFill>
+              <a:srgbClr val="2e3e67">
+                <a:alpha val="100000"/>
+              </a:srgbClr>
+            </a:solidFill>
+            <a:prstDash val="solid"/>
+          </a:ln>
+        </p:spPr>
+        <p:txBody>
+          <a:bodyPr anchor="ctr"/>
+          <a:p>
+            <a:pPr marL="0" indent="0" algn="ctr" defTabSz="914400" rtl="0" eaLnBrk="1" latinLnBrk="1" hangingPunct="1">
+              <a:lnSpc>
+                <a:spcPct val="100000"/>
+              </a:lnSpc>
+              <a:spcBef>
+                <a:spcPct val="0"/>
+              </a:spcBef>
+              <a:spcAft>
+                <a:spcPts val="0"/>
+              </a:spcAft>
+              <a:buNone/>
+              <a:defRPr/>
+            </a:pPr>
+            <a:r>
+              <a:rPr xmlns:mc="http://schemas.openxmlformats.org/markup-compatibility/2006" xmlns:hp="http://schemas.haansoft.com/office/presentation/8.0" kumimoji="0" lang="en-US" altLang="ko-KR" sz="2000" b="1" i="0" u="none" strike="noStrike" kern="1200" cap="none" spc="0" normalizeH="0" baseline="0" mc:Ignorable="hp" hp:hslEmbossed="0">
+                <a:solidFill>
+                  <a:srgbClr val="ffffff"/>
+                </a:solidFill>
+                <a:latin typeface="Calibri"/>
+                <a:ea typeface="맑은 고딕"/>
+                <a:cs typeface="Times New Roman"/>
+              </a:rPr>
+              <a:t>3</a:t>
+            </a:r>
+            <a:endParaRPr xmlns:mc="http://schemas.openxmlformats.org/markup-compatibility/2006" xmlns:hp="http://schemas.haansoft.com/office/presentation/8.0" kumimoji="0" lang="en-US" altLang="ko-KR" sz="2000" b="1" i="0" u="none" strike="noStrike" kern="1200" cap="none" spc="0" normalizeH="0" baseline="0" mc:Ignorable="hp" hp:hslEmbossed="0">
+              <a:solidFill>
+                <a:srgbClr val="ffffff"/>
+              </a:solidFill>
+              <a:latin typeface="Calibri"/>
+              <a:ea typeface="맑은 고딕"/>
+              <a:cs typeface="Times New Roman"/>
+            </a:endParaRPr>
+          </a:p>
+        </p:txBody>
+      </p:sp>
+      <p:sp>
+        <p:nvSpPr>
+          <p:cNvPr id="10" name=""/>
+          <p:cNvSpPr/>
+          <p:nvPr/>
+        </p:nvSpPr>
+        <p:spPr>
+          <a:xfrm>
+            <a:off x="8483639" y="3141757"/>
+            <a:ext cx="545521" cy="574486"/>
+          </a:xfrm>
+          <a:prstGeom prst="ellipse">
+            <a:avLst/>
+          </a:prstGeom>
+          <a:solidFill>
+            <a:schemeClr val="accent6">
+              <a:alpha val="100000"/>
+            </a:schemeClr>
+          </a:solidFill>
+          <a:ln w="19050" cap="flat" cmpd="sng" algn="ctr">
+            <a:solidFill>
+              <a:srgbClr val="2e3e67">
+                <a:alpha val="100000"/>
+              </a:srgbClr>
+            </a:solidFill>
+            <a:prstDash val="solid"/>
+          </a:ln>
+        </p:spPr>
+        <p:txBody>
+          <a:bodyPr anchor="ctr"/>
+          <a:p>
+            <a:pPr marL="0" indent="0" algn="ctr" defTabSz="914400" rtl="0" eaLnBrk="1" latinLnBrk="1" hangingPunct="1">
+              <a:lnSpc>
+                <a:spcPct val="100000"/>
+              </a:lnSpc>
+              <a:spcBef>
+                <a:spcPct val="0"/>
+              </a:spcBef>
+              <a:spcAft>
+                <a:spcPts val="0"/>
+              </a:spcAft>
+              <a:buNone/>
+              <a:defRPr/>
+            </a:pPr>
+            <a:r>
+              <a:rPr xmlns:mc="http://schemas.openxmlformats.org/markup-compatibility/2006" xmlns:hp="http://schemas.haansoft.com/office/presentation/8.0" kumimoji="0" lang="en-US" altLang="ko-KR" sz="2000" b="1" i="0" u="none" strike="noStrike" kern="1200" cap="none" spc="0" normalizeH="0" baseline="0" mc:Ignorable="hp" hp:hslEmbossed="0">
+                <a:solidFill>
+                  <a:srgbClr val="ffffff"/>
+                </a:solidFill>
+                <a:latin typeface="Calibri"/>
+                <a:ea typeface="맑은 고딕"/>
+                <a:cs typeface="Times New Roman"/>
+              </a:rPr>
+              <a:t>2</a:t>
+            </a:r>
+            <a:endParaRPr xmlns:mc="http://schemas.openxmlformats.org/markup-compatibility/2006" xmlns:hp="http://schemas.haansoft.com/office/presentation/8.0" kumimoji="0" lang="en-US" altLang="ko-KR" sz="2000" b="1" i="0" u="none" strike="noStrike" kern="1200" cap="none" spc="0" normalizeH="0" baseline="0" mc:Ignorable="hp" hp:hslEmbossed="0">
+              <a:solidFill>
+                <a:srgbClr val="ffffff"/>
+              </a:solidFill>
+              <a:latin typeface="Calibri"/>
+              <a:ea typeface="맑은 고딕"/>
+              <a:cs typeface="Times New Roman"/>
+            </a:endParaRPr>
+          </a:p>
+        </p:txBody>
+      </p:sp>
+      <p:cxnSp>
+        <p:nvCxnSpPr>
+          <p:cNvPr id="11" name=""/>
+          <p:cNvCxnSpPr>
+            <a:stCxn id="4" idx="3"/>
+            <a:endCxn id="5" idx="7"/>
+          </p:cNvCxnSpPr>
+          <p:nvPr/>
+        </p:nvCxnSpPr>
+        <p:spPr>
+          <a:xfrm rot="10800000" flipV="1">
+            <a:off x="4941151" y="1692104"/>
+            <a:ext cx="1053438" cy="629989"/>
+          </a:xfrm>
+          <a:prstGeom prst="line">
+            <a:avLst/>
+          </a:prstGeom>
+          <a:noFill/>
+          <a:ln w="38100" cap="flat" cmpd="sng" algn="ctr">
+            <a:solidFill>
+              <a:srgbClr val="000000">
+                <a:alpha val="100000"/>
+              </a:srgbClr>
+            </a:solidFill>
+            <a:prstDash val="solid"/>
+          </a:ln>
+        </p:spPr>
+      </p:cxnSp>
+      <p:cxnSp>
+        <p:nvCxnSpPr>
+          <p:cNvPr id="12" name=""/>
+          <p:cNvCxnSpPr>
+            <a:stCxn id="6" idx="1"/>
+            <a:endCxn id="4" idx="5"/>
+          </p:cNvCxnSpPr>
+          <p:nvPr/>
+        </p:nvCxnSpPr>
+        <p:spPr>
+          <a:xfrm rot="10800000">
+            <a:off x="6380331" y="1692103"/>
+            <a:ext cx="1171946" cy="629990"/>
+          </a:xfrm>
+          <a:prstGeom prst="line">
+            <a:avLst/>
+          </a:prstGeom>
+          <a:noFill/>
+          <a:ln w="38100" cap="flat" cmpd="sng" algn="ctr">
+            <a:solidFill>
+              <a:srgbClr val="000000">
+                <a:alpha val="100000"/>
+              </a:srgbClr>
+            </a:solidFill>
+            <a:prstDash val="solid"/>
+          </a:ln>
+        </p:spPr>
+      </p:cxnSp>
+      <p:cxnSp>
+        <p:nvCxnSpPr>
+          <p:cNvPr id="13" name=""/>
+          <p:cNvCxnSpPr>
+            <a:stCxn id="9" idx="7"/>
+            <a:endCxn id="6" idx="3"/>
+          </p:cNvCxnSpPr>
+          <p:nvPr/>
+        </p:nvCxnSpPr>
+        <p:spPr>
+          <a:xfrm flipV="1">
+            <a:off x="6925852" y="2728316"/>
+            <a:ext cx="626425" cy="497572"/>
+          </a:xfrm>
+          <a:prstGeom prst="line">
+            <a:avLst/>
+          </a:prstGeom>
+          <a:noFill/>
+          <a:ln w="38100" cap="flat" cmpd="sng" algn="ctr">
+            <a:solidFill>
+              <a:srgbClr val="000000">
+                <a:alpha val="100000"/>
+              </a:srgbClr>
+            </a:solidFill>
+            <a:prstDash val="solid"/>
+          </a:ln>
+        </p:spPr>
+      </p:cxnSp>
+      <p:cxnSp>
+        <p:nvCxnSpPr>
+          <p:cNvPr id="14" name=""/>
+          <p:cNvCxnSpPr>
+            <a:stCxn id="8" idx="1"/>
+            <a:endCxn id="5" idx="5"/>
+          </p:cNvCxnSpPr>
+          <p:nvPr/>
+        </p:nvCxnSpPr>
+        <p:spPr>
+          <a:xfrm rot="10800000">
+            <a:off x="4941149" y="2728316"/>
+            <a:ext cx="610192" cy="497572"/>
+          </a:xfrm>
+          <a:prstGeom prst="line">
+            <a:avLst/>
+          </a:prstGeom>
+          <a:noFill/>
+          <a:ln w="38100" cap="flat" cmpd="sng" algn="ctr">
+            <a:solidFill>
+              <a:srgbClr val="000000">
+                <a:alpha val="100000"/>
+              </a:srgbClr>
+            </a:solidFill>
+            <a:prstDash val="solid"/>
+          </a:ln>
+        </p:spPr>
+      </p:cxnSp>
+      <p:cxnSp>
+        <p:nvCxnSpPr>
+          <p:cNvPr id="15" name=""/>
+          <p:cNvCxnSpPr>
+            <a:stCxn id="10" idx="1"/>
+            <a:endCxn id="6" idx="5"/>
+          </p:cNvCxnSpPr>
+          <p:nvPr/>
+        </p:nvCxnSpPr>
+        <p:spPr>
+          <a:xfrm rot="10800000">
+            <a:off x="7938019" y="2728316"/>
+            <a:ext cx="625511" cy="497572"/>
+          </a:xfrm>
+          <a:prstGeom prst="line">
+            <a:avLst/>
+          </a:prstGeom>
+          <a:noFill/>
+          <a:ln w="38100" cap="flat" cmpd="sng" algn="ctr">
+            <a:solidFill>
+              <a:srgbClr val="000000">
+                <a:alpha val="100000"/>
+              </a:srgbClr>
+            </a:solidFill>
+            <a:prstDash val="solid"/>
+          </a:ln>
+        </p:spPr>
+      </p:cxnSp>
+      <p:cxnSp>
+        <p:nvCxnSpPr>
+          <p:cNvPr id="16" name=""/>
+          <p:cNvCxnSpPr>
+            <a:stCxn id="5" idx="3"/>
+            <a:endCxn id="7" idx="7"/>
+          </p:cNvCxnSpPr>
+          <p:nvPr/>
+        </p:nvCxnSpPr>
+        <p:spPr>
+          <a:xfrm rot="10800000" flipV="1">
+            <a:off x="3903480" y="2728316"/>
+            <a:ext cx="651929" cy="497572"/>
+          </a:xfrm>
+          <a:prstGeom prst="line">
+            <a:avLst/>
+          </a:prstGeom>
+          <a:noFill/>
+          <a:ln w="38100" cap="flat" cmpd="sng" algn="ctr">
+            <a:solidFill>
+              <a:srgbClr val="000000">
+                <a:alpha val="100000"/>
+              </a:srgbClr>
+            </a:solidFill>
+            <a:prstDash val="solid"/>
+          </a:ln>
+        </p:spPr>
+      </p:cxnSp>
+      <p:sp>
+        <p:nvSpPr>
+          <p:cNvPr id="17" name=""/>
+          <p:cNvSpPr/>
+          <p:nvPr/>
+        </p:nvSpPr>
+        <p:spPr>
+          <a:xfrm>
+            <a:off x="2785920" y="3969712"/>
+            <a:ext cx="545521" cy="574486"/>
+          </a:xfrm>
+          <a:prstGeom prst="ellipse">
+            <a:avLst/>
+          </a:prstGeom>
+          <a:solidFill>
+            <a:srgbClr val="6182d6">
+              <a:alpha val="100000"/>
+            </a:srgbClr>
+          </a:solidFill>
+          <a:ln w="19050" cap="flat" cmpd="sng" algn="ctr">
+            <a:solidFill>
+              <a:srgbClr val="2e3e67">
+                <a:alpha val="100000"/>
+              </a:srgbClr>
+            </a:solidFill>
+            <a:prstDash val="solid"/>
+          </a:ln>
+        </p:spPr>
+        <p:txBody>
+          <a:bodyPr anchor="ctr"/>
+          <a:p>
+            <a:pPr marL="0" indent="0" algn="ctr" defTabSz="914400" rtl="0" eaLnBrk="1" latinLnBrk="1" hangingPunct="1">
+              <a:lnSpc>
+                <a:spcPct val="100000"/>
+              </a:lnSpc>
+              <a:spcBef>
+                <a:spcPct val="0"/>
+              </a:spcBef>
+              <a:spcAft>
+                <a:spcPts val="0"/>
+              </a:spcAft>
+              <a:buNone/>
+              <a:defRPr/>
+            </a:pPr>
+            <a:r>
+              <a:rPr xmlns:mc="http://schemas.openxmlformats.org/markup-compatibility/2006" xmlns:hp="http://schemas.haansoft.com/office/presentation/8.0" kumimoji="0" lang="en-US" altLang="ko-KR" sz="2000" b="1" i="0" u="none" strike="noStrike" kern="1200" cap="none" spc="0" normalizeH="0" baseline="0" mc:Ignorable="hp" hp:hslEmbossed="0">
+                <a:solidFill>
+                  <a:srgbClr val="ffffff"/>
+                </a:solidFill>
+                <a:latin typeface="Calibri"/>
+                <a:ea typeface="맑은 고딕"/>
+                <a:cs typeface="Times New Roman"/>
+              </a:rPr>
+              <a:t>2</a:t>
+            </a:r>
+            <a:endParaRPr xmlns:mc="http://schemas.openxmlformats.org/markup-compatibility/2006" xmlns:hp="http://schemas.haansoft.com/office/presentation/8.0" kumimoji="0" lang="en-US" altLang="ko-KR" sz="2000" b="1" i="0" u="none" strike="noStrike" kern="1200" cap="none" spc="0" normalizeH="0" baseline="0" mc:Ignorable="hp" hp:hslEmbossed="0">
+              <a:solidFill>
+                <a:srgbClr val="ffffff"/>
+              </a:solidFill>
+              <a:latin typeface="Calibri"/>
+              <a:ea typeface="맑은 고딕"/>
+              <a:cs typeface="Times New Roman"/>
+            </a:endParaRPr>
+          </a:p>
+        </p:txBody>
+      </p:sp>
+      <p:cxnSp>
+        <p:nvCxnSpPr>
+          <p:cNvPr id="18" name=""/>
+          <p:cNvCxnSpPr>
+            <a:stCxn id="17" idx="0"/>
+            <a:endCxn id="7" idx="3"/>
+          </p:cNvCxnSpPr>
+          <p:nvPr/>
+        </p:nvCxnSpPr>
+        <p:spPr>
+          <a:xfrm flipV="1">
+            <a:off x="3058681" y="3632111"/>
+            <a:ext cx="459057" cy="337600"/>
+          </a:xfrm>
+          <a:prstGeom prst="line">
+            <a:avLst/>
+          </a:prstGeom>
+          <a:noFill/>
+          <a:ln w="38100" cap="flat" cmpd="sng" algn="ctr">
+            <a:solidFill>
+              <a:srgbClr val="000000">
+                <a:alpha val="100000"/>
+              </a:srgbClr>
+            </a:solidFill>
+            <a:prstDash val="solid"/>
+          </a:ln>
+        </p:spPr>
+      </p:cxnSp>
+      <p:sp>
+        <p:nvSpPr>
+          <p:cNvPr id="19" name=""/>
+          <p:cNvSpPr/>
+          <p:nvPr/>
+        </p:nvSpPr>
+        <p:spPr>
+          <a:xfrm>
+            <a:off x="4009889" y="3969711"/>
+            <a:ext cx="545521" cy="574486"/>
+          </a:xfrm>
+          <a:prstGeom prst="ellipse">
+            <a:avLst/>
+          </a:prstGeom>
+          <a:solidFill>
+            <a:srgbClr val="6182d6">
+              <a:alpha val="100000"/>
+            </a:srgbClr>
+          </a:solidFill>
+          <a:ln w="19050" cap="flat" cmpd="sng" algn="ctr">
+            <a:solidFill>
+              <a:srgbClr val="2e3e67">
+                <a:alpha val="100000"/>
+              </a:srgbClr>
+            </a:solidFill>
+            <a:prstDash val="solid"/>
+          </a:ln>
+        </p:spPr>
+        <p:txBody>
+          <a:bodyPr anchor="ctr"/>
+          <a:p>
+            <a:pPr marL="0" indent="0" algn="ctr" defTabSz="914400" rtl="0" eaLnBrk="1" latinLnBrk="1" hangingPunct="1">
+              <a:lnSpc>
+                <a:spcPct val="100000"/>
+              </a:lnSpc>
+              <a:spcBef>
+                <a:spcPct val="0"/>
+              </a:spcBef>
+              <a:spcAft>
+                <a:spcPts val="0"/>
+              </a:spcAft>
+              <a:buNone/>
+              <a:defRPr/>
+            </a:pPr>
+            <a:r>
+              <a:rPr xmlns:mc="http://schemas.openxmlformats.org/markup-compatibility/2006" xmlns:hp="http://schemas.haansoft.com/office/presentation/8.0" kumimoji="0" lang="en-US" altLang="ko-KR" sz="2000" b="1" i="0" u="none" strike="noStrike" kern="1200" cap="none" spc="0" normalizeH="0" baseline="0" mc:Ignorable="hp" hp:hslEmbossed="0">
+                <a:solidFill>
+                  <a:srgbClr val="ffffff"/>
+                </a:solidFill>
+                <a:latin typeface="Calibri"/>
+                <a:ea typeface="맑은 고딕"/>
+                <a:cs typeface="Times New Roman"/>
+              </a:rPr>
+              <a:t>1</a:t>
+            </a:r>
+            <a:endParaRPr xmlns:mc="http://schemas.openxmlformats.org/markup-compatibility/2006" xmlns:hp="http://schemas.haansoft.com/office/presentation/8.0" kumimoji="0" lang="en-US" altLang="ko-KR" sz="2000" b="1" i="0" u="none" strike="noStrike" kern="1200" cap="none" spc="0" normalizeH="0" baseline="0" mc:Ignorable="hp" hp:hslEmbossed="0">
+              <a:solidFill>
+                <a:srgbClr val="ffffff"/>
+              </a:solidFill>
+              <a:latin typeface="Calibri"/>
+              <a:ea typeface="맑은 고딕"/>
+              <a:cs typeface="Times New Roman"/>
+            </a:endParaRPr>
+          </a:p>
+        </p:txBody>
+      </p:sp>
+      <p:cxnSp>
+        <p:nvCxnSpPr>
+          <p:cNvPr id="20" name=""/>
+          <p:cNvCxnSpPr>
+            <a:stCxn id="19" idx="0"/>
+            <a:endCxn id="7" idx="5"/>
+          </p:cNvCxnSpPr>
+          <p:nvPr/>
+        </p:nvCxnSpPr>
+        <p:spPr>
+          <a:xfrm rot="10800000">
+            <a:off x="3903480" y="3632111"/>
+            <a:ext cx="379169" cy="337599"/>
+          </a:xfrm>
+          <a:prstGeom prst="line">
+            <a:avLst/>
+          </a:prstGeom>
+          <a:noFill/>
+          <a:ln w="38100" cap="flat" cmpd="sng" algn="ctr">
+            <a:solidFill>
+              <a:srgbClr val="000000">
+                <a:alpha val="100000"/>
+              </a:srgbClr>
+            </a:solidFill>
+            <a:prstDash val="solid"/>
+          </a:ln>
+        </p:spPr>
+      </p:cxnSp>
+      <p:sp>
+        <p:nvSpPr>
+          <p:cNvPr id="21" name=""/>
+          <p:cNvSpPr/>
+          <p:nvPr/>
+        </p:nvSpPr>
+        <p:spPr>
+          <a:xfrm>
+            <a:off x="4828169" y="3969712"/>
+            <a:ext cx="545521" cy="574486"/>
+          </a:xfrm>
+          <a:prstGeom prst="ellipse">
+            <a:avLst/>
+          </a:prstGeom>
+          <a:solidFill>
+            <a:srgbClr val="6182d6">
+              <a:alpha val="100000"/>
+            </a:srgbClr>
+          </a:solidFill>
+          <a:ln w="19050" cap="flat" cmpd="sng" algn="ctr">
+            <a:solidFill>
+              <a:srgbClr val="2e3e67">
+                <a:alpha val="100000"/>
+              </a:srgbClr>
+            </a:solidFill>
+            <a:prstDash val="solid"/>
+          </a:ln>
+        </p:spPr>
+        <p:txBody>
+          <a:bodyPr anchor="ctr"/>
+          <a:p>
+            <a:pPr marL="0" indent="0" algn="ctr" defTabSz="914400" rtl="0" eaLnBrk="1" latinLnBrk="1" hangingPunct="1">
+              <a:lnSpc>
+                <a:spcPct val="100000"/>
+              </a:lnSpc>
+              <a:spcBef>
+                <a:spcPct val="0"/>
+              </a:spcBef>
+              <a:spcAft>
+                <a:spcPts val="0"/>
+              </a:spcAft>
+              <a:buNone/>
+              <a:defRPr/>
+            </a:pPr>
+            <a:r>
+              <a:rPr xmlns:mc="http://schemas.openxmlformats.org/markup-compatibility/2006" xmlns:hp="http://schemas.haansoft.com/office/presentation/8.0" kumimoji="0" lang="en-US" altLang="ko-KR" sz="2000" b="1" i="0" u="none" strike="noStrike" kern="1200" cap="none" spc="0" normalizeH="0" baseline="0" mc:Ignorable="hp" hp:hslEmbossed="0">
+                <a:solidFill>
+                  <a:srgbClr val="ffffff"/>
+                </a:solidFill>
+                <a:latin typeface="Calibri"/>
+                <a:ea typeface="맑은 고딕"/>
+                <a:cs typeface="Times New Roman"/>
+              </a:rPr>
+              <a:t>3</a:t>
+            </a:r>
+            <a:endParaRPr xmlns:mc="http://schemas.openxmlformats.org/markup-compatibility/2006" xmlns:hp="http://schemas.haansoft.com/office/presentation/8.0" kumimoji="0" lang="en-US" altLang="ko-KR" sz="2000" b="1" i="0" u="none" strike="noStrike" kern="1200" cap="none" spc="0" normalizeH="0" baseline="0" mc:Ignorable="hp" hp:hslEmbossed="0">
+              <a:solidFill>
+                <a:srgbClr val="ffffff"/>
+              </a:solidFill>
+              <a:latin typeface="Calibri"/>
+              <a:ea typeface="맑은 고딕"/>
+              <a:cs typeface="Times New Roman"/>
+            </a:endParaRPr>
+          </a:p>
+        </p:txBody>
+      </p:sp>
+      <p:cxnSp>
+        <p:nvCxnSpPr>
+          <p:cNvPr id="22" name=""/>
+          <p:cNvCxnSpPr>
+            <a:stCxn id="21" idx="0"/>
+            <a:endCxn id="8" idx="3"/>
+          </p:cNvCxnSpPr>
+          <p:nvPr/>
+        </p:nvCxnSpPr>
+        <p:spPr>
+          <a:xfrm flipV="1">
+            <a:off x="5100929" y="3632111"/>
+            <a:ext cx="450411" cy="337600"/>
+          </a:xfrm>
+          <a:prstGeom prst="line">
+            <a:avLst/>
+          </a:prstGeom>
+          <a:noFill/>
+          <a:ln w="38100" cap="flat" cmpd="sng" algn="ctr">
+            <a:solidFill>
+              <a:srgbClr val="000000">
+                <a:alpha val="100000"/>
+              </a:srgbClr>
+            </a:solidFill>
+            <a:prstDash val="solid"/>
+          </a:ln>
+        </p:spPr>
+      </p:cxnSp>
+      <p:graphicFrame>
+        <p:nvGraphicFramePr>
+          <p:cNvPr id="25" name=""/>
+          <p:cNvGraphicFramePr>
+            <a:graphicFrameLocks noGrp="1"/>
+          </p:cNvGraphicFramePr>
+          <p:nvPr/>
+        </p:nvGraphicFramePr>
+        <p:xfrm>
+          <a:off x="2465270" y="4802405"/>
+          <a:ext cx="7058638" cy="741680"/>
+        </p:xfrm>
+        <a:graphic>
+          <a:graphicData uri="http://schemas.openxmlformats.org/drawingml/2006/table">
+            <a:tbl>
+              <a:tblPr firstRow="1" bandRow="1">
+                <a:tableStyleId>{01A66EDD-3DAB-4C5B-A090-DC80EC1FD486}</a:tableStyleId>
+              </a:tblPr>
+              <a:tblGrid>
+                <a:gridCol w="588219"/>
+                <a:gridCol w="588219"/>
+                <a:gridCol w="588219"/>
+                <a:gridCol w="588219"/>
+                <a:gridCol w="588219"/>
+                <a:gridCol w="588219"/>
+                <a:gridCol w="588219"/>
+                <a:gridCol w="588219"/>
+                <a:gridCol w="588219"/>
+                <a:gridCol w="588219"/>
+                <a:gridCol w="588219"/>
+                <a:gridCol w="588219"/>
+              </a:tblGrid>
+              <a:tr h="370840">
+                <a:tc>
+                  <a:txBody>
+                    <a:bodyPr vert="horz" wrap="square" lIns="91440" tIns="45720" rIns="91440" bIns="45720" anchor="t" anchorCtr="0">
+                      <a:spAutoFit/>
+                    </a:bodyPr>
+                    <a:p>
+                      <a:pPr algn="ctr">
+                        <a:defRPr/>
+                      </a:pPr>
+                      <a:r>
+                        <a:rPr lang="en-US" altLang="ko-KR">
+                          <a:solidFill>
+                            <a:schemeClr val="tx1"/>
+                          </a:solidFill>
+                        </a:rPr>
+                        <a:t>0</a:t>
+                      </a:r>
+                      <a:endParaRPr lang="en-US" altLang="ko-KR">
+                        <a:solidFill>
+                          <a:schemeClr val="tx1"/>
+                        </a:solidFill>
+                      </a:endParaRPr>
+                    </a:p>
+                  </a:txBody>
+                  <a:tcPr marL="91440" marR="91440">
+                    <a:solidFill>
+                      <a:schemeClr val="lt1"/>
+                    </a:solidFill>
+                  </a:tcPr>
+                </a:tc>
+                <a:tc>
+                  <a:txBody>
+                    <a:bodyPr vert="horz" wrap="square" lIns="91440" tIns="45720" rIns="91440" bIns="45720" anchor="t" anchorCtr="0">
+                      <a:spAutoFit/>
+                    </a:bodyPr>
+                    <a:p>
+                      <a:pPr algn="ctr">
+                        <a:defRPr/>
+                      </a:pPr>
+                      <a:r>
+                        <a:rPr lang="en-US" altLang="ko-KR">
+                          <a:solidFill>
+                            <a:schemeClr val="tx1"/>
+                          </a:solidFill>
+                        </a:rPr>
+                        <a:t>1</a:t>
+                      </a:r>
+                      <a:endParaRPr lang="en-US" altLang="ko-KR">
+                        <a:solidFill>
+                          <a:schemeClr val="tx1"/>
+                        </a:solidFill>
+                      </a:endParaRPr>
+                    </a:p>
+                  </a:txBody>
+                  <a:tcPr marL="91440" marR="91440">
+                    <a:solidFill>
+                      <a:schemeClr val="lt1"/>
+                    </a:solidFill>
+                  </a:tcPr>
+                </a:tc>
+                <a:tc>
+                  <a:txBody>
+                    <a:bodyPr vert="horz" wrap="square" lIns="91440" tIns="45720" rIns="91440" bIns="45720" anchor="t" anchorCtr="0">
+                      <a:spAutoFit/>
+                    </a:bodyPr>
+                    <a:p>
+                      <a:pPr algn="ctr">
+                        <a:defRPr/>
+                      </a:pPr>
+                      <a:r>
+                        <a:rPr lang="en-US" altLang="ko-KR">
+                          <a:solidFill>
+                            <a:schemeClr val="tx1"/>
+                          </a:solidFill>
+                        </a:rPr>
+                        <a:t>2</a:t>
+                      </a:r>
+                      <a:r>
+                        <a:rPr lang="ko-KR" altLang="en-US">
+                          <a:solidFill>
+                            <a:schemeClr val="tx1"/>
+                          </a:solidFill>
+                        </a:rPr>
+                        <a:t> </a:t>
+                      </a:r>
+                      <a:endParaRPr lang="ko-KR" altLang="en-US">
+                        <a:solidFill>
+                          <a:schemeClr val="tx1"/>
+                        </a:solidFill>
+                      </a:endParaRPr>
+                    </a:p>
+                  </a:txBody>
+                  <a:tcPr marL="91440" marR="91440">
+                    <a:solidFill>
+                      <a:schemeClr val="lt1"/>
+                    </a:solidFill>
+                  </a:tcPr>
+                </a:tc>
+                <a:tc>
+                  <a:txBody>
+                    <a:bodyPr vert="horz" wrap="square" lIns="91440" tIns="45720" rIns="91440" bIns="45720" anchor="t" anchorCtr="0">
+                      <a:spAutoFit/>
+                    </a:bodyPr>
+                    <a:p>
+                      <a:pPr algn="ctr">
+                        <a:defRPr/>
+                      </a:pPr>
+                      <a:r>
+                        <a:rPr lang="en-US" altLang="ko-KR">
+                          <a:solidFill>
+                            <a:schemeClr val="tx1"/>
+                          </a:solidFill>
+                        </a:rPr>
+                        <a:t>3</a:t>
+                      </a:r>
+                      <a:endParaRPr lang="en-US" altLang="ko-KR">
+                        <a:solidFill>
+                          <a:schemeClr val="tx1"/>
+                        </a:solidFill>
+                      </a:endParaRPr>
+                    </a:p>
+                  </a:txBody>
+                  <a:tcPr marL="91440" marR="91440">
+                    <a:solidFill>
+                      <a:schemeClr val="lt1"/>
+                    </a:solidFill>
+                  </a:tcPr>
+                </a:tc>
+                <a:tc>
+                  <a:txBody>
+                    <a:bodyPr vert="horz" wrap="square" lIns="91440" tIns="45720" rIns="91440" bIns="45720" anchor="t" anchorCtr="0">
+                      <a:spAutoFit/>
+                    </a:bodyPr>
+                    <a:p>
+                      <a:pPr algn="ctr">
+                        <a:defRPr/>
+                      </a:pPr>
+                      <a:r>
+                        <a:rPr lang="en-US" altLang="ko-KR">
+                          <a:solidFill>
+                            <a:schemeClr val="tx1"/>
+                          </a:solidFill>
+                        </a:rPr>
+                        <a:t>4</a:t>
+                      </a:r>
+                      <a:endParaRPr lang="en-US" altLang="ko-KR">
+                        <a:solidFill>
+                          <a:schemeClr val="tx1"/>
+                        </a:solidFill>
+                      </a:endParaRPr>
+                    </a:p>
+                  </a:txBody>
+                  <a:tcPr marL="91440" marR="91440">
+                    <a:solidFill>
+                      <a:schemeClr val="lt1"/>
+                    </a:solidFill>
+                  </a:tcPr>
+                </a:tc>
+                <a:tc>
+                  <a:txBody>
+                    <a:bodyPr vert="horz" wrap="square" lIns="91440" tIns="45720" rIns="91440" bIns="45720" anchor="t" anchorCtr="0">
+                      <a:spAutoFit/>
+                    </a:bodyPr>
+                    <a:p>
+                      <a:pPr algn="ctr">
+                        <a:defRPr/>
+                      </a:pPr>
+                      <a:r>
+                        <a:rPr lang="en-US" altLang="ko-KR">
+                          <a:solidFill>
+                            <a:schemeClr val="tx1"/>
+                          </a:solidFill>
+                        </a:rPr>
+                        <a:t>5</a:t>
+                      </a:r>
+                      <a:endParaRPr lang="en-US" altLang="ko-KR">
+                        <a:solidFill>
+                          <a:schemeClr val="tx1"/>
+                        </a:solidFill>
+                      </a:endParaRPr>
+                    </a:p>
+                  </a:txBody>
+                  <a:tcPr marL="91440" marR="91440">
+                    <a:solidFill>
+                      <a:schemeClr val="lt1"/>
+                    </a:solidFill>
+                  </a:tcPr>
+                </a:tc>
+                <a:tc>
+                  <a:txBody>
+                    <a:bodyPr vert="horz" wrap="square" lIns="91440" tIns="45720" rIns="91440" bIns="45720" anchor="t" anchorCtr="0">
+                      <a:spAutoFit/>
+                    </a:bodyPr>
+                    <a:p>
+                      <a:pPr algn="ctr">
+                        <a:defRPr/>
+                      </a:pPr>
+                      <a:r>
+                        <a:rPr lang="en-US" altLang="ko-KR">
+                          <a:solidFill>
+                            <a:schemeClr val="tx1"/>
+                          </a:solidFill>
+                        </a:rPr>
+                        <a:t>6</a:t>
+                      </a:r>
+                      <a:endParaRPr lang="en-US" altLang="ko-KR">
+                        <a:solidFill>
+                          <a:schemeClr val="tx1"/>
+                        </a:solidFill>
+                      </a:endParaRPr>
+                    </a:p>
+                  </a:txBody>
+                  <a:tcPr marL="91440" marR="91440">
+                    <a:solidFill>
+                      <a:schemeClr val="lt1"/>
+                    </a:solidFill>
+                  </a:tcPr>
+                </a:tc>
+                <a:tc>
+                  <a:txBody>
+                    <a:bodyPr vert="horz" wrap="square" lIns="91440" tIns="45720" rIns="91440" bIns="45720" anchor="t" anchorCtr="0">
+                      <a:spAutoFit/>
+                    </a:bodyPr>
+                    <a:p>
+                      <a:pPr algn="ctr">
+                        <a:defRPr/>
+                      </a:pPr>
+                      <a:r>
+                        <a:rPr lang="en-US" altLang="ko-KR">
+                          <a:solidFill>
+                            <a:schemeClr val="tx1"/>
+                          </a:solidFill>
+                        </a:rPr>
+                        <a:t>7</a:t>
+                      </a:r>
+                      <a:endParaRPr lang="en-US" altLang="ko-KR">
+                        <a:solidFill>
+                          <a:schemeClr val="tx1"/>
+                        </a:solidFill>
+                      </a:endParaRPr>
+                    </a:p>
+                  </a:txBody>
+                  <a:tcPr marL="91440" marR="91440">
+                    <a:solidFill>
+                      <a:schemeClr val="lt1"/>
+                    </a:solidFill>
+                  </a:tcPr>
+                </a:tc>
+                <a:tc>
+                  <a:txBody>
+                    <a:bodyPr vert="horz" wrap="square" lIns="91440" tIns="45720" rIns="91440" bIns="45720" anchor="t" anchorCtr="0">
+                      <a:spAutoFit/>
+                    </a:bodyPr>
+                    <a:p>
+                      <a:pPr algn="ctr">
+                        <a:defRPr/>
+                      </a:pPr>
+                      <a:r>
+                        <a:rPr lang="en-US" altLang="ko-KR">
+                          <a:solidFill>
+                            <a:schemeClr val="tx1"/>
+                          </a:solidFill>
+                        </a:rPr>
+                        <a:t>8</a:t>
+                      </a:r>
+                      <a:endParaRPr lang="en-US" altLang="ko-KR">
+                        <a:solidFill>
+                          <a:schemeClr val="tx1"/>
+                        </a:solidFill>
+                      </a:endParaRPr>
+                    </a:p>
+                  </a:txBody>
+                  <a:tcPr marL="91440" marR="91440">
+                    <a:solidFill>
+                      <a:schemeClr val="lt1"/>
+                    </a:solidFill>
+                  </a:tcPr>
+                </a:tc>
+                <a:tc>
+                  <a:txBody>
+                    <a:bodyPr vert="horz" wrap="square" lIns="91440" tIns="45720" rIns="91440" bIns="45720" anchor="t" anchorCtr="0">
+                      <a:spAutoFit/>
+                    </a:bodyPr>
+                    <a:p>
+                      <a:pPr algn="ctr">
+                        <a:defRPr/>
+                      </a:pPr>
+                      <a:r>
+                        <a:rPr lang="en-US" altLang="ko-KR">
+                          <a:solidFill>
+                            <a:schemeClr val="tx1"/>
+                          </a:solidFill>
+                        </a:rPr>
+                        <a:t>9</a:t>
+                      </a:r>
+                      <a:endParaRPr lang="en-US" altLang="ko-KR">
+                        <a:solidFill>
+                          <a:schemeClr val="tx1"/>
+                        </a:solidFill>
+                      </a:endParaRPr>
+                    </a:p>
+                  </a:txBody>
+                  <a:tcPr marL="91440" marR="91440">
+                    <a:solidFill>
+                      <a:schemeClr val="lt1"/>
+                    </a:solidFill>
+                  </a:tcPr>
+                </a:tc>
+                <a:tc>
+                  <a:txBody>
+                    <a:bodyPr vert="horz" wrap="square" lIns="91440" tIns="45720" rIns="91440" bIns="45720" anchor="t" anchorCtr="0">
+                      <a:spAutoFit/>
+                    </a:bodyPr>
+                    <a:p>
+                      <a:pPr algn="ctr">
+                        <a:defRPr/>
+                      </a:pPr>
+                      <a:r>
+                        <a:rPr lang="en-US" altLang="ko-KR">
+                          <a:solidFill>
+                            <a:schemeClr val="tx1"/>
+                          </a:solidFill>
+                        </a:rPr>
+                        <a:t>10</a:t>
+                      </a:r>
+                      <a:endParaRPr lang="en-US" altLang="ko-KR">
+                        <a:solidFill>
+                          <a:schemeClr val="tx1"/>
+                        </a:solidFill>
+                      </a:endParaRPr>
+                    </a:p>
+                  </a:txBody>
+                  <a:tcPr marL="91440" marR="91440">
+                    <a:solidFill>
+                      <a:schemeClr val="lt1"/>
+                    </a:solidFill>
+                  </a:tcPr>
+                </a:tc>
+                <a:tc>
+                  <a:txBody>
+                    <a:bodyPr vert="horz" wrap="square" lIns="91440" tIns="45720" rIns="91440" bIns="45720" anchor="t" anchorCtr="0">
+                      <a:spAutoFit/>
+                    </a:bodyPr>
+                    <a:p>
+                      <a:pPr algn="ctr">
+                        <a:defRPr/>
+                      </a:pPr>
+                      <a:r>
+                        <a:rPr lang="en-US" altLang="ko-KR">
+                          <a:solidFill>
+                            <a:schemeClr val="tx1"/>
+                          </a:solidFill>
+                        </a:rPr>
+                        <a:t>11</a:t>
+                      </a:r>
+                      <a:endParaRPr lang="en-US" altLang="ko-KR">
+                        <a:solidFill>
+                          <a:schemeClr val="tx1"/>
+                        </a:solidFill>
+                      </a:endParaRPr>
+                    </a:p>
+                  </a:txBody>
+                  <a:tcPr marL="91440" marR="91440">
+                    <a:solidFill>
+                      <a:schemeClr val="lt1"/>
+                    </a:solidFill>
+                  </a:tcPr>
+                </a:tc>
+              </a:tr>
+              <a:tr h="370840">
+                <a:tc>
+                  <a:txBody>
+                    <a:bodyPr vert="horz" wrap="square" lIns="91440" tIns="45720" rIns="91440" bIns="45720" anchor="t" anchorCtr="0">
+                      <a:spAutoFit/>
+                    </a:bodyPr>
+                    <a:p>
+                      <a:pPr algn="ctr">
+                        <a:defRPr/>
+                      </a:pPr>
+                      <a:r>
+                        <a:rPr lang="en-US" altLang="ko-KR" b="1">
+                          <a:solidFill>
+                            <a:schemeClr val="lt1"/>
+                          </a:solidFill>
+                        </a:rPr>
+                        <a:t>-</a:t>
+                      </a:r>
+                      <a:endParaRPr lang="en-US" altLang="ko-KR" b="1">
+                        <a:solidFill>
+                          <a:schemeClr val="lt1"/>
+                        </a:solidFill>
+                      </a:endParaRPr>
+                    </a:p>
+                  </a:txBody>
+                  <a:tcPr marL="91440" marR="91440"/>
+                </a:tc>
+                <a:tc>
+                  <a:txBody>
+                    <a:bodyPr vert="horz" wrap="square" lIns="91440" tIns="45720" rIns="91440" bIns="45720" anchor="t" anchorCtr="0">
+                      <a:spAutoFit/>
+                    </a:bodyPr>
+                    <a:p>
+                      <a:pPr algn="ctr">
+                        <a:defRPr/>
+                      </a:pPr>
+                      <a:r>
+                        <a:rPr lang="en-US" altLang="ko-KR" b="1">
+                          <a:solidFill>
+                            <a:schemeClr val="lt1"/>
+                          </a:solidFill>
+                        </a:rPr>
+                        <a:t>9</a:t>
+                      </a:r>
+                      <a:endParaRPr lang="en-US" altLang="ko-KR" b="1">
+                        <a:solidFill>
+                          <a:schemeClr val="lt1"/>
+                        </a:solidFill>
+                      </a:endParaRPr>
+                    </a:p>
+                  </a:txBody>
+                  <a:tcPr marL="91440" marR="91440"/>
+                </a:tc>
+                <a:tc>
+                  <a:txBody>
+                    <a:bodyPr vert="horz" wrap="square" lIns="91440" tIns="45720" rIns="91440" bIns="45720" anchor="t" anchorCtr="0">
+                      <a:spAutoFit/>
+                    </a:bodyPr>
+                    <a:p>
+                      <a:pPr algn="ctr">
+                        <a:defRPr/>
+                      </a:pPr>
+                      <a:r>
+                        <a:rPr lang="en-US" altLang="ko-KR" b="1">
+                          <a:solidFill>
+                            <a:schemeClr val="lt1"/>
+                          </a:solidFill>
+                        </a:rPr>
+                        <a:t>7</a:t>
+                      </a:r>
+                      <a:endParaRPr lang="en-US" altLang="ko-KR" b="1">
+                        <a:solidFill>
+                          <a:schemeClr val="lt1"/>
+                        </a:solidFill>
+                      </a:endParaRPr>
+                    </a:p>
+                  </a:txBody>
+                  <a:tcPr marL="91440" marR="91440"/>
+                </a:tc>
+                <a:tc>
+                  <a:txBody>
+                    <a:bodyPr vert="horz" wrap="square" lIns="91440" tIns="45720" rIns="91440" bIns="45720" anchor="t" anchorCtr="0">
+                      <a:spAutoFit/>
+                    </a:bodyPr>
+                    <a:p>
+                      <a:pPr algn="ctr">
+                        <a:defRPr/>
+                      </a:pPr>
+                      <a:r>
+                        <a:rPr lang="en-US" altLang="ko-KR" b="1">
+                          <a:solidFill>
+                            <a:schemeClr val="lt1"/>
+                          </a:solidFill>
+                        </a:rPr>
+                        <a:t>6</a:t>
+                      </a:r>
+                      <a:endParaRPr lang="en-US" altLang="ko-KR" b="1">
+                        <a:solidFill>
+                          <a:schemeClr val="lt1"/>
+                        </a:solidFill>
+                      </a:endParaRPr>
+                    </a:p>
+                  </a:txBody>
+                  <a:tcPr marL="91440" marR="91440">
+                    <a:solidFill>
+                      <a:schemeClr val="accent2"/>
+                    </a:solidFill>
+                  </a:tcPr>
+                </a:tc>
+                <a:tc>
+                  <a:txBody>
+                    <a:bodyPr vert="horz" wrap="square" lIns="91440" tIns="45720" rIns="91440" bIns="45720" anchor="t" anchorCtr="0">
+                      <a:spAutoFit/>
+                    </a:bodyPr>
+                    <a:p>
+                      <a:pPr algn="ctr">
+                        <a:defRPr/>
+                      </a:pPr>
+                      <a:r>
+                        <a:rPr lang="en-US" altLang="ko-KR" b="1">
+                          <a:solidFill>
+                            <a:schemeClr val="lt1"/>
+                          </a:solidFill>
+                        </a:rPr>
+                        <a:t>5</a:t>
+                      </a:r>
+                      <a:endParaRPr lang="en-US" altLang="ko-KR" b="1">
+                        <a:solidFill>
+                          <a:schemeClr val="lt1"/>
+                        </a:solidFill>
+                      </a:endParaRPr>
+                    </a:p>
+                  </a:txBody>
+                  <a:tcPr marL="91440" marR="91440"/>
+                </a:tc>
+                <a:tc>
+                  <a:txBody>
+                    <a:bodyPr vert="horz" wrap="square" lIns="91440" tIns="45720" rIns="91440" bIns="45720" anchor="t" anchorCtr="0">
+                      <a:spAutoFit/>
+                    </a:bodyPr>
+                    <a:p>
+                      <a:pPr algn="ctr">
+                        <a:defRPr/>
+                      </a:pPr>
+                      <a:r>
+                        <a:rPr lang="en-US" altLang="ko-KR" b="1">
+                          <a:solidFill>
+                            <a:schemeClr val="lt1"/>
+                          </a:solidFill>
+                        </a:rPr>
+                        <a:t>4</a:t>
+                      </a:r>
+                      <a:endParaRPr lang="en-US" altLang="ko-KR" b="1">
+                        <a:solidFill>
+                          <a:schemeClr val="lt1"/>
+                        </a:solidFill>
+                      </a:endParaRPr>
+                    </a:p>
+                  </a:txBody>
+                  <a:tcPr marL="91440" marR="91440"/>
+                </a:tc>
+                <a:tc>
+                  <a:txBody>
+                    <a:bodyPr vert="horz" wrap="square" lIns="91440" tIns="45720" rIns="91440" bIns="45720" anchor="t" anchorCtr="0">
+                      <a:spAutoFit/>
+                    </a:bodyPr>
+                    <a:p>
+                      <a:pPr algn="ctr">
+                        <a:defRPr/>
+                      </a:pPr>
+                      <a:r>
+                        <a:rPr lang="en-US" altLang="ko-KR" b="1">
+                          <a:solidFill>
+                            <a:schemeClr val="lt1"/>
+                          </a:solidFill>
+                        </a:rPr>
+                        <a:t>3</a:t>
+                      </a:r>
+                      <a:endParaRPr lang="en-US" altLang="ko-KR" b="1">
+                        <a:solidFill>
+                          <a:schemeClr val="lt1"/>
+                        </a:solidFill>
+                      </a:endParaRPr>
+                    </a:p>
+                  </a:txBody>
+                  <a:tcPr marL="91440" marR="91440">
+                    <a:solidFill>
+                      <a:schemeClr val="accent5"/>
+                    </a:solidFill>
+                  </a:tcPr>
+                </a:tc>
+                <a:tc>
+                  <a:txBody>
+                    <a:bodyPr vert="horz" wrap="square" lIns="91440" tIns="45720" rIns="91440" bIns="45720" anchor="t" anchorCtr="0">
+                      <a:spAutoFit/>
+                    </a:bodyPr>
+                    <a:p>
+                      <a:pPr algn="ctr">
+                        <a:defRPr/>
+                      </a:pPr>
+                      <a:r>
+                        <a:rPr lang="en-US" altLang="ko-KR" b="1">
+                          <a:solidFill>
+                            <a:schemeClr val="lt1"/>
+                          </a:solidFill>
+                        </a:rPr>
+                        <a:t>2</a:t>
+                      </a:r>
+                      <a:endParaRPr lang="en-US" altLang="ko-KR" b="1">
+                        <a:solidFill>
+                          <a:schemeClr val="lt1"/>
+                        </a:solidFill>
+                      </a:endParaRPr>
+                    </a:p>
+                  </a:txBody>
+                  <a:tcPr marL="91440" marR="91440">
+                    <a:solidFill>
+                      <a:schemeClr val="accent6"/>
+                    </a:solidFill>
+                  </a:tcPr>
+                </a:tc>
+                <a:tc>
+                  <a:txBody>
+                    <a:bodyPr vert="horz" wrap="square" lIns="91440" tIns="45720" rIns="91440" bIns="45720" anchor="t" anchorCtr="0">
+                      <a:spAutoFit/>
+                    </a:bodyPr>
+                    <a:p>
+                      <a:pPr algn="ctr">
+                        <a:defRPr/>
+                      </a:pPr>
+                      <a:r>
+                        <a:rPr lang="en-US" altLang="ko-KR" b="1">
+                          <a:solidFill>
+                            <a:schemeClr val="lt1"/>
+                          </a:solidFill>
+                          <a:latin typeface="Calibri"/>
+                          <a:ea typeface="맑은 고딕"/>
+                          <a:cs typeface="Times New Roman"/>
+                        </a:rPr>
+                        <a:t>2</a:t>
+                      </a:r>
+                      <a:endParaRPr lang="en-US" altLang="ko-KR" b="1">
+                        <a:solidFill>
+                          <a:schemeClr val="lt1"/>
+                        </a:solidFill>
+                        <a:latin typeface="Calibri"/>
+                        <a:ea typeface="맑은 고딕"/>
+                        <a:cs typeface="Times New Roman"/>
+                      </a:endParaRPr>
+                    </a:p>
+                  </a:txBody>
+                  <a:tcPr marL="91440" marR="91440"/>
+                </a:tc>
+                <a:tc>
+                  <a:txBody>
+                    <a:bodyPr vert="horz" wrap="square" lIns="91440" tIns="45720" rIns="91440" bIns="45720" anchor="t" anchorCtr="0">
+                      <a:spAutoFit/>
+                    </a:bodyPr>
+                    <a:p>
+                      <a:pPr algn="ctr">
+                        <a:defRPr/>
+                      </a:pPr>
+                      <a:r>
+                        <a:rPr lang="en-US" altLang="ko-KR" b="1">
+                          <a:solidFill>
+                            <a:schemeClr val="lt1"/>
+                          </a:solidFill>
+                        </a:rPr>
+                        <a:t>1</a:t>
+                      </a:r>
+                      <a:endParaRPr lang="en-US" altLang="ko-KR" b="1">
+                        <a:solidFill>
+                          <a:schemeClr val="lt1"/>
+                        </a:solidFill>
+                      </a:endParaRPr>
+                    </a:p>
+                  </a:txBody>
+                  <a:tcPr marL="91440" marR="91440"/>
+                </a:tc>
+                <a:tc>
+                  <a:txBody>
+                    <a:bodyPr vert="horz" wrap="square" lIns="91440" tIns="45720" rIns="91440" bIns="45720" anchor="t" anchorCtr="0">
+                      <a:spAutoFit/>
+                    </a:bodyPr>
+                    <a:p>
+                      <a:pPr algn="ctr">
+                        <a:defRPr/>
+                      </a:pPr>
+                      <a:r>
+                        <a:rPr lang="en-US" altLang="ko-KR" b="1">
+                          <a:solidFill>
+                            <a:schemeClr val="lt1"/>
+                          </a:solidFill>
+                        </a:rPr>
+                        <a:t>3</a:t>
+                      </a:r>
+                      <a:endParaRPr lang="en-US" altLang="ko-KR" b="1">
+                        <a:solidFill>
+                          <a:schemeClr val="lt1"/>
+                        </a:solidFill>
+                      </a:endParaRPr>
+                    </a:p>
+                  </a:txBody>
+                  <a:tcPr marL="91440" marR="91440"/>
+                </a:tc>
+                <a:tc>
+                  <a:txBody>
+                    <a:bodyPr vert="horz" wrap="square" lIns="91440" tIns="45720" rIns="91440" bIns="45720" anchor="t" anchorCtr="0">
+                      <a:spAutoFit/>
+                    </a:bodyPr>
+                    <a:p>
+                      <a:pPr algn="ctr">
+                        <a:defRPr/>
+                      </a:pPr>
+                      <a:endParaRPr lang="ko-KR" altLang="en-US" b="1">
+                        <a:solidFill>
+                          <a:schemeClr val="lt1"/>
+                        </a:solidFill>
+                      </a:endParaRPr>
+                    </a:p>
+                  </a:txBody>
+                  <a:tcPr marL="91440" marR="91440"/>
+                </a:tc>
+              </a:tr>
+            </a:tbl>
+          </a:graphicData>
+        </a:graphic>
+      </p:graphicFrame>
+      <p:sp>
+        <p:nvSpPr>
+          <p:cNvPr id="26" name=""/>
+          <p:cNvSpPr txBox="1"/>
+          <p:nvPr/>
+        </p:nvSpPr>
+        <p:spPr>
+          <a:xfrm>
+            <a:off x="5884121" y="834271"/>
+            <a:ext cx="303339" cy="367478"/>
+          </a:xfrm>
+          <a:prstGeom prst="rect">
+            <a:avLst/>
+          </a:prstGeom>
+        </p:spPr>
+        <p:txBody>
+          <a:bodyPr wrap="square">
+            <a:spAutoFit/>
+          </a:bodyPr>
+          <a:p>
+            <a:pPr>
+              <a:defRPr/>
+            </a:pPr>
+            <a:r>
+              <a:rPr lang="en-US" altLang="ko-KR" b="1"/>
+              <a:t>1</a:t>
+            </a:r>
+            <a:endParaRPr lang="en-US" altLang="ko-KR" b="1"/>
+          </a:p>
+        </p:txBody>
+      </p:sp>
+      <p:sp>
+        <p:nvSpPr>
+          <p:cNvPr id="27" name=""/>
+          <p:cNvSpPr txBox="1"/>
+          <p:nvPr/>
+        </p:nvSpPr>
+        <p:spPr>
+          <a:xfrm>
+            <a:off x="4402111" y="1870382"/>
+            <a:ext cx="299429" cy="367580"/>
+          </a:xfrm>
+          <a:prstGeom prst="rect">
+            <a:avLst/>
+          </a:prstGeom>
+        </p:spPr>
+        <p:txBody>
+          <a:bodyPr wrap="none">
+            <a:spAutoFit/>
+          </a:bodyPr>
+          <a:p>
+            <a:pPr>
+              <a:defRPr/>
+            </a:pPr>
+            <a:r>
+              <a:rPr lang="en-US" altLang="ko-KR" b="1"/>
+              <a:t>2</a:t>
+            </a:r>
+            <a:endParaRPr lang="en-US" altLang="ko-KR" b="1"/>
+          </a:p>
+        </p:txBody>
+      </p:sp>
+      <p:sp>
+        <p:nvSpPr>
+          <p:cNvPr id="28" name=""/>
+          <p:cNvSpPr txBox="1"/>
+          <p:nvPr/>
+        </p:nvSpPr>
+        <p:spPr>
+          <a:xfrm>
+            <a:off x="7438554" y="1870382"/>
+            <a:ext cx="306594" cy="366088"/>
+          </a:xfrm>
+          <a:prstGeom prst="rect">
+            <a:avLst/>
+          </a:prstGeom>
+        </p:spPr>
+        <p:txBody>
+          <a:bodyPr wrap="square">
+            <a:spAutoFit/>
+          </a:bodyPr>
+          <a:p>
+            <a:pPr>
+              <a:defRPr/>
+            </a:pPr>
+            <a:r>
+              <a:rPr lang="en-US" altLang="ko-KR" b="1"/>
+              <a:t>3</a:t>
+            </a:r>
+            <a:endParaRPr lang="en-US" altLang="ko-KR" b="1"/>
+          </a:p>
+        </p:txBody>
+      </p:sp>
+      <p:sp>
+        <p:nvSpPr>
+          <p:cNvPr id="29" name=""/>
+          <p:cNvSpPr txBox="1"/>
+          <p:nvPr/>
+        </p:nvSpPr>
+        <p:spPr>
+          <a:xfrm>
+            <a:off x="6426387" y="2774176"/>
+            <a:ext cx="306594" cy="367169"/>
+          </a:xfrm>
+          <a:prstGeom prst="rect">
+            <a:avLst/>
+          </a:prstGeom>
+        </p:spPr>
+        <p:txBody>
+          <a:bodyPr wrap="square">
+            <a:spAutoFit/>
+          </a:bodyPr>
+          <a:p>
+            <a:pPr>
+              <a:defRPr/>
+            </a:pPr>
+            <a:r>
+              <a:rPr lang="en-US" altLang="ko-KR" b="1"/>
+              <a:t>6</a:t>
+            </a:r>
+            <a:endParaRPr lang="en-US" altLang="ko-KR" b="1"/>
+          </a:p>
+        </p:txBody>
+      </p:sp>
+      <p:sp>
+        <p:nvSpPr>
+          <p:cNvPr id="30" name=""/>
+          <p:cNvSpPr txBox="1"/>
+          <p:nvPr/>
+        </p:nvSpPr>
+        <p:spPr>
+          <a:xfrm>
+            <a:off x="8449806" y="2774176"/>
+            <a:ext cx="306594" cy="367581"/>
+          </a:xfrm>
+          <a:prstGeom prst="rect">
+            <a:avLst/>
+          </a:prstGeom>
+        </p:spPr>
+        <p:txBody>
+          <a:bodyPr wrap="square">
+            <a:spAutoFit/>
+          </a:bodyPr>
+          <a:p>
+            <a:pPr>
+              <a:defRPr/>
+            </a:pPr>
+            <a:r>
+              <a:rPr lang="en-US" altLang="ko-KR" b="1"/>
+              <a:t>7</a:t>
+            </a:r>
+            <a:endParaRPr lang="en-US" altLang="ko-KR" b="1"/>
+          </a:p>
+        </p:txBody>
+      </p:sp>
+      <p:sp>
+        <p:nvSpPr>
+          <p:cNvPr id="31" name=""/>
+          <p:cNvSpPr txBox="1"/>
+          <p:nvPr/>
+        </p:nvSpPr>
+        <p:spPr>
+          <a:xfrm>
+            <a:off x="3404015" y="2774176"/>
+            <a:ext cx="306594" cy="367581"/>
+          </a:xfrm>
+          <a:prstGeom prst="rect">
+            <a:avLst/>
+          </a:prstGeom>
+        </p:spPr>
+        <p:txBody>
+          <a:bodyPr wrap="square">
+            <a:spAutoFit/>
+          </a:bodyPr>
+          <a:p>
+            <a:pPr>
+              <a:defRPr/>
+            </a:pPr>
+            <a:r>
+              <a:rPr lang="en-US" altLang="ko-KR" b="1"/>
+              <a:t>4</a:t>
+            </a:r>
+            <a:endParaRPr lang="en-US" altLang="ko-KR" b="1"/>
+          </a:p>
+        </p:txBody>
+      </p:sp>
+      <p:sp>
+        <p:nvSpPr>
+          <p:cNvPr id="32" name=""/>
+          <p:cNvSpPr txBox="1"/>
+          <p:nvPr/>
+        </p:nvSpPr>
+        <p:spPr>
+          <a:xfrm>
+            <a:off x="5437619" y="2774176"/>
+            <a:ext cx="306594" cy="367581"/>
+          </a:xfrm>
+          <a:prstGeom prst="rect">
+            <a:avLst/>
+          </a:prstGeom>
+        </p:spPr>
+        <p:txBody>
+          <a:bodyPr wrap="square">
+            <a:spAutoFit/>
+          </a:bodyPr>
+          <a:p>
+            <a:pPr>
+              <a:defRPr/>
+            </a:pPr>
+            <a:r>
+              <a:rPr lang="en-US" altLang="ko-KR" b="1"/>
+              <a:t>5</a:t>
+            </a:r>
+            <a:endParaRPr lang="en-US" altLang="ko-KR" b="1"/>
+          </a:p>
+        </p:txBody>
+      </p:sp>
+      <p:sp>
+        <p:nvSpPr>
+          <p:cNvPr id="33" name=""/>
+          <p:cNvSpPr txBox="1"/>
+          <p:nvPr/>
+        </p:nvSpPr>
+        <p:spPr>
+          <a:xfrm>
+            <a:off x="2752087" y="3602130"/>
+            <a:ext cx="306594" cy="367581"/>
+          </a:xfrm>
+          <a:prstGeom prst="rect">
+            <a:avLst/>
+          </a:prstGeom>
+        </p:spPr>
+        <p:txBody>
+          <a:bodyPr wrap="square">
+            <a:spAutoFit/>
+          </a:bodyPr>
+          <a:p>
+            <a:pPr>
+              <a:defRPr/>
+            </a:pPr>
+            <a:r>
+              <a:rPr lang="en-US" altLang="ko-KR" b="1"/>
+              <a:t>8</a:t>
+            </a:r>
+            <a:endParaRPr lang="en-US" altLang="ko-KR" b="1"/>
+          </a:p>
+        </p:txBody>
+      </p:sp>
+      <p:sp>
+        <p:nvSpPr>
+          <p:cNvPr id="34" name=""/>
+          <p:cNvSpPr txBox="1"/>
+          <p:nvPr/>
+        </p:nvSpPr>
+        <p:spPr>
+          <a:xfrm>
+            <a:off x="4282650" y="3602130"/>
+            <a:ext cx="306594" cy="367581"/>
+          </a:xfrm>
+          <a:prstGeom prst="rect">
+            <a:avLst/>
+          </a:prstGeom>
+        </p:spPr>
+        <p:txBody>
+          <a:bodyPr wrap="square">
+            <a:spAutoFit/>
+          </a:bodyPr>
+          <a:p>
+            <a:pPr>
+              <a:defRPr/>
+            </a:pPr>
+            <a:r>
+              <a:rPr lang="en-US" altLang="ko-KR" b="1"/>
+              <a:t>9</a:t>
+            </a:r>
+            <a:endParaRPr lang="en-US" altLang="ko-KR" b="1"/>
+          </a:p>
+        </p:txBody>
+      </p:sp>
+      <p:sp>
+        <p:nvSpPr>
+          <p:cNvPr id="35" name=""/>
+          <p:cNvSpPr txBox="1"/>
+          <p:nvPr/>
+        </p:nvSpPr>
+        <p:spPr>
+          <a:xfrm>
+            <a:off x="4649021" y="3602130"/>
+            <a:ext cx="451909" cy="358365"/>
+          </a:xfrm>
+          <a:prstGeom prst="rect">
+            <a:avLst/>
+          </a:prstGeom>
+        </p:spPr>
+        <p:txBody>
+          <a:bodyPr wrap="square">
+            <a:spAutoFit/>
+          </a:bodyPr>
+          <a:p>
+            <a:pPr algn="r">
+              <a:defRPr/>
+            </a:pPr>
+            <a:r>
+              <a:rPr lang="en-US" altLang="ko-KR" b="1"/>
+              <a:t>10</a:t>
+            </a:r>
+            <a:endParaRPr lang="en-US" altLang="ko-KR" b="1"/>
+          </a:p>
+        </p:txBody>
+      </p:sp>
+      <p:sp>
+        <p:nvSpPr>
+          <p:cNvPr id="36" name=""/>
+          <p:cNvSpPr txBox="1"/>
+          <p:nvPr/>
+        </p:nvSpPr>
+        <p:spPr>
+          <a:xfrm>
+            <a:off x="8017908" y="2322093"/>
+            <a:ext cx="1831572" cy="365760"/>
+          </a:xfrm>
+          <a:prstGeom prst="rect">
+            <a:avLst/>
+          </a:prstGeom>
+        </p:spPr>
+        <p:txBody>
+          <a:bodyPr wrap="square">
+            <a:spAutoFit/>
+          </a:bodyPr>
+          <a:p>
+            <a:pPr>
+              <a:defRPr/>
+            </a:pPr>
+            <a:r>
+              <a:rPr lang="en-US" altLang="ko-KR"/>
+              <a:t>parent : i</a:t>
+            </a:r>
+            <a:endParaRPr lang="en-US" altLang="ko-KR"/>
+          </a:p>
+        </p:txBody>
+      </p:sp>
+      <p:sp>
+        <p:nvSpPr>
+          <p:cNvPr id="37" name=""/>
+          <p:cNvSpPr txBox="1"/>
+          <p:nvPr/>
+        </p:nvSpPr>
+        <p:spPr>
+          <a:xfrm>
+            <a:off x="5914699" y="3716243"/>
+            <a:ext cx="1831572" cy="365760"/>
+          </a:xfrm>
+          <a:prstGeom prst="rect">
+            <a:avLst/>
+          </a:prstGeom>
+        </p:spPr>
+        <p:txBody>
+          <a:bodyPr wrap="square">
+            <a:spAutoFit/>
+          </a:bodyPr>
+          <a:p>
+            <a:pPr>
+              <a:defRPr/>
+            </a:pPr>
+            <a:r>
+              <a:rPr lang="en-US" altLang="ko-KR"/>
+              <a:t>left child : 2 * i</a:t>
+            </a:r>
+            <a:endParaRPr lang="en-US" altLang="ko-KR"/>
+          </a:p>
+        </p:txBody>
+      </p:sp>
+      <p:sp>
+        <p:nvSpPr>
+          <p:cNvPr id="38" name=""/>
+          <p:cNvSpPr txBox="1"/>
+          <p:nvPr/>
+        </p:nvSpPr>
+        <p:spPr>
+          <a:xfrm>
+            <a:off x="7758134" y="3716243"/>
+            <a:ext cx="2091346" cy="358552"/>
+          </a:xfrm>
+          <a:prstGeom prst="rect">
+            <a:avLst/>
+          </a:prstGeom>
+        </p:spPr>
+        <p:txBody>
+          <a:bodyPr wrap="square">
+            <a:spAutoFit/>
+          </a:bodyPr>
+          <a:p>
+            <a:pPr>
+              <a:defRPr/>
+            </a:pPr>
+            <a:r>
+              <a:rPr lang="en-US" altLang="ko-KR"/>
+              <a:t>right child : 2 * i + 1</a:t>
+            </a:r>
+            <a:endParaRPr lang="en-US" altLang="ko-KR"/>
+          </a:p>
+        </p:txBody>
+      </p:sp>
+      <p:sp>
+        <p:nvSpPr>
+          <p:cNvPr id="39" name=""/>
+          <p:cNvSpPr/>
+          <p:nvPr/>
+        </p:nvSpPr>
+        <p:spPr>
+          <a:xfrm rot="5400000">
+            <a:off x="5279536" y="4737755"/>
+            <a:ext cx="206368" cy="1761302"/>
+          </a:xfrm>
+          <a:prstGeom prst="rightBracket">
+            <a:avLst>
+              <a:gd name="adj" fmla="val 55646"/>
+            </a:avLst>
+          </a:prstGeom>
+          <a:ln w="28575">
+            <a:solidFill>
+              <a:schemeClr val="accent1">
+                <a:satMod val="105000"/>
+              </a:schemeClr>
+            </a:solidFill>
+          </a:ln>
+        </p:spPr>
+        <p:style>
+          <a:lnRef idx="1">
+            <a:schemeClr val="accent1"/>
+          </a:lnRef>
+          <a:fillRef idx="0">
+            <a:schemeClr val="accent1"/>
+          </a:fillRef>
+          <a:effectRef idx="0">
+            <a:schemeClr val="accent1"/>
+          </a:effectRef>
+          <a:fontRef idx="minor">
+            <a:schemeClr val="tx1"/>
+          </a:fontRef>
+        </p:style>
+        <p:txBody>
+          <a:bodyPr anchor="ctr"/>
+          <a:p>
+            <a:pPr algn="ctr">
+              <a:defRPr/>
+            </a:pPr>
+            <a:endParaRPr lang="en-US" altLang="ko-KR">
+              <a:solidFill>
+                <a:schemeClr val="tx1"/>
+              </a:solidFill>
+            </a:endParaRPr>
+          </a:p>
+        </p:txBody>
+      </p:sp>
+      <p:sp>
+        <p:nvSpPr>
+          <p:cNvPr id="40" name=""/>
+          <p:cNvSpPr/>
+          <p:nvPr/>
+        </p:nvSpPr>
+        <p:spPr>
+          <a:xfrm rot="5400000">
+            <a:off x="5489870" y="4529938"/>
+            <a:ext cx="344913" cy="2338575"/>
+          </a:xfrm>
+          <a:prstGeom prst="rightBracket">
+            <a:avLst>
+              <a:gd name="adj" fmla="val 53907"/>
+            </a:avLst>
+          </a:prstGeom>
+          <a:ln w="28575">
+            <a:solidFill>
+              <a:schemeClr val="accent1">
+                <a:satMod val="105000"/>
+              </a:schemeClr>
+            </a:solidFill>
+          </a:ln>
+        </p:spPr>
+        <p:style>
+          <a:lnRef idx="1">
+            <a:schemeClr val="accent1"/>
+          </a:lnRef>
+          <a:fillRef idx="0">
+            <a:schemeClr val="accent1"/>
+          </a:fillRef>
+          <a:effectRef idx="0">
+            <a:schemeClr val="accent1"/>
+          </a:effectRef>
+          <a:fontRef idx="minor">
+            <a:schemeClr val="tx1"/>
+          </a:fontRef>
+        </p:style>
+        <p:txBody>
+          <a:bodyPr anchor="ctr"/>
+          <a:p>
+            <a:pPr algn="ctr">
+              <a:defRPr/>
+            </a:pPr>
+            <a:endParaRPr lang="en-US" altLang="ko-KR">
+              <a:solidFill>
+                <a:schemeClr val="tx1"/>
+              </a:solidFill>
+            </a:endParaRPr>
+          </a:p>
+        </p:txBody>
+      </p:sp>
+    </p:spTree>
+  </p:cSld>
+  <p:clrMapOvr>
+    <a:masterClrMapping/>
+  </p:clrMapOvr>
+  <mc:AlternateContent xmlns:mc="http://schemas.openxmlformats.org/markup-compatibility/2006">
+    <mc:Choice xmlns:p14="http://schemas.microsoft.com/office/powerpoint/2010/main" Requires="p14">
+      <p:transition xmlns:mc="http://schemas.openxmlformats.org/markup-compatibility/2006" xmlns:p14="http://schemas.microsoft.com/office/powerpoint/2010/main" mc:Ignorable="p14" p14:dur="500"/>
+    </mc:Choice>
+    <mc:Fallback>
+      <p:transition/>
+    </mc:Fallback>
+  </mc:AlternateContent>
+</p:sld>
+</file>
+
 <file path=ppt/slides/slide2.xml><?xml version="1.0" encoding="utf-8"?>
 <p:sld xmlns:r="http://schemas.openxmlformats.org/officeDocument/2006/relationships" xmlns:c="http://schemas.openxmlformats.org/drawingml/2006/chart" xmlns:a="http://schemas.openxmlformats.org/drawingml/2006/main" xmlns:dgm="http://schemas.openxmlformats.org/drawingml/2006/diagram" xmlns:dsp="http://schemas.microsoft.com/office/drawing/2008/diagram" xmlns:p="http://schemas.openxmlformats.org/presentationml/2006/main">
   <p:cSld>

</xml_diff>

<commit_message>
add image "B-Tree & B+Tree"
</commit_message>
<xml_diff>
--- a/etc/images.pptx
+++ b/etc/images.pptx
@@ -2,7 +2,7 @@
 <file path=ppt/presentation.xml><?xml version="1.0" encoding="utf-8"?>
 <p:presentation xmlns:r="http://schemas.openxmlformats.org/officeDocument/2006/relationships" xmlns:c="http://schemas.openxmlformats.org/drawingml/2006/chart" xmlns:a="http://schemas.openxmlformats.org/drawingml/2006/main" xmlns:dgm="http://schemas.openxmlformats.org/drawingml/2006/diagram" xmlns:dsp="http://schemas.microsoft.com/office/drawing/2008/diagram" xmlns:p="http://schemas.openxmlformats.org/presentationml/2006/main">
   <p:sldMasterIdLst>
-    <p:sldMasterId id="2147483756" r:id="rId1"/>
+    <p:sldMasterId id="2147483726" r:id="rId1"/>
   </p:sldMasterIdLst>
   <p:notesMasterIdLst>
     <p:notesMasterId r:id="rId2"/>
@@ -33,6 +33,7 @@
     <p:sldId id="278" r:id="rId25"/>
     <p:sldId id="279" r:id="rId26"/>
     <p:sldId id="280" r:id="rId27"/>
+    <p:sldId id="281" r:id="rId28"/>
   </p:sldIdLst>
   <p:sldSz cx="12192000" cy="6858000"/>
   <p:notesSz cx="6858000" cy="9144000"/>
@@ -39382,7 +39383,7 @@
                 <a:ea typeface="맑은 고딕"/>
                 <a:cs typeface="Times New Roman"/>
               </a:rPr>
-              <a:t>10</a:t>
+              <a:t>12</a:t>
             </a:r>
             <a:endParaRPr xmlns:mc="http://schemas.openxmlformats.org/markup-compatibility/2006" xmlns:hp="http://schemas.haansoft.com/office/presentation/8.0" kumimoji="0" lang="en-US" altLang="ko-KR" sz="1800" b="1" i="0" u="none" strike="noStrike" kern="1200" cap="none" spc="0" normalizeH="0" baseline="0" mc:Ignorable="hp" hp:hslEmbossed="0">
               <a:solidFill>
@@ -41038,7 +41039,7 @@
                 <a:ea typeface="맑은 고딕"/>
                 <a:cs typeface="Times New Roman"/>
               </a:rPr>
-              <a:t>10</a:t>
+              <a:t>12</a:t>
             </a:r>
             <a:endParaRPr xmlns:mc="http://schemas.openxmlformats.org/markup-compatibility/2006" xmlns:hp="http://schemas.haansoft.com/office/presentation/8.0" kumimoji="0" lang="en-US" altLang="ko-KR" sz="1800" b="1" i="0" u="none" strike="noStrike" kern="1200" cap="none" spc="0" normalizeH="0" baseline="0" mc:Ignorable="hp" hp:hslEmbossed="0">
               <a:solidFill>
@@ -42597,7 +42598,7 @@
                 <a:ea typeface="맑은 고딕"/>
                 <a:cs typeface="Times New Roman"/>
               </a:rPr>
-              <a:t>10</a:t>
+              <a:t>12</a:t>
             </a:r>
             <a:endParaRPr xmlns:mc="http://schemas.openxmlformats.org/markup-compatibility/2006" xmlns:hp="http://schemas.haansoft.com/office/presentation/8.0" kumimoji="0" lang="en-US" altLang="ko-KR" sz="1800" b="1" i="0" u="none" strike="noStrike" kern="1200" cap="none" spc="0" normalizeH="0" baseline="0" mc:Ignorable="hp" hp:hslEmbossed="0">
               <a:solidFill>
@@ -43864,6 +43865,3820 @@
               <a:t>작업 수행</a:t>
             </a:r>
             <a:endParaRPr xmlns:mc="http://schemas.openxmlformats.org/markup-compatibility/2006" xmlns:hp="http://schemas.haansoft.com/office/presentation/8.0" kumimoji="0" lang="ko-KR" altLang="en-US" sz="1200" b="0" i="0" u="none" strike="noStrike" kern="1200" cap="none" spc="0" normalizeH="0" baseline="0" mc:Ignorable="hp" hp:hslEmbossed="0">
+              <a:solidFill>
+                <a:srgbClr val="000000"/>
+              </a:solidFill>
+              <a:latin typeface="Calibri"/>
+              <a:ea typeface="맑은 고딕"/>
+              <a:cs typeface="Times New Roman"/>
+            </a:endParaRPr>
+          </a:p>
+        </p:txBody>
+      </p:sp>
+    </p:spTree>
+  </p:cSld>
+  <p:clrMapOvr>
+    <a:masterClrMapping/>
+  </p:clrMapOvr>
+  <mc:AlternateContent xmlns:mc="http://schemas.openxmlformats.org/markup-compatibility/2006">
+    <mc:Choice xmlns:p14="http://schemas.microsoft.com/office/powerpoint/2010/main" Requires="p14">
+      <p:transition xmlns:mc="http://schemas.openxmlformats.org/markup-compatibility/2006" xmlns:p14="http://schemas.microsoft.com/office/powerpoint/2010/main" mc:Ignorable="p14" p14:dur="500"/>
+    </mc:Choice>
+    <mc:Fallback>
+      <p:transition/>
+    </mc:Fallback>
+  </mc:AlternateContent>
+</p:sld>
+</file>
+
+<file path=ppt/slides/slide26.xml><?xml version="1.0" encoding="utf-8"?>
+<p:sld xmlns:r="http://schemas.openxmlformats.org/officeDocument/2006/relationships" xmlns:c="http://schemas.openxmlformats.org/drawingml/2006/chart" xmlns:a="http://schemas.openxmlformats.org/drawingml/2006/main" xmlns:dgm="http://schemas.openxmlformats.org/drawingml/2006/diagram" xmlns:dsp="http://schemas.microsoft.com/office/drawing/2008/diagram" xmlns:p="http://schemas.openxmlformats.org/presentationml/2006/main">
+  <p:cSld>
+    <p:spTree>
+      <p:nvGrpSpPr>
+        <p:cNvPr id="1" name=""/>
+        <p:cNvGrpSpPr/>
+        <p:nvPr/>
+      </p:nvGrpSpPr>
+      <p:grpSpPr>
+        <a:xfrm>
+          <a:off x="0" y="0"/>
+          <a:ext cx="0" cy="0"/>
+          <a:chOff x="0" y="0"/>
+          <a:chExt cx="0" cy="0"/>
+        </a:xfrm>
+      </p:grpSpPr>
+      <p:cxnSp>
+        <p:nvCxnSpPr>
+          <p:cNvPr id="4" name=""/>
+          <p:cNvCxnSpPr/>
+          <p:nvPr/>
+        </p:nvCxnSpPr>
+        <p:spPr>
+          <a:xfrm>
+            <a:off x="3903143" y="1717585"/>
+            <a:ext cx="1090800" cy="653918"/>
+          </a:xfrm>
+          <a:prstGeom prst="line">
+            <a:avLst/>
+          </a:prstGeom>
+          <a:noFill/>
+          <a:ln w="28575" cap="flat" cmpd="sng" algn="ctr">
+            <a:solidFill>
+              <a:srgbClr val="000000">
+                <a:alpha val="100000"/>
+              </a:srgbClr>
+            </a:solidFill>
+            <a:prstDash val="solid"/>
+          </a:ln>
+        </p:spPr>
+      </p:cxnSp>
+      <p:sp>
+        <p:nvSpPr>
+          <p:cNvPr id="5" name=""/>
+          <p:cNvSpPr/>
+          <p:nvPr/>
+        </p:nvSpPr>
+        <p:spPr>
+          <a:xfrm>
+            <a:off x="2940747" y="1352172"/>
+            <a:ext cx="481198" cy="365413"/>
+          </a:xfrm>
+          <a:prstGeom prst="rect">
+            <a:avLst/>
+          </a:prstGeom>
+          <a:ln>
+            <a:headEnd w="med" len="med"/>
+            <a:tailEnd w="med" len="med"/>
+          </a:ln>
+        </p:spPr>
+        <p:style>
+          <a:lnRef idx="2">
+            <a:schemeClr val="accent1">
+              <a:shade val="20000"/>
+            </a:schemeClr>
+          </a:lnRef>
+          <a:fillRef idx="1">
+            <a:schemeClr val="accent1"/>
+          </a:fillRef>
+          <a:effectRef idx="0">
+            <a:schemeClr val="accent1"/>
+          </a:effectRef>
+          <a:fontRef idx="minor">
+            <a:schemeClr val="lt1"/>
+          </a:fontRef>
+        </p:style>
+        <p:txBody>
+          <a:bodyPr anchor="ctr"/>
+          <a:p>
+            <a:pPr marL="0" indent="0" algn="ctr" defTabSz="914400" rtl="0" eaLnBrk="1" latinLnBrk="1" hangingPunct="1">
+              <a:lnSpc>
+                <a:spcPct val="100000"/>
+              </a:lnSpc>
+              <a:spcBef>
+                <a:spcPct val="0"/>
+              </a:spcBef>
+              <a:spcAft>
+                <a:spcPts val="0"/>
+              </a:spcAft>
+              <a:buNone/>
+              <a:defRPr/>
+            </a:pPr>
+            <a:r>
+              <a:rPr xmlns:mc="http://schemas.openxmlformats.org/markup-compatibility/2006" xmlns:hp="http://schemas.haansoft.com/office/presentation/8.0" kumimoji="0" lang="en-US" altLang="ko-KR" sz="1800" b="1" i="0" u="none" strike="noStrike" kern="1200" cap="none" spc="0" normalizeH="0" baseline="0" mc:Ignorable="hp" hp:hslEmbossed="0">
+                <a:solidFill>
+                  <a:srgbClr val="ffffff"/>
+                </a:solidFill>
+                <a:latin typeface="Calibri"/>
+                <a:ea typeface="맑은 고딕"/>
+                <a:cs typeface="Times New Roman"/>
+              </a:rPr>
+              <a:t>5</a:t>
+            </a:r>
+            <a:endParaRPr xmlns:mc="http://schemas.openxmlformats.org/markup-compatibility/2006" xmlns:hp="http://schemas.haansoft.com/office/presentation/8.0" kumimoji="0" lang="en-US" altLang="ko-KR" sz="1800" b="1" i="0" u="none" strike="noStrike" kern="1200" cap="none" spc="0" normalizeH="0" baseline="0" mc:Ignorable="hp" hp:hslEmbossed="0">
+              <a:solidFill>
+                <a:srgbClr val="ffffff"/>
+              </a:solidFill>
+              <a:latin typeface="Calibri"/>
+              <a:ea typeface="맑은 고딕"/>
+              <a:cs typeface="Times New Roman"/>
+            </a:endParaRPr>
+          </a:p>
+        </p:txBody>
+      </p:sp>
+      <p:sp>
+        <p:nvSpPr>
+          <p:cNvPr id="6" name=""/>
+          <p:cNvSpPr/>
+          <p:nvPr/>
+        </p:nvSpPr>
+        <p:spPr>
+          <a:xfrm>
+            <a:off x="3421945" y="1352172"/>
+            <a:ext cx="481198" cy="365413"/>
+          </a:xfrm>
+          <a:prstGeom prst="rect">
+            <a:avLst/>
+          </a:prstGeom>
+          <a:solidFill>
+            <a:srgbClr val="6182d6">
+              <a:alpha val="100000"/>
+            </a:srgbClr>
+          </a:solidFill>
+          <a:ln w="19050" cap="flat" cmpd="sng" algn="ctr">
+            <a:solidFill>
+              <a:srgbClr val="2e3e67">
+                <a:alpha val="100000"/>
+              </a:srgbClr>
+            </a:solidFill>
+            <a:prstDash val="solid"/>
+          </a:ln>
+        </p:spPr>
+        <p:txBody>
+          <a:bodyPr anchor="ctr"/>
+          <a:p>
+            <a:pPr marL="0" indent="0" algn="ctr" defTabSz="914400" rtl="0" eaLnBrk="1" latinLnBrk="1" hangingPunct="1">
+              <a:lnSpc>
+                <a:spcPct val="100000"/>
+              </a:lnSpc>
+              <a:spcBef>
+                <a:spcPct val="0"/>
+              </a:spcBef>
+              <a:spcAft>
+                <a:spcPts val="0"/>
+              </a:spcAft>
+              <a:buNone/>
+              <a:defRPr/>
+            </a:pPr>
+            <a:r>
+              <a:rPr xmlns:mc="http://schemas.openxmlformats.org/markup-compatibility/2006" xmlns:hp="http://schemas.haansoft.com/office/presentation/8.0" kumimoji="0" lang="en-US" altLang="ko-KR" sz="1800" b="1" i="0" u="none" strike="noStrike" kern="1200" cap="none" spc="0" normalizeH="0" baseline="0" mc:Ignorable="hp" hp:hslEmbossed="0">
+                <a:solidFill>
+                  <a:srgbClr val="ffffff"/>
+                </a:solidFill>
+                <a:latin typeface="Calibri"/>
+                <a:ea typeface="맑은 고딕"/>
+                <a:cs typeface="Times New Roman"/>
+              </a:rPr>
+              <a:t>12</a:t>
+            </a:r>
+            <a:endParaRPr xmlns:mc="http://schemas.openxmlformats.org/markup-compatibility/2006" xmlns:hp="http://schemas.haansoft.com/office/presentation/8.0" kumimoji="0" lang="en-US" altLang="ko-KR" sz="1800" b="1" i="0" u="none" strike="noStrike" kern="1200" cap="none" spc="0" normalizeH="0" baseline="0" mc:Ignorable="hp" hp:hslEmbossed="0">
+              <a:solidFill>
+                <a:srgbClr val="ffffff"/>
+              </a:solidFill>
+              <a:latin typeface="Calibri"/>
+              <a:ea typeface="맑은 고딕"/>
+              <a:cs typeface="Times New Roman"/>
+            </a:endParaRPr>
+          </a:p>
+        </p:txBody>
+      </p:sp>
+      <p:sp>
+        <p:nvSpPr>
+          <p:cNvPr id="7" name=""/>
+          <p:cNvSpPr/>
+          <p:nvPr/>
+        </p:nvSpPr>
+        <p:spPr>
+          <a:xfrm>
+            <a:off x="5855401" y="615573"/>
+            <a:ext cx="481198" cy="365413"/>
+          </a:xfrm>
+          <a:prstGeom prst="rect">
+            <a:avLst/>
+          </a:prstGeom>
+          <a:solidFill>
+            <a:srgbClr val="6182d6">
+              <a:alpha val="100000"/>
+            </a:srgbClr>
+          </a:solidFill>
+          <a:ln w="19050" cap="flat" cmpd="sng" algn="ctr">
+            <a:solidFill>
+              <a:srgbClr val="2e3e67">
+                <a:alpha val="100000"/>
+              </a:srgbClr>
+            </a:solidFill>
+            <a:prstDash val="solid"/>
+            <a:headEnd w="med" len="med"/>
+            <a:tailEnd w="med" len="med"/>
+          </a:ln>
+        </p:spPr>
+        <p:txBody>
+          <a:bodyPr anchor="ctr"/>
+          <a:p>
+            <a:pPr marL="0" indent="0" algn="ctr" defTabSz="914400" rtl="0" eaLnBrk="1" latinLnBrk="1" hangingPunct="1">
+              <a:lnSpc>
+                <a:spcPct val="100000"/>
+              </a:lnSpc>
+              <a:spcBef>
+                <a:spcPct val="0"/>
+              </a:spcBef>
+              <a:spcAft>
+                <a:spcPts val="0"/>
+              </a:spcAft>
+              <a:buNone/>
+              <a:defRPr/>
+            </a:pPr>
+            <a:r>
+              <a:rPr xmlns:mc="http://schemas.openxmlformats.org/markup-compatibility/2006" xmlns:hp="http://schemas.haansoft.com/office/presentation/8.0" kumimoji="0" lang="en-US" altLang="ko-KR" sz="1800" b="1" i="0" u="none" strike="noStrike" kern="1200" cap="none" spc="0" normalizeH="0" baseline="0" mc:Ignorable="hp" hp:hslEmbossed="0">
+                <a:solidFill>
+                  <a:srgbClr val="ffffff"/>
+                </a:solidFill>
+                <a:latin typeface="Calibri"/>
+                <a:ea typeface="맑은 고딕"/>
+                <a:cs typeface="Times New Roman"/>
+              </a:rPr>
+              <a:t>20</a:t>
+            </a:r>
+            <a:endParaRPr xmlns:mc="http://schemas.openxmlformats.org/markup-compatibility/2006" xmlns:hp="http://schemas.haansoft.com/office/presentation/8.0" kumimoji="0" lang="en-US" altLang="ko-KR" sz="1800" b="1" i="0" u="none" strike="noStrike" kern="1200" cap="none" spc="0" normalizeH="0" baseline="0" mc:Ignorable="hp" hp:hslEmbossed="0">
+              <a:solidFill>
+                <a:srgbClr val="ffffff"/>
+              </a:solidFill>
+              <a:latin typeface="Calibri"/>
+              <a:ea typeface="맑은 고딕"/>
+              <a:cs typeface="Times New Roman"/>
+            </a:endParaRPr>
+          </a:p>
+        </p:txBody>
+      </p:sp>
+      <p:sp>
+        <p:nvSpPr>
+          <p:cNvPr id="8" name=""/>
+          <p:cNvSpPr/>
+          <p:nvPr/>
+        </p:nvSpPr>
+        <p:spPr>
+          <a:xfrm>
+            <a:off x="8269441" y="1352190"/>
+            <a:ext cx="481198" cy="365413"/>
+          </a:xfrm>
+          <a:prstGeom prst="rect">
+            <a:avLst/>
+          </a:prstGeom>
+          <a:solidFill>
+            <a:srgbClr val="6182d6">
+              <a:alpha val="100000"/>
+            </a:srgbClr>
+          </a:solidFill>
+          <a:ln w="19050" cap="flat" cmpd="sng" algn="ctr">
+            <a:solidFill>
+              <a:srgbClr val="2e3e67">
+                <a:alpha val="100000"/>
+              </a:srgbClr>
+            </a:solidFill>
+            <a:prstDash val="solid"/>
+          </a:ln>
+        </p:spPr>
+        <p:txBody>
+          <a:bodyPr anchor="ctr"/>
+          <a:p>
+            <a:pPr marL="0" indent="0" algn="ctr" defTabSz="914400" rtl="0" eaLnBrk="1" latinLnBrk="1" hangingPunct="1">
+              <a:lnSpc>
+                <a:spcPct val="100000"/>
+              </a:lnSpc>
+              <a:spcBef>
+                <a:spcPct val="0"/>
+              </a:spcBef>
+              <a:spcAft>
+                <a:spcPts val="0"/>
+              </a:spcAft>
+              <a:buNone/>
+              <a:defRPr/>
+            </a:pPr>
+            <a:r>
+              <a:rPr xmlns:mc="http://schemas.openxmlformats.org/markup-compatibility/2006" xmlns:hp="http://schemas.haansoft.com/office/presentation/8.0" kumimoji="0" lang="en-US" altLang="ko-KR" sz="1800" b="1" i="0" u="none" strike="noStrike" kern="1200" cap="none" spc="0" normalizeH="0" baseline="0" mc:Ignorable="hp" hp:hslEmbossed="0">
+                <a:solidFill>
+                  <a:srgbClr val="ffffff"/>
+                </a:solidFill>
+                <a:latin typeface="Calibri"/>
+                <a:ea typeface="맑은 고딕"/>
+                <a:cs typeface="Times New Roman"/>
+              </a:rPr>
+              <a:t>50</a:t>
+            </a:r>
+            <a:endParaRPr xmlns:mc="http://schemas.openxmlformats.org/markup-compatibility/2006" xmlns:hp="http://schemas.haansoft.com/office/presentation/8.0" kumimoji="0" lang="en-US" altLang="ko-KR" sz="1800" b="1" i="0" u="none" strike="noStrike" kern="1200" cap="none" spc="0" normalizeH="0" baseline="0" mc:Ignorable="hp" hp:hslEmbossed="0">
+              <a:solidFill>
+                <a:srgbClr val="ffffff"/>
+              </a:solidFill>
+              <a:latin typeface="Calibri"/>
+              <a:ea typeface="맑은 고딕"/>
+              <a:cs typeface="Times New Roman"/>
+            </a:endParaRPr>
+          </a:p>
+        </p:txBody>
+      </p:sp>
+      <p:sp>
+        <p:nvSpPr>
+          <p:cNvPr id="9" name=""/>
+          <p:cNvSpPr/>
+          <p:nvPr/>
+        </p:nvSpPr>
+        <p:spPr>
+          <a:xfrm>
+            <a:off x="1313745" y="2371521"/>
+            <a:ext cx="481198" cy="365413"/>
+          </a:xfrm>
+          <a:prstGeom prst="rect">
+            <a:avLst/>
+          </a:prstGeom>
+          <a:solidFill>
+            <a:srgbClr val="6182d6">
+              <a:alpha val="100000"/>
+            </a:srgbClr>
+          </a:solidFill>
+          <a:ln w="19050" cap="flat" cmpd="sng" algn="ctr">
+            <a:solidFill>
+              <a:srgbClr val="2e3e67">
+                <a:alpha val="100000"/>
+              </a:srgbClr>
+            </a:solidFill>
+            <a:prstDash val="solid"/>
+          </a:ln>
+        </p:spPr>
+        <p:txBody>
+          <a:bodyPr anchor="ctr"/>
+          <a:p>
+            <a:pPr marL="0" indent="0" algn="ctr" defTabSz="914400" rtl="0" eaLnBrk="1" latinLnBrk="1" hangingPunct="1">
+              <a:lnSpc>
+                <a:spcPct val="100000"/>
+              </a:lnSpc>
+              <a:spcBef>
+                <a:spcPct val="0"/>
+              </a:spcBef>
+              <a:spcAft>
+                <a:spcPts val="0"/>
+              </a:spcAft>
+              <a:buNone/>
+              <a:defRPr/>
+            </a:pPr>
+            <a:r>
+              <a:rPr xmlns:mc="http://schemas.openxmlformats.org/markup-compatibility/2006" xmlns:hp="http://schemas.haansoft.com/office/presentation/8.0" kumimoji="0" lang="en-US" altLang="ko-KR" sz="1800" b="1" i="0" u="none" strike="noStrike" kern="1200" cap="none" spc="0" normalizeH="0" baseline="0" mc:Ignorable="hp" hp:hslEmbossed="0">
+                <a:solidFill>
+                  <a:srgbClr val="ffffff"/>
+                </a:solidFill>
+                <a:latin typeface="Calibri"/>
+                <a:ea typeface="맑은 고딕"/>
+                <a:cs typeface="Times New Roman"/>
+              </a:rPr>
+              <a:t>1</a:t>
+            </a:r>
+            <a:endParaRPr xmlns:mc="http://schemas.openxmlformats.org/markup-compatibility/2006" xmlns:hp="http://schemas.haansoft.com/office/presentation/8.0" kumimoji="0" lang="en-US" altLang="ko-KR" sz="1800" b="1" i="0" u="none" strike="noStrike" kern="1200" cap="none" spc="0" normalizeH="0" baseline="0" mc:Ignorable="hp" hp:hslEmbossed="0">
+              <a:solidFill>
+                <a:srgbClr val="ffffff"/>
+              </a:solidFill>
+              <a:latin typeface="Calibri"/>
+              <a:ea typeface="맑은 고딕"/>
+              <a:cs typeface="Times New Roman"/>
+            </a:endParaRPr>
+          </a:p>
+        </p:txBody>
+      </p:sp>
+      <p:sp>
+        <p:nvSpPr>
+          <p:cNvPr id="10" name=""/>
+          <p:cNvSpPr/>
+          <p:nvPr/>
+        </p:nvSpPr>
+        <p:spPr>
+          <a:xfrm>
+            <a:off x="1794943" y="2371521"/>
+            <a:ext cx="481198" cy="365413"/>
+          </a:xfrm>
+          <a:prstGeom prst="rect">
+            <a:avLst/>
+          </a:prstGeom>
+          <a:solidFill>
+            <a:srgbClr val="6182d6">
+              <a:alpha val="100000"/>
+            </a:srgbClr>
+          </a:solidFill>
+          <a:ln w="19050" cap="flat" cmpd="sng" algn="ctr">
+            <a:solidFill>
+              <a:srgbClr val="2e3e67">
+                <a:alpha val="100000"/>
+              </a:srgbClr>
+            </a:solidFill>
+            <a:prstDash val="solid"/>
+          </a:ln>
+        </p:spPr>
+        <p:txBody>
+          <a:bodyPr anchor="ctr"/>
+          <a:p>
+            <a:pPr marL="0" indent="0" algn="ctr" defTabSz="914400" rtl="0" eaLnBrk="1" latinLnBrk="1" hangingPunct="1">
+              <a:lnSpc>
+                <a:spcPct val="100000"/>
+              </a:lnSpc>
+              <a:spcBef>
+                <a:spcPct val="0"/>
+              </a:spcBef>
+              <a:spcAft>
+                <a:spcPts val="0"/>
+              </a:spcAft>
+              <a:buNone/>
+              <a:defRPr/>
+            </a:pPr>
+            <a:r>
+              <a:rPr xmlns:mc="http://schemas.openxmlformats.org/markup-compatibility/2006" xmlns:hp="http://schemas.haansoft.com/office/presentation/8.0" kumimoji="0" lang="en-US" altLang="ko-KR" sz="1800" b="1" i="0" u="none" strike="noStrike" kern="1200" cap="none" spc="0" normalizeH="0" baseline="0" mc:Ignorable="hp" hp:hslEmbossed="0">
+                <a:solidFill>
+                  <a:srgbClr val="ffffff"/>
+                </a:solidFill>
+                <a:latin typeface="Calibri"/>
+                <a:ea typeface="맑은 고딕"/>
+                <a:cs typeface="Times New Roman"/>
+              </a:rPr>
+              <a:t>2</a:t>
+            </a:r>
+            <a:endParaRPr xmlns:mc="http://schemas.openxmlformats.org/markup-compatibility/2006" xmlns:hp="http://schemas.haansoft.com/office/presentation/8.0" kumimoji="0" lang="en-US" altLang="ko-KR" sz="1800" b="1" i="0" u="none" strike="noStrike" kern="1200" cap="none" spc="0" normalizeH="0" baseline="0" mc:Ignorable="hp" hp:hslEmbossed="0">
+              <a:solidFill>
+                <a:srgbClr val="ffffff"/>
+              </a:solidFill>
+              <a:latin typeface="Calibri"/>
+              <a:ea typeface="맑은 고딕"/>
+              <a:cs typeface="Times New Roman"/>
+            </a:endParaRPr>
+          </a:p>
+        </p:txBody>
+      </p:sp>
+      <p:sp>
+        <p:nvSpPr>
+          <p:cNvPr id="11" name=""/>
+          <p:cNvSpPr/>
+          <p:nvPr/>
+        </p:nvSpPr>
+        <p:spPr>
+          <a:xfrm>
+            <a:off x="2940747" y="2371521"/>
+            <a:ext cx="481198" cy="365413"/>
+          </a:xfrm>
+          <a:prstGeom prst="rect">
+            <a:avLst/>
+          </a:prstGeom>
+          <a:ln>
+            <a:headEnd w="med" len="med"/>
+            <a:tailEnd w="med" len="med"/>
+          </a:ln>
+        </p:spPr>
+        <p:style>
+          <a:lnRef idx="2">
+            <a:schemeClr val="accent1">
+              <a:shade val="20000"/>
+            </a:schemeClr>
+          </a:lnRef>
+          <a:fillRef idx="1">
+            <a:schemeClr val="accent1"/>
+          </a:fillRef>
+          <a:effectRef idx="0">
+            <a:schemeClr val="accent1"/>
+          </a:effectRef>
+          <a:fontRef idx="minor">
+            <a:schemeClr val="lt1"/>
+          </a:fontRef>
+        </p:style>
+        <p:txBody>
+          <a:bodyPr anchor="ctr"/>
+          <a:p>
+            <a:pPr marL="0" indent="0" algn="ctr" defTabSz="914400" rtl="0" eaLnBrk="1" latinLnBrk="1" hangingPunct="1">
+              <a:lnSpc>
+                <a:spcPct val="100000"/>
+              </a:lnSpc>
+              <a:spcBef>
+                <a:spcPct val="0"/>
+              </a:spcBef>
+              <a:spcAft>
+                <a:spcPts val="0"/>
+              </a:spcAft>
+              <a:buNone/>
+              <a:defRPr/>
+            </a:pPr>
+            <a:r>
+              <a:rPr xmlns:mc="http://schemas.openxmlformats.org/markup-compatibility/2006" xmlns:hp="http://schemas.haansoft.com/office/presentation/8.0" kumimoji="0" lang="en-US" altLang="ko-KR" sz="1800" b="1" i="0" u="none" strike="noStrike" kern="1200" cap="none" spc="0" normalizeH="0" baseline="0" mc:Ignorable="hp" hp:hslEmbossed="0">
+                <a:solidFill>
+                  <a:srgbClr val="ffffff"/>
+                </a:solidFill>
+                <a:latin typeface="Calibri"/>
+                <a:ea typeface="맑은 고딕"/>
+                <a:cs typeface="Times New Roman"/>
+              </a:rPr>
+              <a:t>7</a:t>
+            </a:r>
+            <a:endParaRPr xmlns:mc="http://schemas.openxmlformats.org/markup-compatibility/2006" xmlns:hp="http://schemas.haansoft.com/office/presentation/8.0" kumimoji="0" lang="en-US" altLang="ko-KR" sz="1800" b="1" i="0" u="none" strike="noStrike" kern="1200" cap="none" spc="0" normalizeH="0" baseline="0" mc:Ignorable="hp" hp:hslEmbossed="0">
+              <a:solidFill>
+                <a:srgbClr val="ffffff"/>
+              </a:solidFill>
+              <a:latin typeface="Calibri"/>
+              <a:ea typeface="맑은 고딕"/>
+              <a:cs typeface="Times New Roman"/>
+            </a:endParaRPr>
+          </a:p>
+        </p:txBody>
+      </p:sp>
+      <p:sp>
+        <p:nvSpPr>
+          <p:cNvPr id="12" name=""/>
+          <p:cNvSpPr/>
+          <p:nvPr/>
+        </p:nvSpPr>
+        <p:spPr>
+          <a:xfrm>
+            <a:off x="3421945" y="2371521"/>
+            <a:ext cx="481198" cy="365413"/>
+          </a:xfrm>
+          <a:prstGeom prst="rect">
+            <a:avLst/>
+          </a:prstGeom>
+          <a:solidFill>
+            <a:srgbClr val="6182d6">
+              <a:alpha val="100000"/>
+            </a:srgbClr>
+          </a:solidFill>
+          <a:ln w="19050" cap="flat" cmpd="sng" algn="ctr">
+            <a:solidFill>
+              <a:srgbClr val="2e3e67">
+                <a:alpha val="100000"/>
+              </a:srgbClr>
+            </a:solidFill>
+            <a:prstDash val="solid"/>
+          </a:ln>
+        </p:spPr>
+        <p:txBody>
+          <a:bodyPr anchor="ctr"/>
+          <a:p>
+            <a:pPr marL="0" indent="0" algn="ctr" defTabSz="914400" rtl="0" eaLnBrk="1" latinLnBrk="1" hangingPunct="1">
+              <a:lnSpc>
+                <a:spcPct val="100000"/>
+              </a:lnSpc>
+              <a:spcBef>
+                <a:spcPct val="0"/>
+              </a:spcBef>
+              <a:spcAft>
+                <a:spcPts val="0"/>
+              </a:spcAft>
+              <a:buNone/>
+              <a:defRPr/>
+            </a:pPr>
+            <a:r>
+              <a:rPr xmlns:mc="http://schemas.openxmlformats.org/markup-compatibility/2006" xmlns:hp="http://schemas.haansoft.com/office/presentation/8.0" kumimoji="0" lang="en-US" altLang="ko-KR" sz="1800" b="1" i="0" u="none" strike="noStrike" kern="1200" cap="none" spc="0" normalizeH="0" baseline="0" mc:Ignorable="hp" hp:hslEmbossed="0">
+                <a:solidFill>
+                  <a:srgbClr val="ffffff"/>
+                </a:solidFill>
+                <a:latin typeface="Calibri"/>
+                <a:ea typeface="맑은 고딕"/>
+                <a:cs typeface="Times New Roman"/>
+              </a:rPr>
+              <a:t>10</a:t>
+            </a:r>
+            <a:endParaRPr xmlns:mc="http://schemas.openxmlformats.org/markup-compatibility/2006" xmlns:hp="http://schemas.haansoft.com/office/presentation/8.0" kumimoji="0" lang="en-US" altLang="ko-KR" sz="1800" b="1" i="0" u="none" strike="noStrike" kern="1200" cap="none" spc="0" normalizeH="0" baseline="0" mc:Ignorable="hp" hp:hslEmbossed="0">
+              <a:solidFill>
+                <a:srgbClr val="ffffff"/>
+              </a:solidFill>
+              <a:latin typeface="Calibri"/>
+              <a:ea typeface="맑은 고딕"/>
+              <a:cs typeface="Times New Roman"/>
+            </a:endParaRPr>
+          </a:p>
+        </p:txBody>
+      </p:sp>
+      <p:sp>
+        <p:nvSpPr>
+          <p:cNvPr id="13" name=""/>
+          <p:cNvSpPr/>
+          <p:nvPr/>
+        </p:nvSpPr>
+        <p:spPr>
+          <a:xfrm>
+            <a:off x="4512745" y="2371504"/>
+            <a:ext cx="481198" cy="365413"/>
+          </a:xfrm>
+          <a:prstGeom prst="rect">
+            <a:avLst/>
+          </a:prstGeom>
+          <a:solidFill>
+            <a:srgbClr val="6182d6">
+              <a:alpha val="100000"/>
+            </a:srgbClr>
+          </a:solidFill>
+          <a:ln w="19050" cap="flat" cmpd="sng" algn="ctr">
+            <a:solidFill>
+              <a:srgbClr val="2e3e67">
+                <a:alpha val="100000"/>
+              </a:srgbClr>
+            </a:solidFill>
+            <a:prstDash val="solid"/>
+          </a:ln>
+        </p:spPr>
+        <p:txBody>
+          <a:bodyPr anchor="ctr"/>
+          <a:p>
+            <a:pPr marL="0" indent="0" algn="ctr" defTabSz="914400" rtl="0" eaLnBrk="1" latinLnBrk="1" hangingPunct="1">
+              <a:lnSpc>
+                <a:spcPct val="100000"/>
+              </a:lnSpc>
+              <a:spcBef>
+                <a:spcPct val="0"/>
+              </a:spcBef>
+              <a:spcAft>
+                <a:spcPts val="0"/>
+              </a:spcAft>
+              <a:buNone/>
+              <a:defRPr/>
+            </a:pPr>
+            <a:r>
+              <a:rPr xmlns:mc="http://schemas.openxmlformats.org/markup-compatibility/2006" xmlns:hp="http://schemas.haansoft.com/office/presentation/8.0" kumimoji="0" lang="en-US" altLang="ko-KR" sz="1800" b="1" i="0" u="none" strike="noStrike" kern="1200" cap="none" spc="0" normalizeH="0" baseline="0" mc:Ignorable="hp" hp:hslEmbossed="0">
+                <a:solidFill>
+                  <a:srgbClr val="ffffff"/>
+                </a:solidFill>
+                <a:latin typeface="Calibri"/>
+                <a:ea typeface="맑은 고딕"/>
+                <a:cs typeface="Times New Roman"/>
+              </a:rPr>
+              <a:t>14</a:t>
+            </a:r>
+            <a:endParaRPr xmlns:mc="http://schemas.openxmlformats.org/markup-compatibility/2006" xmlns:hp="http://schemas.haansoft.com/office/presentation/8.0" kumimoji="0" lang="en-US" altLang="ko-KR" sz="1800" b="1" i="0" u="none" strike="noStrike" kern="1200" cap="none" spc="0" normalizeH="0" baseline="0" mc:Ignorable="hp" hp:hslEmbossed="0">
+              <a:solidFill>
+                <a:srgbClr val="ffffff"/>
+              </a:solidFill>
+              <a:latin typeface="Calibri"/>
+              <a:ea typeface="맑은 고딕"/>
+              <a:cs typeface="Times New Roman"/>
+            </a:endParaRPr>
+          </a:p>
+        </p:txBody>
+      </p:sp>
+      <p:sp>
+        <p:nvSpPr>
+          <p:cNvPr id="14" name=""/>
+          <p:cNvSpPr/>
+          <p:nvPr/>
+        </p:nvSpPr>
+        <p:spPr>
+          <a:xfrm>
+            <a:off x="4993943" y="2371504"/>
+            <a:ext cx="481198" cy="365413"/>
+          </a:xfrm>
+          <a:prstGeom prst="rect">
+            <a:avLst/>
+          </a:prstGeom>
+          <a:solidFill>
+            <a:srgbClr val="6182d6">
+              <a:alpha val="100000"/>
+            </a:srgbClr>
+          </a:solidFill>
+          <a:ln w="19050" cap="flat" cmpd="sng" algn="ctr">
+            <a:solidFill>
+              <a:srgbClr val="2e3e67">
+                <a:alpha val="100000"/>
+              </a:srgbClr>
+            </a:solidFill>
+            <a:prstDash val="solid"/>
+          </a:ln>
+        </p:spPr>
+        <p:txBody>
+          <a:bodyPr anchor="ctr"/>
+          <a:p>
+            <a:pPr marL="0" indent="0" algn="ctr" defTabSz="914400" rtl="0" eaLnBrk="1" latinLnBrk="1" hangingPunct="1">
+              <a:lnSpc>
+                <a:spcPct val="100000"/>
+              </a:lnSpc>
+              <a:spcBef>
+                <a:spcPct val="0"/>
+              </a:spcBef>
+              <a:spcAft>
+                <a:spcPts val="0"/>
+              </a:spcAft>
+              <a:buNone/>
+              <a:defRPr/>
+            </a:pPr>
+            <a:r>
+              <a:rPr xmlns:mc="http://schemas.openxmlformats.org/markup-compatibility/2006" xmlns:hp="http://schemas.haansoft.com/office/presentation/8.0" kumimoji="0" lang="en-US" altLang="ko-KR" sz="1800" b="1" i="0" u="none" strike="noStrike" kern="1200" cap="none" spc="0" normalizeH="0" baseline="0" mc:Ignorable="hp" hp:hslEmbossed="0">
+                <a:solidFill>
+                  <a:srgbClr val="ffffff"/>
+                </a:solidFill>
+                <a:latin typeface="Calibri"/>
+                <a:ea typeface="맑은 고딕"/>
+                <a:cs typeface="Times New Roman"/>
+              </a:rPr>
+              <a:t>16</a:t>
+            </a:r>
+            <a:endParaRPr xmlns:mc="http://schemas.openxmlformats.org/markup-compatibility/2006" xmlns:hp="http://schemas.haansoft.com/office/presentation/8.0" kumimoji="0" lang="en-US" altLang="ko-KR" sz="1800" b="1" i="0" u="none" strike="noStrike" kern="1200" cap="none" spc="0" normalizeH="0" baseline="0" mc:Ignorable="hp" hp:hslEmbossed="0">
+              <a:solidFill>
+                <a:srgbClr val="ffffff"/>
+              </a:solidFill>
+              <a:latin typeface="Calibri"/>
+              <a:ea typeface="맑은 고딕"/>
+              <a:cs typeface="Times New Roman"/>
+            </a:endParaRPr>
+          </a:p>
+        </p:txBody>
+      </p:sp>
+      <p:sp>
+        <p:nvSpPr>
+          <p:cNvPr id="15" name=""/>
+          <p:cNvSpPr/>
+          <p:nvPr/>
+        </p:nvSpPr>
+        <p:spPr>
+          <a:xfrm>
+            <a:off x="6336596" y="2371521"/>
+            <a:ext cx="481198" cy="365413"/>
+          </a:xfrm>
+          <a:prstGeom prst="rect">
+            <a:avLst/>
+          </a:prstGeom>
+          <a:solidFill>
+            <a:srgbClr val="6182d6">
+              <a:alpha val="100000"/>
+            </a:srgbClr>
+          </a:solidFill>
+          <a:ln w="19050" cap="flat" cmpd="sng" algn="ctr">
+            <a:solidFill>
+              <a:srgbClr val="2e3e67">
+                <a:alpha val="100000"/>
+              </a:srgbClr>
+            </a:solidFill>
+            <a:prstDash val="solid"/>
+          </a:ln>
+        </p:spPr>
+        <p:txBody>
+          <a:bodyPr anchor="ctr"/>
+          <a:p>
+            <a:pPr marL="0" indent="0" algn="ctr" defTabSz="914400" rtl="0" eaLnBrk="1" latinLnBrk="1" hangingPunct="1">
+              <a:lnSpc>
+                <a:spcPct val="100000"/>
+              </a:lnSpc>
+              <a:spcBef>
+                <a:spcPct val="0"/>
+              </a:spcBef>
+              <a:spcAft>
+                <a:spcPts val="0"/>
+              </a:spcAft>
+              <a:buNone/>
+              <a:defRPr/>
+            </a:pPr>
+            <a:r>
+              <a:rPr xmlns:mc="http://schemas.openxmlformats.org/markup-compatibility/2006" xmlns:hp="http://schemas.haansoft.com/office/presentation/8.0" kumimoji="0" lang="en-US" altLang="ko-KR" sz="1800" b="1" i="0" u="none" strike="noStrike" kern="1200" cap="none" spc="0" normalizeH="0" baseline="0" mc:Ignorable="hp" hp:hslEmbossed="0">
+                <a:solidFill>
+                  <a:srgbClr val="ffffff"/>
+                </a:solidFill>
+                <a:latin typeface="Calibri"/>
+                <a:ea typeface="맑은 고딕"/>
+                <a:cs typeface="Times New Roman"/>
+              </a:rPr>
+              <a:t>25</a:t>
+            </a:r>
+            <a:endParaRPr xmlns:mc="http://schemas.openxmlformats.org/markup-compatibility/2006" xmlns:hp="http://schemas.haansoft.com/office/presentation/8.0" kumimoji="0" lang="en-US" altLang="ko-KR" sz="1800" b="1" i="0" u="none" strike="noStrike" kern="1200" cap="none" spc="0" normalizeH="0" baseline="0" mc:Ignorable="hp" hp:hslEmbossed="0">
+              <a:solidFill>
+                <a:srgbClr val="ffffff"/>
+              </a:solidFill>
+              <a:latin typeface="Calibri"/>
+              <a:ea typeface="맑은 고딕"/>
+              <a:cs typeface="Times New Roman"/>
+            </a:endParaRPr>
+          </a:p>
+        </p:txBody>
+      </p:sp>
+      <p:sp>
+        <p:nvSpPr>
+          <p:cNvPr id="16" name=""/>
+          <p:cNvSpPr/>
+          <p:nvPr/>
+        </p:nvSpPr>
+        <p:spPr>
+          <a:xfrm>
+            <a:off x="6817794" y="2371521"/>
+            <a:ext cx="481198" cy="365413"/>
+          </a:xfrm>
+          <a:prstGeom prst="rect">
+            <a:avLst/>
+          </a:prstGeom>
+          <a:solidFill>
+            <a:srgbClr val="6182d6">
+              <a:alpha val="100000"/>
+            </a:srgbClr>
+          </a:solidFill>
+          <a:ln w="19050" cap="flat" cmpd="sng" algn="ctr">
+            <a:solidFill>
+              <a:srgbClr val="2e3e67">
+                <a:alpha val="100000"/>
+              </a:srgbClr>
+            </a:solidFill>
+            <a:prstDash val="solid"/>
+          </a:ln>
+        </p:spPr>
+        <p:txBody>
+          <a:bodyPr anchor="ctr"/>
+          <a:p>
+            <a:pPr marL="0" indent="0" algn="ctr" defTabSz="914400" rtl="0" eaLnBrk="1" latinLnBrk="1" hangingPunct="1">
+              <a:lnSpc>
+                <a:spcPct val="100000"/>
+              </a:lnSpc>
+              <a:spcBef>
+                <a:spcPct val="0"/>
+              </a:spcBef>
+              <a:spcAft>
+                <a:spcPts val="0"/>
+              </a:spcAft>
+              <a:buNone/>
+              <a:defRPr/>
+            </a:pPr>
+            <a:r>
+              <a:rPr xmlns:mc="http://schemas.openxmlformats.org/markup-compatibility/2006" xmlns:hp="http://schemas.haansoft.com/office/presentation/8.0" kumimoji="0" lang="en-US" altLang="ko-KR" sz="1800" b="1" i="0" u="none" strike="noStrike" kern="1200" cap="none" spc="0" normalizeH="0" baseline="0" mc:Ignorable="hp" hp:hslEmbossed="0">
+                <a:solidFill>
+                  <a:srgbClr val="ffffff"/>
+                </a:solidFill>
+                <a:latin typeface="Calibri"/>
+                <a:ea typeface="맑은 고딕"/>
+                <a:cs typeface="Times New Roman"/>
+              </a:rPr>
+              <a:t>30</a:t>
+            </a:r>
+            <a:endParaRPr xmlns:mc="http://schemas.openxmlformats.org/markup-compatibility/2006" xmlns:hp="http://schemas.haansoft.com/office/presentation/8.0" kumimoji="0" lang="en-US" altLang="ko-KR" sz="1800" b="1" i="0" u="none" strike="noStrike" kern="1200" cap="none" spc="0" normalizeH="0" baseline="0" mc:Ignorable="hp" hp:hslEmbossed="0">
+              <a:solidFill>
+                <a:srgbClr val="ffffff"/>
+              </a:solidFill>
+              <a:latin typeface="Calibri"/>
+              <a:ea typeface="맑은 고딕"/>
+              <a:cs typeface="Times New Roman"/>
+            </a:endParaRPr>
+          </a:p>
+        </p:txBody>
+      </p:sp>
+      <p:sp>
+        <p:nvSpPr>
+          <p:cNvPr id="17" name=""/>
+          <p:cNvSpPr/>
+          <p:nvPr/>
+        </p:nvSpPr>
+        <p:spPr>
+          <a:xfrm>
+            <a:off x="7788243" y="1352207"/>
+            <a:ext cx="481198" cy="365413"/>
+          </a:xfrm>
+          <a:prstGeom prst="rect">
+            <a:avLst/>
+          </a:prstGeom>
+          <a:solidFill>
+            <a:srgbClr val="6182d6">
+              <a:alpha val="100000"/>
+            </a:srgbClr>
+          </a:solidFill>
+          <a:ln w="19050" cap="flat" cmpd="sng" algn="ctr">
+            <a:solidFill>
+              <a:srgbClr val="2e3e67">
+                <a:alpha val="100000"/>
+              </a:srgbClr>
+            </a:solidFill>
+            <a:prstDash val="solid"/>
+          </a:ln>
+        </p:spPr>
+        <p:txBody>
+          <a:bodyPr anchor="ctr"/>
+          <a:p>
+            <a:pPr marL="0" indent="0" algn="ctr" defTabSz="914400" rtl="0" eaLnBrk="1" latinLnBrk="1" hangingPunct="1">
+              <a:lnSpc>
+                <a:spcPct val="100000"/>
+              </a:lnSpc>
+              <a:spcBef>
+                <a:spcPct val="0"/>
+              </a:spcBef>
+              <a:spcAft>
+                <a:spcPts val="0"/>
+              </a:spcAft>
+              <a:buNone/>
+              <a:defRPr/>
+            </a:pPr>
+            <a:r>
+              <a:rPr xmlns:mc="http://schemas.openxmlformats.org/markup-compatibility/2006" xmlns:hp="http://schemas.haansoft.com/office/presentation/8.0" kumimoji="0" lang="en-US" altLang="ko-KR" sz="1800" b="1" i="0" u="none" strike="noStrike" kern="1200" cap="none" spc="0" normalizeH="0" baseline="0" mc:Ignorable="hp" hp:hslEmbossed="0">
+                <a:solidFill>
+                  <a:srgbClr val="ffffff"/>
+                </a:solidFill>
+                <a:latin typeface="Calibri"/>
+                <a:ea typeface="맑은 고딕"/>
+                <a:cs typeface="Times New Roman"/>
+              </a:rPr>
+              <a:t>35</a:t>
+            </a:r>
+            <a:endParaRPr xmlns:mc="http://schemas.openxmlformats.org/markup-compatibility/2006" xmlns:hp="http://schemas.haansoft.com/office/presentation/8.0" kumimoji="0" lang="en-US" altLang="ko-KR" sz="1800" b="1" i="0" u="none" strike="noStrike" kern="1200" cap="none" spc="0" normalizeH="0" baseline="0" mc:Ignorable="hp" hp:hslEmbossed="0">
+              <a:solidFill>
+                <a:srgbClr val="ffffff"/>
+              </a:solidFill>
+              <a:latin typeface="Calibri"/>
+              <a:ea typeface="맑은 고딕"/>
+              <a:cs typeface="Times New Roman"/>
+            </a:endParaRPr>
+          </a:p>
+        </p:txBody>
+      </p:sp>
+      <p:sp>
+        <p:nvSpPr>
+          <p:cNvPr id="18" name=""/>
+          <p:cNvSpPr/>
+          <p:nvPr/>
+        </p:nvSpPr>
+        <p:spPr>
+          <a:xfrm>
+            <a:off x="7780190" y="2371521"/>
+            <a:ext cx="481198" cy="365413"/>
+          </a:xfrm>
+          <a:prstGeom prst="rect">
+            <a:avLst/>
+          </a:prstGeom>
+          <a:solidFill>
+            <a:srgbClr val="6182d6">
+              <a:alpha val="100000"/>
+            </a:srgbClr>
+          </a:solidFill>
+          <a:ln w="19050" cap="flat" cmpd="sng" algn="ctr">
+            <a:solidFill>
+              <a:srgbClr val="2e3e67">
+                <a:alpha val="100000"/>
+              </a:srgbClr>
+            </a:solidFill>
+            <a:prstDash val="solid"/>
+          </a:ln>
+        </p:spPr>
+        <p:txBody>
+          <a:bodyPr anchor="ctr"/>
+          <a:p>
+            <a:pPr marL="0" indent="0" algn="ctr" defTabSz="914400" rtl="0" eaLnBrk="1" latinLnBrk="1" hangingPunct="1">
+              <a:lnSpc>
+                <a:spcPct val="100000"/>
+              </a:lnSpc>
+              <a:spcBef>
+                <a:spcPct val="0"/>
+              </a:spcBef>
+              <a:spcAft>
+                <a:spcPts val="0"/>
+              </a:spcAft>
+              <a:buNone/>
+              <a:defRPr/>
+            </a:pPr>
+            <a:r>
+              <a:rPr xmlns:mc="http://schemas.openxmlformats.org/markup-compatibility/2006" xmlns:hp="http://schemas.haansoft.com/office/presentation/8.0" kumimoji="0" lang="en-US" altLang="ko-KR" sz="1800" b="1" i="0" u="none" strike="noStrike" kern="1200" cap="none" spc="0" normalizeH="0" baseline="0" mc:Ignorable="hp" hp:hslEmbossed="0">
+                <a:solidFill>
+                  <a:srgbClr val="ffffff"/>
+                </a:solidFill>
+                <a:latin typeface="Calibri"/>
+                <a:ea typeface="맑은 고딕"/>
+                <a:cs typeface="Times New Roman"/>
+              </a:rPr>
+              <a:t>40</a:t>
+            </a:r>
+            <a:endParaRPr xmlns:mc="http://schemas.openxmlformats.org/markup-compatibility/2006" xmlns:hp="http://schemas.haansoft.com/office/presentation/8.0" kumimoji="0" lang="en-US" altLang="ko-KR" sz="1800" b="1" i="0" u="none" strike="noStrike" kern="1200" cap="none" spc="0" normalizeH="0" baseline="0" mc:Ignorable="hp" hp:hslEmbossed="0">
+              <a:solidFill>
+                <a:srgbClr val="ffffff"/>
+              </a:solidFill>
+              <a:latin typeface="Calibri"/>
+              <a:ea typeface="맑은 고딕"/>
+              <a:cs typeface="Times New Roman"/>
+            </a:endParaRPr>
+          </a:p>
+        </p:txBody>
+      </p:sp>
+      <p:sp>
+        <p:nvSpPr>
+          <p:cNvPr id="19" name=""/>
+          <p:cNvSpPr/>
+          <p:nvPr/>
+        </p:nvSpPr>
+        <p:spPr>
+          <a:xfrm>
+            <a:off x="9239886" y="2371504"/>
+            <a:ext cx="481198" cy="365413"/>
+          </a:xfrm>
+          <a:prstGeom prst="rect">
+            <a:avLst/>
+          </a:prstGeom>
+          <a:solidFill>
+            <a:srgbClr val="6182d6">
+              <a:alpha val="100000"/>
+            </a:srgbClr>
+          </a:solidFill>
+          <a:ln w="19050" cap="flat" cmpd="sng" algn="ctr">
+            <a:solidFill>
+              <a:srgbClr val="2e3e67">
+                <a:alpha val="100000"/>
+              </a:srgbClr>
+            </a:solidFill>
+            <a:prstDash val="solid"/>
+          </a:ln>
+        </p:spPr>
+        <p:txBody>
+          <a:bodyPr anchor="ctr"/>
+          <a:p>
+            <a:pPr marL="0" indent="0" algn="ctr" defTabSz="914400" rtl="0" eaLnBrk="1" latinLnBrk="1" hangingPunct="1">
+              <a:lnSpc>
+                <a:spcPct val="100000"/>
+              </a:lnSpc>
+              <a:spcBef>
+                <a:spcPct val="0"/>
+              </a:spcBef>
+              <a:spcAft>
+                <a:spcPts val="0"/>
+              </a:spcAft>
+              <a:buNone/>
+              <a:defRPr/>
+            </a:pPr>
+            <a:r>
+              <a:rPr xmlns:mc="http://schemas.openxmlformats.org/markup-compatibility/2006" xmlns:hp="http://schemas.haansoft.com/office/presentation/8.0" kumimoji="0" lang="en-US" altLang="ko-KR" sz="1800" b="1" i="0" u="none" strike="noStrike" kern="1200" cap="none" spc="0" normalizeH="0" baseline="0" mc:Ignorable="hp" hp:hslEmbossed="0">
+                <a:solidFill>
+                  <a:srgbClr val="ffffff"/>
+                </a:solidFill>
+                <a:latin typeface="Calibri"/>
+                <a:ea typeface="맑은 고딕"/>
+                <a:cs typeface="Times New Roman"/>
+              </a:rPr>
+              <a:t>55</a:t>
+            </a:r>
+            <a:endParaRPr xmlns:mc="http://schemas.openxmlformats.org/markup-compatibility/2006" xmlns:hp="http://schemas.haansoft.com/office/presentation/8.0" kumimoji="0" lang="en-US" altLang="ko-KR" sz="1800" b="1" i="0" u="none" strike="noStrike" kern="1200" cap="none" spc="0" normalizeH="0" baseline="0" mc:Ignorable="hp" hp:hslEmbossed="0">
+              <a:solidFill>
+                <a:srgbClr val="ffffff"/>
+              </a:solidFill>
+              <a:latin typeface="Calibri"/>
+              <a:ea typeface="맑은 고딕"/>
+              <a:cs typeface="Times New Roman"/>
+            </a:endParaRPr>
+          </a:p>
+        </p:txBody>
+      </p:sp>
+      <p:sp>
+        <p:nvSpPr>
+          <p:cNvPr id="20" name=""/>
+          <p:cNvSpPr/>
+          <p:nvPr/>
+        </p:nvSpPr>
+        <p:spPr>
+          <a:xfrm>
+            <a:off x="9721084" y="2371504"/>
+            <a:ext cx="481198" cy="365413"/>
+          </a:xfrm>
+          <a:prstGeom prst="rect">
+            <a:avLst/>
+          </a:prstGeom>
+          <a:solidFill>
+            <a:srgbClr val="6182d6">
+              <a:alpha val="100000"/>
+            </a:srgbClr>
+          </a:solidFill>
+          <a:ln w="19050" cap="flat" cmpd="sng" algn="ctr">
+            <a:solidFill>
+              <a:srgbClr val="2e3e67">
+                <a:alpha val="100000"/>
+              </a:srgbClr>
+            </a:solidFill>
+            <a:prstDash val="solid"/>
+          </a:ln>
+        </p:spPr>
+        <p:txBody>
+          <a:bodyPr anchor="ctr"/>
+          <a:p>
+            <a:pPr marL="0" indent="0" algn="ctr" defTabSz="914400" rtl="0" eaLnBrk="1" latinLnBrk="1" hangingPunct="1">
+              <a:lnSpc>
+                <a:spcPct val="100000"/>
+              </a:lnSpc>
+              <a:spcBef>
+                <a:spcPct val="0"/>
+              </a:spcBef>
+              <a:spcAft>
+                <a:spcPts val="0"/>
+              </a:spcAft>
+              <a:buNone/>
+              <a:defRPr/>
+            </a:pPr>
+            <a:r>
+              <a:rPr xmlns:mc="http://schemas.openxmlformats.org/markup-compatibility/2006" xmlns:hp="http://schemas.haansoft.com/office/presentation/8.0" kumimoji="0" lang="en-US" altLang="ko-KR" sz="1800" b="1" i="0" u="none" strike="noStrike" kern="1200" cap="none" spc="0" normalizeH="0" baseline="0" mc:Ignorable="hp" hp:hslEmbossed="0">
+                <a:solidFill>
+                  <a:srgbClr val="ffffff"/>
+                </a:solidFill>
+                <a:latin typeface="Calibri"/>
+                <a:ea typeface="맑은 고딕"/>
+                <a:cs typeface="Times New Roman"/>
+              </a:rPr>
+              <a:t>60</a:t>
+            </a:r>
+            <a:endParaRPr xmlns:mc="http://schemas.openxmlformats.org/markup-compatibility/2006" xmlns:hp="http://schemas.haansoft.com/office/presentation/8.0" kumimoji="0" lang="en-US" altLang="ko-KR" sz="1800" b="1" i="0" u="none" strike="noStrike" kern="1200" cap="none" spc="0" normalizeH="0" baseline="0" mc:Ignorable="hp" hp:hslEmbossed="0">
+              <a:solidFill>
+                <a:srgbClr val="ffffff"/>
+              </a:solidFill>
+              <a:latin typeface="Calibri"/>
+              <a:ea typeface="맑은 고딕"/>
+              <a:cs typeface="Times New Roman"/>
+            </a:endParaRPr>
+          </a:p>
+        </p:txBody>
+      </p:sp>
+      <p:sp>
+        <p:nvSpPr>
+          <p:cNvPr id="21" name=""/>
+          <p:cNvSpPr/>
+          <p:nvPr/>
+        </p:nvSpPr>
+        <p:spPr>
+          <a:xfrm>
+            <a:off x="10202283" y="2371504"/>
+            <a:ext cx="481198" cy="365413"/>
+          </a:xfrm>
+          <a:prstGeom prst="rect">
+            <a:avLst/>
+          </a:prstGeom>
+          <a:solidFill>
+            <a:srgbClr val="6182d6">
+              <a:alpha val="100000"/>
+            </a:srgbClr>
+          </a:solidFill>
+          <a:ln w="19050" cap="flat" cmpd="sng" algn="ctr">
+            <a:solidFill>
+              <a:srgbClr val="2e3e67">
+                <a:alpha val="100000"/>
+              </a:srgbClr>
+            </a:solidFill>
+            <a:prstDash val="solid"/>
+          </a:ln>
+        </p:spPr>
+        <p:txBody>
+          <a:bodyPr anchor="ctr"/>
+          <a:p>
+            <a:pPr marL="0" indent="0" algn="ctr" defTabSz="914400" rtl="0" eaLnBrk="1" latinLnBrk="1" hangingPunct="1">
+              <a:lnSpc>
+                <a:spcPct val="100000"/>
+              </a:lnSpc>
+              <a:spcBef>
+                <a:spcPct val="0"/>
+              </a:spcBef>
+              <a:spcAft>
+                <a:spcPts val="0"/>
+              </a:spcAft>
+              <a:buNone/>
+              <a:defRPr/>
+            </a:pPr>
+            <a:r>
+              <a:rPr xmlns:mc="http://schemas.openxmlformats.org/markup-compatibility/2006" xmlns:hp="http://schemas.haansoft.com/office/presentation/8.0" kumimoji="0" lang="en-US" altLang="ko-KR" sz="1800" b="1" i="0" u="none" strike="noStrike" kern="1200" cap="none" spc="0" normalizeH="0" baseline="0" mc:Ignorable="hp" hp:hslEmbossed="0">
+                <a:solidFill>
+                  <a:srgbClr val="ffffff"/>
+                </a:solidFill>
+                <a:latin typeface="Calibri"/>
+                <a:ea typeface="맑은 고딕"/>
+                <a:cs typeface="Times New Roman"/>
+              </a:rPr>
+              <a:t>65</a:t>
+            </a:r>
+            <a:endParaRPr xmlns:mc="http://schemas.openxmlformats.org/markup-compatibility/2006" xmlns:hp="http://schemas.haansoft.com/office/presentation/8.0" kumimoji="0" lang="en-US" altLang="ko-KR" sz="1800" b="1" i="0" u="none" strike="noStrike" kern="1200" cap="none" spc="0" normalizeH="0" baseline="0" mc:Ignorable="hp" hp:hslEmbossed="0">
+              <a:solidFill>
+                <a:srgbClr val="ffffff"/>
+              </a:solidFill>
+              <a:latin typeface="Calibri"/>
+              <a:ea typeface="맑은 고딕"/>
+              <a:cs typeface="Times New Roman"/>
+            </a:endParaRPr>
+          </a:p>
+        </p:txBody>
+      </p:sp>
+      <p:sp>
+        <p:nvSpPr>
+          <p:cNvPr id="22" name=""/>
+          <p:cNvSpPr/>
+          <p:nvPr/>
+        </p:nvSpPr>
+        <p:spPr>
+          <a:xfrm>
+            <a:off x="10683481" y="2371504"/>
+            <a:ext cx="481198" cy="365413"/>
+          </a:xfrm>
+          <a:prstGeom prst="rect">
+            <a:avLst/>
+          </a:prstGeom>
+          <a:solidFill>
+            <a:srgbClr val="6182d6">
+              <a:alpha val="100000"/>
+            </a:srgbClr>
+          </a:solidFill>
+          <a:ln w="19050" cap="flat" cmpd="sng" algn="ctr">
+            <a:solidFill>
+              <a:srgbClr val="2e3e67">
+                <a:alpha val="100000"/>
+              </a:srgbClr>
+            </a:solidFill>
+            <a:prstDash val="solid"/>
+          </a:ln>
+        </p:spPr>
+        <p:txBody>
+          <a:bodyPr anchor="ctr"/>
+          <a:p>
+            <a:pPr marL="0" indent="0" algn="ctr" defTabSz="914400" rtl="0" eaLnBrk="1" latinLnBrk="1" hangingPunct="1">
+              <a:lnSpc>
+                <a:spcPct val="100000"/>
+              </a:lnSpc>
+              <a:spcBef>
+                <a:spcPct val="0"/>
+              </a:spcBef>
+              <a:spcAft>
+                <a:spcPts val="0"/>
+              </a:spcAft>
+              <a:buNone/>
+              <a:defRPr/>
+            </a:pPr>
+            <a:r>
+              <a:rPr xmlns:mc="http://schemas.openxmlformats.org/markup-compatibility/2006" xmlns:hp="http://schemas.haansoft.com/office/presentation/8.0" kumimoji="0" lang="en-US" altLang="ko-KR" sz="1800" b="1" i="0" u="none" strike="noStrike" kern="1200" cap="none" spc="0" normalizeH="0" baseline="0" mc:Ignorable="hp" hp:hslEmbossed="0">
+                <a:solidFill>
+                  <a:srgbClr val="ffffff"/>
+                </a:solidFill>
+                <a:latin typeface="Calibri"/>
+                <a:ea typeface="맑은 고딕"/>
+                <a:cs typeface="Times New Roman"/>
+              </a:rPr>
+              <a:t>70</a:t>
+            </a:r>
+            <a:endParaRPr xmlns:mc="http://schemas.openxmlformats.org/markup-compatibility/2006" xmlns:hp="http://schemas.haansoft.com/office/presentation/8.0" kumimoji="0" lang="en-US" altLang="ko-KR" sz="1800" b="1" i="0" u="none" strike="noStrike" kern="1200" cap="none" spc="0" normalizeH="0" baseline="0" mc:Ignorable="hp" hp:hslEmbossed="0">
+              <a:solidFill>
+                <a:srgbClr val="ffffff"/>
+              </a:solidFill>
+              <a:latin typeface="Calibri"/>
+              <a:ea typeface="맑은 고딕"/>
+              <a:cs typeface="Times New Roman"/>
+            </a:endParaRPr>
+          </a:p>
+        </p:txBody>
+      </p:sp>
+      <p:cxnSp>
+        <p:nvCxnSpPr>
+          <p:cNvPr id="23" name=""/>
+          <p:cNvCxnSpPr/>
+          <p:nvPr/>
+        </p:nvCxnSpPr>
+        <p:spPr>
+          <a:xfrm rot="10800000" flipV="1">
+            <a:off x="1794943" y="1717621"/>
+            <a:ext cx="1145803" cy="653899"/>
+          </a:xfrm>
+          <a:prstGeom prst="line">
+            <a:avLst/>
+          </a:prstGeom>
+          <a:noFill/>
+          <a:ln w="28575" cap="flat" cmpd="sng" algn="ctr">
+            <a:solidFill>
+              <a:srgbClr val="000000">
+                <a:alpha val="100000"/>
+              </a:srgbClr>
+            </a:solidFill>
+            <a:prstDash val="solid"/>
+          </a:ln>
+        </p:spPr>
+      </p:cxnSp>
+      <p:cxnSp>
+        <p:nvCxnSpPr>
+          <p:cNvPr id="24" name=""/>
+          <p:cNvCxnSpPr/>
+          <p:nvPr/>
+        </p:nvCxnSpPr>
+        <p:spPr>
+          <a:xfrm rot="16200000" flipH="1">
+            <a:off x="3094996" y="2044570"/>
+            <a:ext cx="653899" cy="2"/>
+          </a:xfrm>
+          <a:prstGeom prst="line">
+            <a:avLst/>
+          </a:prstGeom>
+          <a:noFill/>
+          <a:ln w="28575" cap="flat" cmpd="sng" algn="ctr">
+            <a:solidFill>
+              <a:srgbClr val="000000">
+                <a:alpha val="100000"/>
+              </a:srgbClr>
+            </a:solidFill>
+            <a:prstDash val="solid"/>
+          </a:ln>
+        </p:spPr>
+      </p:cxnSp>
+      <p:cxnSp>
+        <p:nvCxnSpPr>
+          <p:cNvPr id="25" name=""/>
+          <p:cNvCxnSpPr/>
+          <p:nvPr/>
+        </p:nvCxnSpPr>
+        <p:spPr>
+          <a:xfrm rot="10800000" flipV="1">
+            <a:off x="6817795" y="1717620"/>
+            <a:ext cx="970448" cy="653884"/>
+          </a:xfrm>
+          <a:prstGeom prst="line">
+            <a:avLst/>
+          </a:prstGeom>
+          <a:noFill/>
+          <a:ln w="28575" cap="flat" cmpd="sng" algn="ctr">
+            <a:solidFill>
+              <a:srgbClr val="000000">
+                <a:alpha val="100000"/>
+              </a:srgbClr>
+            </a:solidFill>
+            <a:prstDash val="solid"/>
+          </a:ln>
+        </p:spPr>
+      </p:cxnSp>
+      <p:cxnSp>
+        <p:nvCxnSpPr>
+          <p:cNvPr id="26" name=""/>
+          <p:cNvCxnSpPr/>
+          <p:nvPr/>
+        </p:nvCxnSpPr>
+        <p:spPr>
+          <a:xfrm>
+            <a:off x="8750638" y="1717620"/>
+            <a:ext cx="1451646" cy="653884"/>
+          </a:xfrm>
+          <a:prstGeom prst="line">
+            <a:avLst/>
+          </a:prstGeom>
+          <a:noFill/>
+          <a:ln w="28575" cap="flat" cmpd="sng" algn="ctr">
+            <a:solidFill>
+              <a:srgbClr val="000000">
+                <a:alpha val="100000"/>
+              </a:srgbClr>
+            </a:solidFill>
+            <a:prstDash val="solid"/>
+          </a:ln>
+        </p:spPr>
+      </p:cxnSp>
+      <p:sp>
+        <p:nvSpPr>
+          <p:cNvPr id="27" name=""/>
+          <p:cNvSpPr/>
+          <p:nvPr/>
+        </p:nvSpPr>
+        <p:spPr>
+          <a:xfrm>
+            <a:off x="8261389" y="2371504"/>
+            <a:ext cx="481198" cy="365413"/>
+          </a:xfrm>
+          <a:prstGeom prst="rect">
+            <a:avLst/>
+          </a:prstGeom>
+          <a:solidFill>
+            <a:srgbClr val="6182d6">
+              <a:alpha val="100000"/>
+            </a:srgbClr>
+          </a:solidFill>
+          <a:ln w="19050" cap="flat" cmpd="sng" algn="ctr">
+            <a:solidFill>
+              <a:srgbClr val="2e3e67">
+                <a:alpha val="100000"/>
+              </a:srgbClr>
+            </a:solidFill>
+            <a:prstDash val="solid"/>
+            <a:headEnd w="med" len="med"/>
+            <a:tailEnd w="med" len="med"/>
+          </a:ln>
+        </p:spPr>
+        <p:txBody>
+          <a:bodyPr anchor="ctr"/>
+          <a:p>
+            <a:pPr marL="0" indent="0" algn="ctr" defTabSz="914400" rtl="0" eaLnBrk="1" latinLnBrk="1" hangingPunct="1">
+              <a:lnSpc>
+                <a:spcPct val="100000"/>
+              </a:lnSpc>
+              <a:spcBef>
+                <a:spcPct val="0"/>
+              </a:spcBef>
+              <a:spcAft>
+                <a:spcPts val="0"/>
+              </a:spcAft>
+              <a:buNone/>
+              <a:defRPr/>
+            </a:pPr>
+            <a:r>
+              <a:rPr xmlns:mc="http://schemas.openxmlformats.org/markup-compatibility/2006" xmlns:hp="http://schemas.haansoft.com/office/presentation/8.0" kumimoji="0" lang="en-US" altLang="ko-KR" sz="1800" b="1" i="0" u="none" strike="noStrike" kern="1200" cap="none" spc="0" normalizeH="0" baseline="0" mc:Ignorable="hp" hp:hslEmbossed="0">
+                <a:solidFill>
+                  <a:srgbClr val="ffffff"/>
+                </a:solidFill>
+                <a:latin typeface="Calibri"/>
+                <a:ea typeface="맑은 고딕"/>
+                <a:cs typeface="Times New Roman"/>
+              </a:rPr>
+              <a:t>45</a:t>
+            </a:r>
+            <a:endParaRPr xmlns:mc="http://schemas.openxmlformats.org/markup-compatibility/2006" xmlns:hp="http://schemas.haansoft.com/office/presentation/8.0" kumimoji="0" lang="en-US" altLang="ko-KR" sz="1800" b="1" i="0" u="none" strike="noStrike" kern="1200" cap="none" spc="0" normalizeH="0" baseline="0" mc:Ignorable="hp" hp:hslEmbossed="0">
+              <a:solidFill>
+                <a:srgbClr val="ffffff"/>
+              </a:solidFill>
+              <a:latin typeface="Calibri"/>
+              <a:ea typeface="맑은 고딕"/>
+              <a:cs typeface="Times New Roman"/>
+            </a:endParaRPr>
+          </a:p>
+        </p:txBody>
+      </p:sp>
+      <p:cxnSp>
+        <p:nvCxnSpPr>
+          <p:cNvPr id="28" name=""/>
+          <p:cNvCxnSpPr/>
+          <p:nvPr/>
+        </p:nvCxnSpPr>
+        <p:spPr>
+          <a:xfrm rot="5400000">
+            <a:off x="7938473" y="2040536"/>
+            <a:ext cx="653883" cy="8053"/>
+          </a:xfrm>
+          <a:prstGeom prst="line">
+            <a:avLst/>
+          </a:prstGeom>
+          <a:noFill/>
+          <a:ln w="28575" cap="flat" cmpd="sng" algn="ctr">
+            <a:solidFill>
+              <a:srgbClr val="000000">
+                <a:alpha val="100000"/>
+              </a:srgbClr>
+            </a:solidFill>
+            <a:prstDash val="solid"/>
+          </a:ln>
+        </p:spPr>
+      </p:cxnSp>
+      <p:cxnSp>
+        <p:nvCxnSpPr>
+          <p:cNvPr id="29" name=""/>
+          <p:cNvCxnSpPr/>
+          <p:nvPr/>
+        </p:nvCxnSpPr>
+        <p:spPr>
+          <a:xfrm rot="10800000" flipV="1">
+            <a:off x="3421945" y="981000"/>
+            <a:ext cx="2433456" cy="371171"/>
+          </a:xfrm>
+          <a:prstGeom prst="line">
+            <a:avLst/>
+          </a:prstGeom>
+          <a:noFill/>
+          <a:ln w="28575" cap="flat" cmpd="sng" algn="ctr">
+            <a:solidFill>
+              <a:srgbClr val="000000">
+                <a:alpha val="100000"/>
+              </a:srgbClr>
+            </a:solidFill>
+            <a:prstDash val="solid"/>
+          </a:ln>
+        </p:spPr>
+      </p:cxnSp>
+      <p:cxnSp>
+        <p:nvCxnSpPr>
+          <p:cNvPr id="30" name=""/>
+          <p:cNvCxnSpPr/>
+          <p:nvPr/>
+        </p:nvCxnSpPr>
+        <p:spPr>
+          <a:xfrm>
+            <a:off x="6336599" y="980996"/>
+            <a:ext cx="1932843" cy="371175"/>
+          </a:xfrm>
+          <a:prstGeom prst="line">
+            <a:avLst/>
+          </a:prstGeom>
+          <a:noFill/>
+          <a:ln w="28575" cap="flat" cmpd="sng" algn="ctr">
+            <a:solidFill>
+              <a:srgbClr val="000000">
+                <a:alpha val="100000"/>
+              </a:srgbClr>
+            </a:solidFill>
+            <a:prstDash val="solid"/>
+          </a:ln>
+        </p:spPr>
+      </p:cxnSp>
+      <p:cxnSp>
+        <p:nvCxnSpPr>
+          <p:cNvPr id="31" name=""/>
+          <p:cNvCxnSpPr>
+            <a:endCxn id="40" idx="0"/>
+          </p:cNvCxnSpPr>
+          <p:nvPr/>
+        </p:nvCxnSpPr>
+        <p:spPr>
+          <a:xfrm>
+            <a:off x="3421945" y="4466064"/>
+            <a:ext cx="976128" cy="653920"/>
+          </a:xfrm>
+          <a:prstGeom prst="line">
+            <a:avLst/>
+          </a:prstGeom>
+          <a:noFill/>
+          <a:ln w="28575" cap="flat" cmpd="sng" algn="ctr">
+            <a:solidFill>
+              <a:srgbClr val="000000">
+                <a:alpha val="100000"/>
+              </a:srgbClr>
+            </a:solidFill>
+            <a:prstDash val="solid"/>
+          </a:ln>
+        </p:spPr>
+      </p:cxnSp>
+      <p:sp>
+        <p:nvSpPr>
+          <p:cNvPr id="32" name=""/>
+          <p:cNvSpPr/>
+          <p:nvPr/>
+        </p:nvSpPr>
+        <p:spPr>
+          <a:xfrm>
+            <a:off x="2459549" y="4100687"/>
+            <a:ext cx="481198" cy="365413"/>
+          </a:xfrm>
+          <a:prstGeom prst="rect">
+            <a:avLst/>
+          </a:prstGeom>
+          <a:ln>
+            <a:headEnd w="med" len="med"/>
+            <a:tailEnd w="med" len="med"/>
+          </a:ln>
+        </p:spPr>
+        <p:style>
+          <a:lnRef idx="2">
+            <a:schemeClr val="accent2">
+              <a:shade val="20000"/>
+            </a:schemeClr>
+          </a:lnRef>
+          <a:fillRef idx="1">
+            <a:schemeClr val="accent2"/>
+          </a:fillRef>
+          <a:effectRef idx="0">
+            <a:schemeClr val="accent2"/>
+          </a:effectRef>
+          <a:fontRef idx="minor">
+            <a:schemeClr val="lt1"/>
+          </a:fontRef>
+        </p:style>
+        <p:txBody>
+          <a:bodyPr anchor="ctr"/>
+          <a:p>
+            <a:pPr marL="0" indent="0" algn="ctr" defTabSz="914400" rtl="0" eaLnBrk="1" latinLnBrk="1" hangingPunct="1">
+              <a:lnSpc>
+                <a:spcPct val="100000"/>
+              </a:lnSpc>
+              <a:spcBef>
+                <a:spcPct val="0"/>
+              </a:spcBef>
+              <a:spcAft>
+                <a:spcPts val="0"/>
+              </a:spcAft>
+              <a:buNone/>
+              <a:defRPr/>
+            </a:pPr>
+            <a:r>
+              <a:rPr xmlns:mc="http://schemas.openxmlformats.org/markup-compatibility/2006" xmlns:hp="http://schemas.haansoft.com/office/presentation/8.0" kumimoji="0" lang="en-US" altLang="ko-KR" sz="1800" b="1" i="0" u="none" strike="noStrike" kern="1200" cap="none" spc="0" normalizeH="0" baseline="0" mc:Ignorable="hp" hp:hslEmbossed="0">
+                <a:solidFill>
+                  <a:srgbClr val="ffffff"/>
+                </a:solidFill>
+                <a:latin typeface="Calibri"/>
+                <a:ea typeface="맑은 고딕"/>
+                <a:cs typeface="Times New Roman"/>
+              </a:rPr>
+              <a:t>5</a:t>
+            </a:r>
+            <a:endParaRPr xmlns:mc="http://schemas.openxmlformats.org/markup-compatibility/2006" xmlns:hp="http://schemas.haansoft.com/office/presentation/8.0" kumimoji="0" lang="en-US" altLang="ko-KR" sz="1800" b="1" i="0" u="none" strike="noStrike" kern="1200" cap="none" spc="0" normalizeH="0" baseline="0" mc:Ignorable="hp" hp:hslEmbossed="0">
+              <a:solidFill>
+                <a:srgbClr val="ffffff"/>
+              </a:solidFill>
+              <a:latin typeface="Calibri"/>
+              <a:ea typeface="맑은 고딕"/>
+              <a:cs typeface="Times New Roman"/>
+            </a:endParaRPr>
+          </a:p>
+        </p:txBody>
+      </p:sp>
+      <p:sp>
+        <p:nvSpPr>
+          <p:cNvPr id="33" name=""/>
+          <p:cNvSpPr/>
+          <p:nvPr/>
+        </p:nvSpPr>
+        <p:spPr>
+          <a:xfrm>
+            <a:off x="2940747" y="4100687"/>
+            <a:ext cx="481198" cy="365413"/>
+          </a:xfrm>
+          <a:prstGeom prst="rect">
+            <a:avLst/>
+          </a:prstGeom>
+          <a:ln>
+            <a:headEnd w="med" len="med"/>
+            <a:tailEnd w="med" len="med"/>
+          </a:ln>
+        </p:spPr>
+        <p:style>
+          <a:lnRef idx="2">
+            <a:schemeClr val="accent2">
+              <a:shade val="20000"/>
+            </a:schemeClr>
+          </a:lnRef>
+          <a:fillRef idx="1">
+            <a:schemeClr val="accent2"/>
+          </a:fillRef>
+          <a:effectRef idx="0">
+            <a:schemeClr val="accent2"/>
+          </a:effectRef>
+          <a:fontRef idx="minor">
+            <a:schemeClr val="lt1"/>
+          </a:fontRef>
+        </p:style>
+        <p:txBody>
+          <a:bodyPr anchor="ctr"/>
+          <a:p>
+            <a:pPr marL="0" indent="0" algn="ctr" defTabSz="914400" rtl="0" eaLnBrk="1" latinLnBrk="1" hangingPunct="1">
+              <a:lnSpc>
+                <a:spcPct val="100000"/>
+              </a:lnSpc>
+              <a:spcBef>
+                <a:spcPct val="0"/>
+              </a:spcBef>
+              <a:spcAft>
+                <a:spcPts val="0"/>
+              </a:spcAft>
+              <a:buNone/>
+              <a:defRPr/>
+            </a:pPr>
+            <a:r>
+              <a:rPr xmlns:mc="http://schemas.openxmlformats.org/markup-compatibility/2006" xmlns:hp="http://schemas.haansoft.com/office/presentation/8.0" kumimoji="0" lang="en-US" altLang="ko-KR" sz="1800" b="1" i="0" u="none" strike="noStrike" kern="1200" cap="none" spc="0" normalizeH="0" baseline="0" mc:Ignorable="hp" hp:hslEmbossed="0">
+                <a:solidFill>
+                  <a:srgbClr val="ffffff"/>
+                </a:solidFill>
+                <a:latin typeface="Calibri"/>
+                <a:ea typeface="맑은 고딕"/>
+                <a:cs typeface="Times New Roman"/>
+              </a:rPr>
+              <a:t>12</a:t>
+            </a:r>
+            <a:endParaRPr xmlns:mc="http://schemas.openxmlformats.org/markup-compatibility/2006" xmlns:hp="http://schemas.haansoft.com/office/presentation/8.0" kumimoji="0" lang="en-US" altLang="ko-KR" sz="1800" b="1" i="0" u="none" strike="noStrike" kern="1200" cap="none" spc="0" normalizeH="0" baseline="0" mc:Ignorable="hp" hp:hslEmbossed="0">
+              <a:solidFill>
+                <a:srgbClr val="ffffff"/>
+              </a:solidFill>
+              <a:latin typeface="Calibri"/>
+              <a:ea typeface="맑은 고딕"/>
+              <a:cs typeface="Times New Roman"/>
+            </a:endParaRPr>
+          </a:p>
+        </p:txBody>
+      </p:sp>
+      <p:sp>
+        <p:nvSpPr>
+          <p:cNvPr id="34" name=""/>
+          <p:cNvSpPr/>
+          <p:nvPr/>
+        </p:nvSpPr>
+        <p:spPr>
+          <a:xfrm>
+            <a:off x="5374203" y="3364063"/>
+            <a:ext cx="481198" cy="365413"/>
+          </a:xfrm>
+          <a:prstGeom prst="rect">
+            <a:avLst/>
+          </a:prstGeom>
+          <a:ln>
+            <a:headEnd w="med" len="med"/>
+            <a:tailEnd w="med" len="med"/>
+          </a:ln>
+        </p:spPr>
+        <p:style>
+          <a:lnRef idx="2">
+            <a:schemeClr val="accent2">
+              <a:shade val="20000"/>
+            </a:schemeClr>
+          </a:lnRef>
+          <a:fillRef idx="1">
+            <a:schemeClr val="accent2"/>
+          </a:fillRef>
+          <a:effectRef idx="0">
+            <a:schemeClr val="accent2"/>
+          </a:effectRef>
+          <a:fontRef idx="minor">
+            <a:schemeClr val="lt1"/>
+          </a:fontRef>
+        </p:style>
+        <p:txBody>
+          <a:bodyPr anchor="ctr"/>
+          <a:p>
+            <a:pPr marL="0" indent="0" algn="ctr" defTabSz="914400" rtl="0" eaLnBrk="1" latinLnBrk="1" hangingPunct="1">
+              <a:lnSpc>
+                <a:spcPct val="100000"/>
+              </a:lnSpc>
+              <a:spcBef>
+                <a:spcPct val="0"/>
+              </a:spcBef>
+              <a:spcAft>
+                <a:spcPts val="0"/>
+              </a:spcAft>
+              <a:buNone/>
+              <a:defRPr/>
+            </a:pPr>
+            <a:r>
+              <a:rPr xmlns:mc="http://schemas.openxmlformats.org/markup-compatibility/2006" xmlns:hp="http://schemas.haansoft.com/office/presentation/8.0" kumimoji="0" lang="en-US" altLang="ko-KR" sz="1800" b="1" i="0" u="none" strike="noStrike" kern="1200" cap="none" spc="0" normalizeH="0" baseline="0" mc:Ignorable="hp" hp:hslEmbossed="0">
+                <a:solidFill>
+                  <a:srgbClr val="ffffff"/>
+                </a:solidFill>
+                <a:latin typeface="Calibri"/>
+                <a:ea typeface="맑은 고딕"/>
+                <a:cs typeface="Times New Roman"/>
+              </a:rPr>
+              <a:t>20</a:t>
+            </a:r>
+            <a:endParaRPr xmlns:mc="http://schemas.openxmlformats.org/markup-compatibility/2006" xmlns:hp="http://schemas.haansoft.com/office/presentation/8.0" kumimoji="0" lang="en-US" altLang="ko-KR" sz="1800" b="1" i="0" u="none" strike="noStrike" kern="1200" cap="none" spc="0" normalizeH="0" baseline="0" mc:Ignorable="hp" hp:hslEmbossed="0">
+              <a:solidFill>
+                <a:srgbClr val="ffffff"/>
+              </a:solidFill>
+              <a:latin typeface="Calibri"/>
+              <a:ea typeface="맑은 고딕"/>
+              <a:cs typeface="Times New Roman"/>
+            </a:endParaRPr>
+          </a:p>
+        </p:txBody>
+      </p:sp>
+      <p:sp>
+        <p:nvSpPr>
+          <p:cNvPr id="35" name=""/>
+          <p:cNvSpPr/>
+          <p:nvPr/>
+        </p:nvSpPr>
+        <p:spPr>
+          <a:xfrm>
+            <a:off x="8269441" y="4100670"/>
+            <a:ext cx="481198" cy="365413"/>
+          </a:xfrm>
+          <a:prstGeom prst="rect">
+            <a:avLst/>
+          </a:prstGeom>
+          <a:ln>
+            <a:headEnd w="med" len="med"/>
+            <a:tailEnd w="med" len="med"/>
+          </a:ln>
+        </p:spPr>
+        <p:style>
+          <a:lnRef idx="2">
+            <a:schemeClr val="accent2">
+              <a:shade val="20000"/>
+            </a:schemeClr>
+          </a:lnRef>
+          <a:fillRef idx="1">
+            <a:schemeClr val="accent2"/>
+          </a:fillRef>
+          <a:effectRef idx="0">
+            <a:schemeClr val="accent2"/>
+          </a:effectRef>
+          <a:fontRef idx="minor">
+            <a:schemeClr val="lt1"/>
+          </a:fontRef>
+        </p:style>
+        <p:txBody>
+          <a:bodyPr anchor="ctr"/>
+          <a:p>
+            <a:pPr marL="0" indent="0" algn="ctr" defTabSz="914400" rtl="0" eaLnBrk="1" latinLnBrk="1" hangingPunct="1">
+              <a:lnSpc>
+                <a:spcPct val="100000"/>
+              </a:lnSpc>
+              <a:spcBef>
+                <a:spcPct val="0"/>
+              </a:spcBef>
+              <a:spcAft>
+                <a:spcPts val="0"/>
+              </a:spcAft>
+              <a:buNone/>
+              <a:defRPr/>
+            </a:pPr>
+            <a:r>
+              <a:rPr xmlns:mc="http://schemas.openxmlformats.org/markup-compatibility/2006" xmlns:hp="http://schemas.haansoft.com/office/presentation/8.0" kumimoji="0" lang="en-US" altLang="ko-KR" sz="1800" b="1" i="0" u="none" strike="noStrike" kern="1200" cap="none" spc="0" normalizeH="0" baseline="0" mc:Ignorable="hp" hp:hslEmbossed="0">
+                <a:solidFill>
+                  <a:srgbClr val="ffffff"/>
+                </a:solidFill>
+                <a:latin typeface="Calibri"/>
+                <a:ea typeface="맑은 고딕"/>
+                <a:cs typeface="Times New Roman"/>
+              </a:rPr>
+              <a:t>50</a:t>
+            </a:r>
+            <a:endParaRPr xmlns:mc="http://schemas.openxmlformats.org/markup-compatibility/2006" xmlns:hp="http://schemas.haansoft.com/office/presentation/8.0" kumimoji="0" lang="en-US" altLang="ko-KR" sz="1800" b="1" i="0" u="none" strike="noStrike" kern="1200" cap="none" spc="0" normalizeH="0" baseline="0" mc:Ignorable="hp" hp:hslEmbossed="0">
+              <a:solidFill>
+                <a:srgbClr val="ffffff"/>
+              </a:solidFill>
+              <a:latin typeface="Calibri"/>
+              <a:ea typeface="맑은 고딕"/>
+              <a:cs typeface="Times New Roman"/>
+            </a:endParaRPr>
+          </a:p>
+        </p:txBody>
+      </p:sp>
+      <p:sp>
+        <p:nvSpPr>
+          <p:cNvPr id="36" name=""/>
+          <p:cNvSpPr/>
+          <p:nvPr/>
+        </p:nvSpPr>
+        <p:spPr>
+          <a:xfrm>
+            <a:off x="351349" y="5120001"/>
+            <a:ext cx="481198" cy="365413"/>
+          </a:xfrm>
+          <a:prstGeom prst="rect">
+            <a:avLst/>
+          </a:prstGeom>
+          <a:solidFill>
+            <a:srgbClr val="6182d6">
+              <a:alpha val="100000"/>
+            </a:srgbClr>
+          </a:solidFill>
+          <a:ln w="19050" cap="flat" cmpd="sng" algn="ctr">
+            <a:solidFill>
+              <a:srgbClr val="2e3e67">
+                <a:alpha val="100000"/>
+              </a:srgbClr>
+            </a:solidFill>
+            <a:prstDash val="solid"/>
+          </a:ln>
+        </p:spPr>
+        <p:txBody>
+          <a:bodyPr anchor="ctr"/>
+          <a:p>
+            <a:pPr marL="0" indent="0" algn="ctr" defTabSz="914400" rtl="0" eaLnBrk="1" latinLnBrk="1" hangingPunct="1">
+              <a:lnSpc>
+                <a:spcPct val="100000"/>
+              </a:lnSpc>
+              <a:spcBef>
+                <a:spcPct val="0"/>
+              </a:spcBef>
+              <a:spcAft>
+                <a:spcPts val="0"/>
+              </a:spcAft>
+              <a:buNone/>
+              <a:defRPr/>
+            </a:pPr>
+            <a:r>
+              <a:rPr xmlns:mc="http://schemas.openxmlformats.org/markup-compatibility/2006" xmlns:hp="http://schemas.haansoft.com/office/presentation/8.0" kumimoji="0" lang="en-US" altLang="ko-KR" sz="1800" b="1" i="0" u="none" strike="noStrike" kern="1200" cap="none" spc="0" normalizeH="0" baseline="0" mc:Ignorable="hp" hp:hslEmbossed="0">
+                <a:solidFill>
+                  <a:srgbClr val="ffffff"/>
+                </a:solidFill>
+                <a:latin typeface="Calibri"/>
+                <a:ea typeface="맑은 고딕"/>
+                <a:cs typeface="Times New Roman"/>
+              </a:rPr>
+              <a:t>1</a:t>
+            </a:r>
+            <a:endParaRPr xmlns:mc="http://schemas.openxmlformats.org/markup-compatibility/2006" xmlns:hp="http://schemas.haansoft.com/office/presentation/8.0" kumimoji="0" lang="en-US" altLang="ko-KR" sz="1800" b="1" i="0" u="none" strike="noStrike" kern="1200" cap="none" spc="0" normalizeH="0" baseline="0" mc:Ignorable="hp" hp:hslEmbossed="0">
+              <a:solidFill>
+                <a:srgbClr val="ffffff"/>
+              </a:solidFill>
+              <a:latin typeface="Calibri"/>
+              <a:ea typeface="맑은 고딕"/>
+              <a:cs typeface="Times New Roman"/>
+            </a:endParaRPr>
+          </a:p>
+        </p:txBody>
+      </p:sp>
+      <p:sp>
+        <p:nvSpPr>
+          <p:cNvPr id="37" name=""/>
+          <p:cNvSpPr/>
+          <p:nvPr/>
+        </p:nvSpPr>
+        <p:spPr>
+          <a:xfrm>
+            <a:off x="832547" y="5120001"/>
+            <a:ext cx="481198" cy="365413"/>
+          </a:xfrm>
+          <a:prstGeom prst="rect">
+            <a:avLst/>
+          </a:prstGeom>
+          <a:solidFill>
+            <a:srgbClr val="6182d6">
+              <a:alpha val="100000"/>
+            </a:srgbClr>
+          </a:solidFill>
+          <a:ln w="19050" cap="flat" cmpd="sng" algn="ctr">
+            <a:solidFill>
+              <a:srgbClr val="2e3e67">
+                <a:alpha val="100000"/>
+              </a:srgbClr>
+            </a:solidFill>
+            <a:prstDash val="solid"/>
+          </a:ln>
+        </p:spPr>
+        <p:txBody>
+          <a:bodyPr anchor="ctr"/>
+          <a:p>
+            <a:pPr marL="0" indent="0" algn="ctr" defTabSz="914400" rtl="0" eaLnBrk="1" latinLnBrk="1" hangingPunct="1">
+              <a:lnSpc>
+                <a:spcPct val="100000"/>
+              </a:lnSpc>
+              <a:spcBef>
+                <a:spcPct val="0"/>
+              </a:spcBef>
+              <a:spcAft>
+                <a:spcPts val="0"/>
+              </a:spcAft>
+              <a:buNone/>
+              <a:defRPr/>
+            </a:pPr>
+            <a:r>
+              <a:rPr xmlns:mc="http://schemas.openxmlformats.org/markup-compatibility/2006" xmlns:hp="http://schemas.haansoft.com/office/presentation/8.0" kumimoji="0" lang="en-US" altLang="ko-KR" sz="1800" b="1" i="0" u="none" strike="noStrike" kern="1200" cap="none" spc="0" normalizeH="0" baseline="0" mc:Ignorable="hp" hp:hslEmbossed="0">
+                <a:solidFill>
+                  <a:srgbClr val="ffffff"/>
+                </a:solidFill>
+                <a:latin typeface="Calibri"/>
+                <a:ea typeface="맑은 고딕"/>
+                <a:cs typeface="Times New Roman"/>
+              </a:rPr>
+              <a:t>2</a:t>
+            </a:r>
+            <a:endParaRPr xmlns:mc="http://schemas.openxmlformats.org/markup-compatibility/2006" xmlns:hp="http://schemas.haansoft.com/office/presentation/8.0" kumimoji="0" lang="en-US" altLang="ko-KR" sz="1800" b="1" i="0" u="none" strike="noStrike" kern="1200" cap="none" spc="0" normalizeH="0" baseline="0" mc:Ignorable="hp" hp:hslEmbossed="0">
+              <a:solidFill>
+                <a:srgbClr val="ffffff"/>
+              </a:solidFill>
+              <a:latin typeface="Calibri"/>
+              <a:ea typeface="맑은 고딕"/>
+              <a:cs typeface="Times New Roman"/>
+            </a:endParaRPr>
+          </a:p>
+        </p:txBody>
+      </p:sp>
+      <p:sp>
+        <p:nvSpPr>
+          <p:cNvPr id="38" name=""/>
+          <p:cNvSpPr/>
+          <p:nvPr/>
+        </p:nvSpPr>
+        <p:spPr>
+          <a:xfrm>
+            <a:off x="2276141" y="5120001"/>
+            <a:ext cx="481198" cy="365413"/>
+          </a:xfrm>
+          <a:prstGeom prst="rect">
+            <a:avLst/>
+          </a:prstGeom>
+          <a:ln>
+            <a:headEnd w="med" len="med"/>
+            <a:tailEnd w="med" len="med"/>
+          </a:ln>
+        </p:spPr>
+        <p:style>
+          <a:lnRef idx="2">
+            <a:schemeClr val="accent1">
+              <a:shade val="20000"/>
+            </a:schemeClr>
+          </a:lnRef>
+          <a:fillRef idx="1">
+            <a:schemeClr val="accent1"/>
+          </a:fillRef>
+          <a:effectRef idx="0">
+            <a:schemeClr val="accent1"/>
+          </a:effectRef>
+          <a:fontRef idx="minor">
+            <a:schemeClr val="lt1"/>
+          </a:fontRef>
+        </p:style>
+        <p:txBody>
+          <a:bodyPr anchor="ctr"/>
+          <a:p>
+            <a:pPr marL="0" indent="0" algn="ctr" defTabSz="914400" rtl="0" eaLnBrk="1" latinLnBrk="1" hangingPunct="1">
+              <a:lnSpc>
+                <a:spcPct val="100000"/>
+              </a:lnSpc>
+              <a:spcBef>
+                <a:spcPct val="0"/>
+              </a:spcBef>
+              <a:spcAft>
+                <a:spcPts val="0"/>
+              </a:spcAft>
+              <a:buNone/>
+              <a:defRPr/>
+            </a:pPr>
+            <a:r>
+              <a:rPr xmlns:mc="http://schemas.openxmlformats.org/markup-compatibility/2006" xmlns:hp="http://schemas.haansoft.com/office/presentation/8.0" kumimoji="0" lang="en-US" altLang="ko-KR" sz="1800" b="1" i="0" u="none" strike="noStrike" kern="1200" cap="none" spc="0" normalizeH="0" baseline="0" mc:Ignorable="hp" hp:hslEmbossed="0">
+                <a:solidFill>
+                  <a:srgbClr val="ffffff"/>
+                </a:solidFill>
+                <a:latin typeface="Calibri"/>
+                <a:ea typeface="맑은 고딕"/>
+                <a:cs typeface="Times New Roman"/>
+              </a:rPr>
+              <a:t>7</a:t>
+            </a:r>
+            <a:endParaRPr xmlns:mc="http://schemas.openxmlformats.org/markup-compatibility/2006" xmlns:hp="http://schemas.haansoft.com/office/presentation/8.0" kumimoji="0" lang="en-US" altLang="ko-KR" sz="1800" b="1" i="0" u="none" strike="noStrike" kern="1200" cap="none" spc="0" normalizeH="0" baseline="0" mc:Ignorable="hp" hp:hslEmbossed="0">
+              <a:solidFill>
+                <a:srgbClr val="ffffff"/>
+              </a:solidFill>
+              <a:latin typeface="Calibri"/>
+              <a:ea typeface="맑은 고딕"/>
+              <a:cs typeface="Times New Roman"/>
+            </a:endParaRPr>
+          </a:p>
+        </p:txBody>
+      </p:sp>
+      <p:sp>
+        <p:nvSpPr>
+          <p:cNvPr id="39" name=""/>
+          <p:cNvSpPr/>
+          <p:nvPr/>
+        </p:nvSpPr>
+        <p:spPr>
+          <a:xfrm>
+            <a:off x="2757339" y="5120001"/>
+            <a:ext cx="481198" cy="365413"/>
+          </a:xfrm>
+          <a:prstGeom prst="rect">
+            <a:avLst/>
+          </a:prstGeom>
+          <a:solidFill>
+            <a:srgbClr val="6182d6">
+              <a:alpha val="100000"/>
+            </a:srgbClr>
+          </a:solidFill>
+          <a:ln w="19050" cap="flat" cmpd="sng" algn="ctr">
+            <a:solidFill>
+              <a:srgbClr val="2e3e67">
+                <a:alpha val="100000"/>
+              </a:srgbClr>
+            </a:solidFill>
+            <a:prstDash val="solid"/>
+          </a:ln>
+        </p:spPr>
+        <p:txBody>
+          <a:bodyPr anchor="ctr"/>
+          <a:p>
+            <a:pPr marL="0" indent="0" algn="ctr" defTabSz="914400" rtl="0" eaLnBrk="1" latinLnBrk="1" hangingPunct="1">
+              <a:lnSpc>
+                <a:spcPct val="100000"/>
+              </a:lnSpc>
+              <a:spcBef>
+                <a:spcPct val="0"/>
+              </a:spcBef>
+              <a:spcAft>
+                <a:spcPts val="0"/>
+              </a:spcAft>
+              <a:buNone/>
+              <a:defRPr/>
+            </a:pPr>
+            <a:r>
+              <a:rPr xmlns:mc="http://schemas.openxmlformats.org/markup-compatibility/2006" xmlns:hp="http://schemas.haansoft.com/office/presentation/8.0" kumimoji="0" lang="en-US" altLang="ko-KR" sz="1800" b="1" i="0" u="none" strike="noStrike" kern="1200" cap="none" spc="0" normalizeH="0" baseline="0" mc:Ignorable="hp" hp:hslEmbossed="0">
+                <a:solidFill>
+                  <a:srgbClr val="ffffff"/>
+                </a:solidFill>
+                <a:latin typeface="Calibri"/>
+                <a:ea typeface="맑은 고딕"/>
+                <a:cs typeface="Times New Roman"/>
+              </a:rPr>
+              <a:t>10</a:t>
+            </a:r>
+            <a:endParaRPr xmlns:mc="http://schemas.openxmlformats.org/markup-compatibility/2006" xmlns:hp="http://schemas.haansoft.com/office/presentation/8.0" kumimoji="0" lang="en-US" altLang="ko-KR" sz="1800" b="1" i="0" u="none" strike="noStrike" kern="1200" cap="none" spc="0" normalizeH="0" baseline="0" mc:Ignorable="hp" hp:hslEmbossed="0">
+              <a:solidFill>
+                <a:srgbClr val="ffffff"/>
+              </a:solidFill>
+              <a:latin typeface="Calibri"/>
+              <a:ea typeface="맑은 고딕"/>
+              <a:cs typeface="Times New Roman"/>
+            </a:endParaRPr>
+          </a:p>
+        </p:txBody>
+      </p:sp>
+      <p:sp>
+        <p:nvSpPr>
+          <p:cNvPr id="40" name=""/>
+          <p:cNvSpPr/>
+          <p:nvPr/>
+        </p:nvSpPr>
+        <p:spPr>
+          <a:xfrm>
+            <a:off x="4157474" y="5119984"/>
+            <a:ext cx="481198" cy="365413"/>
+          </a:xfrm>
+          <a:prstGeom prst="rect">
+            <a:avLst/>
+          </a:prstGeom>
+          <a:solidFill>
+            <a:srgbClr val="6182d6">
+              <a:alpha val="100000"/>
+            </a:srgbClr>
+          </a:solidFill>
+          <a:ln w="19050" cap="flat" cmpd="sng" algn="ctr">
+            <a:solidFill>
+              <a:srgbClr val="2e3e67">
+                <a:alpha val="100000"/>
+              </a:srgbClr>
+            </a:solidFill>
+            <a:prstDash val="solid"/>
+          </a:ln>
+        </p:spPr>
+        <p:txBody>
+          <a:bodyPr anchor="ctr"/>
+          <a:p>
+            <a:pPr marL="0" indent="0" algn="ctr" defTabSz="914400" rtl="0" eaLnBrk="1" latinLnBrk="1" hangingPunct="1">
+              <a:lnSpc>
+                <a:spcPct val="100000"/>
+              </a:lnSpc>
+              <a:spcBef>
+                <a:spcPct val="0"/>
+              </a:spcBef>
+              <a:spcAft>
+                <a:spcPts val="0"/>
+              </a:spcAft>
+              <a:buNone/>
+              <a:defRPr/>
+            </a:pPr>
+            <a:r>
+              <a:rPr xmlns:mc="http://schemas.openxmlformats.org/markup-compatibility/2006" xmlns:hp="http://schemas.haansoft.com/office/presentation/8.0" kumimoji="0" lang="en-US" altLang="ko-KR" sz="1800" b="1" i="0" u="none" strike="noStrike" kern="1200" cap="none" spc="0" normalizeH="0" baseline="0" mc:Ignorable="hp" hp:hslEmbossed="0">
+                <a:solidFill>
+                  <a:srgbClr val="ffffff"/>
+                </a:solidFill>
+                <a:latin typeface="Calibri"/>
+                <a:ea typeface="맑은 고딕"/>
+                <a:cs typeface="Times New Roman"/>
+              </a:rPr>
+              <a:t>14</a:t>
+            </a:r>
+            <a:endParaRPr xmlns:mc="http://schemas.openxmlformats.org/markup-compatibility/2006" xmlns:hp="http://schemas.haansoft.com/office/presentation/8.0" kumimoji="0" lang="en-US" altLang="ko-KR" sz="1800" b="1" i="0" u="none" strike="noStrike" kern="1200" cap="none" spc="0" normalizeH="0" baseline="0" mc:Ignorable="hp" hp:hslEmbossed="0">
+              <a:solidFill>
+                <a:srgbClr val="ffffff"/>
+              </a:solidFill>
+              <a:latin typeface="Calibri"/>
+              <a:ea typeface="맑은 고딕"/>
+              <a:cs typeface="Times New Roman"/>
+            </a:endParaRPr>
+          </a:p>
+        </p:txBody>
+      </p:sp>
+      <p:sp>
+        <p:nvSpPr>
+          <p:cNvPr id="41" name=""/>
+          <p:cNvSpPr/>
+          <p:nvPr/>
+        </p:nvSpPr>
+        <p:spPr>
+          <a:xfrm>
+            <a:off x="4638672" y="5119984"/>
+            <a:ext cx="481198" cy="365413"/>
+          </a:xfrm>
+          <a:prstGeom prst="rect">
+            <a:avLst/>
+          </a:prstGeom>
+          <a:solidFill>
+            <a:srgbClr val="6182d6">
+              <a:alpha val="100000"/>
+            </a:srgbClr>
+          </a:solidFill>
+          <a:ln w="19050" cap="flat" cmpd="sng" algn="ctr">
+            <a:solidFill>
+              <a:srgbClr val="2e3e67">
+                <a:alpha val="100000"/>
+              </a:srgbClr>
+            </a:solidFill>
+            <a:prstDash val="solid"/>
+          </a:ln>
+        </p:spPr>
+        <p:txBody>
+          <a:bodyPr anchor="ctr"/>
+          <a:p>
+            <a:pPr marL="0" indent="0" algn="ctr" defTabSz="914400" rtl="0" eaLnBrk="1" latinLnBrk="1" hangingPunct="1">
+              <a:lnSpc>
+                <a:spcPct val="100000"/>
+              </a:lnSpc>
+              <a:spcBef>
+                <a:spcPct val="0"/>
+              </a:spcBef>
+              <a:spcAft>
+                <a:spcPts val="0"/>
+              </a:spcAft>
+              <a:buNone/>
+              <a:defRPr/>
+            </a:pPr>
+            <a:r>
+              <a:rPr xmlns:mc="http://schemas.openxmlformats.org/markup-compatibility/2006" xmlns:hp="http://schemas.haansoft.com/office/presentation/8.0" kumimoji="0" lang="en-US" altLang="ko-KR" sz="1800" b="1" i="0" u="none" strike="noStrike" kern="1200" cap="none" spc="0" normalizeH="0" baseline="0" mc:Ignorable="hp" hp:hslEmbossed="0">
+                <a:solidFill>
+                  <a:srgbClr val="ffffff"/>
+                </a:solidFill>
+                <a:latin typeface="Calibri"/>
+                <a:ea typeface="맑은 고딕"/>
+                <a:cs typeface="Times New Roman"/>
+              </a:rPr>
+              <a:t>16</a:t>
+            </a:r>
+            <a:endParaRPr xmlns:mc="http://schemas.openxmlformats.org/markup-compatibility/2006" xmlns:hp="http://schemas.haansoft.com/office/presentation/8.0" kumimoji="0" lang="en-US" altLang="ko-KR" sz="1800" b="1" i="0" u="none" strike="noStrike" kern="1200" cap="none" spc="0" normalizeH="0" baseline="0" mc:Ignorable="hp" hp:hslEmbossed="0">
+              <a:solidFill>
+                <a:srgbClr val="ffffff"/>
+              </a:solidFill>
+              <a:latin typeface="Calibri"/>
+              <a:ea typeface="맑은 고딕"/>
+              <a:cs typeface="Times New Roman"/>
+            </a:endParaRPr>
+          </a:p>
+        </p:txBody>
+      </p:sp>
+      <p:sp>
+        <p:nvSpPr>
+          <p:cNvPr id="42" name=""/>
+          <p:cNvSpPr/>
+          <p:nvPr/>
+        </p:nvSpPr>
+        <p:spPr>
+          <a:xfrm>
+            <a:off x="6026746" y="5119983"/>
+            <a:ext cx="481198" cy="365413"/>
+          </a:xfrm>
+          <a:prstGeom prst="rect">
+            <a:avLst/>
+          </a:prstGeom>
+          <a:solidFill>
+            <a:srgbClr val="6182d6">
+              <a:alpha val="100000"/>
+            </a:srgbClr>
+          </a:solidFill>
+          <a:ln w="19050" cap="flat" cmpd="sng" algn="ctr">
+            <a:solidFill>
+              <a:srgbClr val="2e3e67">
+                <a:alpha val="100000"/>
+              </a:srgbClr>
+            </a:solidFill>
+            <a:prstDash val="solid"/>
+          </a:ln>
+        </p:spPr>
+        <p:txBody>
+          <a:bodyPr anchor="ctr"/>
+          <a:p>
+            <a:pPr marL="0" indent="0" algn="ctr" defTabSz="914400" rtl="0" eaLnBrk="1" latinLnBrk="1" hangingPunct="1">
+              <a:lnSpc>
+                <a:spcPct val="100000"/>
+              </a:lnSpc>
+              <a:spcBef>
+                <a:spcPct val="0"/>
+              </a:spcBef>
+              <a:spcAft>
+                <a:spcPts val="0"/>
+              </a:spcAft>
+              <a:buNone/>
+              <a:defRPr/>
+            </a:pPr>
+            <a:r>
+              <a:rPr xmlns:mc="http://schemas.openxmlformats.org/markup-compatibility/2006" xmlns:hp="http://schemas.haansoft.com/office/presentation/8.0" kumimoji="0" lang="en-US" altLang="ko-KR" sz="1800" b="1" i="0" u="none" strike="noStrike" kern="1200" cap="none" spc="0" normalizeH="0" baseline="0" mc:Ignorable="hp" hp:hslEmbossed="0">
+                <a:solidFill>
+                  <a:srgbClr val="ffffff"/>
+                </a:solidFill>
+                <a:latin typeface="Calibri"/>
+                <a:ea typeface="맑은 고딕"/>
+                <a:cs typeface="Times New Roman"/>
+              </a:rPr>
+              <a:t>25</a:t>
+            </a:r>
+            <a:endParaRPr xmlns:mc="http://schemas.openxmlformats.org/markup-compatibility/2006" xmlns:hp="http://schemas.haansoft.com/office/presentation/8.0" kumimoji="0" lang="en-US" altLang="ko-KR" sz="1800" b="1" i="0" u="none" strike="noStrike" kern="1200" cap="none" spc="0" normalizeH="0" baseline="0" mc:Ignorable="hp" hp:hslEmbossed="0">
+              <a:solidFill>
+                <a:srgbClr val="ffffff"/>
+              </a:solidFill>
+              <a:latin typeface="Calibri"/>
+              <a:ea typeface="맑은 고딕"/>
+              <a:cs typeface="Times New Roman"/>
+            </a:endParaRPr>
+          </a:p>
+        </p:txBody>
+      </p:sp>
+      <p:sp>
+        <p:nvSpPr>
+          <p:cNvPr id="43" name=""/>
+          <p:cNvSpPr/>
+          <p:nvPr/>
+        </p:nvSpPr>
+        <p:spPr>
+          <a:xfrm>
+            <a:off x="6507944" y="5119983"/>
+            <a:ext cx="481198" cy="365413"/>
+          </a:xfrm>
+          <a:prstGeom prst="rect">
+            <a:avLst/>
+          </a:prstGeom>
+          <a:solidFill>
+            <a:srgbClr val="6182d6">
+              <a:alpha val="100000"/>
+            </a:srgbClr>
+          </a:solidFill>
+          <a:ln w="19050" cap="flat" cmpd="sng" algn="ctr">
+            <a:solidFill>
+              <a:srgbClr val="2e3e67">
+                <a:alpha val="100000"/>
+              </a:srgbClr>
+            </a:solidFill>
+            <a:prstDash val="solid"/>
+          </a:ln>
+        </p:spPr>
+        <p:txBody>
+          <a:bodyPr anchor="ctr"/>
+          <a:p>
+            <a:pPr marL="0" indent="0" algn="ctr" defTabSz="914400" rtl="0" eaLnBrk="1" latinLnBrk="1" hangingPunct="1">
+              <a:lnSpc>
+                <a:spcPct val="100000"/>
+              </a:lnSpc>
+              <a:spcBef>
+                <a:spcPct val="0"/>
+              </a:spcBef>
+              <a:spcAft>
+                <a:spcPts val="0"/>
+              </a:spcAft>
+              <a:buNone/>
+              <a:defRPr/>
+            </a:pPr>
+            <a:r>
+              <a:rPr xmlns:mc="http://schemas.openxmlformats.org/markup-compatibility/2006" xmlns:hp="http://schemas.haansoft.com/office/presentation/8.0" kumimoji="0" lang="en-US" altLang="ko-KR" sz="1800" b="1" i="0" u="none" strike="noStrike" kern="1200" cap="none" spc="0" normalizeH="0" baseline="0" mc:Ignorable="hp" hp:hslEmbossed="0">
+                <a:solidFill>
+                  <a:srgbClr val="ffffff"/>
+                </a:solidFill>
+                <a:latin typeface="Calibri"/>
+                <a:ea typeface="맑은 고딕"/>
+                <a:cs typeface="Times New Roman"/>
+              </a:rPr>
+              <a:t>30</a:t>
+            </a:r>
+            <a:endParaRPr xmlns:mc="http://schemas.openxmlformats.org/markup-compatibility/2006" xmlns:hp="http://schemas.haansoft.com/office/presentation/8.0" kumimoji="0" lang="en-US" altLang="ko-KR" sz="1800" b="1" i="0" u="none" strike="noStrike" kern="1200" cap="none" spc="0" normalizeH="0" baseline="0" mc:Ignorable="hp" hp:hslEmbossed="0">
+              <a:solidFill>
+                <a:srgbClr val="ffffff"/>
+              </a:solidFill>
+              <a:latin typeface="Calibri"/>
+              <a:ea typeface="맑은 고딕"/>
+              <a:cs typeface="Times New Roman"/>
+            </a:endParaRPr>
+          </a:p>
+        </p:txBody>
+      </p:sp>
+      <p:sp>
+        <p:nvSpPr>
+          <p:cNvPr id="44" name=""/>
+          <p:cNvSpPr/>
+          <p:nvPr/>
+        </p:nvSpPr>
+        <p:spPr>
+          <a:xfrm>
+            <a:off x="7788243" y="4100687"/>
+            <a:ext cx="481198" cy="365413"/>
+          </a:xfrm>
+          <a:prstGeom prst="rect">
+            <a:avLst/>
+          </a:prstGeom>
+          <a:ln>
+            <a:headEnd w="med" len="med"/>
+            <a:tailEnd w="med" len="med"/>
+          </a:ln>
+        </p:spPr>
+        <p:style>
+          <a:lnRef idx="2">
+            <a:schemeClr val="accent2">
+              <a:shade val="20000"/>
+            </a:schemeClr>
+          </a:lnRef>
+          <a:fillRef idx="1">
+            <a:schemeClr val="accent2"/>
+          </a:fillRef>
+          <a:effectRef idx="0">
+            <a:schemeClr val="accent2"/>
+          </a:effectRef>
+          <a:fontRef idx="minor">
+            <a:schemeClr val="lt1"/>
+          </a:fontRef>
+        </p:style>
+        <p:txBody>
+          <a:bodyPr anchor="ctr"/>
+          <a:p>
+            <a:pPr marL="0" indent="0" algn="ctr" defTabSz="914400" rtl="0" eaLnBrk="1" latinLnBrk="1" hangingPunct="1">
+              <a:lnSpc>
+                <a:spcPct val="100000"/>
+              </a:lnSpc>
+              <a:spcBef>
+                <a:spcPct val="0"/>
+              </a:spcBef>
+              <a:spcAft>
+                <a:spcPts val="0"/>
+              </a:spcAft>
+              <a:buNone/>
+              <a:defRPr/>
+            </a:pPr>
+            <a:r>
+              <a:rPr xmlns:mc="http://schemas.openxmlformats.org/markup-compatibility/2006" xmlns:hp="http://schemas.haansoft.com/office/presentation/8.0" kumimoji="0" lang="en-US" altLang="ko-KR" sz="1800" b="1" i="0" u="none" strike="noStrike" kern="1200" cap="none" spc="0" normalizeH="0" baseline="0" mc:Ignorable="hp" hp:hslEmbossed="0">
+                <a:solidFill>
+                  <a:srgbClr val="ffffff"/>
+                </a:solidFill>
+                <a:latin typeface="Calibri"/>
+                <a:ea typeface="맑은 고딕"/>
+                <a:cs typeface="Times New Roman"/>
+              </a:rPr>
+              <a:t>35</a:t>
+            </a:r>
+            <a:endParaRPr xmlns:mc="http://schemas.openxmlformats.org/markup-compatibility/2006" xmlns:hp="http://schemas.haansoft.com/office/presentation/8.0" kumimoji="0" lang="en-US" altLang="ko-KR" sz="1800" b="1" i="0" u="none" strike="noStrike" kern="1200" cap="none" spc="0" normalizeH="0" baseline="0" mc:Ignorable="hp" hp:hslEmbossed="0">
+              <a:solidFill>
+                <a:srgbClr val="ffffff"/>
+              </a:solidFill>
+              <a:latin typeface="Calibri"/>
+              <a:ea typeface="맑은 고딕"/>
+              <a:cs typeface="Times New Roman"/>
+            </a:endParaRPr>
+          </a:p>
+        </p:txBody>
+      </p:sp>
+      <p:sp>
+        <p:nvSpPr>
+          <p:cNvPr id="45" name=""/>
+          <p:cNvSpPr/>
+          <p:nvPr/>
+        </p:nvSpPr>
+        <p:spPr>
+          <a:xfrm>
+            <a:off x="7916393" y="5120001"/>
+            <a:ext cx="481198" cy="365413"/>
+          </a:xfrm>
+          <a:prstGeom prst="rect">
+            <a:avLst/>
+          </a:prstGeom>
+          <a:solidFill>
+            <a:srgbClr val="6182d6">
+              <a:alpha val="100000"/>
+            </a:srgbClr>
+          </a:solidFill>
+          <a:ln w="19050" cap="flat" cmpd="sng" algn="ctr">
+            <a:solidFill>
+              <a:srgbClr val="2e3e67">
+                <a:alpha val="100000"/>
+              </a:srgbClr>
+            </a:solidFill>
+            <a:prstDash val="solid"/>
+          </a:ln>
+        </p:spPr>
+        <p:txBody>
+          <a:bodyPr anchor="ctr"/>
+          <a:p>
+            <a:pPr marL="0" indent="0" algn="ctr" defTabSz="914400" rtl="0" eaLnBrk="1" latinLnBrk="1" hangingPunct="1">
+              <a:lnSpc>
+                <a:spcPct val="100000"/>
+              </a:lnSpc>
+              <a:spcBef>
+                <a:spcPct val="0"/>
+              </a:spcBef>
+              <a:spcAft>
+                <a:spcPts val="0"/>
+              </a:spcAft>
+              <a:buNone/>
+              <a:defRPr/>
+            </a:pPr>
+            <a:r>
+              <a:rPr xmlns:mc="http://schemas.openxmlformats.org/markup-compatibility/2006" xmlns:hp="http://schemas.haansoft.com/office/presentation/8.0" kumimoji="0" lang="en-US" altLang="ko-KR" sz="1800" b="1" i="0" u="none" strike="noStrike" kern="1200" cap="none" spc="0" normalizeH="0" baseline="0" mc:Ignorable="hp" hp:hslEmbossed="0">
+                <a:solidFill>
+                  <a:srgbClr val="ffffff"/>
+                </a:solidFill>
+                <a:latin typeface="Calibri"/>
+                <a:ea typeface="맑은 고딕"/>
+                <a:cs typeface="Times New Roman"/>
+              </a:rPr>
+              <a:t>40</a:t>
+            </a:r>
+            <a:endParaRPr xmlns:mc="http://schemas.openxmlformats.org/markup-compatibility/2006" xmlns:hp="http://schemas.haansoft.com/office/presentation/8.0" kumimoji="0" lang="en-US" altLang="ko-KR" sz="1800" b="1" i="0" u="none" strike="noStrike" kern="1200" cap="none" spc="0" normalizeH="0" baseline="0" mc:Ignorable="hp" hp:hslEmbossed="0">
+              <a:solidFill>
+                <a:srgbClr val="ffffff"/>
+              </a:solidFill>
+              <a:latin typeface="Calibri"/>
+              <a:ea typeface="맑은 고딕"/>
+              <a:cs typeface="Times New Roman"/>
+            </a:endParaRPr>
+          </a:p>
+        </p:txBody>
+      </p:sp>
+      <p:sp>
+        <p:nvSpPr>
+          <p:cNvPr id="46" name=""/>
+          <p:cNvSpPr/>
+          <p:nvPr/>
+        </p:nvSpPr>
+        <p:spPr>
+          <a:xfrm>
+            <a:off x="9721086" y="5119984"/>
+            <a:ext cx="481198" cy="365413"/>
+          </a:xfrm>
+          <a:prstGeom prst="rect">
+            <a:avLst/>
+          </a:prstGeom>
+          <a:solidFill>
+            <a:srgbClr val="6182d6">
+              <a:alpha val="100000"/>
+            </a:srgbClr>
+          </a:solidFill>
+          <a:ln w="19050" cap="flat" cmpd="sng" algn="ctr">
+            <a:solidFill>
+              <a:srgbClr val="2e3e67">
+                <a:alpha val="100000"/>
+              </a:srgbClr>
+            </a:solidFill>
+            <a:prstDash val="solid"/>
+          </a:ln>
+        </p:spPr>
+        <p:txBody>
+          <a:bodyPr anchor="ctr"/>
+          <a:p>
+            <a:pPr marL="0" indent="0" algn="ctr" defTabSz="914400" rtl="0" eaLnBrk="1" latinLnBrk="1" hangingPunct="1">
+              <a:lnSpc>
+                <a:spcPct val="100000"/>
+              </a:lnSpc>
+              <a:spcBef>
+                <a:spcPct val="0"/>
+              </a:spcBef>
+              <a:spcAft>
+                <a:spcPts val="0"/>
+              </a:spcAft>
+              <a:buNone/>
+              <a:defRPr/>
+            </a:pPr>
+            <a:r>
+              <a:rPr xmlns:mc="http://schemas.openxmlformats.org/markup-compatibility/2006" xmlns:hp="http://schemas.haansoft.com/office/presentation/8.0" kumimoji="0" lang="en-US" altLang="ko-KR" sz="1800" b="1" i="0" u="none" strike="noStrike" kern="1200" cap="none" spc="0" normalizeH="0" baseline="0" mc:Ignorable="hp" hp:hslEmbossed="0">
+                <a:solidFill>
+                  <a:srgbClr val="ffffff"/>
+                </a:solidFill>
+                <a:latin typeface="Calibri"/>
+                <a:ea typeface="맑은 고딕"/>
+                <a:cs typeface="Times New Roman"/>
+              </a:rPr>
+              <a:t>55</a:t>
+            </a:r>
+            <a:endParaRPr xmlns:mc="http://schemas.openxmlformats.org/markup-compatibility/2006" xmlns:hp="http://schemas.haansoft.com/office/presentation/8.0" kumimoji="0" lang="en-US" altLang="ko-KR" sz="1800" b="1" i="0" u="none" strike="noStrike" kern="1200" cap="none" spc="0" normalizeH="0" baseline="0" mc:Ignorable="hp" hp:hslEmbossed="0">
+              <a:solidFill>
+                <a:srgbClr val="ffffff"/>
+              </a:solidFill>
+              <a:latin typeface="Calibri"/>
+              <a:ea typeface="맑은 고딕"/>
+              <a:cs typeface="Times New Roman"/>
+            </a:endParaRPr>
+          </a:p>
+        </p:txBody>
+      </p:sp>
+      <p:sp>
+        <p:nvSpPr>
+          <p:cNvPr id="47" name=""/>
+          <p:cNvSpPr/>
+          <p:nvPr/>
+        </p:nvSpPr>
+        <p:spPr>
+          <a:xfrm>
+            <a:off x="10557246" y="5119983"/>
+            <a:ext cx="481198" cy="365413"/>
+          </a:xfrm>
+          <a:prstGeom prst="rect">
+            <a:avLst/>
+          </a:prstGeom>
+          <a:solidFill>
+            <a:srgbClr val="6182d6">
+              <a:alpha val="100000"/>
+            </a:srgbClr>
+          </a:solidFill>
+          <a:ln w="19050" cap="flat" cmpd="sng" algn="ctr">
+            <a:solidFill>
+              <a:srgbClr val="2e3e67">
+                <a:alpha val="100000"/>
+              </a:srgbClr>
+            </a:solidFill>
+            <a:prstDash val="solid"/>
+          </a:ln>
+        </p:spPr>
+        <p:txBody>
+          <a:bodyPr anchor="ctr"/>
+          <a:p>
+            <a:pPr marL="0" indent="0" algn="ctr" defTabSz="914400" rtl="0" eaLnBrk="1" latinLnBrk="1" hangingPunct="1">
+              <a:lnSpc>
+                <a:spcPct val="100000"/>
+              </a:lnSpc>
+              <a:spcBef>
+                <a:spcPct val="0"/>
+              </a:spcBef>
+              <a:spcAft>
+                <a:spcPts val="0"/>
+              </a:spcAft>
+              <a:buNone/>
+              <a:defRPr/>
+            </a:pPr>
+            <a:r>
+              <a:rPr xmlns:mc="http://schemas.openxmlformats.org/markup-compatibility/2006" xmlns:hp="http://schemas.haansoft.com/office/presentation/8.0" kumimoji="0" lang="en-US" altLang="ko-KR" sz="1800" b="1" i="0" u="none" strike="noStrike" kern="1200" cap="none" spc="0" normalizeH="0" baseline="0" mc:Ignorable="hp" hp:hslEmbossed="0">
+                <a:solidFill>
+                  <a:srgbClr val="ffffff"/>
+                </a:solidFill>
+                <a:latin typeface="Calibri"/>
+                <a:ea typeface="맑은 고딕"/>
+                <a:cs typeface="Times New Roman"/>
+              </a:rPr>
+              <a:t>60</a:t>
+            </a:r>
+            <a:endParaRPr xmlns:mc="http://schemas.openxmlformats.org/markup-compatibility/2006" xmlns:hp="http://schemas.haansoft.com/office/presentation/8.0" kumimoji="0" lang="en-US" altLang="ko-KR" sz="1800" b="1" i="0" u="none" strike="noStrike" kern="1200" cap="none" spc="0" normalizeH="0" baseline="0" mc:Ignorable="hp" hp:hslEmbossed="0">
+              <a:solidFill>
+                <a:srgbClr val="ffffff"/>
+              </a:solidFill>
+              <a:latin typeface="Calibri"/>
+              <a:ea typeface="맑은 고딕"/>
+              <a:cs typeface="Times New Roman"/>
+            </a:endParaRPr>
+          </a:p>
+        </p:txBody>
+      </p:sp>
+      <p:sp>
+        <p:nvSpPr>
+          <p:cNvPr id="48" name=""/>
+          <p:cNvSpPr/>
+          <p:nvPr/>
+        </p:nvSpPr>
+        <p:spPr>
+          <a:xfrm>
+            <a:off x="11038445" y="5119983"/>
+            <a:ext cx="481198" cy="365413"/>
+          </a:xfrm>
+          <a:prstGeom prst="rect">
+            <a:avLst/>
+          </a:prstGeom>
+          <a:solidFill>
+            <a:srgbClr val="6182d6">
+              <a:alpha val="100000"/>
+            </a:srgbClr>
+          </a:solidFill>
+          <a:ln w="19050" cap="flat" cmpd="sng" algn="ctr">
+            <a:solidFill>
+              <a:srgbClr val="2e3e67">
+                <a:alpha val="100000"/>
+              </a:srgbClr>
+            </a:solidFill>
+            <a:prstDash val="solid"/>
+          </a:ln>
+        </p:spPr>
+        <p:txBody>
+          <a:bodyPr anchor="ctr"/>
+          <a:p>
+            <a:pPr marL="0" indent="0" algn="ctr" defTabSz="914400" rtl="0" eaLnBrk="1" latinLnBrk="1" hangingPunct="1">
+              <a:lnSpc>
+                <a:spcPct val="100000"/>
+              </a:lnSpc>
+              <a:spcBef>
+                <a:spcPct val="0"/>
+              </a:spcBef>
+              <a:spcAft>
+                <a:spcPts val="0"/>
+              </a:spcAft>
+              <a:buNone/>
+              <a:defRPr/>
+            </a:pPr>
+            <a:r>
+              <a:rPr xmlns:mc="http://schemas.openxmlformats.org/markup-compatibility/2006" xmlns:hp="http://schemas.haansoft.com/office/presentation/8.0" kumimoji="0" lang="en-US" altLang="ko-KR" sz="1800" b="1" i="0" u="none" strike="noStrike" kern="1200" cap="none" spc="0" normalizeH="0" baseline="0" mc:Ignorable="hp" hp:hslEmbossed="0">
+                <a:solidFill>
+                  <a:srgbClr val="ffffff"/>
+                </a:solidFill>
+                <a:latin typeface="Calibri"/>
+                <a:ea typeface="맑은 고딕"/>
+                <a:cs typeface="Times New Roman"/>
+              </a:rPr>
+              <a:t>65</a:t>
+            </a:r>
+            <a:endParaRPr xmlns:mc="http://schemas.openxmlformats.org/markup-compatibility/2006" xmlns:hp="http://schemas.haansoft.com/office/presentation/8.0" kumimoji="0" lang="en-US" altLang="ko-KR" sz="1800" b="1" i="0" u="none" strike="noStrike" kern="1200" cap="none" spc="0" normalizeH="0" baseline="0" mc:Ignorable="hp" hp:hslEmbossed="0">
+              <a:solidFill>
+                <a:srgbClr val="ffffff"/>
+              </a:solidFill>
+              <a:latin typeface="Calibri"/>
+              <a:ea typeface="맑은 고딕"/>
+              <a:cs typeface="Times New Roman"/>
+            </a:endParaRPr>
+          </a:p>
+        </p:txBody>
+      </p:sp>
+      <p:sp>
+        <p:nvSpPr>
+          <p:cNvPr id="49" name=""/>
+          <p:cNvSpPr/>
+          <p:nvPr/>
+        </p:nvSpPr>
+        <p:spPr>
+          <a:xfrm>
+            <a:off x="11519643" y="5119983"/>
+            <a:ext cx="481198" cy="365413"/>
+          </a:xfrm>
+          <a:prstGeom prst="rect">
+            <a:avLst/>
+          </a:prstGeom>
+          <a:solidFill>
+            <a:srgbClr val="6182d6">
+              <a:alpha val="100000"/>
+            </a:srgbClr>
+          </a:solidFill>
+          <a:ln w="19050" cap="flat" cmpd="sng" algn="ctr">
+            <a:solidFill>
+              <a:srgbClr val="2e3e67">
+                <a:alpha val="100000"/>
+              </a:srgbClr>
+            </a:solidFill>
+            <a:prstDash val="solid"/>
+          </a:ln>
+        </p:spPr>
+        <p:txBody>
+          <a:bodyPr anchor="ctr"/>
+          <a:p>
+            <a:pPr marL="0" indent="0" algn="ctr" defTabSz="914400" rtl="0" eaLnBrk="1" latinLnBrk="1" hangingPunct="1">
+              <a:lnSpc>
+                <a:spcPct val="100000"/>
+              </a:lnSpc>
+              <a:spcBef>
+                <a:spcPct val="0"/>
+              </a:spcBef>
+              <a:spcAft>
+                <a:spcPts val="0"/>
+              </a:spcAft>
+              <a:buNone/>
+              <a:defRPr/>
+            </a:pPr>
+            <a:r>
+              <a:rPr xmlns:mc="http://schemas.openxmlformats.org/markup-compatibility/2006" xmlns:hp="http://schemas.haansoft.com/office/presentation/8.0" kumimoji="0" lang="en-US" altLang="ko-KR" sz="1800" b="1" i="0" u="none" strike="noStrike" kern="1200" cap="none" spc="0" normalizeH="0" baseline="0" mc:Ignorable="hp" hp:hslEmbossed="0">
+                <a:solidFill>
+                  <a:srgbClr val="ffffff"/>
+                </a:solidFill>
+                <a:latin typeface="Calibri"/>
+                <a:ea typeface="맑은 고딕"/>
+                <a:cs typeface="Times New Roman"/>
+              </a:rPr>
+              <a:t>70</a:t>
+            </a:r>
+            <a:endParaRPr xmlns:mc="http://schemas.openxmlformats.org/markup-compatibility/2006" xmlns:hp="http://schemas.haansoft.com/office/presentation/8.0" kumimoji="0" lang="en-US" altLang="ko-KR" sz="1800" b="1" i="0" u="none" strike="noStrike" kern="1200" cap="none" spc="0" normalizeH="0" baseline="0" mc:Ignorable="hp" hp:hslEmbossed="0">
+              <a:solidFill>
+                <a:srgbClr val="ffffff"/>
+              </a:solidFill>
+              <a:latin typeface="Calibri"/>
+              <a:ea typeface="맑은 고딕"/>
+              <a:cs typeface="Times New Roman"/>
+            </a:endParaRPr>
+          </a:p>
+        </p:txBody>
+      </p:sp>
+      <p:cxnSp>
+        <p:nvCxnSpPr>
+          <p:cNvPr id="50" name=""/>
+          <p:cNvCxnSpPr/>
+          <p:nvPr/>
+        </p:nvCxnSpPr>
+        <p:spPr>
+          <a:xfrm rot="10800000" flipV="1">
+            <a:off x="1313745" y="4466101"/>
+            <a:ext cx="1145804" cy="653882"/>
+          </a:xfrm>
+          <a:prstGeom prst="line">
+            <a:avLst/>
+          </a:prstGeom>
+          <a:noFill/>
+          <a:ln w="28575" cap="flat" cmpd="sng" algn="ctr">
+            <a:solidFill>
+              <a:srgbClr val="000000">
+                <a:alpha val="100000"/>
+              </a:srgbClr>
+            </a:solidFill>
+            <a:prstDash val="solid"/>
+          </a:ln>
+        </p:spPr>
+      </p:cxnSp>
+      <p:cxnSp>
+        <p:nvCxnSpPr>
+          <p:cNvPr id="51" name=""/>
+          <p:cNvCxnSpPr>
+            <a:endCxn id="38" idx="0"/>
+          </p:cNvCxnSpPr>
+          <p:nvPr/>
+        </p:nvCxnSpPr>
+        <p:spPr>
+          <a:xfrm rot="5400000">
+            <a:off x="2401792" y="4581048"/>
+            <a:ext cx="653900" cy="424005"/>
+          </a:xfrm>
+          <a:prstGeom prst="line">
+            <a:avLst/>
+          </a:prstGeom>
+          <a:noFill/>
+          <a:ln w="28575" cap="flat" cmpd="sng" algn="ctr">
+            <a:solidFill>
+              <a:srgbClr val="000000">
+                <a:alpha val="100000"/>
+              </a:srgbClr>
+            </a:solidFill>
+            <a:prstDash val="solid"/>
+          </a:ln>
+        </p:spPr>
+      </p:cxnSp>
+      <p:cxnSp>
+        <p:nvCxnSpPr>
+          <p:cNvPr id="52" name=""/>
+          <p:cNvCxnSpPr>
+            <a:endCxn id="42" idx="0"/>
+          </p:cNvCxnSpPr>
+          <p:nvPr/>
+        </p:nvCxnSpPr>
+        <p:spPr>
+          <a:xfrm rot="10800000" flipV="1">
+            <a:off x="6267345" y="4466100"/>
+            <a:ext cx="1520897" cy="653883"/>
+          </a:xfrm>
+          <a:prstGeom prst="line">
+            <a:avLst/>
+          </a:prstGeom>
+          <a:noFill/>
+          <a:ln w="28575" cap="flat" cmpd="sng" algn="ctr">
+            <a:solidFill>
+              <a:srgbClr val="000000">
+                <a:alpha val="100000"/>
+              </a:srgbClr>
+            </a:solidFill>
+            <a:prstDash val="solid"/>
+          </a:ln>
+        </p:spPr>
+      </p:cxnSp>
+      <p:cxnSp>
+        <p:nvCxnSpPr>
+          <p:cNvPr id="53" name=""/>
+          <p:cNvCxnSpPr/>
+          <p:nvPr/>
+        </p:nvCxnSpPr>
+        <p:spPr>
+          <a:xfrm>
+            <a:off x="8750638" y="4466100"/>
+            <a:ext cx="970446" cy="653901"/>
+          </a:xfrm>
+          <a:prstGeom prst="line">
+            <a:avLst/>
+          </a:prstGeom>
+          <a:noFill/>
+          <a:ln w="28575" cap="flat" cmpd="sng" algn="ctr">
+            <a:solidFill>
+              <a:srgbClr val="000000">
+                <a:alpha val="100000"/>
+              </a:srgbClr>
+            </a:solidFill>
+            <a:prstDash val="solid"/>
+          </a:ln>
+        </p:spPr>
+      </p:cxnSp>
+      <p:sp>
+        <p:nvSpPr>
+          <p:cNvPr id="54" name=""/>
+          <p:cNvSpPr/>
+          <p:nvPr/>
+        </p:nvSpPr>
+        <p:spPr>
+          <a:xfrm>
+            <a:off x="8397592" y="5119984"/>
+            <a:ext cx="481198" cy="365413"/>
+          </a:xfrm>
+          <a:prstGeom prst="rect">
+            <a:avLst/>
+          </a:prstGeom>
+          <a:solidFill>
+            <a:srgbClr val="6182d6">
+              <a:alpha val="100000"/>
+            </a:srgbClr>
+          </a:solidFill>
+          <a:ln w="19050" cap="flat" cmpd="sng" algn="ctr">
+            <a:solidFill>
+              <a:srgbClr val="2e3e67">
+                <a:alpha val="100000"/>
+              </a:srgbClr>
+            </a:solidFill>
+            <a:prstDash val="solid"/>
+            <a:headEnd w="med" len="med"/>
+            <a:tailEnd w="med" len="med"/>
+          </a:ln>
+        </p:spPr>
+        <p:txBody>
+          <a:bodyPr anchor="ctr"/>
+          <a:p>
+            <a:pPr marL="0" indent="0" algn="ctr" defTabSz="914400" rtl="0" eaLnBrk="1" latinLnBrk="1" hangingPunct="1">
+              <a:lnSpc>
+                <a:spcPct val="100000"/>
+              </a:lnSpc>
+              <a:spcBef>
+                <a:spcPct val="0"/>
+              </a:spcBef>
+              <a:spcAft>
+                <a:spcPts val="0"/>
+              </a:spcAft>
+              <a:buNone/>
+              <a:defRPr/>
+            </a:pPr>
+            <a:r>
+              <a:rPr xmlns:mc="http://schemas.openxmlformats.org/markup-compatibility/2006" xmlns:hp="http://schemas.haansoft.com/office/presentation/8.0" kumimoji="0" lang="en-US" altLang="ko-KR" sz="1800" b="1" i="0" u="none" strike="noStrike" kern="1200" cap="none" spc="0" normalizeH="0" baseline="0" mc:Ignorable="hp" hp:hslEmbossed="0">
+                <a:solidFill>
+                  <a:srgbClr val="ffffff"/>
+                </a:solidFill>
+                <a:latin typeface="Calibri"/>
+                <a:ea typeface="맑은 고딕"/>
+                <a:cs typeface="Times New Roman"/>
+              </a:rPr>
+              <a:t>45</a:t>
+            </a:r>
+            <a:endParaRPr xmlns:mc="http://schemas.openxmlformats.org/markup-compatibility/2006" xmlns:hp="http://schemas.haansoft.com/office/presentation/8.0" kumimoji="0" lang="en-US" altLang="ko-KR" sz="1800" b="1" i="0" u="none" strike="noStrike" kern="1200" cap="none" spc="0" normalizeH="0" baseline="0" mc:Ignorable="hp" hp:hslEmbossed="0">
+              <a:solidFill>
+                <a:srgbClr val="ffffff"/>
+              </a:solidFill>
+              <a:latin typeface="Calibri"/>
+              <a:ea typeface="맑은 고딕"/>
+              <a:cs typeface="Times New Roman"/>
+            </a:endParaRPr>
+          </a:p>
+        </p:txBody>
+      </p:sp>
+      <p:cxnSp>
+        <p:nvCxnSpPr>
+          <p:cNvPr id="55" name=""/>
+          <p:cNvCxnSpPr>
+            <a:endCxn id="45" idx="0"/>
+          </p:cNvCxnSpPr>
+          <p:nvPr/>
+        </p:nvCxnSpPr>
+        <p:spPr>
+          <a:xfrm rot="5400000">
+            <a:off x="7886266" y="4736826"/>
+            <a:ext cx="653900" cy="112449"/>
+          </a:xfrm>
+          <a:prstGeom prst="line">
+            <a:avLst/>
+          </a:prstGeom>
+          <a:noFill/>
+          <a:ln w="28575" cap="flat" cmpd="sng" algn="ctr">
+            <a:solidFill>
+              <a:srgbClr val="000000">
+                <a:alpha val="100000"/>
+              </a:srgbClr>
+            </a:solidFill>
+            <a:prstDash val="solid"/>
+          </a:ln>
+        </p:spPr>
+      </p:cxnSp>
+      <p:cxnSp>
+        <p:nvCxnSpPr>
+          <p:cNvPr id="56" name=""/>
+          <p:cNvCxnSpPr/>
+          <p:nvPr/>
+        </p:nvCxnSpPr>
+        <p:spPr>
+          <a:xfrm rot="10800000" flipV="1">
+            <a:off x="2940744" y="3729476"/>
+            <a:ext cx="2433458" cy="371172"/>
+          </a:xfrm>
+          <a:prstGeom prst="line">
+            <a:avLst/>
+          </a:prstGeom>
+          <a:noFill/>
+          <a:ln w="28575" cap="flat" cmpd="sng" algn="ctr">
+            <a:solidFill>
+              <a:srgbClr val="000000">
+                <a:alpha val="100000"/>
+              </a:srgbClr>
+            </a:solidFill>
+            <a:prstDash val="solid"/>
+          </a:ln>
+        </p:spPr>
+      </p:cxnSp>
+      <p:cxnSp>
+        <p:nvCxnSpPr>
+          <p:cNvPr id="57" name=""/>
+          <p:cNvCxnSpPr>
+            <a:endCxn id="35" idx="0"/>
+          </p:cNvCxnSpPr>
+          <p:nvPr/>
+        </p:nvCxnSpPr>
+        <p:spPr>
+          <a:xfrm>
+            <a:off x="5855401" y="3729476"/>
+            <a:ext cx="2654639" cy="371194"/>
+          </a:xfrm>
+          <a:prstGeom prst="line">
+            <a:avLst/>
+          </a:prstGeom>
+          <a:noFill/>
+          <a:ln w="28575" cap="flat" cmpd="sng" algn="ctr">
+            <a:solidFill>
+              <a:srgbClr val="000000">
+                <a:alpha val="100000"/>
+              </a:srgbClr>
+            </a:solidFill>
+            <a:prstDash val="solid"/>
+          </a:ln>
+        </p:spPr>
+      </p:cxnSp>
+      <p:sp>
+        <p:nvSpPr>
+          <p:cNvPr id="58" name=""/>
+          <p:cNvSpPr/>
+          <p:nvPr/>
+        </p:nvSpPr>
+        <p:spPr>
+          <a:xfrm>
+            <a:off x="9249413" y="5120001"/>
+            <a:ext cx="481198" cy="365413"/>
+          </a:xfrm>
+          <a:prstGeom prst="rect">
+            <a:avLst/>
+          </a:prstGeom>
+          <a:solidFill>
+            <a:srgbClr val="6182d6">
+              <a:alpha val="100000"/>
+            </a:srgbClr>
+          </a:solidFill>
+          <a:ln w="19050" cap="flat" cmpd="sng" algn="ctr">
+            <a:solidFill>
+              <a:srgbClr val="2e3e67">
+                <a:alpha val="100000"/>
+              </a:srgbClr>
+            </a:solidFill>
+            <a:prstDash val="solid"/>
+          </a:ln>
+        </p:spPr>
+        <p:txBody>
+          <a:bodyPr anchor="ctr"/>
+          <a:p>
+            <a:pPr marL="0" indent="0" algn="ctr" defTabSz="914400" rtl="0" eaLnBrk="1" latinLnBrk="1" hangingPunct="1">
+              <a:lnSpc>
+                <a:spcPct val="100000"/>
+              </a:lnSpc>
+              <a:spcBef>
+                <a:spcPct val="0"/>
+              </a:spcBef>
+              <a:spcAft>
+                <a:spcPts val="0"/>
+              </a:spcAft>
+              <a:buNone/>
+              <a:defRPr/>
+            </a:pPr>
+            <a:r>
+              <a:rPr xmlns:mc="http://schemas.openxmlformats.org/markup-compatibility/2006" xmlns:hp="http://schemas.haansoft.com/office/presentation/8.0" kumimoji="0" lang="en-US" altLang="ko-KR" sz="1800" b="1" i="0" u="none" strike="noStrike" kern="1200" cap="none" spc="0" normalizeH="0" baseline="0" mc:Ignorable="hp" hp:hslEmbossed="0">
+                <a:solidFill>
+                  <a:srgbClr val="ffffff"/>
+                </a:solidFill>
+                <a:latin typeface="Calibri"/>
+                <a:ea typeface="맑은 고딕"/>
+                <a:cs typeface="Times New Roman"/>
+              </a:rPr>
+              <a:t>50</a:t>
+            </a:r>
+            <a:endParaRPr xmlns:mc="http://schemas.openxmlformats.org/markup-compatibility/2006" xmlns:hp="http://schemas.haansoft.com/office/presentation/8.0" kumimoji="0" lang="en-US" altLang="ko-KR" sz="1800" b="1" i="0" u="none" strike="noStrike" kern="1200" cap="none" spc="0" normalizeH="0" baseline="0" mc:Ignorable="hp" hp:hslEmbossed="0">
+              <a:solidFill>
+                <a:srgbClr val="ffffff"/>
+              </a:solidFill>
+              <a:latin typeface="Calibri"/>
+              <a:ea typeface="맑은 고딕"/>
+              <a:cs typeface="Times New Roman"/>
+            </a:endParaRPr>
+          </a:p>
+        </p:txBody>
+      </p:sp>
+      <p:sp>
+        <p:nvSpPr>
+          <p:cNvPr id="59" name=""/>
+          <p:cNvSpPr/>
+          <p:nvPr/>
+        </p:nvSpPr>
+        <p:spPr>
+          <a:xfrm>
+            <a:off x="8758688" y="4100651"/>
+            <a:ext cx="481198" cy="365413"/>
+          </a:xfrm>
+          <a:prstGeom prst="rect">
+            <a:avLst/>
+          </a:prstGeom>
+          <a:ln>
+            <a:headEnd w="med" len="med"/>
+            <a:tailEnd w="med" len="med"/>
+          </a:ln>
+        </p:spPr>
+        <p:style>
+          <a:lnRef idx="2">
+            <a:schemeClr val="accent2">
+              <a:shade val="20000"/>
+            </a:schemeClr>
+          </a:lnRef>
+          <a:fillRef idx="1">
+            <a:schemeClr val="accent2"/>
+          </a:fillRef>
+          <a:effectRef idx="0">
+            <a:schemeClr val="accent2"/>
+          </a:effectRef>
+          <a:fontRef idx="minor">
+            <a:schemeClr val="lt1"/>
+          </a:fontRef>
+        </p:style>
+        <p:txBody>
+          <a:bodyPr anchor="ctr"/>
+          <a:p>
+            <a:pPr marL="0" indent="0" algn="ctr" defTabSz="914400" rtl="0" eaLnBrk="1" latinLnBrk="1" hangingPunct="1">
+              <a:lnSpc>
+                <a:spcPct val="100000"/>
+              </a:lnSpc>
+              <a:spcBef>
+                <a:spcPct val="0"/>
+              </a:spcBef>
+              <a:spcAft>
+                <a:spcPts val="0"/>
+              </a:spcAft>
+              <a:buNone/>
+              <a:defRPr/>
+            </a:pPr>
+            <a:r>
+              <a:rPr xmlns:mc="http://schemas.openxmlformats.org/markup-compatibility/2006" xmlns:hp="http://schemas.haansoft.com/office/presentation/8.0" kumimoji="0" lang="en-US" altLang="ko-KR" sz="1800" b="1" i="0" u="none" strike="noStrike" kern="1200" cap="none" spc="0" normalizeH="0" baseline="0" mc:Ignorable="hp" hp:hslEmbossed="0">
+                <a:solidFill>
+                  <a:srgbClr val="ffffff"/>
+                </a:solidFill>
+                <a:latin typeface="Calibri"/>
+                <a:ea typeface="맑은 고딕"/>
+                <a:cs typeface="Times New Roman"/>
+              </a:rPr>
+              <a:t>60</a:t>
+            </a:r>
+            <a:endParaRPr xmlns:mc="http://schemas.openxmlformats.org/markup-compatibility/2006" xmlns:hp="http://schemas.haansoft.com/office/presentation/8.0" kumimoji="0" lang="en-US" altLang="ko-KR" sz="1800" b="1" i="0" u="none" strike="noStrike" kern="1200" cap="none" spc="0" normalizeH="0" baseline="0" mc:Ignorable="hp" hp:hslEmbossed="0">
+              <a:solidFill>
+                <a:srgbClr val="ffffff"/>
+              </a:solidFill>
+              <a:latin typeface="Calibri"/>
+              <a:ea typeface="맑은 고딕"/>
+              <a:cs typeface="Times New Roman"/>
+            </a:endParaRPr>
+          </a:p>
+        </p:txBody>
+      </p:sp>
+      <p:sp>
+        <p:nvSpPr>
+          <p:cNvPr id="62" name=""/>
+          <p:cNvSpPr/>
+          <p:nvPr/>
+        </p:nvSpPr>
+        <p:spPr>
+          <a:xfrm>
+            <a:off x="7435195" y="5120001"/>
+            <a:ext cx="481198" cy="365413"/>
+          </a:xfrm>
+          <a:prstGeom prst="rect">
+            <a:avLst/>
+          </a:prstGeom>
+          <a:solidFill>
+            <a:srgbClr val="6182d6">
+              <a:alpha val="100000"/>
+            </a:srgbClr>
+          </a:solidFill>
+          <a:ln w="19050" cap="flat" cmpd="sng" algn="ctr">
+            <a:solidFill>
+              <a:srgbClr val="2e3e67">
+                <a:alpha val="100000"/>
+              </a:srgbClr>
+            </a:solidFill>
+            <a:prstDash val="solid"/>
+          </a:ln>
+        </p:spPr>
+        <p:txBody>
+          <a:bodyPr anchor="ctr"/>
+          <a:p>
+            <a:pPr marL="0" indent="0" algn="ctr" defTabSz="914400" rtl="0" eaLnBrk="1" latinLnBrk="1" hangingPunct="1">
+              <a:lnSpc>
+                <a:spcPct val="100000"/>
+              </a:lnSpc>
+              <a:spcBef>
+                <a:spcPct val="0"/>
+              </a:spcBef>
+              <a:spcAft>
+                <a:spcPts val="0"/>
+              </a:spcAft>
+              <a:buNone/>
+              <a:defRPr/>
+            </a:pPr>
+            <a:r>
+              <a:rPr xmlns:mc="http://schemas.openxmlformats.org/markup-compatibility/2006" xmlns:hp="http://schemas.haansoft.com/office/presentation/8.0" kumimoji="0" lang="en-US" altLang="ko-KR" sz="1800" b="1" i="0" u="none" strike="noStrike" kern="1200" cap="none" spc="0" normalizeH="0" baseline="0" mc:Ignorable="hp" hp:hslEmbossed="0">
+                <a:solidFill>
+                  <a:srgbClr val="ffffff"/>
+                </a:solidFill>
+                <a:latin typeface="Calibri"/>
+                <a:ea typeface="맑은 고딕"/>
+                <a:cs typeface="Times New Roman"/>
+              </a:rPr>
+              <a:t>35</a:t>
+            </a:r>
+            <a:endParaRPr xmlns:mc="http://schemas.openxmlformats.org/markup-compatibility/2006" xmlns:hp="http://schemas.haansoft.com/office/presentation/8.0" kumimoji="0" lang="en-US" altLang="ko-KR" sz="1800" b="1" i="0" u="none" strike="noStrike" kern="1200" cap="none" spc="0" normalizeH="0" baseline="0" mc:Ignorable="hp" hp:hslEmbossed="0">
+              <a:solidFill>
+                <a:srgbClr val="ffffff"/>
+              </a:solidFill>
+              <a:latin typeface="Calibri"/>
+              <a:ea typeface="맑은 고딕"/>
+              <a:cs typeface="Times New Roman"/>
+            </a:endParaRPr>
+          </a:p>
+        </p:txBody>
+      </p:sp>
+      <p:cxnSp>
+        <p:nvCxnSpPr>
+          <p:cNvPr id="63" name=""/>
+          <p:cNvCxnSpPr>
+            <a:endCxn id="48" idx="0"/>
+          </p:cNvCxnSpPr>
+          <p:nvPr/>
+        </p:nvCxnSpPr>
+        <p:spPr>
+          <a:xfrm>
+            <a:off x="9239886" y="4466101"/>
+            <a:ext cx="2039158" cy="653882"/>
+          </a:xfrm>
+          <a:prstGeom prst="line">
+            <a:avLst/>
+          </a:prstGeom>
+          <a:noFill/>
+          <a:ln w="28575" cap="flat" cmpd="sng" algn="ctr">
+            <a:solidFill>
+              <a:srgbClr val="000000">
+                <a:alpha val="100000"/>
+              </a:srgbClr>
+            </a:solidFill>
+            <a:prstDash val="solid"/>
+          </a:ln>
+        </p:spPr>
+      </p:cxnSp>
+      <p:sp>
+        <p:nvSpPr>
+          <p:cNvPr id="65" name=""/>
+          <p:cNvSpPr/>
+          <p:nvPr/>
+        </p:nvSpPr>
+        <p:spPr>
+          <a:xfrm>
+            <a:off x="5545551" y="5119983"/>
+            <a:ext cx="481198" cy="365413"/>
+          </a:xfrm>
+          <a:prstGeom prst="rect">
+            <a:avLst/>
+          </a:prstGeom>
+          <a:solidFill>
+            <a:srgbClr val="6182d6">
+              <a:alpha val="100000"/>
+            </a:srgbClr>
+          </a:solidFill>
+          <a:ln w="19050" cap="flat" cmpd="sng" algn="ctr">
+            <a:solidFill>
+              <a:srgbClr val="2e3e67">
+                <a:alpha val="100000"/>
+              </a:srgbClr>
+            </a:solidFill>
+            <a:prstDash val="solid"/>
+            <a:headEnd w="med" len="med"/>
+            <a:tailEnd w="med" len="med"/>
+          </a:ln>
+        </p:spPr>
+        <p:txBody>
+          <a:bodyPr anchor="ctr"/>
+          <a:p>
+            <a:pPr marL="0" indent="0" algn="ctr" defTabSz="914400" rtl="0" eaLnBrk="1" latinLnBrk="1" hangingPunct="1">
+              <a:lnSpc>
+                <a:spcPct val="100000"/>
+              </a:lnSpc>
+              <a:spcBef>
+                <a:spcPct val="0"/>
+              </a:spcBef>
+              <a:spcAft>
+                <a:spcPts val="0"/>
+              </a:spcAft>
+              <a:buNone/>
+              <a:defRPr/>
+            </a:pPr>
+            <a:r>
+              <a:rPr xmlns:mc="http://schemas.openxmlformats.org/markup-compatibility/2006" xmlns:hp="http://schemas.haansoft.com/office/presentation/8.0" kumimoji="0" lang="en-US" altLang="ko-KR" sz="1800" b="1" i="0" u="none" strike="noStrike" kern="1200" cap="none" spc="0" normalizeH="0" baseline="0" mc:Ignorable="hp" hp:hslEmbossed="0">
+                <a:solidFill>
+                  <a:srgbClr val="ffffff"/>
+                </a:solidFill>
+                <a:latin typeface="Calibri"/>
+                <a:ea typeface="맑은 고딕"/>
+                <a:cs typeface="Times New Roman"/>
+              </a:rPr>
+              <a:t>20</a:t>
+            </a:r>
+            <a:endParaRPr xmlns:mc="http://schemas.openxmlformats.org/markup-compatibility/2006" xmlns:hp="http://schemas.haansoft.com/office/presentation/8.0" kumimoji="0" lang="en-US" altLang="ko-KR" sz="1800" b="1" i="0" u="none" strike="noStrike" kern="1200" cap="none" spc="0" normalizeH="0" baseline="0" mc:Ignorable="hp" hp:hslEmbossed="0">
+              <a:solidFill>
+                <a:srgbClr val="ffffff"/>
+              </a:solidFill>
+              <a:latin typeface="Calibri"/>
+              <a:ea typeface="맑은 고딕"/>
+              <a:cs typeface="Times New Roman"/>
+            </a:endParaRPr>
+          </a:p>
+        </p:txBody>
+      </p:sp>
+      <p:sp>
+        <p:nvSpPr>
+          <p:cNvPr id="68" name=""/>
+          <p:cNvSpPr/>
+          <p:nvPr/>
+        </p:nvSpPr>
+        <p:spPr>
+          <a:xfrm>
+            <a:off x="3676276" y="5120001"/>
+            <a:ext cx="481198" cy="365413"/>
+          </a:xfrm>
+          <a:prstGeom prst="rect">
+            <a:avLst/>
+          </a:prstGeom>
+          <a:solidFill>
+            <a:srgbClr val="6182d6">
+              <a:alpha val="100000"/>
+            </a:srgbClr>
+          </a:solidFill>
+          <a:ln w="19050" cap="flat" cmpd="sng" algn="ctr">
+            <a:solidFill>
+              <a:srgbClr val="2e3e67">
+                <a:alpha val="100000"/>
+              </a:srgbClr>
+            </a:solidFill>
+            <a:prstDash val="solid"/>
+          </a:ln>
+        </p:spPr>
+        <p:txBody>
+          <a:bodyPr anchor="ctr"/>
+          <a:p>
+            <a:pPr marL="0" indent="0" algn="ctr" defTabSz="914400" rtl="0" eaLnBrk="1" latinLnBrk="1" hangingPunct="1">
+              <a:lnSpc>
+                <a:spcPct val="100000"/>
+              </a:lnSpc>
+              <a:spcBef>
+                <a:spcPct val="0"/>
+              </a:spcBef>
+              <a:spcAft>
+                <a:spcPts val="0"/>
+              </a:spcAft>
+              <a:buNone/>
+              <a:defRPr/>
+            </a:pPr>
+            <a:r>
+              <a:rPr xmlns:mc="http://schemas.openxmlformats.org/markup-compatibility/2006" xmlns:hp="http://schemas.haansoft.com/office/presentation/8.0" kumimoji="0" lang="en-US" altLang="ko-KR" sz="1800" b="1" i="0" u="none" strike="noStrike" kern="1200" cap="none" spc="0" normalizeH="0" baseline="0" mc:Ignorable="hp" hp:hslEmbossed="0">
+                <a:solidFill>
+                  <a:srgbClr val="ffffff"/>
+                </a:solidFill>
+                <a:latin typeface="Calibri"/>
+                <a:ea typeface="맑은 고딕"/>
+                <a:cs typeface="Times New Roman"/>
+              </a:rPr>
+              <a:t>12</a:t>
+            </a:r>
+            <a:endParaRPr xmlns:mc="http://schemas.openxmlformats.org/markup-compatibility/2006" xmlns:hp="http://schemas.haansoft.com/office/presentation/8.0" kumimoji="0" lang="en-US" altLang="ko-KR" sz="1800" b="1" i="0" u="none" strike="noStrike" kern="1200" cap="none" spc="0" normalizeH="0" baseline="0" mc:Ignorable="hp" hp:hslEmbossed="0">
+              <a:solidFill>
+                <a:srgbClr val="ffffff"/>
+              </a:solidFill>
+              <a:latin typeface="Calibri"/>
+              <a:ea typeface="맑은 고딕"/>
+              <a:cs typeface="Times New Roman"/>
+            </a:endParaRPr>
+          </a:p>
+        </p:txBody>
+      </p:sp>
+      <p:sp>
+        <p:nvSpPr>
+          <p:cNvPr id="69" name=""/>
+          <p:cNvSpPr/>
+          <p:nvPr/>
+        </p:nvSpPr>
+        <p:spPr>
+          <a:xfrm>
+            <a:off x="1794943" y="5119983"/>
+            <a:ext cx="481198" cy="365413"/>
+          </a:xfrm>
+          <a:prstGeom prst="rect">
+            <a:avLst/>
+          </a:prstGeom>
+          <a:ln>
+            <a:headEnd w="med" len="med"/>
+            <a:tailEnd w="med" len="med"/>
+          </a:ln>
+        </p:spPr>
+        <p:style>
+          <a:lnRef idx="2">
+            <a:schemeClr val="accent1">
+              <a:shade val="20000"/>
+            </a:schemeClr>
+          </a:lnRef>
+          <a:fillRef idx="1">
+            <a:schemeClr val="accent1"/>
+          </a:fillRef>
+          <a:effectRef idx="0">
+            <a:schemeClr val="accent1"/>
+          </a:effectRef>
+          <a:fontRef idx="minor">
+            <a:schemeClr val="lt1"/>
+          </a:fontRef>
+        </p:style>
+        <p:txBody>
+          <a:bodyPr anchor="ctr"/>
+          <a:p>
+            <a:pPr marL="0" indent="0" algn="ctr" defTabSz="914400" rtl="0" eaLnBrk="1" latinLnBrk="1" hangingPunct="1">
+              <a:lnSpc>
+                <a:spcPct val="100000"/>
+              </a:lnSpc>
+              <a:spcBef>
+                <a:spcPct val="0"/>
+              </a:spcBef>
+              <a:spcAft>
+                <a:spcPts val="0"/>
+              </a:spcAft>
+              <a:buNone/>
+              <a:defRPr/>
+            </a:pPr>
+            <a:r>
+              <a:rPr xmlns:mc="http://schemas.openxmlformats.org/markup-compatibility/2006" xmlns:hp="http://schemas.haansoft.com/office/presentation/8.0" kumimoji="0" lang="en-US" altLang="ko-KR" sz="1800" b="1" i="0" u="none" strike="noStrike" kern="1200" cap="none" spc="0" normalizeH="0" baseline="0" mc:Ignorable="hp" hp:hslEmbossed="0">
+                <a:solidFill>
+                  <a:srgbClr val="ffffff"/>
+                </a:solidFill>
+                <a:latin typeface="Calibri"/>
+                <a:ea typeface="맑은 고딕"/>
+                <a:cs typeface="Times New Roman"/>
+              </a:rPr>
+              <a:t>5</a:t>
+            </a:r>
+            <a:endParaRPr xmlns:mc="http://schemas.openxmlformats.org/markup-compatibility/2006" xmlns:hp="http://schemas.haansoft.com/office/presentation/8.0" kumimoji="0" lang="en-US" altLang="ko-KR" sz="1800" b="1" i="0" u="none" strike="noStrike" kern="1200" cap="none" spc="0" normalizeH="0" baseline="0" mc:Ignorable="hp" hp:hslEmbossed="0">
+              <a:solidFill>
+                <a:srgbClr val="ffffff"/>
+              </a:solidFill>
+              <a:latin typeface="Calibri"/>
+              <a:ea typeface="맑은 고딕"/>
+              <a:cs typeface="Times New Roman"/>
+            </a:endParaRPr>
+          </a:p>
+        </p:txBody>
+      </p:sp>
+      <p:cxnSp>
+        <p:nvCxnSpPr>
+          <p:cNvPr id="70" name=""/>
+          <p:cNvCxnSpPr>
+            <a:stCxn id="37" idx="3"/>
+            <a:endCxn id="69" idx="1"/>
+          </p:cNvCxnSpPr>
+          <p:nvPr/>
+        </p:nvCxnSpPr>
+        <p:spPr>
+          <a:xfrm flipV="1">
+            <a:off x="1313745" y="5302690"/>
+            <a:ext cx="481198" cy="18"/>
+          </a:xfrm>
+          <a:prstGeom prst="straightConnector1">
+            <a:avLst/>
+          </a:prstGeom>
+          <a:ln w="28575">
+            <a:solidFill>
+              <a:srgbClr val="ff0000"/>
+            </a:solidFill>
+            <a:headEnd w="med" len="med"/>
+            <a:tailEnd type="arrow" w="med" len="med"/>
+          </a:ln>
+        </p:spPr>
+        <p:style>
+          <a:lnRef idx="2">
+            <a:schemeClr val="accent6">
+              <a:shade val="20000"/>
+            </a:schemeClr>
+          </a:lnRef>
+          <a:fillRef idx="1">
+            <a:schemeClr val="accent6"/>
+          </a:fillRef>
+          <a:effectRef idx="0">
+            <a:schemeClr val="accent6"/>
+          </a:effectRef>
+          <a:fontRef idx="minor">
+            <a:schemeClr val="lt1"/>
+          </a:fontRef>
+        </p:style>
+      </p:cxnSp>
+      <p:cxnSp>
+        <p:nvCxnSpPr>
+          <p:cNvPr id="71" name=""/>
+          <p:cNvCxnSpPr>
+            <a:stCxn id="39" idx="3"/>
+            <a:endCxn id="68" idx="1"/>
+          </p:cNvCxnSpPr>
+          <p:nvPr/>
+        </p:nvCxnSpPr>
+        <p:spPr>
+          <a:xfrm>
+            <a:off x="3238537" y="5302707"/>
+            <a:ext cx="437739" cy="0"/>
+          </a:xfrm>
+          <a:prstGeom prst="straightConnector1">
+            <a:avLst/>
+          </a:prstGeom>
+          <a:ln w="28575">
+            <a:solidFill>
+              <a:srgbClr val="ff0000"/>
+            </a:solidFill>
+            <a:headEnd w="med" len="med"/>
+            <a:tailEnd type="arrow" w="med" len="med"/>
+          </a:ln>
+        </p:spPr>
+        <p:style>
+          <a:lnRef idx="2">
+            <a:schemeClr val="accent6">
+              <a:shade val="20000"/>
+            </a:schemeClr>
+          </a:lnRef>
+          <a:fillRef idx="1">
+            <a:schemeClr val="accent6"/>
+          </a:fillRef>
+          <a:effectRef idx="0">
+            <a:schemeClr val="accent6"/>
+          </a:effectRef>
+          <a:fontRef idx="minor">
+            <a:schemeClr val="lt1"/>
+          </a:fontRef>
+        </p:style>
+      </p:cxnSp>
+      <p:cxnSp>
+        <p:nvCxnSpPr>
+          <p:cNvPr id="72" name=""/>
+          <p:cNvCxnSpPr>
+            <a:stCxn id="46" idx="3"/>
+            <a:endCxn id="47" idx="1"/>
+          </p:cNvCxnSpPr>
+          <p:nvPr/>
+        </p:nvCxnSpPr>
+        <p:spPr>
+          <a:xfrm flipV="1">
+            <a:off x="10202282" y="5302690"/>
+            <a:ext cx="354964" cy="1"/>
+          </a:xfrm>
+          <a:prstGeom prst="straightConnector1">
+            <a:avLst/>
+          </a:prstGeom>
+          <a:ln w="28575">
+            <a:solidFill>
+              <a:srgbClr val="ff0000"/>
+            </a:solidFill>
+            <a:headEnd w="med" len="med"/>
+            <a:tailEnd type="arrow" w="med" len="med"/>
+          </a:ln>
+        </p:spPr>
+        <p:style>
+          <a:lnRef idx="2">
+            <a:schemeClr val="accent6">
+              <a:shade val="20000"/>
+            </a:schemeClr>
+          </a:lnRef>
+          <a:fillRef idx="1">
+            <a:schemeClr val="accent6"/>
+          </a:fillRef>
+          <a:effectRef idx="0">
+            <a:schemeClr val="accent6"/>
+          </a:effectRef>
+          <a:fontRef idx="minor">
+            <a:schemeClr val="lt1"/>
+          </a:fontRef>
+        </p:style>
+      </p:cxnSp>
+      <p:cxnSp>
+        <p:nvCxnSpPr>
+          <p:cNvPr id="73" name=""/>
+          <p:cNvCxnSpPr>
+            <a:stCxn id="41" idx="3"/>
+            <a:endCxn id="65" idx="1"/>
+          </p:cNvCxnSpPr>
+          <p:nvPr/>
+        </p:nvCxnSpPr>
+        <p:spPr>
+          <a:xfrm flipV="1">
+            <a:off x="5119870" y="5302690"/>
+            <a:ext cx="425681" cy="0"/>
+          </a:xfrm>
+          <a:prstGeom prst="straightConnector1">
+            <a:avLst/>
+          </a:prstGeom>
+          <a:ln w="28575">
+            <a:solidFill>
+              <a:srgbClr val="ff0000"/>
+            </a:solidFill>
+            <a:headEnd w="med" len="med"/>
+            <a:tailEnd type="arrow" w="med" len="med"/>
+          </a:ln>
+        </p:spPr>
+        <p:style>
+          <a:lnRef idx="2">
+            <a:schemeClr val="accent6">
+              <a:shade val="20000"/>
+            </a:schemeClr>
+          </a:lnRef>
+          <a:fillRef idx="1">
+            <a:schemeClr val="accent6"/>
+          </a:fillRef>
+          <a:effectRef idx="0">
+            <a:schemeClr val="accent6"/>
+          </a:effectRef>
+          <a:fontRef idx="minor">
+            <a:schemeClr val="lt1"/>
+          </a:fontRef>
+        </p:style>
+      </p:cxnSp>
+      <p:cxnSp>
+        <p:nvCxnSpPr>
+          <p:cNvPr id="76" name=""/>
+          <p:cNvCxnSpPr>
+            <a:stCxn id="43" idx="3"/>
+            <a:endCxn id="62" idx="1"/>
+          </p:cNvCxnSpPr>
+          <p:nvPr/>
+        </p:nvCxnSpPr>
+        <p:spPr>
+          <a:xfrm>
+            <a:off x="6989143" y="5302690"/>
+            <a:ext cx="446052" cy="17"/>
+          </a:xfrm>
+          <a:prstGeom prst="straightConnector1">
+            <a:avLst/>
+          </a:prstGeom>
+          <a:ln w="28575">
+            <a:solidFill>
+              <a:srgbClr val="ff0000"/>
+            </a:solidFill>
+            <a:headEnd w="med" len="med"/>
+            <a:tailEnd type="arrow" w="med" len="med"/>
+          </a:ln>
+        </p:spPr>
+        <p:style>
+          <a:lnRef idx="2">
+            <a:schemeClr val="accent6">
+              <a:shade val="20000"/>
+            </a:schemeClr>
+          </a:lnRef>
+          <a:fillRef idx="1">
+            <a:schemeClr val="accent6"/>
+          </a:fillRef>
+          <a:effectRef idx="0">
+            <a:schemeClr val="accent6"/>
+          </a:effectRef>
+          <a:fontRef idx="minor">
+            <a:schemeClr val="lt1"/>
+          </a:fontRef>
+        </p:style>
+      </p:cxnSp>
+      <p:cxnSp>
+        <p:nvCxnSpPr>
+          <p:cNvPr id="77" name=""/>
+          <p:cNvCxnSpPr>
+            <a:stCxn id="54" idx="3"/>
+            <a:endCxn id="58" idx="1"/>
+          </p:cNvCxnSpPr>
+          <p:nvPr/>
+        </p:nvCxnSpPr>
+        <p:spPr>
+          <a:xfrm>
+            <a:off x="8878788" y="5302691"/>
+            <a:ext cx="370625" cy="16"/>
+          </a:xfrm>
+          <a:prstGeom prst="straightConnector1">
+            <a:avLst/>
+          </a:prstGeom>
+          <a:ln w="28575">
+            <a:solidFill>
+              <a:srgbClr val="ff0000"/>
+            </a:solidFill>
+            <a:headEnd w="med" len="med"/>
+            <a:tailEnd type="arrow" w="med" len="med"/>
+          </a:ln>
+        </p:spPr>
+        <p:style>
+          <a:lnRef idx="2">
+            <a:schemeClr val="accent6">
+              <a:shade val="20000"/>
+            </a:schemeClr>
+          </a:lnRef>
+          <a:fillRef idx="1">
+            <a:schemeClr val="accent6"/>
+          </a:fillRef>
+          <a:effectRef idx="0">
+            <a:schemeClr val="accent6"/>
+          </a:effectRef>
+          <a:fontRef idx="minor">
+            <a:schemeClr val="lt1"/>
+          </a:fontRef>
+        </p:style>
+      </p:cxnSp>
+      <p:sp>
+        <p:nvSpPr>
+          <p:cNvPr id="78" name=""/>
+          <p:cNvSpPr txBox="1"/>
+          <p:nvPr/>
+        </p:nvSpPr>
+        <p:spPr>
+          <a:xfrm>
+            <a:off x="351349" y="615573"/>
+            <a:ext cx="916612" cy="364729"/>
+          </a:xfrm>
+          <a:prstGeom prst="rect">
+            <a:avLst/>
+          </a:prstGeom>
+        </p:spPr>
+        <p:txBody>
+          <a:bodyPr wrap="square">
+            <a:spAutoFit/>
+          </a:bodyPr>
+          <a:p>
+            <a:pPr marL="0" indent="0" algn="l" defTabSz="914400" rtl="0" eaLnBrk="1" latinLnBrk="1" hangingPunct="1">
+              <a:lnSpc>
+                <a:spcPct val="100000"/>
+              </a:lnSpc>
+              <a:spcBef>
+                <a:spcPct val="0"/>
+              </a:spcBef>
+              <a:spcAft>
+                <a:spcPts val="0"/>
+              </a:spcAft>
+              <a:buNone/>
+              <a:defRPr/>
+            </a:pPr>
+            <a:r>
+              <a:rPr xmlns:mc="http://schemas.openxmlformats.org/markup-compatibility/2006" xmlns:hp="http://schemas.haansoft.com/office/presentation/8.0" kumimoji="0" lang="en-US" altLang="ko-KR" sz="1800" b="1" i="0" u="none" strike="noStrike" kern="1200" cap="none" spc="0" normalizeH="0" baseline="0" mc:Ignorable="hp" hp:hslEmbossed="0">
+                <a:solidFill>
+                  <a:srgbClr val="000000"/>
+                </a:solidFill>
+                <a:latin typeface="Calibri"/>
+                <a:ea typeface="맑은 고딕"/>
+                <a:cs typeface="Times New Roman"/>
+              </a:rPr>
+              <a:t>B-Tree</a:t>
+            </a:r>
+            <a:endParaRPr xmlns:mc="http://schemas.openxmlformats.org/markup-compatibility/2006" xmlns:hp="http://schemas.haansoft.com/office/presentation/8.0" kumimoji="0" lang="en-US" altLang="ko-KR" sz="1800" b="1" i="0" u="none" strike="noStrike" kern="1200" cap="none" spc="0" normalizeH="0" baseline="0" mc:Ignorable="hp" hp:hslEmbossed="0">
+              <a:solidFill>
+                <a:srgbClr val="000000"/>
+              </a:solidFill>
+              <a:latin typeface="Calibri"/>
+              <a:ea typeface="맑은 고딕"/>
+              <a:cs typeface="Times New Roman"/>
+            </a:endParaRPr>
+          </a:p>
+        </p:txBody>
+      </p:sp>
+      <p:sp>
+        <p:nvSpPr>
+          <p:cNvPr id="79" name=""/>
+          <p:cNvSpPr txBox="1"/>
+          <p:nvPr/>
+        </p:nvSpPr>
+        <p:spPr>
+          <a:xfrm>
+            <a:off x="351349" y="3364053"/>
+            <a:ext cx="916612" cy="364729"/>
+          </a:xfrm>
+          <a:prstGeom prst="rect">
+            <a:avLst/>
+          </a:prstGeom>
+        </p:spPr>
+        <p:txBody>
+          <a:bodyPr wrap="square">
+            <a:spAutoFit/>
+          </a:bodyPr>
+          <a:p>
+            <a:pPr marL="0" indent="0" algn="l" defTabSz="914400" rtl="0" eaLnBrk="1" latinLnBrk="1" hangingPunct="1">
+              <a:lnSpc>
+                <a:spcPct val="100000"/>
+              </a:lnSpc>
+              <a:spcBef>
+                <a:spcPct val="0"/>
+              </a:spcBef>
+              <a:spcAft>
+                <a:spcPts val="0"/>
+              </a:spcAft>
+              <a:buNone/>
+              <a:defRPr/>
+            </a:pPr>
+            <a:r>
+              <a:rPr xmlns:mc="http://schemas.openxmlformats.org/markup-compatibility/2006" xmlns:hp="http://schemas.haansoft.com/office/presentation/8.0" kumimoji="0" lang="en-US" altLang="ko-KR" sz="1800" b="1" i="0" u="none" strike="noStrike" kern="1200" cap="none" spc="0" normalizeH="0" baseline="0" mc:Ignorable="hp" hp:hslEmbossed="0">
+                <a:solidFill>
+                  <a:srgbClr val="000000"/>
+                </a:solidFill>
+                <a:latin typeface="Calibri"/>
+                <a:ea typeface="맑은 고딕"/>
+                <a:cs typeface="Times New Roman"/>
+              </a:rPr>
+              <a:t>B+Tree</a:t>
+            </a:r>
+            <a:endParaRPr xmlns:mc="http://schemas.openxmlformats.org/markup-compatibility/2006" xmlns:hp="http://schemas.haansoft.com/office/presentation/8.0" kumimoji="0" lang="en-US" altLang="ko-KR" sz="1800" b="1" i="0" u="none" strike="noStrike" kern="1200" cap="none" spc="0" normalizeH="0" baseline="0" mc:Ignorable="hp" hp:hslEmbossed="0">
               <a:solidFill>
                 <a:srgbClr val="000000"/>
               </a:solidFill>

</xml_diff>

<commit_message>
add image "transaction states"
</commit_message>
<xml_diff>
--- a/etc/images.pptx
+++ b/etc/images.pptx
@@ -2,7 +2,7 @@
 <file path=ppt/presentation.xml><?xml version="1.0" encoding="utf-8"?>
 <p:presentation xmlns:r="http://schemas.openxmlformats.org/officeDocument/2006/relationships" xmlns:c="http://schemas.openxmlformats.org/drawingml/2006/chart" xmlns:a="http://schemas.openxmlformats.org/drawingml/2006/main" xmlns:dgm="http://schemas.openxmlformats.org/drawingml/2006/diagram" xmlns:dsp="http://schemas.microsoft.com/office/drawing/2008/diagram" xmlns:p="http://schemas.openxmlformats.org/presentationml/2006/main">
   <p:sldMasterIdLst>
-    <p:sldMasterId id="2147483726" r:id="rId1"/>
+    <p:sldMasterId id="2147483737" r:id="rId1"/>
   </p:sldMasterIdLst>
   <p:notesMasterIdLst>
     <p:notesMasterId r:id="rId2"/>
@@ -34,6 +34,7 @@
     <p:sldId id="279" r:id="rId26"/>
     <p:sldId id="280" r:id="rId27"/>
     <p:sldId id="281" r:id="rId28"/>
+    <p:sldId id="282" r:id="rId29"/>
   </p:sldIdLst>
   <p:sldSz cx="12192000" cy="6858000"/>
   <p:notesSz cx="6858000" cy="9144000"/>
@@ -47705,6 +47706,637 @@
 </p:sld>
 </file>
 
+<file path=ppt/slides/slide27.xml><?xml version="1.0" encoding="utf-8"?>
+<p:sld xmlns:r="http://schemas.openxmlformats.org/officeDocument/2006/relationships" xmlns:c="http://schemas.openxmlformats.org/drawingml/2006/chart" xmlns:a="http://schemas.openxmlformats.org/drawingml/2006/main" xmlns:dgm="http://schemas.openxmlformats.org/drawingml/2006/diagram" xmlns:dsp="http://schemas.microsoft.com/office/drawing/2008/diagram" xmlns:p="http://schemas.openxmlformats.org/presentationml/2006/main">
+  <p:cSld>
+    <p:spTree>
+      <p:nvGrpSpPr>
+        <p:cNvPr id="1" name=""/>
+        <p:cNvGrpSpPr/>
+        <p:nvPr/>
+      </p:nvGrpSpPr>
+      <p:grpSpPr>
+        <a:xfrm>
+          <a:off x="0" y="0"/>
+          <a:ext cx="0" cy="0"/>
+          <a:chOff x="0" y="0"/>
+          <a:chExt cx="0" cy="0"/>
+        </a:xfrm>
+      </p:grpSpPr>
+      <p:cxnSp>
+        <p:nvCxnSpPr>
+          <p:cNvPr id="5" name=""/>
+          <p:cNvCxnSpPr>
+            <a:stCxn id="6" idx="2"/>
+          </p:cNvCxnSpPr>
+          <p:nvPr/>
+        </p:nvCxnSpPr>
+        <p:spPr>
+          <a:xfrm rot="16200000" flipH="1">
+            <a:off x="5791973" y="1073647"/>
+            <a:ext cx="608062" cy="8"/>
+          </a:xfrm>
+          <a:prstGeom prst="straightConnector1">
+            <a:avLst/>
+          </a:prstGeom>
+          <a:ln w="28575">
+            <a:solidFill>
+              <a:schemeClr val="dk1"/>
+            </a:solidFill>
+            <a:tailEnd type="arrow"/>
+          </a:ln>
+        </p:spPr>
+        <p:style>
+          <a:lnRef idx="1">
+            <a:schemeClr val="accent1"/>
+          </a:lnRef>
+          <a:fillRef idx="0">
+            <a:schemeClr val="accent1"/>
+          </a:fillRef>
+          <a:effectRef idx="0">
+            <a:schemeClr val="accent1"/>
+          </a:effectRef>
+          <a:fontRef idx="minor">
+            <a:schemeClr val="tx1"/>
+          </a:fontRef>
+        </p:style>
+      </p:cxnSp>
+      <p:sp>
+        <p:nvSpPr>
+          <p:cNvPr id="6" name=""/>
+          <p:cNvSpPr txBox="1"/>
+          <p:nvPr/>
+        </p:nvSpPr>
+        <p:spPr>
+          <a:xfrm>
+            <a:off x="5133361" y="455676"/>
+            <a:ext cx="1925278" cy="313944"/>
+          </a:xfrm>
+          <a:prstGeom prst="rect">
+            <a:avLst/>
+          </a:prstGeom>
+        </p:spPr>
+        <p:txBody>
+          <a:bodyPr wrap="none">
+            <a:spAutoFit/>
+          </a:bodyPr>
+          <a:p>
+            <a:pPr>
+              <a:defRPr/>
+            </a:pPr>
+            <a:r>
+              <a:rPr lang="en-US" altLang="ko-KR" sz="1500"/>
+              <a:t>Transaction </a:t>
+            </a:r>
+            <a:r>
+              <a:rPr lang="ko-KR" altLang="en-US" sz="1500"/>
+              <a:t>수행 시작</a:t>
+            </a:r>
+            <a:endParaRPr lang="ko-KR" altLang="en-US" sz="1500"/>
+          </a:p>
+        </p:txBody>
+      </p:sp>
+      <p:sp>
+        <p:nvSpPr>
+          <p:cNvPr id="7" name=""/>
+          <p:cNvSpPr/>
+          <p:nvPr/>
+        </p:nvSpPr>
+        <p:spPr>
+          <a:xfrm>
+            <a:off x="3076404" y="2719514"/>
+            <a:ext cx="1589412" cy="709485"/>
+          </a:xfrm>
+          <a:prstGeom prst="roundRect">
+            <a:avLst>
+              <a:gd name="adj" fmla="val 16667"/>
+            </a:avLst>
+          </a:prstGeom>
+        </p:spPr>
+        <p:style>
+          <a:lnRef idx="2">
+            <a:schemeClr val="accent1">
+              <a:shade val="20000"/>
+            </a:schemeClr>
+          </a:lnRef>
+          <a:fillRef idx="1">
+            <a:schemeClr val="accent1"/>
+          </a:fillRef>
+          <a:effectRef idx="0">
+            <a:schemeClr val="accent1"/>
+          </a:effectRef>
+          <a:fontRef idx="minor">
+            <a:schemeClr val="lt1"/>
+          </a:fontRef>
+        </p:style>
+        <p:txBody>
+          <a:bodyPr anchor="ctr"/>
+          <a:p>
+            <a:pPr algn="ctr">
+              <a:defRPr/>
+            </a:pPr>
+            <a:r>
+              <a:rPr lang="en-US" altLang="ko-KR" b="1"/>
+              <a:t>Partially Committed</a:t>
+            </a:r>
+            <a:endParaRPr lang="en-US" altLang="ko-KR" b="1"/>
+          </a:p>
+        </p:txBody>
+      </p:sp>
+      <p:cxnSp>
+        <p:nvCxnSpPr>
+          <p:cNvPr id="8" name=""/>
+          <p:cNvCxnSpPr/>
+          <p:nvPr/>
+        </p:nvCxnSpPr>
+        <p:spPr>
+          <a:xfrm rot="10800000" flipV="1">
+            <a:off x="4665817" y="2087167"/>
+            <a:ext cx="635477" cy="632346"/>
+          </a:xfrm>
+          <a:prstGeom prst="straightConnector1">
+            <a:avLst/>
+          </a:prstGeom>
+          <a:ln w="28575">
+            <a:solidFill>
+              <a:schemeClr val="dk1"/>
+            </a:solidFill>
+            <a:tailEnd type="arrow"/>
+          </a:ln>
+        </p:spPr>
+        <p:style>
+          <a:lnRef idx="1">
+            <a:schemeClr val="accent1"/>
+          </a:lnRef>
+          <a:fillRef idx="0">
+            <a:schemeClr val="accent1"/>
+          </a:fillRef>
+          <a:effectRef idx="0">
+            <a:schemeClr val="accent1"/>
+          </a:effectRef>
+          <a:fontRef idx="minor">
+            <a:schemeClr val="tx1"/>
+          </a:fontRef>
+        </p:style>
+      </p:cxnSp>
+      <p:sp>
+        <p:nvSpPr>
+          <p:cNvPr id="9" name=""/>
+          <p:cNvSpPr/>
+          <p:nvPr/>
+        </p:nvSpPr>
+        <p:spPr>
+          <a:xfrm>
+            <a:off x="7523317" y="2719514"/>
+            <a:ext cx="1589412" cy="709485"/>
+          </a:xfrm>
+          <a:prstGeom prst="roundRect">
+            <a:avLst>
+              <a:gd name="adj" fmla="val 16667"/>
+            </a:avLst>
+          </a:prstGeom>
+        </p:spPr>
+        <p:style>
+          <a:lnRef idx="2">
+            <a:schemeClr val="accent1">
+              <a:shade val="20000"/>
+            </a:schemeClr>
+          </a:lnRef>
+          <a:fillRef idx="1">
+            <a:schemeClr val="accent1"/>
+          </a:fillRef>
+          <a:effectRef idx="0">
+            <a:schemeClr val="accent1"/>
+          </a:effectRef>
+          <a:fontRef idx="minor">
+            <a:schemeClr val="lt1"/>
+          </a:fontRef>
+        </p:style>
+        <p:txBody>
+          <a:bodyPr anchor="ctr"/>
+          <a:p>
+            <a:pPr algn="ctr">
+              <a:defRPr/>
+            </a:pPr>
+            <a:r>
+              <a:rPr lang="en-US" altLang="ko-KR" b="1"/>
+              <a:t>Failed</a:t>
+            </a:r>
+            <a:endParaRPr lang="en-US" altLang="ko-KR" b="1"/>
+          </a:p>
+        </p:txBody>
+      </p:sp>
+      <p:cxnSp>
+        <p:nvCxnSpPr>
+          <p:cNvPr id="10" name=""/>
+          <p:cNvCxnSpPr/>
+          <p:nvPr/>
+        </p:nvCxnSpPr>
+        <p:spPr>
+          <a:xfrm>
+            <a:off x="6890706" y="2087168"/>
+            <a:ext cx="632611" cy="632346"/>
+          </a:xfrm>
+          <a:prstGeom prst="straightConnector1">
+            <a:avLst/>
+          </a:prstGeom>
+          <a:ln w="28575">
+            <a:solidFill>
+              <a:schemeClr val="dk1"/>
+            </a:solidFill>
+            <a:tailEnd type="arrow"/>
+          </a:ln>
+        </p:spPr>
+        <p:style>
+          <a:lnRef idx="1">
+            <a:schemeClr val="accent1"/>
+          </a:lnRef>
+          <a:fillRef idx="0">
+            <a:schemeClr val="accent1"/>
+          </a:fillRef>
+          <a:effectRef idx="0">
+            <a:schemeClr val="accent1"/>
+          </a:effectRef>
+          <a:fontRef idx="minor">
+            <a:schemeClr val="tx1"/>
+          </a:fontRef>
+        </p:style>
+      </p:cxnSp>
+      <p:sp>
+        <p:nvSpPr>
+          <p:cNvPr id="11" name=""/>
+          <p:cNvSpPr/>
+          <p:nvPr/>
+        </p:nvSpPr>
+        <p:spPr>
+          <a:xfrm>
+            <a:off x="5301294" y="1377682"/>
+            <a:ext cx="1589412" cy="709485"/>
+          </a:xfrm>
+          <a:prstGeom prst="roundRect">
+            <a:avLst>
+              <a:gd name="adj" fmla="val 16667"/>
+            </a:avLst>
+          </a:prstGeom>
+        </p:spPr>
+        <p:style>
+          <a:lnRef idx="2">
+            <a:schemeClr val="accent1">
+              <a:shade val="20000"/>
+            </a:schemeClr>
+          </a:lnRef>
+          <a:fillRef idx="1">
+            <a:schemeClr val="accent1"/>
+          </a:fillRef>
+          <a:effectRef idx="0">
+            <a:schemeClr val="accent1"/>
+          </a:effectRef>
+          <a:fontRef idx="minor">
+            <a:schemeClr val="lt1"/>
+          </a:fontRef>
+        </p:style>
+        <p:txBody>
+          <a:bodyPr anchor="ctr"/>
+          <a:p>
+            <a:pPr algn="ctr">
+              <a:defRPr/>
+            </a:pPr>
+            <a:r>
+              <a:rPr lang="en-US" altLang="ko-KR" b="1"/>
+              <a:t>Active</a:t>
+            </a:r>
+            <a:endParaRPr lang="en-US" altLang="ko-KR" b="1"/>
+          </a:p>
+        </p:txBody>
+      </p:sp>
+      <p:sp>
+        <p:nvSpPr>
+          <p:cNvPr id="12" name=""/>
+          <p:cNvSpPr/>
+          <p:nvPr/>
+        </p:nvSpPr>
+        <p:spPr>
+          <a:xfrm>
+            <a:off x="3076404" y="4297449"/>
+            <a:ext cx="1589412" cy="709485"/>
+          </a:xfrm>
+          <a:prstGeom prst="roundRect">
+            <a:avLst>
+              <a:gd name="adj" fmla="val 16667"/>
+            </a:avLst>
+          </a:prstGeom>
+        </p:spPr>
+        <p:style>
+          <a:lnRef idx="2">
+            <a:schemeClr val="accent1">
+              <a:shade val="20000"/>
+            </a:schemeClr>
+          </a:lnRef>
+          <a:fillRef idx="1">
+            <a:schemeClr val="accent1"/>
+          </a:fillRef>
+          <a:effectRef idx="0">
+            <a:schemeClr val="accent1"/>
+          </a:effectRef>
+          <a:fontRef idx="minor">
+            <a:schemeClr val="lt1"/>
+          </a:fontRef>
+        </p:style>
+        <p:txBody>
+          <a:bodyPr anchor="ctr"/>
+          <a:p>
+            <a:pPr algn="ctr">
+              <a:defRPr/>
+            </a:pPr>
+            <a:r>
+              <a:rPr lang="en-US" altLang="ko-KR" b="1"/>
+              <a:t>Committed</a:t>
+            </a:r>
+            <a:endParaRPr lang="en-US" altLang="ko-KR" b="1"/>
+          </a:p>
+        </p:txBody>
+      </p:sp>
+      <p:sp>
+        <p:nvSpPr>
+          <p:cNvPr id="13" name=""/>
+          <p:cNvSpPr/>
+          <p:nvPr/>
+        </p:nvSpPr>
+        <p:spPr>
+          <a:xfrm>
+            <a:off x="7523317" y="4297449"/>
+            <a:ext cx="1589412" cy="709485"/>
+          </a:xfrm>
+          <a:prstGeom prst="roundRect">
+            <a:avLst>
+              <a:gd name="adj" fmla="val 16667"/>
+            </a:avLst>
+          </a:prstGeom>
+        </p:spPr>
+        <p:style>
+          <a:lnRef idx="2">
+            <a:schemeClr val="accent1">
+              <a:shade val="20000"/>
+            </a:schemeClr>
+          </a:lnRef>
+          <a:fillRef idx="1">
+            <a:schemeClr val="accent1"/>
+          </a:fillRef>
+          <a:effectRef idx="0">
+            <a:schemeClr val="accent1"/>
+          </a:effectRef>
+          <a:fontRef idx="minor">
+            <a:schemeClr val="lt1"/>
+          </a:fontRef>
+        </p:style>
+        <p:txBody>
+          <a:bodyPr anchor="ctr"/>
+          <a:p>
+            <a:pPr algn="ctr">
+              <a:defRPr/>
+            </a:pPr>
+            <a:r>
+              <a:rPr lang="en-US" altLang="ko-KR" b="1"/>
+              <a:t>Aborted</a:t>
+            </a:r>
+            <a:endParaRPr lang="en-US" altLang="ko-KR" b="1"/>
+          </a:p>
+        </p:txBody>
+      </p:sp>
+      <p:cxnSp>
+        <p:nvCxnSpPr>
+          <p:cNvPr id="14" name=""/>
+          <p:cNvCxnSpPr>
+            <a:stCxn id="7" idx="3"/>
+            <a:endCxn id="9" idx="1"/>
+          </p:cNvCxnSpPr>
+          <p:nvPr/>
+        </p:nvCxnSpPr>
+        <p:spPr>
+          <a:xfrm>
+            <a:off x="4665817" y="3074257"/>
+            <a:ext cx="2857500" cy="0"/>
+          </a:xfrm>
+          <a:prstGeom prst="straightConnector1">
+            <a:avLst/>
+          </a:prstGeom>
+          <a:ln w="28575">
+            <a:solidFill>
+              <a:schemeClr val="dk1"/>
+            </a:solidFill>
+            <a:tailEnd type="arrow"/>
+          </a:ln>
+        </p:spPr>
+        <p:style>
+          <a:lnRef idx="1">
+            <a:schemeClr val="accent1"/>
+          </a:lnRef>
+          <a:fillRef idx="0">
+            <a:schemeClr val="accent1"/>
+          </a:fillRef>
+          <a:effectRef idx="0">
+            <a:schemeClr val="accent1"/>
+          </a:effectRef>
+          <a:fontRef idx="minor">
+            <a:schemeClr val="tx1"/>
+          </a:fontRef>
+        </p:style>
+      </p:cxnSp>
+      <p:cxnSp>
+        <p:nvCxnSpPr>
+          <p:cNvPr id="15" name=""/>
+          <p:cNvCxnSpPr>
+            <a:stCxn id="7" idx="2"/>
+            <a:endCxn id="12" idx="0"/>
+          </p:cNvCxnSpPr>
+          <p:nvPr/>
+        </p:nvCxnSpPr>
+        <p:spPr>
+          <a:xfrm rot="16200000" flipH="1">
+            <a:off x="3436885" y="3863224"/>
+            <a:ext cx="868450" cy="0"/>
+          </a:xfrm>
+          <a:prstGeom prst="straightConnector1">
+            <a:avLst/>
+          </a:prstGeom>
+          <a:ln w="28575">
+            <a:solidFill>
+              <a:schemeClr val="dk1"/>
+            </a:solidFill>
+            <a:tailEnd type="arrow"/>
+          </a:ln>
+        </p:spPr>
+        <p:style>
+          <a:lnRef idx="1">
+            <a:schemeClr val="accent1"/>
+          </a:lnRef>
+          <a:fillRef idx="0">
+            <a:schemeClr val="accent1"/>
+          </a:fillRef>
+          <a:effectRef idx="0">
+            <a:schemeClr val="accent1"/>
+          </a:effectRef>
+          <a:fontRef idx="minor">
+            <a:schemeClr val="tx1"/>
+          </a:fontRef>
+        </p:style>
+      </p:cxnSp>
+      <p:cxnSp>
+        <p:nvCxnSpPr>
+          <p:cNvPr id="16" name=""/>
+          <p:cNvCxnSpPr>
+            <a:stCxn id="9" idx="2"/>
+            <a:endCxn id="13" idx="0"/>
+          </p:cNvCxnSpPr>
+          <p:nvPr/>
+        </p:nvCxnSpPr>
+        <p:spPr>
+          <a:xfrm rot="16200000" flipH="1">
+            <a:off x="7883798" y="3863224"/>
+            <a:ext cx="868449" cy="1"/>
+          </a:xfrm>
+          <a:prstGeom prst="straightConnector1">
+            <a:avLst/>
+          </a:prstGeom>
+          <a:ln w="28575">
+            <a:solidFill>
+              <a:schemeClr val="dk1"/>
+            </a:solidFill>
+            <a:tailEnd type="arrow"/>
+          </a:ln>
+        </p:spPr>
+        <p:style>
+          <a:lnRef idx="1">
+            <a:schemeClr val="accent1"/>
+          </a:lnRef>
+          <a:fillRef idx="0">
+            <a:schemeClr val="accent1"/>
+          </a:fillRef>
+          <a:effectRef idx="0">
+            <a:schemeClr val="accent1"/>
+          </a:effectRef>
+          <a:fontRef idx="minor">
+            <a:schemeClr val="tx1"/>
+          </a:fontRef>
+        </p:style>
+      </p:cxnSp>
+      <p:sp>
+        <p:nvSpPr>
+          <p:cNvPr id="17" name=""/>
+          <p:cNvSpPr txBox="1"/>
+          <p:nvPr/>
+        </p:nvSpPr>
+        <p:spPr>
+          <a:xfrm>
+            <a:off x="3871110" y="3680087"/>
+            <a:ext cx="897105" cy="366274"/>
+          </a:xfrm>
+          <a:prstGeom prst="rect">
+            <a:avLst/>
+          </a:prstGeom>
+        </p:spPr>
+        <p:txBody>
+          <a:bodyPr wrap="none">
+            <a:spAutoFit/>
+          </a:bodyPr>
+          <a:p>
+            <a:pPr>
+              <a:defRPr/>
+            </a:pPr>
+            <a:r>
+              <a:rPr lang="en-US" altLang="ko-KR"/>
+              <a:t>commit</a:t>
+            </a:r>
+            <a:endParaRPr lang="en-US" altLang="ko-KR"/>
+          </a:p>
+        </p:txBody>
+      </p:sp>
+      <p:sp>
+        <p:nvSpPr>
+          <p:cNvPr id="18" name=""/>
+          <p:cNvSpPr txBox="1"/>
+          <p:nvPr/>
+        </p:nvSpPr>
+        <p:spPr>
+          <a:xfrm>
+            <a:off x="8318024" y="3680087"/>
+            <a:ext cx="917416" cy="366274"/>
+          </a:xfrm>
+          <a:prstGeom prst="rect">
+            <a:avLst/>
+          </a:prstGeom>
+        </p:spPr>
+        <p:txBody>
+          <a:bodyPr wrap="none">
+            <a:spAutoFit/>
+          </a:bodyPr>
+          <a:p>
+            <a:pPr>
+              <a:defRPr/>
+            </a:pPr>
+            <a:r>
+              <a:rPr lang="en-US" altLang="ko-KR"/>
+              <a:t>rollback</a:t>
+            </a:r>
+            <a:endParaRPr lang="en-US" altLang="ko-KR"/>
+          </a:p>
+        </p:txBody>
+      </p:sp>
+      <p:sp>
+        <p:nvSpPr>
+          <p:cNvPr id="19" name=""/>
+          <p:cNvSpPr txBox="1"/>
+          <p:nvPr/>
+        </p:nvSpPr>
+        <p:spPr>
+          <a:xfrm>
+            <a:off x="3076404" y="455676"/>
+            <a:ext cx="1872786" cy="367291"/>
+          </a:xfrm>
+          <a:prstGeom prst="rect">
+            <a:avLst/>
+          </a:prstGeom>
+        </p:spPr>
+        <p:txBody>
+          <a:bodyPr wrap="square">
+            <a:spAutoFit/>
+          </a:bodyPr>
+          <a:p>
+            <a:pPr>
+              <a:defRPr/>
+            </a:pPr>
+            <a:r>
+              <a:rPr lang="en-US" altLang="ko-KR">
+                <a:solidFill>
+                  <a:schemeClr val="accent2"/>
+                </a:solidFill>
+              </a:rPr>
+              <a:t>Transaction States</a:t>
+            </a:r>
+            <a:endParaRPr lang="en-US" altLang="ko-KR">
+              <a:solidFill>
+                <a:schemeClr val="accent2"/>
+              </a:solidFill>
+            </a:endParaRPr>
+          </a:p>
+        </p:txBody>
+      </p:sp>
+    </p:spTree>
+  </p:cSld>
+  <p:clrMapOvr>
+    <a:masterClrMapping/>
+  </p:clrMapOvr>
+  <mc:AlternateContent xmlns:mc="http://schemas.openxmlformats.org/markup-compatibility/2006">
+    <mc:Choice xmlns:p14="http://schemas.microsoft.com/office/powerpoint/2010/main" Requires="p14">
+      <p:transition xmlns:mc="http://schemas.openxmlformats.org/markup-compatibility/2006" xmlns:p14="http://schemas.microsoft.com/office/powerpoint/2010/main" mc:Ignorable="p14" p14:dur="500"/>
+    </mc:Choice>
+    <mc:Fallback>
+      <p:transition/>
+    </mc:Fallback>
+  </mc:AlternateContent>
+</p:sld>
+</file>
+
 <file path=ppt/slides/slide3.xml><?xml version="1.0" encoding="utf-8"?>
 <p:sld xmlns:r="http://schemas.openxmlformats.org/officeDocument/2006/relationships" xmlns:c="http://schemas.openxmlformats.org/drawingml/2006/chart" xmlns:a="http://schemas.openxmlformats.org/drawingml/2006/main" xmlns:dgm="http://schemas.openxmlformats.org/drawingml/2006/diagram" xmlns:dsp="http://schemas.microsoft.com/office/drawing/2008/diagram" xmlns:p="http://schemas.openxmlformats.org/presentationml/2006/main">
   <p:cSld>

</xml_diff>